<commit_message>
update css - code highlight - scrollbar color - table css
update post
- .NET MAUI : update image size and align

new post
- packet sniffing
</commit_message>
<xml_diff>
--- a/assets/etc/이미지제작용.pptx
+++ b/assets/etc/이미지제작용.pptx
@@ -6,15 +6,16 @@
   </p:sldMasterIdLst>
   <p:sldIdLst>
     <p:sldId id="256" r:id="rId2"/>
+    <p:sldId id="257" r:id="rId3"/>
   </p:sldIdLst>
-  <p:sldSz cx="9144000" cy="6858000" type="screen4x3"/>
+  <p:sldSz cx="11522075" cy="6480175"/>
   <p:notesSz cx="6858000" cy="9144000"/>
   <p:defaultTextStyle>
     <a:defPPr>
       <a:defRPr lang="ko-KR"/>
     </a:defPPr>
-    <a:lvl1pPr marL="0" algn="l" defTabSz="914400" rtl="0" eaLnBrk="1" latinLnBrk="1" hangingPunct="1">
-      <a:defRPr sz="1800" kern="1200">
+    <a:lvl1pPr marL="0" algn="l" defTabSz="1107796" rtl="0" eaLnBrk="1" latinLnBrk="1" hangingPunct="1">
+      <a:defRPr sz="2200" kern="1200">
         <a:solidFill>
           <a:schemeClr val="tx1"/>
         </a:solidFill>
@@ -23,8 +24,8 @@
         <a:cs typeface="+mn-cs"/>
       </a:defRPr>
     </a:lvl1pPr>
-    <a:lvl2pPr marL="457200" algn="l" defTabSz="914400" rtl="0" eaLnBrk="1" latinLnBrk="1" hangingPunct="1">
-      <a:defRPr sz="1800" kern="1200">
+    <a:lvl2pPr marL="553898" algn="l" defTabSz="1107796" rtl="0" eaLnBrk="1" latinLnBrk="1" hangingPunct="1">
+      <a:defRPr sz="2200" kern="1200">
         <a:solidFill>
           <a:schemeClr val="tx1"/>
         </a:solidFill>
@@ -33,8 +34,8 @@
         <a:cs typeface="+mn-cs"/>
       </a:defRPr>
     </a:lvl2pPr>
-    <a:lvl3pPr marL="914400" algn="l" defTabSz="914400" rtl="0" eaLnBrk="1" latinLnBrk="1" hangingPunct="1">
-      <a:defRPr sz="1800" kern="1200">
+    <a:lvl3pPr marL="1107796" algn="l" defTabSz="1107796" rtl="0" eaLnBrk="1" latinLnBrk="1" hangingPunct="1">
+      <a:defRPr sz="2200" kern="1200">
         <a:solidFill>
           <a:schemeClr val="tx1"/>
         </a:solidFill>
@@ -43,8 +44,8 @@
         <a:cs typeface="+mn-cs"/>
       </a:defRPr>
     </a:lvl3pPr>
-    <a:lvl4pPr marL="1371600" algn="l" defTabSz="914400" rtl="0" eaLnBrk="1" latinLnBrk="1" hangingPunct="1">
-      <a:defRPr sz="1800" kern="1200">
+    <a:lvl4pPr marL="1661693" algn="l" defTabSz="1107796" rtl="0" eaLnBrk="1" latinLnBrk="1" hangingPunct="1">
+      <a:defRPr sz="2200" kern="1200">
         <a:solidFill>
           <a:schemeClr val="tx1"/>
         </a:solidFill>
@@ -53,8 +54,8 @@
         <a:cs typeface="+mn-cs"/>
       </a:defRPr>
     </a:lvl4pPr>
-    <a:lvl5pPr marL="1828800" algn="l" defTabSz="914400" rtl="0" eaLnBrk="1" latinLnBrk="1" hangingPunct="1">
-      <a:defRPr sz="1800" kern="1200">
+    <a:lvl5pPr marL="2215591" algn="l" defTabSz="1107796" rtl="0" eaLnBrk="1" latinLnBrk="1" hangingPunct="1">
+      <a:defRPr sz="2200" kern="1200">
         <a:solidFill>
           <a:schemeClr val="tx1"/>
         </a:solidFill>
@@ -63,8 +64,8 @@
         <a:cs typeface="+mn-cs"/>
       </a:defRPr>
     </a:lvl5pPr>
-    <a:lvl6pPr marL="2286000" algn="l" defTabSz="914400" rtl="0" eaLnBrk="1" latinLnBrk="1" hangingPunct="1">
-      <a:defRPr sz="1800" kern="1200">
+    <a:lvl6pPr marL="2769489" algn="l" defTabSz="1107796" rtl="0" eaLnBrk="1" latinLnBrk="1" hangingPunct="1">
+      <a:defRPr sz="2200" kern="1200">
         <a:solidFill>
           <a:schemeClr val="tx1"/>
         </a:solidFill>
@@ -73,8 +74,8 @@
         <a:cs typeface="+mn-cs"/>
       </a:defRPr>
     </a:lvl6pPr>
-    <a:lvl7pPr marL="2743200" algn="l" defTabSz="914400" rtl="0" eaLnBrk="1" latinLnBrk="1" hangingPunct="1">
-      <a:defRPr sz="1800" kern="1200">
+    <a:lvl7pPr marL="3323387" algn="l" defTabSz="1107796" rtl="0" eaLnBrk="1" latinLnBrk="1" hangingPunct="1">
+      <a:defRPr sz="2200" kern="1200">
         <a:solidFill>
           <a:schemeClr val="tx1"/>
         </a:solidFill>
@@ -83,8 +84,8 @@
         <a:cs typeface="+mn-cs"/>
       </a:defRPr>
     </a:lvl7pPr>
-    <a:lvl8pPr marL="3200400" algn="l" defTabSz="914400" rtl="0" eaLnBrk="1" latinLnBrk="1" hangingPunct="1">
-      <a:defRPr sz="1800" kern="1200">
+    <a:lvl8pPr marL="3877285" algn="l" defTabSz="1107796" rtl="0" eaLnBrk="1" latinLnBrk="1" hangingPunct="1">
+      <a:defRPr sz="2200" kern="1200">
         <a:solidFill>
           <a:schemeClr val="tx1"/>
         </a:solidFill>
@@ -93,8 +94,8 @@
         <a:cs typeface="+mn-cs"/>
       </a:defRPr>
     </a:lvl8pPr>
-    <a:lvl9pPr marL="3657600" algn="l" defTabSz="914400" rtl="0" eaLnBrk="1" latinLnBrk="1" hangingPunct="1">
-      <a:defRPr sz="1800" kern="1200">
+    <a:lvl9pPr marL="4431182" algn="l" defTabSz="1107796" rtl="0" eaLnBrk="1" latinLnBrk="1" hangingPunct="1">
+      <a:defRPr sz="2200" kern="1200">
         <a:solidFill>
           <a:schemeClr val="tx1"/>
         </a:solidFill>
@@ -136,8 +137,8 @@
         </p:nvSpPr>
         <p:spPr>
           <a:xfrm>
-            <a:off x="685800" y="2130425"/>
-            <a:ext cx="7772400" cy="1470025"/>
+            <a:off x="864156" y="2013056"/>
+            <a:ext cx="9793764" cy="1389038"/>
           </a:xfrm>
         </p:spPr>
         <p:txBody>
@@ -164,8 +165,8 @@
         </p:nvSpPr>
         <p:spPr>
           <a:xfrm>
-            <a:off x="1371600" y="3886200"/>
-            <a:ext cx="6400800" cy="1752600"/>
+            <a:off x="1728311" y="3672099"/>
+            <a:ext cx="8065453" cy="1656045"/>
           </a:xfrm>
         </p:spPr>
         <p:txBody>
@@ -181,7 +182,7 @@
                 </a:solidFill>
               </a:defRPr>
             </a:lvl1pPr>
-            <a:lvl2pPr marL="457200" indent="0" algn="ctr">
+            <a:lvl2pPr marL="553898" indent="0" algn="ctr">
               <a:buNone/>
               <a:defRPr>
                 <a:solidFill>
@@ -191,7 +192,7 @@
                 </a:solidFill>
               </a:defRPr>
             </a:lvl2pPr>
-            <a:lvl3pPr marL="914400" indent="0" algn="ctr">
+            <a:lvl3pPr marL="1107796" indent="0" algn="ctr">
               <a:buNone/>
               <a:defRPr>
                 <a:solidFill>
@@ -201,7 +202,7 @@
                 </a:solidFill>
               </a:defRPr>
             </a:lvl3pPr>
-            <a:lvl4pPr marL="1371600" indent="0" algn="ctr">
+            <a:lvl4pPr marL="1661693" indent="0" algn="ctr">
               <a:buNone/>
               <a:defRPr>
                 <a:solidFill>
@@ -211,7 +212,7 @@
                 </a:solidFill>
               </a:defRPr>
             </a:lvl4pPr>
-            <a:lvl5pPr marL="1828800" indent="0" algn="ctr">
+            <a:lvl5pPr marL="2215591" indent="0" algn="ctr">
               <a:buNone/>
               <a:defRPr>
                 <a:solidFill>
@@ -221,7 +222,7 @@
                 </a:solidFill>
               </a:defRPr>
             </a:lvl5pPr>
-            <a:lvl6pPr marL="2286000" indent="0" algn="ctr">
+            <a:lvl6pPr marL="2769489" indent="0" algn="ctr">
               <a:buNone/>
               <a:defRPr>
                 <a:solidFill>
@@ -231,7 +232,7 @@
                 </a:solidFill>
               </a:defRPr>
             </a:lvl6pPr>
-            <a:lvl7pPr marL="2743200" indent="0" algn="ctr">
+            <a:lvl7pPr marL="3323387" indent="0" algn="ctr">
               <a:buNone/>
               <a:defRPr>
                 <a:solidFill>
@@ -241,7 +242,7 @@
                 </a:solidFill>
               </a:defRPr>
             </a:lvl7pPr>
-            <a:lvl8pPr marL="3200400" indent="0" algn="ctr">
+            <a:lvl8pPr marL="3877285" indent="0" algn="ctr">
               <a:buNone/>
               <a:defRPr>
                 <a:solidFill>
@@ -251,7 +252,7 @@
                 </a:solidFill>
               </a:defRPr>
             </a:lvl8pPr>
-            <a:lvl9pPr marL="3657600" indent="0" algn="ctr">
+            <a:lvl9pPr marL="4431182" indent="0" algn="ctr">
               <a:buNone/>
               <a:defRPr>
                 <a:solidFill>
@@ -288,7 +289,7 @@
           <a:p>
             <a:fld id="{10B01263-E573-4C51-9265-094B7818CB45}" type="datetimeFigureOut">
               <a:rPr lang="ko-KR" altLang="en-US" smtClean="0"/>
-              <a:t>2023-11-17</a:t>
+              <a:t>2024-02-15</a:t>
             </a:fld>
             <a:endParaRPr lang="ko-KR" altLang="en-US"/>
           </a:p>
@@ -458,7 +459,7 @@
           <a:p>
             <a:fld id="{10B01263-E573-4C51-9265-094B7818CB45}" type="datetimeFigureOut">
               <a:rPr lang="ko-KR" altLang="en-US" smtClean="0"/>
-              <a:t>2023-11-17</a:t>
+              <a:t>2024-02-15</a:t>
             </a:fld>
             <a:endParaRPr lang="ko-KR" altLang="en-US"/>
           </a:p>
@@ -548,8 +549,8 @@
         </p:nvSpPr>
         <p:spPr>
           <a:xfrm>
-            <a:off x="6629400" y="274638"/>
-            <a:ext cx="2057400" cy="5851525"/>
+            <a:off x="8353504" y="259508"/>
+            <a:ext cx="2592467" cy="5529150"/>
           </a:xfrm>
         </p:spPr>
         <p:txBody>
@@ -576,8 +577,8 @@
         </p:nvSpPr>
         <p:spPr>
           <a:xfrm>
-            <a:off x="457200" y="274638"/>
-            <a:ext cx="6019800" cy="5851525"/>
+            <a:off x="576104" y="259508"/>
+            <a:ext cx="7585366" cy="5529150"/>
           </a:xfrm>
         </p:spPr>
         <p:txBody>
@@ -638,7 +639,7 @@
           <a:p>
             <a:fld id="{10B01263-E573-4C51-9265-094B7818CB45}" type="datetimeFigureOut">
               <a:rPr lang="ko-KR" altLang="en-US" smtClean="0"/>
-              <a:t>2023-11-17</a:t>
+              <a:t>2024-02-15</a:t>
             </a:fld>
             <a:endParaRPr lang="ko-KR" altLang="en-US"/>
           </a:p>
@@ -808,7 +809,7 @@
           <a:p>
             <a:fld id="{10B01263-E573-4C51-9265-094B7818CB45}" type="datetimeFigureOut">
               <a:rPr lang="ko-KR" altLang="en-US" smtClean="0"/>
-              <a:t>2023-11-17</a:t>
+              <a:t>2024-02-15</a:t>
             </a:fld>
             <a:endParaRPr lang="ko-KR" altLang="en-US"/>
           </a:p>
@@ -898,15 +899,15 @@
         </p:nvSpPr>
         <p:spPr>
           <a:xfrm>
-            <a:off x="722313" y="4406900"/>
-            <a:ext cx="7772400" cy="1362075"/>
+            <a:off x="910164" y="4164114"/>
+            <a:ext cx="9793764" cy="1287035"/>
           </a:xfrm>
         </p:spPr>
         <p:txBody>
           <a:bodyPr anchor="t"/>
           <a:lstStyle>
             <a:lvl1pPr algn="l">
-              <a:defRPr sz="4000" b="1" cap="all"/>
+              <a:defRPr sz="4800" b="1" cap="all"/>
             </a:lvl1pPr>
           </a:lstStyle>
           <a:p>
@@ -930,8 +931,8 @@
         </p:nvSpPr>
         <p:spPr>
           <a:xfrm>
-            <a:off x="722313" y="2906713"/>
-            <a:ext cx="7772400" cy="1500187"/>
+            <a:off x="910164" y="2746575"/>
+            <a:ext cx="9793764" cy="1417538"/>
           </a:xfrm>
         </p:spPr>
         <p:txBody>
@@ -939,7 +940,7 @@
           <a:lstStyle>
             <a:lvl1pPr marL="0" indent="0">
               <a:buNone/>
-              <a:defRPr sz="2000">
+              <a:defRPr sz="2400">
                 <a:solidFill>
                   <a:schemeClr val="tx1">
                     <a:tint val="75000"/>
@@ -947,9 +948,9 @@
                 </a:solidFill>
               </a:defRPr>
             </a:lvl1pPr>
-            <a:lvl2pPr marL="457200" indent="0">
-              <a:buNone/>
-              <a:defRPr sz="1800">
+            <a:lvl2pPr marL="553898" indent="0">
+              <a:buNone/>
+              <a:defRPr sz="2200">
                 <a:solidFill>
                   <a:schemeClr val="tx1">
                     <a:tint val="75000"/>
@@ -957,9 +958,9 @@
                 </a:solidFill>
               </a:defRPr>
             </a:lvl2pPr>
-            <a:lvl3pPr marL="914400" indent="0">
-              <a:buNone/>
-              <a:defRPr sz="1600">
+            <a:lvl3pPr marL="1107796" indent="0">
+              <a:buNone/>
+              <a:defRPr sz="1900">
                 <a:solidFill>
                   <a:schemeClr val="tx1">
                     <a:tint val="75000"/>
@@ -967,9 +968,9 @@
                 </a:solidFill>
               </a:defRPr>
             </a:lvl3pPr>
-            <a:lvl4pPr marL="1371600" indent="0">
-              <a:buNone/>
-              <a:defRPr sz="1400">
+            <a:lvl4pPr marL="1661693" indent="0">
+              <a:buNone/>
+              <a:defRPr sz="1700">
                 <a:solidFill>
                   <a:schemeClr val="tx1">
                     <a:tint val="75000"/>
@@ -977,9 +978,9 @@
                 </a:solidFill>
               </a:defRPr>
             </a:lvl4pPr>
-            <a:lvl5pPr marL="1828800" indent="0">
-              <a:buNone/>
-              <a:defRPr sz="1400">
+            <a:lvl5pPr marL="2215591" indent="0">
+              <a:buNone/>
+              <a:defRPr sz="1700">
                 <a:solidFill>
                   <a:schemeClr val="tx1">
                     <a:tint val="75000"/>
@@ -987,9 +988,9 @@
                 </a:solidFill>
               </a:defRPr>
             </a:lvl5pPr>
-            <a:lvl6pPr marL="2286000" indent="0">
-              <a:buNone/>
-              <a:defRPr sz="1400">
+            <a:lvl6pPr marL="2769489" indent="0">
+              <a:buNone/>
+              <a:defRPr sz="1700">
                 <a:solidFill>
                   <a:schemeClr val="tx1">
                     <a:tint val="75000"/>
@@ -997,9 +998,9 @@
                 </a:solidFill>
               </a:defRPr>
             </a:lvl6pPr>
-            <a:lvl7pPr marL="2743200" indent="0">
-              <a:buNone/>
-              <a:defRPr sz="1400">
+            <a:lvl7pPr marL="3323387" indent="0">
+              <a:buNone/>
+              <a:defRPr sz="1700">
                 <a:solidFill>
                   <a:schemeClr val="tx1">
                     <a:tint val="75000"/>
@@ -1007,9 +1008,9 @@
                 </a:solidFill>
               </a:defRPr>
             </a:lvl7pPr>
-            <a:lvl8pPr marL="3200400" indent="0">
-              <a:buNone/>
-              <a:defRPr sz="1400">
+            <a:lvl8pPr marL="3877285" indent="0">
+              <a:buNone/>
+              <a:defRPr sz="1700">
                 <a:solidFill>
                   <a:schemeClr val="tx1">
                     <a:tint val="75000"/>
@@ -1017,9 +1018,9 @@
                 </a:solidFill>
               </a:defRPr>
             </a:lvl8pPr>
-            <a:lvl9pPr marL="3657600" indent="0">
-              <a:buNone/>
-              <a:defRPr sz="1400">
+            <a:lvl9pPr marL="4431182" indent="0">
+              <a:buNone/>
+              <a:defRPr sz="1700">
                 <a:solidFill>
                   <a:schemeClr val="tx1">
                     <a:tint val="75000"/>
@@ -1054,7 +1055,7 @@
           <a:p>
             <a:fld id="{10B01263-E573-4C51-9265-094B7818CB45}" type="datetimeFigureOut">
               <a:rPr lang="ko-KR" altLang="en-US" smtClean="0"/>
-              <a:t>2023-11-17</a:t>
+              <a:t>2024-02-15</a:t>
             </a:fld>
             <a:endParaRPr lang="ko-KR" altLang="en-US"/>
           </a:p>
@@ -1167,39 +1168,39 @@
         </p:nvSpPr>
         <p:spPr>
           <a:xfrm>
-            <a:off x="457200" y="1600200"/>
-            <a:ext cx="4038600" cy="4525963"/>
+            <a:off x="576104" y="1512041"/>
+            <a:ext cx="5088916" cy="4276616"/>
           </a:xfrm>
         </p:spPr>
         <p:txBody>
           <a:bodyPr/>
           <a:lstStyle>
             <a:lvl1pPr>
-              <a:defRPr sz="2800"/>
+              <a:defRPr sz="3400"/>
             </a:lvl1pPr>
             <a:lvl2pPr>
-              <a:defRPr sz="2400"/>
+              <a:defRPr sz="2900"/>
             </a:lvl2pPr>
             <a:lvl3pPr>
-              <a:defRPr sz="2000"/>
+              <a:defRPr sz="2400"/>
             </a:lvl3pPr>
             <a:lvl4pPr>
-              <a:defRPr sz="1800"/>
+              <a:defRPr sz="2200"/>
             </a:lvl4pPr>
             <a:lvl5pPr>
-              <a:defRPr sz="1800"/>
+              <a:defRPr sz="2200"/>
             </a:lvl5pPr>
             <a:lvl6pPr>
-              <a:defRPr sz="1800"/>
+              <a:defRPr sz="2200"/>
             </a:lvl6pPr>
             <a:lvl7pPr>
-              <a:defRPr sz="1800"/>
+              <a:defRPr sz="2200"/>
             </a:lvl7pPr>
             <a:lvl8pPr>
-              <a:defRPr sz="1800"/>
+              <a:defRPr sz="2200"/>
             </a:lvl8pPr>
             <a:lvl9pPr>
-              <a:defRPr sz="1800"/>
+              <a:defRPr sz="2200"/>
             </a:lvl9pPr>
           </a:lstStyle>
           <a:p>
@@ -1252,39 +1253,39 @@
         </p:nvSpPr>
         <p:spPr>
           <a:xfrm>
-            <a:off x="4648200" y="1600200"/>
-            <a:ext cx="4038600" cy="4525963"/>
+            <a:off x="5857055" y="1512041"/>
+            <a:ext cx="5088916" cy="4276616"/>
           </a:xfrm>
         </p:spPr>
         <p:txBody>
           <a:bodyPr/>
           <a:lstStyle>
             <a:lvl1pPr>
-              <a:defRPr sz="2800"/>
+              <a:defRPr sz="3400"/>
             </a:lvl1pPr>
             <a:lvl2pPr>
-              <a:defRPr sz="2400"/>
+              <a:defRPr sz="2900"/>
             </a:lvl2pPr>
             <a:lvl3pPr>
-              <a:defRPr sz="2000"/>
+              <a:defRPr sz="2400"/>
             </a:lvl3pPr>
             <a:lvl4pPr>
-              <a:defRPr sz="1800"/>
+              <a:defRPr sz="2200"/>
             </a:lvl4pPr>
             <a:lvl5pPr>
-              <a:defRPr sz="1800"/>
+              <a:defRPr sz="2200"/>
             </a:lvl5pPr>
             <a:lvl6pPr>
-              <a:defRPr sz="1800"/>
+              <a:defRPr sz="2200"/>
             </a:lvl6pPr>
             <a:lvl7pPr>
-              <a:defRPr sz="1800"/>
+              <a:defRPr sz="2200"/>
             </a:lvl7pPr>
             <a:lvl8pPr>
-              <a:defRPr sz="1800"/>
+              <a:defRPr sz="2200"/>
             </a:lvl8pPr>
             <a:lvl9pPr>
-              <a:defRPr sz="1800"/>
+              <a:defRPr sz="2200"/>
             </a:lvl9pPr>
           </a:lstStyle>
           <a:p>
@@ -1342,7 +1343,7 @@
           <a:p>
             <a:fld id="{10B01263-E573-4C51-9265-094B7818CB45}" type="datetimeFigureOut">
               <a:rPr lang="ko-KR" altLang="en-US" smtClean="0"/>
-              <a:t>2023-11-17</a:t>
+              <a:t>2024-02-15</a:t>
             </a:fld>
             <a:endParaRPr lang="ko-KR" altLang="en-US"/>
           </a:p>
@@ -1459,8 +1460,8 @@
         </p:nvSpPr>
         <p:spPr>
           <a:xfrm>
-            <a:off x="457200" y="1535113"/>
-            <a:ext cx="4040188" cy="639762"/>
+            <a:off x="576104" y="1450540"/>
+            <a:ext cx="5090917" cy="604516"/>
           </a:xfrm>
         </p:spPr>
         <p:txBody>
@@ -1468,39 +1469,39 @@
           <a:lstStyle>
             <a:lvl1pPr marL="0" indent="0">
               <a:buNone/>
+              <a:defRPr sz="2900" b="1"/>
+            </a:lvl1pPr>
+            <a:lvl2pPr marL="553898" indent="0">
+              <a:buNone/>
               <a:defRPr sz="2400" b="1"/>
-            </a:lvl1pPr>
-            <a:lvl2pPr marL="457200" indent="0">
-              <a:buNone/>
-              <a:defRPr sz="2000" b="1"/>
             </a:lvl2pPr>
-            <a:lvl3pPr marL="914400" indent="0">
-              <a:buNone/>
-              <a:defRPr sz="1800" b="1"/>
+            <a:lvl3pPr marL="1107796" indent="0">
+              <a:buNone/>
+              <a:defRPr sz="2200" b="1"/>
             </a:lvl3pPr>
-            <a:lvl4pPr marL="1371600" indent="0">
-              <a:buNone/>
-              <a:defRPr sz="1600" b="1"/>
+            <a:lvl4pPr marL="1661693" indent="0">
+              <a:buNone/>
+              <a:defRPr sz="1900" b="1"/>
             </a:lvl4pPr>
-            <a:lvl5pPr marL="1828800" indent="0">
-              <a:buNone/>
-              <a:defRPr sz="1600" b="1"/>
+            <a:lvl5pPr marL="2215591" indent="0">
+              <a:buNone/>
+              <a:defRPr sz="1900" b="1"/>
             </a:lvl5pPr>
-            <a:lvl6pPr marL="2286000" indent="0">
-              <a:buNone/>
-              <a:defRPr sz="1600" b="1"/>
+            <a:lvl6pPr marL="2769489" indent="0">
+              <a:buNone/>
+              <a:defRPr sz="1900" b="1"/>
             </a:lvl6pPr>
-            <a:lvl7pPr marL="2743200" indent="0">
-              <a:buNone/>
-              <a:defRPr sz="1600" b="1"/>
+            <a:lvl7pPr marL="3323387" indent="0">
+              <a:buNone/>
+              <a:defRPr sz="1900" b="1"/>
             </a:lvl7pPr>
-            <a:lvl8pPr marL="3200400" indent="0">
-              <a:buNone/>
-              <a:defRPr sz="1600" b="1"/>
+            <a:lvl8pPr marL="3877285" indent="0">
+              <a:buNone/>
+              <a:defRPr sz="1900" b="1"/>
             </a:lvl8pPr>
-            <a:lvl9pPr marL="3657600" indent="0">
-              <a:buNone/>
-              <a:defRPr sz="1600" b="1"/>
+            <a:lvl9pPr marL="4431182" indent="0">
+              <a:buNone/>
+              <a:defRPr sz="1900" b="1"/>
             </a:lvl9pPr>
           </a:lstStyle>
           <a:p>
@@ -1524,39 +1525,39 @@
         </p:nvSpPr>
         <p:spPr>
           <a:xfrm>
-            <a:off x="457200" y="2174875"/>
-            <a:ext cx="4040188" cy="3951288"/>
+            <a:off x="576104" y="2055056"/>
+            <a:ext cx="5090917" cy="3733601"/>
           </a:xfrm>
         </p:spPr>
         <p:txBody>
           <a:bodyPr/>
           <a:lstStyle>
             <a:lvl1pPr>
-              <a:defRPr sz="2400"/>
+              <a:defRPr sz="2900"/>
             </a:lvl1pPr>
             <a:lvl2pPr>
-              <a:defRPr sz="2000"/>
+              <a:defRPr sz="2400"/>
             </a:lvl2pPr>
             <a:lvl3pPr>
-              <a:defRPr sz="1800"/>
+              <a:defRPr sz="2200"/>
             </a:lvl3pPr>
             <a:lvl4pPr>
-              <a:defRPr sz="1600"/>
+              <a:defRPr sz="1900"/>
             </a:lvl4pPr>
             <a:lvl5pPr>
-              <a:defRPr sz="1600"/>
+              <a:defRPr sz="1900"/>
             </a:lvl5pPr>
             <a:lvl6pPr>
-              <a:defRPr sz="1600"/>
+              <a:defRPr sz="1900"/>
             </a:lvl6pPr>
             <a:lvl7pPr>
-              <a:defRPr sz="1600"/>
+              <a:defRPr sz="1900"/>
             </a:lvl7pPr>
             <a:lvl8pPr>
-              <a:defRPr sz="1600"/>
+              <a:defRPr sz="1900"/>
             </a:lvl8pPr>
             <a:lvl9pPr>
-              <a:defRPr sz="1600"/>
+              <a:defRPr sz="1900"/>
             </a:lvl9pPr>
           </a:lstStyle>
           <a:p>
@@ -1609,8 +1610,8 @@
         </p:nvSpPr>
         <p:spPr>
           <a:xfrm>
-            <a:off x="4645025" y="1535113"/>
-            <a:ext cx="4041775" cy="639762"/>
+            <a:off x="5853056" y="1450540"/>
+            <a:ext cx="5092917" cy="604516"/>
           </a:xfrm>
         </p:spPr>
         <p:txBody>
@@ -1618,39 +1619,39 @@
           <a:lstStyle>
             <a:lvl1pPr marL="0" indent="0">
               <a:buNone/>
+              <a:defRPr sz="2900" b="1"/>
+            </a:lvl1pPr>
+            <a:lvl2pPr marL="553898" indent="0">
+              <a:buNone/>
               <a:defRPr sz="2400" b="1"/>
-            </a:lvl1pPr>
-            <a:lvl2pPr marL="457200" indent="0">
-              <a:buNone/>
-              <a:defRPr sz="2000" b="1"/>
             </a:lvl2pPr>
-            <a:lvl3pPr marL="914400" indent="0">
-              <a:buNone/>
-              <a:defRPr sz="1800" b="1"/>
+            <a:lvl3pPr marL="1107796" indent="0">
+              <a:buNone/>
+              <a:defRPr sz="2200" b="1"/>
             </a:lvl3pPr>
-            <a:lvl4pPr marL="1371600" indent="0">
-              <a:buNone/>
-              <a:defRPr sz="1600" b="1"/>
+            <a:lvl4pPr marL="1661693" indent="0">
+              <a:buNone/>
+              <a:defRPr sz="1900" b="1"/>
             </a:lvl4pPr>
-            <a:lvl5pPr marL="1828800" indent="0">
-              <a:buNone/>
-              <a:defRPr sz="1600" b="1"/>
+            <a:lvl5pPr marL="2215591" indent="0">
+              <a:buNone/>
+              <a:defRPr sz="1900" b="1"/>
             </a:lvl5pPr>
-            <a:lvl6pPr marL="2286000" indent="0">
-              <a:buNone/>
-              <a:defRPr sz="1600" b="1"/>
+            <a:lvl6pPr marL="2769489" indent="0">
+              <a:buNone/>
+              <a:defRPr sz="1900" b="1"/>
             </a:lvl6pPr>
-            <a:lvl7pPr marL="2743200" indent="0">
-              <a:buNone/>
-              <a:defRPr sz="1600" b="1"/>
+            <a:lvl7pPr marL="3323387" indent="0">
+              <a:buNone/>
+              <a:defRPr sz="1900" b="1"/>
             </a:lvl7pPr>
-            <a:lvl8pPr marL="3200400" indent="0">
-              <a:buNone/>
-              <a:defRPr sz="1600" b="1"/>
+            <a:lvl8pPr marL="3877285" indent="0">
+              <a:buNone/>
+              <a:defRPr sz="1900" b="1"/>
             </a:lvl8pPr>
-            <a:lvl9pPr marL="3657600" indent="0">
-              <a:buNone/>
-              <a:defRPr sz="1600" b="1"/>
+            <a:lvl9pPr marL="4431182" indent="0">
+              <a:buNone/>
+              <a:defRPr sz="1900" b="1"/>
             </a:lvl9pPr>
           </a:lstStyle>
           <a:p>
@@ -1674,39 +1675,39 @@
         </p:nvSpPr>
         <p:spPr>
           <a:xfrm>
-            <a:off x="4645025" y="2174875"/>
-            <a:ext cx="4041775" cy="3951288"/>
+            <a:off x="5853056" y="2055056"/>
+            <a:ext cx="5092917" cy="3733601"/>
           </a:xfrm>
         </p:spPr>
         <p:txBody>
           <a:bodyPr/>
           <a:lstStyle>
             <a:lvl1pPr>
-              <a:defRPr sz="2400"/>
+              <a:defRPr sz="2900"/>
             </a:lvl1pPr>
             <a:lvl2pPr>
-              <a:defRPr sz="2000"/>
+              <a:defRPr sz="2400"/>
             </a:lvl2pPr>
             <a:lvl3pPr>
-              <a:defRPr sz="1800"/>
+              <a:defRPr sz="2200"/>
             </a:lvl3pPr>
             <a:lvl4pPr>
-              <a:defRPr sz="1600"/>
+              <a:defRPr sz="1900"/>
             </a:lvl4pPr>
             <a:lvl5pPr>
-              <a:defRPr sz="1600"/>
+              <a:defRPr sz="1900"/>
             </a:lvl5pPr>
             <a:lvl6pPr>
-              <a:defRPr sz="1600"/>
+              <a:defRPr sz="1900"/>
             </a:lvl6pPr>
             <a:lvl7pPr>
-              <a:defRPr sz="1600"/>
+              <a:defRPr sz="1900"/>
             </a:lvl7pPr>
             <a:lvl8pPr>
-              <a:defRPr sz="1600"/>
+              <a:defRPr sz="1900"/>
             </a:lvl8pPr>
             <a:lvl9pPr>
-              <a:defRPr sz="1600"/>
+              <a:defRPr sz="1900"/>
             </a:lvl9pPr>
           </a:lstStyle>
           <a:p>
@@ -1764,7 +1765,7 @@
           <a:p>
             <a:fld id="{10B01263-E573-4C51-9265-094B7818CB45}" type="datetimeFigureOut">
               <a:rPr lang="ko-KR" altLang="en-US" smtClean="0"/>
-              <a:t>2023-11-17</a:t>
+              <a:t>2024-02-15</a:t>
             </a:fld>
             <a:endParaRPr lang="ko-KR" altLang="en-US"/>
           </a:p>
@@ -1882,7 +1883,7 @@
           <a:p>
             <a:fld id="{10B01263-E573-4C51-9265-094B7818CB45}" type="datetimeFigureOut">
               <a:rPr lang="ko-KR" altLang="en-US" smtClean="0"/>
-              <a:t>2023-11-17</a:t>
+              <a:t>2024-02-15</a:t>
             </a:fld>
             <a:endParaRPr lang="ko-KR" altLang="en-US"/>
           </a:p>
@@ -1977,7 +1978,7 @@
           <a:p>
             <a:fld id="{10B01263-E573-4C51-9265-094B7818CB45}" type="datetimeFigureOut">
               <a:rPr lang="ko-KR" altLang="en-US" smtClean="0"/>
-              <a:t>2023-11-17</a:t>
+              <a:t>2024-02-15</a:t>
             </a:fld>
             <a:endParaRPr lang="ko-KR" altLang="en-US"/>
           </a:p>
@@ -2067,15 +2068,15 @@
         </p:nvSpPr>
         <p:spPr>
           <a:xfrm>
-            <a:off x="457200" y="273050"/>
-            <a:ext cx="3008313" cy="1162050"/>
+            <a:off x="576106" y="258008"/>
+            <a:ext cx="3790683" cy="1098030"/>
           </a:xfrm>
         </p:spPr>
         <p:txBody>
           <a:bodyPr anchor="b"/>
           <a:lstStyle>
             <a:lvl1pPr algn="l">
-              <a:defRPr sz="2000" b="1"/>
+              <a:defRPr sz="2400" b="1"/>
             </a:lvl1pPr>
           </a:lstStyle>
           <a:p>
@@ -2099,39 +2100,39 @@
         </p:nvSpPr>
         <p:spPr>
           <a:xfrm>
-            <a:off x="3575050" y="273050"/>
-            <a:ext cx="5111750" cy="5853113"/>
+            <a:off x="4504811" y="258007"/>
+            <a:ext cx="6441160" cy="5530650"/>
           </a:xfrm>
         </p:spPr>
         <p:txBody>
           <a:bodyPr/>
           <a:lstStyle>
             <a:lvl1pPr>
-              <a:defRPr sz="3200"/>
+              <a:defRPr sz="3900"/>
             </a:lvl1pPr>
             <a:lvl2pPr>
-              <a:defRPr sz="2800"/>
+              <a:defRPr sz="3400"/>
             </a:lvl2pPr>
             <a:lvl3pPr>
-              <a:defRPr sz="2400"/>
+              <a:defRPr sz="2900"/>
             </a:lvl3pPr>
             <a:lvl4pPr>
-              <a:defRPr sz="2000"/>
+              <a:defRPr sz="2400"/>
             </a:lvl4pPr>
             <a:lvl5pPr>
-              <a:defRPr sz="2000"/>
+              <a:defRPr sz="2400"/>
             </a:lvl5pPr>
             <a:lvl6pPr>
-              <a:defRPr sz="2000"/>
+              <a:defRPr sz="2400"/>
             </a:lvl6pPr>
             <a:lvl7pPr>
-              <a:defRPr sz="2000"/>
+              <a:defRPr sz="2400"/>
             </a:lvl7pPr>
             <a:lvl8pPr>
-              <a:defRPr sz="2000"/>
+              <a:defRPr sz="2400"/>
             </a:lvl8pPr>
             <a:lvl9pPr>
-              <a:defRPr sz="2000"/>
+              <a:defRPr sz="2400"/>
             </a:lvl9pPr>
           </a:lstStyle>
           <a:p>
@@ -2184,8 +2185,8 @@
         </p:nvSpPr>
         <p:spPr>
           <a:xfrm>
-            <a:off x="457200" y="1435100"/>
-            <a:ext cx="3008313" cy="4691063"/>
+            <a:off x="576106" y="1356038"/>
+            <a:ext cx="3790683" cy="4432620"/>
           </a:xfrm>
         </p:spPr>
         <p:txBody>
@@ -2193,39 +2194,39 @@
           <a:lstStyle>
             <a:lvl1pPr marL="0" indent="0">
               <a:buNone/>
-              <a:defRPr sz="1400"/>
+              <a:defRPr sz="1700"/>
             </a:lvl1pPr>
-            <a:lvl2pPr marL="457200" indent="0">
+            <a:lvl2pPr marL="553898" indent="0">
+              <a:buNone/>
+              <a:defRPr sz="1500"/>
+            </a:lvl2pPr>
+            <a:lvl3pPr marL="1107796" indent="0">
               <a:buNone/>
               <a:defRPr sz="1200"/>
-            </a:lvl2pPr>
-            <a:lvl3pPr marL="914400" indent="0">
-              <a:buNone/>
-              <a:defRPr sz="1000"/>
             </a:lvl3pPr>
-            <a:lvl4pPr marL="1371600" indent="0">
-              <a:buNone/>
-              <a:defRPr sz="900"/>
+            <a:lvl4pPr marL="1661693" indent="0">
+              <a:buNone/>
+              <a:defRPr sz="1100"/>
             </a:lvl4pPr>
-            <a:lvl5pPr marL="1828800" indent="0">
-              <a:buNone/>
-              <a:defRPr sz="900"/>
+            <a:lvl5pPr marL="2215591" indent="0">
+              <a:buNone/>
+              <a:defRPr sz="1100"/>
             </a:lvl5pPr>
-            <a:lvl6pPr marL="2286000" indent="0">
-              <a:buNone/>
-              <a:defRPr sz="900"/>
+            <a:lvl6pPr marL="2769489" indent="0">
+              <a:buNone/>
+              <a:defRPr sz="1100"/>
             </a:lvl6pPr>
-            <a:lvl7pPr marL="2743200" indent="0">
-              <a:buNone/>
-              <a:defRPr sz="900"/>
+            <a:lvl7pPr marL="3323387" indent="0">
+              <a:buNone/>
+              <a:defRPr sz="1100"/>
             </a:lvl7pPr>
-            <a:lvl8pPr marL="3200400" indent="0">
-              <a:buNone/>
-              <a:defRPr sz="900"/>
+            <a:lvl8pPr marL="3877285" indent="0">
+              <a:buNone/>
+              <a:defRPr sz="1100"/>
             </a:lvl8pPr>
-            <a:lvl9pPr marL="3657600" indent="0">
-              <a:buNone/>
-              <a:defRPr sz="900"/>
+            <a:lvl9pPr marL="4431182" indent="0">
+              <a:buNone/>
+              <a:defRPr sz="1100"/>
             </a:lvl9pPr>
           </a:lstStyle>
           <a:p>
@@ -2254,7 +2255,7 @@
           <a:p>
             <a:fld id="{10B01263-E573-4C51-9265-094B7818CB45}" type="datetimeFigureOut">
               <a:rPr lang="ko-KR" altLang="en-US" smtClean="0"/>
-              <a:t>2023-11-17</a:t>
+              <a:t>2024-02-15</a:t>
             </a:fld>
             <a:endParaRPr lang="ko-KR" altLang="en-US"/>
           </a:p>
@@ -2344,15 +2345,15 @@
         </p:nvSpPr>
         <p:spPr>
           <a:xfrm>
-            <a:off x="1792288" y="4800600"/>
-            <a:ext cx="5486400" cy="566738"/>
+            <a:off x="2258407" y="4536123"/>
+            <a:ext cx="6913245" cy="535515"/>
           </a:xfrm>
         </p:spPr>
         <p:txBody>
           <a:bodyPr anchor="b"/>
           <a:lstStyle>
             <a:lvl1pPr algn="l">
-              <a:defRPr sz="2000" b="1"/>
+              <a:defRPr sz="2400" b="1"/>
             </a:lvl1pPr>
           </a:lstStyle>
           <a:p>
@@ -2376,8 +2377,8 @@
         </p:nvSpPr>
         <p:spPr>
           <a:xfrm>
-            <a:off x="1792288" y="612775"/>
-            <a:ext cx="5486400" cy="4114800"/>
+            <a:off x="2258407" y="579016"/>
+            <a:ext cx="6913245" cy="3888105"/>
           </a:xfrm>
         </p:spPr>
         <p:txBody>
@@ -2385,39 +2386,39 @@
           <a:lstStyle>
             <a:lvl1pPr marL="0" indent="0">
               <a:buNone/>
-              <a:defRPr sz="3200"/>
+              <a:defRPr sz="3900"/>
             </a:lvl1pPr>
-            <a:lvl2pPr marL="457200" indent="0">
-              <a:buNone/>
-              <a:defRPr sz="2800"/>
+            <a:lvl2pPr marL="553898" indent="0">
+              <a:buNone/>
+              <a:defRPr sz="3400"/>
             </a:lvl2pPr>
-            <a:lvl3pPr marL="914400" indent="0">
+            <a:lvl3pPr marL="1107796" indent="0">
+              <a:buNone/>
+              <a:defRPr sz="2900"/>
+            </a:lvl3pPr>
+            <a:lvl4pPr marL="1661693" indent="0">
               <a:buNone/>
               <a:defRPr sz="2400"/>
-            </a:lvl3pPr>
-            <a:lvl4pPr marL="1371600" indent="0">
-              <a:buNone/>
-              <a:defRPr sz="2000"/>
             </a:lvl4pPr>
-            <a:lvl5pPr marL="1828800" indent="0">
-              <a:buNone/>
-              <a:defRPr sz="2000"/>
+            <a:lvl5pPr marL="2215591" indent="0">
+              <a:buNone/>
+              <a:defRPr sz="2400"/>
             </a:lvl5pPr>
-            <a:lvl6pPr marL="2286000" indent="0">
-              <a:buNone/>
-              <a:defRPr sz="2000"/>
+            <a:lvl6pPr marL="2769489" indent="0">
+              <a:buNone/>
+              <a:defRPr sz="2400"/>
             </a:lvl6pPr>
-            <a:lvl7pPr marL="2743200" indent="0">
-              <a:buNone/>
-              <a:defRPr sz="2000"/>
+            <a:lvl7pPr marL="3323387" indent="0">
+              <a:buNone/>
+              <a:defRPr sz="2400"/>
             </a:lvl7pPr>
-            <a:lvl8pPr marL="3200400" indent="0">
-              <a:buNone/>
-              <a:defRPr sz="2000"/>
+            <a:lvl8pPr marL="3877285" indent="0">
+              <a:buNone/>
+              <a:defRPr sz="2400"/>
             </a:lvl8pPr>
-            <a:lvl9pPr marL="3657600" indent="0">
-              <a:buNone/>
-              <a:defRPr sz="2000"/>
+            <a:lvl9pPr marL="4431182" indent="0">
+              <a:buNone/>
+              <a:defRPr sz="2400"/>
             </a:lvl9pPr>
           </a:lstStyle>
           <a:p>
@@ -2437,8 +2438,8 @@
         </p:nvSpPr>
         <p:spPr>
           <a:xfrm>
-            <a:off x="1792288" y="5367338"/>
-            <a:ext cx="5486400" cy="804862"/>
+            <a:off x="2258407" y="5071638"/>
+            <a:ext cx="6913245" cy="760520"/>
           </a:xfrm>
         </p:spPr>
         <p:txBody>
@@ -2446,39 +2447,39 @@
           <a:lstStyle>
             <a:lvl1pPr marL="0" indent="0">
               <a:buNone/>
-              <a:defRPr sz="1400"/>
+              <a:defRPr sz="1700"/>
             </a:lvl1pPr>
-            <a:lvl2pPr marL="457200" indent="0">
+            <a:lvl2pPr marL="553898" indent="0">
+              <a:buNone/>
+              <a:defRPr sz="1500"/>
+            </a:lvl2pPr>
+            <a:lvl3pPr marL="1107796" indent="0">
               <a:buNone/>
               <a:defRPr sz="1200"/>
-            </a:lvl2pPr>
-            <a:lvl3pPr marL="914400" indent="0">
-              <a:buNone/>
-              <a:defRPr sz="1000"/>
             </a:lvl3pPr>
-            <a:lvl4pPr marL="1371600" indent="0">
-              <a:buNone/>
-              <a:defRPr sz="900"/>
+            <a:lvl4pPr marL="1661693" indent="0">
+              <a:buNone/>
+              <a:defRPr sz="1100"/>
             </a:lvl4pPr>
-            <a:lvl5pPr marL="1828800" indent="0">
-              <a:buNone/>
-              <a:defRPr sz="900"/>
+            <a:lvl5pPr marL="2215591" indent="0">
+              <a:buNone/>
+              <a:defRPr sz="1100"/>
             </a:lvl5pPr>
-            <a:lvl6pPr marL="2286000" indent="0">
-              <a:buNone/>
-              <a:defRPr sz="900"/>
+            <a:lvl6pPr marL="2769489" indent="0">
+              <a:buNone/>
+              <a:defRPr sz="1100"/>
             </a:lvl6pPr>
-            <a:lvl7pPr marL="2743200" indent="0">
-              <a:buNone/>
-              <a:defRPr sz="900"/>
+            <a:lvl7pPr marL="3323387" indent="0">
+              <a:buNone/>
+              <a:defRPr sz="1100"/>
             </a:lvl7pPr>
-            <a:lvl8pPr marL="3200400" indent="0">
-              <a:buNone/>
-              <a:defRPr sz="900"/>
+            <a:lvl8pPr marL="3877285" indent="0">
+              <a:buNone/>
+              <a:defRPr sz="1100"/>
             </a:lvl8pPr>
-            <a:lvl9pPr marL="3657600" indent="0">
-              <a:buNone/>
-              <a:defRPr sz="900"/>
+            <a:lvl9pPr marL="4431182" indent="0">
+              <a:buNone/>
+              <a:defRPr sz="1100"/>
             </a:lvl9pPr>
           </a:lstStyle>
           <a:p>
@@ -2507,7 +2508,7 @@
           <a:p>
             <a:fld id="{10B01263-E573-4C51-9265-094B7818CB45}" type="datetimeFigureOut">
               <a:rPr lang="ko-KR" altLang="en-US" smtClean="0"/>
-              <a:t>2023-11-17</a:t>
+              <a:t>2024-02-15</a:t>
             </a:fld>
             <a:endParaRPr lang="ko-KR" altLang="en-US"/>
           </a:p>
@@ -2602,15 +2603,15 @@
         </p:nvSpPr>
         <p:spPr>
           <a:xfrm>
-            <a:off x="457200" y="274638"/>
-            <a:ext cx="8229600" cy="1143000"/>
+            <a:off x="576104" y="259508"/>
+            <a:ext cx="10369868" cy="1080029"/>
           </a:xfrm>
           <a:prstGeom prst="rect">
             <a:avLst/>
           </a:prstGeom>
         </p:spPr>
         <p:txBody>
-          <a:bodyPr vert="horz" lIns="91440" tIns="45720" rIns="91440" bIns="45720" rtlCol="0" anchor="ctr">
+          <a:bodyPr vert="horz" lIns="110780" tIns="55390" rIns="110780" bIns="55390" rtlCol="0" anchor="ctr">
             <a:normAutofit/>
           </a:bodyPr>
           <a:lstStyle/>
@@ -2635,15 +2636,15 @@
         </p:nvSpPr>
         <p:spPr>
           <a:xfrm>
-            <a:off x="457200" y="1600200"/>
-            <a:ext cx="8229600" cy="4525963"/>
+            <a:off x="576104" y="1512041"/>
+            <a:ext cx="10369868" cy="4276616"/>
           </a:xfrm>
           <a:prstGeom prst="rect">
             <a:avLst/>
           </a:prstGeom>
         </p:spPr>
         <p:txBody>
-          <a:bodyPr vert="horz" lIns="91440" tIns="45720" rIns="91440" bIns="45720" rtlCol="0">
+          <a:bodyPr vert="horz" lIns="110780" tIns="55390" rIns="110780" bIns="55390" rtlCol="0">
             <a:normAutofit/>
           </a:bodyPr>
           <a:lstStyle/>
@@ -2697,18 +2698,18 @@
         </p:nvSpPr>
         <p:spPr>
           <a:xfrm>
-            <a:off x="457200" y="6356350"/>
-            <a:ext cx="2133600" cy="365125"/>
+            <a:off x="576104" y="6006163"/>
+            <a:ext cx="2688484" cy="345010"/>
           </a:xfrm>
           <a:prstGeom prst="rect">
             <a:avLst/>
           </a:prstGeom>
         </p:spPr>
         <p:txBody>
-          <a:bodyPr vert="horz" lIns="91440" tIns="45720" rIns="91440" bIns="45720" rtlCol="0" anchor="ctr"/>
+          <a:bodyPr vert="horz" lIns="110780" tIns="55390" rIns="110780" bIns="55390" rtlCol="0" anchor="ctr"/>
           <a:lstStyle>
             <a:lvl1pPr algn="l">
-              <a:defRPr sz="1200">
+              <a:defRPr sz="1500">
                 <a:solidFill>
                   <a:schemeClr val="tx1">
                     <a:tint val="75000"/>
@@ -2720,7 +2721,7 @@
           <a:p>
             <a:fld id="{10B01263-E573-4C51-9265-094B7818CB45}" type="datetimeFigureOut">
               <a:rPr lang="ko-KR" altLang="en-US" smtClean="0"/>
-              <a:t>2023-11-17</a:t>
+              <a:t>2024-02-15</a:t>
             </a:fld>
             <a:endParaRPr lang="ko-KR" altLang="en-US"/>
           </a:p>
@@ -2738,18 +2739,18 @@
         </p:nvSpPr>
         <p:spPr>
           <a:xfrm>
-            <a:off x="3124200" y="6356350"/>
-            <a:ext cx="2895600" cy="365125"/>
+            <a:off x="3936709" y="6006163"/>
+            <a:ext cx="3648657" cy="345010"/>
           </a:xfrm>
           <a:prstGeom prst="rect">
             <a:avLst/>
           </a:prstGeom>
         </p:spPr>
         <p:txBody>
-          <a:bodyPr vert="horz" lIns="91440" tIns="45720" rIns="91440" bIns="45720" rtlCol="0" anchor="ctr"/>
+          <a:bodyPr vert="horz" lIns="110780" tIns="55390" rIns="110780" bIns="55390" rtlCol="0" anchor="ctr"/>
           <a:lstStyle>
             <a:lvl1pPr algn="ctr">
-              <a:defRPr sz="1200">
+              <a:defRPr sz="1500">
                 <a:solidFill>
                   <a:schemeClr val="tx1">
                     <a:tint val="75000"/>
@@ -2775,18 +2776,18 @@
         </p:nvSpPr>
         <p:spPr>
           <a:xfrm>
-            <a:off x="6553200" y="6356350"/>
-            <a:ext cx="2133600" cy="365125"/>
+            <a:off x="8257487" y="6006163"/>
+            <a:ext cx="2688484" cy="345010"/>
           </a:xfrm>
           <a:prstGeom prst="rect">
             <a:avLst/>
           </a:prstGeom>
         </p:spPr>
         <p:txBody>
-          <a:bodyPr vert="horz" lIns="91440" tIns="45720" rIns="91440" bIns="45720" rtlCol="0" anchor="ctr"/>
+          <a:bodyPr vert="horz" lIns="110780" tIns="55390" rIns="110780" bIns="55390" rtlCol="0" anchor="ctr"/>
           <a:lstStyle>
             <a:lvl1pPr algn="r">
-              <a:defRPr sz="1200">
+              <a:defRPr sz="1500">
                 <a:solidFill>
                   <a:schemeClr val="tx1">
                     <a:tint val="75000"/>
@@ -2827,12 +2828,12 @@
   </p:sldLayoutIdLst>
   <p:txStyles>
     <p:titleStyle>
-      <a:lvl1pPr algn="ctr" defTabSz="914400" rtl="0" eaLnBrk="1" latinLnBrk="1" hangingPunct="1">
+      <a:lvl1pPr algn="ctr" defTabSz="1107796" rtl="0" eaLnBrk="1" latinLnBrk="1" hangingPunct="1">
         <a:spcBef>
           <a:spcPct val="0"/>
         </a:spcBef>
         <a:buNone/>
-        <a:defRPr sz="4400" kern="1200">
+        <a:defRPr sz="5300" kern="1200">
           <a:solidFill>
             <a:schemeClr val="tx1"/>
           </a:solidFill>
@@ -2843,13 +2844,13 @@
       </a:lvl1pPr>
     </p:titleStyle>
     <p:bodyStyle>
-      <a:lvl1pPr marL="342900" indent="-342900" algn="l" defTabSz="914400" rtl="0" eaLnBrk="1" latinLnBrk="1" hangingPunct="1">
+      <a:lvl1pPr marL="415423" indent="-415423" algn="l" defTabSz="1107796" rtl="0" eaLnBrk="1" latinLnBrk="1" hangingPunct="1">
         <a:spcBef>
           <a:spcPct val="20000"/>
         </a:spcBef>
         <a:buFont typeface="Arial" pitchFamily="34" charset="0"/>
         <a:buChar char="•"/>
-        <a:defRPr sz="3200" kern="1200">
+        <a:defRPr sz="3900" kern="1200">
           <a:solidFill>
             <a:schemeClr val="tx1"/>
           </a:solidFill>
@@ -2858,13 +2859,13 @@
           <a:cs typeface="+mn-cs"/>
         </a:defRPr>
       </a:lvl1pPr>
-      <a:lvl2pPr marL="742950" indent="-285750" algn="l" defTabSz="914400" rtl="0" eaLnBrk="1" latinLnBrk="1" hangingPunct="1">
+      <a:lvl2pPr marL="900084" indent="-346186" algn="l" defTabSz="1107796" rtl="0" eaLnBrk="1" latinLnBrk="1" hangingPunct="1">
         <a:spcBef>
           <a:spcPct val="20000"/>
         </a:spcBef>
         <a:buFont typeface="Arial" pitchFamily="34" charset="0"/>
         <a:buChar char="–"/>
-        <a:defRPr sz="2800" kern="1200">
+        <a:defRPr sz="3400" kern="1200">
           <a:solidFill>
             <a:schemeClr val="tx1"/>
           </a:solidFill>
@@ -2873,7 +2874,52 @@
           <a:cs typeface="+mn-cs"/>
         </a:defRPr>
       </a:lvl2pPr>
-      <a:lvl3pPr marL="1143000" indent="-228600" algn="l" defTabSz="914400" rtl="0" eaLnBrk="1" latinLnBrk="1" hangingPunct="1">
+      <a:lvl3pPr marL="1384745" indent="-276949" algn="l" defTabSz="1107796" rtl="0" eaLnBrk="1" latinLnBrk="1" hangingPunct="1">
+        <a:spcBef>
+          <a:spcPct val="20000"/>
+        </a:spcBef>
+        <a:buFont typeface="Arial" pitchFamily="34" charset="0"/>
+        <a:buChar char="•"/>
+        <a:defRPr sz="2900" kern="1200">
+          <a:solidFill>
+            <a:schemeClr val="tx1"/>
+          </a:solidFill>
+          <a:latin typeface="+mn-lt"/>
+          <a:ea typeface="+mn-ea"/>
+          <a:cs typeface="+mn-cs"/>
+        </a:defRPr>
+      </a:lvl3pPr>
+      <a:lvl4pPr marL="1938642" indent="-276949" algn="l" defTabSz="1107796" rtl="0" eaLnBrk="1" latinLnBrk="1" hangingPunct="1">
+        <a:spcBef>
+          <a:spcPct val="20000"/>
+        </a:spcBef>
+        <a:buFont typeface="Arial" pitchFamily="34" charset="0"/>
+        <a:buChar char="–"/>
+        <a:defRPr sz="2400" kern="1200">
+          <a:solidFill>
+            <a:schemeClr val="tx1"/>
+          </a:solidFill>
+          <a:latin typeface="+mn-lt"/>
+          <a:ea typeface="+mn-ea"/>
+          <a:cs typeface="+mn-cs"/>
+        </a:defRPr>
+      </a:lvl4pPr>
+      <a:lvl5pPr marL="2492540" indent="-276949" algn="l" defTabSz="1107796" rtl="0" eaLnBrk="1" latinLnBrk="1" hangingPunct="1">
+        <a:spcBef>
+          <a:spcPct val="20000"/>
+        </a:spcBef>
+        <a:buFont typeface="Arial" pitchFamily="34" charset="0"/>
+        <a:buChar char="»"/>
+        <a:defRPr sz="2400" kern="1200">
+          <a:solidFill>
+            <a:schemeClr val="tx1"/>
+          </a:solidFill>
+          <a:latin typeface="+mn-lt"/>
+          <a:ea typeface="+mn-ea"/>
+          <a:cs typeface="+mn-cs"/>
+        </a:defRPr>
+      </a:lvl5pPr>
+      <a:lvl6pPr marL="3046438" indent="-276949" algn="l" defTabSz="1107796" rtl="0" eaLnBrk="1" latinLnBrk="1" hangingPunct="1">
         <a:spcBef>
           <a:spcPct val="20000"/>
         </a:spcBef>
@@ -2887,59 +2933,14 @@
           <a:ea typeface="+mn-ea"/>
           <a:cs typeface="+mn-cs"/>
         </a:defRPr>
-      </a:lvl3pPr>
-      <a:lvl4pPr marL="1600200" indent="-228600" algn="l" defTabSz="914400" rtl="0" eaLnBrk="1" latinLnBrk="1" hangingPunct="1">
-        <a:spcBef>
-          <a:spcPct val="20000"/>
-        </a:spcBef>
-        <a:buFont typeface="Arial" pitchFamily="34" charset="0"/>
-        <a:buChar char="–"/>
-        <a:defRPr sz="2000" kern="1200">
-          <a:solidFill>
-            <a:schemeClr val="tx1"/>
-          </a:solidFill>
-          <a:latin typeface="+mn-lt"/>
-          <a:ea typeface="+mn-ea"/>
-          <a:cs typeface="+mn-cs"/>
-        </a:defRPr>
-      </a:lvl4pPr>
-      <a:lvl5pPr marL="2057400" indent="-228600" algn="l" defTabSz="914400" rtl="0" eaLnBrk="1" latinLnBrk="1" hangingPunct="1">
-        <a:spcBef>
-          <a:spcPct val="20000"/>
-        </a:spcBef>
-        <a:buFont typeface="Arial" pitchFamily="34" charset="0"/>
-        <a:buChar char="»"/>
-        <a:defRPr sz="2000" kern="1200">
-          <a:solidFill>
-            <a:schemeClr val="tx1"/>
-          </a:solidFill>
-          <a:latin typeface="+mn-lt"/>
-          <a:ea typeface="+mn-ea"/>
-          <a:cs typeface="+mn-cs"/>
-        </a:defRPr>
-      </a:lvl5pPr>
-      <a:lvl6pPr marL="2514600" indent="-228600" algn="l" defTabSz="914400" rtl="0" eaLnBrk="1" latinLnBrk="1" hangingPunct="1">
+      </a:lvl6pPr>
+      <a:lvl7pPr marL="3600336" indent="-276949" algn="l" defTabSz="1107796" rtl="0" eaLnBrk="1" latinLnBrk="1" hangingPunct="1">
         <a:spcBef>
           <a:spcPct val="20000"/>
         </a:spcBef>
         <a:buFont typeface="Arial" pitchFamily="34" charset="0"/>
         <a:buChar char="•"/>
-        <a:defRPr sz="2000" kern="1200">
-          <a:solidFill>
-            <a:schemeClr val="tx1"/>
-          </a:solidFill>
-          <a:latin typeface="+mn-lt"/>
-          <a:ea typeface="+mn-ea"/>
-          <a:cs typeface="+mn-cs"/>
-        </a:defRPr>
-      </a:lvl6pPr>
-      <a:lvl7pPr marL="2971800" indent="-228600" algn="l" defTabSz="914400" rtl="0" eaLnBrk="1" latinLnBrk="1" hangingPunct="1">
-        <a:spcBef>
-          <a:spcPct val="20000"/>
-        </a:spcBef>
-        <a:buFont typeface="Arial" pitchFamily="34" charset="0"/>
-        <a:buChar char="•"/>
-        <a:defRPr sz="2000" kern="1200">
+        <a:defRPr sz="2400" kern="1200">
           <a:solidFill>
             <a:schemeClr val="tx1"/>
           </a:solidFill>
@@ -2948,13 +2949,13 @@
           <a:cs typeface="+mn-cs"/>
         </a:defRPr>
       </a:lvl7pPr>
-      <a:lvl8pPr marL="3429000" indent="-228600" algn="l" defTabSz="914400" rtl="0" eaLnBrk="1" latinLnBrk="1" hangingPunct="1">
+      <a:lvl8pPr marL="4154234" indent="-276949" algn="l" defTabSz="1107796" rtl="0" eaLnBrk="1" latinLnBrk="1" hangingPunct="1">
         <a:spcBef>
           <a:spcPct val="20000"/>
         </a:spcBef>
         <a:buFont typeface="Arial" pitchFamily="34" charset="0"/>
         <a:buChar char="•"/>
-        <a:defRPr sz="2000" kern="1200">
+        <a:defRPr sz="2400" kern="1200">
           <a:solidFill>
             <a:schemeClr val="tx1"/>
           </a:solidFill>
@@ -2963,13 +2964,13 @@
           <a:cs typeface="+mn-cs"/>
         </a:defRPr>
       </a:lvl8pPr>
-      <a:lvl9pPr marL="3886200" indent="-228600" algn="l" defTabSz="914400" rtl="0" eaLnBrk="1" latinLnBrk="1" hangingPunct="1">
+      <a:lvl9pPr marL="4708131" indent="-276949" algn="l" defTabSz="1107796" rtl="0" eaLnBrk="1" latinLnBrk="1" hangingPunct="1">
         <a:spcBef>
           <a:spcPct val="20000"/>
         </a:spcBef>
         <a:buFont typeface="Arial" pitchFamily="34" charset="0"/>
         <a:buChar char="•"/>
-        <a:defRPr sz="2000" kern="1200">
+        <a:defRPr sz="2400" kern="1200">
           <a:solidFill>
             <a:schemeClr val="tx1"/>
           </a:solidFill>
@@ -2983,8 +2984,8 @@
       <a:defPPr>
         <a:defRPr lang="ko-KR"/>
       </a:defPPr>
-      <a:lvl1pPr marL="0" algn="l" defTabSz="914400" rtl="0" eaLnBrk="1" latinLnBrk="1" hangingPunct="1">
-        <a:defRPr sz="1800" kern="1200">
+      <a:lvl1pPr marL="0" algn="l" defTabSz="1107796" rtl="0" eaLnBrk="1" latinLnBrk="1" hangingPunct="1">
+        <a:defRPr sz="2200" kern="1200">
           <a:solidFill>
             <a:schemeClr val="tx1"/>
           </a:solidFill>
@@ -2993,8 +2994,8 @@
           <a:cs typeface="+mn-cs"/>
         </a:defRPr>
       </a:lvl1pPr>
-      <a:lvl2pPr marL="457200" algn="l" defTabSz="914400" rtl="0" eaLnBrk="1" latinLnBrk="1" hangingPunct="1">
-        <a:defRPr sz="1800" kern="1200">
+      <a:lvl2pPr marL="553898" algn="l" defTabSz="1107796" rtl="0" eaLnBrk="1" latinLnBrk="1" hangingPunct="1">
+        <a:defRPr sz="2200" kern="1200">
           <a:solidFill>
             <a:schemeClr val="tx1"/>
           </a:solidFill>
@@ -3003,8 +3004,8 @@
           <a:cs typeface="+mn-cs"/>
         </a:defRPr>
       </a:lvl2pPr>
-      <a:lvl3pPr marL="914400" algn="l" defTabSz="914400" rtl="0" eaLnBrk="1" latinLnBrk="1" hangingPunct="1">
-        <a:defRPr sz="1800" kern="1200">
+      <a:lvl3pPr marL="1107796" algn="l" defTabSz="1107796" rtl="0" eaLnBrk="1" latinLnBrk="1" hangingPunct="1">
+        <a:defRPr sz="2200" kern="1200">
           <a:solidFill>
             <a:schemeClr val="tx1"/>
           </a:solidFill>
@@ -3013,8 +3014,8 @@
           <a:cs typeface="+mn-cs"/>
         </a:defRPr>
       </a:lvl3pPr>
-      <a:lvl4pPr marL="1371600" algn="l" defTabSz="914400" rtl="0" eaLnBrk="1" latinLnBrk="1" hangingPunct="1">
-        <a:defRPr sz="1800" kern="1200">
+      <a:lvl4pPr marL="1661693" algn="l" defTabSz="1107796" rtl="0" eaLnBrk="1" latinLnBrk="1" hangingPunct="1">
+        <a:defRPr sz="2200" kern="1200">
           <a:solidFill>
             <a:schemeClr val="tx1"/>
           </a:solidFill>
@@ -3023,8 +3024,8 @@
           <a:cs typeface="+mn-cs"/>
         </a:defRPr>
       </a:lvl4pPr>
-      <a:lvl5pPr marL="1828800" algn="l" defTabSz="914400" rtl="0" eaLnBrk="1" latinLnBrk="1" hangingPunct="1">
-        <a:defRPr sz="1800" kern="1200">
+      <a:lvl5pPr marL="2215591" algn="l" defTabSz="1107796" rtl="0" eaLnBrk="1" latinLnBrk="1" hangingPunct="1">
+        <a:defRPr sz="2200" kern="1200">
           <a:solidFill>
             <a:schemeClr val="tx1"/>
           </a:solidFill>
@@ -3033,8 +3034,8 @@
           <a:cs typeface="+mn-cs"/>
         </a:defRPr>
       </a:lvl5pPr>
-      <a:lvl6pPr marL="2286000" algn="l" defTabSz="914400" rtl="0" eaLnBrk="1" latinLnBrk="1" hangingPunct="1">
-        <a:defRPr sz="1800" kern="1200">
+      <a:lvl6pPr marL="2769489" algn="l" defTabSz="1107796" rtl="0" eaLnBrk="1" latinLnBrk="1" hangingPunct="1">
+        <a:defRPr sz="2200" kern="1200">
           <a:solidFill>
             <a:schemeClr val="tx1"/>
           </a:solidFill>
@@ -3043,8 +3044,8 @@
           <a:cs typeface="+mn-cs"/>
         </a:defRPr>
       </a:lvl6pPr>
-      <a:lvl7pPr marL="2743200" algn="l" defTabSz="914400" rtl="0" eaLnBrk="1" latinLnBrk="1" hangingPunct="1">
-        <a:defRPr sz="1800" kern="1200">
+      <a:lvl7pPr marL="3323387" algn="l" defTabSz="1107796" rtl="0" eaLnBrk="1" latinLnBrk="1" hangingPunct="1">
+        <a:defRPr sz="2200" kern="1200">
           <a:solidFill>
             <a:schemeClr val="tx1"/>
           </a:solidFill>
@@ -3053,8 +3054,8 @@
           <a:cs typeface="+mn-cs"/>
         </a:defRPr>
       </a:lvl7pPr>
-      <a:lvl8pPr marL="3200400" algn="l" defTabSz="914400" rtl="0" eaLnBrk="1" latinLnBrk="1" hangingPunct="1">
-        <a:defRPr sz="1800" kern="1200">
+      <a:lvl8pPr marL="3877285" algn="l" defTabSz="1107796" rtl="0" eaLnBrk="1" latinLnBrk="1" hangingPunct="1">
+        <a:defRPr sz="2200" kern="1200">
           <a:solidFill>
             <a:schemeClr val="tx1"/>
           </a:solidFill>
@@ -3063,8 +3064,8 @@
           <a:cs typeface="+mn-cs"/>
         </a:defRPr>
       </a:lvl8pPr>
-      <a:lvl9pPr marL="3657600" algn="l" defTabSz="914400" rtl="0" eaLnBrk="1" latinLnBrk="1" hangingPunct="1">
-        <a:defRPr sz="1800" kern="1200">
+      <a:lvl9pPr marL="4431182" algn="l" defTabSz="1107796" rtl="0" eaLnBrk="1" latinLnBrk="1" hangingPunct="1">
+        <a:defRPr sz="2200" kern="1200">
           <a:solidFill>
             <a:schemeClr val="tx1"/>
           </a:solidFill>
@@ -3118,8 +3119,8 @@
         </p:blipFill>
         <p:spPr bwMode="auto">
           <a:xfrm>
-            <a:off x="3654946" y="940993"/>
-            <a:ext cx="989062" cy="1006568"/>
+            <a:off x="4605486" y="889152"/>
+            <a:ext cx="1246287" cy="951114"/>
           </a:xfrm>
           <a:prstGeom prst="rect">
             <a:avLst/>
@@ -3144,8 +3145,8 @@
         </p:nvSpPr>
         <p:spPr>
           <a:xfrm>
-            <a:off x="323528" y="1121112"/>
-            <a:ext cx="2376264" cy="646331"/>
+            <a:off x="407668" y="1059349"/>
+            <a:ext cx="2994258" cy="788970"/>
           </a:xfrm>
           <a:prstGeom prst="rect">
             <a:avLst/>
@@ -3153,19 +3154,19 @@
           <a:noFill/>
         </p:spPr>
         <p:txBody>
-          <a:bodyPr wrap="square" rtlCol="0">
+          <a:bodyPr wrap="square" lIns="110780" tIns="55390" rIns="110780" bIns="55390" rtlCol="0">
             <a:spAutoFit/>
           </a:bodyPr>
           <a:lstStyle/>
           <a:p>
             <a:r>
-              <a:rPr lang="ko-KR" altLang="en-US" sz="3600" smtClean="0">
+              <a:rPr lang="ko-KR" altLang="en-US" sz="4400">
                 <a:latin typeface="나눔스퀘어 ExtraBold" pitchFamily="50" charset="-127"/>
                 <a:ea typeface="나눔스퀘어 ExtraBold" pitchFamily="50" charset="-127"/>
               </a:rPr>
               <a:t>안녕하세요</a:t>
             </a:r>
-            <a:endParaRPr lang="ko-KR" altLang="en-US" sz="3600">
+            <a:endParaRPr lang="ko-KR" altLang="en-US" sz="4400">
               <a:latin typeface="나눔스퀘어 ExtraBold" pitchFamily="50" charset="-127"/>
               <a:ea typeface="나눔스퀘어 ExtraBold" pitchFamily="50" charset="-127"/>
             </a:endParaRPr>
@@ -3180,8 +3181,8 @@
         </p:nvSpPr>
         <p:spPr>
           <a:xfrm>
-            <a:off x="2820833" y="980279"/>
-            <a:ext cx="690994" cy="830997"/>
+            <a:off x="3554446" y="816675"/>
+            <a:ext cx="870700" cy="1004414"/>
           </a:xfrm>
           <a:prstGeom prst="rect">
             <a:avLst/>
@@ -3189,16 +3190,16 @@
           <a:noFill/>
         </p:spPr>
         <p:txBody>
-          <a:bodyPr wrap="square" rtlCol="0" anchor="ctr">
+          <a:bodyPr wrap="square" lIns="110780" tIns="55390" rIns="110780" bIns="55390" rtlCol="0" anchor="ctr">
             <a:spAutoFit/>
           </a:bodyPr>
           <a:lstStyle/>
           <a:p>
             <a:r>
-              <a:rPr lang="en-US" altLang="ko-KR" sz="4800" b="1" smtClean="0"/>
+              <a:rPr lang="en-US" altLang="ko-KR" sz="5800" b="1"/>
               <a:t>+</a:t>
             </a:r>
-            <a:endParaRPr lang="ko-KR" altLang="en-US" sz="2400" b="1"/>
+            <a:endParaRPr lang="ko-KR" altLang="en-US" sz="2900" b="1"/>
           </a:p>
         </p:txBody>
       </p:sp>
@@ -3210,8 +3211,8 @@
         </p:nvSpPr>
         <p:spPr>
           <a:xfrm>
-            <a:off x="5148064" y="1186550"/>
-            <a:ext cx="864096" cy="477893"/>
+            <a:off x="6486918" y="1121180"/>
+            <a:ext cx="1088821" cy="451564"/>
           </a:xfrm>
           <a:prstGeom prst="rightArrow">
             <a:avLst>
@@ -3245,7 +3246,7 @@
           </a:fontRef>
         </p:style>
         <p:txBody>
-          <a:bodyPr rtlCol="0" anchor="ctr"/>
+          <a:bodyPr lIns="110780" tIns="55390" rIns="110780" bIns="55390" rtlCol="0" anchor="ctr"/>
           <a:lstStyle/>
           <a:p>
             <a:pPr algn="ctr"/>
@@ -3261,8 +3262,8 @@
         </p:nvSpPr>
         <p:spPr>
           <a:xfrm>
-            <a:off x="6178789" y="1174364"/>
-            <a:ext cx="2763087" cy="523220"/>
+            <a:off x="7785705" y="1109666"/>
+            <a:ext cx="3481682" cy="635082"/>
           </a:xfrm>
           <a:prstGeom prst="rect">
             <a:avLst/>
@@ -3270,14 +3271,14 @@
           <a:noFill/>
         </p:spPr>
         <p:txBody>
-          <a:bodyPr wrap="square" rtlCol="0">
+          <a:bodyPr wrap="square" lIns="110780" tIns="55390" rIns="110780" bIns="55390" rtlCol="0">
             <a:spAutoFit/>
           </a:bodyPr>
           <a:lstStyle/>
           <a:p>
             <a:pPr algn="ctr"/>
             <a:r>
-              <a:rPr lang="en-US" altLang="ko-KR" sz="2800">
+              <a:rPr lang="en-US" altLang="ko-KR" sz="3400">
                 <a:latin typeface="나눔스퀘어 ExtraBold" pitchFamily="50" charset="-127"/>
                 <a:ea typeface="나눔스퀘어 ExtraBold" pitchFamily="50" charset="-127"/>
               </a:rPr>
@@ -3309,8 +3310,8 @@
         </p:blipFill>
         <p:spPr bwMode="auto">
           <a:xfrm flipH="1">
-            <a:off x="3654946" y="3140968"/>
-            <a:ext cx="989062" cy="1006568"/>
+            <a:off x="4605486" y="2967924"/>
+            <a:ext cx="1246287" cy="951114"/>
           </a:xfrm>
           <a:prstGeom prst="rect">
             <a:avLst/>
@@ -3335,8 +3336,8 @@
         </p:nvSpPr>
         <p:spPr>
           <a:xfrm>
-            <a:off x="6372200" y="3321087"/>
-            <a:ext cx="2376264" cy="646331"/>
+            <a:off x="8029414" y="3138121"/>
+            <a:ext cx="2994258" cy="788970"/>
           </a:xfrm>
           <a:prstGeom prst="rect">
             <a:avLst/>
@@ -3344,19 +3345,19 @@
           <a:noFill/>
         </p:spPr>
         <p:txBody>
-          <a:bodyPr wrap="square" rtlCol="0">
+          <a:bodyPr wrap="square" lIns="110780" tIns="55390" rIns="110780" bIns="55390" rtlCol="0">
             <a:spAutoFit/>
           </a:bodyPr>
           <a:lstStyle/>
           <a:p>
             <a:r>
-              <a:rPr lang="ko-KR" altLang="en-US" sz="3600" smtClean="0">
+              <a:rPr lang="ko-KR" altLang="en-US" sz="4400">
                 <a:latin typeface="나눔스퀘어 ExtraBold" pitchFamily="50" charset="-127"/>
                 <a:ea typeface="나눔스퀘어 ExtraBold" pitchFamily="50" charset="-127"/>
               </a:rPr>
               <a:t>안녕하세요</a:t>
             </a:r>
-            <a:endParaRPr lang="ko-KR" altLang="en-US" sz="3600">
+            <a:endParaRPr lang="ko-KR" altLang="en-US" sz="4400">
               <a:latin typeface="나눔스퀘어 ExtraBold" pitchFamily="50" charset="-127"/>
               <a:ea typeface="나눔스퀘어 ExtraBold" pitchFamily="50" charset="-127"/>
             </a:endParaRPr>
@@ -3371,8 +3372,8 @@
         </p:nvSpPr>
         <p:spPr>
           <a:xfrm>
-            <a:off x="2987824" y="3180254"/>
-            <a:ext cx="690994" cy="830997"/>
+            <a:off x="3764866" y="2895448"/>
+            <a:ext cx="870700" cy="1004414"/>
           </a:xfrm>
           <a:prstGeom prst="rect">
             <a:avLst/>
@@ -3380,16 +3381,16 @@
           <a:noFill/>
         </p:spPr>
         <p:txBody>
-          <a:bodyPr wrap="square" rtlCol="0" anchor="ctr">
+          <a:bodyPr wrap="square" lIns="110780" tIns="55390" rIns="110780" bIns="55390" rtlCol="0" anchor="ctr">
             <a:spAutoFit/>
           </a:bodyPr>
           <a:lstStyle/>
           <a:p>
             <a:r>
-              <a:rPr lang="en-US" altLang="ko-KR" sz="4800" b="1" smtClean="0"/>
+              <a:rPr lang="en-US" altLang="ko-KR" sz="5800" b="1"/>
               <a:t>+</a:t>
             </a:r>
-            <a:endParaRPr lang="ko-KR" altLang="en-US" sz="2400" b="1"/>
+            <a:endParaRPr lang="ko-KR" altLang="en-US" sz="2900" b="1"/>
           </a:p>
         </p:txBody>
       </p:sp>
@@ -3401,8 +3402,8 @@
         </p:nvSpPr>
         <p:spPr>
           <a:xfrm>
-            <a:off x="5148064" y="3386525"/>
-            <a:ext cx="864096" cy="477893"/>
+            <a:off x="6486918" y="3199954"/>
+            <a:ext cx="1088821" cy="451564"/>
           </a:xfrm>
           <a:prstGeom prst="rightArrow">
             <a:avLst>
@@ -3436,7 +3437,7 @@
           </a:fontRef>
         </p:style>
         <p:txBody>
-          <a:bodyPr rtlCol="0" anchor="ctr"/>
+          <a:bodyPr lIns="110780" tIns="55390" rIns="110780" bIns="55390" rtlCol="0" anchor="ctr"/>
           <a:lstStyle/>
           <a:p>
             <a:pPr algn="ctr"/>
@@ -3452,8 +3453,8 @@
         </p:nvSpPr>
         <p:spPr>
           <a:xfrm>
-            <a:off x="130116" y="3374339"/>
-            <a:ext cx="2763087" cy="523220"/>
+            <a:off x="163957" y="3188438"/>
+            <a:ext cx="3481682" cy="635082"/>
           </a:xfrm>
           <a:prstGeom prst="rect">
             <a:avLst/>
@@ -3461,14 +3462,14 @@
           <a:noFill/>
         </p:spPr>
         <p:txBody>
-          <a:bodyPr wrap="square" rtlCol="0">
+          <a:bodyPr wrap="square" lIns="110780" tIns="55390" rIns="110780" bIns="55390" rtlCol="0">
             <a:spAutoFit/>
           </a:bodyPr>
           <a:lstStyle/>
           <a:p>
             <a:pPr algn="ctr"/>
             <a:r>
-              <a:rPr lang="en-US" altLang="ko-KR" sz="2800">
+              <a:rPr lang="en-US" altLang="ko-KR" sz="3400">
                 <a:latin typeface="나눔스퀘어 ExtraBold" pitchFamily="50" charset="-127"/>
                 <a:ea typeface="나눔스퀘어 ExtraBold" pitchFamily="50" charset="-127"/>
               </a:rPr>
@@ -3485,8 +3486,8 @@
         </p:nvSpPr>
         <p:spPr>
           <a:xfrm>
-            <a:off x="570498" y="692696"/>
-            <a:ext cx="1666301" cy="400110"/>
+            <a:off x="718869" y="654534"/>
+            <a:ext cx="2099655" cy="481194"/>
           </a:xfrm>
           <a:prstGeom prst="rect">
             <a:avLst/>
@@ -3494,14 +3495,14 @@
           <a:noFill/>
         </p:spPr>
         <p:txBody>
-          <a:bodyPr wrap="square" rtlCol="0">
+          <a:bodyPr wrap="square" lIns="110780" tIns="55390" rIns="110780" bIns="55390" rtlCol="0">
             <a:spAutoFit/>
           </a:bodyPr>
           <a:lstStyle/>
           <a:p>
             <a:pPr algn="ctr"/>
             <a:r>
-              <a:rPr lang="en-US" altLang="ko-KR" sz="2000" smtClean="0">
+              <a:rPr lang="en-US" altLang="ko-KR" sz="2400">
                 <a:solidFill>
                   <a:schemeClr val="tx2">
                     <a:lumMod val="60000"/>
@@ -3513,7 +3514,7 @@
               </a:rPr>
               <a:t>Plain Text</a:t>
             </a:r>
-            <a:endParaRPr lang="ko-KR" altLang="en-US" sz="2000">
+            <a:endParaRPr lang="ko-KR" altLang="en-US" sz="2400">
               <a:solidFill>
                 <a:schemeClr val="tx2">
                   <a:lumMod val="60000"/>
@@ -3534,8 +3535,8 @@
         </p:nvSpPr>
         <p:spPr>
           <a:xfrm>
-            <a:off x="3316326" y="548680"/>
-            <a:ext cx="1666301" cy="400110"/>
+            <a:off x="4178803" y="518452"/>
+            <a:ext cx="2099655" cy="481194"/>
           </a:xfrm>
           <a:prstGeom prst="rect">
             <a:avLst/>
@@ -3543,14 +3544,14 @@
           <a:noFill/>
         </p:spPr>
         <p:txBody>
-          <a:bodyPr wrap="square" rtlCol="0">
+          <a:bodyPr wrap="square" lIns="110780" tIns="55390" rIns="110780" bIns="55390" rtlCol="0">
             <a:spAutoFit/>
           </a:bodyPr>
           <a:lstStyle/>
           <a:p>
             <a:pPr algn="ctr"/>
             <a:r>
-              <a:rPr lang="en-US" altLang="ko-KR" sz="2000" smtClean="0">
+              <a:rPr lang="en-US" altLang="ko-KR" sz="2400">
                 <a:solidFill>
                   <a:schemeClr val="tx2">
                     <a:lumMod val="60000"/>
@@ -3562,7 +3563,7 @@
               </a:rPr>
               <a:t>Public Key</a:t>
             </a:r>
-            <a:endParaRPr lang="ko-KR" altLang="en-US" sz="2000">
+            <a:endParaRPr lang="ko-KR" altLang="en-US" sz="2400">
               <a:solidFill>
                 <a:schemeClr val="tx2">
                   <a:lumMod val="60000"/>
@@ -3583,8 +3584,8 @@
         </p:nvSpPr>
         <p:spPr>
           <a:xfrm>
-            <a:off x="6727181" y="692696"/>
-            <a:ext cx="1666301" cy="400110"/>
+            <a:off x="8476717" y="654534"/>
+            <a:ext cx="2099655" cy="481194"/>
           </a:xfrm>
           <a:prstGeom prst="rect">
             <a:avLst/>
@@ -3592,14 +3593,14 @@
           <a:noFill/>
         </p:spPr>
         <p:txBody>
-          <a:bodyPr wrap="square" rtlCol="0">
+          <a:bodyPr wrap="square" lIns="110780" tIns="55390" rIns="110780" bIns="55390" rtlCol="0">
             <a:spAutoFit/>
           </a:bodyPr>
           <a:lstStyle/>
           <a:p>
             <a:pPr algn="ctr"/>
             <a:r>
-              <a:rPr lang="en-US" altLang="ko-KR" sz="2000" smtClean="0">
+              <a:rPr lang="en-US" altLang="ko-KR" sz="2400">
                 <a:solidFill>
                   <a:schemeClr val="tx2">
                     <a:lumMod val="60000"/>
@@ -3611,7 +3612,7 @@
               </a:rPr>
               <a:t>Cipher Text</a:t>
             </a:r>
-            <a:endParaRPr lang="ko-KR" altLang="en-US" sz="2000">
+            <a:endParaRPr lang="ko-KR" altLang="en-US" sz="2400">
               <a:solidFill>
                 <a:schemeClr val="tx2">
                   <a:lumMod val="60000"/>
@@ -3632,8 +3633,8 @@
         </p:nvSpPr>
         <p:spPr>
           <a:xfrm>
-            <a:off x="570498" y="2852936"/>
-            <a:ext cx="1666301" cy="400110"/>
+            <a:off x="718869" y="2695761"/>
+            <a:ext cx="2099655" cy="481194"/>
           </a:xfrm>
           <a:prstGeom prst="rect">
             <a:avLst/>
@@ -3641,14 +3642,14 @@
           <a:noFill/>
         </p:spPr>
         <p:txBody>
-          <a:bodyPr wrap="square" rtlCol="0">
+          <a:bodyPr wrap="square" lIns="110780" tIns="55390" rIns="110780" bIns="55390" rtlCol="0">
             <a:spAutoFit/>
           </a:bodyPr>
           <a:lstStyle/>
           <a:p>
             <a:pPr algn="ctr"/>
             <a:r>
-              <a:rPr lang="en-US" altLang="ko-KR" sz="2000" smtClean="0">
+              <a:rPr lang="en-US" altLang="ko-KR" sz="2400">
                 <a:solidFill>
                   <a:srgbClr val="92D050"/>
                 </a:solidFill>
@@ -3657,7 +3658,7 @@
               </a:rPr>
               <a:t>Cipher Text</a:t>
             </a:r>
-            <a:endParaRPr lang="ko-KR" altLang="en-US" sz="2000">
+            <a:endParaRPr lang="ko-KR" altLang="en-US" sz="2400">
               <a:solidFill>
                 <a:srgbClr val="92D050"/>
               </a:solidFill>
@@ -3675,8 +3676,8 @@
         </p:nvSpPr>
         <p:spPr>
           <a:xfrm>
-            <a:off x="3316326" y="2708920"/>
-            <a:ext cx="1666301" cy="400110"/>
+            <a:off x="4178803" y="2559678"/>
+            <a:ext cx="2099655" cy="481194"/>
           </a:xfrm>
           <a:prstGeom prst="rect">
             <a:avLst/>
@@ -3684,14 +3685,14 @@
           <a:noFill/>
         </p:spPr>
         <p:txBody>
-          <a:bodyPr wrap="square" rtlCol="0">
+          <a:bodyPr wrap="square" lIns="110780" tIns="55390" rIns="110780" bIns="55390" rtlCol="0">
             <a:spAutoFit/>
           </a:bodyPr>
           <a:lstStyle/>
           <a:p>
             <a:pPr algn="ctr"/>
             <a:r>
-              <a:rPr lang="en-US" altLang="ko-KR" sz="2000" smtClean="0">
+              <a:rPr lang="en-US" altLang="ko-KR" sz="2400">
                 <a:solidFill>
                   <a:srgbClr val="92D050"/>
                 </a:solidFill>
@@ -3700,7 +3701,7 @@
               </a:rPr>
               <a:t>Private Key</a:t>
             </a:r>
-            <a:endParaRPr lang="ko-KR" altLang="en-US" sz="2000">
+            <a:endParaRPr lang="ko-KR" altLang="en-US" sz="2400">
               <a:solidFill>
                 <a:srgbClr val="92D050"/>
               </a:solidFill>
@@ -3718,8 +3719,8 @@
         </p:nvSpPr>
         <p:spPr>
           <a:xfrm>
-            <a:off x="6727181" y="2852936"/>
-            <a:ext cx="1666301" cy="400110"/>
+            <a:off x="8476717" y="2695761"/>
+            <a:ext cx="2099655" cy="481194"/>
           </a:xfrm>
           <a:prstGeom prst="rect">
             <a:avLst/>
@@ -3727,14 +3728,14 @@
           <a:noFill/>
         </p:spPr>
         <p:txBody>
-          <a:bodyPr wrap="square" rtlCol="0">
+          <a:bodyPr wrap="square" lIns="110780" tIns="55390" rIns="110780" bIns="55390" rtlCol="0">
             <a:spAutoFit/>
           </a:bodyPr>
           <a:lstStyle/>
           <a:p>
             <a:pPr algn="ctr"/>
             <a:r>
-              <a:rPr lang="en-US" altLang="ko-KR" sz="2000" smtClean="0">
+              <a:rPr lang="en-US" altLang="ko-KR" sz="2400">
                 <a:solidFill>
                   <a:srgbClr val="92D050"/>
                 </a:solidFill>
@@ -3743,7 +3744,7 @@
               </a:rPr>
               <a:t>Plain Text</a:t>
             </a:r>
-            <a:endParaRPr lang="ko-KR" altLang="en-US" sz="2000">
+            <a:endParaRPr lang="ko-KR" altLang="en-US" sz="2400">
               <a:solidFill>
                 <a:srgbClr val="92D050"/>
               </a:solidFill>
@@ -3757,6 +3758,1729 @@
     <p:extLst>
       <p:ext uri="{BB962C8B-B14F-4D97-AF65-F5344CB8AC3E}">
         <p14:creationId xmlns:p14="http://schemas.microsoft.com/office/powerpoint/2010/main" val="1861585198"/>
+      </p:ext>
+    </p:extLst>
+  </p:cSld>
+  <p:clrMapOvr>
+    <a:masterClrMapping/>
+  </p:clrMapOvr>
+</p:sld>
+</file>
+
+<file path=ppt/slides/slide2.xml><?xml version="1.0" encoding="utf-8"?>
+<p:sld xmlns:a="http://schemas.openxmlformats.org/drawingml/2006/main" xmlns:r="http://schemas.openxmlformats.org/officeDocument/2006/relationships" xmlns:p="http://schemas.openxmlformats.org/presentationml/2006/main">
+  <p:cSld>
+    <p:spTree>
+      <p:nvGrpSpPr>
+        <p:cNvPr id="1" name=""/>
+        <p:cNvGrpSpPr/>
+        <p:nvPr/>
+      </p:nvGrpSpPr>
+      <p:grpSpPr>
+        <a:xfrm>
+          <a:off x="0" y="0"/>
+          <a:ext cx="0" cy="0"/>
+          <a:chOff x="0" y="0"/>
+          <a:chExt cx="0" cy="0"/>
+        </a:xfrm>
+      </p:grpSpPr>
+      <p:sp>
+        <p:nvSpPr>
+          <p:cNvPr id="56" name="직사각형 55"/>
+          <p:cNvSpPr/>
+          <p:nvPr/>
+        </p:nvSpPr>
+        <p:spPr>
+          <a:xfrm>
+            <a:off x="1885425" y="4005183"/>
+            <a:ext cx="8103060" cy="1177953"/>
+          </a:xfrm>
+          <a:prstGeom prst="rect">
+            <a:avLst/>
+          </a:prstGeom>
+          <a:solidFill>
+            <a:schemeClr val="accent5">
+              <a:lumMod val="60000"/>
+              <a:lumOff val="40000"/>
+              <a:alpha val="21961"/>
+            </a:schemeClr>
+          </a:solidFill>
+          <a:ln>
+            <a:noFill/>
+          </a:ln>
+        </p:spPr>
+        <p:style>
+          <a:lnRef idx="2">
+            <a:schemeClr val="accent1">
+              <a:shade val="50000"/>
+            </a:schemeClr>
+          </a:lnRef>
+          <a:fillRef idx="1">
+            <a:schemeClr val="accent1"/>
+          </a:fillRef>
+          <a:effectRef idx="0">
+            <a:schemeClr val="accent1"/>
+          </a:effectRef>
+          <a:fontRef idx="minor">
+            <a:schemeClr val="lt1"/>
+          </a:fontRef>
+        </p:style>
+        <p:txBody>
+          <a:bodyPr rtlCol="0" anchor="ctr"/>
+          <a:lstStyle/>
+          <a:p>
+            <a:pPr algn="ctr"/>
+            <a:endParaRPr lang="ko-KR" altLang="en-US"/>
+          </a:p>
+        </p:txBody>
+      </p:sp>
+      <p:sp>
+        <p:nvSpPr>
+          <p:cNvPr id="54" name="직사각형 53"/>
+          <p:cNvSpPr/>
+          <p:nvPr/>
+        </p:nvSpPr>
+        <p:spPr>
+          <a:xfrm>
+            <a:off x="1885425" y="2827230"/>
+            <a:ext cx="8103060" cy="1177953"/>
+          </a:xfrm>
+          <a:prstGeom prst="rect">
+            <a:avLst/>
+          </a:prstGeom>
+          <a:solidFill>
+            <a:schemeClr val="accent3">
+              <a:lumMod val="60000"/>
+              <a:lumOff val="40000"/>
+              <a:alpha val="21961"/>
+            </a:schemeClr>
+          </a:solidFill>
+          <a:ln>
+            <a:noFill/>
+          </a:ln>
+        </p:spPr>
+        <p:style>
+          <a:lnRef idx="2">
+            <a:schemeClr val="accent1">
+              <a:shade val="50000"/>
+            </a:schemeClr>
+          </a:lnRef>
+          <a:fillRef idx="1">
+            <a:schemeClr val="accent1"/>
+          </a:fillRef>
+          <a:effectRef idx="0">
+            <a:schemeClr val="accent1"/>
+          </a:effectRef>
+          <a:fontRef idx="minor">
+            <a:schemeClr val="lt1"/>
+          </a:fontRef>
+        </p:style>
+        <p:txBody>
+          <a:bodyPr rtlCol="0" anchor="ctr"/>
+          <a:lstStyle/>
+          <a:p>
+            <a:pPr algn="ctr"/>
+            <a:endParaRPr lang="ko-KR" altLang="en-US"/>
+          </a:p>
+        </p:txBody>
+      </p:sp>
+      <p:sp>
+        <p:nvSpPr>
+          <p:cNvPr id="52" name="직사각형 51"/>
+          <p:cNvSpPr/>
+          <p:nvPr/>
+        </p:nvSpPr>
+        <p:spPr>
+          <a:xfrm>
+            <a:off x="1885425" y="1066801"/>
+            <a:ext cx="8103060" cy="1760428"/>
+          </a:xfrm>
+          <a:prstGeom prst="rect">
+            <a:avLst/>
+          </a:prstGeom>
+          <a:solidFill>
+            <a:schemeClr val="accent2">
+              <a:lumMod val="40000"/>
+              <a:lumOff val="60000"/>
+              <a:alpha val="21961"/>
+            </a:schemeClr>
+          </a:solidFill>
+          <a:ln>
+            <a:noFill/>
+          </a:ln>
+        </p:spPr>
+        <p:style>
+          <a:lnRef idx="2">
+            <a:schemeClr val="accent1">
+              <a:shade val="50000"/>
+            </a:schemeClr>
+          </a:lnRef>
+          <a:fillRef idx="1">
+            <a:schemeClr val="accent1"/>
+          </a:fillRef>
+          <a:effectRef idx="0">
+            <a:schemeClr val="accent1"/>
+          </a:effectRef>
+          <a:fontRef idx="minor">
+            <a:schemeClr val="lt1"/>
+          </a:fontRef>
+        </p:style>
+        <p:txBody>
+          <a:bodyPr rtlCol="0" anchor="ctr"/>
+          <a:lstStyle/>
+          <a:p>
+            <a:pPr algn="ctr"/>
+            <a:endParaRPr lang="ko-KR" altLang="en-US"/>
+          </a:p>
+        </p:txBody>
+      </p:sp>
+      <p:sp>
+        <p:nvSpPr>
+          <p:cNvPr id="3" name="TextBox 2"/>
+          <p:cNvSpPr txBox="1"/>
+          <p:nvPr/>
+        </p:nvSpPr>
+        <p:spPr>
+          <a:xfrm>
+            <a:off x="3521756" y="1200255"/>
+            <a:ext cx="655105" cy="327305"/>
+          </a:xfrm>
+          <a:prstGeom prst="rect">
+            <a:avLst/>
+          </a:prstGeom>
+          <a:noFill/>
+        </p:spPr>
+        <p:txBody>
+          <a:bodyPr wrap="square" lIns="110780" tIns="55390" rIns="110780" bIns="55390" rtlCol="0">
+            <a:spAutoFit/>
+          </a:bodyPr>
+          <a:lstStyle/>
+          <a:p>
+            <a:pPr algn="ctr"/>
+            <a:r>
+              <a:rPr lang="en-US" altLang="ko-KR" sz="1400">
+                <a:latin typeface="나눔스퀘어 ExtraBold" pitchFamily="50" charset="-127"/>
+                <a:ea typeface="나눔스퀘어 ExtraBold" pitchFamily="50" charset="-127"/>
+              </a:rPr>
+              <a:t>7</a:t>
+            </a:r>
+            <a:r>
+              <a:rPr lang="ko-KR" altLang="en-US" sz="1400">
+                <a:latin typeface="나눔스퀘어 ExtraBold" pitchFamily="50" charset="-127"/>
+                <a:ea typeface="나눔스퀘어 ExtraBold" pitchFamily="50" charset="-127"/>
+              </a:rPr>
+              <a:t>계층</a:t>
+            </a:r>
+          </a:p>
+        </p:txBody>
+      </p:sp>
+      <p:sp>
+        <p:nvSpPr>
+          <p:cNvPr id="14" name="직사각형 13"/>
+          <p:cNvSpPr/>
+          <p:nvPr/>
+        </p:nvSpPr>
+        <p:spPr>
+          <a:xfrm>
+            <a:off x="4162789" y="1066803"/>
+            <a:ext cx="2184273" cy="586809"/>
+          </a:xfrm>
+          <a:prstGeom prst="rect">
+            <a:avLst/>
+          </a:prstGeom>
+          <a:solidFill>
+            <a:srgbClr val="CF3531"/>
+          </a:solidFill>
+          <a:ln w="12700">
+            <a:solidFill>
+              <a:schemeClr val="tx1">
+                <a:lumMod val="65000"/>
+                <a:lumOff val="35000"/>
+              </a:schemeClr>
+            </a:solidFill>
+          </a:ln>
+        </p:spPr>
+        <p:style>
+          <a:lnRef idx="2">
+            <a:schemeClr val="accent1">
+              <a:shade val="50000"/>
+            </a:schemeClr>
+          </a:lnRef>
+          <a:fillRef idx="1">
+            <a:schemeClr val="accent1"/>
+          </a:fillRef>
+          <a:effectRef idx="0">
+            <a:schemeClr val="accent1"/>
+          </a:effectRef>
+          <a:fontRef idx="minor">
+            <a:schemeClr val="lt1"/>
+          </a:fontRef>
+        </p:style>
+        <p:txBody>
+          <a:bodyPr lIns="110780" tIns="55390" rIns="110780" bIns="55390" spcCol="0" rtlCol="0" anchor="ctr"/>
+          <a:lstStyle/>
+          <a:p>
+            <a:pPr algn="ctr"/>
+            <a:r>
+              <a:rPr lang="ko-KR" altLang="en-US" sz="1600">
+                <a:latin typeface="나눔스퀘어 ExtraBold" pitchFamily="50" charset="-127"/>
+                <a:ea typeface="나눔스퀘어 ExtraBold" pitchFamily="50" charset="-127"/>
+              </a:rPr>
+              <a:t>응용 계층</a:t>
+            </a:r>
+            <a:endParaRPr lang="en-US" altLang="ko-KR" sz="1600">
+              <a:latin typeface="나눔스퀘어 ExtraBold" pitchFamily="50" charset="-127"/>
+              <a:ea typeface="나눔스퀘어 ExtraBold" pitchFamily="50" charset="-127"/>
+            </a:endParaRPr>
+          </a:p>
+          <a:p>
+            <a:pPr algn="ctr"/>
+            <a:r>
+              <a:rPr lang="en-US" altLang="ko-KR" sz="1400">
+                <a:latin typeface="나눔스퀘어 ExtraBold" pitchFamily="50" charset="-127"/>
+                <a:ea typeface="나눔스퀘어 ExtraBold" pitchFamily="50" charset="-127"/>
+              </a:rPr>
+              <a:t>Applcation Layer</a:t>
+            </a:r>
+            <a:endParaRPr lang="ko-KR" altLang="en-US" sz="1400">
+              <a:latin typeface="나눔스퀘어 ExtraBold" pitchFamily="50" charset="-127"/>
+              <a:ea typeface="나눔스퀘어 ExtraBold" pitchFamily="50" charset="-127"/>
+            </a:endParaRPr>
+          </a:p>
+        </p:txBody>
+      </p:sp>
+      <p:sp>
+        <p:nvSpPr>
+          <p:cNvPr id="21" name="직사각형 20"/>
+          <p:cNvSpPr/>
+          <p:nvPr/>
+        </p:nvSpPr>
+        <p:spPr>
+          <a:xfrm>
+            <a:off x="4162786" y="1653612"/>
+            <a:ext cx="2184273" cy="586809"/>
+          </a:xfrm>
+          <a:prstGeom prst="rect">
+            <a:avLst/>
+          </a:prstGeom>
+          <a:solidFill>
+            <a:srgbClr val="F79647"/>
+          </a:solidFill>
+          <a:ln w="12700">
+            <a:solidFill>
+              <a:schemeClr val="tx1">
+                <a:lumMod val="65000"/>
+                <a:lumOff val="35000"/>
+              </a:schemeClr>
+            </a:solidFill>
+          </a:ln>
+        </p:spPr>
+        <p:style>
+          <a:lnRef idx="2">
+            <a:schemeClr val="accent1">
+              <a:shade val="50000"/>
+            </a:schemeClr>
+          </a:lnRef>
+          <a:fillRef idx="1">
+            <a:schemeClr val="accent1"/>
+          </a:fillRef>
+          <a:effectRef idx="0">
+            <a:schemeClr val="accent1"/>
+          </a:effectRef>
+          <a:fontRef idx="minor">
+            <a:schemeClr val="lt1"/>
+          </a:fontRef>
+        </p:style>
+        <p:txBody>
+          <a:bodyPr lIns="110780" tIns="55390" rIns="110780" bIns="55390" spcCol="0" rtlCol="0" anchor="ctr"/>
+          <a:lstStyle/>
+          <a:p>
+            <a:pPr algn="ctr"/>
+            <a:r>
+              <a:rPr lang="ko-KR" altLang="en-US" sz="1600">
+                <a:latin typeface="나눔스퀘어 ExtraBold" pitchFamily="50" charset="-127"/>
+                <a:ea typeface="나눔스퀘어 ExtraBold" pitchFamily="50" charset="-127"/>
+              </a:rPr>
+              <a:t>표현 계층</a:t>
+            </a:r>
+            <a:endParaRPr lang="en-US" altLang="ko-KR" sz="1600">
+              <a:latin typeface="나눔스퀘어 ExtraBold" pitchFamily="50" charset="-127"/>
+              <a:ea typeface="나눔스퀘어 ExtraBold" pitchFamily="50" charset="-127"/>
+            </a:endParaRPr>
+          </a:p>
+          <a:p>
+            <a:pPr algn="ctr"/>
+            <a:r>
+              <a:rPr lang="en-US" altLang="ko-KR" sz="1400">
+                <a:latin typeface="나눔스퀘어 ExtraBold" pitchFamily="50" charset="-127"/>
+                <a:ea typeface="나눔스퀘어 ExtraBold" pitchFamily="50" charset="-127"/>
+              </a:rPr>
+              <a:t>Presentation Layer</a:t>
+            </a:r>
+            <a:endParaRPr lang="ko-KR" altLang="en-US" sz="1400">
+              <a:latin typeface="나눔스퀘어 ExtraBold" pitchFamily="50" charset="-127"/>
+              <a:ea typeface="나눔스퀘어 ExtraBold" pitchFamily="50" charset="-127"/>
+            </a:endParaRPr>
+          </a:p>
+        </p:txBody>
+      </p:sp>
+      <p:sp>
+        <p:nvSpPr>
+          <p:cNvPr id="22" name="직사각형 21"/>
+          <p:cNvSpPr/>
+          <p:nvPr/>
+        </p:nvSpPr>
+        <p:spPr>
+          <a:xfrm>
+            <a:off x="4162789" y="2240421"/>
+            <a:ext cx="2184273" cy="586809"/>
+          </a:xfrm>
+          <a:prstGeom prst="rect">
+            <a:avLst/>
+          </a:prstGeom>
+          <a:solidFill>
+            <a:srgbClr val="FFC203"/>
+          </a:solidFill>
+          <a:ln w="12700">
+            <a:solidFill>
+              <a:schemeClr val="tx1">
+                <a:lumMod val="65000"/>
+                <a:lumOff val="35000"/>
+              </a:schemeClr>
+            </a:solidFill>
+          </a:ln>
+        </p:spPr>
+        <p:style>
+          <a:lnRef idx="2">
+            <a:schemeClr val="accent1">
+              <a:shade val="50000"/>
+            </a:schemeClr>
+          </a:lnRef>
+          <a:fillRef idx="1">
+            <a:schemeClr val="accent1"/>
+          </a:fillRef>
+          <a:effectRef idx="0">
+            <a:schemeClr val="accent1"/>
+          </a:effectRef>
+          <a:fontRef idx="minor">
+            <a:schemeClr val="lt1"/>
+          </a:fontRef>
+        </p:style>
+        <p:txBody>
+          <a:bodyPr lIns="110780" tIns="55390" rIns="110780" bIns="55390" spcCol="0" rtlCol="0" anchor="ctr"/>
+          <a:lstStyle/>
+          <a:p>
+            <a:pPr algn="ctr"/>
+            <a:r>
+              <a:rPr lang="ko-KR" altLang="en-US" sz="1600">
+                <a:latin typeface="나눔스퀘어 ExtraBold" pitchFamily="50" charset="-127"/>
+                <a:ea typeface="나눔스퀘어 ExtraBold" pitchFamily="50" charset="-127"/>
+              </a:rPr>
+              <a:t>세션 계층</a:t>
+            </a:r>
+            <a:endParaRPr lang="en-US" altLang="ko-KR" sz="1600">
+              <a:latin typeface="나눔스퀘어 ExtraBold" pitchFamily="50" charset="-127"/>
+              <a:ea typeface="나눔스퀘어 ExtraBold" pitchFamily="50" charset="-127"/>
+            </a:endParaRPr>
+          </a:p>
+          <a:p>
+            <a:pPr algn="ctr"/>
+            <a:r>
+              <a:rPr lang="en-US" altLang="ko-KR" sz="1400">
+                <a:latin typeface="나눔스퀘어 ExtraBold" pitchFamily="50" charset="-127"/>
+                <a:ea typeface="나눔스퀘어 ExtraBold" pitchFamily="50" charset="-127"/>
+              </a:rPr>
+              <a:t>Session Layer</a:t>
+            </a:r>
+            <a:endParaRPr lang="ko-KR" altLang="en-US" sz="1400">
+              <a:latin typeface="나눔스퀘어 ExtraBold" pitchFamily="50" charset="-127"/>
+              <a:ea typeface="나눔스퀘어 ExtraBold" pitchFamily="50" charset="-127"/>
+            </a:endParaRPr>
+          </a:p>
+        </p:txBody>
+      </p:sp>
+      <p:sp>
+        <p:nvSpPr>
+          <p:cNvPr id="23" name="직사각형 22"/>
+          <p:cNvSpPr/>
+          <p:nvPr/>
+        </p:nvSpPr>
+        <p:spPr>
+          <a:xfrm>
+            <a:off x="4162789" y="2827230"/>
+            <a:ext cx="2184273" cy="586809"/>
+          </a:xfrm>
+          <a:prstGeom prst="rect">
+            <a:avLst/>
+          </a:prstGeom>
+          <a:solidFill>
+            <a:srgbClr val="10A021"/>
+          </a:solidFill>
+          <a:ln w="12700">
+            <a:solidFill>
+              <a:schemeClr val="tx1">
+                <a:lumMod val="65000"/>
+                <a:lumOff val="35000"/>
+              </a:schemeClr>
+            </a:solidFill>
+          </a:ln>
+        </p:spPr>
+        <p:style>
+          <a:lnRef idx="2">
+            <a:schemeClr val="accent1">
+              <a:shade val="50000"/>
+            </a:schemeClr>
+          </a:lnRef>
+          <a:fillRef idx="1">
+            <a:schemeClr val="accent1"/>
+          </a:fillRef>
+          <a:effectRef idx="0">
+            <a:schemeClr val="accent1"/>
+          </a:effectRef>
+          <a:fontRef idx="minor">
+            <a:schemeClr val="lt1"/>
+          </a:fontRef>
+        </p:style>
+        <p:txBody>
+          <a:bodyPr lIns="110780" tIns="55390" rIns="110780" bIns="55390" spcCol="0" rtlCol="0" anchor="ctr"/>
+          <a:lstStyle/>
+          <a:p>
+            <a:pPr algn="ctr"/>
+            <a:r>
+              <a:rPr lang="ko-KR" altLang="en-US" sz="1600">
+                <a:latin typeface="나눔스퀘어 ExtraBold" pitchFamily="50" charset="-127"/>
+                <a:ea typeface="나눔스퀘어 ExtraBold" pitchFamily="50" charset="-127"/>
+              </a:rPr>
+              <a:t>전송 계층</a:t>
+            </a:r>
+            <a:endParaRPr lang="en-US" altLang="ko-KR" sz="1600">
+              <a:latin typeface="나눔스퀘어 ExtraBold" pitchFamily="50" charset="-127"/>
+              <a:ea typeface="나눔스퀘어 ExtraBold" pitchFamily="50" charset="-127"/>
+            </a:endParaRPr>
+          </a:p>
+          <a:p>
+            <a:pPr algn="ctr"/>
+            <a:r>
+              <a:rPr lang="en-US" altLang="ko-KR" sz="1400">
+                <a:latin typeface="나눔스퀘어 ExtraBold" pitchFamily="50" charset="-127"/>
+                <a:ea typeface="나눔스퀘어 ExtraBold" pitchFamily="50" charset="-127"/>
+              </a:rPr>
+              <a:t>Transport Layer</a:t>
+            </a:r>
+            <a:endParaRPr lang="ko-KR" altLang="en-US" sz="1400">
+              <a:latin typeface="나눔스퀘어 ExtraBold" pitchFamily="50" charset="-127"/>
+              <a:ea typeface="나눔스퀘어 ExtraBold" pitchFamily="50" charset="-127"/>
+            </a:endParaRPr>
+          </a:p>
+        </p:txBody>
+      </p:sp>
+      <p:sp>
+        <p:nvSpPr>
+          <p:cNvPr id="24" name="직사각형 23"/>
+          <p:cNvSpPr/>
+          <p:nvPr/>
+        </p:nvSpPr>
+        <p:spPr>
+          <a:xfrm>
+            <a:off x="4162789" y="3414040"/>
+            <a:ext cx="2184273" cy="586809"/>
+          </a:xfrm>
+          <a:prstGeom prst="rect">
+            <a:avLst/>
+          </a:prstGeom>
+          <a:ln w="12700">
+            <a:solidFill>
+              <a:schemeClr val="tx1">
+                <a:lumMod val="65000"/>
+                <a:lumOff val="35000"/>
+              </a:schemeClr>
+            </a:solidFill>
+          </a:ln>
+        </p:spPr>
+        <p:style>
+          <a:lnRef idx="2">
+            <a:schemeClr val="accent1">
+              <a:shade val="50000"/>
+            </a:schemeClr>
+          </a:lnRef>
+          <a:fillRef idx="1">
+            <a:schemeClr val="accent1"/>
+          </a:fillRef>
+          <a:effectRef idx="0">
+            <a:schemeClr val="accent1"/>
+          </a:effectRef>
+          <a:fontRef idx="minor">
+            <a:schemeClr val="lt1"/>
+          </a:fontRef>
+        </p:style>
+        <p:txBody>
+          <a:bodyPr lIns="110780" tIns="55390" rIns="110780" bIns="55390" spcCol="0" rtlCol="0" anchor="ctr"/>
+          <a:lstStyle/>
+          <a:p>
+            <a:pPr algn="ctr"/>
+            <a:r>
+              <a:rPr lang="ko-KR" altLang="en-US" sz="1600">
+                <a:latin typeface="나눔스퀘어 ExtraBold" pitchFamily="50" charset="-127"/>
+                <a:ea typeface="나눔스퀘어 ExtraBold" pitchFamily="50" charset="-127"/>
+              </a:rPr>
+              <a:t>네트워크 계층</a:t>
+            </a:r>
+            <a:endParaRPr lang="en-US" altLang="ko-KR" sz="1600">
+              <a:latin typeface="나눔스퀘어 ExtraBold" pitchFamily="50" charset="-127"/>
+              <a:ea typeface="나눔스퀘어 ExtraBold" pitchFamily="50" charset="-127"/>
+            </a:endParaRPr>
+          </a:p>
+          <a:p>
+            <a:pPr algn="ctr"/>
+            <a:r>
+              <a:rPr lang="en-US" altLang="ko-KR" sz="1400">
+                <a:latin typeface="나눔스퀘어 ExtraBold" pitchFamily="50" charset="-127"/>
+                <a:ea typeface="나눔스퀘어 ExtraBold" pitchFamily="50" charset="-127"/>
+              </a:rPr>
+              <a:t>Network Layer</a:t>
+            </a:r>
+            <a:endParaRPr lang="ko-KR" altLang="en-US" sz="1400">
+              <a:latin typeface="나눔스퀘어 ExtraBold" pitchFamily="50" charset="-127"/>
+              <a:ea typeface="나눔스퀘어 ExtraBold" pitchFamily="50" charset="-127"/>
+            </a:endParaRPr>
+          </a:p>
+        </p:txBody>
+      </p:sp>
+      <p:sp>
+        <p:nvSpPr>
+          <p:cNvPr id="25" name="직사각형 24"/>
+          <p:cNvSpPr/>
+          <p:nvPr/>
+        </p:nvSpPr>
+        <p:spPr>
+          <a:xfrm>
+            <a:off x="4162786" y="4000849"/>
+            <a:ext cx="2184273" cy="586809"/>
+          </a:xfrm>
+          <a:prstGeom prst="rect">
+            <a:avLst/>
+          </a:prstGeom>
+          <a:solidFill>
+            <a:srgbClr val="00487E"/>
+          </a:solidFill>
+          <a:ln w="12700">
+            <a:solidFill>
+              <a:schemeClr val="tx1">
+                <a:lumMod val="65000"/>
+                <a:lumOff val="35000"/>
+              </a:schemeClr>
+            </a:solidFill>
+          </a:ln>
+        </p:spPr>
+        <p:style>
+          <a:lnRef idx="2">
+            <a:schemeClr val="accent1">
+              <a:shade val="50000"/>
+            </a:schemeClr>
+          </a:lnRef>
+          <a:fillRef idx="1">
+            <a:schemeClr val="accent1"/>
+          </a:fillRef>
+          <a:effectRef idx="0">
+            <a:schemeClr val="accent1"/>
+          </a:effectRef>
+          <a:fontRef idx="minor">
+            <a:schemeClr val="lt1"/>
+          </a:fontRef>
+        </p:style>
+        <p:txBody>
+          <a:bodyPr lIns="110780" tIns="55390" rIns="110780" bIns="55390" spcCol="0" rtlCol="0" anchor="ctr"/>
+          <a:lstStyle/>
+          <a:p>
+            <a:pPr algn="ctr"/>
+            <a:r>
+              <a:rPr lang="ko-KR" altLang="en-US" sz="1600">
+                <a:latin typeface="나눔스퀘어 ExtraBold" pitchFamily="50" charset="-127"/>
+                <a:ea typeface="나눔스퀘어 ExtraBold" pitchFamily="50" charset="-127"/>
+              </a:rPr>
+              <a:t>데이터 링크 계층</a:t>
+            </a:r>
+            <a:endParaRPr lang="en-US" altLang="ko-KR" sz="1600">
+              <a:latin typeface="나눔스퀘어 ExtraBold" pitchFamily="50" charset="-127"/>
+              <a:ea typeface="나눔스퀘어 ExtraBold" pitchFamily="50" charset="-127"/>
+            </a:endParaRPr>
+          </a:p>
+          <a:p>
+            <a:pPr algn="ctr"/>
+            <a:r>
+              <a:rPr lang="en-US" altLang="ko-KR" sz="1400">
+                <a:latin typeface="나눔스퀘어 ExtraBold" pitchFamily="50" charset="-127"/>
+                <a:ea typeface="나눔스퀘어 ExtraBold" pitchFamily="50" charset="-127"/>
+              </a:rPr>
+              <a:t>DataLink Layer</a:t>
+            </a:r>
+            <a:endParaRPr lang="ko-KR" altLang="en-US" sz="1400">
+              <a:latin typeface="나눔스퀘어 ExtraBold" pitchFamily="50" charset="-127"/>
+              <a:ea typeface="나눔스퀘어 ExtraBold" pitchFamily="50" charset="-127"/>
+            </a:endParaRPr>
+          </a:p>
+        </p:txBody>
+      </p:sp>
+      <p:sp>
+        <p:nvSpPr>
+          <p:cNvPr id="26" name="직사각형 25"/>
+          <p:cNvSpPr/>
+          <p:nvPr/>
+        </p:nvSpPr>
+        <p:spPr>
+          <a:xfrm>
+            <a:off x="4162789" y="4587658"/>
+            <a:ext cx="2184273" cy="586809"/>
+          </a:xfrm>
+          <a:prstGeom prst="rect">
+            <a:avLst/>
+          </a:prstGeom>
+          <a:solidFill>
+            <a:srgbClr val="58267E"/>
+          </a:solidFill>
+          <a:ln w="12700">
+            <a:solidFill>
+              <a:schemeClr val="tx1">
+                <a:lumMod val="65000"/>
+                <a:lumOff val="35000"/>
+              </a:schemeClr>
+            </a:solidFill>
+          </a:ln>
+        </p:spPr>
+        <p:style>
+          <a:lnRef idx="2">
+            <a:schemeClr val="accent1">
+              <a:shade val="50000"/>
+            </a:schemeClr>
+          </a:lnRef>
+          <a:fillRef idx="1">
+            <a:schemeClr val="accent1"/>
+          </a:fillRef>
+          <a:effectRef idx="0">
+            <a:schemeClr val="accent1"/>
+          </a:effectRef>
+          <a:fontRef idx="minor">
+            <a:schemeClr val="lt1"/>
+          </a:fontRef>
+        </p:style>
+        <p:txBody>
+          <a:bodyPr lIns="110780" tIns="55390" rIns="110780" bIns="55390" spcCol="0" rtlCol="0" anchor="ctr"/>
+          <a:lstStyle/>
+          <a:p>
+            <a:pPr algn="ctr"/>
+            <a:r>
+              <a:rPr lang="ko-KR" altLang="en-US" sz="1600">
+                <a:latin typeface="나눔스퀘어 ExtraBold" pitchFamily="50" charset="-127"/>
+                <a:ea typeface="나눔스퀘어 ExtraBold" pitchFamily="50" charset="-127"/>
+              </a:rPr>
+              <a:t>물리 계층</a:t>
+            </a:r>
+            <a:endParaRPr lang="en-US" altLang="ko-KR" sz="1600">
+              <a:latin typeface="나눔스퀘어 ExtraBold" pitchFamily="50" charset="-127"/>
+              <a:ea typeface="나눔스퀘어 ExtraBold" pitchFamily="50" charset="-127"/>
+            </a:endParaRPr>
+          </a:p>
+          <a:p>
+            <a:pPr algn="ctr"/>
+            <a:r>
+              <a:rPr lang="en-US" altLang="ko-KR" sz="1400">
+                <a:latin typeface="나눔스퀘어 ExtraBold" pitchFamily="50" charset="-127"/>
+                <a:ea typeface="나눔스퀘어 ExtraBold" pitchFamily="50" charset="-127"/>
+              </a:rPr>
+              <a:t>Physical Layer</a:t>
+            </a:r>
+            <a:endParaRPr lang="ko-KR" altLang="en-US" sz="1400">
+              <a:latin typeface="나눔스퀘어 ExtraBold" pitchFamily="50" charset="-127"/>
+              <a:ea typeface="나눔스퀘어 ExtraBold" pitchFamily="50" charset="-127"/>
+            </a:endParaRPr>
+          </a:p>
+        </p:txBody>
+      </p:sp>
+      <p:sp>
+        <p:nvSpPr>
+          <p:cNvPr id="27" name="TextBox 26"/>
+          <p:cNvSpPr txBox="1"/>
+          <p:nvPr/>
+        </p:nvSpPr>
+        <p:spPr>
+          <a:xfrm>
+            <a:off x="3521756" y="1783362"/>
+            <a:ext cx="655105" cy="327305"/>
+          </a:xfrm>
+          <a:prstGeom prst="rect">
+            <a:avLst/>
+          </a:prstGeom>
+          <a:noFill/>
+        </p:spPr>
+        <p:txBody>
+          <a:bodyPr wrap="square" lIns="110780" tIns="55390" rIns="110780" bIns="55390" rtlCol="0">
+            <a:spAutoFit/>
+          </a:bodyPr>
+          <a:lstStyle/>
+          <a:p>
+            <a:pPr algn="ctr"/>
+            <a:r>
+              <a:rPr lang="en-US" altLang="ko-KR" sz="1400">
+                <a:latin typeface="나눔스퀘어 ExtraBold" pitchFamily="50" charset="-127"/>
+                <a:ea typeface="나눔스퀘어 ExtraBold" pitchFamily="50" charset="-127"/>
+              </a:rPr>
+              <a:t>6</a:t>
+            </a:r>
+            <a:r>
+              <a:rPr lang="ko-KR" altLang="en-US" sz="1400">
+                <a:latin typeface="나눔스퀘어 ExtraBold" pitchFamily="50" charset="-127"/>
+                <a:ea typeface="나눔스퀘어 ExtraBold" pitchFamily="50" charset="-127"/>
+              </a:rPr>
+              <a:t>계층</a:t>
+            </a:r>
+          </a:p>
+        </p:txBody>
+      </p:sp>
+      <p:sp>
+        <p:nvSpPr>
+          <p:cNvPr id="28" name="TextBox 27"/>
+          <p:cNvSpPr txBox="1"/>
+          <p:nvPr/>
+        </p:nvSpPr>
+        <p:spPr>
+          <a:xfrm>
+            <a:off x="3521756" y="2370172"/>
+            <a:ext cx="655105" cy="327305"/>
+          </a:xfrm>
+          <a:prstGeom prst="rect">
+            <a:avLst/>
+          </a:prstGeom>
+          <a:noFill/>
+        </p:spPr>
+        <p:txBody>
+          <a:bodyPr wrap="square" lIns="110780" tIns="55390" rIns="110780" bIns="55390" rtlCol="0">
+            <a:spAutoFit/>
+          </a:bodyPr>
+          <a:lstStyle/>
+          <a:p>
+            <a:pPr algn="ctr"/>
+            <a:r>
+              <a:rPr lang="en-US" altLang="ko-KR" sz="1400">
+                <a:latin typeface="나눔스퀘어 ExtraBold" pitchFamily="50" charset="-127"/>
+                <a:ea typeface="나눔스퀘어 ExtraBold" pitchFamily="50" charset="-127"/>
+              </a:rPr>
+              <a:t>5</a:t>
+            </a:r>
+            <a:r>
+              <a:rPr lang="ko-KR" altLang="en-US" sz="1400">
+                <a:latin typeface="나눔스퀘어 ExtraBold" pitchFamily="50" charset="-127"/>
+                <a:ea typeface="나눔스퀘어 ExtraBold" pitchFamily="50" charset="-127"/>
+              </a:rPr>
+              <a:t>계층</a:t>
+            </a:r>
+          </a:p>
+        </p:txBody>
+      </p:sp>
+      <p:sp>
+        <p:nvSpPr>
+          <p:cNvPr id="29" name="TextBox 28"/>
+          <p:cNvSpPr txBox="1"/>
+          <p:nvPr/>
+        </p:nvSpPr>
+        <p:spPr>
+          <a:xfrm>
+            <a:off x="3521756" y="2961453"/>
+            <a:ext cx="655105" cy="327305"/>
+          </a:xfrm>
+          <a:prstGeom prst="rect">
+            <a:avLst/>
+          </a:prstGeom>
+          <a:noFill/>
+        </p:spPr>
+        <p:txBody>
+          <a:bodyPr wrap="square" lIns="110780" tIns="55390" rIns="110780" bIns="55390" rtlCol="0">
+            <a:spAutoFit/>
+          </a:bodyPr>
+          <a:lstStyle/>
+          <a:p>
+            <a:pPr algn="ctr"/>
+            <a:r>
+              <a:rPr lang="en-US" altLang="ko-KR" sz="1400">
+                <a:latin typeface="나눔스퀘어 ExtraBold" pitchFamily="50" charset="-127"/>
+                <a:ea typeface="나눔스퀘어 ExtraBold" pitchFamily="50" charset="-127"/>
+              </a:rPr>
+              <a:t>4</a:t>
+            </a:r>
+            <a:r>
+              <a:rPr lang="ko-KR" altLang="en-US" sz="1400">
+                <a:latin typeface="나눔스퀘어 ExtraBold" pitchFamily="50" charset="-127"/>
+                <a:ea typeface="나눔스퀘어 ExtraBold" pitchFamily="50" charset="-127"/>
+              </a:rPr>
+              <a:t>계층</a:t>
+            </a:r>
+          </a:p>
+        </p:txBody>
+      </p:sp>
+      <p:sp>
+        <p:nvSpPr>
+          <p:cNvPr id="30" name="TextBox 29"/>
+          <p:cNvSpPr txBox="1"/>
+          <p:nvPr/>
+        </p:nvSpPr>
+        <p:spPr>
+          <a:xfrm>
+            <a:off x="3521756" y="3543790"/>
+            <a:ext cx="655105" cy="327305"/>
+          </a:xfrm>
+          <a:prstGeom prst="rect">
+            <a:avLst/>
+          </a:prstGeom>
+          <a:noFill/>
+        </p:spPr>
+        <p:txBody>
+          <a:bodyPr wrap="square" lIns="110780" tIns="55390" rIns="110780" bIns="55390" rtlCol="0">
+            <a:spAutoFit/>
+          </a:bodyPr>
+          <a:lstStyle/>
+          <a:p>
+            <a:pPr algn="ctr"/>
+            <a:r>
+              <a:rPr lang="en-US" altLang="ko-KR" sz="1400">
+                <a:latin typeface="나눔스퀘어 ExtraBold" pitchFamily="50" charset="-127"/>
+                <a:ea typeface="나눔스퀘어 ExtraBold" pitchFamily="50" charset="-127"/>
+              </a:rPr>
+              <a:t>3</a:t>
+            </a:r>
+            <a:r>
+              <a:rPr lang="ko-KR" altLang="en-US" sz="1400">
+                <a:latin typeface="나눔스퀘어 ExtraBold" pitchFamily="50" charset="-127"/>
+                <a:ea typeface="나눔스퀘어 ExtraBold" pitchFamily="50" charset="-127"/>
+              </a:rPr>
+              <a:t>계층</a:t>
+            </a:r>
+          </a:p>
+        </p:txBody>
+      </p:sp>
+      <p:sp>
+        <p:nvSpPr>
+          <p:cNvPr id="31" name="TextBox 30"/>
+          <p:cNvSpPr txBox="1"/>
+          <p:nvPr/>
+        </p:nvSpPr>
+        <p:spPr>
+          <a:xfrm>
+            <a:off x="3521756" y="4130600"/>
+            <a:ext cx="655105" cy="327305"/>
+          </a:xfrm>
+          <a:prstGeom prst="rect">
+            <a:avLst/>
+          </a:prstGeom>
+          <a:noFill/>
+        </p:spPr>
+        <p:txBody>
+          <a:bodyPr wrap="square" lIns="110780" tIns="55390" rIns="110780" bIns="55390" rtlCol="0">
+            <a:spAutoFit/>
+          </a:bodyPr>
+          <a:lstStyle/>
+          <a:p>
+            <a:pPr algn="ctr"/>
+            <a:r>
+              <a:rPr lang="en-US" altLang="ko-KR" sz="1400">
+                <a:latin typeface="나눔스퀘어 ExtraBold" pitchFamily="50" charset="-127"/>
+                <a:ea typeface="나눔스퀘어 ExtraBold" pitchFamily="50" charset="-127"/>
+              </a:rPr>
+              <a:t>2</a:t>
+            </a:r>
+            <a:r>
+              <a:rPr lang="ko-KR" altLang="en-US" sz="1400">
+                <a:latin typeface="나눔스퀘어 ExtraBold" pitchFamily="50" charset="-127"/>
+                <a:ea typeface="나눔스퀘어 ExtraBold" pitchFamily="50" charset="-127"/>
+              </a:rPr>
+              <a:t>계층</a:t>
+            </a:r>
+          </a:p>
+        </p:txBody>
+      </p:sp>
+      <p:sp>
+        <p:nvSpPr>
+          <p:cNvPr id="32" name="TextBox 31"/>
+          <p:cNvSpPr txBox="1"/>
+          <p:nvPr/>
+        </p:nvSpPr>
+        <p:spPr>
+          <a:xfrm>
+            <a:off x="3521756" y="4717409"/>
+            <a:ext cx="655105" cy="327305"/>
+          </a:xfrm>
+          <a:prstGeom prst="rect">
+            <a:avLst/>
+          </a:prstGeom>
+          <a:noFill/>
+        </p:spPr>
+        <p:txBody>
+          <a:bodyPr wrap="square" lIns="110780" tIns="55390" rIns="110780" bIns="55390" rtlCol="0">
+            <a:spAutoFit/>
+          </a:bodyPr>
+          <a:lstStyle/>
+          <a:p>
+            <a:pPr algn="ctr"/>
+            <a:r>
+              <a:rPr lang="en-US" altLang="ko-KR" sz="1400">
+                <a:latin typeface="나눔스퀘어 ExtraBold" pitchFamily="50" charset="-127"/>
+                <a:ea typeface="나눔스퀘어 ExtraBold" pitchFamily="50" charset="-127"/>
+              </a:rPr>
+              <a:t>1</a:t>
+            </a:r>
+            <a:r>
+              <a:rPr lang="ko-KR" altLang="en-US" sz="1400">
+                <a:latin typeface="나눔스퀘어 ExtraBold" pitchFamily="50" charset="-127"/>
+                <a:ea typeface="나눔스퀘어 ExtraBold" pitchFamily="50" charset="-127"/>
+              </a:rPr>
+              <a:t>계층</a:t>
+            </a:r>
+          </a:p>
+        </p:txBody>
+      </p:sp>
+      <p:sp>
+        <p:nvSpPr>
+          <p:cNvPr id="33" name="직사각형 32"/>
+          <p:cNvSpPr/>
+          <p:nvPr/>
+        </p:nvSpPr>
+        <p:spPr>
+          <a:xfrm>
+            <a:off x="7142012" y="1066801"/>
+            <a:ext cx="2642970" cy="1760428"/>
+          </a:xfrm>
+          <a:prstGeom prst="rect">
+            <a:avLst/>
+          </a:prstGeom>
+          <a:solidFill>
+            <a:srgbClr val="CF3531"/>
+          </a:solidFill>
+          <a:ln w="12700">
+            <a:solidFill>
+              <a:schemeClr val="tx1">
+                <a:lumMod val="65000"/>
+                <a:lumOff val="35000"/>
+              </a:schemeClr>
+            </a:solidFill>
+          </a:ln>
+        </p:spPr>
+        <p:style>
+          <a:lnRef idx="2">
+            <a:schemeClr val="accent1">
+              <a:shade val="50000"/>
+            </a:schemeClr>
+          </a:lnRef>
+          <a:fillRef idx="1">
+            <a:schemeClr val="accent1"/>
+          </a:fillRef>
+          <a:effectRef idx="0">
+            <a:schemeClr val="accent1"/>
+          </a:effectRef>
+          <a:fontRef idx="minor">
+            <a:schemeClr val="lt1"/>
+          </a:fontRef>
+        </p:style>
+        <p:txBody>
+          <a:bodyPr lIns="110780" tIns="55390" rIns="110780" bIns="55390" spcCol="0" rtlCol="0" anchor="ctr"/>
+          <a:lstStyle/>
+          <a:p>
+            <a:pPr algn="ctr"/>
+            <a:r>
+              <a:rPr lang="en-US" altLang="ko-KR" sz="1400">
+                <a:latin typeface="나눔스퀘어 ExtraBold" pitchFamily="50" charset="-127"/>
+                <a:ea typeface="나눔스퀘어 ExtraBold" pitchFamily="50" charset="-127"/>
+              </a:rPr>
+              <a:t>Applcation Layer</a:t>
+            </a:r>
+            <a:endParaRPr lang="ko-KR" altLang="en-US" sz="1400">
+              <a:latin typeface="나눔스퀘어 ExtraBold" pitchFamily="50" charset="-127"/>
+              <a:ea typeface="나눔스퀘어 ExtraBold" pitchFamily="50" charset="-127"/>
+            </a:endParaRPr>
+          </a:p>
+        </p:txBody>
+      </p:sp>
+      <p:sp>
+        <p:nvSpPr>
+          <p:cNvPr id="34" name="직사각형 33"/>
+          <p:cNvSpPr/>
+          <p:nvPr/>
+        </p:nvSpPr>
+        <p:spPr>
+          <a:xfrm>
+            <a:off x="7142011" y="2827230"/>
+            <a:ext cx="2642970" cy="586809"/>
+          </a:xfrm>
+          <a:prstGeom prst="rect">
+            <a:avLst/>
+          </a:prstGeom>
+          <a:solidFill>
+            <a:srgbClr val="10A021"/>
+          </a:solidFill>
+          <a:ln w="12700">
+            <a:solidFill>
+              <a:schemeClr val="tx1">
+                <a:lumMod val="65000"/>
+                <a:lumOff val="35000"/>
+              </a:schemeClr>
+            </a:solidFill>
+          </a:ln>
+        </p:spPr>
+        <p:style>
+          <a:lnRef idx="2">
+            <a:schemeClr val="accent1">
+              <a:shade val="50000"/>
+            </a:schemeClr>
+          </a:lnRef>
+          <a:fillRef idx="1">
+            <a:schemeClr val="accent1"/>
+          </a:fillRef>
+          <a:effectRef idx="0">
+            <a:schemeClr val="accent1"/>
+          </a:effectRef>
+          <a:fontRef idx="minor">
+            <a:schemeClr val="lt1"/>
+          </a:fontRef>
+        </p:style>
+        <p:txBody>
+          <a:bodyPr lIns="110780" tIns="55390" rIns="110780" bIns="55390" spcCol="0" rtlCol="0" anchor="ctr"/>
+          <a:lstStyle/>
+          <a:p>
+            <a:pPr algn="ctr"/>
+            <a:r>
+              <a:rPr lang="en-US" altLang="ko-KR" sz="1400">
+                <a:latin typeface="나눔스퀘어 ExtraBold" pitchFamily="50" charset="-127"/>
+                <a:ea typeface="나눔스퀘어 ExtraBold" pitchFamily="50" charset="-127"/>
+              </a:rPr>
+              <a:t>Transport Layer</a:t>
+            </a:r>
+          </a:p>
+          <a:p>
+            <a:pPr algn="ctr"/>
+            <a:r>
+              <a:rPr lang="en-US" altLang="ko-KR" sz="1400">
+                <a:latin typeface="나눔스퀘어 ExtraBold" pitchFamily="50" charset="-127"/>
+                <a:ea typeface="나눔스퀘어 ExtraBold" pitchFamily="50" charset="-127"/>
+              </a:rPr>
+              <a:t>(Host-to-Host)</a:t>
+            </a:r>
+            <a:endParaRPr lang="ko-KR" altLang="en-US" sz="1400">
+              <a:latin typeface="나눔스퀘어 ExtraBold" pitchFamily="50" charset="-127"/>
+              <a:ea typeface="나눔스퀘어 ExtraBold" pitchFamily="50" charset="-127"/>
+            </a:endParaRPr>
+          </a:p>
+        </p:txBody>
+      </p:sp>
+      <p:sp>
+        <p:nvSpPr>
+          <p:cNvPr id="35" name="직사각형 34"/>
+          <p:cNvSpPr/>
+          <p:nvPr/>
+        </p:nvSpPr>
+        <p:spPr>
+          <a:xfrm>
+            <a:off x="7142012" y="3414039"/>
+            <a:ext cx="2642970" cy="586809"/>
+          </a:xfrm>
+          <a:prstGeom prst="rect">
+            <a:avLst/>
+          </a:prstGeom>
+          <a:ln w="12700">
+            <a:solidFill>
+              <a:schemeClr val="tx1">
+                <a:lumMod val="65000"/>
+                <a:lumOff val="35000"/>
+              </a:schemeClr>
+            </a:solidFill>
+          </a:ln>
+        </p:spPr>
+        <p:style>
+          <a:lnRef idx="2">
+            <a:schemeClr val="accent1">
+              <a:shade val="50000"/>
+            </a:schemeClr>
+          </a:lnRef>
+          <a:fillRef idx="1">
+            <a:schemeClr val="accent1"/>
+          </a:fillRef>
+          <a:effectRef idx="0">
+            <a:schemeClr val="accent1"/>
+          </a:effectRef>
+          <a:fontRef idx="minor">
+            <a:schemeClr val="lt1"/>
+          </a:fontRef>
+        </p:style>
+        <p:txBody>
+          <a:bodyPr lIns="110780" tIns="55390" rIns="110780" bIns="55390" spcCol="0" rtlCol="0" anchor="ctr"/>
+          <a:lstStyle/>
+          <a:p>
+            <a:pPr algn="ctr"/>
+            <a:r>
+              <a:rPr lang="en-US" altLang="ko-KR" sz="1400">
+                <a:latin typeface="나눔스퀘어 ExtraBold" pitchFamily="50" charset="-127"/>
+                <a:ea typeface="나눔스퀘어 ExtraBold" pitchFamily="50" charset="-127"/>
+              </a:rPr>
+              <a:t>Network Layer</a:t>
+            </a:r>
+          </a:p>
+          <a:p>
+            <a:pPr algn="ctr"/>
+            <a:r>
+              <a:rPr lang="en-US" altLang="ko-KR" sz="1400">
+                <a:latin typeface="나눔스퀘어 ExtraBold" pitchFamily="50" charset="-127"/>
+                <a:ea typeface="나눔스퀘어 ExtraBold" pitchFamily="50" charset="-127"/>
+              </a:rPr>
+              <a:t>(Internet)</a:t>
+            </a:r>
+            <a:endParaRPr lang="ko-KR" altLang="en-US" sz="1400">
+              <a:latin typeface="나눔스퀘어 ExtraBold" pitchFamily="50" charset="-127"/>
+              <a:ea typeface="나눔스퀘어 ExtraBold" pitchFamily="50" charset="-127"/>
+            </a:endParaRPr>
+          </a:p>
+        </p:txBody>
+      </p:sp>
+      <p:sp>
+        <p:nvSpPr>
+          <p:cNvPr id="36" name="직사각형 35"/>
+          <p:cNvSpPr/>
+          <p:nvPr/>
+        </p:nvSpPr>
+        <p:spPr>
+          <a:xfrm>
+            <a:off x="7142009" y="4000847"/>
+            <a:ext cx="2642970" cy="1173618"/>
+          </a:xfrm>
+          <a:prstGeom prst="rect">
+            <a:avLst/>
+          </a:prstGeom>
+          <a:solidFill>
+            <a:srgbClr val="00487E"/>
+          </a:solidFill>
+          <a:ln w="12700">
+            <a:solidFill>
+              <a:schemeClr val="tx1">
+                <a:lumMod val="65000"/>
+                <a:lumOff val="35000"/>
+              </a:schemeClr>
+            </a:solidFill>
+          </a:ln>
+        </p:spPr>
+        <p:style>
+          <a:lnRef idx="2">
+            <a:schemeClr val="accent1">
+              <a:shade val="50000"/>
+            </a:schemeClr>
+          </a:lnRef>
+          <a:fillRef idx="1">
+            <a:schemeClr val="accent1"/>
+          </a:fillRef>
+          <a:effectRef idx="0">
+            <a:schemeClr val="accent1"/>
+          </a:effectRef>
+          <a:fontRef idx="minor">
+            <a:schemeClr val="lt1"/>
+          </a:fontRef>
+        </p:style>
+        <p:txBody>
+          <a:bodyPr lIns="110780" tIns="55390" rIns="110780" bIns="55390" spcCol="0" rtlCol="0" anchor="ctr"/>
+          <a:lstStyle/>
+          <a:p>
+            <a:pPr algn="ctr"/>
+            <a:r>
+              <a:rPr lang="en-US" altLang="ko-KR" sz="1400">
+                <a:latin typeface="나눔스퀘어 ExtraBold" pitchFamily="50" charset="-127"/>
+                <a:ea typeface="나눔스퀘어 ExtraBold" pitchFamily="50" charset="-127"/>
+              </a:rPr>
+              <a:t>Access Layer</a:t>
+            </a:r>
+          </a:p>
+          <a:p>
+            <a:pPr algn="ctr"/>
+            <a:r>
+              <a:rPr lang="en-US" altLang="ko-KR" sz="1400">
+                <a:latin typeface="나눔스퀘어 ExtraBold" pitchFamily="50" charset="-127"/>
+                <a:ea typeface="나눔스퀘어 ExtraBold" pitchFamily="50" charset="-127"/>
+              </a:rPr>
+              <a:t>(Network Access)</a:t>
+            </a:r>
+            <a:endParaRPr lang="ko-KR" altLang="en-US" sz="1400">
+              <a:latin typeface="나눔스퀘어 ExtraBold" pitchFamily="50" charset="-127"/>
+              <a:ea typeface="나눔스퀘어 ExtraBold" pitchFamily="50" charset="-127"/>
+            </a:endParaRPr>
+          </a:p>
+        </p:txBody>
+      </p:sp>
+      <p:cxnSp>
+        <p:nvCxnSpPr>
+          <p:cNvPr id="37" name="직선 연결선 36"/>
+          <p:cNvCxnSpPr/>
+          <p:nvPr/>
+        </p:nvCxnSpPr>
+        <p:spPr>
+          <a:xfrm flipH="1">
+            <a:off x="1885425" y="2827230"/>
+            <a:ext cx="8103060" cy="0"/>
+          </a:xfrm>
+          <a:prstGeom prst="line">
+            <a:avLst/>
+          </a:prstGeom>
+          <a:ln w="28575">
+            <a:solidFill>
+              <a:schemeClr val="tx1">
+                <a:lumMod val="75000"/>
+                <a:lumOff val="25000"/>
+              </a:schemeClr>
+            </a:solidFill>
+            <a:prstDash val="sysDash"/>
+          </a:ln>
+        </p:spPr>
+        <p:style>
+          <a:lnRef idx="1">
+            <a:schemeClr val="accent1"/>
+          </a:lnRef>
+          <a:fillRef idx="0">
+            <a:schemeClr val="accent1"/>
+          </a:fillRef>
+          <a:effectRef idx="0">
+            <a:schemeClr val="accent1"/>
+          </a:effectRef>
+          <a:fontRef idx="minor">
+            <a:schemeClr val="tx1"/>
+          </a:fontRef>
+        </p:style>
+      </p:cxnSp>
+      <p:cxnSp>
+        <p:nvCxnSpPr>
+          <p:cNvPr id="40" name="직선 연결선 39"/>
+          <p:cNvCxnSpPr/>
+          <p:nvPr/>
+        </p:nvCxnSpPr>
+        <p:spPr>
+          <a:xfrm flipH="1">
+            <a:off x="1885425" y="4005183"/>
+            <a:ext cx="8103060" cy="0"/>
+          </a:xfrm>
+          <a:prstGeom prst="line">
+            <a:avLst/>
+          </a:prstGeom>
+          <a:ln w="28575">
+            <a:solidFill>
+              <a:schemeClr val="tx1">
+                <a:lumMod val="75000"/>
+                <a:lumOff val="25000"/>
+              </a:schemeClr>
+            </a:solidFill>
+            <a:prstDash val="sysDash"/>
+          </a:ln>
+        </p:spPr>
+        <p:style>
+          <a:lnRef idx="1">
+            <a:schemeClr val="accent1"/>
+          </a:lnRef>
+          <a:fillRef idx="0">
+            <a:schemeClr val="accent1"/>
+          </a:fillRef>
+          <a:effectRef idx="0">
+            <a:schemeClr val="accent1"/>
+          </a:effectRef>
+          <a:fontRef idx="minor">
+            <a:schemeClr val="tx1"/>
+          </a:fontRef>
+        </p:style>
+      </p:cxnSp>
+      <p:sp>
+        <p:nvSpPr>
+          <p:cNvPr id="38" name="TextBox 37"/>
+          <p:cNvSpPr txBox="1"/>
+          <p:nvPr/>
+        </p:nvSpPr>
+        <p:spPr>
+          <a:xfrm>
+            <a:off x="2313579" y="1762348"/>
+            <a:ext cx="1071194" cy="369332"/>
+          </a:xfrm>
+          <a:prstGeom prst="rect">
+            <a:avLst/>
+          </a:prstGeom>
+          <a:noFill/>
+        </p:spPr>
+        <p:txBody>
+          <a:bodyPr wrap="square" rtlCol="0">
+            <a:spAutoFit/>
+          </a:bodyPr>
+          <a:lstStyle/>
+          <a:p>
+            <a:pPr algn="ctr"/>
+            <a:r>
+              <a:rPr lang="en-US" altLang="ko-KR" sz="1800" smtClean="0">
+                <a:latin typeface="나눔스퀘어 ExtraBold" pitchFamily="50" charset="-127"/>
+                <a:ea typeface="나눔스퀘어 ExtraBold" pitchFamily="50" charset="-127"/>
+              </a:rPr>
+              <a:t>User</a:t>
+            </a:r>
+            <a:endParaRPr lang="ko-KR" altLang="en-US" sz="1800">
+              <a:latin typeface="나눔스퀘어 ExtraBold" pitchFamily="50" charset="-127"/>
+              <a:ea typeface="나눔스퀘어 ExtraBold" pitchFamily="50" charset="-127"/>
+            </a:endParaRPr>
+          </a:p>
+        </p:txBody>
+      </p:sp>
+      <p:sp>
+        <p:nvSpPr>
+          <p:cNvPr id="42" name="TextBox 41"/>
+          <p:cNvSpPr txBox="1"/>
+          <p:nvPr/>
+        </p:nvSpPr>
+        <p:spPr>
+          <a:xfrm>
+            <a:off x="2313579" y="3229373"/>
+            <a:ext cx="1071194" cy="369332"/>
+          </a:xfrm>
+          <a:prstGeom prst="rect">
+            <a:avLst/>
+          </a:prstGeom>
+          <a:noFill/>
+        </p:spPr>
+        <p:txBody>
+          <a:bodyPr wrap="square" rtlCol="0">
+            <a:spAutoFit/>
+          </a:bodyPr>
+          <a:lstStyle/>
+          <a:p>
+            <a:pPr algn="ctr"/>
+            <a:r>
+              <a:rPr lang="en-US" altLang="ko-KR" sz="1800" smtClean="0">
+                <a:latin typeface="나눔스퀘어 ExtraBold" pitchFamily="50" charset="-127"/>
+                <a:ea typeface="나눔스퀘어 ExtraBold" pitchFamily="50" charset="-127"/>
+              </a:rPr>
+              <a:t>Kernel</a:t>
+            </a:r>
+            <a:endParaRPr lang="ko-KR" altLang="en-US" sz="1800">
+              <a:latin typeface="나눔스퀘어 ExtraBold" pitchFamily="50" charset="-127"/>
+              <a:ea typeface="나눔스퀘어 ExtraBold" pitchFamily="50" charset="-127"/>
+            </a:endParaRPr>
+          </a:p>
+        </p:txBody>
+      </p:sp>
+      <p:sp>
+        <p:nvSpPr>
+          <p:cNvPr id="44" name="TextBox 43"/>
+          <p:cNvSpPr txBox="1"/>
+          <p:nvPr/>
+        </p:nvSpPr>
+        <p:spPr>
+          <a:xfrm>
+            <a:off x="2313579" y="4402992"/>
+            <a:ext cx="1071194" cy="369332"/>
+          </a:xfrm>
+          <a:prstGeom prst="rect">
+            <a:avLst/>
+          </a:prstGeom>
+          <a:noFill/>
+        </p:spPr>
+        <p:txBody>
+          <a:bodyPr wrap="square" rtlCol="0">
+            <a:spAutoFit/>
+          </a:bodyPr>
+          <a:lstStyle/>
+          <a:p>
+            <a:pPr algn="ctr"/>
+            <a:r>
+              <a:rPr lang="en-US" altLang="ko-KR" sz="1800" smtClean="0">
+                <a:latin typeface="나눔스퀘어 ExtraBold" pitchFamily="50" charset="-127"/>
+                <a:ea typeface="나눔스퀘어 ExtraBold" pitchFamily="50" charset="-127"/>
+              </a:rPr>
+              <a:t>H/W</a:t>
+            </a:r>
+            <a:endParaRPr lang="ko-KR" altLang="en-US" sz="1800">
+              <a:latin typeface="나눔스퀘어 ExtraBold" pitchFamily="50" charset="-127"/>
+              <a:ea typeface="나눔스퀘어 ExtraBold" pitchFamily="50" charset="-127"/>
+            </a:endParaRPr>
+          </a:p>
+        </p:txBody>
+      </p:sp>
+      <p:cxnSp>
+        <p:nvCxnSpPr>
+          <p:cNvPr id="1032" name="직선 연결선 1031"/>
+          <p:cNvCxnSpPr/>
+          <p:nvPr/>
+        </p:nvCxnSpPr>
+        <p:spPr>
+          <a:xfrm>
+            <a:off x="1456347" y="1066801"/>
+            <a:ext cx="216403" cy="0"/>
+          </a:xfrm>
+          <a:prstGeom prst="line">
+            <a:avLst/>
+          </a:prstGeom>
+          <a:ln w="19050">
+            <a:solidFill>
+              <a:schemeClr val="tx1">
+                <a:lumMod val="65000"/>
+                <a:lumOff val="35000"/>
+              </a:schemeClr>
+            </a:solidFill>
+          </a:ln>
+        </p:spPr>
+        <p:style>
+          <a:lnRef idx="1">
+            <a:schemeClr val="accent1"/>
+          </a:lnRef>
+          <a:fillRef idx="0">
+            <a:schemeClr val="accent1"/>
+          </a:fillRef>
+          <a:effectRef idx="0">
+            <a:schemeClr val="accent1"/>
+          </a:effectRef>
+          <a:fontRef idx="minor">
+            <a:schemeClr val="tx1"/>
+          </a:fontRef>
+        </p:style>
+      </p:cxnSp>
+      <p:cxnSp>
+        <p:nvCxnSpPr>
+          <p:cNvPr id="73" name="직선 연결선 72"/>
+          <p:cNvCxnSpPr/>
+          <p:nvPr/>
+        </p:nvCxnSpPr>
+        <p:spPr>
+          <a:xfrm>
+            <a:off x="1456347" y="4010240"/>
+            <a:ext cx="216403" cy="0"/>
+          </a:xfrm>
+          <a:prstGeom prst="line">
+            <a:avLst/>
+          </a:prstGeom>
+          <a:ln w="19050">
+            <a:solidFill>
+              <a:schemeClr val="tx1">
+                <a:lumMod val="65000"/>
+                <a:lumOff val="35000"/>
+              </a:schemeClr>
+            </a:solidFill>
+          </a:ln>
+        </p:spPr>
+        <p:style>
+          <a:lnRef idx="1">
+            <a:schemeClr val="accent1"/>
+          </a:lnRef>
+          <a:fillRef idx="0">
+            <a:schemeClr val="accent1"/>
+          </a:fillRef>
+          <a:effectRef idx="0">
+            <a:schemeClr val="accent1"/>
+          </a:effectRef>
+          <a:fontRef idx="minor">
+            <a:schemeClr val="tx1"/>
+          </a:fontRef>
+        </p:style>
+      </p:cxnSp>
+      <p:cxnSp>
+        <p:nvCxnSpPr>
+          <p:cNvPr id="1034" name="직선 연결선 1033"/>
+          <p:cNvCxnSpPr>
+            <a:endCxn id="57" idx="0"/>
+          </p:cNvCxnSpPr>
+          <p:nvPr/>
+        </p:nvCxnSpPr>
+        <p:spPr>
+          <a:xfrm flipH="1">
+            <a:off x="1558767" y="1066803"/>
+            <a:ext cx="5781" cy="1296186"/>
+          </a:xfrm>
+          <a:prstGeom prst="line">
+            <a:avLst/>
+          </a:prstGeom>
+          <a:ln w="19050">
+            <a:solidFill>
+              <a:schemeClr val="tx1">
+                <a:lumMod val="65000"/>
+                <a:lumOff val="35000"/>
+              </a:schemeClr>
+            </a:solidFill>
+          </a:ln>
+        </p:spPr>
+        <p:style>
+          <a:lnRef idx="1">
+            <a:schemeClr val="accent1"/>
+          </a:lnRef>
+          <a:fillRef idx="0">
+            <a:schemeClr val="accent1"/>
+          </a:fillRef>
+          <a:effectRef idx="0">
+            <a:schemeClr val="accent1"/>
+          </a:effectRef>
+          <a:fontRef idx="minor">
+            <a:schemeClr val="tx1"/>
+          </a:fontRef>
+        </p:style>
+      </p:cxnSp>
+      <p:sp>
+        <p:nvSpPr>
+          <p:cNvPr id="57" name="TextBox 56"/>
+          <p:cNvSpPr txBox="1"/>
+          <p:nvPr/>
+        </p:nvSpPr>
+        <p:spPr>
+          <a:xfrm>
+            <a:off x="1226203" y="2362989"/>
+            <a:ext cx="665128" cy="369332"/>
+          </a:xfrm>
+          <a:prstGeom prst="rect">
+            <a:avLst/>
+          </a:prstGeom>
+          <a:noFill/>
+        </p:spPr>
+        <p:txBody>
+          <a:bodyPr wrap="square" rtlCol="0" anchor="ctr">
+            <a:spAutoFit/>
+          </a:bodyPr>
+          <a:lstStyle/>
+          <a:p>
+            <a:pPr algn="ctr"/>
+            <a:r>
+              <a:rPr lang="en-US" altLang="ko-KR" sz="1800" smtClean="0">
+                <a:latin typeface="나눔스퀘어 ExtraBold" pitchFamily="50" charset="-127"/>
+                <a:ea typeface="나눔스퀘어 ExtraBold" pitchFamily="50" charset="-127"/>
+              </a:rPr>
+              <a:t>S/W</a:t>
+            </a:r>
+            <a:endParaRPr lang="ko-KR" altLang="en-US" sz="1800">
+              <a:latin typeface="나눔스퀘어 ExtraBold" pitchFamily="50" charset="-127"/>
+              <a:ea typeface="나눔스퀘어 ExtraBold" pitchFamily="50" charset="-127"/>
+            </a:endParaRPr>
+          </a:p>
+        </p:txBody>
+      </p:sp>
+      <p:cxnSp>
+        <p:nvCxnSpPr>
+          <p:cNvPr id="1037" name="직선 연결선 1036"/>
+          <p:cNvCxnSpPr>
+            <a:stCxn id="57" idx="2"/>
+          </p:cNvCxnSpPr>
+          <p:nvPr/>
+        </p:nvCxnSpPr>
+        <p:spPr>
+          <a:xfrm>
+            <a:off x="1558767" y="2732321"/>
+            <a:ext cx="5781" cy="1268526"/>
+          </a:xfrm>
+          <a:prstGeom prst="line">
+            <a:avLst/>
+          </a:prstGeom>
+          <a:ln w="19050">
+            <a:solidFill>
+              <a:schemeClr val="tx1">
+                <a:lumMod val="65000"/>
+                <a:lumOff val="35000"/>
+              </a:schemeClr>
+            </a:solidFill>
+          </a:ln>
+        </p:spPr>
+        <p:style>
+          <a:lnRef idx="1">
+            <a:schemeClr val="accent1"/>
+          </a:lnRef>
+          <a:fillRef idx="0">
+            <a:schemeClr val="accent1"/>
+          </a:fillRef>
+          <a:effectRef idx="0">
+            <a:schemeClr val="accent1"/>
+          </a:effectRef>
+          <a:fontRef idx="minor">
+            <a:schemeClr val="tx1"/>
+          </a:fontRef>
+        </p:style>
+      </p:cxnSp>
+      <p:sp>
+        <p:nvSpPr>
+          <p:cNvPr id="79" name="TextBox 78"/>
+          <p:cNvSpPr txBox="1"/>
+          <p:nvPr/>
+        </p:nvSpPr>
+        <p:spPr>
+          <a:xfrm>
+            <a:off x="4306083" y="693179"/>
+            <a:ext cx="1897684" cy="369332"/>
+          </a:xfrm>
+          <a:prstGeom prst="rect">
+            <a:avLst/>
+          </a:prstGeom>
+          <a:noFill/>
+        </p:spPr>
+        <p:txBody>
+          <a:bodyPr wrap="square" rtlCol="0">
+            <a:spAutoFit/>
+          </a:bodyPr>
+          <a:lstStyle/>
+          <a:p>
+            <a:pPr algn="ctr"/>
+            <a:r>
+              <a:rPr lang="en-US" altLang="ko-KR" sz="1800" smtClean="0">
+                <a:latin typeface="나눔스퀘어 ExtraBold" pitchFamily="50" charset="-127"/>
+                <a:ea typeface="나눔스퀘어 ExtraBold" pitchFamily="50" charset="-127"/>
+              </a:rPr>
+              <a:t>OSI 7</a:t>
+            </a:r>
+            <a:r>
+              <a:rPr lang="ko-KR" altLang="en-US" sz="1800" smtClean="0">
+                <a:latin typeface="나눔스퀘어 ExtraBold" pitchFamily="50" charset="-127"/>
+                <a:ea typeface="나눔스퀘어 ExtraBold" pitchFamily="50" charset="-127"/>
+              </a:rPr>
+              <a:t>계층 모델</a:t>
+            </a:r>
+            <a:endParaRPr lang="ko-KR" altLang="en-US" sz="1800">
+              <a:latin typeface="나눔스퀘어 ExtraBold" pitchFamily="50" charset="-127"/>
+              <a:ea typeface="나눔스퀘어 ExtraBold" pitchFamily="50" charset="-127"/>
+            </a:endParaRPr>
+          </a:p>
+        </p:txBody>
+      </p:sp>
+      <p:sp>
+        <p:nvSpPr>
+          <p:cNvPr id="80" name="TextBox 79"/>
+          <p:cNvSpPr txBox="1"/>
+          <p:nvPr/>
+        </p:nvSpPr>
+        <p:spPr>
+          <a:xfrm>
+            <a:off x="7514655" y="693179"/>
+            <a:ext cx="1897684" cy="369332"/>
+          </a:xfrm>
+          <a:prstGeom prst="rect">
+            <a:avLst/>
+          </a:prstGeom>
+          <a:noFill/>
+        </p:spPr>
+        <p:txBody>
+          <a:bodyPr wrap="square" rtlCol="0">
+            <a:spAutoFit/>
+          </a:bodyPr>
+          <a:lstStyle/>
+          <a:p>
+            <a:pPr algn="ctr"/>
+            <a:r>
+              <a:rPr lang="en-US" altLang="ko-KR" sz="1800" smtClean="0">
+                <a:latin typeface="나눔스퀘어 ExtraBold" pitchFamily="50" charset="-127"/>
+                <a:ea typeface="나눔스퀘어 ExtraBold" pitchFamily="50" charset="-127"/>
+              </a:rPr>
+              <a:t>DoD </a:t>
+            </a:r>
+            <a:r>
+              <a:rPr lang="ko-KR" altLang="en-US" sz="1800" smtClean="0">
+                <a:latin typeface="나눔스퀘어 ExtraBold" pitchFamily="50" charset="-127"/>
+                <a:ea typeface="나눔스퀘어 ExtraBold" pitchFamily="50" charset="-127"/>
+              </a:rPr>
+              <a:t>모델</a:t>
+            </a:r>
+            <a:endParaRPr lang="ko-KR" altLang="en-US" sz="1800">
+              <a:latin typeface="나눔스퀘어 ExtraBold" pitchFamily="50" charset="-127"/>
+              <a:ea typeface="나눔스퀘어 ExtraBold" pitchFamily="50" charset="-127"/>
+            </a:endParaRPr>
+          </a:p>
+        </p:txBody>
+      </p:sp>
+    </p:spTree>
+    <p:extLst>
+      <p:ext uri="{BB962C8B-B14F-4D97-AF65-F5344CB8AC3E}">
+        <p14:creationId xmlns:p14="http://schemas.microsoft.com/office/powerpoint/2010/main" val="1584995958"/>
       </p:ext>
     </p:extLst>
   </p:cSld>

</xml_diff>

<commit_message>
update css - image border - header1 fontweight - dark theme main-inner-bg - light theme content-hr-image-bg-color
update post
- finish packet sniffing ch1

new post
- packet sniffing ch2

new vscode workspace setting
- markdown snippet
- quick suggetion
</commit_message>
<xml_diff>
--- a/assets/etc/이미지제작용.pptx
+++ b/assets/etc/이미지제작용.pptx
@@ -7,6 +7,7 @@
   <p:sldIdLst>
     <p:sldId id="256" r:id="rId2"/>
     <p:sldId id="257" r:id="rId3"/>
+    <p:sldId id="258" r:id="rId4"/>
   </p:sldIdLst>
   <p:sldSz cx="11522075" cy="6480175"/>
   <p:notesSz cx="6858000" cy="9144000"/>
@@ -289,7 +290,7 @@
           <a:p>
             <a:fld id="{10B01263-E573-4C51-9265-094B7818CB45}" type="datetimeFigureOut">
               <a:rPr lang="ko-KR" altLang="en-US" smtClean="0"/>
-              <a:t>2024-02-15</a:t>
+              <a:t>2024-02-16</a:t>
             </a:fld>
             <a:endParaRPr lang="ko-KR" altLang="en-US"/>
           </a:p>
@@ -459,7 +460,7 @@
           <a:p>
             <a:fld id="{10B01263-E573-4C51-9265-094B7818CB45}" type="datetimeFigureOut">
               <a:rPr lang="ko-KR" altLang="en-US" smtClean="0"/>
-              <a:t>2024-02-15</a:t>
+              <a:t>2024-02-16</a:t>
             </a:fld>
             <a:endParaRPr lang="ko-KR" altLang="en-US"/>
           </a:p>
@@ -639,7 +640,7 @@
           <a:p>
             <a:fld id="{10B01263-E573-4C51-9265-094B7818CB45}" type="datetimeFigureOut">
               <a:rPr lang="ko-KR" altLang="en-US" smtClean="0"/>
-              <a:t>2024-02-15</a:t>
+              <a:t>2024-02-16</a:t>
             </a:fld>
             <a:endParaRPr lang="ko-KR" altLang="en-US"/>
           </a:p>
@@ -809,7 +810,7 @@
           <a:p>
             <a:fld id="{10B01263-E573-4C51-9265-094B7818CB45}" type="datetimeFigureOut">
               <a:rPr lang="ko-KR" altLang="en-US" smtClean="0"/>
-              <a:t>2024-02-15</a:t>
+              <a:t>2024-02-16</a:t>
             </a:fld>
             <a:endParaRPr lang="ko-KR" altLang="en-US"/>
           </a:p>
@@ -1055,7 +1056,7 @@
           <a:p>
             <a:fld id="{10B01263-E573-4C51-9265-094B7818CB45}" type="datetimeFigureOut">
               <a:rPr lang="ko-KR" altLang="en-US" smtClean="0"/>
-              <a:t>2024-02-15</a:t>
+              <a:t>2024-02-16</a:t>
             </a:fld>
             <a:endParaRPr lang="ko-KR" altLang="en-US"/>
           </a:p>
@@ -1343,7 +1344,7 @@
           <a:p>
             <a:fld id="{10B01263-E573-4C51-9265-094B7818CB45}" type="datetimeFigureOut">
               <a:rPr lang="ko-KR" altLang="en-US" smtClean="0"/>
-              <a:t>2024-02-15</a:t>
+              <a:t>2024-02-16</a:t>
             </a:fld>
             <a:endParaRPr lang="ko-KR" altLang="en-US"/>
           </a:p>
@@ -1765,7 +1766,7 @@
           <a:p>
             <a:fld id="{10B01263-E573-4C51-9265-094B7818CB45}" type="datetimeFigureOut">
               <a:rPr lang="ko-KR" altLang="en-US" smtClean="0"/>
-              <a:t>2024-02-15</a:t>
+              <a:t>2024-02-16</a:t>
             </a:fld>
             <a:endParaRPr lang="ko-KR" altLang="en-US"/>
           </a:p>
@@ -1883,7 +1884,7 @@
           <a:p>
             <a:fld id="{10B01263-E573-4C51-9265-094B7818CB45}" type="datetimeFigureOut">
               <a:rPr lang="ko-KR" altLang="en-US" smtClean="0"/>
-              <a:t>2024-02-15</a:t>
+              <a:t>2024-02-16</a:t>
             </a:fld>
             <a:endParaRPr lang="ko-KR" altLang="en-US"/>
           </a:p>
@@ -1978,7 +1979,7 @@
           <a:p>
             <a:fld id="{10B01263-E573-4C51-9265-094B7818CB45}" type="datetimeFigureOut">
               <a:rPr lang="ko-KR" altLang="en-US" smtClean="0"/>
-              <a:t>2024-02-15</a:t>
+              <a:t>2024-02-16</a:t>
             </a:fld>
             <a:endParaRPr lang="ko-KR" altLang="en-US"/>
           </a:p>
@@ -2255,7 +2256,7 @@
           <a:p>
             <a:fld id="{10B01263-E573-4C51-9265-094B7818CB45}" type="datetimeFigureOut">
               <a:rPr lang="ko-KR" altLang="en-US" smtClean="0"/>
-              <a:t>2024-02-15</a:t>
+              <a:t>2024-02-16</a:t>
             </a:fld>
             <a:endParaRPr lang="ko-KR" altLang="en-US"/>
           </a:p>
@@ -2508,7 +2509,7 @@
           <a:p>
             <a:fld id="{10B01263-E573-4C51-9265-094B7818CB45}" type="datetimeFigureOut">
               <a:rPr lang="ko-KR" altLang="en-US" smtClean="0"/>
-              <a:t>2024-02-15</a:t>
+              <a:t>2024-02-16</a:t>
             </a:fld>
             <a:endParaRPr lang="ko-KR" altLang="en-US"/>
           </a:p>
@@ -2721,7 +2722,7 @@
           <a:p>
             <a:fld id="{10B01263-E573-4C51-9265-094B7818CB45}" type="datetimeFigureOut">
               <a:rPr lang="ko-KR" altLang="en-US" smtClean="0"/>
-              <a:t>2024-02-15</a:t>
+              <a:t>2024-02-16</a:t>
             </a:fld>
             <a:endParaRPr lang="ko-KR" altLang="en-US"/>
           </a:p>
@@ -3100,7 +3101,7 @@
         <p:nvPicPr>
           <p:cNvPr id="1026" name="Picture 2" descr="C:\Users\momo1\Downloads\key.png"/>
           <p:cNvPicPr>
-            <a:picLocks noChangeAspect="1" noChangeArrowheads="1"/>
+            <a:picLocks noChangeArrowheads="1"/>
           </p:cNvPicPr>
           <p:nvPr/>
         </p:nvPicPr>
@@ -3119,8 +3120,8 @@
         </p:blipFill>
         <p:spPr bwMode="auto">
           <a:xfrm>
-            <a:off x="4605486" y="889152"/>
-            <a:ext cx="1246287" cy="951114"/>
+            <a:off x="4778630" y="977207"/>
+            <a:ext cx="900000" cy="900000"/>
           </a:xfrm>
           <a:prstGeom prst="rect">
             <a:avLst/>
@@ -3166,10 +3167,6 @@
               </a:rPr>
               <a:t>안녕하세요</a:t>
             </a:r>
-            <a:endParaRPr lang="ko-KR" altLang="en-US" sz="4400">
-              <a:latin typeface="나눔스퀘어 ExtraBold" pitchFamily="50" charset="-127"/>
-              <a:ea typeface="나눔스퀘어 ExtraBold" pitchFamily="50" charset="-127"/>
-            </a:endParaRPr>
           </a:p>
         </p:txBody>
       </p:sp>
@@ -3291,7 +3288,7 @@
         <p:nvPicPr>
           <p:cNvPr id="9" name="Picture 2" descr="C:\Users\momo1\Downloads\key.png"/>
           <p:cNvPicPr>
-            <a:picLocks noChangeAspect="1" noChangeArrowheads="1"/>
+            <a:picLocks noChangeArrowheads="1"/>
           </p:cNvPicPr>
           <p:nvPr/>
         </p:nvPicPr>
@@ -3310,8 +3307,8 @@
         </p:blipFill>
         <p:spPr bwMode="auto">
           <a:xfrm flipH="1">
-            <a:off x="4605486" y="2967924"/>
-            <a:ext cx="1246287" cy="951114"/>
+            <a:off x="4778630" y="3055979"/>
+            <a:ext cx="900000" cy="900000"/>
           </a:xfrm>
           <a:prstGeom prst="rect">
             <a:avLst/>
@@ -3357,10 +3354,6 @@
               </a:rPr>
               <a:t>안녕하세요</a:t>
             </a:r>
-            <a:endParaRPr lang="ko-KR" altLang="en-US" sz="4400">
-              <a:latin typeface="나눔스퀘어 ExtraBold" pitchFamily="50" charset="-127"/>
-              <a:ea typeface="나눔스퀘어 ExtraBold" pitchFamily="50" charset="-127"/>
-            </a:endParaRPr>
           </a:p>
         </p:txBody>
       </p:sp>
@@ -5481,6 +5474,2145 @@
     <p:extLst>
       <p:ext uri="{BB962C8B-B14F-4D97-AF65-F5344CB8AC3E}">
         <p14:creationId xmlns:p14="http://schemas.microsoft.com/office/powerpoint/2010/main" val="1584995958"/>
+      </p:ext>
+    </p:extLst>
+  </p:cSld>
+  <p:clrMapOvr>
+    <a:masterClrMapping/>
+  </p:clrMapOvr>
+</p:sld>
+</file>
+
+<file path=ppt/slides/slide3.xml><?xml version="1.0" encoding="utf-8"?>
+<p:sld xmlns:a="http://schemas.openxmlformats.org/drawingml/2006/main" xmlns:r="http://schemas.openxmlformats.org/officeDocument/2006/relationships" xmlns:p="http://schemas.openxmlformats.org/presentationml/2006/main">
+  <p:cSld>
+    <p:spTree>
+      <p:nvGrpSpPr>
+        <p:cNvPr id="1" name=""/>
+        <p:cNvGrpSpPr/>
+        <p:nvPr/>
+      </p:nvGrpSpPr>
+      <p:grpSpPr>
+        <a:xfrm>
+          <a:off x="0" y="0"/>
+          <a:ext cx="0" cy="0"/>
+          <a:chOff x="0" y="0"/>
+          <a:chExt cx="0" cy="0"/>
+        </a:xfrm>
+      </p:grpSpPr>
+      <p:cxnSp>
+        <p:nvCxnSpPr>
+          <p:cNvPr id="88" name="직선 화살표 연결선 87"/>
+          <p:cNvCxnSpPr>
+            <a:stCxn id="76" idx="0"/>
+          </p:cNvCxnSpPr>
+          <p:nvPr/>
+        </p:nvCxnSpPr>
+        <p:spPr>
+          <a:xfrm flipV="1">
+            <a:off x="8022152" y="2361880"/>
+            <a:ext cx="0" cy="2491826"/>
+          </a:xfrm>
+          <a:prstGeom prst="straightConnector1">
+            <a:avLst/>
+          </a:prstGeom>
+          <a:ln w="19050">
+            <a:solidFill>
+              <a:schemeClr val="tx1">
+                <a:lumMod val="65000"/>
+                <a:lumOff val="35000"/>
+              </a:schemeClr>
+            </a:solidFill>
+            <a:tailEnd type="arrow"/>
+          </a:ln>
+        </p:spPr>
+        <p:style>
+          <a:lnRef idx="1">
+            <a:schemeClr val="accent1"/>
+          </a:lnRef>
+          <a:fillRef idx="0">
+            <a:schemeClr val="accent1"/>
+          </a:fillRef>
+          <a:effectRef idx="0">
+            <a:schemeClr val="accent1"/>
+          </a:effectRef>
+          <a:fontRef idx="minor">
+            <a:schemeClr val="tx1"/>
+          </a:fontRef>
+        </p:style>
+      </p:cxnSp>
+      <p:cxnSp>
+        <p:nvCxnSpPr>
+          <p:cNvPr id="85" name="직선 연결선 84"/>
+          <p:cNvCxnSpPr>
+            <a:stCxn id="53" idx="0"/>
+            <a:endCxn id="67" idx="2"/>
+          </p:cNvCxnSpPr>
+          <p:nvPr/>
+        </p:nvCxnSpPr>
+        <p:spPr>
+          <a:xfrm>
+            <a:off x="3540806" y="1919660"/>
+            <a:ext cx="0" cy="3374924"/>
+          </a:xfrm>
+          <a:prstGeom prst="line">
+            <a:avLst/>
+          </a:prstGeom>
+          <a:ln w="19050">
+            <a:solidFill>
+              <a:schemeClr val="tx1">
+                <a:lumMod val="65000"/>
+                <a:lumOff val="35000"/>
+              </a:schemeClr>
+            </a:solidFill>
+          </a:ln>
+        </p:spPr>
+        <p:style>
+          <a:lnRef idx="1">
+            <a:schemeClr val="accent1"/>
+          </a:lnRef>
+          <a:fillRef idx="0">
+            <a:schemeClr val="accent1"/>
+          </a:fillRef>
+          <a:effectRef idx="0">
+            <a:schemeClr val="accent1"/>
+          </a:effectRef>
+          <a:fontRef idx="minor">
+            <a:schemeClr val="tx1"/>
+          </a:fontRef>
+        </p:style>
+      </p:cxnSp>
+      <p:cxnSp>
+        <p:nvCxnSpPr>
+          <p:cNvPr id="50" name="직선 연결선 49"/>
+          <p:cNvCxnSpPr>
+            <a:stCxn id="39" idx="0"/>
+            <a:endCxn id="48" idx="2"/>
+          </p:cNvCxnSpPr>
+          <p:nvPr/>
+        </p:nvCxnSpPr>
+        <p:spPr>
+          <a:xfrm>
+            <a:off x="5773054" y="1919660"/>
+            <a:ext cx="0" cy="3961733"/>
+          </a:xfrm>
+          <a:prstGeom prst="line">
+            <a:avLst/>
+          </a:prstGeom>
+          <a:ln w="19050">
+            <a:solidFill>
+              <a:schemeClr val="tx1">
+                <a:lumMod val="65000"/>
+                <a:lumOff val="35000"/>
+              </a:schemeClr>
+            </a:solidFill>
+          </a:ln>
+        </p:spPr>
+        <p:style>
+          <a:lnRef idx="1">
+            <a:schemeClr val="accent1"/>
+          </a:lnRef>
+          <a:fillRef idx="0">
+            <a:schemeClr val="accent1"/>
+          </a:fillRef>
+          <a:effectRef idx="0">
+            <a:schemeClr val="accent1"/>
+          </a:effectRef>
+          <a:fontRef idx="minor">
+            <a:schemeClr val="tx1"/>
+          </a:fontRef>
+        </p:style>
+      </p:cxnSp>
+      <p:sp>
+        <p:nvSpPr>
+          <p:cNvPr id="39" name="직사각형 38"/>
+          <p:cNvSpPr/>
+          <p:nvPr/>
+        </p:nvSpPr>
+        <p:spPr>
+          <a:xfrm>
+            <a:off x="4680917" y="1919660"/>
+            <a:ext cx="2184273" cy="440878"/>
+          </a:xfrm>
+          <a:prstGeom prst="rect">
+            <a:avLst/>
+          </a:prstGeom>
+          <a:solidFill>
+            <a:srgbClr val="CF3531"/>
+          </a:solidFill>
+          <a:ln w="12700">
+            <a:solidFill>
+              <a:schemeClr val="tx1">
+                <a:lumMod val="65000"/>
+                <a:lumOff val="35000"/>
+              </a:schemeClr>
+            </a:solidFill>
+          </a:ln>
+        </p:spPr>
+        <p:style>
+          <a:lnRef idx="2">
+            <a:schemeClr val="accent1">
+              <a:shade val="50000"/>
+            </a:schemeClr>
+          </a:lnRef>
+          <a:fillRef idx="1">
+            <a:schemeClr val="accent1"/>
+          </a:fillRef>
+          <a:effectRef idx="0">
+            <a:schemeClr val="accent1"/>
+          </a:effectRef>
+          <a:fontRef idx="minor">
+            <a:schemeClr val="lt1"/>
+          </a:fontRef>
+        </p:style>
+        <p:txBody>
+          <a:bodyPr lIns="110780" tIns="55390" rIns="110780" bIns="55390" spcCol="0" rtlCol="0" anchor="ctr"/>
+          <a:lstStyle/>
+          <a:p>
+            <a:pPr algn="ctr"/>
+            <a:r>
+              <a:rPr lang="en-US" altLang="ko-KR" sz="1400" smtClean="0">
+                <a:latin typeface="나눔스퀘어 ExtraBold" pitchFamily="50" charset="-127"/>
+                <a:ea typeface="나눔스퀘어 ExtraBold" pitchFamily="50" charset="-127"/>
+              </a:rPr>
+              <a:t>Applcation </a:t>
+            </a:r>
+            <a:r>
+              <a:rPr lang="en-US" altLang="ko-KR" sz="1400">
+                <a:latin typeface="나눔스퀘어 ExtraBold" pitchFamily="50" charset="-127"/>
+                <a:ea typeface="나눔스퀘어 ExtraBold" pitchFamily="50" charset="-127"/>
+              </a:rPr>
+              <a:t>Layer</a:t>
+            </a:r>
+            <a:endParaRPr lang="ko-KR" altLang="en-US" sz="1400">
+              <a:latin typeface="나눔스퀘어 ExtraBold" pitchFamily="50" charset="-127"/>
+              <a:ea typeface="나눔스퀘어 ExtraBold" pitchFamily="50" charset="-127"/>
+            </a:endParaRPr>
+          </a:p>
+        </p:txBody>
+      </p:sp>
+      <p:sp>
+        <p:nvSpPr>
+          <p:cNvPr id="41" name="직사각형 40"/>
+          <p:cNvSpPr/>
+          <p:nvPr/>
+        </p:nvSpPr>
+        <p:spPr>
+          <a:xfrm>
+            <a:off x="4680914" y="2506469"/>
+            <a:ext cx="2184273" cy="440878"/>
+          </a:xfrm>
+          <a:prstGeom prst="rect">
+            <a:avLst/>
+          </a:prstGeom>
+          <a:solidFill>
+            <a:srgbClr val="F79647"/>
+          </a:solidFill>
+          <a:ln w="12700">
+            <a:solidFill>
+              <a:schemeClr val="tx1">
+                <a:lumMod val="65000"/>
+                <a:lumOff val="35000"/>
+              </a:schemeClr>
+            </a:solidFill>
+          </a:ln>
+        </p:spPr>
+        <p:style>
+          <a:lnRef idx="2">
+            <a:schemeClr val="accent1">
+              <a:shade val="50000"/>
+            </a:schemeClr>
+          </a:lnRef>
+          <a:fillRef idx="1">
+            <a:schemeClr val="accent1"/>
+          </a:fillRef>
+          <a:effectRef idx="0">
+            <a:schemeClr val="accent1"/>
+          </a:effectRef>
+          <a:fontRef idx="minor">
+            <a:schemeClr val="lt1"/>
+          </a:fontRef>
+        </p:style>
+        <p:txBody>
+          <a:bodyPr lIns="110780" tIns="55390" rIns="110780" bIns="55390" spcCol="0" rtlCol="0" anchor="ctr"/>
+          <a:lstStyle/>
+          <a:p>
+            <a:pPr algn="ctr"/>
+            <a:r>
+              <a:rPr lang="en-US" altLang="ko-KR" sz="1400" smtClean="0">
+                <a:latin typeface="나눔스퀘어 ExtraBold" pitchFamily="50" charset="-127"/>
+                <a:ea typeface="나눔스퀘어 ExtraBold" pitchFamily="50" charset="-127"/>
+              </a:rPr>
+              <a:t>Presentation </a:t>
+            </a:r>
+            <a:r>
+              <a:rPr lang="en-US" altLang="ko-KR" sz="1400">
+                <a:latin typeface="나눔스퀘어 ExtraBold" pitchFamily="50" charset="-127"/>
+                <a:ea typeface="나눔스퀘어 ExtraBold" pitchFamily="50" charset="-127"/>
+              </a:rPr>
+              <a:t>Layer</a:t>
+            </a:r>
+            <a:endParaRPr lang="ko-KR" altLang="en-US" sz="1400">
+              <a:latin typeface="나눔스퀘어 ExtraBold" pitchFamily="50" charset="-127"/>
+              <a:ea typeface="나눔스퀘어 ExtraBold" pitchFamily="50" charset="-127"/>
+            </a:endParaRPr>
+          </a:p>
+        </p:txBody>
+      </p:sp>
+      <p:sp>
+        <p:nvSpPr>
+          <p:cNvPr id="43" name="직사각형 42"/>
+          <p:cNvSpPr/>
+          <p:nvPr/>
+        </p:nvSpPr>
+        <p:spPr>
+          <a:xfrm>
+            <a:off x="4680917" y="3093278"/>
+            <a:ext cx="2184273" cy="440878"/>
+          </a:xfrm>
+          <a:prstGeom prst="rect">
+            <a:avLst/>
+          </a:prstGeom>
+          <a:solidFill>
+            <a:srgbClr val="FFC203"/>
+          </a:solidFill>
+          <a:ln w="12700">
+            <a:solidFill>
+              <a:schemeClr val="tx1">
+                <a:lumMod val="65000"/>
+                <a:lumOff val="35000"/>
+              </a:schemeClr>
+            </a:solidFill>
+          </a:ln>
+        </p:spPr>
+        <p:style>
+          <a:lnRef idx="2">
+            <a:schemeClr val="accent1">
+              <a:shade val="50000"/>
+            </a:schemeClr>
+          </a:lnRef>
+          <a:fillRef idx="1">
+            <a:schemeClr val="accent1"/>
+          </a:fillRef>
+          <a:effectRef idx="0">
+            <a:schemeClr val="accent1"/>
+          </a:effectRef>
+          <a:fontRef idx="minor">
+            <a:schemeClr val="lt1"/>
+          </a:fontRef>
+        </p:style>
+        <p:txBody>
+          <a:bodyPr lIns="110780" tIns="55390" rIns="110780" bIns="55390" spcCol="0" rtlCol="0" anchor="ctr"/>
+          <a:lstStyle/>
+          <a:p>
+            <a:pPr algn="ctr"/>
+            <a:r>
+              <a:rPr lang="en-US" altLang="ko-KR" sz="1400" smtClean="0">
+                <a:latin typeface="나눔스퀘어 ExtraBold" pitchFamily="50" charset="-127"/>
+                <a:ea typeface="나눔스퀘어 ExtraBold" pitchFamily="50" charset="-127"/>
+              </a:rPr>
+              <a:t>Session </a:t>
+            </a:r>
+            <a:r>
+              <a:rPr lang="en-US" altLang="ko-KR" sz="1400">
+                <a:latin typeface="나눔스퀘어 ExtraBold" pitchFamily="50" charset="-127"/>
+                <a:ea typeface="나눔스퀘어 ExtraBold" pitchFamily="50" charset="-127"/>
+              </a:rPr>
+              <a:t>Layer</a:t>
+            </a:r>
+            <a:endParaRPr lang="ko-KR" altLang="en-US" sz="1400">
+              <a:latin typeface="나눔스퀘어 ExtraBold" pitchFamily="50" charset="-127"/>
+              <a:ea typeface="나눔스퀘어 ExtraBold" pitchFamily="50" charset="-127"/>
+            </a:endParaRPr>
+          </a:p>
+        </p:txBody>
+      </p:sp>
+      <p:sp>
+        <p:nvSpPr>
+          <p:cNvPr id="45" name="직사각형 44"/>
+          <p:cNvSpPr/>
+          <p:nvPr/>
+        </p:nvSpPr>
+        <p:spPr>
+          <a:xfrm>
+            <a:off x="4680917" y="3680087"/>
+            <a:ext cx="2184273" cy="440878"/>
+          </a:xfrm>
+          <a:prstGeom prst="rect">
+            <a:avLst/>
+          </a:prstGeom>
+          <a:solidFill>
+            <a:srgbClr val="10A021"/>
+          </a:solidFill>
+          <a:ln w="12700">
+            <a:solidFill>
+              <a:schemeClr val="tx1">
+                <a:lumMod val="65000"/>
+                <a:lumOff val="35000"/>
+              </a:schemeClr>
+            </a:solidFill>
+          </a:ln>
+        </p:spPr>
+        <p:style>
+          <a:lnRef idx="2">
+            <a:schemeClr val="accent1">
+              <a:shade val="50000"/>
+            </a:schemeClr>
+          </a:lnRef>
+          <a:fillRef idx="1">
+            <a:schemeClr val="accent1"/>
+          </a:fillRef>
+          <a:effectRef idx="0">
+            <a:schemeClr val="accent1"/>
+          </a:effectRef>
+          <a:fontRef idx="minor">
+            <a:schemeClr val="lt1"/>
+          </a:fontRef>
+        </p:style>
+        <p:txBody>
+          <a:bodyPr lIns="110780" tIns="55390" rIns="110780" bIns="55390" spcCol="0" rtlCol="0" anchor="ctr"/>
+          <a:lstStyle/>
+          <a:p>
+            <a:pPr algn="ctr"/>
+            <a:r>
+              <a:rPr lang="en-US" altLang="ko-KR" sz="1400" smtClean="0">
+                <a:latin typeface="나눔스퀘어 ExtraBold" pitchFamily="50" charset="-127"/>
+                <a:ea typeface="나눔스퀘어 ExtraBold" pitchFamily="50" charset="-127"/>
+              </a:rPr>
+              <a:t>Transport </a:t>
+            </a:r>
+            <a:r>
+              <a:rPr lang="en-US" altLang="ko-KR" sz="1400">
+                <a:latin typeface="나눔스퀘어 ExtraBold" pitchFamily="50" charset="-127"/>
+                <a:ea typeface="나눔스퀘어 ExtraBold" pitchFamily="50" charset="-127"/>
+              </a:rPr>
+              <a:t>Layer</a:t>
+            </a:r>
+            <a:endParaRPr lang="ko-KR" altLang="en-US" sz="1400">
+              <a:latin typeface="나눔스퀘어 ExtraBold" pitchFamily="50" charset="-127"/>
+              <a:ea typeface="나눔스퀘어 ExtraBold" pitchFamily="50" charset="-127"/>
+            </a:endParaRPr>
+          </a:p>
+        </p:txBody>
+      </p:sp>
+      <p:sp>
+        <p:nvSpPr>
+          <p:cNvPr id="46" name="직사각형 45"/>
+          <p:cNvSpPr/>
+          <p:nvPr/>
+        </p:nvSpPr>
+        <p:spPr>
+          <a:xfrm>
+            <a:off x="4680917" y="4266897"/>
+            <a:ext cx="2184273" cy="440878"/>
+          </a:xfrm>
+          <a:prstGeom prst="rect">
+            <a:avLst/>
+          </a:prstGeom>
+          <a:ln w="12700">
+            <a:solidFill>
+              <a:schemeClr val="tx1">
+                <a:lumMod val="65000"/>
+                <a:lumOff val="35000"/>
+              </a:schemeClr>
+            </a:solidFill>
+          </a:ln>
+        </p:spPr>
+        <p:style>
+          <a:lnRef idx="2">
+            <a:schemeClr val="accent1">
+              <a:shade val="50000"/>
+            </a:schemeClr>
+          </a:lnRef>
+          <a:fillRef idx="1">
+            <a:schemeClr val="accent1"/>
+          </a:fillRef>
+          <a:effectRef idx="0">
+            <a:schemeClr val="accent1"/>
+          </a:effectRef>
+          <a:fontRef idx="minor">
+            <a:schemeClr val="lt1"/>
+          </a:fontRef>
+        </p:style>
+        <p:txBody>
+          <a:bodyPr lIns="110780" tIns="55390" rIns="110780" bIns="55390" spcCol="0" rtlCol="0" anchor="ctr"/>
+          <a:lstStyle/>
+          <a:p>
+            <a:pPr algn="ctr"/>
+            <a:r>
+              <a:rPr lang="en-US" altLang="ko-KR" sz="1400" smtClean="0">
+                <a:latin typeface="나눔스퀘어 ExtraBold" pitchFamily="50" charset="-127"/>
+                <a:ea typeface="나눔스퀘어 ExtraBold" pitchFamily="50" charset="-127"/>
+              </a:rPr>
+              <a:t>Network </a:t>
+            </a:r>
+            <a:r>
+              <a:rPr lang="en-US" altLang="ko-KR" sz="1400">
+                <a:latin typeface="나눔스퀘어 ExtraBold" pitchFamily="50" charset="-127"/>
+                <a:ea typeface="나눔스퀘어 ExtraBold" pitchFamily="50" charset="-127"/>
+              </a:rPr>
+              <a:t>Layer</a:t>
+            </a:r>
+            <a:endParaRPr lang="ko-KR" altLang="en-US" sz="1400">
+              <a:latin typeface="나눔스퀘어 ExtraBold" pitchFamily="50" charset="-127"/>
+              <a:ea typeface="나눔스퀘어 ExtraBold" pitchFamily="50" charset="-127"/>
+            </a:endParaRPr>
+          </a:p>
+        </p:txBody>
+      </p:sp>
+      <p:sp>
+        <p:nvSpPr>
+          <p:cNvPr id="47" name="직사각형 46"/>
+          <p:cNvSpPr/>
+          <p:nvPr/>
+        </p:nvSpPr>
+        <p:spPr>
+          <a:xfrm>
+            <a:off x="4680914" y="4853706"/>
+            <a:ext cx="2184273" cy="440878"/>
+          </a:xfrm>
+          <a:prstGeom prst="rect">
+            <a:avLst/>
+          </a:prstGeom>
+          <a:solidFill>
+            <a:srgbClr val="00487E"/>
+          </a:solidFill>
+          <a:ln w="12700">
+            <a:solidFill>
+              <a:schemeClr val="tx1">
+                <a:lumMod val="65000"/>
+                <a:lumOff val="35000"/>
+              </a:schemeClr>
+            </a:solidFill>
+          </a:ln>
+        </p:spPr>
+        <p:style>
+          <a:lnRef idx="2">
+            <a:schemeClr val="accent1">
+              <a:shade val="50000"/>
+            </a:schemeClr>
+          </a:lnRef>
+          <a:fillRef idx="1">
+            <a:schemeClr val="accent1"/>
+          </a:fillRef>
+          <a:effectRef idx="0">
+            <a:schemeClr val="accent1"/>
+          </a:effectRef>
+          <a:fontRef idx="minor">
+            <a:schemeClr val="lt1"/>
+          </a:fontRef>
+        </p:style>
+        <p:txBody>
+          <a:bodyPr lIns="110780" tIns="55390" rIns="110780" bIns="55390" spcCol="0" rtlCol="0" anchor="ctr"/>
+          <a:lstStyle/>
+          <a:p>
+            <a:pPr algn="ctr"/>
+            <a:r>
+              <a:rPr lang="en-US" altLang="ko-KR" sz="1400" smtClean="0">
+                <a:latin typeface="나눔스퀘어 ExtraBold" pitchFamily="50" charset="-127"/>
+                <a:ea typeface="나눔스퀘어 ExtraBold" pitchFamily="50" charset="-127"/>
+              </a:rPr>
+              <a:t>DataLink </a:t>
+            </a:r>
+            <a:r>
+              <a:rPr lang="en-US" altLang="ko-KR" sz="1400">
+                <a:latin typeface="나눔스퀘어 ExtraBold" pitchFamily="50" charset="-127"/>
+                <a:ea typeface="나눔스퀘어 ExtraBold" pitchFamily="50" charset="-127"/>
+              </a:rPr>
+              <a:t>Layer</a:t>
+            </a:r>
+            <a:endParaRPr lang="ko-KR" altLang="en-US" sz="1400">
+              <a:latin typeface="나눔스퀘어 ExtraBold" pitchFamily="50" charset="-127"/>
+              <a:ea typeface="나눔스퀘어 ExtraBold" pitchFamily="50" charset="-127"/>
+            </a:endParaRPr>
+          </a:p>
+        </p:txBody>
+      </p:sp>
+      <p:sp>
+        <p:nvSpPr>
+          <p:cNvPr id="48" name="직사각형 47"/>
+          <p:cNvSpPr/>
+          <p:nvPr/>
+        </p:nvSpPr>
+        <p:spPr>
+          <a:xfrm>
+            <a:off x="4680917" y="5440515"/>
+            <a:ext cx="2184273" cy="440878"/>
+          </a:xfrm>
+          <a:prstGeom prst="rect">
+            <a:avLst/>
+          </a:prstGeom>
+          <a:solidFill>
+            <a:srgbClr val="58267E"/>
+          </a:solidFill>
+          <a:ln w="12700">
+            <a:solidFill>
+              <a:schemeClr val="tx1">
+                <a:lumMod val="65000"/>
+                <a:lumOff val="35000"/>
+              </a:schemeClr>
+            </a:solidFill>
+          </a:ln>
+        </p:spPr>
+        <p:style>
+          <a:lnRef idx="2">
+            <a:schemeClr val="accent1">
+              <a:shade val="50000"/>
+            </a:schemeClr>
+          </a:lnRef>
+          <a:fillRef idx="1">
+            <a:schemeClr val="accent1"/>
+          </a:fillRef>
+          <a:effectRef idx="0">
+            <a:schemeClr val="accent1"/>
+          </a:effectRef>
+          <a:fontRef idx="minor">
+            <a:schemeClr val="lt1"/>
+          </a:fontRef>
+        </p:style>
+        <p:txBody>
+          <a:bodyPr lIns="110780" tIns="55390" rIns="110780" bIns="55390" spcCol="0" rtlCol="0" anchor="ctr"/>
+          <a:lstStyle/>
+          <a:p>
+            <a:pPr algn="ctr"/>
+            <a:r>
+              <a:rPr lang="en-US" altLang="ko-KR" sz="1400" smtClean="0">
+                <a:latin typeface="나눔스퀘어 ExtraBold" pitchFamily="50" charset="-127"/>
+                <a:ea typeface="나눔스퀘어 ExtraBold" pitchFamily="50" charset="-127"/>
+              </a:rPr>
+              <a:t>Physical </a:t>
+            </a:r>
+            <a:r>
+              <a:rPr lang="en-US" altLang="ko-KR" sz="1400">
+                <a:latin typeface="나눔스퀘어 ExtraBold" pitchFamily="50" charset="-127"/>
+                <a:ea typeface="나눔스퀘어 ExtraBold" pitchFamily="50" charset="-127"/>
+              </a:rPr>
+              <a:t>Layer</a:t>
+            </a:r>
+            <a:endParaRPr lang="ko-KR" altLang="en-US" sz="1400">
+              <a:latin typeface="나눔스퀘어 ExtraBold" pitchFamily="50" charset="-127"/>
+              <a:ea typeface="나눔스퀘어 ExtraBold" pitchFamily="50" charset="-127"/>
+            </a:endParaRPr>
+          </a:p>
+        </p:txBody>
+      </p:sp>
+      <p:sp>
+        <p:nvSpPr>
+          <p:cNvPr id="53" name="직사각형 52"/>
+          <p:cNvSpPr/>
+          <p:nvPr/>
+        </p:nvSpPr>
+        <p:spPr>
+          <a:xfrm>
+            <a:off x="3077633" y="1919660"/>
+            <a:ext cx="926345" cy="440878"/>
+          </a:xfrm>
+          <a:prstGeom prst="rect">
+            <a:avLst/>
+          </a:prstGeom>
+          <a:solidFill>
+            <a:srgbClr val="CF3531"/>
+          </a:solidFill>
+          <a:ln w="12700">
+            <a:solidFill>
+              <a:schemeClr val="tx1">
+                <a:lumMod val="65000"/>
+                <a:lumOff val="35000"/>
+              </a:schemeClr>
+            </a:solidFill>
+          </a:ln>
+        </p:spPr>
+        <p:style>
+          <a:lnRef idx="2">
+            <a:schemeClr val="accent1">
+              <a:shade val="50000"/>
+            </a:schemeClr>
+          </a:lnRef>
+          <a:fillRef idx="1">
+            <a:schemeClr val="accent1"/>
+          </a:fillRef>
+          <a:effectRef idx="0">
+            <a:schemeClr val="accent1"/>
+          </a:effectRef>
+          <a:fontRef idx="minor">
+            <a:schemeClr val="lt1"/>
+          </a:fontRef>
+        </p:style>
+        <p:txBody>
+          <a:bodyPr lIns="110780" tIns="55390" rIns="110780" bIns="55390" spcCol="0" rtlCol="0" anchor="ctr"/>
+          <a:lstStyle/>
+          <a:p>
+            <a:pPr algn="ctr"/>
+            <a:r>
+              <a:rPr lang="en-US" altLang="ko-KR" sz="1400" smtClean="0">
+                <a:latin typeface="나눔스퀘어 ExtraBold" pitchFamily="50" charset="-127"/>
+                <a:ea typeface="나눔스퀘어 ExtraBold" pitchFamily="50" charset="-127"/>
+              </a:rPr>
+              <a:t>HTTP</a:t>
+            </a:r>
+            <a:endParaRPr lang="ko-KR" altLang="en-US" sz="1400">
+              <a:latin typeface="나눔스퀘어 ExtraBold" pitchFamily="50" charset="-127"/>
+              <a:ea typeface="나눔스퀘어 ExtraBold" pitchFamily="50" charset="-127"/>
+            </a:endParaRPr>
+          </a:p>
+        </p:txBody>
+      </p:sp>
+      <p:sp>
+        <p:nvSpPr>
+          <p:cNvPr id="55" name="직사각형 54"/>
+          <p:cNvSpPr/>
+          <p:nvPr/>
+        </p:nvSpPr>
+        <p:spPr>
+          <a:xfrm>
+            <a:off x="3077633" y="3680087"/>
+            <a:ext cx="926345" cy="440878"/>
+          </a:xfrm>
+          <a:prstGeom prst="rect">
+            <a:avLst/>
+          </a:prstGeom>
+          <a:solidFill>
+            <a:srgbClr val="CF3531"/>
+          </a:solidFill>
+          <a:ln w="12700">
+            <a:solidFill>
+              <a:schemeClr val="tx1">
+                <a:lumMod val="65000"/>
+                <a:lumOff val="35000"/>
+              </a:schemeClr>
+            </a:solidFill>
+          </a:ln>
+        </p:spPr>
+        <p:style>
+          <a:lnRef idx="2">
+            <a:schemeClr val="accent1">
+              <a:shade val="50000"/>
+            </a:schemeClr>
+          </a:lnRef>
+          <a:fillRef idx="1">
+            <a:schemeClr val="accent1"/>
+          </a:fillRef>
+          <a:effectRef idx="0">
+            <a:schemeClr val="accent1"/>
+          </a:effectRef>
+          <a:fontRef idx="minor">
+            <a:schemeClr val="lt1"/>
+          </a:fontRef>
+        </p:style>
+        <p:txBody>
+          <a:bodyPr lIns="110780" tIns="55390" rIns="110780" bIns="55390" spcCol="0" rtlCol="0" anchor="ctr"/>
+          <a:lstStyle/>
+          <a:p>
+            <a:pPr algn="ctr"/>
+            <a:r>
+              <a:rPr lang="en-US" altLang="ko-KR" sz="1400" smtClean="0">
+                <a:latin typeface="나눔스퀘어 ExtraBold" pitchFamily="50" charset="-127"/>
+                <a:ea typeface="나눔스퀘어 ExtraBold" pitchFamily="50" charset="-127"/>
+              </a:rPr>
+              <a:t>HTTP</a:t>
+            </a:r>
+            <a:endParaRPr lang="ko-KR" altLang="en-US" sz="1400">
+              <a:latin typeface="나눔스퀘어 ExtraBold" pitchFamily="50" charset="-127"/>
+              <a:ea typeface="나눔스퀘어 ExtraBold" pitchFamily="50" charset="-127"/>
+            </a:endParaRPr>
+          </a:p>
+        </p:txBody>
+      </p:sp>
+      <p:sp>
+        <p:nvSpPr>
+          <p:cNvPr id="61" name="직사각형 60"/>
+          <p:cNvSpPr/>
+          <p:nvPr/>
+        </p:nvSpPr>
+        <p:spPr>
+          <a:xfrm>
+            <a:off x="2473927" y="3680087"/>
+            <a:ext cx="603706" cy="440878"/>
+          </a:xfrm>
+          <a:prstGeom prst="rect">
+            <a:avLst/>
+          </a:prstGeom>
+          <a:solidFill>
+            <a:srgbClr val="10A021"/>
+          </a:solidFill>
+          <a:ln w="12700">
+            <a:solidFill>
+              <a:schemeClr val="tx1">
+                <a:lumMod val="65000"/>
+                <a:lumOff val="35000"/>
+              </a:schemeClr>
+            </a:solidFill>
+          </a:ln>
+        </p:spPr>
+        <p:style>
+          <a:lnRef idx="2">
+            <a:schemeClr val="accent1">
+              <a:shade val="50000"/>
+            </a:schemeClr>
+          </a:lnRef>
+          <a:fillRef idx="1">
+            <a:schemeClr val="accent1"/>
+          </a:fillRef>
+          <a:effectRef idx="0">
+            <a:schemeClr val="accent1"/>
+          </a:effectRef>
+          <a:fontRef idx="minor">
+            <a:schemeClr val="lt1"/>
+          </a:fontRef>
+        </p:style>
+        <p:txBody>
+          <a:bodyPr lIns="110780" tIns="55390" rIns="110780" bIns="55390" spcCol="0" rtlCol="0" anchor="ctr"/>
+          <a:lstStyle/>
+          <a:p>
+            <a:pPr algn="ctr"/>
+            <a:r>
+              <a:rPr lang="en-US" altLang="ko-KR" sz="1400" smtClean="0">
+                <a:latin typeface="나눔스퀘어 ExtraBold" pitchFamily="50" charset="-127"/>
+                <a:ea typeface="나눔스퀘어 ExtraBold" pitchFamily="50" charset="-127"/>
+              </a:rPr>
+              <a:t>TCP</a:t>
+            </a:r>
+            <a:endParaRPr lang="ko-KR" altLang="en-US" sz="1400">
+              <a:latin typeface="나눔스퀘어 ExtraBold" pitchFamily="50" charset="-127"/>
+              <a:ea typeface="나눔스퀘어 ExtraBold" pitchFamily="50" charset="-127"/>
+            </a:endParaRPr>
+          </a:p>
+        </p:txBody>
+      </p:sp>
+      <p:sp>
+        <p:nvSpPr>
+          <p:cNvPr id="62" name="직사각형 61"/>
+          <p:cNvSpPr/>
+          <p:nvPr/>
+        </p:nvSpPr>
+        <p:spPr>
+          <a:xfrm>
+            <a:off x="3077633" y="4266897"/>
+            <a:ext cx="926345" cy="440878"/>
+          </a:xfrm>
+          <a:prstGeom prst="rect">
+            <a:avLst/>
+          </a:prstGeom>
+          <a:solidFill>
+            <a:srgbClr val="CF3531"/>
+          </a:solidFill>
+          <a:ln w="12700">
+            <a:solidFill>
+              <a:schemeClr val="tx1">
+                <a:lumMod val="65000"/>
+                <a:lumOff val="35000"/>
+              </a:schemeClr>
+            </a:solidFill>
+          </a:ln>
+        </p:spPr>
+        <p:style>
+          <a:lnRef idx="2">
+            <a:schemeClr val="accent1">
+              <a:shade val="50000"/>
+            </a:schemeClr>
+          </a:lnRef>
+          <a:fillRef idx="1">
+            <a:schemeClr val="accent1"/>
+          </a:fillRef>
+          <a:effectRef idx="0">
+            <a:schemeClr val="accent1"/>
+          </a:effectRef>
+          <a:fontRef idx="minor">
+            <a:schemeClr val="lt1"/>
+          </a:fontRef>
+        </p:style>
+        <p:txBody>
+          <a:bodyPr lIns="110780" tIns="55390" rIns="110780" bIns="55390" spcCol="0" rtlCol="0" anchor="ctr"/>
+          <a:lstStyle/>
+          <a:p>
+            <a:pPr algn="ctr"/>
+            <a:r>
+              <a:rPr lang="en-US" altLang="ko-KR" sz="1400" smtClean="0">
+                <a:latin typeface="나눔스퀘어 ExtraBold" pitchFamily="50" charset="-127"/>
+                <a:ea typeface="나눔스퀘어 ExtraBold" pitchFamily="50" charset="-127"/>
+              </a:rPr>
+              <a:t>HTTP</a:t>
+            </a:r>
+            <a:endParaRPr lang="ko-KR" altLang="en-US" sz="1400">
+              <a:latin typeface="나눔스퀘어 ExtraBold" pitchFamily="50" charset="-127"/>
+              <a:ea typeface="나눔스퀘어 ExtraBold" pitchFamily="50" charset="-127"/>
+            </a:endParaRPr>
+          </a:p>
+        </p:txBody>
+      </p:sp>
+      <p:sp>
+        <p:nvSpPr>
+          <p:cNvPr id="63" name="직사각형 62"/>
+          <p:cNvSpPr/>
+          <p:nvPr/>
+        </p:nvSpPr>
+        <p:spPr>
+          <a:xfrm>
+            <a:off x="2473927" y="4266897"/>
+            <a:ext cx="603706" cy="440878"/>
+          </a:xfrm>
+          <a:prstGeom prst="rect">
+            <a:avLst/>
+          </a:prstGeom>
+          <a:solidFill>
+            <a:srgbClr val="10A021"/>
+          </a:solidFill>
+          <a:ln w="12700">
+            <a:solidFill>
+              <a:schemeClr val="tx1">
+                <a:lumMod val="65000"/>
+                <a:lumOff val="35000"/>
+              </a:schemeClr>
+            </a:solidFill>
+          </a:ln>
+        </p:spPr>
+        <p:style>
+          <a:lnRef idx="2">
+            <a:schemeClr val="accent1">
+              <a:shade val="50000"/>
+            </a:schemeClr>
+          </a:lnRef>
+          <a:fillRef idx="1">
+            <a:schemeClr val="accent1"/>
+          </a:fillRef>
+          <a:effectRef idx="0">
+            <a:schemeClr val="accent1"/>
+          </a:effectRef>
+          <a:fontRef idx="minor">
+            <a:schemeClr val="lt1"/>
+          </a:fontRef>
+        </p:style>
+        <p:txBody>
+          <a:bodyPr lIns="110780" tIns="55390" rIns="110780" bIns="55390" spcCol="0" rtlCol="0" anchor="ctr"/>
+          <a:lstStyle/>
+          <a:p>
+            <a:pPr algn="ctr"/>
+            <a:r>
+              <a:rPr lang="en-US" altLang="ko-KR" sz="1400" smtClean="0">
+                <a:latin typeface="나눔스퀘어 ExtraBold" pitchFamily="50" charset="-127"/>
+                <a:ea typeface="나눔스퀘어 ExtraBold" pitchFamily="50" charset="-127"/>
+              </a:rPr>
+              <a:t>TCP</a:t>
+            </a:r>
+            <a:endParaRPr lang="ko-KR" altLang="en-US" sz="1400">
+              <a:latin typeface="나눔스퀘어 ExtraBold" pitchFamily="50" charset="-127"/>
+              <a:ea typeface="나눔스퀘어 ExtraBold" pitchFamily="50" charset="-127"/>
+            </a:endParaRPr>
+          </a:p>
+        </p:txBody>
+      </p:sp>
+      <p:sp>
+        <p:nvSpPr>
+          <p:cNvPr id="66" name="직사각형 65"/>
+          <p:cNvSpPr/>
+          <p:nvPr/>
+        </p:nvSpPr>
+        <p:spPr>
+          <a:xfrm>
+            <a:off x="1944613" y="4266897"/>
+            <a:ext cx="529314" cy="440878"/>
+          </a:xfrm>
+          <a:prstGeom prst="rect">
+            <a:avLst/>
+          </a:prstGeom>
+          <a:ln w="12700">
+            <a:solidFill>
+              <a:schemeClr val="tx1">
+                <a:lumMod val="65000"/>
+                <a:lumOff val="35000"/>
+              </a:schemeClr>
+            </a:solidFill>
+          </a:ln>
+        </p:spPr>
+        <p:style>
+          <a:lnRef idx="2">
+            <a:schemeClr val="accent1">
+              <a:shade val="50000"/>
+            </a:schemeClr>
+          </a:lnRef>
+          <a:fillRef idx="1">
+            <a:schemeClr val="accent1"/>
+          </a:fillRef>
+          <a:effectRef idx="0">
+            <a:schemeClr val="accent1"/>
+          </a:effectRef>
+          <a:fontRef idx="minor">
+            <a:schemeClr val="lt1"/>
+          </a:fontRef>
+        </p:style>
+        <p:txBody>
+          <a:bodyPr lIns="110780" tIns="55390" rIns="110780" bIns="55390" spcCol="0" rtlCol="0" anchor="ctr"/>
+          <a:lstStyle/>
+          <a:p>
+            <a:pPr algn="ctr"/>
+            <a:r>
+              <a:rPr lang="en-US" altLang="ko-KR" sz="1400" smtClean="0">
+                <a:latin typeface="나눔스퀘어 ExtraBold" pitchFamily="50" charset="-127"/>
+                <a:ea typeface="나눔스퀘어 ExtraBold" pitchFamily="50" charset="-127"/>
+              </a:rPr>
+              <a:t>IP</a:t>
+            </a:r>
+            <a:endParaRPr lang="ko-KR" altLang="en-US" sz="1400">
+              <a:latin typeface="나눔스퀘어 ExtraBold" pitchFamily="50" charset="-127"/>
+              <a:ea typeface="나눔스퀘어 ExtraBold" pitchFamily="50" charset="-127"/>
+            </a:endParaRPr>
+          </a:p>
+        </p:txBody>
+      </p:sp>
+      <p:sp>
+        <p:nvSpPr>
+          <p:cNvPr id="67" name="직사각형 66"/>
+          <p:cNvSpPr/>
+          <p:nvPr/>
+        </p:nvSpPr>
+        <p:spPr>
+          <a:xfrm>
+            <a:off x="3077633" y="4853706"/>
+            <a:ext cx="926345" cy="440878"/>
+          </a:xfrm>
+          <a:prstGeom prst="rect">
+            <a:avLst/>
+          </a:prstGeom>
+          <a:solidFill>
+            <a:srgbClr val="CF3531"/>
+          </a:solidFill>
+          <a:ln w="12700">
+            <a:solidFill>
+              <a:schemeClr val="tx1">
+                <a:lumMod val="65000"/>
+                <a:lumOff val="35000"/>
+              </a:schemeClr>
+            </a:solidFill>
+          </a:ln>
+        </p:spPr>
+        <p:style>
+          <a:lnRef idx="2">
+            <a:schemeClr val="accent1">
+              <a:shade val="50000"/>
+            </a:schemeClr>
+          </a:lnRef>
+          <a:fillRef idx="1">
+            <a:schemeClr val="accent1"/>
+          </a:fillRef>
+          <a:effectRef idx="0">
+            <a:schemeClr val="accent1"/>
+          </a:effectRef>
+          <a:fontRef idx="minor">
+            <a:schemeClr val="lt1"/>
+          </a:fontRef>
+        </p:style>
+        <p:txBody>
+          <a:bodyPr lIns="110780" tIns="55390" rIns="110780" bIns="55390" spcCol="0" rtlCol="0" anchor="ctr"/>
+          <a:lstStyle/>
+          <a:p>
+            <a:pPr algn="ctr"/>
+            <a:r>
+              <a:rPr lang="en-US" altLang="ko-KR" sz="1400" smtClean="0">
+                <a:latin typeface="나눔스퀘어 ExtraBold" pitchFamily="50" charset="-127"/>
+                <a:ea typeface="나눔스퀘어 ExtraBold" pitchFamily="50" charset="-127"/>
+              </a:rPr>
+              <a:t>HTTP</a:t>
+            </a:r>
+            <a:endParaRPr lang="ko-KR" altLang="en-US" sz="1400">
+              <a:latin typeface="나눔스퀘어 ExtraBold" pitchFamily="50" charset="-127"/>
+              <a:ea typeface="나눔스퀘어 ExtraBold" pitchFamily="50" charset="-127"/>
+            </a:endParaRPr>
+          </a:p>
+        </p:txBody>
+      </p:sp>
+      <p:sp>
+        <p:nvSpPr>
+          <p:cNvPr id="68" name="직사각형 67"/>
+          <p:cNvSpPr/>
+          <p:nvPr/>
+        </p:nvSpPr>
+        <p:spPr>
+          <a:xfrm>
+            <a:off x="2473927" y="4853706"/>
+            <a:ext cx="603706" cy="440878"/>
+          </a:xfrm>
+          <a:prstGeom prst="rect">
+            <a:avLst/>
+          </a:prstGeom>
+          <a:solidFill>
+            <a:srgbClr val="10A021"/>
+          </a:solidFill>
+          <a:ln w="12700">
+            <a:solidFill>
+              <a:schemeClr val="tx1">
+                <a:lumMod val="65000"/>
+                <a:lumOff val="35000"/>
+              </a:schemeClr>
+            </a:solidFill>
+          </a:ln>
+        </p:spPr>
+        <p:style>
+          <a:lnRef idx="2">
+            <a:schemeClr val="accent1">
+              <a:shade val="50000"/>
+            </a:schemeClr>
+          </a:lnRef>
+          <a:fillRef idx="1">
+            <a:schemeClr val="accent1"/>
+          </a:fillRef>
+          <a:effectRef idx="0">
+            <a:schemeClr val="accent1"/>
+          </a:effectRef>
+          <a:fontRef idx="minor">
+            <a:schemeClr val="lt1"/>
+          </a:fontRef>
+        </p:style>
+        <p:txBody>
+          <a:bodyPr lIns="110780" tIns="55390" rIns="110780" bIns="55390" spcCol="0" rtlCol="0" anchor="ctr"/>
+          <a:lstStyle/>
+          <a:p>
+            <a:pPr algn="ctr"/>
+            <a:r>
+              <a:rPr lang="en-US" altLang="ko-KR" sz="1400" smtClean="0">
+                <a:latin typeface="나눔스퀘어 ExtraBold" pitchFamily="50" charset="-127"/>
+                <a:ea typeface="나눔스퀘어 ExtraBold" pitchFamily="50" charset="-127"/>
+              </a:rPr>
+              <a:t>TCP</a:t>
+            </a:r>
+            <a:endParaRPr lang="ko-KR" altLang="en-US" sz="1400">
+              <a:latin typeface="나눔스퀘어 ExtraBold" pitchFamily="50" charset="-127"/>
+              <a:ea typeface="나눔스퀘어 ExtraBold" pitchFamily="50" charset="-127"/>
+            </a:endParaRPr>
+          </a:p>
+        </p:txBody>
+      </p:sp>
+      <p:sp>
+        <p:nvSpPr>
+          <p:cNvPr id="69" name="직사각형 68"/>
+          <p:cNvSpPr/>
+          <p:nvPr/>
+        </p:nvSpPr>
+        <p:spPr>
+          <a:xfrm>
+            <a:off x="1944613" y="4853706"/>
+            <a:ext cx="529314" cy="440878"/>
+          </a:xfrm>
+          <a:prstGeom prst="rect">
+            <a:avLst/>
+          </a:prstGeom>
+          <a:ln w="12700">
+            <a:solidFill>
+              <a:schemeClr val="tx1">
+                <a:lumMod val="65000"/>
+                <a:lumOff val="35000"/>
+              </a:schemeClr>
+            </a:solidFill>
+          </a:ln>
+        </p:spPr>
+        <p:style>
+          <a:lnRef idx="2">
+            <a:schemeClr val="accent1">
+              <a:shade val="50000"/>
+            </a:schemeClr>
+          </a:lnRef>
+          <a:fillRef idx="1">
+            <a:schemeClr val="accent1"/>
+          </a:fillRef>
+          <a:effectRef idx="0">
+            <a:schemeClr val="accent1"/>
+          </a:effectRef>
+          <a:fontRef idx="minor">
+            <a:schemeClr val="lt1"/>
+          </a:fontRef>
+        </p:style>
+        <p:txBody>
+          <a:bodyPr lIns="110780" tIns="55390" rIns="110780" bIns="55390" spcCol="0" rtlCol="0" anchor="ctr"/>
+          <a:lstStyle/>
+          <a:p>
+            <a:pPr algn="ctr"/>
+            <a:r>
+              <a:rPr lang="en-US" altLang="ko-KR" sz="1400" smtClean="0">
+                <a:latin typeface="나눔스퀘어 ExtraBold" pitchFamily="50" charset="-127"/>
+                <a:ea typeface="나눔스퀘어 ExtraBold" pitchFamily="50" charset="-127"/>
+              </a:rPr>
+              <a:t>IP</a:t>
+            </a:r>
+            <a:endParaRPr lang="ko-KR" altLang="en-US" sz="1400">
+              <a:latin typeface="나눔스퀘어 ExtraBold" pitchFamily="50" charset="-127"/>
+              <a:ea typeface="나눔스퀘어 ExtraBold" pitchFamily="50" charset="-127"/>
+            </a:endParaRPr>
+          </a:p>
+        </p:txBody>
+      </p:sp>
+      <p:sp>
+        <p:nvSpPr>
+          <p:cNvPr id="71" name="직사각형 70"/>
+          <p:cNvSpPr/>
+          <p:nvPr/>
+        </p:nvSpPr>
+        <p:spPr>
+          <a:xfrm>
+            <a:off x="936501" y="4853706"/>
+            <a:ext cx="1008112" cy="440878"/>
+          </a:xfrm>
+          <a:prstGeom prst="rect">
+            <a:avLst/>
+          </a:prstGeom>
+          <a:solidFill>
+            <a:srgbClr val="00487E"/>
+          </a:solidFill>
+          <a:ln w="12700">
+            <a:solidFill>
+              <a:schemeClr val="tx1">
+                <a:lumMod val="65000"/>
+                <a:lumOff val="35000"/>
+              </a:schemeClr>
+            </a:solidFill>
+          </a:ln>
+        </p:spPr>
+        <p:style>
+          <a:lnRef idx="2">
+            <a:schemeClr val="accent1">
+              <a:shade val="50000"/>
+            </a:schemeClr>
+          </a:lnRef>
+          <a:fillRef idx="1">
+            <a:schemeClr val="accent1"/>
+          </a:fillRef>
+          <a:effectRef idx="0">
+            <a:schemeClr val="accent1"/>
+          </a:effectRef>
+          <a:fontRef idx="minor">
+            <a:schemeClr val="lt1"/>
+          </a:fontRef>
+        </p:style>
+        <p:txBody>
+          <a:bodyPr lIns="110780" tIns="55390" rIns="110780" bIns="55390" spcCol="0" rtlCol="0" anchor="ctr"/>
+          <a:lstStyle/>
+          <a:p>
+            <a:pPr algn="ctr"/>
+            <a:r>
+              <a:rPr lang="en-US" altLang="ko-KR" sz="1400" smtClean="0">
+                <a:latin typeface="나눔스퀘어 ExtraBold" pitchFamily="50" charset="-127"/>
+                <a:ea typeface="나눔스퀘어 ExtraBold" pitchFamily="50" charset="-127"/>
+              </a:rPr>
+              <a:t>Ethernet</a:t>
+            </a:r>
+            <a:endParaRPr lang="ko-KR" altLang="en-US" sz="1400">
+              <a:latin typeface="나눔스퀘어 ExtraBold" pitchFamily="50" charset="-127"/>
+              <a:ea typeface="나눔스퀘어 ExtraBold" pitchFamily="50" charset="-127"/>
+            </a:endParaRPr>
+          </a:p>
+        </p:txBody>
+      </p:sp>
+      <p:sp>
+        <p:nvSpPr>
+          <p:cNvPr id="72" name="직사각형 71"/>
+          <p:cNvSpPr/>
+          <p:nvPr/>
+        </p:nvSpPr>
+        <p:spPr>
+          <a:xfrm>
+            <a:off x="9659228" y="4853706"/>
+            <a:ext cx="926345" cy="440878"/>
+          </a:xfrm>
+          <a:prstGeom prst="rect">
+            <a:avLst/>
+          </a:prstGeom>
+          <a:solidFill>
+            <a:srgbClr val="CF3531"/>
+          </a:solidFill>
+          <a:ln w="12700">
+            <a:solidFill>
+              <a:schemeClr val="tx1">
+                <a:lumMod val="65000"/>
+                <a:lumOff val="35000"/>
+              </a:schemeClr>
+            </a:solidFill>
+          </a:ln>
+        </p:spPr>
+        <p:style>
+          <a:lnRef idx="2">
+            <a:schemeClr val="accent1">
+              <a:shade val="50000"/>
+            </a:schemeClr>
+          </a:lnRef>
+          <a:fillRef idx="1">
+            <a:schemeClr val="accent1"/>
+          </a:fillRef>
+          <a:effectRef idx="0">
+            <a:schemeClr val="accent1"/>
+          </a:effectRef>
+          <a:fontRef idx="minor">
+            <a:schemeClr val="lt1"/>
+          </a:fontRef>
+        </p:style>
+        <p:txBody>
+          <a:bodyPr lIns="110780" tIns="55390" rIns="110780" bIns="55390" spcCol="0" rtlCol="0" anchor="ctr"/>
+          <a:lstStyle/>
+          <a:p>
+            <a:pPr algn="ctr"/>
+            <a:r>
+              <a:rPr lang="en-US" altLang="ko-KR" sz="1400" smtClean="0">
+                <a:latin typeface="나눔스퀘어 ExtraBold" pitchFamily="50" charset="-127"/>
+                <a:ea typeface="나눔스퀘어 ExtraBold" pitchFamily="50" charset="-127"/>
+              </a:rPr>
+              <a:t>HTTP</a:t>
+            </a:r>
+            <a:endParaRPr lang="ko-KR" altLang="en-US" sz="1400">
+              <a:latin typeface="나눔스퀘어 ExtraBold" pitchFamily="50" charset="-127"/>
+              <a:ea typeface="나눔스퀘어 ExtraBold" pitchFamily="50" charset="-127"/>
+            </a:endParaRPr>
+          </a:p>
+        </p:txBody>
+      </p:sp>
+      <p:sp>
+        <p:nvSpPr>
+          <p:cNvPr id="74" name="직사각형 73"/>
+          <p:cNvSpPr/>
+          <p:nvPr/>
+        </p:nvSpPr>
+        <p:spPr>
+          <a:xfrm>
+            <a:off x="9055522" y="4853706"/>
+            <a:ext cx="603706" cy="440878"/>
+          </a:xfrm>
+          <a:prstGeom prst="rect">
+            <a:avLst/>
+          </a:prstGeom>
+          <a:solidFill>
+            <a:srgbClr val="10A021"/>
+          </a:solidFill>
+          <a:ln w="12700">
+            <a:solidFill>
+              <a:schemeClr val="tx1">
+                <a:lumMod val="65000"/>
+                <a:lumOff val="35000"/>
+              </a:schemeClr>
+            </a:solidFill>
+          </a:ln>
+        </p:spPr>
+        <p:style>
+          <a:lnRef idx="2">
+            <a:schemeClr val="accent1">
+              <a:shade val="50000"/>
+            </a:schemeClr>
+          </a:lnRef>
+          <a:fillRef idx="1">
+            <a:schemeClr val="accent1"/>
+          </a:fillRef>
+          <a:effectRef idx="0">
+            <a:schemeClr val="accent1"/>
+          </a:effectRef>
+          <a:fontRef idx="minor">
+            <a:schemeClr val="lt1"/>
+          </a:fontRef>
+        </p:style>
+        <p:txBody>
+          <a:bodyPr lIns="110780" tIns="55390" rIns="110780" bIns="55390" spcCol="0" rtlCol="0" anchor="ctr"/>
+          <a:lstStyle/>
+          <a:p>
+            <a:pPr algn="ctr"/>
+            <a:r>
+              <a:rPr lang="en-US" altLang="ko-KR" sz="1400" smtClean="0">
+                <a:latin typeface="나눔스퀘어 ExtraBold" pitchFamily="50" charset="-127"/>
+                <a:ea typeface="나눔스퀘어 ExtraBold" pitchFamily="50" charset="-127"/>
+              </a:rPr>
+              <a:t>TCP</a:t>
+            </a:r>
+            <a:endParaRPr lang="ko-KR" altLang="en-US" sz="1400">
+              <a:latin typeface="나눔스퀘어 ExtraBold" pitchFamily="50" charset="-127"/>
+              <a:ea typeface="나눔스퀘어 ExtraBold" pitchFamily="50" charset="-127"/>
+            </a:endParaRPr>
+          </a:p>
+        </p:txBody>
+      </p:sp>
+      <p:sp>
+        <p:nvSpPr>
+          <p:cNvPr id="75" name="직사각형 74"/>
+          <p:cNvSpPr/>
+          <p:nvPr/>
+        </p:nvSpPr>
+        <p:spPr>
+          <a:xfrm>
+            <a:off x="8526208" y="4853706"/>
+            <a:ext cx="529314" cy="440878"/>
+          </a:xfrm>
+          <a:prstGeom prst="rect">
+            <a:avLst/>
+          </a:prstGeom>
+          <a:ln w="12700">
+            <a:solidFill>
+              <a:schemeClr val="tx1">
+                <a:lumMod val="65000"/>
+                <a:lumOff val="35000"/>
+              </a:schemeClr>
+            </a:solidFill>
+          </a:ln>
+        </p:spPr>
+        <p:style>
+          <a:lnRef idx="2">
+            <a:schemeClr val="accent1">
+              <a:shade val="50000"/>
+            </a:schemeClr>
+          </a:lnRef>
+          <a:fillRef idx="1">
+            <a:schemeClr val="accent1"/>
+          </a:fillRef>
+          <a:effectRef idx="0">
+            <a:schemeClr val="accent1"/>
+          </a:effectRef>
+          <a:fontRef idx="minor">
+            <a:schemeClr val="lt1"/>
+          </a:fontRef>
+        </p:style>
+        <p:txBody>
+          <a:bodyPr lIns="110780" tIns="55390" rIns="110780" bIns="55390" spcCol="0" rtlCol="0" anchor="ctr"/>
+          <a:lstStyle/>
+          <a:p>
+            <a:pPr algn="ctr"/>
+            <a:r>
+              <a:rPr lang="en-US" altLang="ko-KR" sz="1400" smtClean="0">
+                <a:latin typeface="나눔스퀘어 ExtraBold" pitchFamily="50" charset="-127"/>
+                <a:ea typeface="나눔스퀘어 ExtraBold" pitchFamily="50" charset="-127"/>
+              </a:rPr>
+              <a:t>IP</a:t>
+            </a:r>
+            <a:endParaRPr lang="ko-KR" altLang="en-US" sz="1400">
+              <a:latin typeface="나눔스퀘어 ExtraBold" pitchFamily="50" charset="-127"/>
+              <a:ea typeface="나눔스퀘어 ExtraBold" pitchFamily="50" charset="-127"/>
+            </a:endParaRPr>
+          </a:p>
+        </p:txBody>
+      </p:sp>
+      <p:sp>
+        <p:nvSpPr>
+          <p:cNvPr id="76" name="직사각형 75"/>
+          <p:cNvSpPr/>
+          <p:nvPr/>
+        </p:nvSpPr>
+        <p:spPr>
+          <a:xfrm>
+            <a:off x="7518096" y="4853706"/>
+            <a:ext cx="1008112" cy="440878"/>
+          </a:xfrm>
+          <a:prstGeom prst="rect">
+            <a:avLst/>
+          </a:prstGeom>
+          <a:solidFill>
+            <a:srgbClr val="00487E"/>
+          </a:solidFill>
+          <a:ln w="12700">
+            <a:solidFill>
+              <a:schemeClr val="tx1">
+                <a:lumMod val="65000"/>
+                <a:lumOff val="35000"/>
+              </a:schemeClr>
+            </a:solidFill>
+          </a:ln>
+        </p:spPr>
+        <p:style>
+          <a:lnRef idx="2">
+            <a:schemeClr val="accent1">
+              <a:shade val="50000"/>
+            </a:schemeClr>
+          </a:lnRef>
+          <a:fillRef idx="1">
+            <a:schemeClr val="accent1"/>
+          </a:fillRef>
+          <a:effectRef idx="0">
+            <a:schemeClr val="accent1"/>
+          </a:effectRef>
+          <a:fontRef idx="minor">
+            <a:schemeClr val="lt1"/>
+          </a:fontRef>
+        </p:style>
+        <p:txBody>
+          <a:bodyPr lIns="110780" tIns="55390" rIns="110780" bIns="55390" spcCol="0" rtlCol="0" anchor="ctr"/>
+          <a:lstStyle/>
+          <a:p>
+            <a:pPr algn="ctr"/>
+            <a:r>
+              <a:rPr lang="en-US" altLang="ko-KR" sz="1400" smtClean="0">
+                <a:latin typeface="나눔스퀘어 ExtraBold" pitchFamily="50" charset="-127"/>
+                <a:ea typeface="나눔스퀘어 ExtraBold" pitchFamily="50" charset="-127"/>
+              </a:rPr>
+              <a:t>Ethernet</a:t>
+            </a:r>
+            <a:endParaRPr lang="ko-KR" altLang="en-US" sz="1400">
+              <a:latin typeface="나눔스퀘어 ExtraBold" pitchFamily="50" charset="-127"/>
+              <a:ea typeface="나눔스퀘어 ExtraBold" pitchFamily="50" charset="-127"/>
+            </a:endParaRPr>
+          </a:p>
+        </p:txBody>
+      </p:sp>
+      <p:sp>
+        <p:nvSpPr>
+          <p:cNvPr id="77" name="직사각형 76"/>
+          <p:cNvSpPr/>
+          <p:nvPr/>
+        </p:nvSpPr>
+        <p:spPr>
+          <a:xfrm>
+            <a:off x="8651116" y="4266897"/>
+            <a:ext cx="926345" cy="440878"/>
+          </a:xfrm>
+          <a:prstGeom prst="rect">
+            <a:avLst/>
+          </a:prstGeom>
+          <a:solidFill>
+            <a:srgbClr val="CF3531"/>
+          </a:solidFill>
+          <a:ln w="12700">
+            <a:solidFill>
+              <a:schemeClr val="tx1">
+                <a:lumMod val="65000"/>
+                <a:lumOff val="35000"/>
+              </a:schemeClr>
+            </a:solidFill>
+          </a:ln>
+        </p:spPr>
+        <p:style>
+          <a:lnRef idx="2">
+            <a:schemeClr val="accent1">
+              <a:shade val="50000"/>
+            </a:schemeClr>
+          </a:lnRef>
+          <a:fillRef idx="1">
+            <a:schemeClr val="accent1"/>
+          </a:fillRef>
+          <a:effectRef idx="0">
+            <a:schemeClr val="accent1"/>
+          </a:effectRef>
+          <a:fontRef idx="minor">
+            <a:schemeClr val="lt1"/>
+          </a:fontRef>
+        </p:style>
+        <p:txBody>
+          <a:bodyPr lIns="110780" tIns="55390" rIns="110780" bIns="55390" spcCol="0" rtlCol="0" anchor="ctr"/>
+          <a:lstStyle/>
+          <a:p>
+            <a:pPr algn="ctr"/>
+            <a:r>
+              <a:rPr lang="en-US" altLang="ko-KR" sz="1400" smtClean="0">
+                <a:latin typeface="나눔스퀘어 ExtraBold" pitchFamily="50" charset="-127"/>
+                <a:ea typeface="나눔스퀘어 ExtraBold" pitchFamily="50" charset="-127"/>
+              </a:rPr>
+              <a:t>HTTP</a:t>
+            </a:r>
+            <a:endParaRPr lang="ko-KR" altLang="en-US" sz="1400">
+              <a:latin typeface="나눔스퀘어 ExtraBold" pitchFamily="50" charset="-127"/>
+              <a:ea typeface="나눔스퀘어 ExtraBold" pitchFamily="50" charset="-127"/>
+            </a:endParaRPr>
+          </a:p>
+        </p:txBody>
+      </p:sp>
+      <p:sp>
+        <p:nvSpPr>
+          <p:cNvPr id="78" name="직사각형 77"/>
+          <p:cNvSpPr/>
+          <p:nvPr/>
+        </p:nvSpPr>
+        <p:spPr>
+          <a:xfrm>
+            <a:off x="8047410" y="4266897"/>
+            <a:ext cx="603706" cy="440878"/>
+          </a:xfrm>
+          <a:prstGeom prst="rect">
+            <a:avLst/>
+          </a:prstGeom>
+          <a:solidFill>
+            <a:srgbClr val="10A021"/>
+          </a:solidFill>
+          <a:ln w="12700">
+            <a:solidFill>
+              <a:schemeClr val="tx1">
+                <a:lumMod val="65000"/>
+                <a:lumOff val="35000"/>
+              </a:schemeClr>
+            </a:solidFill>
+          </a:ln>
+        </p:spPr>
+        <p:style>
+          <a:lnRef idx="2">
+            <a:schemeClr val="accent1">
+              <a:shade val="50000"/>
+            </a:schemeClr>
+          </a:lnRef>
+          <a:fillRef idx="1">
+            <a:schemeClr val="accent1"/>
+          </a:fillRef>
+          <a:effectRef idx="0">
+            <a:schemeClr val="accent1"/>
+          </a:effectRef>
+          <a:fontRef idx="minor">
+            <a:schemeClr val="lt1"/>
+          </a:fontRef>
+        </p:style>
+        <p:txBody>
+          <a:bodyPr lIns="110780" tIns="55390" rIns="110780" bIns="55390" spcCol="0" rtlCol="0" anchor="ctr"/>
+          <a:lstStyle/>
+          <a:p>
+            <a:pPr algn="ctr"/>
+            <a:r>
+              <a:rPr lang="en-US" altLang="ko-KR" sz="1400" smtClean="0">
+                <a:latin typeface="나눔스퀘어 ExtraBold" pitchFamily="50" charset="-127"/>
+                <a:ea typeface="나눔스퀘어 ExtraBold" pitchFamily="50" charset="-127"/>
+              </a:rPr>
+              <a:t>TCP</a:t>
+            </a:r>
+            <a:endParaRPr lang="ko-KR" altLang="en-US" sz="1400">
+              <a:latin typeface="나눔스퀘어 ExtraBold" pitchFamily="50" charset="-127"/>
+              <a:ea typeface="나눔스퀘어 ExtraBold" pitchFamily="50" charset="-127"/>
+            </a:endParaRPr>
+          </a:p>
+        </p:txBody>
+      </p:sp>
+      <p:sp>
+        <p:nvSpPr>
+          <p:cNvPr id="81" name="직사각형 80"/>
+          <p:cNvSpPr/>
+          <p:nvPr/>
+        </p:nvSpPr>
+        <p:spPr>
+          <a:xfrm>
+            <a:off x="7518096" y="4266897"/>
+            <a:ext cx="529314" cy="440878"/>
+          </a:xfrm>
+          <a:prstGeom prst="rect">
+            <a:avLst/>
+          </a:prstGeom>
+          <a:ln w="12700">
+            <a:solidFill>
+              <a:schemeClr val="tx1">
+                <a:lumMod val="65000"/>
+                <a:lumOff val="35000"/>
+              </a:schemeClr>
+            </a:solidFill>
+          </a:ln>
+        </p:spPr>
+        <p:style>
+          <a:lnRef idx="2">
+            <a:schemeClr val="accent1">
+              <a:shade val="50000"/>
+            </a:schemeClr>
+          </a:lnRef>
+          <a:fillRef idx="1">
+            <a:schemeClr val="accent1"/>
+          </a:fillRef>
+          <a:effectRef idx="0">
+            <a:schemeClr val="accent1"/>
+          </a:effectRef>
+          <a:fontRef idx="minor">
+            <a:schemeClr val="lt1"/>
+          </a:fontRef>
+        </p:style>
+        <p:txBody>
+          <a:bodyPr lIns="110780" tIns="55390" rIns="110780" bIns="55390" spcCol="0" rtlCol="0" anchor="ctr"/>
+          <a:lstStyle/>
+          <a:p>
+            <a:pPr algn="ctr"/>
+            <a:r>
+              <a:rPr lang="en-US" altLang="ko-KR" sz="1400" smtClean="0">
+                <a:latin typeface="나눔스퀘어 ExtraBold" pitchFamily="50" charset="-127"/>
+                <a:ea typeface="나눔스퀘어 ExtraBold" pitchFamily="50" charset="-127"/>
+              </a:rPr>
+              <a:t>IP</a:t>
+            </a:r>
+            <a:endParaRPr lang="ko-KR" altLang="en-US" sz="1400">
+              <a:latin typeface="나눔스퀘어 ExtraBold" pitchFamily="50" charset="-127"/>
+              <a:ea typeface="나눔스퀘어 ExtraBold" pitchFamily="50" charset="-127"/>
+            </a:endParaRPr>
+          </a:p>
+        </p:txBody>
+      </p:sp>
+      <p:sp>
+        <p:nvSpPr>
+          <p:cNvPr id="82" name="직사각형 81"/>
+          <p:cNvSpPr/>
+          <p:nvPr/>
+        </p:nvSpPr>
+        <p:spPr>
+          <a:xfrm>
+            <a:off x="8121802" y="3680087"/>
+            <a:ext cx="926345" cy="440878"/>
+          </a:xfrm>
+          <a:prstGeom prst="rect">
+            <a:avLst/>
+          </a:prstGeom>
+          <a:solidFill>
+            <a:srgbClr val="CF3531"/>
+          </a:solidFill>
+          <a:ln w="12700">
+            <a:solidFill>
+              <a:schemeClr val="tx1">
+                <a:lumMod val="65000"/>
+                <a:lumOff val="35000"/>
+              </a:schemeClr>
+            </a:solidFill>
+          </a:ln>
+        </p:spPr>
+        <p:style>
+          <a:lnRef idx="2">
+            <a:schemeClr val="accent1">
+              <a:shade val="50000"/>
+            </a:schemeClr>
+          </a:lnRef>
+          <a:fillRef idx="1">
+            <a:schemeClr val="accent1"/>
+          </a:fillRef>
+          <a:effectRef idx="0">
+            <a:schemeClr val="accent1"/>
+          </a:effectRef>
+          <a:fontRef idx="minor">
+            <a:schemeClr val="lt1"/>
+          </a:fontRef>
+        </p:style>
+        <p:txBody>
+          <a:bodyPr lIns="110780" tIns="55390" rIns="110780" bIns="55390" spcCol="0" rtlCol="0" anchor="ctr"/>
+          <a:lstStyle/>
+          <a:p>
+            <a:pPr algn="ctr"/>
+            <a:r>
+              <a:rPr lang="en-US" altLang="ko-KR" sz="1400" smtClean="0">
+                <a:latin typeface="나눔스퀘어 ExtraBold" pitchFamily="50" charset="-127"/>
+                <a:ea typeface="나눔스퀘어 ExtraBold" pitchFamily="50" charset="-127"/>
+              </a:rPr>
+              <a:t>HTTP</a:t>
+            </a:r>
+            <a:endParaRPr lang="ko-KR" altLang="en-US" sz="1400">
+              <a:latin typeface="나눔스퀘어 ExtraBold" pitchFamily="50" charset="-127"/>
+              <a:ea typeface="나눔스퀘어 ExtraBold" pitchFamily="50" charset="-127"/>
+            </a:endParaRPr>
+          </a:p>
+        </p:txBody>
+      </p:sp>
+      <p:sp>
+        <p:nvSpPr>
+          <p:cNvPr id="83" name="직사각형 82"/>
+          <p:cNvSpPr/>
+          <p:nvPr/>
+        </p:nvSpPr>
+        <p:spPr>
+          <a:xfrm>
+            <a:off x="7518096" y="3680087"/>
+            <a:ext cx="603706" cy="440878"/>
+          </a:xfrm>
+          <a:prstGeom prst="rect">
+            <a:avLst/>
+          </a:prstGeom>
+          <a:solidFill>
+            <a:srgbClr val="10A021"/>
+          </a:solidFill>
+          <a:ln w="12700">
+            <a:solidFill>
+              <a:schemeClr val="tx1">
+                <a:lumMod val="65000"/>
+                <a:lumOff val="35000"/>
+              </a:schemeClr>
+            </a:solidFill>
+          </a:ln>
+        </p:spPr>
+        <p:style>
+          <a:lnRef idx="2">
+            <a:schemeClr val="accent1">
+              <a:shade val="50000"/>
+            </a:schemeClr>
+          </a:lnRef>
+          <a:fillRef idx="1">
+            <a:schemeClr val="accent1"/>
+          </a:fillRef>
+          <a:effectRef idx="0">
+            <a:schemeClr val="accent1"/>
+          </a:effectRef>
+          <a:fontRef idx="minor">
+            <a:schemeClr val="lt1"/>
+          </a:fontRef>
+        </p:style>
+        <p:txBody>
+          <a:bodyPr lIns="110780" tIns="55390" rIns="110780" bIns="55390" spcCol="0" rtlCol="0" anchor="ctr"/>
+          <a:lstStyle/>
+          <a:p>
+            <a:pPr algn="ctr"/>
+            <a:r>
+              <a:rPr lang="en-US" altLang="ko-KR" sz="1400" smtClean="0">
+                <a:latin typeface="나눔스퀘어 ExtraBold" pitchFamily="50" charset="-127"/>
+                <a:ea typeface="나눔스퀘어 ExtraBold" pitchFamily="50" charset="-127"/>
+              </a:rPr>
+              <a:t>TCP</a:t>
+            </a:r>
+            <a:endParaRPr lang="ko-KR" altLang="en-US" sz="1400">
+              <a:latin typeface="나눔스퀘어 ExtraBold" pitchFamily="50" charset="-127"/>
+              <a:ea typeface="나눔스퀘어 ExtraBold" pitchFamily="50" charset="-127"/>
+            </a:endParaRPr>
+          </a:p>
+        </p:txBody>
+      </p:sp>
+      <p:sp>
+        <p:nvSpPr>
+          <p:cNvPr id="84" name="직사각형 83"/>
+          <p:cNvSpPr/>
+          <p:nvPr/>
+        </p:nvSpPr>
+        <p:spPr>
+          <a:xfrm>
+            <a:off x="7518096" y="1919660"/>
+            <a:ext cx="926345" cy="440878"/>
+          </a:xfrm>
+          <a:prstGeom prst="rect">
+            <a:avLst/>
+          </a:prstGeom>
+          <a:solidFill>
+            <a:srgbClr val="CF3531"/>
+          </a:solidFill>
+          <a:ln w="12700">
+            <a:solidFill>
+              <a:schemeClr val="tx1">
+                <a:lumMod val="65000"/>
+                <a:lumOff val="35000"/>
+              </a:schemeClr>
+            </a:solidFill>
+          </a:ln>
+        </p:spPr>
+        <p:style>
+          <a:lnRef idx="2">
+            <a:schemeClr val="accent1">
+              <a:shade val="50000"/>
+            </a:schemeClr>
+          </a:lnRef>
+          <a:fillRef idx="1">
+            <a:schemeClr val="accent1"/>
+          </a:fillRef>
+          <a:effectRef idx="0">
+            <a:schemeClr val="accent1"/>
+          </a:effectRef>
+          <a:fontRef idx="minor">
+            <a:schemeClr val="lt1"/>
+          </a:fontRef>
+        </p:style>
+        <p:txBody>
+          <a:bodyPr lIns="110780" tIns="55390" rIns="110780" bIns="55390" spcCol="0" rtlCol="0" anchor="ctr"/>
+          <a:lstStyle/>
+          <a:p>
+            <a:pPr algn="ctr"/>
+            <a:r>
+              <a:rPr lang="en-US" altLang="ko-KR" sz="1400" smtClean="0">
+                <a:latin typeface="나눔스퀘어 ExtraBold" pitchFamily="50" charset="-127"/>
+                <a:ea typeface="나눔스퀘어 ExtraBold" pitchFamily="50" charset="-127"/>
+              </a:rPr>
+              <a:t>HTTP</a:t>
+            </a:r>
+            <a:endParaRPr lang="ko-KR" altLang="en-US" sz="1400">
+              <a:latin typeface="나눔스퀘어 ExtraBold" pitchFamily="50" charset="-127"/>
+              <a:ea typeface="나눔스퀘어 ExtraBold" pitchFamily="50" charset="-127"/>
+            </a:endParaRPr>
+          </a:p>
+        </p:txBody>
+      </p:sp>
+      <p:cxnSp>
+        <p:nvCxnSpPr>
+          <p:cNvPr id="12" name="구부러진 연결선 11"/>
+          <p:cNvCxnSpPr>
+            <a:stCxn id="67" idx="2"/>
+            <a:endCxn id="48" idx="1"/>
+          </p:cNvCxnSpPr>
+          <p:nvPr/>
+        </p:nvCxnSpPr>
+        <p:spPr>
+          <a:xfrm rot="16200000" flipH="1">
+            <a:off x="3927676" y="4907713"/>
+            <a:ext cx="366370" cy="1140111"/>
+          </a:xfrm>
+          <a:prstGeom prst="curvedConnector2">
+            <a:avLst/>
+          </a:prstGeom>
+          <a:ln w="19050">
+            <a:solidFill>
+              <a:schemeClr val="tx1">
+                <a:lumMod val="65000"/>
+                <a:lumOff val="35000"/>
+              </a:schemeClr>
+            </a:solidFill>
+            <a:tailEnd type="arrow"/>
+          </a:ln>
+        </p:spPr>
+        <p:style>
+          <a:lnRef idx="1">
+            <a:schemeClr val="accent1"/>
+          </a:lnRef>
+          <a:fillRef idx="0">
+            <a:schemeClr val="accent1"/>
+          </a:fillRef>
+          <a:effectRef idx="0">
+            <a:schemeClr val="accent1"/>
+          </a:effectRef>
+          <a:fontRef idx="minor">
+            <a:schemeClr val="tx1"/>
+          </a:fontRef>
+        </p:style>
+      </p:cxnSp>
+      <p:cxnSp>
+        <p:nvCxnSpPr>
+          <p:cNvPr id="20" name="구부러진 연결선 19"/>
+          <p:cNvCxnSpPr>
+            <a:stCxn id="48" idx="3"/>
+            <a:endCxn id="76" idx="2"/>
+          </p:cNvCxnSpPr>
+          <p:nvPr/>
+        </p:nvCxnSpPr>
+        <p:spPr>
+          <a:xfrm flipV="1">
+            <a:off x="6865190" y="5294584"/>
+            <a:ext cx="1156962" cy="366370"/>
+          </a:xfrm>
+          <a:prstGeom prst="curvedConnector2">
+            <a:avLst/>
+          </a:prstGeom>
+          <a:ln w="19050">
+            <a:solidFill>
+              <a:schemeClr val="tx1">
+                <a:lumMod val="65000"/>
+                <a:lumOff val="35000"/>
+              </a:schemeClr>
+            </a:solidFill>
+          </a:ln>
+        </p:spPr>
+        <p:style>
+          <a:lnRef idx="1">
+            <a:schemeClr val="accent1"/>
+          </a:lnRef>
+          <a:fillRef idx="0">
+            <a:schemeClr val="accent1"/>
+          </a:fillRef>
+          <a:effectRef idx="0">
+            <a:schemeClr val="accent1"/>
+          </a:effectRef>
+          <a:fontRef idx="minor">
+            <a:schemeClr val="tx1"/>
+          </a:fontRef>
+        </p:style>
+      </p:cxnSp>
+      <p:pic>
+        <p:nvPicPr>
+          <p:cNvPr id="1026" name="Picture 2"/>
+          <p:cNvPicPr>
+            <a:picLocks noChangeAspect="1" noChangeArrowheads="1"/>
+          </p:cNvPicPr>
+          <p:nvPr/>
+        </p:nvPicPr>
+        <p:blipFill>
+          <a:blip r:embed="rId2" cstate="print">
+            <a:extLst>
+              <a:ext uri="{28A0092B-C50C-407E-A947-70E740481C1C}">
+                <a14:useLocalDpi xmlns:a14="http://schemas.microsoft.com/office/drawing/2010/main" val="0"/>
+              </a:ext>
+            </a:extLst>
+          </a:blip>
+          <a:srcRect/>
+          <a:stretch>
+            <a:fillRect/>
+          </a:stretch>
+        </p:blipFill>
+        <p:spPr bwMode="auto">
+          <a:xfrm>
+            <a:off x="3187821" y="1079847"/>
+            <a:ext cx="705969" cy="705969"/>
+          </a:xfrm>
+          <a:prstGeom prst="rect">
+            <a:avLst/>
+          </a:prstGeom>
+          <a:noFill/>
+          <a:ln>
+            <a:noFill/>
+          </a:ln>
+          <a:effectLst/>
+          <a:extLst>
+            <a:ext uri="{909E8E84-426E-40DD-AFC4-6F175D3DCCD1}">
+              <a14:hiddenFill xmlns:a14="http://schemas.microsoft.com/office/drawing/2010/main">
+                <a:solidFill>
+                  <a:schemeClr val="accent1"/>
+                </a:solidFill>
+              </a14:hiddenFill>
+            </a:ext>
+            <a:ext uri="{91240B29-F687-4F45-9708-019B960494DF}">
+              <a14:hiddenLine xmlns:a14="http://schemas.microsoft.com/office/drawing/2010/main" w="9525">
+                <a:solidFill>
+                  <a:schemeClr val="tx1"/>
+                </a:solidFill>
+                <a:miter lim="800000"/>
+                <a:headEnd/>
+                <a:tailEnd/>
+              </a14:hiddenLine>
+            </a:ext>
+            <a:ext uri="{AF507438-7753-43E0-B8FC-AC1667EBCBE1}">
+              <a14:hiddenEffects xmlns:a14="http://schemas.microsoft.com/office/drawing/2010/main">
+                <a:effectLst>
+                  <a:outerShdw dist="35921" dir="2700000" algn="ctr" rotWithShape="0">
+                    <a:schemeClr val="bg2"/>
+                  </a:outerShdw>
+                </a:effectLst>
+              </a14:hiddenEffects>
+            </a:ext>
+          </a:extLst>
+        </p:spPr>
+      </p:pic>
+      <p:pic>
+        <p:nvPicPr>
+          <p:cNvPr id="1027" name="Picture 3"/>
+          <p:cNvPicPr>
+            <a:picLocks noChangeAspect="1" noChangeArrowheads="1"/>
+          </p:cNvPicPr>
+          <p:nvPr/>
+        </p:nvPicPr>
+        <p:blipFill>
+          <a:blip r:embed="rId3" cstate="print">
+            <a:extLst>
+              <a:ext uri="{28A0092B-C50C-407E-A947-70E740481C1C}">
+                <a14:useLocalDpi xmlns:a14="http://schemas.microsoft.com/office/drawing/2010/main" val="0"/>
+              </a:ext>
+            </a:extLst>
+          </a:blip>
+          <a:srcRect/>
+          <a:stretch>
+            <a:fillRect/>
+          </a:stretch>
+        </p:blipFill>
+        <p:spPr bwMode="auto">
+          <a:xfrm>
+            <a:off x="7651766" y="1103329"/>
+            <a:ext cx="659005" cy="659005"/>
+          </a:xfrm>
+          <a:prstGeom prst="rect">
+            <a:avLst/>
+          </a:prstGeom>
+          <a:noFill/>
+          <a:ln>
+            <a:noFill/>
+          </a:ln>
+          <a:effectLst/>
+          <a:extLst>
+            <a:ext uri="{909E8E84-426E-40DD-AFC4-6F175D3DCCD1}">
+              <a14:hiddenFill xmlns:a14="http://schemas.microsoft.com/office/drawing/2010/main">
+                <a:solidFill>
+                  <a:schemeClr val="accent1"/>
+                </a:solidFill>
+              </a14:hiddenFill>
+            </a:ext>
+            <a:ext uri="{91240B29-F687-4F45-9708-019B960494DF}">
+              <a14:hiddenLine xmlns:a14="http://schemas.microsoft.com/office/drawing/2010/main" w="9525">
+                <a:solidFill>
+                  <a:schemeClr val="tx1"/>
+                </a:solidFill>
+                <a:miter lim="800000"/>
+                <a:headEnd/>
+                <a:tailEnd/>
+              </a14:hiddenLine>
+            </a:ext>
+            <a:ext uri="{AF507438-7753-43E0-B8FC-AC1667EBCBE1}">
+              <a14:hiddenEffects xmlns:a14="http://schemas.microsoft.com/office/drawing/2010/main">
+                <a:effectLst>
+                  <a:outerShdw dist="35921" dir="2700000" algn="ctr" rotWithShape="0">
+                    <a:schemeClr val="bg2"/>
+                  </a:outerShdw>
+                </a:effectLst>
+              </a14:hiddenEffects>
+            </a:ext>
+          </a:extLst>
+        </p:spPr>
+      </p:pic>
+      <p:sp>
+        <p:nvSpPr>
+          <p:cNvPr id="97" name="TextBox 96"/>
+          <p:cNvSpPr txBox="1"/>
+          <p:nvPr/>
+        </p:nvSpPr>
+        <p:spPr>
+          <a:xfrm>
+            <a:off x="3077632" y="453378"/>
+            <a:ext cx="926345" cy="615553"/>
+          </a:xfrm>
+          <a:prstGeom prst="rect">
+            <a:avLst/>
+          </a:prstGeom>
+          <a:noFill/>
+        </p:spPr>
+        <p:txBody>
+          <a:bodyPr wrap="square" rtlCol="0">
+            <a:spAutoFit/>
+          </a:bodyPr>
+          <a:lstStyle/>
+          <a:p>
+            <a:pPr algn="ctr"/>
+            <a:r>
+              <a:rPr lang="en-US" altLang="ko-KR" sz="2000" smtClean="0">
+                <a:latin typeface="나눔스퀘어 ExtraBold" pitchFamily="50" charset="-127"/>
+                <a:ea typeface="나눔스퀘어 ExtraBold" pitchFamily="50" charset="-127"/>
+              </a:rPr>
+              <a:t>Client</a:t>
+            </a:r>
+          </a:p>
+          <a:p>
+            <a:pPr algn="ctr"/>
+            <a:r>
+              <a:rPr lang="en-US" altLang="ko-KR" sz="1400" smtClean="0">
+                <a:latin typeface="나눔스퀘어 ExtraBold" pitchFamily="50" charset="-127"/>
+                <a:ea typeface="나눔스퀘어 ExtraBold" pitchFamily="50" charset="-127"/>
+              </a:rPr>
+              <a:t>(source)</a:t>
+            </a:r>
+            <a:endParaRPr lang="ko-KR" altLang="en-US" sz="1400">
+              <a:latin typeface="나눔스퀘어 ExtraBold" pitchFamily="50" charset="-127"/>
+              <a:ea typeface="나눔스퀘어 ExtraBold" pitchFamily="50" charset="-127"/>
+            </a:endParaRPr>
+          </a:p>
+        </p:txBody>
+      </p:sp>
+      <p:sp>
+        <p:nvSpPr>
+          <p:cNvPr id="103" name="TextBox 102"/>
+          <p:cNvSpPr txBox="1"/>
+          <p:nvPr/>
+        </p:nvSpPr>
+        <p:spPr>
+          <a:xfrm>
+            <a:off x="7303136" y="453377"/>
+            <a:ext cx="1356263" cy="615553"/>
+          </a:xfrm>
+          <a:prstGeom prst="rect">
+            <a:avLst/>
+          </a:prstGeom>
+          <a:noFill/>
+        </p:spPr>
+        <p:txBody>
+          <a:bodyPr wrap="square" rtlCol="0">
+            <a:spAutoFit/>
+          </a:bodyPr>
+          <a:lstStyle/>
+          <a:p>
+            <a:pPr algn="ctr"/>
+            <a:r>
+              <a:rPr lang="en-US" altLang="ko-KR" sz="2000" smtClean="0">
+                <a:latin typeface="나눔스퀘어 ExtraBold" pitchFamily="50" charset="-127"/>
+                <a:ea typeface="나눔스퀘어 ExtraBold" pitchFamily="50" charset="-127"/>
+              </a:rPr>
+              <a:t>Server</a:t>
+            </a:r>
+          </a:p>
+          <a:p>
+            <a:pPr algn="ctr"/>
+            <a:r>
+              <a:rPr lang="en-US" altLang="ko-KR" sz="1400" smtClean="0">
+                <a:latin typeface="나눔스퀘어 ExtraBold" pitchFamily="50" charset="-127"/>
+                <a:ea typeface="나눔스퀘어 ExtraBold" pitchFamily="50" charset="-127"/>
+              </a:rPr>
+              <a:t>(Destination)</a:t>
+            </a:r>
+            <a:endParaRPr lang="ko-KR" altLang="en-US" sz="1400">
+              <a:latin typeface="나눔스퀘어 ExtraBold" pitchFamily="50" charset="-127"/>
+              <a:ea typeface="나눔스퀘어 ExtraBold" pitchFamily="50" charset="-127"/>
+            </a:endParaRPr>
+          </a:p>
+        </p:txBody>
+      </p:sp>
+    </p:spTree>
+    <p:extLst>
+      <p:ext uri="{BB962C8B-B14F-4D97-AF65-F5344CB8AC3E}">
+        <p14:creationId xmlns:p14="http://schemas.microsoft.com/office/powerpoint/2010/main" val="2878156311"/>
       </p:ext>
     </p:extLst>
   </p:cSld>

</xml_diff>

<commit_message>
update css - change img border to shadow
update post
- update packet sniffing ch2
</commit_message>
<xml_diff>
--- a/assets/etc/이미지제작용.pptx
+++ b/assets/etc/이미지제작용.pptx
@@ -8,6 +8,7 @@
     <p:sldId id="256" r:id="rId2"/>
     <p:sldId id="257" r:id="rId3"/>
     <p:sldId id="258" r:id="rId4"/>
+    <p:sldId id="259" r:id="rId5"/>
   </p:sldIdLst>
   <p:sldSz cx="11522075" cy="6480175"/>
   <p:notesSz cx="6858000" cy="9144000"/>
@@ -290,7 +291,7 @@
           <a:p>
             <a:fld id="{10B01263-E573-4C51-9265-094B7818CB45}" type="datetimeFigureOut">
               <a:rPr lang="ko-KR" altLang="en-US" smtClean="0"/>
-              <a:t>2024-02-16</a:t>
+              <a:t>2024-02-21</a:t>
             </a:fld>
             <a:endParaRPr lang="ko-KR" altLang="en-US"/>
           </a:p>
@@ -460,7 +461,7 @@
           <a:p>
             <a:fld id="{10B01263-E573-4C51-9265-094B7818CB45}" type="datetimeFigureOut">
               <a:rPr lang="ko-KR" altLang="en-US" smtClean="0"/>
-              <a:t>2024-02-16</a:t>
+              <a:t>2024-02-21</a:t>
             </a:fld>
             <a:endParaRPr lang="ko-KR" altLang="en-US"/>
           </a:p>
@@ -640,7 +641,7 @@
           <a:p>
             <a:fld id="{10B01263-E573-4C51-9265-094B7818CB45}" type="datetimeFigureOut">
               <a:rPr lang="ko-KR" altLang="en-US" smtClean="0"/>
-              <a:t>2024-02-16</a:t>
+              <a:t>2024-02-21</a:t>
             </a:fld>
             <a:endParaRPr lang="ko-KR" altLang="en-US"/>
           </a:p>
@@ -810,7 +811,7 @@
           <a:p>
             <a:fld id="{10B01263-E573-4C51-9265-094B7818CB45}" type="datetimeFigureOut">
               <a:rPr lang="ko-KR" altLang="en-US" smtClean="0"/>
-              <a:t>2024-02-16</a:t>
+              <a:t>2024-02-21</a:t>
             </a:fld>
             <a:endParaRPr lang="ko-KR" altLang="en-US"/>
           </a:p>
@@ -1056,7 +1057,7 @@
           <a:p>
             <a:fld id="{10B01263-E573-4C51-9265-094B7818CB45}" type="datetimeFigureOut">
               <a:rPr lang="ko-KR" altLang="en-US" smtClean="0"/>
-              <a:t>2024-02-16</a:t>
+              <a:t>2024-02-21</a:t>
             </a:fld>
             <a:endParaRPr lang="ko-KR" altLang="en-US"/>
           </a:p>
@@ -1344,7 +1345,7 @@
           <a:p>
             <a:fld id="{10B01263-E573-4C51-9265-094B7818CB45}" type="datetimeFigureOut">
               <a:rPr lang="ko-KR" altLang="en-US" smtClean="0"/>
-              <a:t>2024-02-16</a:t>
+              <a:t>2024-02-21</a:t>
             </a:fld>
             <a:endParaRPr lang="ko-KR" altLang="en-US"/>
           </a:p>
@@ -1766,7 +1767,7 @@
           <a:p>
             <a:fld id="{10B01263-E573-4C51-9265-094B7818CB45}" type="datetimeFigureOut">
               <a:rPr lang="ko-KR" altLang="en-US" smtClean="0"/>
-              <a:t>2024-02-16</a:t>
+              <a:t>2024-02-21</a:t>
             </a:fld>
             <a:endParaRPr lang="ko-KR" altLang="en-US"/>
           </a:p>
@@ -1884,7 +1885,7 @@
           <a:p>
             <a:fld id="{10B01263-E573-4C51-9265-094B7818CB45}" type="datetimeFigureOut">
               <a:rPr lang="ko-KR" altLang="en-US" smtClean="0"/>
-              <a:t>2024-02-16</a:t>
+              <a:t>2024-02-21</a:t>
             </a:fld>
             <a:endParaRPr lang="ko-KR" altLang="en-US"/>
           </a:p>
@@ -1979,7 +1980,7 @@
           <a:p>
             <a:fld id="{10B01263-E573-4C51-9265-094B7818CB45}" type="datetimeFigureOut">
               <a:rPr lang="ko-KR" altLang="en-US" smtClean="0"/>
-              <a:t>2024-02-16</a:t>
+              <a:t>2024-02-21</a:t>
             </a:fld>
             <a:endParaRPr lang="ko-KR" altLang="en-US"/>
           </a:p>
@@ -2256,7 +2257,7 @@
           <a:p>
             <a:fld id="{10B01263-E573-4C51-9265-094B7818CB45}" type="datetimeFigureOut">
               <a:rPr lang="ko-KR" altLang="en-US" smtClean="0"/>
-              <a:t>2024-02-16</a:t>
+              <a:t>2024-02-21</a:t>
             </a:fld>
             <a:endParaRPr lang="ko-KR" altLang="en-US"/>
           </a:p>
@@ -2509,7 +2510,7 @@
           <a:p>
             <a:fld id="{10B01263-E573-4C51-9265-094B7818CB45}" type="datetimeFigureOut">
               <a:rPr lang="ko-KR" altLang="en-US" smtClean="0"/>
-              <a:t>2024-02-16</a:t>
+              <a:t>2024-02-21</a:t>
             </a:fld>
             <a:endParaRPr lang="ko-KR" altLang="en-US"/>
           </a:p>
@@ -2722,7 +2723,7 @@
           <a:p>
             <a:fld id="{10B01263-E573-4C51-9265-094B7818CB45}" type="datetimeFigureOut">
               <a:rPr lang="ko-KR" altLang="en-US" smtClean="0"/>
-              <a:t>2024-02-16</a:t>
+              <a:t>2024-02-21</a:t>
             </a:fld>
             <a:endParaRPr lang="ko-KR" altLang="en-US"/>
           </a:p>
@@ -7622,6 +7623,915 @@
 </p:sld>
 </file>
 
+<file path=ppt/slides/slide4.xml><?xml version="1.0" encoding="utf-8"?>
+<p:sld xmlns:a="http://schemas.openxmlformats.org/drawingml/2006/main" xmlns:r="http://schemas.openxmlformats.org/officeDocument/2006/relationships" xmlns:p="http://schemas.openxmlformats.org/presentationml/2006/main">
+  <p:cSld>
+    <p:spTree>
+      <p:nvGrpSpPr>
+        <p:cNvPr id="1" name=""/>
+        <p:cNvGrpSpPr/>
+        <p:nvPr/>
+      </p:nvGrpSpPr>
+      <p:grpSpPr>
+        <a:xfrm>
+          <a:off x="0" y="0"/>
+          <a:ext cx="0" cy="0"/>
+          <a:chOff x="0" y="0"/>
+          <a:chExt cx="0" cy="0"/>
+        </a:xfrm>
+      </p:grpSpPr>
+      <p:sp>
+        <p:nvSpPr>
+          <p:cNvPr id="4" name="TextBox 3"/>
+          <p:cNvSpPr txBox="1"/>
+          <p:nvPr/>
+        </p:nvSpPr>
+        <p:spPr>
+          <a:xfrm>
+            <a:off x="2592685" y="1943943"/>
+            <a:ext cx="6696744" cy="430887"/>
+          </a:xfrm>
+          <a:prstGeom prst="rect">
+            <a:avLst/>
+          </a:prstGeom>
+          <a:noFill/>
+        </p:spPr>
+        <p:txBody>
+          <a:bodyPr wrap="square" rtlCol="0">
+            <a:spAutoFit/>
+          </a:bodyPr>
+          <a:lstStyle/>
+          <a:p>
+            <a:r>
+              <a:rPr lang="en-US" altLang="ko-KR" smtClean="0">
+                <a:latin typeface="나눔스퀘어 ExtraBold" pitchFamily="50" charset="-127"/>
+                <a:ea typeface="나눔스퀘어 ExtraBold" pitchFamily="50" charset="-127"/>
+              </a:rPr>
+              <a:t>dst  host  192.168.0.10     &amp;&amp;     tcp  port  80</a:t>
+            </a:r>
+            <a:endParaRPr lang="ko-KR" altLang="en-US">
+              <a:latin typeface="나눔스퀘어 ExtraBold" pitchFamily="50" charset="-127"/>
+              <a:ea typeface="나눔스퀘어 ExtraBold" pitchFamily="50" charset="-127"/>
+            </a:endParaRPr>
+          </a:p>
+        </p:txBody>
+      </p:sp>
+      <p:sp>
+        <p:nvSpPr>
+          <p:cNvPr id="6" name="왼쪽 중괄호 5"/>
+          <p:cNvSpPr/>
+          <p:nvPr/>
+        </p:nvSpPr>
+        <p:spPr>
+          <a:xfrm rot="5400000">
+            <a:off x="4068849" y="179747"/>
+            <a:ext cx="360040" cy="3168352"/>
+          </a:xfrm>
+          <a:prstGeom prst="leftBrace">
+            <a:avLst>
+              <a:gd name="adj1" fmla="val 33610"/>
+              <a:gd name="adj2" fmla="val 50000"/>
+            </a:avLst>
+          </a:prstGeom>
+          <a:ln w="25400">
+            <a:solidFill>
+              <a:schemeClr val="tx2">
+                <a:lumMod val="60000"/>
+                <a:lumOff val="40000"/>
+              </a:schemeClr>
+            </a:solidFill>
+          </a:ln>
+        </p:spPr>
+        <p:style>
+          <a:lnRef idx="1">
+            <a:schemeClr val="accent1"/>
+          </a:lnRef>
+          <a:fillRef idx="0">
+            <a:schemeClr val="accent1"/>
+          </a:fillRef>
+          <a:effectRef idx="0">
+            <a:schemeClr val="accent1"/>
+          </a:effectRef>
+          <a:fontRef idx="minor">
+            <a:schemeClr val="tx1"/>
+          </a:fontRef>
+        </p:style>
+        <p:txBody>
+          <a:bodyPr rtlCol="0" anchor="ctr"/>
+          <a:lstStyle/>
+          <a:p>
+            <a:pPr algn="ctr"/>
+            <a:endParaRPr lang="ko-KR" altLang="en-US"/>
+          </a:p>
+        </p:txBody>
+      </p:sp>
+      <p:sp>
+        <p:nvSpPr>
+          <p:cNvPr id="8" name="왼쪽 중괄호 7"/>
+          <p:cNvSpPr/>
+          <p:nvPr/>
+        </p:nvSpPr>
+        <p:spPr>
+          <a:xfrm rot="5400000">
+            <a:off x="7558235" y="939673"/>
+            <a:ext cx="360040" cy="1648500"/>
+          </a:xfrm>
+          <a:prstGeom prst="leftBrace">
+            <a:avLst>
+              <a:gd name="adj1" fmla="val 33610"/>
+              <a:gd name="adj2" fmla="val 50000"/>
+            </a:avLst>
+          </a:prstGeom>
+          <a:ln w="25400">
+            <a:solidFill>
+              <a:schemeClr val="tx2">
+                <a:lumMod val="60000"/>
+                <a:lumOff val="40000"/>
+              </a:schemeClr>
+            </a:solidFill>
+          </a:ln>
+        </p:spPr>
+        <p:style>
+          <a:lnRef idx="1">
+            <a:schemeClr val="accent1"/>
+          </a:lnRef>
+          <a:fillRef idx="0">
+            <a:schemeClr val="accent1"/>
+          </a:fillRef>
+          <a:effectRef idx="0">
+            <a:schemeClr val="accent1"/>
+          </a:effectRef>
+          <a:fontRef idx="minor">
+            <a:schemeClr val="tx1"/>
+          </a:fontRef>
+        </p:style>
+        <p:txBody>
+          <a:bodyPr rtlCol="0" anchor="ctr"/>
+          <a:lstStyle/>
+          <a:p>
+            <a:pPr algn="ctr"/>
+            <a:endParaRPr lang="ko-KR" altLang="en-US"/>
+          </a:p>
+        </p:txBody>
+      </p:sp>
+      <p:sp>
+        <p:nvSpPr>
+          <p:cNvPr id="9" name="왼쪽 중괄호 8"/>
+          <p:cNvSpPr/>
+          <p:nvPr/>
+        </p:nvSpPr>
+        <p:spPr>
+          <a:xfrm rot="5400000">
+            <a:off x="6193577" y="1544484"/>
+            <a:ext cx="360040" cy="438878"/>
+          </a:xfrm>
+          <a:prstGeom prst="leftBrace">
+            <a:avLst>
+              <a:gd name="adj1" fmla="val 18438"/>
+              <a:gd name="adj2" fmla="val 50000"/>
+            </a:avLst>
+          </a:prstGeom>
+          <a:ln w="25400">
+            <a:solidFill>
+              <a:schemeClr val="accent2">
+                <a:lumMod val="75000"/>
+              </a:schemeClr>
+            </a:solidFill>
+          </a:ln>
+        </p:spPr>
+        <p:style>
+          <a:lnRef idx="1">
+            <a:schemeClr val="accent1"/>
+          </a:lnRef>
+          <a:fillRef idx="0">
+            <a:schemeClr val="accent1"/>
+          </a:fillRef>
+          <a:effectRef idx="0">
+            <a:schemeClr val="accent1"/>
+          </a:effectRef>
+          <a:fontRef idx="minor">
+            <a:schemeClr val="tx1"/>
+          </a:fontRef>
+        </p:style>
+        <p:txBody>
+          <a:bodyPr rtlCol="0" anchor="ctr"/>
+          <a:lstStyle/>
+          <a:p>
+            <a:pPr algn="ctr"/>
+            <a:endParaRPr lang="ko-KR" altLang="en-US"/>
+          </a:p>
+        </p:txBody>
+      </p:sp>
+      <p:sp>
+        <p:nvSpPr>
+          <p:cNvPr id="10" name="TextBox 9"/>
+          <p:cNvSpPr txBox="1"/>
+          <p:nvPr/>
+        </p:nvSpPr>
+        <p:spPr>
+          <a:xfrm>
+            <a:off x="3636801" y="1269954"/>
+            <a:ext cx="1224136" cy="279796"/>
+          </a:xfrm>
+          <a:prstGeom prst="rect">
+            <a:avLst/>
+          </a:prstGeom>
+          <a:noFill/>
+        </p:spPr>
+        <p:txBody>
+          <a:bodyPr wrap="square" rtlCol="0">
+            <a:spAutoFit/>
+          </a:bodyPr>
+          <a:lstStyle/>
+          <a:p>
+            <a:pPr algn="ctr"/>
+            <a:r>
+              <a:rPr lang="en-US" altLang="ko-KR" sz="1600">
+                <a:solidFill>
+                  <a:schemeClr val="tx2">
+                    <a:lumMod val="60000"/>
+                    <a:lumOff val="40000"/>
+                  </a:schemeClr>
+                </a:solidFill>
+                <a:latin typeface="나눔스퀘어 ExtraBold" pitchFamily="50" charset="-127"/>
+                <a:ea typeface="나눔스퀘어 ExtraBold" pitchFamily="50" charset="-127"/>
+              </a:rPr>
+              <a:t>P</a:t>
+            </a:r>
+            <a:r>
+              <a:rPr lang="en-US" altLang="ko-KR" sz="1600" smtClean="0">
+                <a:solidFill>
+                  <a:schemeClr val="tx2">
+                    <a:lumMod val="60000"/>
+                    <a:lumOff val="40000"/>
+                  </a:schemeClr>
+                </a:solidFill>
+                <a:latin typeface="나눔스퀘어 ExtraBold" pitchFamily="50" charset="-127"/>
+                <a:ea typeface="나눔스퀘어 ExtraBold" pitchFamily="50" charset="-127"/>
+              </a:rPr>
+              <a:t>rimitive</a:t>
+            </a:r>
+            <a:endParaRPr lang="ko-KR" altLang="en-US" sz="1600">
+              <a:solidFill>
+                <a:schemeClr val="tx2">
+                  <a:lumMod val="60000"/>
+                  <a:lumOff val="40000"/>
+                </a:schemeClr>
+              </a:solidFill>
+              <a:latin typeface="나눔스퀘어 ExtraBold" pitchFamily="50" charset="-127"/>
+              <a:ea typeface="나눔스퀘어 ExtraBold" pitchFamily="50" charset="-127"/>
+            </a:endParaRPr>
+          </a:p>
+        </p:txBody>
+      </p:sp>
+      <p:sp>
+        <p:nvSpPr>
+          <p:cNvPr id="11" name="TextBox 10"/>
+          <p:cNvSpPr txBox="1"/>
+          <p:nvPr/>
+        </p:nvSpPr>
+        <p:spPr>
+          <a:xfrm>
+            <a:off x="7126187" y="1269954"/>
+            <a:ext cx="1224136" cy="279796"/>
+          </a:xfrm>
+          <a:prstGeom prst="rect">
+            <a:avLst/>
+          </a:prstGeom>
+          <a:noFill/>
+        </p:spPr>
+        <p:txBody>
+          <a:bodyPr wrap="square" rtlCol="0">
+            <a:spAutoFit/>
+          </a:bodyPr>
+          <a:lstStyle/>
+          <a:p>
+            <a:pPr algn="ctr"/>
+            <a:r>
+              <a:rPr lang="en-US" altLang="ko-KR" sz="1600">
+                <a:solidFill>
+                  <a:schemeClr val="tx2">
+                    <a:lumMod val="60000"/>
+                    <a:lumOff val="40000"/>
+                  </a:schemeClr>
+                </a:solidFill>
+                <a:latin typeface="나눔스퀘어 ExtraBold" pitchFamily="50" charset="-127"/>
+                <a:ea typeface="나눔스퀘어 ExtraBold" pitchFamily="50" charset="-127"/>
+              </a:rPr>
+              <a:t>P</a:t>
+            </a:r>
+            <a:r>
+              <a:rPr lang="en-US" altLang="ko-KR" sz="1600" smtClean="0">
+                <a:solidFill>
+                  <a:schemeClr val="tx2">
+                    <a:lumMod val="60000"/>
+                    <a:lumOff val="40000"/>
+                  </a:schemeClr>
+                </a:solidFill>
+                <a:latin typeface="나눔스퀘어 ExtraBold" pitchFamily="50" charset="-127"/>
+                <a:ea typeface="나눔스퀘어 ExtraBold" pitchFamily="50" charset="-127"/>
+              </a:rPr>
+              <a:t>rimitive</a:t>
+            </a:r>
+            <a:endParaRPr lang="ko-KR" altLang="en-US" sz="1600">
+              <a:solidFill>
+                <a:schemeClr val="tx2">
+                  <a:lumMod val="60000"/>
+                  <a:lumOff val="40000"/>
+                </a:schemeClr>
+              </a:solidFill>
+              <a:latin typeface="나눔스퀘어 ExtraBold" pitchFamily="50" charset="-127"/>
+              <a:ea typeface="나눔스퀘어 ExtraBold" pitchFamily="50" charset="-127"/>
+            </a:endParaRPr>
+          </a:p>
+        </p:txBody>
+      </p:sp>
+      <p:sp>
+        <p:nvSpPr>
+          <p:cNvPr id="12" name="TextBox 11"/>
+          <p:cNvSpPr txBox="1"/>
+          <p:nvPr/>
+        </p:nvSpPr>
+        <p:spPr>
+          <a:xfrm>
+            <a:off x="5761529" y="1269954"/>
+            <a:ext cx="1224136" cy="338554"/>
+          </a:xfrm>
+          <a:prstGeom prst="rect">
+            <a:avLst/>
+          </a:prstGeom>
+          <a:noFill/>
+        </p:spPr>
+        <p:txBody>
+          <a:bodyPr wrap="square" rtlCol="0">
+            <a:spAutoFit/>
+          </a:bodyPr>
+          <a:lstStyle/>
+          <a:p>
+            <a:pPr algn="ctr"/>
+            <a:r>
+              <a:rPr lang="ko-KR" altLang="en-US" sz="1600" smtClean="0">
+                <a:solidFill>
+                  <a:schemeClr val="accent2">
+                    <a:lumMod val="75000"/>
+                  </a:schemeClr>
+                </a:solidFill>
+                <a:latin typeface="나눔스퀘어 ExtraBold" pitchFamily="50" charset="-127"/>
+                <a:ea typeface="나눔스퀘어 ExtraBold" pitchFamily="50" charset="-127"/>
+              </a:rPr>
+              <a:t>연산자</a:t>
+            </a:r>
+            <a:endParaRPr lang="ko-KR" altLang="en-US" sz="1600">
+              <a:solidFill>
+                <a:schemeClr val="accent2">
+                  <a:lumMod val="75000"/>
+                </a:schemeClr>
+              </a:solidFill>
+              <a:latin typeface="나눔스퀘어 ExtraBold" pitchFamily="50" charset="-127"/>
+              <a:ea typeface="나눔스퀘어 ExtraBold" pitchFamily="50" charset="-127"/>
+            </a:endParaRPr>
+          </a:p>
+        </p:txBody>
+      </p:sp>
+      <p:sp>
+        <p:nvSpPr>
+          <p:cNvPr id="13" name="왼쪽 중괄호 12"/>
+          <p:cNvSpPr/>
+          <p:nvPr/>
+        </p:nvSpPr>
+        <p:spPr>
+          <a:xfrm rot="16200000">
+            <a:off x="2713699" y="2338826"/>
+            <a:ext cx="360040" cy="432048"/>
+          </a:xfrm>
+          <a:prstGeom prst="leftBrace">
+            <a:avLst>
+              <a:gd name="adj1" fmla="val 20371"/>
+              <a:gd name="adj2" fmla="val 50000"/>
+            </a:avLst>
+          </a:prstGeom>
+          <a:ln w="25400">
+            <a:solidFill>
+              <a:srgbClr val="00B050"/>
+            </a:solidFill>
+          </a:ln>
+        </p:spPr>
+        <p:style>
+          <a:lnRef idx="1">
+            <a:schemeClr val="accent1"/>
+          </a:lnRef>
+          <a:fillRef idx="0">
+            <a:schemeClr val="accent1"/>
+          </a:fillRef>
+          <a:effectRef idx="0">
+            <a:schemeClr val="accent1"/>
+          </a:effectRef>
+          <a:fontRef idx="minor">
+            <a:schemeClr val="tx1"/>
+          </a:fontRef>
+        </p:style>
+        <p:txBody>
+          <a:bodyPr rtlCol="0" anchor="ctr"/>
+          <a:lstStyle/>
+          <a:p>
+            <a:pPr algn="ctr"/>
+            <a:endParaRPr lang="ko-KR" altLang="en-US"/>
+          </a:p>
+        </p:txBody>
+      </p:sp>
+      <p:sp>
+        <p:nvSpPr>
+          <p:cNvPr id="14" name="왼쪽 중괄호 13"/>
+          <p:cNvSpPr/>
+          <p:nvPr/>
+        </p:nvSpPr>
+        <p:spPr>
+          <a:xfrm rot="16200000">
+            <a:off x="3372109" y="2261543"/>
+            <a:ext cx="360040" cy="586615"/>
+          </a:xfrm>
+          <a:prstGeom prst="leftBrace">
+            <a:avLst>
+              <a:gd name="adj1" fmla="val 20371"/>
+              <a:gd name="adj2" fmla="val 50000"/>
+            </a:avLst>
+          </a:prstGeom>
+          <a:ln w="25400">
+            <a:solidFill>
+              <a:srgbClr val="00B050"/>
+            </a:solidFill>
+          </a:ln>
+        </p:spPr>
+        <p:style>
+          <a:lnRef idx="1">
+            <a:schemeClr val="accent1"/>
+          </a:lnRef>
+          <a:fillRef idx="0">
+            <a:schemeClr val="accent1"/>
+          </a:fillRef>
+          <a:effectRef idx="0">
+            <a:schemeClr val="accent1"/>
+          </a:effectRef>
+          <a:fontRef idx="minor">
+            <a:schemeClr val="tx1"/>
+          </a:fontRef>
+        </p:style>
+        <p:txBody>
+          <a:bodyPr rtlCol="0" anchor="ctr"/>
+          <a:lstStyle/>
+          <a:p>
+            <a:pPr algn="ctr"/>
+            <a:endParaRPr lang="ko-KR" altLang="en-US"/>
+          </a:p>
+        </p:txBody>
+      </p:sp>
+      <p:sp>
+        <p:nvSpPr>
+          <p:cNvPr id="15" name="왼쪽 중괄호 14"/>
+          <p:cNvSpPr/>
+          <p:nvPr/>
+        </p:nvSpPr>
+        <p:spPr>
+          <a:xfrm rot="16200000">
+            <a:off x="7606851" y="2261544"/>
+            <a:ext cx="360040" cy="586615"/>
+          </a:xfrm>
+          <a:prstGeom prst="leftBrace">
+            <a:avLst>
+              <a:gd name="adj1" fmla="val 20371"/>
+              <a:gd name="adj2" fmla="val 50000"/>
+            </a:avLst>
+          </a:prstGeom>
+          <a:ln w="25400">
+            <a:solidFill>
+              <a:srgbClr val="00B050"/>
+            </a:solidFill>
+          </a:ln>
+        </p:spPr>
+        <p:style>
+          <a:lnRef idx="1">
+            <a:schemeClr val="accent1"/>
+          </a:lnRef>
+          <a:fillRef idx="0">
+            <a:schemeClr val="accent1"/>
+          </a:fillRef>
+          <a:effectRef idx="0">
+            <a:schemeClr val="accent1"/>
+          </a:effectRef>
+          <a:fontRef idx="minor">
+            <a:schemeClr val="tx1"/>
+          </a:fontRef>
+        </p:style>
+        <p:txBody>
+          <a:bodyPr rtlCol="0" anchor="ctr"/>
+          <a:lstStyle/>
+          <a:p>
+            <a:pPr algn="ctr"/>
+            <a:endParaRPr lang="ko-KR" altLang="en-US"/>
+          </a:p>
+        </p:txBody>
+      </p:sp>
+      <p:sp>
+        <p:nvSpPr>
+          <p:cNvPr id="16" name="왼쪽 중괄호 15"/>
+          <p:cNvSpPr/>
+          <p:nvPr/>
+        </p:nvSpPr>
+        <p:spPr>
+          <a:xfrm rot="16200000">
+            <a:off x="6956510" y="2338826"/>
+            <a:ext cx="360040" cy="432048"/>
+          </a:xfrm>
+          <a:prstGeom prst="leftBrace">
+            <a:avLst>
+              <a:gd name="adj1" fmla="val 20371"/>
+              <a:gd name="adj2" fmla="val 50000"/>
+            </a:avLst>
+          </a:prstGeom>
+          <a:ln w="25400">
+            <a:solidFill>
+              <a:srgbClr val="00B050"/>
+            </a:solidFill>
+          </a:ln>
+        </p:spPr>
+        <p:style>
+          <a:lnRef idx="1">
+            <a:schemeClr val="accent1"/>
+          </a:lnRef>
+          <a:fillRef idx="0">
+            <a:schemeClr val="accent1"/>
+          </a:fillRef>
+          <a:effectRef idx="0">
+            <a:schemeClr val="accent1"/>
+          </a:effectRef>
+          <a:fontRef idx="minor">
+            <a:schemeClr val="tx1"/>
+          </a:fontRef>
+        </p:style>
+        <p:txBody>
+          <a:bodyPr rtlCol="0" anchor="ctr"/>
+          <a:lstStyle/>
+          <a:p>
+            <a:pPr algn="ctr"/>
+            <a:endParaRPr lang="ko-KR" altLang="en-US"/>
+          </a:p>
+        </p:txBody>
+      </p:sp>
+      <p:sp>
+        <p:nvSpPr>
+          <p:cNvPr id="17" name="TextBox 16"/>
+          <p:cNvSpPr txBox="1"/>
+          <p:nvPr/>
+        </p:nvSpPr>
+        <p:spPr>
+          <a:xfrm>
+            <a:off x="2605687" y="2808039"/>
+            <a:ext cx="1224136" cy="553998"/>
+          </a:xfrm>
+          <a:prstGeom prst="rect">
+            <a:avLst/>
+          </a:prstGeom>
+          <a:noFill/>
+        </p:spPr>
+        <p:txBody>
+          <a:bodyPr wrap="square" rtlCol="0">
+            <a:spAutoFit/>
+          </a:bodyPr>
+          <a:lstStyle/>
+          <a:p>
+            <a:pPr algn="ctr"/>
+            <a:r>
+              <a:rPr lang="en-US" altLang="ko-KR" sz="1600" smtClean="0">
+                <a:solidFill>
+                  <a:srgbClr val="00B050"/>
+                </a:solidFill>
+                <a:latin typeface="나눔스퀘어 ExtraBold" pitchFamily="50" charset="-127"/>
+                <a:ea typeface="나눔스퀘어 ExtraBold" pitchFamily="50" charset="-127"/>
+              </a:rPr>
+              <a:t>Qualifier</a:t>
+            </a:r>
+          </a:p>
+          <a:p>
+            <a:pPr algn="ctr"/>
+            <a:r>
+              <a:rPr lang="en-US" altLang="ko-KR" sz="1400" smtClean="0">
+                <a:solidFill>
+                  <a:srgbClr val="00B050"/>
+                </a:solidFill>
+                <a:latin typeface="나눔스퀘어 ExtraBold" pitchFamily="50" charset="-127"/>
+                <a:ea typeface="나눔스퀘어 ExtraBold" pitchFamily="50" charset="-127"/>
+              </a:rPr>
+              <a:t>(</a:t>
+            </a:r>
+            <a:r>
+              <a:rPr lang="ko-KR" altLang="en-US" sz="1400" smtClean="0">
+                <a:solidFill>
+                  <a:srgbClr val="00B050"/>
+                </a:solidFill>
+                <a:latin typeface="나눔스퀘어 ExtraBold" pitchFamily="50" charset="-127"/>
+                <a:ea typeface="나눔스퀘어 ExtraBold" pitchFamily="50" charset="-127"/>
+              </a:rPr>
+              <a:t>한정자</a:t>
+            </a:r>
+            <a:r>
+              <a:rPr lang="en-US" altLang="ko-KR" sz="1400" smtClean="0">
+                <a:solidFill>
+                  <a:srgbClr val="00B050"/>
+                </a:solidFill>
+                <a:latin typeface="나눔스퀘어 ExtraBold" pitchFamily="50" charset="-127"/>
+                <a:ea typeface="나눔스퀘어 ExtraBold" pitchFamily="50" charset="-127"/>
+              </a:rPr>
+              <a:t>)</a:t>
+            </a:r>
+            <a:endParaRPr lang="ko-KR" altLang="en-US" sz="1400">
+              <a:solidFill>
+                <a:srgbClr val="00B050"/>
+              </a:solidFill>
+              <a:latin typeface="나눔스퀘어 ExtraBold" pitchFamily="50" charset="-127"/>
+              <a:ea typeface="나눔스퀘어 ExtraBold" pitchFamily="50" charset="-127"/>
+            </a:endParaRPr>
+          </a:p>
+        </p:txBody>
+      </p:sp>
+      <p:sp>
+        <p:nvSpPr>
+          <p:cNvPr id="18" name="TextBox 17"/>
+          <p:cNvSpPr txBox="1"/>
+          <p:nvPr/>
+        </p:nvSpPr>
+        <p:spPr>
+          <a:xfrm>
+            <a:off x="6851157" y="2808039"/>
+            <a:ext cx="1224136" cy="553998"/>
+          </a:xfrm>
+          <a:prstGeom prst="rect">
+            <a:avLst/>
+          </a:prstGeom>
+          <a:noFill/>
+        </p:spPr>
+        <p:txBody>
+          <a:bodyPr wrap="square" rtlCol="0">
+            <a:spAutoFit/>
+          </a:bodyPr>
+          <a:lstStyle/>
+          <a:p>
+            <a:pPr algn="ctr"/>
+            <a:r>
+              <a:rPr lang="en-US" altLang="ko-KR" sz="1600" smtClean="0">
+                <a:solidFill>
+                  <a:srgbClr val="00B050"/>
+                </a:solidFill>
+                <a:latin typeface="나눔스퀘어 ExtraBold" pitchFamily="50" charset="-127"/>
+                <a:ea typeface="나눔스퀘어 ExtraBold" pitchFamily="50" charset="-127"/>
+              </a:rPr>
+              <a:t>Qualifier</a:t>
+            </a:r>
+          </a:p>
+          <a:p>
+            <a:pPr algn="ctr"/>
+            <a:r>
+              <a:rPr lang="en-US" altLang="ko-KR" sz="1400" smtClean="0">
+                <a:solidFill>
+                  <a:srgbClr val="00B050"/>
+                </a:solidFill>
+                <a:latin typeface="나눔스퀘어 ExtraBold" pitchFamily="50" charset="-127"/>
+                <a:ea typeface="나눔스퀘어 ExtraBold" pitchFamily="50" charset="-127"/>
+              </a:rPr>
+              <a:t>(</a:t>
+            </a:r>
+            <a:r>
+              <a:rPr lang="ko-KR" altLang="en-US" sz="1400" smtClean="0">
+                <a:solidFill>
+                  <a:srgbClr val="00B050"/>
+                </a:solidFill>
+                <a:latin typeface="나눔스퀘어 ExtraBold" pitchFamily="50" charset="-127"/>
+                <a:ea typeface="나눔스퀘어 ExtraBold" pitchFamily="50" charset="-127"/>
+              </a:rPr>
+              <a:t>한정자</a:t>
+            </a:r>
+            <a:r>
+              <a:rPr lang="en-US" altLang="ko-KR" sz="1400" smtClean="0">
+                <a:solidFill>
+                  <a:srgbClr val="00B050"/>
+                </a:solidFill>
+                <a:latin typeface="나눔스퀘어 ExtraBold" pitchFamily="50" charset="-127"/>
+                <a:ea typeface="나눔스퀘어 ExtraBold" pitchFamily="50" charset="-127"/>
+              </a:rPr>
+              <a:t>)</a:t>
+            </a:r>
+            <a:endParaRPr lang="ko-KR" altLang="en-US" sz="1400">
+              <a:solidFill>
+                <a:srgbClr val="00B050"/>
+              </a:solidFill>
+              <a:latin typeface="나눔스퀘어 ExtraBold" pitchFamily="50" charset="-127"/>
+              <a:ea typeface="나눔스퀘어 ExtraBold" pitchFamily="50" charset="-127"/>
+            </a:endParaRPr>
+          </a:p>
+        </p:txBody>
+      </p:sp>
+      <p:sp>
+        <p:nvSpPr>
+          <p:cNvPr id="19" name="왼쪽 중괄호 18"/>
+          <p:cNvSpPr/>
+          <p:nvPr/>
+        </p:nvSpPr>
+        <p:spPr>
+          <a:xfrm rot="16200000">
+            <a:off x="4752926" y="1654752"/>
+            <a:ext cx="360040" cy="1800199"/>
+          </a:xfrm>
+          <a:prstGeom prst="leftBrace">
+            <a:avLst>
+              <a:gd name="adj1" fmla="val 20371"/>
+              <a:gd name="adj2" fmla="val 50000"/>
+            </a:avLst>
+          </a:prstGeom>
+          <a:ln w="25400">
+            <a:solidFill>
+              <a:schemeClr val="bg1">
+                <a:lumMod val="65000"/>
+              </a:schemeClr>
+            </a:solidFill>
+          </a:ln>
+        </p:spPr>
+        <p:style>
+          <a:lnRef idx="1">
+            <a:schemeClr val="accent1"/>
+          </a:lnRef>
+          <a:fillRef idx="0">
+            <a:schemeClr val="accent1"/>
+          </a:fillRef>
+          <a:effectRef idx="0">
+            <a:schemeClr val="accent1"/>
+          </a:effectRef>
+          <a:fontRef idx="minor">
+            <a:schemeClr val="tx1"/>
+          </a:fontRef>
+        </p:style>
+        <p:txBody>
+          <a:bodyPr rtlCol="0" anchor="ctr"/>
+          <a:lstStyle/>
+          <a:p>
+            <a:pPr algn="ctr"/>
+            <a:endParaRPr lang="ko-KR" altLang="en-US"/>
+          </a:p>
+        </p:txBody>
+      </p:sp>
+      <p:sp>
+        <p:nvSpPr>
+          <p:cNvPr id="20" name="왼쪽 중괄호 19"/>
+          <p:cNvSpPr/>
+          <p:nvPr/>
+        </p:nvSpPr>
+        <p:spPr>
+          <a:xfrm rot="16200000">
+            <a:off x="8212066" y="2376453"/>
+            <a:ext cx="360040" cy="356797"/>
+          </a:xfrm>
+          <a:prstGeom prst="leftBrace">
+            <a:avLst>
+              <a:gd name="adj1" fmla="val 13083"/>
+              <a:gd name="adj2" fmla="val 50000"/>
+            </a:avLst>
+          </a:prstGeom>
+          <a:ln w="25400">
+            <a:solidFill>
+              <a:schemeClr val="bg1">
+                <a:lumMod val="65000"/>
+              </a:schemeClr>
+            </a:solidFill>
+          </a:ln>
+        </p:spPr>
+        <p:style>
+          <a:lnRef idx="1">
+            <a:schemeClr val="accent1"/>
+          </a:lnRef>
+          <a:fillRef idx="0">
+            <a:schemeClr val="accent1"/>
+          </a:fillRef>
+          <a:effectRef idx="0">
+            <a:schemeClr val="accent1"/>
+          </a:effectRef>
+          <a:fontRef idx="minor">
+            <a:schemeClr val="tx1"/>
+          </a:fontRef>
+        </p:style>
+        <p:txBody>
+          <a:bodyPr rtlCol="0" anchor="ctr"/>
+          <a:lstStyle/>
+          <a:p>
+            <a:pPr algn="ctr"/>
+            <a:endParaRPr lang="ko-KR" altLang="en-US"/>
+          </a:p>
+        </p:txBody>
+      </p:sp>
+      <p:sp>
+        <p:nvSpPr>
+          <p:cNvPr id="23" name="TextBox 22"/>
+          <p:cNvSpPr txBox="1"/>
+          <p:nvPr/>
+        </p:nvSpPr>
+        <p:spPr>
+          <a:xfrm>
+            <a:off x="4338214" y="2808039"/>
+            <a:ext cx="1224136" cy="338554"/>
+          </a:xfrm>
+          <a:prstGeom prst="rect">
+            <a:avLst/>
+          </a:prstGeom>
+          <a:noFill/>
+        </p:spPr>
+        <p:txBody>
+          <a:bodyPr wrap="square" rtlCol="0">
+            <a:spAutoFit/>
+          </a:bodyPr>
+          <a:lstStyle/>
+          <a:p>
+            <a:pPr algn="ctr"/>
+            <a:r>
+              <a:rPr lang="en-US" altLang="ko-KR" sz="1600" smtClean="0">
+                <a:solidFill>
+                  <a:schemeClr val="bg1">
+                    <a:lumMod val="65000"/>
+                  </a:schemeClr>
+                </a:solidFill>
+                <a:latin typeface="나눔스퀘어 ExtraBold" pitchFamily="50" charset="-127"/>
+                <a:ea typeface="나눔스퀘어 ExtraBold" pitchFamily="50" charset="-127"/>
+              </a:rPr>
+              <a:t>ID</a:t>
+            </a:r>
+            <a:endParaRPr lang="ko-KR" altLang="en-US" sz="1600">
+              <a:solidFill>
+                <a:schemeClr val="bg1">
+                  <a:lumMod val="65000"/>
+                </a:schemeClr>
+              </a:solidFill>
+              <a:latin typeface="나눔스퀘어 ExtraBold" pitchFamily="50" charset="-127"/>
+              <a:ea typeface="나눔스퀘어 ExtraBold" pitchFamily="50" charset="-127"/>
+            </a:endParaRPr>
+          </a:p>
+        </p:txBody>
+      </p:sp>
+      <p:sp>
+        <p:nvSpPr>
+          <p:cNvPr id="24" name="TextBox 23"/>
+          <p:cNvSpPr txBox="1"/>
+          <p:nvPr/>
+        </p:nvSpPr>
+        <p:spPr>
+          <a:xfrm>
+            <a:off x="7800797" y="2808039"/>
+            <a:ext cx="1224136" cy="338554"/>
+          </a:xfrm>
+          <a:prstGeom prst="rect">
+            <a:avLst/>
+          </a:prstGeom>
+          <a:noFill/>
+        </p:spPr>
+        <p:txBody>
+          <a:bodyPr wrap="square" rtlCol="0">
+            <a:spAutoFit/>
+          </a:bodyPr>
+          <a:lstStyle/>
+          <a:p>
+            <a:pPr algn="ctr"/>
+            <a:r>
+              <a:rPr lang="en-US" altLang="ko-KR" sz="1600" smtClean="0">
+                <a:solidFill>
+                  <a:schemeClr val="bg1">
+                    <a:lumMod val="65000"/>
+                  </a:schemeClr>
+                </a:solidFill>
+                <a:latin typeface="나눔스퀘어 ExtraBold" pitchFamily="50" charset="-127"/>
+                <a:ea typeface="나눔스퀘어 ExtraBold" pitchFamily="50" charset="-127"/>
+              </a:rPr>
+              <a:t>ID</a:t>
+            </a:r>
+            <a:endParaRPr lang="ko-KR" altLang="en-US" sz="1600">
+              <a:solidFill>
+                <a:schemeClr val="bg1">
+                  <a:lumMod val="65000"/>
+                </a:schemeClr>
+              </a:solidFill>
+              <a:latin typeface="나눔스퀘어 ExtraBold" pitchFamily="50" charset="-127"/>
+              <a:ea typeface="나눔스퀘어 ExtraBold" pitchFamily="50" charset="-127"/>
+            </a:endParaRPr>
+          </a:p>
+        </p:txBody>
+      </p:sp>
+    </p:spTree>
+    <p:extLst>
+      <p:ext uri="{BB962C8B-B14F-4D97-AF65-F5344CB8AC3E}">
+        <p14:creationId xmlns:p14="http://schemas.microsoft.com/office/powerpoint/2010/main" val="2528424599"/>
+      </p:ext>
+    </p:extLst>
+  </p:cSld>
+  <p:clrMapOvr>
+    <a:masterClrMapping/>
+  </p:clrMapOvr>
+</p:sld>
+</file>
+
 <file path=ppt/theme/theme1.xml><?xml version="1.0" encoding="utf-8"?>
 <a:theme xmlns:a="http://schemas.openxmlformats.org/drawingml/2006/main" name="Office 테마">
   <a:themeElements>

</xml_diff>

<commit_message>
update post - com
new image
- com

update css
- comment out codeblock white-space
</commit_message>
<xml_diff>
--- a/assets/etc/이미지제작용.pptx
+++ b/assets/etc/이미지제작용.pptx
@@ -9,6 +9,7 @@
     <p:sldId id="257" r:id="rId3"/>
     <p:sldId id="258" r:id="rId4"/>
     <p:sldId id="259" r:id="rId5"/>
+    <p:sldId id="260" r:id="rId6"/>
   </p:sldIdLst>
   <p:sldSz cx="11522075" cy="6480175"/>
   <p:notesSz cx="6858000" cy="9144000"/>
@@ -291,7 +292,7 @@
           <a:p>
             <a:fld id="{10B01263-E573-4C51-9265-094B7818CB45}" type="datetimeFigureOut">
               <a:rPr lang="ko-KR" altLang="en-US" smtClean="0"/>
-              <a:t>2024-02-21</a:t>
+              <a:t>2024-03-08</a:t>
             </a:fld>
             <a:endParaRPr lang="ko-KR" altLang="en-US"/>
           </a:p>
@@ -461,7 +462,7 @@
           <a:p>
             <a:fld id="{10B01263-E573-4C51-9265-094B7818CB45}" type="datetimeFigureOut">
               <a:rPr lang="ko-KR" altLang="en-US" smtClean="0"/>
-              <a:t>2024-02-21</a:t>
+              <a:t>2024-03-08</a:t>
             </a:fld>
             <a:endParaRPr lang="ko-KR" altLang="en-US"/>
           </a:p>
@@ -641,7 +642,7 @@
           <a:p>
             <a:fld id="{10B01263-E573-4C51-9265-094B7818CB45}" type="datetimeFigureOut">
               <a:rPr lang="ko-KR" altLang="en-US" smtClean="0"/>
-              <a:t>2024-02-21</a:t>
+              <a:t>2024-03-08</a:t>
             </a:fld>
             <a:endParaRPr lang="ko-KR" altLang="en-US"/>
           </a:p>
@@ -811,7 +812,7 @@
           <a:p>
             <a:fld id="{10B01263-E573-4C51-9265-094B7818CB45}" type="datetimeFigureOut">
               <a:rPr lang="ko-KR" altLang="en-US" smtClean="0"/>
-              <a:t>2024-02-21</a:t>
+              <a:t>2024-03-08</a:t>
             </a:fld>
             <a:endParaRPr lang="ko-KR" altLang="en-US"/>
           </a:p>
@@ -1057,7 +1058,7 @@
           <a:p>
             <a:fld id="{10B01263-E573-4C51-9265-094B7818CB45}" type="datetimeFigureOut">
               <a:rPr lang="ko-KR" altLang="en-US" smtClean="0"/>
-              <a:t>2024-02-21</a:t>
+              <a:t>2024-03-08</a:t>
             </a:fld>
             <a:endParaRPr lang="ko-KR" altLang="en-US"/>
           </a:p>
@@ -1345,7 +1346,7 @@
           <a:p>
             <a:fld id="{10B01263-E573-4C51-9265-094B7818CB45}" type="datetimeFigureOut">
               <a:rPr lang="ko-KR" altLang="en-US" smtClean="0"/>
-              <a:t>2024-02-21</a:t>
+              <a:t>2024-03-08</a:t>
             </a:fld>
             <a:endParaRPr lang="ko-KR" altLang="en-US"/>
           </a:p>
@@ -1767,7 +1768,7 @@
           <a:p>
             <a:fld id="{10B01263-E573-4C51-9265-094B7818CB45}" type="datetimeFigureOut">
               <a:rPr lang="ko-KR" altLang="en-US" smtClean="0"/>
-              <a:t>2024-02-21</a:t>
+              <a:t>2024-03-08</a:t>
             </a:fld>
             <a:endParaRPr lang="ko-KR" altLang="en-US"/>
           </a:p>
@@ -1885,7 +1886,7 @@
           <a:p>
             <a:fld id="{10B01263-E573-4C51-9265-094B7818CB45}" type="datetimeFigureOut">
               <a:rPr lang="ko-KR" altLang="en-US" smtClean="0"/>
-              <a:t>2024-02-21</a:t>
+              <a:t>2024-03-08</a:t>
             </a:fld>
             <a:endParaRPr lang="ko-KR" altLang="en-US"/>
           </a:p>
@@ -1980,7 +1981,7 @@
           <a:p>
             <a:fld id="{10B01263-E573-4C51-9265-094B7818CB45}" type="datetimeFigureOut">
               <a:rPr lang="ko-KR" altLang="en-US" smtClean="0"/>
-              <a:t>2024-02-21</a:t>
+              <a:t>2024-03-08</a:t>
             </a:fld>
             <a:endParaRPr lang="ko-KR" altLang="en-US"/>
           </a:p>
@@ -2257,7 +2258,7 @@
           <a:p>
             <a:fld id="{10B01263-E573-4C51-9265-094B7818CB45}" type="datetimeFigureOut">
               <a:rPr lang="ko-KR" altLang="en-US" smtClean="0"/>
-              <a:t>2024-02-21</a:t>
+              <a:t>2024-03-08</a:t>
             </a:fld>
             <a:endParaRPr lang="ko-KR" altLang="en-US"/>
           </a:p>
@@ -2510,7 +2511,7 @@
           <a:p>
             <a:fld id="{10B01263-E573-4C51-9265-094B7818CB45}" type="datetimeFigureOut">
               <a:rPr lang="ko-KR" altLang="en-US" smtClean="0"/>
-              <a:t>2024-02-21</a:t>
+              <a:t>2024-03-08</a:t>
             </a:fld>
             <a:endParaRPr lang="ko-KR" altLang="en-US"/>
           </a:p>
@@ -2723,7 +2724,7 @@
           <a:p>
             <a:fld id="{10B01263-E573-4C51-9265-094B7818CB45}" type="datetimeFigureOut">
               <a:rPr lang="ko-KR" altLang="en-US" smtClean="0"/>
-              <a:t>2024-02-21</a:t>
+              <a:t>2024-03-08</a:t>
             </a:fld>
             <a:endParaRPr lang="ko-KR" altLang="en-US"/>
           </a:p>
@@ -8532,6 +8533,1753 @@
 </p:sld>
 </file>
 
+<file path=ppt/slides/slide5.xml><?xml version="1.0" encoding="utf-8"?>
+<p:sld xmlns:a="http://schemas.openxmlformats.org/drawingml/2006/main" xmlns:r="http://schemas.openxmlformats.org/officeDocument/2006/relationships" xmlns:p="http://schemas.openxmlformats.org/presentationml/2006/main">
+  <p:cSld>
+    <p:spTree>
+      <p:nvGrpSpPr>
+        <p:cNvPr id="1" name=""/>
+        <p:cNvGrpSpPr/>
+        <p:nvPr/>
+      </p:nvGrpSpPr>
+      <p:grpSpPr>
+        <a:xfrm>
+          <a:off x="0" y="0"/>
+          <a:ext cx="0" cy="0"/>
+          <a:chOff x="0" y="0"/>
+          <a:chExt cx="0" cy="0"/>
+        </a:xfrm>
+      </p:grpSpPr>
+      <p:sp>
+        <p:nvSpPr>
+          <p:cNvPr id="7" name="직사각형 6"/>
+          <p:cNvSpPr/>
+          <p:nvPr/>
+        </p:nvSpPr>
+        <p:spPr>
+          <a:xfrm>
+            <a:off x="4176861" y="1151855"/>
+            <a:ext cx="2448272" cy="4824536"/>
+          </a:xfrm>
+          <a:prstGeom prst="rect">
+            <a:avLst/>
+          </a:prstGeom>
+          <a:solidFill>
+            <a:srgbClr val="FEECEC"/>
+          </a:solidFill>
+          <a:ln>
+            <a:solidFill>
+              <a:schemeClr val="tx1"/>
+            </a:solidFill>
+          </a:ln>
+        </p:spPr>
+        <p:style>
+          <a:lnRef idx="2">
+            <a:schemeClr val="accent1">
+              <a:shade val="50000"/>
+            </a:schemeClr>
+          </a:lnRef>
+          <a:fillRef idx="1">
+            <a:schemeClr val="accent1"/>
+          </a:fillRef>
+          <a:effectRef idx="0">
+            <a:schemeClr val="accent1"/>
+          </a:effectRef>
+          <a:fontRef idx="minor">
+            <a:schemeClr val="lt1"/>
+          </a:fontRef>
+        </p:style>
+        <p:txBody>
+          <a:bodyPr rtlCol="0" anchor="ctr"/>
+          <a:lstStyle/>
+          <a:p>
+            <a:pPr algn="ctr"/>
+            <a:endParaRPr lang="ko-KR" altLang="en-US"/>
+          </a:p>
+        </p:txBody>
+      </p:sp>
+      <p:sp>
+        <p:nvSpPr>
+          <p:cNvPr id="31" name="직사각형 30"/>
+          <p:cNvSpPr/>
+          <p:nvPr/>
+        </p:nvSpPr>
+        <p:spPr>
+          <a:xfrm>
+            <a:off x="1188696" y="4588332"/>
+            <a:ext cx="1886980" cy="1172035"/>
+          </a:xfrm>
+          <a:prstGeom prst="rect">
+            <a:avLst/>
+          </a:prstGeom>
+          <a:solidFill>
+            <a:srgbClr val="C6FFC5"/>
+          </a:solidFill>
+          <a:ln>
+            <a:solidFill>
+              <a:schemeClr val="bg1">
+                <a:lumMod val="50000"/>
+              </a:schemeClr>
+            </a:solidFill>
+            <a:prstDash val="sysDash"/>
+          </a:ln>
+        </p:spPr>
+        <p:style>
+          <a:lnRef idx="2">
+            <a:schemeClr val="accent1">
+              <a:shade val="50000"/>
+            </a:schemeClr>
+          </a:lnRef>
+          <a:fillRef idx="1">
+            <a:schemeClr val="accent1"/>
+          </a:fillRef>
+          <a:effectRef idx="0">
+            <a:schemeClr val="accent1"/>
+          </a:effectRef>
+          <a:fontRef idx="minor">
+            <a:schemeClr val="lt1"/>
+          </a:fontRef>
+        </p:style>
+        <p:txBody>
+          <a:bodyPr rtlCol="0" anchor="ctr"/>
+          <a:lstStyle/>
+          <a:p>
+            <a:pPr algn="ctr"/>
+            <a:endParaRPr lang="ko-KR" altLang="en-US"/>
+          </a:p>
+        </p:txBody>
+      </p:sp>
+      <p:sp>
+        <p:nvSpPr>
+          <p:cNvPr id="3" name="직사각형 2"/>
+          <p:cNvSpPr/>
+          <p:nvPr/>
+        </p:nvSpPr>
+        <p:spPr>
+          <a:xfrm>
+            <a:off x="1324177" y="1703050"/>
+            <a:ext cx="1616018" cy="2040222"/>
+          </a:xfrm>
+          <a:prstGeom prst="rect">
+            <a:avLst/>
+          </a:prstGeom>
+          <a:solidFill>
+            <a:schemeClr val="tx2">
+              <a:lumMod val="20000"/>
+              <a:lumOff val="80000"/>
+            </a:schemeClr>
+          </a:solidFill>
+          <a:ln>
+            <a:solidFill>
+              <a:schemeClr val="bg1">
+                <a:lumMod val="50000"/>
+              </a:schemeClr>
+            </a:solidFill>
+            <a:prstDash val="sysDash"/>
+          </a:ln>
+        </p:spPr>
+        <p:style>
+          <a:lnRef idx="2">
+            <a:schemeClr val="accent1">
+              <a:shade val="50000"/>
+            </a:schemeClr>
+          </a:lnRef>
+          <a:fillRef idx="1">
+            <a:schemeClr val="accent1"/>
+          </a:fillRef>
+          <a:effectRef idx="0">
+            <a:schemeClr val="accent1"/>
+          </a:effectRef>
+          <a:fontRef idx="minor">
+            <a:schemeClr val="lt1"/>
+          </a:fontRef>
+        </p:style>
+        <p:txBody>
+          <a:bodyPr rtlCol="0" anchor="ctr"/>
+          <a:lstStyle/>
+          <a:p>
+            <a:pPr algn="ctr"/>
+            <a:endParaRPr lang="ko-KR" altLang="en-US"/>
+          </a:p>
+        </p:txBody>
+      </p:sp>
+      <p:sp>
+        <p:nvSpPr>
+          <p:cNvPr id="21" name="TextBox 20"/>
+          <p:cNvSpPr txBox="1"/>
+          <p:nvPr/>
+        </p:nvSpPr>
+        <p:spPr>
+          <a:xfrm>
+            <a:off x="1311647" y="1067904"/>
+            <a:ext cx="1641078" cy="584775"/>
+          </a:xfrm>
+          <a:prstGeom prst="rect">
+            <a:avLst/>
+          </a:prstGeom>
+          <a:noFill/>
+        </p:spPr>
+        <p:txBody>
+          <a:bodyPr wrap="square" rtlCol="0">
+            <a:spAutoFit/>
+          </a:bodyPr>
+          <a:lstStyle/>
+          <a:p>
+            <a:pPr algn="ctr"/>
+            <a:r>
+              <a:rPr lang="en-US" altLang="ko-KR" sz="1600" smtClean="0">
+                <a:latin typeface="나눔스퀘어 ExtraBold" pitchFamily="50" charset="-127"/>
+                <a:ea typeface="나눔스퀘어 ExtraBold" pitchFamily="50" charset="-127"/>
+              </a:rPr>
+              <a:t>Interface1</a:t>
+            </a:r>
+          </a:p>
+          <a:p>
+            <a:pPr algn="ctr"/>
+            <a:r>
+              <a:rPr lang="en-US" altLang="ko-KR" sz="1600" smtClean="0">
+                <a:latin typeface="나눔스퀘어 ExtraBold" pitchFamily="50" charset="-127"/>
+                <a:ea typeface="나눔스퀘어 ExtraBold" pitchFamily="50" charset="-127"/>
+              </a:rPr>
+              <a:t>(</a:t>
+            </a:r>
+            <a:r>
+              <a:rPr lang="ko-KR" altLang="en-US" sz="1600" smtClean="0">
+                <a:latin typeface="나눔스퀘어 ExtraBold" pitchFamily="50" charset="-127"/>
+                <a:ea typeface="나눔스퀘어 ExtraBold" pitchFamily="50" charset="-127"/>
+              </a:rPr>
+              <a:t>파일조작</a:t>
+            </a:r>
+            <a:r>
+              <a:rPr lang="en-US" altLang="ko-KR" sz="1600" smtClean="0">
+                <a:latin typeface="나눔스퀘어 ExtraBold" pitchFamily="50" charset="-127"/>
+                <a:ea typeface="나눔스퀘어 ExtraBold" pitchFamily="50" charset="-127"/>
+              </a:rPr>
+              <a:t>)</a:t>
+            </a:r>
+            <a:endParaRPr lang="ko-KR" altLang="en-US" sz="1600">
+              <a:latin typeface="나눔스퀘어 ExtraBold" pitchFamily="50" charset="-127"/>
+              <a:ea typeface="나눔스퀘어 ExtraBold" pitchFamily="50" charset="-127"/>
+            </a:endParaRPr>
+          </a:p>
+        </p:txBody>
+      </p:sp>
+      <p:sp>
+        <p:nvSpPr>
+          <p:cNvPr id="22" name="TextBox 21"/>
+          <p:cNvSpPr txBox="1"/>
+          <p:nvPr/>
+        </p:nvSpPr>
+        <p:spPr>
+          <a:xfrm>
+            <a:off x="1311647" y="3948224"/>
+            <a:ext cx="1641078" cy="584775"/>
+          </a:xfrm>
+          <a:prstGeom prst="rect">
+            <a:avLst/>
+          </a:prstGeom>
+          <a:noFill/>
+        </p:spPr>
+        <p:txBody>
+          <a:bodyPr wrap="square" rtlCol="0">
+            <a:spAutoFit/>
+          </a:bodyPr>
+          <a:lstStyle/>
+          <a:p>
+            <a:pPr algn="ctr"/>
+            <a:r>
+              <a:rPr lang="en-US" altLang="ko-KR" sz="1600" smtClean="0">
+                <a:latin typeface="나눔스퀘어 ExtraBold" pitchFamily="50" charset="-127"/>
+                <a:ea typeface="나눔스퀘어 ExtraBold" pitchFamily="50" charset="-127"/>
+              </a:rPr>
+              <a:t>Interface2</a:t>
+            </a:r>
+            <a:endParaRPr lang="en-US" altLang="ko-KR" sz="1600" smtClean="0">
+              <a:latin typeface="나눔스퀘어 ExtraBold" pitchFamily="50" charset="-127"/>
+              <a:ea typeface="나눔스퀘어 ExtraBold" pitchFamily="50" charset="-127"/>
+            </a:endParaRPr>
+          </a:p>
+          <a:p>
+            <a:pPr algn="ctr"/>
+            <a:r>
+              <a:rPr lang="en-US" altLang="ko-KR" sz="1600" smtClean="0">
+                <a:latin typeface="나눔스퀘어 ExtraBold" pitchFamily="50" charset="-127"/>
+                <a:ea typeface="나눔스퀘어 ExtraBold" pitchFamily="50" charset="-127"/>
+              </a:rPr>
+              <a:t>(</a:t>
+            </a:r>
+            <a:r>
+              <a:rPr lang="ko-KR" altLang="en-US" sz="1600" smtClean="0">
+                <a:latin typeface="나눔스퀘어 ExtraBold" pitchFamily="50" charset="-127"/>
+                <a:ea typeface="나눔스퀘어 ExtraBold" pitchFamily="50" charset="-127"/>
+              </a:rPr>
+              <a:t>데이터처리</a:t>
+            </a:r>
+            <a:r>
+              <a:rPr lang="en-US" altLang="ko-KR" sz="1600" smtClean="0">
+                <a:latin typeface="나눔스퀘어 ExtraBold" pitchFamily="50" charset="-127"/>
+                <a:ea typeface="나눔스퀘어 ExtraBold" pitchFamily="50" charset="-127"/>
+              </a:rPr>
+              <a:t>)</a:t>
+            </a:r>
+            <a:endParaRPr lang="ko-KR" altLang="en-US" sz="1600">
+              <a:latin typeface="나눔스퀘어 ExtraBold" pitchFamily="50" charset="-127"/>
+              <a:ea typeface="나눔스퀘어 ExtraBold" pitchFamily="50" charset="-127"/>
+            </a:endParaRPr>
+          </a:p>
+        </p:txBody>
+      </p:sp>
+      <p:sp>
+        <p:nvSpPr>
+          <p:cNvPr id="2" name="직사각형 1"/>
+          <p:cNvSpPr/>
+          <p:nvPr/>
+        </p:nvSpPr>
+        <p:spPr>
+          <a:xfrm>
+            <a:off x="1416805" y="2053344"/>
+            <a:ext cx="1430762" cy="327309"/>
+          </a:xfrm>
+          <a:prstGeom prst="rect">
+            <a:avLst/>
+          </a:prstGeom>
+          <a:solidFill>
+            <a:schemeClr val="bg1">
+              <a:lumMod val="95000"/>
+            </a:schemeClr>
+          </a:solidFill>
+          <a:ln>
+            <a:solidFill>
+              <a:schemeClr val="bg1">
+                <a:lumMod val="75000"/>
+              </a:schemeClr>
+            </a:solidFill>
+          </a:ln>
+        </p:spPr>
+        <p:style>
+          <a:lnRef idx="2">
+            <a:schemeClr val="accent1">
+              <a:shade val="50000"/>
+            </a:schemeClr>
+          </a:lnRef>
+          <a:fillRef idx="1">
+            <a:schemeClr val="accent1"/>
+          </a:fillRef>
+          <a:effectRef idx="0">
+            <a:schemeClr val="accent1"/>
+          </a:effectRef>
+          <a:fontRef idx="minor">
+            <a:schemeClr val="lt1"/>
+          </a:fontRef>
+        </p:style>
+        <p:txBody>
+          <a:bodyPr rtlCol="0" anchor="ctr"/>
+          <a:lstStyle/>
+          <a:p>
+            <a:pPr algn="ctr"/>
+            <a:r>
+              <a:rPr lang="en-US" altLang="ko-KR" sz="1400" smtClean="0">
+                <a:solidFill>
+                  <a:schemeClr val="tx1">
+                    <a:lumMod val="75000"/>
+                    <a:lumOff val="25000"/>
+                  </a:schemeClr>
+                </a:solidFill>
+                <a:latin typeface="나눔스퀘어 ExtraBold" pitchFamily="50" charset="-127"/>
+                <a:ea typeface="나눔스퀘어 ExtraBold" pitchFamily="50" charset="-127"/>
+              </a:rPr>
+              <a:t>OpenFile</a:t>
+            </a:r>
+            <a:endParaRPr lang="ko-KR" altLang="en-US" sz="1400">
+              <a:solidFill>
+                <a:schemeClr val="tx1">
+                  <a:lumMod val="75000"/>
+                  <a:lumOff val="25000"/>
+                </a:schemeClr>
+              </a:solidFill>
+              <a:latin typeface="나눔스퀘어 ExtraBold" pitchFamily="50" charset="-127"/>
+              <a:ea typeface="나눔스퀘어 ExtraBold" pitchFamily="50" charset="-127"/>
+            </a:endParaRPr>
+          </a:p>
+        </p:txBody>
+      </p:sp>
+      <p:sp>
+        <p:nvSpPr>
+          <p:cNvPr id="25" name="직사각형 24"/>
+          <p:cNvSpPr/>
+          <p:nvPr/>
+        </p:nvSpPr>
+        <p:spPr>
+          <a:xfrm>
+            <a:off x="1416805" y="2485392"/>
+            <a:ext cx="1430762" cy="327309"/>
+          </a:xfrm>
+          <a:prstGeom prst="rect">
+            <a:avLst/>
+          </a:prstGeom>
+          <a:solidFill>
+            <a:schemeClr val="bg1">
+              <a:lumMod val="95000"/>
+            </a:schemeClr>
+          </a:solidFill>
+          <a:ln>
+            <a:solidFill>
+              <a:schemeClr val="bg1">
+                <a:lumMod val="75000"/>
+              </a:schemeClr>
+            </a:solidFill>
+          </a:ln>
+        </p:spPr>
+        <p:style>
+          <a:lnRef idx="2">
+            <a:schemeClr val="accent1">
+              <a:shade val="50000"/>
+            </a:schemeClr>
+          </a:lnRef>
+          <a:fillRef idx="1">
+            <a:schemeClr val="accent1"/>
+          </a:fillRef>
+          <a:effectRef idx="0">
+            <a:schemeClr val="accent1"/>
+          </a:effectRef>
+          <a:fontRef idx="minor">
+            <a:schemeClr val="lt1"/>
+          </a:fontRef>
+        </p:style>
+        <p:txBody>
+          <a:bodyPr rtlCol="0" anchor="ctr"/>
+          <a:lstStyle/>
+          <a:p>
+            <a:pPr algn="ctr"/>
+            <a:r>
+              <a:rPr lang="en-US" altLang="ko-KR" sz="1400" smtClean="0">
+                <a:solidFill>
+                  <a:schemeClr val="tx1">
+                    <a:lumMod val="75000"/>
+                    <a:lumOff val="25000"/>
+                  </a:schemeClr>
+                </a:solidFill>
+                <a:latin typeface="나눔스퀘어 ExtraBold" pitchFamily="50" charset="-127"/>
+                <a:ea typeface="나눔스퀘어 ExtraBold" pitchFamily="50" charset="-127"/>
+              </a:rPr>
+              <a:t>ReadFile</a:t>
+            </a:r>
+            <a:endParaRPr lang="ko-KR" altLang="en-US" sz="1400">
+              <a:solidFill>
+                <a:schemeClr val="tx1">
+                  <a:lumMod val="75000"/>
+                  <a:lumOff val="25000"/>
+                </a:schemeClr>
+              </a:solidFill>
+              <a:latin typeface="나눔스퀘어 ExtraBold" pitchFamily="50" charset="-127"/>
+              <a:ea typeface="나눔스퀘어 ExtraBold" pitchFamily="50" charset="-127"/>
+            </a:endParaRPr>
+          </a:p>
+        </p:txBody>
+      </p:sp>
+      <p:sp>
+        <p:nvSpPr>
+          <p:cNvPr id="26" name="직사각형 25"/>
+          <p:cNvSpPr/>
+          <p:nvPr/>
+        </p:nvSpPr>
+        <p:spPr>
+          <a:xfrm>
+            <a:off x="1416805" y="2917440"/>
+            <a:ext cx="1430762" cy="327309"/>
+          </a:xfrm>
+          <a:prstGeom prst="rect">
+            <a:avLst/>
+          </a:prstGeom>
+          <a:solidFill>
+            <a:schemeClr val="bg1">
+              <a:lumMod val="95000"/>
+            </a:schemeClr>
+          </a:solidFill>
+          <a:ln>
+            <a:solidFill>
+              <a:schemeClr val="bg1">
+                <a:lumMod val="75000"/>
+              </a:schemeClr>
+            </a:solidFill>
+          </a:ln>
+        </p:spPr>
+        <p:style>
+          <a:lnRef idx="2">
+            <a:schemeClr val="accent1">
+              <a:shade val="50000"/>
+            </a:schemeClr>
+          </a:lnRef>
+          <a:fillRef idx="1">
+            <a:schemeClr val="accent1"/>
+          </a:fillRef>
+          <a:effectRef idx="0">
+            <a:schemeClr val="accent1"/>
+          </a:effectRef>
+          <a:fontRef idx="minor">
+            <a:schemeClr val="lt1"/>
+          </a:fontRef>
+        </p:style>
+        <p:txBody>
+          <a:bodyPr rtlCol="0" anchor="ctr"/>
+          <a:lstStyle/>
+          <a:p>
+            <a:pPr algn="ctr"/>
+            <a:r>
+              <a:rPr lang="en-US" altLang="ko-KR" sz="1400" smtClean="0">
+                <a:solidFill>
+                  <a:schemeClr val="tx1">
+                    <a:lumMod val="75000"/>
+                    <a:lumOff val="25000"/>
+                  </a:schemeClr>
+                </a:solidFill>
+                <a:latin typeface="나눔스퀘어 ExtraBold" pitchFamily="50" charset="-127"/>
+                <a:ea typeface="나눔스퀘어 ExtraBold" pitchFamily="50" charset="-127"/>
+              </a:rPr>
+              <a:t>WriteFile</a:t>
+            </a:r>
+            <a:endParaRPr lang="ko-KR" altLang="en-US" sz="1400">
+              <a:solidFill>
+                <a:schemeClr val="tx1">
+                  <a:lumMod val="75000"/>
+                  <a:lumOff val="25000"/>
+                </a:schemeClr>
+              </a:solidFill>
+              <a:latin typeface="나눔스퀘어 ExtraBold" pitchFamily="50" charset="-127"/>
+              <a:ea typeface="나눔스퀘어 ExtraBold" pitchFamily="50" charset="-127"/>
+            </a:endParaRPr>
+          </a:p>
+        </p:txBody>
+      </p:sp>
+      <p:sp>
+        <p:nvSpPr>
+          <p:cNvPr id="27" name="직사각형 26"/>
+          <p:cNvSpPr/>
+          <p:nvPr/>
+        </p:nvSpPr>
+        <p:spPr>
+          <a:xfrm>
+            <a:off x="1416805" y="3349488"/>
+            <a:ext cx="1430762" cy="327309"/>
+          </a:xfrm>
+          <a:prstGeom prst="rect">
+            <a:avLst/>
+          </a:prstGeom>
+          <a:solidFill>
+            <a:schemeClr val="bg1">
+              <a:lumMod val="95000"/>
+            </a:schemeClr>
+          </a:solidFill>
+          <a:ln>
+            <a:solidFill>
+              <a:schemeClr val="bg1">
+                <a:lumMod val="75000"/>
+              </a:schemeClr>
+            </a:solidFill>
+          </a:ln>
+        </p:spPr>
+        <p:style>
+          <a:lnRef idx="2">
+            <a:schemeClr val="accent1">
+              <a:shade val="50000"/>
+            </a:schemeClr>
+          </a:lnRef>
+          <a:fillRef idx="1">
+            <a:schemeClr val="accent1"/>
+          </a:fillRef>
+          <a:effectRef idx="0">
+            <a:schemeClr val="accent1"/>
+          </a:effectRef>
+          <a:fontRef idx="minor">
+            <a:schemeClr val="lt1"/>
+          </a:fontRef>
+        </p:style>
+        <p:txBody>
+          <a:bodyPr rtlCol="0" anchor="ctr"/>
+          <a:lstStyle/>
+          <a:p>
+            <a:pPr algn="ctr"/>
+            <a:r>
+              <a:rPr lang="en-US" altLang="ko-KR" sz="1400" smtClean="0">
+                <a:solidFill>
+                  <a:schemeClr val="tx1">
+                    <a:lumMod val="75000"/>
+                    <a:lumOff val="25000"/>
+                  </a:schemeClr>
+                </a:solidFill>
+                <a:latin typeface="나눔스퀘어 ExtraBold" pitchFamily="50" charset="-127"/>
+                <a:ea typeface="나눔스퀘어 ExtraBold" pitchFamily="50" charset="-127"/>
+              </a:rPr>
+              <a:t>CloseFile</a:t>
+            </a:r>
+            <a:endParaRPr lang="ko-KR" altLang="en-US" sz="1400">
+              <a:solidFill>
+                <a:schemeClr val="tx1">
+                  <a:lumMod val="75000"/>
+                  <a:lumOff val="25000"/>
+                </a:schemeClr>
+              </a:solidFill>
+              <a:latin typeface="나눔스퀘어 ExtraBold" pitchFamily="50" charset="-127"/>
+              <a:ea typeface="나눔스퀘어 ExtraBold" pitchFamily="50" charset="-127"/>
+            </a:endParaRPr>
+          </a:p>
+        </p:txBody>
+      </p:sp>
+      <p:sp>
+        <p:nvSpPr>
+          <p:cNvPr id="28" name="직사각형 27"/>
+          <p:cNvSpPr/>
+          <p:nvPr/>
+        </p:nvSpPr>
+        <p:spPr>
+          <a:xfrm>
+            <a:off x="1266575" y="4941051"/>
+            <a:ext cx="1731222" cy="327309"/>
+          </a:xfrm>
+          <a:prstGeom prst="rect">
+            <a:avLst/>
+          </a:prstGeom>
+          <a:solidFill>
+            <a:schemeClr val="bg1">
+              <a:lumMod val="95000"/>
+            </a:schemeClr>
+          </a:solidFill>
+          <a:ln>
+            <a:solidFill>
+              <a:schemeClr val="bg1">
+                <a:lumMod val="75000"/>
+              </a:schemeClr>
+            </a:solidFill>
+          </a:ln>
+        </p:spPr>
+        <p:style>
+          <a:lnRef idx="2">
+            <a:schemeClr val="accent1">
+              <a:shade val="50000"/>
+            </a:schemeClr>
+          </a:lnRef>
+          <a:fillRef idx="1">
+            <a:schemeClr val="accent1"/>
+          </a:fillRef>
+          <a:effectRef idx="0">
+            <a:schemeClr val="accent1"/>
+          </a:effectRef>
+          <a:fontRef idx="minor">
+            <a:schemeClr val="lt1"/>
+          </a:fontRef>
+        </p:style>
+        <p:txBody>
+          <a:bodyPr rtlCol="0" anchor="ctr"/>
+          <a:lstStyle/>
+          <a:p>
+            <a:pPr algn="ctr"/>
+            <a:r>
+              <a:rPr lang="en-US" altLang="ko-KR" sz="1400" smtClean="0">
+                <a:solidFill>
+                  <a:schemeClr val="tx1">
+                    <a:lumMod val="75000"/>
+                    <a:lumOff val="25000"/>
+                  </a:schemeClr>
+                </a:solidFill>
+                <a:latin typeface="나눔스퀘어 ExtraBold" pitchFamily="50" charset="-127"/>
+                <a:ea typeface="나눔스퀘어 ExtraBold" pitchFamily="50" charset="-127"/>
+              </a:rPr>
+              <a:t>ParseJsonData</a:t>
+            </a:r>
+            <a:endParaRPr lang="ko-KR" altLang="en-US" sz="1400">
+              <a:solidFill>
+                <a:schemeClr val="tx1">
+                  <a:lumMod val="75000"/>
+                  <a:lumOff val="25000"/>
+                </a:schemeClr>
+              </a:solidFill>
+              <a:latin typeface="나눔스퀘어 ExtraBold" pitchFamily="50" charset="-127"/>
+              <a:ea typeface="나눔스퀘어 ExtraBold" pitchFamily="50" charset="-127"/>
+            </a:endParaRPr>
+          </a:p>
+        </p:txBody>
+      </p:sp>
+      <p:sp>
+        <p:nvSpPr>
+          <p:cNvPr id="30" name="직사각형 29"/>
+          <p:cNvSpPr/>
+          <p:nvPr/>
+        </p:nvSpPr>
+        <p:spPr>
+          <a:xfrm>
+            <a:off x="1266575" y="5373099"/>
+            <a:ext cx="1731222" cy="327309"/>
+          </a:xfrm>
+          <a:prstGeom prst="rect">
+            <a:avLst/>
+          </a:prstGeom>
+          <a:solidFill>
+            <a:schemeClr val="bg1">
+              <a:lumMod val="95000"/>
+            </a:schemeClr>
+          </a:solidFill>
+          <a:ln>
+            <a:solidFill>
+              <a:schemeClr val="bg1">
+                <a:lumMod val="75000"/>
+              </a:schemeClr>
+            </a:solidFill>
+          </a:ln>
+        </p:spPr>
+        <p:style>
+          <a:lnRef idx="2">
+            <a:schemeClr val="accent1">
+              <a:shade val="50000"/>
+            </a:schemeClr>
+          </a:lnRef>
+          <a:fillRef idx="1">
+            <a:schemeClr val="accent1"/>
+          </a:fillRef>
+          <a:effectRef idx="0">
+            <a:schemeClr val="accent1"/>
+          </a:effectRef>
+          <a:fontRef idx="minor">
+            <a:schemeClr val="lt1"/>
+          </a:fontRef>
+        </p:style>
+        <p:txBody>
+          <a:bodyPr rtlCol="0" anchor="ctr"/>
+          <a:lstStyle/>
+          <a:p>
+            <a:pPr algn="ctr"/>
+            <a:r>
+              <a:rPr lang="en-US" altLang="ko-KR" sz="1400" smtClean="0">
+                <a:solidFill>
+                  <a:schemeClr val="tx1">
+                    <a:lumMod val="75000"/>
+                    <a:lumOff val="25000"/>
+                  </a:schemeClr>
+                </a:solidFill>
+                <a:latin typeface="나눔스퀘어 ExtraBold" pitchFamily="50" charset="-127"/>
+                <a:ea typeface="나눔스퀘어 ExtraBold" pitchFamily="50" charset="-127"/>
+              </a:rPr>
+              <a:t>ConvertToXML</a:t>
+            </a:r>
+            <a:endParaRPr lang="ko-KR" altLang="en-US" sz="1400">
+              <a:solidFill>
+                <a:schemeClr val="tx1">
+                  <a:lumMod val="75000"/>
+                  <a:lumOff val="25000"/>
+                </a:schemeClr>
+              </a:solidFill>
+              <a:latin typeface="나눔스퀘어 ExtraBold" pitchFamily="50" charset="-127"/>
+              <a:ea typeface="나눔스퀘어 ExtraBold" pitchFamily="50" charset="-127"/>
+            </a:endParaRPr>
+          </a:p>
+        </p:txBody>
+      </p:sp>
+      <p:sp>
+        <p:nvSpPr>
+          <p:cNvPr id="5" name="오른쪽 화살표 4"/>
+          <p:cNvSpPr/>
+          <p:nvPr/>
+        </p:nvSpPr>
+        <p:spPr>
+          <a:xfrm>
+            <a:off x="3157741" y="2643296"/>
+            <a:ext cx="1262909" cy="245913"/>
+          </a:xfrm>
+          <a:prstGeom prst="rightArrow">
+            <a:avLst/>
+          </a:prstGeom>
+          <a:solidFill>
+            <a:schemeClr val="tx1">
+              <a:lumMod val="75000"/>
+              <a:lumOff val="25000"/>
+            </a:schemeClr>
+          </a:solidFill>
+          <a:ln>
+            <a:solidFill>
+              <a:schemeClr val="tx1">
+                <a:lumMod val="95000"/>
+                <a:lumOff val="5000"/>
+              </a:schemeClr>
+            </a:solidFill>
+          </a:ln>
+        </p:spPr>
+        <p:style>
+          <a:lnRef idx="2">
+            <a:schemeClr val="accent1">
+              <a:shade val="50000"/>
+            </a:schemeClr>
+          </a:lnRef>
+          <a:fillRef idx="1">
+            <a:schemeClr val="accent1"/>
+          </a:fillRef>
+          <a:effectRef idx="0">
+            <a:schemeClr val="accent1"/>
+          </a:effectRef>
+          <a:fontRef idx="minor">
+            <a:schemeClr val="lt1"/>
+          </a:fontRef>
+        </p:style>
+        <p:txBody>
+          <a:bodyPr rtlCol="0" anchor="ctr"/>
+          <a:lstStyle/>
+          <a:p>
+            <a:pPr algn="ctr"/>
+            <a:endParaRPr lang="ko-KR" altLang="en-US"/>
+          </a:p>
+        </p:txBody>
+      </p:sp>
+      <p:sp>
+        <p:nvSpPr>
+          <p:cNvPr id="33" name="TextBox 32"/>
+          <p:cNvSpPr txBox="1"/>
+          <p:nvPr/>
+        </p:nvSpPr>
+        <p:spPr>
+          <a:xfrm>
+            <a:off x="3478917" y="2355170"/>
+            <a:ext cx="522897" cy="307777"/>
+          </a:xfrm>
+          <a:prstGeom prst="rect">
+            <a:avLst/>
+          </a:prstGeom>
+          <a:noFill/>
+        </p:spPr>
+        <p:txBody>
+          <a:bodyPr wrap="square" rtlCol="0">
+            <a:spAutoFit/>
+          </a:bodyPr>
+          <a:lstStyle/>
+          <a:p>
+            <a:pPr algn="ctr"/>
+            <a:r>
+              <a:rPr lang="ko-KR" altLang="en-US" sz="1400" smtClean="0">
+                <a:latin typeface="나눔스퀘어 ExtraBold" pitchFamily="50" charset="-127"/>
+                <a:ea typeface="나눔스퀘어 ExtraBold" pitchFamily="50" charset="-127"/>
+              </a:rPr>
+              <a:t>구현</a:t>
+            </a:r>
+            <a:endParaRPr lang="ko-KR" altLang="en-US" sz="1400">
+              <a:latin typeface="나눔스퀘어 ExtraBold" pitchFamily="50" charset="-127"/>
+              <a:ea typeface="나눔스퀘어 ExtraBold" pitchFamily="50" charset="-127"/>
+            </a:endParaRPr>
+          </a:p>
+        </p:txBody>
+      </p:sp>
+      <p:sp>
+        <p:nvSpPr>
+          <p:cNvPr id="36" name="직사각형 35"/>
+          <p:cNvSpPr/>
+          <p:nvPr/>
+        </p:nvSpPr>
+        <p:spPr>
+          <a:xfrm>
+            <a:off x="4450121" y="4719735"/>
+            <a:ext cx="1886980" cy="968624"/>
+          </a:xfrm>
+          <a:prstGeom prst="rect">
+            <a:avLst/>
+          </a:prstGeom>
+          <a:solidFill>
+            <a:srgbClr val="C6FFC5"/>
+          </a:solidFill>
+          <a:ln>
+            <a:solidFill>
+              <a:schemeClr val="tx1">
+                <a:lumMod val="65000"/>
+                <a:lumOff val="35000"/>
+              </a:schemeClr>
+            </a:solidFill>
+            <a:prstDash val="solid"/>
+          </a:ln>
+        </p:spPr>
+        <p:style>
+          <a:lnRef idx="2">
+            <a:schemeClr val="accent1">
+              <a:shade val="50000"/>
+            </a:schemeClr>
+          </a:lnRef>
+          <a:fillRef idx="1">
+            <a:schemeClr val="accent1"/>
+          </a:fillRef>
+          <a:effectRef idx="0">
+            <a:schemeClr val="accent1"/>
+          </a:effectRef>
+          <a:fontRef idx="minor">
+            <a:schemeClr val="lt1"/>
+          </a:fontRef>
+        </p:style>
+        <p:txBody>
+          <a:bodyPr rtlCol="0" anchor="ctr"/>
+          <a:lstStyle/>
+          <a:p>
+            <a:pPr algn="ctr"/>
+            <a:endParaRPr lang="ko-KR" altLang="en-US"/>
+          </a:p>
+        </p:txBody>
+      </p:sp>
+      <p:sp>
+        <p:nvSpPr>
+          <p:cNvPr id="37" name="직사각형 36"/>
+          <p:cNvSpPr/>
+          <p:nvPr/>
+        </p:nvSpPr>
+        <p:spPr>
+          <a:xfrm>
+            <a:off x="4585602" y="1886358"/>
+            <a:ext cx="1616018" cy="1800200"/>
+          </a:xfrm>
+          <a:prstGeom prst="rect">
+            <a:avLst/>
+          </a:prstGeom>
+          <a:solidFill>
+            <a:schemeClr val="tx2">
+              <a:lumMod val="20000"/>
+              <a:lumOff val="80000"/>
+            </a:schemeClr>
+          </a:solidFill>
+          <a:ln>
+            <a:solidFill>
+              <a:schemeClr val="tx1">
+                <a:lumMod val="65000"/>
+                <a:lumOff val="35000"/>
+              </a:schemeClr>
+            </a:solidFill>
+            <a:prstDash val="solid"/>
+          </a:ln>
+        </p:spPr>
+        <p:style>
+          <a:lnRef idx="2">
+            <a:schemeClr val="accent1">
+              <a:shade val="50000"/>
+            </a:schemeClr>
+          </a:lnRef>
+          <a:fillRef idx="1">
+            <a:schemeClr val="accent1"/>
+          </a:fillRef>
+          <a:effectRef idx="0">
+            <a:schemeClr val="accent1"/>
+          </a:effectRef>
+          <a:fontRef idx="minor">
+            <a:schemeClr val="lt1"/>
+          </a:fontRef>
+        </p:style>
+        <p:txBody>
+          <a:bodyPr rtlCol="0" anchor="ctr"/>
+          <a:lstStyle/>
+          <a:p>
+            <a:pPr algn="ctr"/>
+            <a:endParaRPr lang="ko-KR" altLang="en-US"/>
+          </a:p>
+        </p:txBody>
+      </p:sp>
+      <p:sp>
+        <p:nvSpPr>
+          <p:cNvPr id="38" name="TextBox 37"/>
+          <p:cNvSpPr txBox="1"/>
+          <p:nvPr/>
+        </p:nvSpPr>
+        <p:spPr>
+          <a:xfrm>
+            <a:off x="4573072" y="1283928"/>
+            <a:ext cx="1641078" cy="584775"/>
+          </a:xfrm>
+          <a:prstGeom prst="rect">
+            <a:avLst/>
+          </a:prstGeom>
+          <a:noFill/>
+        </p:spPr>
+        <p:txBody>
+          <a:bodyPr wrap="square" rtlCol="0">
+            <a:spAutoFit/>
+          </a:bodyPr>
+          <a:lstStyle/>
+          <a:p>
+            <a:pPr algn="ctr"/>
+            <a:r>
+              <a:rPr lang="en-US" altLang="ko-KR" sz="1600" smtClean="0">
+                <a:latin typeface="나눔스퀘어 ExtraBold" pitchFamily="50" charset="-127"/>
+                <a:ea typeface="나눔스퀘어 ExtraBold" pitchFamily="50" charset="-127"/>
+              </a:rPr>
+              <a:t>Object1</a:t>
+            </a:r>
+          </a:p>
+          <a:p>
+            <a:pPr algn="ctr"/>
+            <a:r>
+              <a:rPr lang="en-US" altLang="ko-KR" sz="1600" smtClean="0">
+                <a:latin typeface="나눔스퀘어 ExtraBold" pitchFamily="50" charset="-127"/>
+                <a:ea typeface="나눔스퀘어 ExtraBold" pitchFamily="50" charset="-127"/>
+              </a:rPr>
+              <a:t>(</a:t>
+            </a:r>
+            <a:r>
+              <a:rPr lang="ko-KR" altLang="en-US" sz="1600" smtClean="0">
+                <a:latin typeface="나눔스퀘어 ExtraBold" pitchFamily="50" charset="-127"/>
+                <a:ea typeface="나눔스퀘어 ExtraBold" pitchFamily="50" charset="-127"/>
+              </a:rPr>
+              <a:t>파일조작</a:t>
+            </a:r>
+            <a:r>
+              <a:rPr lang="en-US" altLang="ko-KR" sz="1600" smtClean="0">
+                <a:latin typeface="나눔스퀘어 ExtraBold" pitchFamily="50" charset="-127"/>
+                <a:ea typeface="나눔스퀘어 ExtraBold" pitchFamily="50" charset="-127"/>
+              </a:rPr>
+              <a:t>)</a:t>
+            </a:r>
+            <a:endParaRPr lang="ko-KR" altLang="en-US" sz="1600">
+              <a:latin typeface="나눔스퀘어 ExtraBold" pitchFamily="50" charset="-127"/>
+              <a:ea typeface="나눔스퀘어 ExtraBold" pitchFamily="50" charset="-127"/>
+            </a:endParaRPr>
+          </a:p>
+        </p:txBody>
+      </p:sp>
+      <p:sp>
+        <p:nvSpPr>
+          <p:cNvPr id="39" name="TextBox 38"/>
+          <p:cNvSpPr txBox="1"/>
+          <p:nvPr/>
+        </p:nvSpPr>
+        <p:spPr>
+          <a:xfrm>
+            <a:off x="4573072" y="4104182"/>
+            <a:ext cx="1641078" cy="584775"/>
+          </a:xfrm>
+          <a:prstGeom prst="rect">
+            <a:avLst/>
+          </a:prstGeom>
+          <a:noFill/>
+        </p:spPr>
+        <p:txBody>
+          <a:bodyPr wrap="square" rtlCol="0">
+            <a:spAutoFit/>
+          </a:bodyPr>
+          <a:lstStyle/>
+          <a:p>
+            <a:pPr algn="ctr"/>
+            <a:r>
+              <a:rPr lang="en-US" altLang="ko-KR" sz="1600" smtClean="0">
+                <a:latin typeface="나눔스퀘어 ExtraBold" pitchFamily="50" charset="-127"/>
+                <a:ea typeface="나눔스퀘어 ExtraBold" pitchFamily="50" charset="-127"/>
+              </a:rPr>
+              <a:t>Object2</a:t>
+            </a:r>
+            <a:endParaRPr lang="en-US" altLang="ko-KR" sz="1600" smtClean="0">
+              <a:latin typeface="나눔스퀘어 ExtraBold" pitchFamily="50" charset="-127"/>
+              <a:ea typeface="나눔스퀘어 ExtraBold" pitchFamily="50" charset="-127"/>
+            </a:endParaRPr>
+          </a:p>
+          <a:p>
+            <a:pPr algn="ctr"/>
+            <a:r>
+              <a:rPr lang="en-US" altLang="ko-KR" sz="1600" smtClean="0">
+                <a:latin typeface="나눔스퀘어 ExtraBold" pitchFamily="50" charset="-127"/>
+                <a:ea typeface="나눔스퀘어 ExtraBold" pitchFamily="50" charset="-127"/>
+              </a:rPr>
+              <a:t>(</a:t>
+            </a:r>
+            <a:r>
+              <a:rPr lang="ko-KR" altLang="en-US" sz="1600" smtClean="0">
+                <a:latin typeface="나눔스퀘어 ExtraBold" pitchFamily="50" charset="-127"/>
+                <a:ea typeface="나눔스퀘어 ExtraBold" pitchFamily="50" charset="-127"/>
+              </a:rPr>
+              <a:t>데이터처리</a:t>
+            </a:r>
+            <a:r>
+              <a:rPr lang="en-US" altLang="ko-KR" sz="1600" smtClean="0">
+                <a:latin typeface="나눔스퀘어 ExtraBold" pitchFamily="50" charset="-127"/>
+                <a:ea typeface="나눔스퀘어 ExtraBold" pitchFamily="50" charset="-127"/>
+              </a:rPr>
+              <a:t>)</a:t>
+            </a:r>
+            <a:endParaRPr lang="ko-KR" altLang="en-US" sz="1600">
+              <a:latin typeface="나눔스퀘어 ExtraBold" pitchFamily="50" charset="-127"/>
+              <a:ea typeface="나눔스퀘어 ExtraBold" pitchFamily="50" charset="-127"/>
+            </a:endParaRPr>
+          </a:p>
+        </p:txBody>
+      </p:sp>
+      <p:sp>
+        <p:nvSpPr>
+          <p:cNvPr id="40" name="직사각형 39"/>
+          <p:cNvSpPr/>
+          <p:nvPr/>
+        </p:nvSpPr>
+        <p:spPr>
+          <a:xfrm>
+            <a:off x="4678230" y="1964731"/>
+            <a:ext cx="1430762" cy="327309"/>
+          </a:xfrm>
+          <a:prstGeom prst="rect">
+            <a:avLst/>
+          </a:prstGeom>
+          <a:solidFill>
+            <a:schemeClr val="bg1">
+              <a:lumMod val="95000"/>
+            </a:schemeClr>
+          </a:solidFill>
+          <a:ln>
+            <a:solidFill>
+              <a:schemeClr val="bg1">
+                <a:lumMod val="75000"/>
+              </a:schemeClr>
+            </a:solidFill>
+          </a:ln>
+        </p:spPr>
+        <p:style>
+          <a:lnRef idx="2">
+            <a:schemeClr val="accent1">
+              <a:shade val="50000"/>
+            </a:schemeClr>
+          </a:lnRef>
+          <a:fillRef idx="1">
+            <a:schemeClr val="accent1"/>
+          </a:fillRef>
+          <a:effectRef idx="0">
+            <a:schemeClr val="accent1"/>
+          </a:effectRef>
+          <a:fontRef idx="minor">
+            <a:schemeClr val="lt1"/>
+          </a:fontRef>
+        </p:style>
+        <p:txBody>
+          <a:bodyPr rtlCol="0" anchor="ctr"/>
+          <a:lstStyle/>
+          <a:p>
+            <a:pPr algn="ctr"/>
+            <a:r>
+              <a:rPr lang="en-US" altLang="ko-KR" sz="1400" smtClean="0">
+                <a:solidFill>
+                  <a:schemeClr val="tx1">
+                    <a:lumMod val="75000"/>
+                    <a:lumOff val="25000"/>
+                  </a:schemeClr>
+                </a:solidFill>
+                <a:latin typeface="나눔스퀘어 ExtraBold" pitchFamily="50" charset="-127"/>
+                <a:ea typeface="나눔스퀘어 ExtraBold" pitchFamily="50" charset="-127"/>
+              </a:rPr>
+              <a:t>OpenFile</a:t>
+            </a:r>
+            <a:endParaRPr lang="ko-KR" altLang="en-US" sz="1400">
+              <a:solidFill>
+                <a:schemeClr val="tx1">
+                  <a:lumMod val="75000"/>
+                  <a:lumOff val="25000"/>
+                </a:schemeClr>
+              </a:solidFill>
+              <a:latin typeface="나눔스퀘어 ExtraBold" pitchFamily="50" charset="-127"/>
+              <a:ea typeface="나눔스퀘어 ExtraBold" pitchFamily="50" charset="-127"/>
+            </a:endParaRPr>
+          </a:p>
+        </p:txBody>
+      </p:sp>
+      <p:sp>
+        <p:nvSpPr>
+          <p:cNvPr id="41" name="직사각형 40"/>
+          <p:cNvSpPr/>
+          <p:nvPr/>
+        </p:nvSpPr>
+        <p:spPr>
+          <a:xfrm>
+            <a:off x="4678230" y="2396779"/>
+            <a:ext cx="1430762" cy="327309"/>
+          </a:xfrm>
+          <a:prstGeom prst="rect">
+            <a:avLst/>
+          </a:prstGeom>
+          <a:solidFill>
+            <a:schemeClr val="bg1">
+              <a:lumMod val="95000"/>
+            </a:schemeClr>
+          </a:solidFill>
+          <a:ln>
+            <a:solidFill>
+              <a:schemeClr val="bg1">
+                <a:lumMod val="75000"/>
+              </a:schemeClr>
+            </a:solidFill>
+          </a:ln>
+        </p:spPr>
+        <p:style>
+          <a:lnRef idx="2">
+            <a:schemeClr val="accent1">
+              <a:shade val="50000"/>
+            </a:schemeClr>
+          </a:lnRef>
+          <a:fillRef idx="1">
+            <a:schemeClr val="accent1"/>
+          </a:fillRef>
+          <a:effectRef idx="0">
+            <a:schemeClr val="accent1"/>
+          </a:effectRef>
+          <a:fontRef idx="minor">
+            <a:schemeClr val="lt1"/>
+          </a:fontRef>
+        </p:style>
+        <p:txBody>
+          <a:bodyPr rtlCol="0" anchor="ctr"/>
+          <a:lstStyle/>
+          <a:p>
+            <a:pPr algn="ctr"/>
+            <a:r>
+              <a:rPr lang="en-US" altLang="ko-KR" sz="1400" smtClean="0">
+                <a:solidFill>
+                  <a:schemeClr val="tx1">
+                    <a:lumMod val="75000"/>
+                    <a:lumOff val="25000"/>
+                  </a:schemeClr>
+                </a:solidFill>
+                <a:latin typeface="나눔스퀘어 ExtraBold" pitchFamily="50" charset="-127"/>
+                <a:ea typeface="나눔스퀘어 ExtraBold" pitchFamily="50" charset="-127"/>
+              </a:rPr>
+              <a:t>ReadFile</a:t>
+            </a:r>
+            <a:endParaRPr lang="ko-KR" altLang="en-US" sz="1400">
+              <a:solidFill>
+                <a:schemeClr val="tx1">
+                  <a:lumMod val="75000"/>
+                  <a:lumOff val="25000"/>
+                </a:schemeClr>
+              </a:solidFill>
+              <a:latin typeface="나눔스퀘어 ExtraBold" pitchFamily="50" charset="-127"/>
+              <a:ea typeface="나눔스퀘어 ExtraBold" pitchFamily="50" charset="-127"/>
+            </a:endParaRPr>
+          </a:p>
+        </p:txBody>
+      </p:sp>
+      <p:sp>
+        <p:nvSpPr>
+          <p:cNvPr id="42" name="직사각형 41"/>
+          <p:cNvSpPr/>
+          <p:nvPr/>
+        </p:nvSpPr>
+        <p:spPr>
+          <a:xfrm>
+            <a:off x="4678230" y="2828827"/>
+            <a:ext cx="1430762" cy="327309"/>
+          </a:xfrm>
+          <a:prstGeom prst="rect">
+            <a:avLst/>
+          </a:prstGeom>
+          <a:solidFill>
+            <a:schemeClr val="bg1">
+              <a:lumMod val="95000"/>
+            </a:schemeClr>
+          </a:solidFill>
+          <a:ln>
+            <a:solidFill>
+              <a:schemeClr val="bg1">
+                <a:lumMod val="75000"/>
+              </a:schemeClr>
+            </a:solidFill>
+          </a:ln>
+        </p:spPr>
+        <p:style>
+          <a:lnRef idx="2">
+            <a:schemeClr val="accent1">
+              <a:shade val="50000"/>
+            </a:schemeClr>
+          </a:lnRef>
+          <a:fillRef idx="1">
+            <a:schemeClr val="accent1"/>
+          </a:fillRef>
+          <a:effectRef idx="0">
+            <a:schemeClr val="accent1"/>
+          </a:effectRef>
+          <a:fontRef idx="minor">
+            <a:schemeClr val="lt1"/>
+          </a:fontRef>
+        </p:style>
+        <p:txBody>
+          <a:bodyPr rtlCol="0" anchor="ctr"/>
+          <a:lstStyle/>
+          <a:p>
+            <a:pPr algn="ctr"/>
+            <a:r>
+              <a:rPr lang="en-US" altLang="ko-KR" sz="1400" smtClean="0">
+                <a:solidFill>
+                  <a:schemeClr val="tx1">
+                    <a:lumMod val="75000"/>
+                    <a:lumOff val="25000"/>
+                  </a:schemeClr>
+                </a:solidFill>
+                <a:latin typeface="나눔스퀘어 ExtraBold" pitchFamily="50" charset="-127"/>
+                <a:ea typeface="나눔스퀘어 ExtraBold" pitchFamily="50" charset="-127"/>
+              </a:rPr>
+              <a:t>WriteFile</a:t>
+            </a:r>
+            <a:endParaRPr lang="ko-KR" altLang="en-US" sz="1400">
+              <a:solidFill>
+                <a:schemeClr val="tx1">
+                  <a:lumMod val="75000"/>
+                  <a:lumOff val="25000"/>
+                </a:schemeClr>
+              </a:solidFill>
+              <a:latin typeface="나눔스퀘어 ExtraBold" pitchFamily="50" charset="-127"/>
+              <a:ea typeface="나눔스퀘어 ExtraBold" pitchFamily="50" charset="-127"/>
+            </a:endParaRPr>
+          </a:p>
+        </p:txBody>
+      </p:sp>
+      <p:sp>
+        <p:nvSpPr>
+          <p:cNvPr id="43" name="직사각형 42"/>
+          <p:cNvSpPr/>
+          <p:nvPr/>
+        </p:nvSpPr>
+        <p:spPr>
+          <a:xfrm>
+            <a:off x="4678230" y="3260875"/>
+            <a:ext cx="1430762" cy="327309"/>
+          </a:xfrm>
+          <a:prstGeom prst="rect">
+            <a:avLst/>
+          </a:prstGeom>
+          <a:solidFill>
+            <a:schemeClr val="bg1">
+              <a:lumMod val="95000"/>
+            </a:schemeClr>
+          </a:solidFill>
+          <a:ln>
+            <a:solidFill>
+              <a:schemeClr val="bg1">
+                <a:lumMod val="75000"/>
+              </a:schemeClr>
+            </a:solidFill>
+          </a:ln>
+        </p:spPr>
+        <p:style>
+          <a:lnRef idx="2">
+            <a:schemeClr val="accent1">
+              <a:shade val="50000"/>
+            </a:schemeClr>
+          </a:lnRef>
+          <a:fillRef idx="1">
+            <a:schemeClr val="accent1"/>
+          </a:fillRef>
+          <a:effectRef idx="0">
+            <a:schemeClr val="accent1"/>
+          </a:effectRef>
+          <a:fontRef idx="minor">
+            <a:schemeClr val="lt1"/>
+          </a:fontRef>
+        </p:style>
+        <p:txBody>
+          <a:bodyPr rtlCol="0" anchor="ctr"/>
+          <a:lstStyle/>
+          <a:p>
+            <a:pPr algn="ctr"/>
+            <a:r>
+              <a:rPr lang="en-US" altLang="ko-KR" sz="1400" smtClean="0">
+                <a:solidFill>
+                  <a:schemeClr val="tx1">
+                    <a:lumMod val="75000"/>
+                    <a:lumOff val="25000"/>
+                  </a:schemeClr>
+                </a:solidFill>
+                <a:latin typeface="나눔스퀘어 ExtraBold" pitchFamily="50" charset="-127"/>
+                <a:ea typeface="나눔스퀘어 ExtraBold" pitchFamily="50" charset="-127"/>
+              </a:rPr>
+              <a:t>CloseFile</a:t>
+            </a:r>
+            <a:endParaRPr lang="ko-KR" altLang="en-US" sz="1400">
+              <a:solidFill>
+                <a:schemeClr val="tx1">
+                  <a:lumMod val="75000"/>
+                  <a:lumOff val="25000"/>
+                </a:schemeClr>
+              </a:solidFill>
+              <a:latin typeface="나눔스퀘어 ExtraBold" pitchFamily="50" charset="-127"/>
+              <a:ea typeface="나눔스퀘어 ExtraBold" pitchFamily="50" charset="-127"/>
+            </a:endParaRPr>
+          </a:p>
+        </p:txBody>
+      </p:sp>
+      <p:sp>
+        <p:nvSpPr>
+          <p:cNvPr id="44" name="직사각형 43"/>
+          <p:cNvSpPr/>
+          <p:nvPr/>
+        </p:nvSpPr>
+        <p:spPr>
+          <a:xfrm>
+            <a:off x="4528000" y="4824262"/>
+            <a:ext cx="1731222" cy="327309"/>
+          </a:xfrm>
+          <a:prstGeom prst="rect">
+            <a:avLst/>
+          </a:prstGeom>
+          <a:solidFill>
+            <a:schemeClr val="bg1">
+              <a:lumMod val="95000"/>
+            </a:schemeClr>
+          </a:solidFill>
+          <a:ln>
+            <a:solidFill>
+              <a:schemeClr val="bg1">
+                <a:lumMod val="75000"/>
+              </a:schemeClr>
+            </a:solidFill>
+          </a:ln>
+        </p:spPr>
+        <p:style>
+          <a:lnRef idx="2">
+            <a:schemeClr val="accent1">
+              <a:shade val="50000"/>
+            </a:schemeClr>
+          </a:lnRef>
+          <a:fillRef idx="1">
+            <a:schemeClr val="accent1"/>
+          </a:fillRef>
+          <a:effectRef idx="0">
+            <a:schemeClr val="accent1"/>
+          </a:effectRef>
+          <a:fontRef idx="minor">
+            <a:schemeClr val="lt1"/>
+          </a:fontRef>
+        </p:style>
+        <p:txBody>
+          <a:bodyPr rtlCol="0" anchor="ctr"/>
+          <a:lstStyle/>
+          <a:p>
+            <a:pPr algn="ctr"/>
+            <a:r>
+              <a:rPr lang="en-US" altLang="ko-KR" sz="1400" smtClean="0">
+                <a:solidFill>
+                  <a:schemeClr val="tx1">
+                    <a:lumMod val="75000"/>
+                    <a:lumOff val="25000"/>
+                  </a:schemeClr>
+                </a:solidFill>
+                <a:latin typeface="나눔스퀘어 ExtraBold" pitchFamily="50" charset="-127"/>
+                <a:ea typeface="나눔스퀘어 ExtraBold" pitchFamily="50" charset="-127"/>
+              </a:rPr>
+              <a:t>ParseJsonData</a:t>
+            </a:r>
+            <a:endParaRPr lang="ko-KR" altLang="en-US" sz="1400">
+              <a:solidFill>
+                <a:schemeClr val="tx1">
+                  <a:lumMod val="75000"/>
+                  <a:lumOff val="25000"/>
+                </a:schemeClr>
+              </a:solidFill>
+              <a:latin typeface="나눔스퀘어 ExtraBold" pitchFamily="50" charset="-127"/>
+              <a:ea typeface="나눔스퀘어 ExtraBold" pitchFamily="50" charset="-127"/>
+            </a:endParaRPr>
+          </a:p>
+        </p:txBody>
+      </p:sp>
+      <p:sp>
+        <p:nvSpPr>
+          <p:cNvPr id="45" name="직사각형 44"/>
+          <p:cNvSpPr/>
+          <p:nvPr/>
+        </p:nvSpPr>
+        <p:spPr>
+          <a:xfrm>
+            <a:off x="4528000" y="5256310"/>
+            <a:ext cx="1731222" cy="327309"/>
+          </a:xfrm>
+          <a:prstGeom prst="rect">
+            <a:avLst/>
+          </a:prstGeom>
+          <a:solidFill>
+            <a:schemeClr val="bg1">
+              <a:lumMod val="95000"/>
+            </a:schemeClr>
+          </a:solidFill>
+          <a:ln>
+            <a:solidFill>
+              <a:schemeClr val="bg1">
+                <a:lumMod val="75000"/>
+              </a:schemeClr>
+            </a:solidFill>
+          </a:ln>
+        </p:spPr>
+        <p:style>
+          <a:lnRef idx="2">
+            <a:schemeClr val="accent1">
+              <a:shade val="50000"/>
+            </a:schemeClr>
+          </a:lnRef>
+          <a:fillRef idx="1">
+            <a:schemeClr val="accent1"/>
+          </a:fillRef>
+          <a:effectRef idx="0">
+            <a:schemeClr val="accent1"/>
+          </a:effectRef>
+          <a:fontRef idx="minor">
+            <a:schemeClr val="lt1"/>
+          </a:fontRef>
+        </p:style>
+        <p:txBody>
+          <a:bodyPr rtlCol="0" anchor="ctr"/>
+          <a:lstStyle/>
+          <a:p>
+            <a:pPr algn="ctr"/>
+            <a:r>
+              <a:rPr lang="en-US" altLang="ko-KR" sz="1400" smtClean="0">
+                <a:solidFill>
+                  <a:schemeClr val="tx1">
+                    <a:lumMod val="75000"/>
+                    <a:lumOff val="25000"/>
+                  </a:schemeClr>
+                </a:solidFill>
+                <a:latin typeface="나눔스퀘어 ExtraBold" pitchFamily="50" charset="-127"/>
+                <a:ea typeface="나눔스퀘어 ExtraBold" pitchFamily="50" charset="-127"/>
+              </a:rPr>
+              <a:t>ConvertToXML</a:t>
+            </a:r>
+            <a:endParaRPr lang="ko-KR" altLang="en-US" sz="1400">
+              <a:solidFill>
+                <a:schemeClr val="tx1">
+                  <a:lumMod val="75000"/>
+                  <a:lumOff val="25000"/>
+                </a:schemeClr>
+              </a:solidFill>
+              <a:latin typeface="나눔스퀘어 ExtraBold" pitchFamily="50" charset="-127"/>
+              <a:ea typeface="나눔스퀘어 ExtraBold" pitchFamily="50" charset="-127"/>
+            </a:endParaRPr>
+          </a:p>
+        </p:txBody>
+      </p:sp>
+      <p:sp>
+        <p:nvSpPr>
+          <p:cNvPr id="46" name="TextBox 45"/>
+          <p:cNvSpPr txBox="1"/>
+          <p:nvPr/>
+        </p:nvSpPr>
+        <p:spPr>
+          <a:xfrm>
+            <a:off x="1571746" y="1729789"/>
+            <a:ext cx="1120879" cy="307777"/>
+          </a:xfrm>
+          <a:prstGeom prst="rect">
+            <a:avLst/>
+          </a:prstGeom>
+          <a:noFill/>
+        </p:spPr>
+        <p:txBody>
+          <a:bodyPr wrap="square" rtlCol="0">
+            <a:spAutoFit/>
+          </a:bodyPr>
+          <a:lstStyle/>
+          <a:p>
+            <a:pPr algn="ctr"/>
+            <a:r>
+              <a:rPr lang="en-US" altLang="ko-KR" sz="1400" smtClean="0">
+                <a:solidFill>
+                  <a:schemeClr val="tx1">
+                    <a:lumMod val="95000"/>
+                    <a:lumOff val="5000"/>
+                  </a:schemeClr>
+                </a:solidFill>
+                <a:latin typeface="나눔스퀘어 ExtraBold" pitchFamily="50" charset="-127"/>
+                <a:ea typeface="나눔스퀘어 ExtraBold" pitchFamily="50" charset="-127"/>
+              </a:rPr>
+              <a:t>methods</a:t>
+            </a:r>
+            <a:endParaRPr lang="ko-KR" altLang="en-US" sz="1400">
+              <a:solidFill>
+                <a:schemeClr val="tx1">
+                  <a:lumMod val="95000"/>
+                  <a:lumOff val="5000"/>
+                </a:schemeClr>
+              </a:solidFill>
+              <a:latin typeface="나눔스퀘어 ExtraBold" pitchFamily="50" charset="-127"/>
+              <a:ea typeface="나눔스퀘어 ExtraBold" pitchFamily="50" charset="-127"/>
+            </a:endParaRPr>
+          </a:p>
+        </p:txBody>
+      </p:sp>
+      <p:sp>
+        <p:nvSpPr>
+          <p:cNvPr id="47" name="TextBox 46"/>
+          <p:cNvSpPr txBox="1"/>
+          <p:nvPr/>
+        </p:nvSpPr>
+        <p:spPr>
+          <a:xfrm>
+            <a:off x="1571746" y="4611079"/>
+            <a:ext cx="1120879" cy="307777"/>
+          </a:xfrm>
+          <a:prstGeom prst="rect">
+            <a:avLst/>
+          </a:prstGeom>
+          <a:noFill/>
+        </p:spPr>
+        <p:txBody>
+          <a:bodyPr wrap="square" rtlCol="0">
+            <a:spAutoFit/>
+          </a:bodyPr>
+          <a:lstStyle/>
+          <a:p>
+            <a:pPr algn="ctr"/>
+            <a:r>
+              <a:rPr lang="en-US" altLang="ko-KR" sz="1400" smtClean="0">
+                <a:solidFill>
+                  <a:schemeClr val="tx1">
+                    <a:lumMod val="95000"/>
+                    <a:lumOff val="5000"/>
+                  </a:schemeClr>
+                </a:solidFill>
+                <a:latin typeface="나눔스퀘어 ExtraBold" pitchFamily="50" charset="-127"/>
+                <a:ea typeface="나눔스퀘어 ExtraBold" pitchFamily="50" charset="-127"/>
+              </a:rPr>
+              <a:t>methods</a:t>
+            </a:r>
+            <a:endParaRPr lang="ko-KR" altLang="en-US" sz="1400">
+              <a:solidFill>
+                <a:schemeClr val="tx1">
+                  <a:lumMod val="95000"/>
+                  <a:lumOff val="5000"/>
+                </a:schemeClr>
+              </a:solidFill>
+              <a:latin typeface="나눔스퀘어 ExtraBold" pitchFamily="50" charset="-127"/>
+              <a:ea typeface="나눔스퀘어 ExtraBold" pitchFamily="50" charset="-127"/>
+            </a:endParaRPr>
+          </a:p>
+        </p:txBody>
+      </p:sp>
+      <p:sp>
+        <p:nvSpPr>
+          <p:cNvPr id="48" name="오른쪽 화살표 47"/>
+          <p:cNvSpPr/>
+          <p:nvPr/>
+        </p:nvSpPr>
+        <p:spPr>
+          <a:xfrm>
+            <a:off x="3199168" y="5096501"/>
+            <a:ext cx="1171176" cy="245913"/>
+          </a:xfrm>
+          <a:prstGeom prst="rightArrow">
+            <a:avLst/>
+          </a:prstGeom>
+          <a:solidFill>
+            <a:schemeClr val="tx1">
+              <a:lumMod val="75000"/>
+              <a:lumOff val="25000"/>
+            </a:schemeClr>
+          </a:solidFill>
+          <a:ln>
+            <a:solidFill>
+              <a:schemeClr val="tx1">
+                <a:lumMod val="95000"/>
+                <a:lumOff val="5000"/>
+              </a:schemeClr>
+            </a:solidFill>
+          </a:ln>
+        </p:spPr>
+        <p:style>
+          <a:lnRef idx="2">
+            <a:schemeClr val="accent1">
+              <a:shade val="50000"/>
+            </a:schemeClr>
+          </a:lnRef>
+          <a:fillRef idx="1">
+            <a:schemeClr val="accent1"/>
+          </a:fillRef>
+          <a:effectRef idx="0">
+            <a:schemeClr val="accent1"/>
+          </a:effectRef>
+          <a:fontRef idx="minor">
+            <a:schemeClr val="lt1"/>
+          </a:fontRef>
+        </p:style>
+        <p:txBody>
+          <a:bodyPr rtlCol="0" anchor="ctr"/>
+          <a:lstStyle/>
+          <a:p>
+            <a:pPr algn="ctr"/>
+            <a:endParaRPr lang="ko-KR" altLang="en-US"/>
+          </a:p>
+        </p:txBody>
+      </p:sp>
+      <p:sp>
+        <p:nvSpPr>
+          <p:cNvPr id="49" name="TextBox 48"/>
+          <p:cNvSpPr txBox="1"/>
+          <p:nvPr/>
+        </p:nvSpPr>
+        <p:spPr>
+          <a:xfrm>
+            <a:off x="3465600" y="4808375"/>
+            <a:ext cx="522897" cy="307777"/>
+          </a:xfrm>
+          <a:prstGeom prst="rect">
+            <a:avLst/>
+          </a:prstGeom>
+          <a:noFill/>
+        </p:spPr>
+        <p:txBody>
+          <a:bodyPr wrap="square" rtlCol="0">
+            <a:spAutoFit/>
+          </a:bodyPr>
+          <a:lstStyle/>
+          <a:p>
+            <a:pPr algn="ctr"/>
+            <a:r>
+              <a:rPr lang="ko-KR" altLang="en-US" sz="1400" smtClean="0">
+                <a:latin typeface="나눔스퀘어 ExtraBold" pitchFamily="50" charset="-127"/>
+                <a:ea typeface="나눔스퀘어 ExtraBold" pitchFamily="50" charset="-127"/>
+              </a:rPr>
+              <a:t>구현</a:t>
+            </a:r>
+            <a:endParaRPr lang="ko-KR" altLang="en-US" sz="1400">
+              <a:latin typeface="나눔스퀘어 ExtraBold" pitchFamily="50" charset="-127"/>
+              <a:ea typeface="나눔스퀘어 ExtraBold" pitchFamily="50" charset="-127"/>
+            </a:endParaRPr>
+          </a:p>
+        </p:txBody>
+      </p:sp>
+      <p:sp>
+        <p:nvSpPr>
+          <p:cNvPr id="51" name="TextBox 50"/>
+          <p:cNvSpPr txBox="1"/>
+          <p:nvPr/>
+        </p:nvSpPr>
+        <p:spPr>
+          <a:xfrm>
+            <a:off x="4301473" y="647799"/>
+            <a:ext cx="2184276" cy="461665"/>
+          </a:xfrm>
+          <a:prstGeom prst="rect">
+            <a:avLst/>
+          </a:prstGeom>
+          <a:noFill/>
+        </p:spPr>
+        <p:txBody>
+          <a:bodyPr wrap="square" rtlCol="0">
+            <a:spAutoFit/>
+          </a:bodyPr>
+          <a:lstStyle/>
+          <a:p>
+            <a:pPr algn="ctr"/>
+            <a:r>
+              <a:rPr lang="en-US" altLang="ko-KR" sz="2400" smtClean="0">
+                <a:latin typeface="나눔스퀘어 ExtraBold" pitchFamily="50" charset="-127"/>
+                <a:ea typeface="나눔스퀘어 ExtraBold" pitchFamily="50" charset="-127"/>
+              </a:rPr>
+              <a:t>Component</a:t>
+            </a:r>
+            <a:endParaRPr lang="ko-KR" altLang="en-US" sz="2400">
+              <a:latin typeface="나눔스퀘어 ExtraBold" pitchFamily="50" charset="-127"/>
+              <a:ea typeface="나눔스퀘어 ExtraBold" pitchFamily="50" charset="-127"/>
+            </a:endParaRPr>
+          </a:p>
+        </p:txBody>
+      </p:sp>
+    </p:spTree>
+    <p:extLst>
+      <p:ext uri="{BB962C8B-B14F-4D97-AF65-F5344CB8AC3E}">
+        <p14:creationId xmlns:p14="http://schemas.microsoft.com/office/powerpoint/2010/main" val="1389914914"/>
+      </p:ext>
+    </p:extLst>
+  </p:cSld>
+  <p:clrMapOvr>
+    <a:masterClrMapping/>
+  </p:clrMapOvr>
+</p:sld>
+</file>
+
 <file path=ppt/theme/theme1.xml><?xml version="1.0" encoding="utf-8"?>
 <a:theme xmlns:a="http://schemas.openxmlformats.org/drawingml/2006/main" name="Office 테마">
   <a:themeElements>

</xml_diff>

<commit_message>
update post - algorithm
update css
- main inner bg
</commit_message>
<xml_diff>
--- a/assets/etc/이미지제작용.pptx
+++ b/assets/etc/이미지제작용.pptx
@@ -10,6 +10,9 @@
     <p:sldId id="258" r:id="rId4"/>
     <p:sldId id="259" r:id="rId5"/>
     <p:sldId id="260" r:id="rId6"/>
+    <p:sldId id="261" r:id="rId7"/>
+    <p:sldId id="262" r:id="rId8"/>
+    <p:sldId id="263" r:id="rId9"/>
   </p:sldIdLst>
   <p:sldSz cx="11522075" cy="6480175"/>
   <p:notesSz cx="6858000" cy="9144000"/>
@@ -292,7 +295,7 @@
           <a:p>
             <a:fld id="{10B01263-E573-4C51-9265-094B7818CB45}" type="datetimeFigureOut">
               <a:rPr lang="ko-KR" altLang="en-US" smtClean="0"/>
-              <a:t>2024-03-08</a:t>
+              <a:t>2024-03-21</a:t>
             </a:fld>
             <a:endParaRPr lang="ko-KR" altLang="en-US"/>
           </a:p>
@@ -462,7 +465,7 @@
           <a:p>
             <a:fld id="{10B01263-E573-4C51-9265-094B7818CB45}" type="datetimeFigureOut">
               <a:rPr lang="ko-KR" altLang="en-US" smtClean="0"/>
-              <a:t>2024-03-08</a:t>
+              <a:t>2024-03-21</a:t>
             </a:fld>
             <a:endParaRPr lang="ko-KR" altLang="en-US"/>
           </a:p>
@@ -642,7 +645,7 @@
           <a:p>
             <a:fld id="{10B01263-E573-4C51-9265-094B7818CB45}" type="datetimeFigureOut">
               <a:rPr lang="ko-KR" altLang="en-US" smtClean="0"/>
-              <a:t>2024-03-08</a:t>
+              <a:t>2024-03-21</a:t>
             </a:fld>
             <a:endParaRPr lang="ko-KR" altLang="en-US"/>
           </a:p>
@@ -812,7 +815,7 @@
           <a:p>
             <a:fld id="{10B01263-E573-4C51-9265-094B7818CB45}" type="datetimeFigureOut">
               <a:rPr lang="ko-KR" altLang="en-US" smtClean="0"/>
-              <a:t>2024-03-08</a:t>
+              <a:t>2024-03-21</a:t>
             </a:fld>
             <a:endParaRPr lang="ko-KR" altLang="en-US"/>
           </a:p>
@@ -1058,7 +1061,7 @@
           <a:p>
             <a:fld id="{10B01263-E573-4C51-9265-094B7818CB45}" type="datetimeFigureOut">
               <a:rPr lang="ko-KR" altLang="en-US" smtClean="0"/>
-              <a:t>2024-03-08</a:t>
+              <a:t>2024-03-21</a:t>
             </a:fld>
             <a:endParaRPr lang="ko-KR" altLang="en-US"/>
           </a:p>
@@ -1346,7 +1349,7 @@
           <a:p>
             <a:fld id="{10B01263-E573-4C51-9265-094B7818CB45}" type="datetimeFigureOut">
               <a:rPr lang="ko-KR" altLang="en-US" smtClean="0"/>
-              <a:t>2024-03-08</a:t>
+              <a:t>2024-03-21</a:t>
             </a:fld>
             <a:endParaRPr lang="ko-KR" altLang="en-US"/>
           </a:p>
@@ -1768,7 +1771,7 @@
           <a:p>
             <a:fld id="{10B01263-E573-4C51-9265-094B7818CB45}" type="datetimeFigureOut">
               <a:rPr lang="ko-KR" altLang="en-US" smtClean="0"/>
-              <a:t>2024-03-08</a:t>
+              <a:t>2024-03-21</a:t>
             </a:fld>
             <a:endParaRPr lang="ko-KR" altLang="en-US"/>
           </a:p>
@@ -1886,7 +1889,7 @@
           <a:p>
             <a:fld id="{10B01263-E573-4C51-9265-094B7818CB45}" type="datetimeFigureOut">
               <a:rPr lang="ko-KR" altLang="en-US" smtClean="0"/>
-              <a:t>2024-03-08</a:t>
+              <a:t>2024-03-21</a:t>
             </a:fld>
             <a:endParaRPr lang="ko-KR" altLang="en-US"/>
           </a:p>
@@ -1981,7 +1984,7 @@
           <a:p>
             <a:fld id="{10B01263-E573-4C51-9265-094B7818CB45}" type="datetimeFigureOut">
               <a:rPr lang="ko-KR" altLang="en-US" smtClean="0"/>
-              <a:t>2024-03-08</a:t>
+              <a:t>2024-03-21</a:t>
             </a:fld>
             <a:endParaRPr lang="ko-KR" altLang="en-US"/>
           </a:p>
@@ -2258,7 +2261,7 @@
           <a:p>
             <a:fld id="{10B01263-E573-4C51-9265-094B7818CB45}" type="datetimeFigureOut">
               <a:rPr lang="ko-KR" altLang="en-US" smtClean="0"/>
-              <a:t>2024-03-08</a:t>
+              <a:t>2024-03-21</a:t>
             </a:fld>
             <a:endParaRPr lang="ko-KR" altLang="en-US"/>
           </a:p>
@@ -2511,7 +2514,7 @@
           <a:p>
             <a:fld id="{10B01263-E573-4C51-9265-094B7818CB45}" type="datetimeFigureOut">
               <a:rPr lang="ko-KR" altLang="en-US" smtClean="0"/>
-              <a:t>2024-03-08</a:t>
+              <a:t>2024-03-21</a:t>
             </a:fld>
             <a:endParaRPr lang="ko-KR" altLang="en-US"/>
           </a:p>
@@ -2724,7 +2727,7 @@
           <a:p>
             <a:fld id="{10B01263-E573-4C51-9265-094B7818CB45}" type="datetimeFigureOut">
               <a:rPr lang="ko-KR" altLang="en-US" smtClean="0"/>
-              <a:t>2024-03-08</a:t>
+              <a:t>2024-03-21</a:t>
             </a:fld>
             <a:endParaRPr lang="ko-KR" altLang="en-US"/>
           </a:p>
@@ -3464,7 +3467,7 @@
           <a:p>
             <a:pPr algn="ctr"/>
             <a:r>
-              <a:rPr lang="en-US" altLang="ko-KR" sz="3400">
+              <a:rPr lang="en-US" altLang="ko-KR" sz="3400" dirty="0">
                 <a:latin typeface="나눔스퀘어 ExtraBold" pitchFamily="50" charset="-127"/>
                 <a:ea typeface="나눔스퀘어 ExtraBold" pitchFamily="50" charset="-127"/>
               </a:rPr>
@@ -6146,13 +6149,13 @@
           <a:p>
             <a:pPr algn="ctr"/>
             <a:r>
-              <a:rPr lang="en-US" altLang="ko-KR" sz="1400" smtClean="0">
+              <a:rPr lang="en-US" altLang="ko-KR" sz="1400" dirty="0" smtClean="0">
                 <a:latin typeface="나눔스퀘어 ExtraBold" pitchFamily="50" charset="-127"/>
                 <a:ea typeface="나눔스퀘어 ExtraBold" pitchFamily="50" charset="-127"/>
               </a:rPr>
               <a:t>HTTP</a:t>
             </a:r>
-            <a:endParaRPr lang="ko-KR" altLang="en-US" sz="1400">
+            <a:endParaRPr lang="ko-KR" altLang="en-US" sz="1400" dirty="0">
               <a:latin typeface="나눔스퀘어 ExtraBold" pitchFamily="50" charset="-127"/>
               <a:ea typeface="나눔스퀘어 ExtraBold" pitchFamily="50" charset="-127"/>
             </a:endParaRPr>
@@ -8794,10 +8797,6 @@
               </a:rPr>
               <a:t>Interface2</a:t>
             </a:r>
-            <a:endParaRPr lang="en-US" altLang="ko-KR" sz="1600" smtClean="0">
-              <a:latin typeface="나눔스퀘어 ExtraBold" pitchFamily="50" charset="-127"/>
-              <a:ea typeface="나눔스퀘어 ExtraBold" pitchFamily="50" charset="-127"/>
-            </a:endParaRPr>
           </a:p>
           <a:p>
             <a:pPr algn="ctr"/>
@@ -9562,10 +9561,6 @@
               </a:rPr>
               <a:t>Object2</a:t>
             </a:r>
-            <a:endParaRPr lang="en-US" altLang="ko-KR" sz="1600" smtClean="0">
-              <a:latin typeface="나눔스퀘어 ExtraBold" pitchFamily="50" charset="-127"/>
-              <a:ea typeface="나눔스퀘어 ExtraBold" pitchFamily="50" charset="-127"/>
-            </a:endParaRPr>
           </a:p>
           <a:p>
             <a:pPr algn="ctr"/>
@@ -10271,6 +10266,4571 @@
     <p:extLst>
       <p:ext uri="{BB962C8B-B14F-4D97-AF65-F5344CB8AC3E}">
         <p14:creationId xmlns:p14="http://schemas.microsoft.com/office/powerpoint/2010/main" val="1389914914"/>
+      </p:ext>
+    </p:extLst>
+  </p:cSld>
+  <p:clrMapOvr>
+    <a:masterClrMapping/>
+  </p:clrMapOvr>
+</p:sld>
+</file>
+
+<file path=ppt/slides/slide6.xml><?xml version="1.0" encoding="utf-8"?>
+<p:sld xmlns:a="http://schemas.openxmlformats.org/drawingml/2006/main" xmlns:r="http://schemas.openxmlformats.org/officeDocument/2006/relationships" xmlns:p="http://schemas.openxmlformats.org/presentationml/2006/main">
+  <p:cSld>
+    <p:spTree>
+      <p:nvGrpSpPr>
+        <p:cNvPr id="1" name=""/>
+        <p:cNvGrpSpPr/>
+        <p:nvPr/>
+      </p:nvGrpSpPr>
+      <p:grpSpPr>
+        <a:xfrm>
+          <a:off x="0" y="0"/>
+          <a:ext cx="0" cy="0"/>
+          <a:chOff x="0" y="0"/>
+          <a:chExt cx="0" cy="0"/>
+        </a:xfrm>
+      </p:grpSpPr>
+      <p:sp>
+        <p:nvSpPr>
+          <p:cNvPr id="7" name="직사각형 6"/>
+          <p:cNvSpPr/>
+          <p:nvPr/>
+        </p:nvSpPr>
+        <p:spPr>
+          <a:xfrm>
+            <a:off x="1892837" y="3818166"/>
+            <a:ext cx="773640" cy="475253"/>
+          </a:xfrm>
+          <a:prstGeom prst="rect">
+            <a:avLst/>
+          </a:prstGeom>
+          <a:solidFill>
+            <a:schemeClr val="bg1">
+              <a:lumMod val="95000"/>
+            </a:schemeClr>
+          </a:solidFill>
+          <a:ln>
+            <a:solidFill>
+              <a:schemeClr val="tx1"/>
+            </a:solidFill>
+          </a:ln>
+        </p:spPr>
+        <p:style>
+          <a:lnRef idx="2">
+            <a:schemeClr val="accent1">
+              <a:shade val="50000"/>
+            </a:schemeClr>
+          </a:lnRef>
+          <a:fillRef idx="1">
+            <a:schemeClr val="accent1"/>
+          </a:fillRef>
+          <a:effectRef idx="0">
+            <a:schemeClr val="accent1"/>
+          </a:effectRef>
+          <a:fontRef idx="minor">
+            <a:schemeClr val="lt1"/>
+          </a:fontRef>
+        </p:style>
+        <p:txBody>
+          <a:bodyPr rtlCol="0" anchor="ctr"/>
+          <a:lstStyle/>
+          <a:p>
+            <a:pPr algn="ctr"/>
+            <a:r>
+              <a:rPr lang="en-US" altLang="ko-KR" dirty="0" smtClean="0">
+                <a:solidFill>
+                  <a:schemeClr val="tx1"/>
+                </a:solidFill>
+                <a:latin typeface="나눔스퀘어 ExtraBold" pitchFamily="50" charset="-127"/>
+                <a:ea typeface="나눔스퀘어 ExtraBold" pitchFamily="50" charset="-127"/>
+              </a:rPr>
+              <a:t>8</a:t>
+            </a:r>
+            <a:endParaRPr lang="ko-KR" altLang="en-US" dirty="0">
+              <a:solidFill>
+                <a:schemeClr val="tx1"/>
+              </a:solidFill>
+              <a:latin typeface="나눔스퀘어 ExtraBold" pitchFamily="50" charset="-127"/>
+              <a:ea typeface="나눔스퀘어 ExtraBold" pitchFamily="50" charset="-127"/>
+            </a:endParaRPr>
+          </a:p>
+        </p:txBody>
+      </p:sp>
+      <p:sp>
+        <p:nvSpPr>
+          <p:cNvPr id="32" name="직사각형 31"/>
+          <p:cNvSpPr/>
+          <p:nvPr/>
+        </p:nvSpPr>
+        <p:spPr>
+          <a:xfrm>
+            <a:off x="2666477" y="3818166"/>
+            <a:ext cx="773640" cy="475253"/>
+          </a:xfrm>
+          <a:prstGeom prst="rect">
+            <a:avLst/>
+          </a:prstGeom>
+          <a:solidFill>
+            <a:schemeClr val="bg1">
+              <a:lumMod val="95000"/>
+            </a:schemeClr>
+          </a:solidFill>
+          <a:ln>
+            <a:solidFill>
+              <a:schemeClr val="tx1"/>
+            </a:solidFill>
+          </a:ln>
+        </p:spPr>
+        <p:style>
+          <a:lnRef idx="2">
+            <a:schemeClr val="accent1">
+              <a:shade val="50000"/>
+            </a:schemeClr>
+          </a:lnRef>
+          <a:fillRef idx="1">
+            <a:schemeClr val="accent1"/>
+          </a:fillRef>
+          <a:effectRef idx="0">
+            <a:schemeClr val="accent1"/>
+          </a:effectRef>
+          <a:fontRef idx="minor">
+            <a:schemeClr val="lt1"/>
+          </a:fontRef>
+        </p:style>
+        <p:txBody>
+          <a:bodyPr rtlCol="0" anchor="ctr"/>
+          <a:lstStyle/>
+          <a:p>
+            <a:pPr algn="ctr"/>
+            <a:r>
+              <a:rPr lang="en-US" altLang="ko-KR" dirty="0" smtClean="0">
+                <a:solidFill>
+                  <a:schemeClr val="tx1"/>
+                </a:solidFill>
+                <a:latin typeface="나눔스퀘어 ExtraBold" pitchFamily="50" charset="-127"/>
+                <a:ea typeface="나눔스퀘어 ExtraBold" pitchFamily="50" charset="-127"/>
+              </a:rPr>
+              <a:t>16</a:t>
+            </a:r>
+            <a:endParaRPr lang="ko-KR" altLang="en-US" dirty="0">
+              <a:solidFill>
+                <a:schemeClr val="tx1"/>
+              </a:solidFill>
+              <a:latin typeface="나눔스퀘어 ExtraBold" pitchFamily="50" charset="-127"/>
+              <a:ea typeface="나눔스퀘어 ExtraBold" pitchFamily="50" charset="-127"/>
+            </a:endParaRPr>
+          </a:p>
+        </p:txBody>
+      </p:sp>
+      <p:sp>
+        <p:nvSpPr>
+          <p:cNvPr id="34" name="직사각형 33"/>
+          <p:cNvSpPr/>
+          <p:nvPr/>
+        </p:nvSpPr>
+        <p:spPr>
+          <a:xfrm>
+            <a:off x="3440117" y="3818166"/>
+            <a:ext cx="773640" cy="475253"/>
+          </a:xfrm>
+          <a:prstGeom prst="rect">
+            <a:avLst/>
+          </a:prstGeom>
+          <a:solidFill>
+            <a:schemeClr val="bg1">
+              <a:lumMod val="95000"/>
+            </a:schemeClr>
+          </a:solidFill>
+          <a:ln>
+            <a:solidFill>
+              <a:schemeClr val="tx1"/>
+            </a:solidFill>
+          </a:ln>
+        </p:spPr>
+        <p:style>
+          <a:lnRef idx="2">
+            <a:schemeClr val="accent1">
+              <a:shade val="50000"/>
+            </a:schemeClr>
+          </a:lnRef>
+          <a:fillRef idx="1">
+            <a:schemeClr val="accent1"/>
+          </a:fillRef>
+          <a:effectRef idx="0">
+            <a:schemeClr val="accent1"/>
+          </a:effectRef>
+          <a:fontRef idx="minor">
+            <a:schemeClr val="lt1"/>
+          </a:fontRef>
+        </p:style>
+        <p:txBody>
+          <a:bodyPr rtlCol="0" anchor="ctr"/>
+          <a:lstStyle/>
+          <a:p>
+            <a:pPr algn="ctr"/>
+            <a:r>
+              <a:rPr lang="en-US" altLang="ko-KR" dirty="0" smtClean="0">
+                <a:solidFill>
+                  <a:schemeClr val="tx1"/>
+                </a:solidFill>
+                <a:latin typeface="나눔스퀘어 ExtraBold" pitchFamily="50" charset="-127"/>
+                <a:ea typeface="나눔스퀘어 ExtraBold" pitchFamily="50" charset="-127"/>
+              </a:rPr>
+              <a:t>23</a:t>
+            </a:r>
+            <a:endParaRPr lang="ko-KR" altLang="en-US" dirty="0">
+              <a:solidFill>
+                <a:schemeClr val="tx1"/>
+              </a:solidFill>
+              <a:latin typeface="나눔스퀘어 ExtraBold" pitchFamily="50" charset="-127"/>
+              <a:ea typeface="나눔스퀘어 ExtraBold" pitchFamily="50" charset="-127"/>
+            </a:endParaRPr>
+          </a:p>
+        </p:txBody>
+      </p:sp>
+      <p:sp>
+        <p:nvSpPr>
+          <p:cNvPr id="35" name="직사각형 34"/>
+          <p:cNvSpPr/>
+          <p:nvPr/>
+        </p:nvSpPr>
+        <p:spPr>
+          <a:xfrm>
+            <a:off x="4213757" y="3818166"/>
+            <a:ext cx="773640" cy="475253"/>
+          </a:xfrm>
+          <a:prstGeom prst="rect">
+            <a:avLst/>
+          </a:prstGeom>
+          <a:solidFill>
+            <a:schemeClr val="bg1">
+              <a:lumMod val="95000"/>
+            </a:schemeClr>
+          </a:solidFill>
+          <a:ln>
+            <a:solidFill>
+              <a:schemeClr val="tx1"/>
+            </a:solidFill>
+          </a:ln>
+        </p:spPr>
+        <p:style>
+          <a:lnRef idx="2">
+            <a:schemeClr val="accent1">
+              <a:shade val="50000"/>
+            </a:schemeClr>
+          </a:lnRef>
+          <a:fillRef idx="1">
+            <a:schemeClr val="accent1"/>
+          </a:fillRef>
+          <a:effectRef idx="0">
+            <a:schemeClr val="accent1"/>
+          </a:effectRef>
+          <a:fontRef idx="minor">
+            <a:schemeClr val="lt1"/>
+          </a:fontRef>
+        </p:style>
+        <p:txBody>
+          <a:bodyPr rtlCol="0" anchor="ctr"/>
+          <a:lstStyle/>
+          <a:p>
+            <a:pPr algn="ctr"/>
+            <a:r>
+              <a:rPr lang="en-US" altLang="ko-KR" dirty="0" smtClean="0">
+                <a:solidFill>
+                  <a:schemeClr val="tx1"/>
+                </a:solidFill>
+                <a:latin typeface="나눔스퀘어 ExtraBold" pitchFamily="50" charset="-127"/>
+                <a:ea typeface="나눔스퀘어 ExtraBold" pitchFamily="50" charset="-127"/>
+              </a:rPr>
+              <a:t>29</a:t>
+            </a:r>
+            <a:endParaRPr lang="ko-KR" altLang="en-US" dirty="0">
+              <a:solidFill>
+                <a:schemeClr val="tx1"/>
+              </a:solidFill>
+              <a:latin typeface="나눔스퀘어 ExtraBold" pitchFamily="50" charset="-127"/>
+              <a:ea typeface="나눔스퀘어 ExtraBold" pitchFamily="50" charset="-127"/>
+            </a:endParaRPr>
+          </a:p>
+        </p:txBody>
+      </p:sp>
+      <p:sp>
+        <p:nvSpPr>
+          <p:cNvPr id="50" name="직사각형 49"/>
+          <p:cNvSpPr/>
+          <p:nvPr/>
+        </p:nvSpPr>
+        <p:spPr>
+          <a:xfrm>
+            <a:off x="4987397" y="3818166"/>
+            <a:ext cx="773640" cy="475253"/>
+          </a:xfrm>
+          <a:prstGeom prst="rect">
+            <a:avLst/>
+          </a:prstGeom>
+          <a:solidFill>
+            <a:schemeClr val="bg1">
+              <a:lumMod val="95000"/>
+            </a:schemeClr>
+          </a:solidFill>
+          <a:ln>
+            <a:solidFill>
+              <a:schemeClr val="tx1"/>
+            </a:solidFill>
+          </a:ln>
+        </p:spPr>
+        <p:style>
+          <a:lnRef idx="2">
+            <a:schemeClr val="accent1">
+              <a:shade val="50000"/>
+            </a:schemeClr>
+          </a:lnRef>
+          <a:fillRef idx="1">
+            <a:schemeClr val="accent1"/>
+          </a:fillRef>
+          <a:effectRef idx="0">
+            <a:schemeClr val="accent1"/>
+          </a:effectRef>
+          <a:fontRef idx="minor">
+            <a:schemeClr val="lt1"/>
+          </a:fontRef>
+        </p:style>
+        <p:txBody>
+          <a:bodyPr rtlCol="0" anchor="ctr"/>
+          <a:lstStyle/>
+          <a:p>
+            <a:pPr algn="ctr"/>
+            <a:r>
+              <a:rPr lang="en-US" altLang="ko-KR" dirty="0" smtClean="0">
+                <a:solidFill>
+                  <a:schemeClr val="tx1"/>
+                </a:solidFill>
+                <a:latin typeface="나눔스퀘어 ExtraBold" pitchFamily="50" charset="-127"/>
+                <a:ea typeface="나눔스퀘어 ExtraBold" pitchFamily="50" charset="-127"/>
+              </a:rPr>
+              <a:t>33</a:t>
+            </a:r>
+            <a:endParaRPr lang="ko-KR" altLang="en-US" dirty="0">
+              <a:solidFill>
+                <a:schemeClr val="tx1"/>
+              </a:solidFill>
+              <a:latin typeface="나눔스퀘어 ExtraBold" pitchFamily="50" charset="-127"/>
+              <a:ea typeface="나눔스퀘어 ExtraBold" pitchFamily="50" charset="-127"/>
+            </a:endParaRPr>
+          </a:p>
+        </p:txBody>
+      </p:sp>
+      <p:sp>
+        <p:nvSpPr>
+          <p:cNvPr id="52" name="직사각형 51"/>
+          <p:cNvSpPr/>
+          <p:nvPr/>
+        </p:nvSpPr>
+        <p:spPr>
+          <a:xfrm>
+            <a:off x="5761037" y="3818166"/>
+            <a:ext cx="773640" cy="475253"/>
+          </a:xfrm>
+          <a:prstGeom prst="rect">
+            <a:avLst/>
+          </a:prstGeom>
+          <a:solidFill>
+            <a:schemeClr val="bg1">
+              <a:lumMod val="95000"/>
+            </a:schemeClr>
+          </a:solidFill>
+          <a:ln>
+            <a:solidFill>
+              <a:schemeClr val="tx1"/>
+            </a:solidFill>
+          </a:ln>
+        </p:spPr>
+        <p:style>
+          <a:lnRef idx="2">
+            <a:schemeClr val="accent1">
+              <a:shade val="50000"/>
+            </a:schemeClr>
+          </a:lnRef>
+          <a:fillRef idx="1">
+            <a:schemeClr val="accent1"/>
+          </a:fillRef>
+          <a:effectRef idx="0">
+            <a:schemeClr val="accent1"/>
+          </a:effectRef>
+          <a:fontRef idx="minor">
+            <a:schemeClr val="lt1"/>
+          </a:fontRef>
+        </p:style>
+        <p:txBody>
+          <a:bodyPr rtlCol="0" anchor="ctr"/>
+          <a:lstStyle/>
+          <a:p>
+            <a:pPr algn="ctr"/>
+            <a:r>
+              <a:rPr lang="en-US" altLang="ko-KR" dirty="0" smtClean="0">
+                <a:solidFill>
+                  <a:schemeClr val="tx1"/>
+                </a:solidFill>
+                <a:latin typeface="나눔스퀘어 ExtraBold" pitchFamily="50" charset="-127"/>
+                <a:ea typeface="나눔스퀘어 ExtraBold" pitchFamily="50" charset="-127"/>
+              </a:rPr>
+              <a:t>48</a:t>
+            </a:r>
+            <a:endParaRPr lang="ko-KR" altLang="en-US" dirty="0">
+              <a:solidFill>
+                <a:schemeClr val="tx1"/>
+              </a:solidFill>
+              <a:latin typeface="나눔스퀘어 ExtraBold" pitchFamily="50" charset="-127"/>
+              <a:ea typeface="나눔스퀘어 ExtraBold" pitchFamily="50" charset="-127"/>
+            </a:endParaRPr>
+          </a:p>
+        </p:txBody>
+      </p:sp>
+      <p:sp>
+        <p:nvSpPr>
+          <p:cNvPr id="58" name="직사각형 57"/>
+          <p:cNvSpPr/>
+          <p:nvPr/>
+        </p:nvSpPr>
+        <p:spPr>
+          <a:xfrm>
+            <a:off x="6534677" y="3818166"/>
+            <a:ext cx="773640" cy="475253"/>
+          </a:xfrm>
+          <a:prstGeom prst="rect">
+            <a:avLst/>
+          </a:prstGeom>
+          <a:solidFill>
+            <a:schemeClr val="bg1">
+              <a:lumMod val="95000"/>
+            </a:schemeClr>
+          </a:solidFill>
+          <a:ln>
+            <a:solidFill>
+              <a:schemeClr val="tx1"/>
+            </a:solidFill>
+          </a:ln>
+        </p:spPr>
+        <p:style>
+          <a:lnRef idx="2">
+            <a:schemeClr val="accent1">
+              <a:shade val="50000"/>
+            </a:schemeClr>
+          </a:lnRef>
+          <a:fillRef idx="1">
+            <a:schemeClr val="accent1"/>
+          </a:fillRef>
+          <a:effectRef idx="0">
+            <a:schemeClr val="accent1"/>
+          </a:effectRef>
+          <a:fontRef idx="minor">
+            <a:schemeClr val="lt1"/>
+          </a:fontRef>
+        </p:style>
+        <p:txBody>
+          <a:bodyPr rtlCol="0" anchor="ctr"/>
+          <a:lstStyle/>
+          <a:p>
+            <a:pPr algn="ctr"/>
+            <a:r>
+              <a:rPr lang="en-US" altLang="ko-KR" dirty="0" smtClean="0">
+                <a:solidFill>
+                  <a:schemeClr val="tx1"/>
+                </a:solidFill>
+                <a:latin typeface="나눔스퀘어 ExtraBold" pitchFamily="50" charset="-127"/>
+                <a:ea typeface="나눔스퀘어 ExtraBold" pitchFamily="50" charset="-127"/>
+              </a:rPr>
+              <a:t>61</a:t>
+            </a:r>
+            <a:endParaRPr lang="ko-KR" altLang="en-US" dirty="0">
+              <a:solidFill>
+                <a:schemeClr val="tx1"/>
+              </a:solidFill>
+              <a:latin typeface="나눔스퀘어 ExtraBold" pitchFamily="50" charset="-127"/>
+              <a:ea typeface="나눔스퀘어 ExtraBold" pitchFamily="50" charset="-127"/>
+            </a:endParaRPr>
+          </a:p>
+        </p:txBody>
+      </p:sp>
+      <p:sp>
+        <p:nvSpPr>
+          <p:cNvPr id="59" name="직사각형 58"/>
+          <p:cNvSpPr/>
+          <p:nvPr/>
+        </p:nvSpPr>
+        <p:spPr>
+          <a:xfrm>
+            <a:off x="7308317" y="3818166"/>
+            <a:ext cx="773640" cy="475253"/>
+          </a:xfrm>
+          <a:prstGeom prst="rect">
+            <a:avLst/>
+          </a:prstGeom>
+          <a:solidFill>
+            <a:schemeClr val="bg1">
+              <a:lumMod val="95000"/>
+            </a:schemeClr>
+          </a:solidFill>
+          <a:ln>
+            <a:solidFill>
+              <a:schemeClr val="tx1"/>
+            </a:solidFill>
+          </a:ln>
+        </p:spPr>
+        <p:style>
+          <a:lnRef idx="2">
+            <a:schemeClr val="accent1">
+              <a:shade val="50000"/>
+            </a:schemeClr>
+          </a:lnRef>
+          <a:fillRef idx="1">
+            <a:schemeClr val="accent1"/>
+          </a:fillRef>
+          <a:effectRef idx="0">
+            <a:schemeClr val="accent1"/>
+          </a:effectRef>
+          <a:fontRef idx="minor">
+            <a:schemeClr val="lt1"/>
+          </a:fontRef>
+        </p:style>
+        <p:txBody>
+          <a:bodyPr rtlCol="0" anchor="ctr"/>
+          <a:lstStyle/>
+          <a:p>
+            <a:pPr algn="ctr"/>
+            <a:r>
+              <a:rPr lang="en-US" altLang="ko-KR" dirty="0" smtClean="0">
+                <a:solidFill>
+                  <a:schemeClr val="tx1"/>
+                </a:solidFill>
+                <a:latin typeface="나눔스퀘어 ExtraBold" pitchFamily="50" charset="-127"/>
+                <a:ea typeface="나눔스퀘어 ExtraBold" pitchFamily="50" charset="-127"/>
+              </a:rPr>
+              <a:t>66</a:t>
+            </a:r>
+            <a:endParaRPr lang="ko-KR" altLang="en-US" dirty="0">
+              <a:solidFill>
+                <a:schemeClr val="tx1"/>
+              </a:solidFill>
+              <a:latin typeface="나눔스퀘어 ExtraBold" pitchFamily="50" charset="-127"/>
+              <a:ea typeface="나눔스퀘어 ExtraBold" pitchFamily="50" charset="-127"/>
+            </a:endParaRPr>
+          </a:p>
+        </p:txBody>
+      </p:sp>
+      <p:sp>
+        <p:nvSpPr>
+          <p:cNvPr id="60" name="직사각형 59"/>
+          <p:cNvSpPr/>
+          <p:nvPr/>
+        </p:nvSpPr>
+        <p:spPr>
+          <a:xfrm>
+            <a:off x="8081957" y="3818166"/>
+            <a:ext cx="773640" cy="475253"/>
+          </a:xfrm>
+          <a:prstGeom prst="rect">
+            <a:avLst/>
+          </a:prstGeom>
+          <a:solidFill>
+            <a:schemeClr val="bg1">
+              <a:lumMod val="95000"/>
+            </a:schemeClr>
+          </a:solidFill>
+          <a:ln>
+            <a:solidFill>
+              <a:schemeClr val="tx1"/>
+            </a:solidFill>
+          </a:ln>
+        </p:spPr>
+        <p:style>
+          <a:lnRef idx="2">
+            <a:schemeClr val="accent1">
+              <a:shade val="50000"/>
+            </a:schemeClr>
+          </a:lnRef>
+          <a:fillRef idx="1">
+            <a:schemeClr val="accent1"/>
+          </a:fillRef>
+          <a:effectRef idx="0">
+            <a:schemeClr val="accent1"/>
+          </a:effectRef>
+          <a:fontRef idx="minor">
+            <a:schemeClr val="lt1"/>
+          </a:fontRef>
+        </p:style>
+        <p:txBody>
+          <a:bodyPr rtlCol="0" anchor="ctr"/>
+          <a:lstStyle/>
+          <a:p>
+            <a:pPr algn="ctr"/>
+            <a:r>
+              <a:rPr lang="en-US" altLang="ko-KR" dirty="0" smtClean="0">
+                <a:solidFill>
+                  <a:schemeClr val="tx1"/>
+                </a:solidFill>
+                <a:latin typeface="나눔스퀘어 ExtraBold" pitchFamily="50" charset="-127"/>
+                <a:ea typeface="나눔스퀘어 ExtraBold" pitchFamily="50" charset="-127"/>
+              </a:rPr>
+              <a:t>98</a:t>
+            </a:r>
+            <a:endParaRPr lang="ko-KR" altLang="en-US" dirty="0">
+              <a:solidFill>
+                <a:schemeClr val="tx1"/>
+              </a:solidFill>
+              <a:latin typeface="나눔스퀘어 ExtraBold" pitchFamily="50" charset="-127"/>
+              <a:ea typeface="나눔스퀘어 ExtraBold" pitchFamily="50" charset="-127"/>
+            </a:endParaRPr>
+          </a:p>
+        </p:txBody>
+      </p:sp>
+      <p:sp>
+        <p:nvSpPr>
+          <p:cNvPr id="4" name="TextBox 3"/>
+          <p:cNvSpPr txBox="1"/>
+          <p:nvPr/>
+        </p:nvSpPr>
+        <p:spPr>
+          <a:xfrm>
+            <a:off x="1892837" y="863823"/>
+            <a:ext cx="5668400" cy="1477328"/>
+          </a:xfrm>
+          <a:prstGeom prst="rect">
+            <a:avLst/>
+          </a:prstGeom>
+          <a:noFill/>
+        </p:spPr>
+        <p:txBody>
+          <a:bodyPr wrap="square" rtlCol="0">
+            <a:spAutoFit/>
+          </a:bodyPr>
+          <a:lstStyle/>
+          <a:p>
+            <a:pPr>
+              <a:lnSpc>
+                <a:spcPct val="150000"/>
+              </a:lnSpc>
+            </a:pPr>
+            <a:r>
+              <a:rPr lang="ko-KR" altLang="en-US" sz="2000" dirty="0" smtClean="0">
+                <a:latin typeface="나눔스퀘어 ExtraBold" pitchFamily="50" charset="-127"/>
+                <a:ea typeface="나눔스퀘어 ExtraBold" pitchFamily="50" charset="-127"/>
+              </a:rPr>
+              <a:t>탐색 가치가 있는 범위의 양 끝을 </a:t>
+            </a:r>
+            <a:r>
+              <a:rPr lang="en-US" altLang="ko-KR" sz="2000" dirty="0" smtClean="0">
+                <a:latin typeface="나눔스퀘어 ExtraBold" pitchFamily="50" charset="-127"/>
+                <a:ea typeface="나눔스퀘어 ExtraBold" pitchFamily="50" charset="-127"/>
+              </a:rPr>
+              <a:t>L, R </a:t>
+            </a:r>
+            <a:r>
+              <a:rPr lang="ko-KR" altLang="en-US" sz="2000" dirty="0" smtClean="0">
+                <a:latin typeface="나눔스퀘어 ExtraBold" pitchFamily="50" charset="-127"/>
+                <a:ea typeface="나눔스퀘어 ExtraBold" pitchFamily="50" charset="-127"/>
+              </a:rPr>
+              <a:t>로 정의</a:t>
+            </a:r>
+            <a:endParaRPr lang="en-US" altLang="ko-KR" sz="2000" dirty="0" smtClean="0">
+              <a:latin typeface="나눔스퀘어 ExtraBold" pitchFamily="50" charset="-127"/>
+              <a:ea typeface="나눔스퀘어 ExtraBold" pitchFamily="50" charset="-127"/>
+            </a:endParaRPr>
+          </a:p>
+          <a:p>
+            <a:pPr>
+              <a:lnSpc>
+                <a:spcPct val="150000"/>
+              </a:lnSpc>
+            </a:pPr>
+            <a:r>
+              <a:rPr lang="ko-KR" altLang="en-US" sz="2000" dirty="0" smtClean="0">
+                <a:latin typeface="나눔스퀘어 ExtraBold" pitchFamily="50" charset="-127"/>
+                <a:ea typeface="나눔스퀘어 ExtraBold" pitchFamily="50" charset="-127"/>
+              </a:rPr>
+              <a:t>맨 처음 </a:t>
+            </a:r>
+            <a:r>
+              <a:rPr lang="en-US" altLang="ko-KR" sz="2000" dirty="0" smtClean="0">
+                <a:solidFill>
+                  <a:srgbClr val="FF0000"/>
+                </a:solidFill>
+                <a:latin typeface="나눔스퀘어 ExtraBold" pitchFamily="50" charset="-127"/>
+                <a:ea typeface="나눔스퀘어 ExtraBold" pitchFamily="50" charset="-127"/>
+              </a:rPr>
+              <a:t>L = 0</a:t>
+            </a:r>
+            <a:r>
+              <a:rPr lang="en-US" altLang="ko-KR" sz="2000" dirty="0" smtClean="0">
+                <a:latin typeface="나눔스퀘어 ExtraBold" pitchFamily="50" charset="-127"/>
+                <a:ea typeface="나눔스퀘어 ExtraBold" pitchFamily="50" charset="-127"/>
+              </a:rPr>
+              <a:t>, </a:t>
+            </a:r>
+            <a:r>
+              <a:rPr lang="en-US" altLang="ko-KR" sz="2000" dirty="0" smtClean="0">
+                <a:solidFill>
+                  <a:srgbClr val="0070C0"/>
+                </a:solidFill>
+                <a:latin typeface="나눔스퀘어 ExtraBold" pitchFamily="50" charset="-127"/>
+                <a:ea typeface="나눔스퀘어 ExtraBold" pitchFamily="50" charset="-127"/>
+              </a:rPr>
+              <a:t>R = 8 </a:t>
+            </a:r>
+            <a:r>
+              <a:rPr lang="ko-KR" altLang="en-US" sz="2000" dirty="0" smtClean="0">
+                <a:latin typeface="나눔스퀘어 ExtraBold" pitchFamily="50" charset="-127"/>
+                <a:ea typeface="나눔스퀘어 ExtraBold" pitchFamily="50" charset="-127"/>
+              </a:rPr>
+              <a:t>이 된다</a:t>
+            </a:r>
+            <a:r>
+              <a:rPr lang="en-US" altLang="ko-KR" sz="2000" dirty="0" smtClean="0">
+                <a:latin typeface="나눔스퀘어 ExtraBold" pitchFamily="50" charset="-127"/>
+                <a:ea typeface="나눔스퀘어 ExtraBold" pitchFamily="50" charset="-127"/>
+              </a:rPr>
+              <a:t>.</a:t>
+            </a:r>
+          </a:p>
+          <a:p>
+            <a:pPr>
+              <a:lnSpc>
+                <a:spcPct val="150000"/>
+              </a:lnSpc>
+            </a:pPr>
+            <a:r>
+              <a:rPr lang="ko-KR" altLang="en-US" sz="2000" dirty="0" err="1" smtClean="0">
+                <a:latin typeface="나눔스퀘어 ExtraBold" pitchFamily="50" charset="-127"/>
+                <a:ea typeface="나눔스퀘어 ExtraBold" pitchFamily="50" charset="-127"/>
+              </a:rPr>
+              <a:t>탐색값이</a:t>
+            </a:r>
+            <a:r>
+              <a:rPr lang="ko-KR" altLang="en-US" sz="2000" dirty="0" smtClean="0">
+                <a:latin typeface="나눔스퀘어 ExtraBold" pitchFamily="50" charset="-127"/>
+                <a:ea typeface="나눔스퀘어 ExtraBold" pitchFamily="50" charset="-127"/>
+              </a:rPr>
+              <a:t> </a:t>
+            </a:r>
+            <a:r>
+              <a:rPr lang="en-US" altLang="ko-KR" sz="2000" dirty="0" smtClean="0">
+                <a:latin typeface="나눔스퀘어 ExtraBold" pitchFamily="50" charset="-127"/>
+                <a:ea typeface="나눔스퀘어 ExtraBold" pitchFamily="50" charset="-127"/>
+              </a:rPr>
+              <a:t>48</a:t>
+            </a:r>
+            <a:r>
+              <a:rPr lang="ko-KR" altLang="en-US" sz="2000" dirty="0">
+                <a:latin typeface="나눔스퀘어 ExtraBold" pitchFamily="50" charset="-127"/>
+                <a:ea typeface="나눔스퀘어 ExtraBold" pitchFamily="50" charset="-127"/>
+              </a:rPr>
+              <a:t> </a:t>
+            </a:r>
+            <a:r>
+              <a:rPr lang="ko-KR" altLang="en-US" sz="2000" dirty="0" smtClean="0">
+                <a:latin typeface="나눔스퀘어 ExtraBold" pitchFamily="50" charset="-127"/>
+                <a:ea typeface="나눔스퀘어 ExtraBold" pitchFamily="50" charset="-127"/>
+              </a:rPr>
+              <a:t>이라 가정하고 중간위치를 체크한다</a:t>
+            </a:r>
+            <a:r>
+              <a:rPr lang="en-US" altLang="ko-KR" sz="2000" dirty="0" smtClean="0">
+                <a:latin typeface="나눔스퀘어 ExtraBold" pitchFamily="50" charset="-127"/>
+                <a:ea typeface="나눔스퀘어 ExtraBold" pitchFamily="50" charset="-127"/>
+              </a:rPr>
+              <a:t>.</a:t>
+            </a:r>
+          </a:p>
+        </p:txBody>
+      </p:sp>
+      <p:sp>
+        <p:nvSpPr>
+          <p:cNvPr id="61" name="직사각형 60"/>
+          <p:cNvSpPr/>
+          <p:nvPr/>
+        </p:nvSpPr>
+        <p:spPr>
+          <a:xfrm>
+            <a:off x="1892837" y="3519881"/>
+            <a:ext cx="773640" cy="268268"/>
+          </a:xfrm>
+          <a:prstGeom prst="rect">
+            <a:avLst/>
+          </a:prstGeom>
+          <a:noFill/>
+          <a:ln>
+            <a:noFill/>
+          </a:ln>
+        </p:spPr>
+        <p:style>
+          <a:lnRef idx="2">
+            <a:schemeClr val="accent1">
+              <a:shade val="50000"/>
+            </a:schemeClr>
+          </a:lnRef>
+          <a:fillRef idx="1">
+            <a:schemeClr val="accent1"/>
+          </a:fillRef>
+          <a:effectRef idx="0">
+            <a:schemeClr val="accent1"/>
+          </a:effectRef>
+          <a:fontRef idx="minor">
+            <a:schemeClr val="lt1"/>
+          </a:fontRef>
+        </p:style>
+        <p:txBody>
+          <a:bodyPr rtlCol="0" anchor="ctr"/>
+          <a:lstStyle/>
+          <a:p>
+            <a:pPr algn="ctr"/>
+            <a:r>
+              <a:rPr lang="en-US" altLang="ko-KR" sz="1400" dirty="0" smtClean="0">
+                <a:solidFill>
+                  <a:schemeClr val="tx1"/>
+                </a:solidFill>
+                <a:latin typeface="나눔스퀘어 ExtraBold" pitchFamily="50" charset="-127"/>
+                <a:ea typeface="나눔스퀘어 ExtraBold" pitchFamily="50" charset="-127"/>
+              </a:rPr>
+              <a:t>0</a:t>
+            </a:r>
+            <a:endParaRPr lang="ko-KR" altLang="en-US" sz="1400" dirty="0">
+              <a:solidFill>
+                <a:schemeClr val="tx1"/>
+              </a:solidFill>
+              <a:latin typeface="나눔스퀘어 ExtraBold" pitchFamily="50" charset="-127"/>
+              <a:ea typeface="나눔스퀘어 ExtraBold" pitchFamily="50" charset="-127"/>
+            </a:endParaRPr>
+          </a:p>
+        </p:txBody>
+      </p:sp>
+      <p:sp>
+        <p:nvSpPr>
+          <p:cNvPr id="62" name="직사각형 61"/>
+          <p:cNvSpPr/>
+          <p:nvPr/>
+        </p:nvSpPr>
+        <p:spPr>
+          <a:xfrm>
+            <a:off x="2666477" y="3519881"/>
+            <a:ext cx="773640" cy="268268"/>
+          </a:xfrm>
+          <a:prstGeom prst="rect">
+            <a:avLst/>
+          </a:prstGeom>
+          <a:noFill/>
+          <a:ln>
+            <a:noFill/>
+          </a:ln>
+        </p:spPr>
+        <p:style>
+          <a:lnRef idx="2">
+            <a:schemeClr val="accent1">
+              <a:shade val="50000"/>
+            </a:schemeClr>
+          </a:lnRef>
+          <a:fillRef idx="1">
+            <a:schemeClr val="accent1"/>
+          </a:fillRef>
+          <a:effectRef idx="0">
+            <a:schemeClr val="accent1"/>
+          </a:effectRef>
+          <a:fontRef idx="minor">
+            <a:schemeClr val="lt1"/>
+          </a:fontRef>
+        </p:style>
+        <p:txBody>
+          <a:bodyPr rtlCol="0" anchor="ctr"/>
+          <a:lstStyle/>
+          <a:p>
+            <a:pPr algn="ctr"/>
+            <a:r>
+              <a:rPr lang="en-US" altLang="ko-KR" sz="1400" dirty="0" smtClean="0">
+                <a:solidFill>
+                  <a:schemeClr val="tx1"/>
+                </a:solidFill>
+                <a:latin typeface="나눔스퀘어 ExtraBold" pitchFamily="50" charset="-127"/>
+                <a:ea typeface="나눔스퀘어 ExtraBold" pitchFamily="50" charset="-127"/>
+              </a:rPr>
+              <a:t>1</a:t>
+            </a:r>
+            <a:endParaRPr lang="ko-KR" altLang="en-US" sz="1400" dirty="0">
+              <a:solidFill>
+                <a:schemeClr val="tx1"/>
+              </a:solidFill>
+              <a:latin typeface="나눔스퀘어 ExtraBold" pitchFamily="50" charset="-127"/>
+              <a:ea typeface="나눔스퀘어 ExtraBold" pitchFamily="50" charset="-127"/>
+            </a:endParaRPr>
+          </a:p>
+        </p:txBody>
+      </p:sp>
+      <p:sp>
+        <p:nvSpPr>
+          <p:cNvPr id="63" name="직사각형 62"/>
+          <p:cNvSpPr/>
+          <p:nvPr/>
+        </p:nvSpPr>
+        <p:spPr>
+          <a:xfrm>
+            <a:off x="3440117" y="3519881"/>
+            <a:ext cx="773640" cy="268268"/>
+          </a:xfrm>
+          <a:prstGeom prst="rect">
+            <a:avLst/>
+          </a:prstGeom>
+          <a:noFill/>
+          <a:ln>
+            <a:noFill/>
+          </a:ln>
+        </p:spPr>
+        <p:style>
+          <a:lnRef idx="2">
+            <a:schemeClr val="accent1">
+              <a:shade val="50000"/>
+            </a:schemeClr>
+          </a:lnRef>
+          <a:fillRef idx="1">
+            <a:schemeClr val="accent1"/>
+          </a:fillRef>
+          <a:effectRef idx="0">
+            <a:schemeClr val="accent1"/>
+          </a:effectRef>
+          <a:fontRef idx="minor">
+            <a:schemeClr val="lt1"/>
+          </a:fontRef>
+        </p:style>
+        <p:txBody>
+          <a:bodyPr rtlCol="0" anchor="ctr"/>
+          <a:lstStyle/>
+          <a:p>
+            <a:pPr algn="ctr"/>
+            <a:r>
+              <a:rPr lang="en-US" altLang="ko-KR" sz="1400" dirty="0" smtClean="0">
+                <a:solidFill>
+                  <a:schemeClr val="tx1"/>
+                </a:solidFill>
+                <a:latin typeface="나눔스퀘어 ExtraBold" pitchFamily="50" charset="-127"/>
+                <a:ea typeface="나눔스퀘어 ExtraBold" pitchFamily="50" charset="-127"/>
+              </a:rPr>
+              <a:t>2</a:t>
+            </a:r>
+            <a:endParaRPr lang="ko-KR" altLang="en-US" sz="1400" dirty="0">
+              <a:solidFill>
+                <a:schemeClr val="tx1"/>
+              </a:solidFill>
+              <a:latin typeface="나눔스퀘어 ExtraBold" pitchFamily="50" charset="-127"/>
+              <a:ea typeface="나눔스퀘어 ExtraBold" pitchFamily="50" charset="-127"/>
+            </a:endParaRPr>
+          </a:p>
+        </p:txBody>
+      </p:sp>
+      <p:sp>
+        <p:nvSpPr>
+          <p:cNvPr id="64" name="직사각형 63"/>
+          <p:cNvSpPr/>
+          <p:nvPr/>
+        </p:nvSpPr>
+        <p:spPr>
+          <a:xfrm>
+            <a:off x="4213757" y="3519881"/>
+            <a:ext cx="773640" cy="268268"/>
+          </a:xfrm>
+          <a:prstGeom prst="rect">
+            <a:avLst/>
+          </a:prstGeom>
+          <a:noFill/>
+          <a:ln>
+            <a:noFill/>
+          </a:ln>
+        </p:spPr>
+        <p:style>
+          <a:lnRef idx="2">
+            <a:schemeClr val="accent1">
+              <a:shade val="50000"/>
+            </a:schemeClr>
+          </a:lnRef>
+          <a:fillRef idx="1">
+            <a:schemeClr val="accent1"/>
+          </a:fillRef>
+          <a:effectRef idx="0">
+            <a:schemeClr val="accent1"/>
+          </a:effectRef>
+          <a:fontRef idx="minor">
+            <a:schemeClr val="lt1"/>
+          </a:fontRef>
+        </p:style>
+        <p:txBody>
+          <a:bodyPr rtlCol="0" anchor="ctr"/>
+          <a:lstStyle/>
+          <a:p>
+            <a:pPr algn="ctr"/>
+            <a:r>
+              <a:rPr lang="en-US" altLang="ko-KR" sz="1400" dirty="0" smtClean="0">
+                <a:solidFill>
+                  <a:schemeClr val="tx1"/>
+                </a:solidFill>
+                <a:latin typeface="나눔스퀘어 ExtraBold" pitchFamily="50" charset="-127"/>
+                <a:ea typeface="나눔스퀘어 ExtraBold" pitchFamily="50" charset="-127"/>
+              </a:rPr>
+              <a:t>3</a:t>
+            </a:r>
+            <a:endParaRPr lang="ko-KR" altLang="en-US" sz="1400" dirty="0">
+              <a:solidFill>
+                <a:schemeClr val="tx1"/>
+              </a:solidFill>
+              <a:latin typeface="나눔스퀘어 ExtraBold" pitchFamily="50" charset="-127"/>
+              <a:ea typeface="나눔스퀘어 ExtraBold" pitchFamily="50" charset="-127"/>
+            </a:endParaRPr>
+          </a:p>
+        </p:txBody>
+      </p:sp>
+      <p:sp>
+        <p:nvSpPr>
+          <p:cNvPr id="65" name="직사각형 64"/>
+          <p:cNvSpPr/>
+          <p:nvPr/>
+        </p:nvSpPr>
+        <p:spPr>
+          <a:xfrm>
+            <a:off x="4987397" y="3519881"/>
+            <a:ext cx="773640" cy="268268"/>
+          </a:xfrm>
+          <a:prstGeom prst="rect">
+            <a:avLst/>
+          </a:prstGeom>
+          <a:noFill/>
+          <a:ln>
+            <a:noFill/>
+          </a:ln>
+        </p:spPr>
+        <p:style>
+          <a:lnRef idx="2">
+            <a:schemeClr val="accent1">
+              <a:shade val="50000"/>
+            </a:schemeClr>
+          </a:lnRef>
+          <a:fillRef idx="1">
+            <a:schemeClr val="accent1"/>
+          </a:fillRef>
+          <a:effectRef idx="0">
+            <a:schemeClr val="accent1"/>
+          </a:effectRef>
+          <a:fontRef idx="minor">
+            <a:schemeClr val="lt1"/>
+          </a:fontRef>
+        </p:style>
+        <p:txBody>
+          <a:bodyPr rtlCol="0" anchor="ctr"/>
+          <a:lstStyle/>
+          <a:p>
+            <a:pPr algn="ctr"/>
+            <a:r>
+              <a:rPr lang="en-US" altLang="ko-KR" sz="1400" dirty="0" smtClean="0">
+                <a:solidFill>
+                  <a:schemeClr val="tx1"/>
+                </a:solidFill>
+                <a:latin typeface="나눔스퀘어 ExtraBold" pitchFamily="50" charset="-127"/>
+                <a:ea typeface="나눔스퀘어 ExtraBold" pitchFamily="50" charset="-127"/>
+              </a:rPr>
+              <a:t>4</a:t>
+            </a:r>
+            <a:endParaRPr lang="ko-KR" altLang="en-US" sz="1400" dirty="0">
+              <a:solidFill>
+                <a:schemeClr val="tx1"/>
+              </a:solidFill>
+              <a:latin typeface="나눔스퀘어 ExtraBold" pitchFamily="50" charset="-127"/>
+              <a:ea typeface="나눔스퀘어 ExtraBold" pitchFamily="50" charset="-127"/>
+            </a:endParaRPr>
+          </a:p>
+        </p:txBody>
+      </p:sp>
+      <p:sp>
+        <p:nvSpPr>
+          <p:cNvPr id="66" name="직사각형 65"/>
+          <p:cNvSpPr/>
+          <p:nvPr/>
+        </p:nvSpPr>
+        <p:spPr>
+          <a:xfrm>
+            <a:off x="5761037" y="3519881"/>
+            <a:ext cx="773640" cy="268268"/>
+          </a:xfrm>
+          <a:prstGeom prst="rect">
+            <a:avLst/>
+          </a:prstGeom>
+          <a:noFill/>
+          <a:ln>
+            <a:noFill/>
+          </a:ln>
+        </p:spPr>
+        <p:style>
+          <a:lnRef idx="2">
+            <a:schemeClr val="accent1">
+              <a:shade val="50000"/>
+            </a:schemeClr>
+          </a:lnRef>
+          <a:fillRef idx="1">
+            <a:schemeClr val="accent1"/>
+          </a:fillRef>
+          <a:effectRef idx="0">
+            <a:schemeClr val="accent1"/>
+          </a:effectRef>
+          <a:fontRef idx="minor">
+            <a:schemeClr val="lt1"/>
+          </a:fontRef>
+        </p:style>
+        <p:txBody>
+          <a:bodyPr rtlCol="0" anchor="ctr"/>
+          <a:lstStyle/>
+          <a:p>
+            <a:pPr algn="ctr"/>
+            <a:r>
+              <a:rPr lang="en-US" altLang="ko-KR" sz="1400" dirty="0" smtClean="0">
+                <a:solidFill>
+                  <a:schemeClr val="tx1"/>
+                </a:solidFill>
+                <a:latin typeface="나눔스퀘어 ExtraBold" pitchFamily="50" charset="-127"/>
+                <a:ea typeface="나눔스퀘어 ExtraBold" pitchFamily="50" charset="-127"/>
+              </a:rPr>
+              <a:t>5</a:t>
+            </a:r>
+            <a:endParaRPr lang="ko-KR" altLang="en-US" sz="1400" dirty="0">
+              <a:solidFill>
+                <a:schemeClr val="tx1"/>
+              </a:solidFill>
+              <a:latin typeface="나눔스퀘어 ExtraBold" pitchFamily="50" charset="-127"/>
+              <a:ea typeface="나눔스퀘어 ExtraBold" pitchFamily="50" charset="-127"/>
+            </a:endParaRPr>
+          </a:p>
+        </p:txBody>
+      </p:sp>
+      <p:sp>
+        <p:nvSpPr>
+          <p:cNvPr id="67" name="직사각형 66"/>
+          <p:cNvSpPr/>
+          <p:nvPr/>
+        </p:nvSpPr>
+        <p:spPr>
+          <a:xfrm>
+            <a:off x="6534677" y="3519881"/>
+            <a:ext cx="773640" cy="268268"/>
+          </a:xfrm>
+          <a:prstGeom prst="rect">
+            <a:avLst/>
+          </a:prstGeom>
+          <a:noFill/>
+          <a:ln>
+            <a:noFill/>
+          </a:ln>
+        </p:spPr>
+        <p:style>
+          <a:lnRef idx="2">
+            <a:schemeClr val="accent1">
+              <a:shade val="50000"/>
+            </a:schemeClr>
+          </a:lnRef>
+          <a:fillRef idx="1">
+            <a:schemeClr val="accent1"/>
+          </a:fillRef>
+          <a:effectRef idx="0">
+            <a:schemeClr val="accent1"/>
+          </a:effectRef>
+          <a:fontRef idx="minor">
+            <a:schemeClr val="lt1"/>
+          </a:fontRef>
+        </p:style>
+        <p:txBody>
+          <a:bodyPr rtlCol="0" anchor="ctr"/>
+          <a:lstStyle/>
+          <a:p>
+            <a:pPr algn="ctr"/>
+            <a:r>
+              <a:rPr lang="en-US" altLang="ko-KR" sz="1400" dirty="0" smtClean="0">
+                <a:solidFill>
+                  <a:schemeClr val="tx1"/>
+                </a:solidFill>
+                <a:latin typeface="나눔스퀘어 ExtraBold" pitchFamily="50" charset="-127"/>
+                <a:ea typeface="나눔스퀘어 ExtraBold" pitchFamily="50" charset="-127"/>
+              </a:rPr>
+              <a:t>6</a:t>
+            </a:r>
+            <a:endParaRPr lang="ko-KR" altLang="en-US" sz="1400" dirty="0">
+              <a:solidFill>
+                <a:schemeClr val="tx1"/>
+              </a:solidFill>
+              <a:latin typeface="나눔스퀘어 ExtraBold" pitchFamily="50" charset="-127"/>
+              <a:ea typeface="나눔스퀘어 ExtraBold" pitchFamily="50" charset="-127"/>
+            </a:endParaRPr>
+          </a:p>
+        </p:txBody>
+      </p:sp>
+      <p:sp>
+        <p:nvSpPr>
+          <p:cNvPr id="68" name="직사각형 67"/>
+          <p:cNvSpPr/>
+          <p:nvPr/>
+        </p:nvSpPr>
+        <p:spPr>
+          <a:xfrm>
+            <a:off x="7308317" y="3519881"/>
+            <a:ext cx="773640" cy="268268"/>
+          </a:xfrm>
+          <a:prstGeom prst="rect">
+            <a:avLst/>
+          </a:prstGeom>
+          <a:noFill/>
+          <a:ln>
+            <a:noFill/>
+          </a:ln>
+        </p:spPr>
+        <p:style>
+          <a:lnRef idx="2">
+            <a:schemeClr val="accent1">
+              <a:shade val="50000"/>
+            </a:schemeClr>
+          </a:lnRef>
+          <a:fillRef idx="1">
+            <a:schemeClr val="accent1"/>
+          </a:fillRef>
+          <a:effectRef idx="0">
+            <a:schemeClr val="accent1"/>
+          </a:effectRef>
+          <a:fontRef idx="minor">
+            <a:schemeClr val="lt1"/>
+          </a:fontRef>
+        </p:style>
+        <p:txBody>
+          <a:bodyPr rtlCol="0" anchor="ctr"/>
+          <a:lstStyle/>
+          <a:p>
+            <a:pPr algn="ctr"/>
+            <a:r>
+              <a:rPr lang="en-US" altLang="ko-KR" sz="1400" dirty="0" smtClean="0">
+                <a:solidFill>
+                  <a:schemeClr val="tx1"/>
+                </a:solidFill>
+                <a:latin typeface="나눔스퀘어 ExtraBold" pitchFamily="50" charset="-127"/>
+                <a:ea typeface="나눔스퀘어 ExtraBold" pitchFamily="50" charset="-127"/>
+              </a:rPr>
+              <a:t>7</a:t>
+            </a:r>
+            <a:endParaRPr lang="ko-KR" altLang="en-US" sz="1400" dirty="0">
+              <a:solidFill>
+                <a:schemeClr val="tx1"/>
+              </a:solidFill>
+              <a:latin typeface="나눔스퀘어 ExtraBold" pitchFamily="50" charset="-127"/>
+              <a:ea typeface="나눔스퀘어 ExtraBold" pitchFamily="50" charset="-127"/>
+            </a:endParaRPr>
+          </a:p>
+        </p:txBody>
+      </p:sp>
+      <p:sp>
+        <p:nvSpPr>
+          <p:cNvPr id="69" name="직사각형 68"/>
+          <p:cNvSpPr/>
+          <p:nvPr/>
+        </p:nvSpPr>
+        <p:spPr>
+          <a:xfrm>
+            <a:off x="8081957" y="3519881"/>
+            <a:ext cx="773640" cy="268268"/>
+          </a:xfrm>
+          <a:prstGeom prst="rect">
+            <a:avLst/>
+          </a:prstGeom>
+          <a:noFill/>
+          <a:ln>
+            <a:noFill/>
+          </a:ln>
+        </p:spPr>
+        <p:style>
+          <a:lnRef idx="2">
+            <a:schemeClr val="accent1">
+              <a:shade val="50000"/>
+            </a:schemeClr>
+          </a:lnRef>
+          <a:fillRef idx="1">
+            <a:schemeClr val="accent1"/>
+          </a:fillRef>
+          <a:effectRef idx="0">
+            <a:schemeClr val="accent1"/>
+          </a:effectRef>
+          <a:fontRef idx="minor">
+            <a:schemeClr val="lt1"/>
+          </a:fontRef>
+        </p:style>
+        <p:txBody>
+          <a:bodyPr rtlCol="0" anchor="ctr"/>
+          <a:lstStyle/>
+          <a:p>
+            <a:pPr algn="ctr"/>
+            <a:r>
+              <a:rPr lang="en-US" altLang="ko-KR" sz="1400" dirty="0" smtClean="0">
+                <a:solidFill>
+                  <a:schemeClr val="tx1"/>
+                </a:solidFill>
+                <a:latin typeface="나눔스퀘어 ExtraBold" pitchFamily="50" charset="-127"/>
+                <a:ea typeface="나눔스퀘어 ExtraBold" pitchFamily="50" charset="-127"/>
+              </a:rPr>
+              <a:t>8</a:t>
+            </a:r>
+            <a:endParaRPr lang="ko-KR" altLang="en-US" sz="1400" dirty="0">
+              <a:solidFill>
+                <a:schemeClr val="tx1"/>
+              </a:solidFill>
+              <a:latin typeface="나눔스퀘어 ExtraBold" pitchFamily="50" charset="-127"/>
+              <a:ea typeface="나눔스퀘어 ExtraBold" pitchFamily="50" charset="-127"/>
+            </a:endParaRPr>
+          </a:p>
+        </p:txBody>
+      </p:sp>
+      <p:sp>
+        <p:nvSpPr>
+          <p:cNvPr id="6" name="왼쪽 대괄호 5"/>
+          <p:cNvSpPr/>
+          <p:nvPr/>
+        </p:nvSpPr>
+        <p:spPr>
+          <a:xfrm>
+            <a:off x="1767178" y="3555649"/>
+            <a:ext cx="105427" cy="811852"/>
+          </a:xfrm>
+          <a:prstGeom prst="leftBracket">
+            <a:avLst/>
+          </a:prstGeom>
+          <a:ln w="38100">
+            <a:solidFill>
+              <a:srgbClr val="FF0000"/>
+            </a:solidFill>
+          </a:ln>
+        </p:spPr>
+        <p:style>
+          <a:lnRef idx="1">
+            <a:schemeClr val="accent1"/>
+          </a:lnRef>
+          <a:fillRef idx="0">
+            <a:schemeClr val="accent1"/>
+          </a:fillRef>
+          <a:effectRef idx="0">
+            <a:schemeClr val="accent1"/>
+          </a:effectRef>
+          <a:fontRef idx="minor">
+            <a:schemeClr val="tx1"/>
+          </a:fontRef>
+        </p:style>
+        <p:txBody>
+          <a:bodyPr rtlCol="0" anchor="ctr"/>
+          <a:lstStyle/>
+          <a:p>
+            <a:pPr algn="ctr"/>
+            <a:endParaRPr lang="ko-KR" altLang="en-US"/>
+          </a:p>
+        </p:txBody>
+      </p:sp>
+      <p:sp>
+        <p:nvSpPr>
+          <p:cNvPr id="70" name="왼쪽 대괄호 69"/>
+          <p:cNvSpPr/>
+          <p:nvPr/>
+        </p:nvSpPr>
+        <p:spPr>
+          <a:xfrm flipH="1">
+            <a:off x="8890333" y="3555649"/>
+            <a:ext cx="105427" cy="811852"/>
+          </a:xfrm>
+          <a:prstGeom prst="leftBracket">
+            <a:avLst/>
+          </a:prstGeom>
+          <a:ln w="38100">
+            <a:solidFill>
+              <a:srgbClr val="0070C0"/>
+            </a:solidFill>
+          </a:ln>
+        </p:spPr>
+        <p:style>
+          <a:lnRef idx="1">
+            <a:schemeClr val="accent1"/>
+          </a:lnRef>
+          <a:fillRef idx="0">
+            <a:schemeClr val="accent1"/>
+          </a:fillRef>
+          <a:effectRef idx="0">
+            <a:schemeClr val="accent1"/>
+          </a:effectRef>
+          <a:fontRef idx="minor">
+            <a:schemeClr val="tx1"/>
+          </a:fontRef>
+        </p:style>
+        <p:txBody>
+          <a:bodyPr rtlCol="0" anchor="ctr"/>
+          <a:lstStyle/>
+          <a:p>
+            <a:pPr algn="ctr"/>
+            <a:endParaRPr lang="ko-KR" altLang="en-US"/>
+          </a:p>
+        </p:txBody>
+      </p:sp>
+      <p:sp>
+        <p:nvSpPr>
+          <p:cNvPr id="8" name="아래쪽 화살표 7"/>
+          <p:cNvSpPr/>
+          <p:nvPr/>
+        </p:nvSpPr>
+        <p:spPr>
+          <a:xfrm>
+            <a:off x="5228305" y="2969206"/>
+            <a:ext cx="291825" cy="486905"/>
+          </a:xfrm>
+          <a:prstGeom prst="downArrow">
+            <a:avLst>
+              <a:gd name="adj1" fmla="val 50000"/>
+              <a:gd name="adj2" fmla="val 65397"/>
+            </a:avLst>
+          </a:prstGeom>
+        </p:spPr>
+        <p:style>
+          <a:lnRef idx="2">
+            <a:schemeClr val="accent1">
+              <a:shade val="50000"/>
+            </a:schemeClr>
+          </a:lnRef>
+          <a:fillRef idx="1">
+            <a:schemeClr val="accent1"/>
+          </a:fillRef>
+          <a:effectRef idx="0">
+            <a:schemeClr val="accent1"/>
+          </a:effectRef>
+          <a:fontRef idx="minor">
+            <a:schemeClr val="lt1"/>
+          </a:fontRef>
+        </p:style>
+        <p:txBody>
+          <a:bodyPr rtlCol="0" anchor="ctr"/>
+          <a:lstStyle/>
+          <a:p>
+            <a:pPr algn="ctr"/>
+            <a:endParaRPr lang="ko-KR" altLang="en-US"/>
+          </a:p>
+        </p:txBody>
+      </p:sp>
+      <p:sp>
+        <p:nvSpPr>
+          <p:cNvPr id="71" name="직사각형 70"/>
+          <p:cNvSpPr/>
+          <p:nvPr/>
+        </p:nvSpPr>
+        <p:spPr>
+          <a:xfrm>
+            <a:off x="4807875" y="2658594"/>
+            <a:ext cx="1132685" cy="268268"/>
+          </a:xfrm>
+          <a:prstGeom prst="rect">
+            <a:avLst/>
+          </a:prstGeom>
+          <a:noFill/>
+          <a:ln>
+            <a:noFill/>
+          </a:ln>
+        </p:spPr>
+        <p:style>
+          <a:lnRef idx="2">
+            <a:schemeClr val="accent1">
+              <a:shade val="50000"/>
+            </a:schemeClr>
+          </a:lnRef>
+          <a:fillRef idx="1">
+            <a:schemeClr val="accent1"/>
+          </a:fillRef>
+          <a:effectRef idx="0">
+            <a:schemeClr val="accent1"/>
+          </a:effectRef>
+          <a:fontRef idx="minor">
+            <a:schemeClr val="lt1"/>
+          </a:fontRef>
+        </p:style>
+        <p:txBody>
+          <a:bodyPr rtlCol="0" anchor="ctr"/>
+          <a:lstStyle/>
+          <a:p>
+            <a:pPr algn="ctr"/>
+            <a:r>
+              <a:rPr lang="en-US" altLang="ko-KR" sz="1400" dirty="0" smtClean="0">
+                <a:solidFill>
+                  <a:schemeClr val="tx1"/>
+                </a:solidFill>
+                <a:latin typeface="나눔스퀘어 ExtraBold" pitchFamily="50" charset="-127"/>
+                <a:ea typeface="나눔스퀘어 ExtraBold" pitchFamily="50" charset="-127"/>
+              </a:rPr>
+              <a:t>(</a:t>
+            </a:r>
+            <a:r>
+              <a:rPr lang="en-US" altLang="ko-KR" sz="1400" dirty="0" smtClean="0">
+                <a:solidFill>
+                  <a:srgbClr val="FF0000"/>
+                </a:solidFill>
+                <a:latin typeface="나눔스퀘어 ExtraBold" pitchFamily="50" charset="-127"/>
+                <a:ea typeface="나눔스퀘어 ExtraBold" pitchFamily="50" charset="-127"/>
+              </a:rPr>
+              <a:t>0</a:t>
+            </a:r>
+            <a:r>
+              <a:rPr lang="en-US" altLang="ko-KR" sz="1400" dirty="0" smtClean="0">
+                <a:solidFill>
+                  <a:schemeClr val="tx1"/>
+                </a:solidFill>
+                <a:latin typeface="나눔스퀘어 ExtraBold" pitchFamily="50" charset="-127"/>
+                <a:ea typeface="나눔스퀘어 ExtraBold" pitchFamily="50" charset="-127"/>
+              </a:rPr>
+              <a:t> + </a:t>
+            </a:r>
+            <a:r>
+              <a:rPr lang="en-US" altLang="ko-KR" sz="1400" dirty="0" smtClean="0">
+                <a:solidFill>
+                  <a:srgbClr val="0070C0"/>
+                </a:solidFill>
+                <a:latin typeface="나눔스퀘어 ExtraBold" pitchFamily="50" charset="-127"/>
+                <a:ea typeface="나눔스퀘어 ExtraBold" pitchFamily="50" charset="-127"/>
+              </a:rPr>
+              <a:t>8</a:t>
+            </a:r>
+            <a:r>
+              <a:rPr lang="en-US" altLang="ko-KR" sz="1400" dirty="0" smtClean="0">
+                <a:solidFill>
+                  <a:schemeClr val="tx1"/>
+                </a:solidFill>
+                <a:latin typeface="나눔스퀘어 ExtraBold" pitchFamily="50" charset="-127"/>
+                <a:ea typeface="나눔스퀘어 ExtraBold" pitchFamily="50" charset="-127"/>
+              </a:rPr>
+              <a:t>) / 2</a:t>
+            </a:r>
+            <a:endParaRPr lang="ko-KR" altLang="en-US" sz="1400" dirty="0">
+              <a:solidFill>
+                <a:schemeClr val="tx1"/>
+              </a:solidFill>
+              <a:latin typeface="나눔스퀘어 ExtraBold" pitchFamily="50" charset="-127"/>
+              <a:ea typeface="나눔스퀘어 ExtraBold" pitchFamily="50" charset="-127"/>
+            </a:endParaRPr>
+          </a:p>
+        </p:txBody>
+      </p:sp>
+    </p:spTree>
+    <p:extLst>
+      <p:ext uri="{BB962C8B-B14F-4D97-AF65-F5344CB8AC3E}">
+        <p14:creationId xmlns:p14="http://schemas.microsoft.com/office/powerpoint/2010/main" val="2653821053"/>
+      </p:ext>
+    </p:extLst>
+  </p:cSld>
+  <p:clrMapOvr>
+    <a:masterClrMapping/>
+  </p:clrMapOvr>
+</p:sld>
+</file>
+
+<file path=ppt/slides/slide7.xml><?xml version="1.0" encoding="utf-8"?>
+<p:sld xmlns:a="http://schemas.openxmlformats.org/drawingml/2006/main" xmlns:r="http://schemas.openxmlformats.org/officeDocument/2006/relationships" xmlns:p="http://schemas.openxmlformats.org/presentationml/2006/main">
+  <p:cSld>
+    <p:spTree>
+      <p:nvGrpSpPr>
+        <p:cNvPr id="1" name=""/>
+        <p:cNvGrpSpPr/>
+        <p:nvPr/>
+      </p:nvGrpSpPr>
+      <p:grpSpPr>
+        <a:xfrm>
+          <a:off x="0" y="0"/>
+          <a:ext cx="0" cy="0"/>
+          <a:chOff x="0" y="0"/>
+          <a:chExt cx="0" cy="0"/>
+        </a:xfrm>
+      </p:grpSpPr>
+      <p:sp>
+        <p:nvSpPr>
+          <p:cNvPr id="7" name="직사각형 6"/>
+          <p:cNvSpPr/>
+          <p:nvPr/>
+        </p:nvSpPr>
+        <p:spPr>
+          <a:xfrm>
+            <a:off x="1892837" y="3818166"/>
+            <a:ext cx="773640" cy="475253"/>
+          </a:xfrm>
+          <a:prstGeom prst="rect">
+            <a:avLst/>
+          </a:prstGeom>
+          <a:solidFill>
+            <a:schemeClr val="bg1">
+              <a:lumMod val="95000"/>
+            </a:schemeClr>
+          </a:solidFill>
+          <a:ln>
+            <a:solidFill>
+              <a:schemeClr val="tx1"/>
+            </a:solidFill>
+          </a:ln>
+        </p:spPr>
+        <p:style>
+          <a:lnRef idx="2">
+            <a:schemeClr val="accent1">
+              <a:shade val="50000"/>
+            </a:schemeClr>
+          </a:lnRef>
+          <a:fillRef idx="1">
+            <a:schemeClr val="accent1"/>
+          </a:fillRef>
+          <a:effectRef idx="0">
+            <a:schemeClr val="accent1"/>
+          </a:effectRef>
+          <a:fontRef idx="minor">
+            <a:schemeClr val="lt1"/>
+          </a:fontRef>
+        </p:style>
+        <p:txBody>
+          <a:bodyPr rtlCol="0" anchor="ctr"/>
+          <a:lstStyle/>
+          <a:p>
+            <a:pPr algn="ctr"/>
+            <a:r>
+              <a:rPr lang="en-US" altLang="ko-KR" dirty="0" smtClean="0">
+                <a:solidFill>
+                  <a:schemeClr val="tx1"/>
+                </a:solidFill>
+                <a:latin typeface="나눔스퀘어 ExtraBold" pitchFamily="50" charset="-127"/>
+                <a:ea typeface="나눔스퀘어 ExtraBold" pitchFamily="50" charset="-127"/>
+              </a:rPr>
+              <a:t>8</a:t>
+            </a:r>
+            <a:endParaRPr lang="ko-KR" altLang="en-US" dirty="0">
+              <a:solidFill>
+                <a:schemeClr val="tx1"/>
+              </a:solidFill>
+              <a:latin typeface="나눔스퀘어 ExtraBold" pitchFamily="50" charset="-127"/>
+              <a:ea typeface="나눔스퀘어 ExtraBold" pitchFamily="50" charset="-127"/>
+            </a:endParaRPr>
+          </a:p>
+        </p:txBody>
+      </p:sp>
+      <p:sp>
+        <p:nvSpPr>
+          <p:cNvPr id="32" name="직사각형 31"/>
+          <p:cNvSpPr/>
+          <p:nvPr/>
+        </p:nvSpPr>
+        <p:spPr>
+          <a:xfrm>
+            <a:off x="2666477" y="3818166"/>
+            <a:ext cx="773640" cy="475253"/>
+          </a:xfrm>
+          <a:prstGeom prst="rect">
+            <a:avLst/>
+          </a:prstGeom>
+          <a:solidFill>
+            <a:schemeClr val="bg1">
+              <a:lumMod val="95000"/>
+            </a:schemeClr>
+          </a:solidFill>
+          <a:ln>
+            <a:solidFill>
+              <a:schemeClr val="tx1"/>
+            </a:solidFill>
+          </a:ln>
+        </p:spPr>
+        <p:style>
+          <a:lnRef idx="2">
+            <a:schemeClr val="accent1">
+              <a:shade val="50000"/>
+            </a:schemeClr>
+          </a:lnRef>
+          <a:fillRef idx="1">
+            <a:schemeClr val="accent1"/>
+          </a:fillRef>
+          <a:effectRef idx="0">
+            <a:schemeClr val="accent1"/>
+          </a:effectRef>
+          <a:fontRef idx="minor">
+            <a:schemeClr val="lt1"/>
+          </a:fontRef>
+        </p:style>
+        <p:txBody>
+          <a:bodyPr rtlCol="0" anchor="ctr"/>
+          <a:lstStyle/>
+          <a:p>
+            <a:pPr algn="ctr"/>
+            <a:r>
+              <a:rPr lang="en-US" altLang="ko-KR" dirty="0" smtClean="0">
+                <a:solidFill>
+                  <a:schemeClr val="tx1"/>
+                </a:solidFill>
+                <a:latin typeface="나눔스퀘어 ExtraBold" pitchFamily="50" charset="-127"/>
+                <a:ea typeface="나눔스퀘어 ExtraBold" pitchFamily="50" charset="-127"/>
+              </a:rPr>
+              <a:t>16</a:t>
+            </a:r>
+            <a:endParaRPr lang="ko-KR" altLang="en-US" dirty="0">
+              <a:solidFill>
+                <a:schemeClr val="tx1"/>
+              </a:solidFill>
+              <a:latin typeface="나눔스퀘어 ExtraBold" pitchFamily="50" charset="-127"/>
+              <a:ea typeface="나눔스퀘어 ExtraBold" pitchFamily="50" charset="-127"/>
+            </a:endParaRPr>
+          </a:p>
+        </p:txBody>
+      </p:sp>
+      <p:sp>
+        <p:nvSpPr>
+          <p:cNvPr id="34" name="직사각형 33"/>
+          <p:cNvSpPr/>
+          <p:nvPr/>
+        </p:nvSpPr>
+        <p:spPr>
+          <a:xfrm>
+            <a:off x="3440117" y="3818166"/>
+            <a:ext cx="773640" cy="475253"/>
+          </a:xfrm>
+          <a:prstGeom prst="rect">
+            <a:avLst/>
+          </a:prstGeom>
+          <a:solidFill>
+            <a:schemeClr val="bg1">
+              <a:lumMod val="95000"/>
+            </a:schemeClr>
+          </a:solidFill>
+          <a:ln>
+            <a:solidFill>
+              <a:schemeClr val="tx1"/>
+            </a:solidFill>
+          </a:ln>
+        </p:spPr>
+        <p:style>
+          <a:lnRef idx="2">
+            <a:schemeClr val="accent1">
+              <a:shade val="50000"/>
+            </a:schemeClr>
+          </a:lnRef>
+          <a:fillRef idx="1">
+            <a:schemeClr val="accent1"/>
+          </a:fillRef>
+          <a:effectRef idx="0">
+            <a:schemeClr val="accent1"/>
+          </a:effectRef>
+          <a:fontRef idx="minor">
+            <a:schemeClr val="lt1"/>
+          </a:fontRef>
+        </p:style>
+        <p:txBody>
+          <a:bodyPr rtlCol="0" anchor="ctr"/>
+          <a:lstStyle/>
+          <a:p>
+            <a:pPr algn="ctr"/>
+            <a:r>
+              <a:rPr lang="en-US" altLang="ko-KR" dirty="0" smtClean="0">
+                <a:solidFill>
+                  <a:schemeClr val="tx1"/>
+                </a:solidFill>
+                <a:latin typeface="나눔스퀘어 ExtraBold" pitchFamily="50" charset="-127"/>
+                <a:ea typeface="나눔스퀘어 ExtraBold" pitchFamily="50" charset="-127"/>
+              </a:rPr>
+              <a:t>23</a:t>
+            </a:r>
+            <a:endParaRPr lang="ko-KR" altLang="en-US" dirty="0">
+              <a:solidFill>
+                <a:schemeClr val="tx1"/>
+              </a:solidFill>
+              <a:latin typeface="나눔스퀘어 ExtraBold" pitchFamily="50" charset="-127"/>
+              <a:ea typeface="나눔스퀘어 ExtraBold" pitchFamily="50" charset="-127"/>
+            </a:endParaRPr>
+          </a:p>
+        </p:txBody>
+      </p:sp>
+      <p:sp>
+        <p:nvSpPr>
+          <p:cNvPr id="35" name="직사각형 34"/>
+          <p:cNvSpPr/>
+          <p:nvPr/>
+        </p:nvSpPr>
+        <p:spPr>
+          <a:xfrm>
+            <a:off x="4213757" y="3818166"/>
+            <a:ext cx="773640" cy="475253"/>
+          </a:xfrm>
+          <a:prstGeom prst="rect">
+            <a:avLst/>
+          </a:prstGeom>
+          <a:solidFill>
+            <a:schemeClr val="bg1">
+              <a:lumMod val="95000"/>
+            </a:schemeClr>
+          </a:solidFill>
+          <a:ln>
+            <a:solidFill>
+              <a:schemeClr val="tx1"/>
+            </a:solidFill>
+          </a:ln>
+        </p:spPr>
+        <p:style>
+          <a:lnRef idx="2">
+            <a:schemeClr val="accent1">
+              <a:shade val="50000"/>
+            </a:schemeClr>
+          </a:lnRef>
+          <a:fillRef idx="1">
+            <a:schemeClr val="accent1"/>
+          </a:fillRef>
+          <a:effectRef idx="0">
+            <a:schemeClr val="accent1"/>
+          </a:effectRef>
+          <a:fontRef idx="minor">
+            <a:schemeClr val="lt1"/>
+          </a:fontRef>
+        </p:style>
+        <p:txBody>
+          <a:bodyPr rtlCol="0" anchor="ctr"/>
+          <a:lstStyle/>
+          <a:p>
+            <a:pPr algn="ctr"/>
+            <a:r>
+              <a:rPr lang="en-US" altLang="ko-KR" dirty="0" smtClean="0">
+                <a:solidFill>
+                  <a:schemeClr val="tx1"/>
+                </a:solidFill>
+                <a:latin typeface="나눔스퀘어 ExtraBold" pitchFamily="50" charset="-127"/>
+                <a:ea typeface="나눔스퀘어 ExtraBold" pitchFamily="50" charset="-127"/>
+              </a:rPr>
+              <a:t>29</a:t>
+            </a:r>
+            <a:endParaRPr lang="ko-KR" altLang="en-US" dirty="0">
+              <a:solidFill>
+                <a:schemeClr val="tx1"/>
+              </a:solidFill>
+              <a:latin typeface="나눔스퀘어 ExtraBold" pitchFamily="50" charset="-127"/>
+              <a:ea typeface="나눔스퀘어 ExtraBold" pitchFamily="50" charset="-127"/>
+            </a:endParaRPr>
+          </a:p>
+        </p:txBody>
+      </p:sp>
+      <p:sp>
+        <p:nvSpPr>
+          <p:cNvPr id="50" name="직사각형 49"/>
+          <p:cNvSpPr/>
+          <p:nvPr/>
+        </p:nvSpPr>
+        <p:spPr>
+          <a:xfrm>
+            <a:off x="4987397" y="3818166"/>
+            <a:ext cx="773640" cy="475253"/>
+          </a:xfrm>
+          <a:prstGeom prst="rect">
+            <a:avLst/>
+          </a:prstGeom>
+          <a:solidFill>
+            <a:schemeClr val="bg1">
+              <a:lumMod val="95000"/>
+            </a:schemeClr>
+          </a:solidFill>
+          <a:ln>
+            <a:solidFill>
+              <a:schemeClr val="tx1"/>
+            </a:solidFill>
+          </a:ln>
+        </p:spPr>
+        <p:style>
+          <a:lnRef idx="2">
+            <a:schemeClr val="accent1">
+              <a:shade val="50000"/>
+            </a:schemeClr>
+          </a:lnRef>
+          <a:fillRef idx="1">
+            <a:schemeClr val="accent1"/>
+          </a:fillRef>
+          <a:effectRef idx="0">
+            <a:schemeClr val="accent1"/>
+          </a:effectRef>
+          <a:fontRef idx="minor">
+            <a:schemeClr val="lt1"/>
+          </a:fontRef>
+        </p:style>
+        <p:txBody>
+          <a:bodyPr rtlCol="0" anchor="ctr"/>
+          <a:lstStyle/>
+          <a:p>
+            <a:pPr algn="ctr"/>
+            <a:r>
+              <a:rPr lang="en-US" altLang="ko-KR" dirty="0" smtClean="0">
+                <a:solidFill>
+                  <a:schemeClr val="tx1"/>
+                </a:solidFill>
+                <a:latin typeface="나눔스퀘어 ExtraBold" pitchFamily="50" charset="-127"/>
+                <a:ea typeface="나눔스퀘어 ExtraBold" pitchFamily="50" charset="-127"/>
+              </a:rPr>
+              <a:t>33</a:t>
+            </a:r>
+            <a:endParaRPr lang="ko-KR" altLang="en-US" dirty="0">
+              <a:solidFill>
+                <a:schemeClr val="tx1"/>
+              </a:solidFill>
+              <a:latin typeface="나눔스퀘어 ExtraBold" pitchFamily="50" charset="-127"/>
+              <a:ea typeface="나눔스퀘어 ExtraBold" pitchFamily="50" charset="-127"/>
+            </a:endParaRPr>
+          </a:p>
+        </p:txBody>
+      </p:sp>
+      <p:sp>
+        <p:nvSpPr>
+          <p:cNvPr id="52" name="직사각형 51"/>
+          <p:cNvSpPr/>
+          <p:nvPr/>
+        </p:nvSpPr>
+        <p:spPr>
+          <a:xfrm>
+            <a:off x="5761037" y="3818166"/>
+            <a:ext cx="773640" cy="475253"/>
+          </a:xfrm>
+          <a:prstGeom prst="rect">
+            <a:avLst/>
+          </a:prstGeom>
+          <a:solidFill>
+            <a:schemeClr val="bg1">
+              <a:lumMod val="95000"/>
+            </a:schemeClr>
+          </a:solidFill>
+          <a:ln>
+            <a:solidFill>
+              <a:schemeClr val="tx1"/>
+            </a:solidFill>
+          </a:ln>
+        </p:spPr>
+        <p:style>
+          <a:lnRef idx="2">
+            <a:schemeClr val="accent1">
+              <a:shade val="50000"/>
+            </a:schemeClr>
+          </a:lnRef>
+          <a:fillRef idx="1">
+            <a:schemeClr val="accent1"/>
+          </a:fillRef>
+          <a:effectRef idx="0">
+            <a:schemeClr val="accent1"/>
+          </a:effectRef>
+          <a:fontRef idx="minor">
+            <a:schemeClr val="lt1"/>
+          </a:fontRef>
+        </p:style>
+        <p:txBody>
+          <a:bodyPr rtlCol="0" anchor="ctr"/>
+          <a:lstStyle/>
+          <a:p>
+            <a:pPr algn="ctr"/>
+            <a:r>
+              <a:rPr lang="en-US" altLang="ko-KR" dirty="0" smtClean="0">
+                <a:solidFill>
+                  <a:schemeClr val="tx1"/>
+                </a:solidFill>
+                <a:latin typeface="나눔스퀘어 ExtraBold" pitchFamily="50" charset="-127"/>
+                <a:ea typeface="나눔스퀘어 ExtraBold" pitchFamily="50" charset="-127"/>
+              </a:rPr>
+              <a:t>48</a:t>
+            </a:r>
+            <a:endParaRPr lang="ko-KR" altLang="en-US" dirty="0">
+              <a:solidFill>
+                <a:schemeClr val="tx1"/>
+              </a:solidFill>
+              <a:latin typeface="나눔스퀘어 ExtraBold" pitchFamily="50" charset="-127"/>
+              <a:ea typeface="나눔스퀘어 ExtraBold" pitchFamily="50" charset="-127"/>
+            </a:endParaRPr>
+          </a:p>
+        </p:txBody>
+      </p:sp>
+      <p:sp>
+        <p:nvSpPr>
+          <p:cNvPr id="58" name="직사각형 57"/>
+          <p:cNvSpPr/>
+          <p:nvPr/>
+        </p:nvSpPr>
+        <p:spPr>
+          <a:xfrm>
+            <a:off x="6534677" y="3818166"/>
+            <a:ext cx="773640" cy="475253"/>
+          </a:xfrm>
+          <a:prstGeom prst="rect">
+            <a:avLst/>
+          </a:prstGeom>
+          <a:solidFill>
+            <a:schemeClr val="bg1">
+              <a:lumMod val="95000"/>
+            </a:schemeClr>
+          </a:solidFill>
+          <a:ln>
+            <a:solidFill>
+              <a:schemeClr val="tx1"/>
+            </a:solidFill>
+          </a:ln>
+        </p:spPr>
+        <p:style>
+          <a:lnRef idx="2">
+            <a:schemeClr val="accent1">
+              <a:shade val="50000"/>
+            </a:schemeClr>
+          </a:lnRef>
+          <a:fillRef idx="1">
+            <a:schemeClr val="accent1"/>
+          </a:fillRef>
+          <a:effectRef idx="0">
+            <a:schemeClr val="accent1"/>
+          </a:effectRef>
+          <a:fontRef idx="minor">
+            <a:schemeClr val="lt1"/>
+          </a:fontRef>
+        </p:style>
+        <p:txBody>
+          <a:bodyPr rtlCol="0" anchor="ctr"/>
+          <a:lstStyle/>
+          <a:p>
+            <a:pPr algn="ctr"/>
+            <a:r>
+              <a:rPr lang="en-US" altLang="ko-KR" dirty="0" smtClean="0">
+                <a:solidFill>
+                  <a:schemeClr val="tx1"/>
+                </a:solidFill>
+                <a:latin typeface="나눔스퀘어 ExtraBold" pitchFamily="50" charset="-127"/>
+                <a:ea typeface="나눔스퀘어 ExtraBold" pitchFamily="50" charset="-127"/>
+              </a:rPr>
+              <a:t>61</a:t>
+            </a:r>
+            <a:endParaRPr lang="ko-KR" altLang="en-US" dirty="0">
+              <a:solidFill>
+                <a:schemeClr val="tx1"/>
+              </a:solidFill>
+              <a:latin typeface="나눔스퀘어 ExtraBold" pitchFamily="50" charset="-127"/>
+              <a:ea typeface="나눔스퀘어 ExtraBold" pitchFamily="50" charset="-127"/>
+            </a:endParaRPr>
+          </a:p>
+        </p:txBody>
+      </p:sp>
+      <p:sp>
+        <p:nvSpPr>
+          <p:cNvPr id="59" name="직사각형 58"/>
+          <p:cNvSpPr/>
+          <p:nvPr/>
+        </p:nvSpPr>
+        <p:spPr>
+          <a:xfrm>
+            <a:off x="7308317" y="3818166"/>
+            <a:ext cx="773640" cy="475253"/>
+          </a:xfrm>
+          <a:prstGeom prst="rect">
+            <a:avLst/>
+          </a:prstGeom>
+          <a:solidFill>
+            <a:schemeClr val="bg1">
+              <a:lumMod val="95000"/>
+            </a:schemeClr>
+          </a:solidFill>
+          <a:ln>
+            <a:solidFill>
+              <a:schemeClr val="tx1"/>
+            </a:solidFill>
+          </a:ln>
+        </p:spPr>
+        <p:style>
+          <a:lnRef idx="2">
+            <a:schemeClr val="accent1">
+              <a:shade val="50000"/>
+            </a:schemeClr>
+          </a:lnRef>
+          <a:fillRef idx="1">
+            <a:schemeClr val="accent1"/>
+          </a:fillRef>
+          <a:effectRef idx="0">
+            <a:schemeClr val="accent1"/>
+          </a:effectRef>
+          <a:fontRef idx="minor">
+            <a:schemeClr val="lt1"/>
+          </a:fontRef>
+        </p:style>
+        <p:txBody>
+          <a:bodyPr rtlCol="0" anchor="ctr"/>
+          <a:lstStyle/>
+          <a:p>
+            <a:pPr algn="ctr"/>
+            <a:r>
+              <a:rPr lang="en-US" altLang="ko-KR" dirty="0" smtClean="0">
+                <a:solidFill>
+                  <a:schemeClr val="tx1"/>
+                </a:solidFill>
+                <a:latin typeface="나눔스퀘어 ExtraBold" pitchFamily="50" charset="-127"/>
+                <a:ea typeface="나눔스퀘어 ExtraBold" pitchFamily="50" charset="-127"/>
+              </a:rPr>
+              <a:t>66</a:t>
+            </a:r>
+            <a:endParaRPr lang="ko-KR" altLang="en-US" dirty="0">
+              <a:solidFill>
+                <a:schemeClr val="tx1"/>
+              </a:solidFill>
+              <a:latin typeface="나눔스퀘어 ExtraBold" pitchFamily="50" charset="-127"/>
+              <a:ea typeface="나눔스퀘어 ExtraBold" pitchFamily="50" charset="-127"/>
+            </a:endParaRPr>
+          </a:p>
+        </p:txBody>
+      </p:sp>
+      <p:sp>
+        <p:nvSpPr>
+          <p:cNvPr id="60" name="직사각형 59"/>
+          <p:cNvSpPr/>
+          <p:nvPr/>
+        </p:nvSpPr>
+        <p:spPr>
+          <a:xfrm>
+            <a:off x="8081957" y="3818166"/>
+            <a:ext cx="773640" cy="475253"/>
+          </a:xfrm>
+          <a:prstGeom prst="rect">
+            <a:avLst/>
+          </a:prstGeom>
+          <a:solidFill>
+            <a:schemeClr val="bg1">
+              <a:lumMod val="95000"/>
+            </a:schemeClr>
+          </a:solidFill>
+          <a:ln>
+            <a:solidFill>
+              <a:schemeClr val="tx1"/>
+            </a:solidFill>
+          </a:ln>
+        </p:spPr>
+        <p:style>
+          <a:lnRef idx="2">
+            <a:schemeClr val="accent1">
+              <a:shade val="50000"/>
+            </a:schemeClr>
+          </a:lnRef>
+          <a:fillRef idx="1">
+            <a:schemeClr val="accent1"/>
+          </a:fillRef>
+          <a:effectRef idx="0">
+            <a:schemeClr val="accent1"/>
+          </a:effectRef>
+          <a:fontRef idx="minor">
+            <a:schemeClr val="lt1"/>
+          </a:fontRef>
+        </p:style>
+        <p:txBody>
+          <a:bodyPr rtlCol="0" anchor="ctr"/>
+          <a:lstStyle/>
+          <a:p>
+            <a:pPr algn="ctr"/>
+            <a:r>
+              <a:rPr lang="en-US" altLang="ko-KR" dirty="0" smtClean="0">
+                <a:solidFill>
+                  <a:schemeClr val="tx1"/>
+                </a:solidFill>
+                <a:latin typeface="나눔스퀘어 ExtraBold" pitchFamily="50" charset="-127"/>
+                <a:ea typeface="나눔스퀘어 ExtraBold" pitchFamily="50" charset="-127"/>
+              </a:rPr>
+              <a:t>98</a:t>
+            </a:r>
+            <a:endParaRPr lang="ko-KR" altLang="en-US" dirty="0">
+              <a:solidFill>
+                <a:schemeClr val="tx1"/>
+              </a:solidFill>
+              <a:latin typeface="나눔스퀘어 ExtraBold" pitchFamily="50" charset="-127"/>
+              <a:ea typeface="나눔스퀘어 ExtraBold" pitchFamily="50" charset="-127"/>
+            </a:endParaRPr>
+          </a:p>
+        </p:txBody>
+      </p:sp>
+      <p:sp>
+        <p:nvSpPr>
+          <p:cNvPr id="4" name="TextBox 3"/>
+          <p:cNvSpPr txBox="1"/>
+          <p:nvPr/>
+        </p:nvSpPr>
+        <p:spPr>
+          <a:xfrm>
+            <a:off x="1892837" y="1799927"/>
+            <a:ext cx="7180568" cy="509627"/>
+          </a:xfrm>
+          <a:prstGeom prst="rect">
+            <a:avLst/>
+          </a:prstGeom>
+          <a:noFill/>
+        </p:spPr>
+        <p:txBody>
+          <a:bodyPr wrap="square" rtlCol="0">
+            <a:spAutoFit/>
+          </a:bodyPr>
+          <a:lstStyle/>
+          <a:p>
+            <a:pPr>
+              <a:lnSpc>
+                <a:spcPct val="150000"/>
+              </a:lnSpc>
+            </a:pPr>
+            <a:r>
+              <a:rPr lang="ko-KR" altLang="en-US" sz="2000" dirty="0" err="1" smtClean="0">
+                <a:latin typeface="나눔스퀘어 ExtraBold" pitchFamily="50" charset="-127"/>
+                <a:ea typeface="나눔스퀘어 ExtraBold" pitchFamily="50" charset="-127"/>
+              </a:rPr>
+              <a:t>중간값인</a:t>
+            </a:r>
+            <a:r>
+              <a:rPr lang="ko-KR" altLang="en-US" sz="2000" dirty="0" smtClean="0">
+                <a:latin typeface="나눔스퀘어 ExtraBold" pitchFamily="50" charset="-127"/>
+                <a:ea typeface="나눔스퀘어 ExtraBold" pitchFamily="50" charset="-127"/>
+              </a:rPr>
+              <a:t> </a:t>
+            </a:r>
+            <a:r>
+              <a:rPr lang="en-US" altLang="ko-KR" sz="2000" dirty="0" smtClean="0">
+                <a:latin typeface="나눔스퀘어 ExtraBold" pitchFamily="50" charset="-127"/>
+                <a:ea typeface="나눔스퀘어 ExtraBold" pitchFamily="50" charset="-127"/>
+              </a:rPr>
+              <a:t>33 </a:t>
+            </a:r>
+            <a:r>
+              <a:rPr lang="ko-KR" altLang="en-US" sz="2000" dirty="0" smtClean="0">
+                <a:latin typeface="나눔스퀘어 ExtraBold" pitchFamily="50" charset="-127"/>
+                <a:ea typeface="나눔스퀘어 ExtraBold" pitchFamily="50" charset="-127"/>
+              </a:rPr>
+              <a:t>이 </a:t>
+            </a:r>
+            <a:r>
+              <a:rPr lang="en-US" altLang="ko-KR" sz="2000" dirty="0" smtClean="0">
+                <a:latin typeface="나눔스퀘어 ExtraBold" pitchFamily="50" charset="-127"/>
+                <a:ea typeface="나눔스퀘어 ExtraBold" pitchFamily="50" charset="-127"/>
+              </a:rPr>
+              <a:t>48 </a:t>
+            </a:r>
+            <a:r>
+              <a:rPr lang="ko-KR" altLang="en-US" sz="2000" dirty="0" smtClean="0">
+                <a:latin typeface="나눔스퀘어 ExtraBold" pitchFamily="50" charset="-127"/>
+                <a:ea typeface="나눔스퀘어 ExtraBold" pitchFamily="50" charset="-127"/>
+              </a:rPr>
+              <a:t>보다 작으므로 </a:t>
+            </a:r>
+            <a:r>
+              <a:rPr lang="en-US" altLang="ko-KR" sz="2000" dirty="0" smtClean="0">
+                <a:solidFill>
+                  <a:srgbClr val="FF0000"/>
+                </a:solidFill>
+                <a:latin typeface="나눔스퀘어 ExtraBold" pitchFamily="50" charset="-127"/>
+                <a:ea typeface="나눔스퀘어 ExtraBold" pitchFamily="50" charset="-127"/>
+              </a:rPr>
+              <a:t>L</a:t>
+            </a:r>
+            <a:r>
+              <a:rPr lang="ko-KR" altLang="en-US" sz="2000" dirty="0">
+                <a:latin typeface="나눔스퀘어 ExtraBold" pitchFamily="50" charset="-127"/>
+                <a:ea typeface="나눔스퀘어 ExtraBold" pitchFamily="50" charset="-127"/>
+              </a:rPr>
+              <a:t> </a:t>
+            </a:r>
+            <a:r>
+              <a:rPr lang="ko-KR" altLang="en-US" sz="2000" dirty="0" smtClean="0">
+                <a:latin typeface="나눔스퀘어 ExtraBold" pitchFamily="50" charset="-127"/>
+                <a:ea typeface="나눔스퀘어 ExtraBold" pitchFamily="50" charset="-127"/>
+              </a:rPr>
+              <a:t>을 </a:t>
+            </a:r>
+            <a:r>
+              <a:rPr lang="en-US" altLang="ko-KR" sz="2000" dirty="0" smtClean="0">
+                <a:solidFill>
+                  <a:srgbClr val="FF0000"/>
+                </a:solidFill>
+                <a:latin typeface="나눔스퀘어 ExtraBold" pitchFamily="50" charset="-127"/>
+                <a:ea typeface="나눔스퀘어 ExtraBold" pitchFamily="50" charset="-127"/>
+              </a:rPr>
+              <a:t>5</a:t>
+            </a:r>
+            <a:r>
+              <a:rPr lang="ko-KR" altLang="en-US" sz="2000" dirty="0" smtClean="0">
+                <a:latin typeface="나눔스퀘어 ExtraBold" pitchFamily="50" charset="-127"/>
+                <a:ea typeface="나눔스퀘어 ExtraBold" pitchFamily="50" charset="-127"/>
+              </a:rPr>
+              <a:t>번 위치로 수정</a:t>
+            </a:r>
+            <a:endParaRPr lang="en-US" altLang="ko-KR" sz="2000" dirty="0">
+              <a:latin typeface="나눔스퀘어 ExtraBold" pitchFamily="50" charset="-127"/>
+              <a:ea typeface="나눔스퀘어 ExtraBold" pitchFamily="50" charset="-127"/>
+            </a:endParaRPr>
+          </a:p>
+        </p:txBody>
+      </p:sp>
+      <p:sp>
+        <p:nvSpPr>
+          <p:cNvPr id="61" name="직사각형 60"/>
+          <p:cNvSpPr/>
+          <p:nvPr/>
+        </p:nvSpPr>
+        <p:spPr>
+          <a:xfrm>
+            <a:off x="1892837" y="3519881"/>
+            <a:ext cx="773640" cy="268268"/>
+          </a:xfrm>
+          <a:prstGeom prst="rect">
+            <a:avLst/>
+          </a:prstGeom>
+          <a:noFill/>
+          <a:ln>
+            <a:noFill/>
+          </a:ln>
+        </p:spPr>
+        <p:style>
+          <a:lnRef idx="2">
+            <a:schemeClr val="accent1">
+              <a:shade val="50000"/>
+            </a:schemeClr>
+          </a:lnRef>
+          <a:fillRef idx="1">
+            <a:schemeClr val="accent1"/>
+          </a:fillRef>
+          <a:effectRef idx="0">
+            <a:schemeClr val="accent1"/>
+          </a:effectRef>
+          <a:fontRef idx="minor">
+            <a:schemeClr val="lt1"/>
+          </a:fontRef>
+        </p:style>
+        <p:txBody>
+          <a:bodyPr rtlCol="0" anchor="ctr"/>
+          <a:lstStyle/>
+          <a:p>
+            <a:pPr algn="ctr"/>
+            <a:r>
+              <a:rPr lang="en-US" altLang="ko-KR" sz="1400" dirty="0" smtClean="0">
+                <a:solidFill>
+                  <a:schemeClr val="tx1"/>
+                </a:solidFill>
+                <a:latin typeface="나눔스퀘어 ExtraBold" pitchFamily="50" charset="-127"/>
+                <a:ea typeface="나눔스퀘어 ExtraBold" pitchFamily="50" charset="-127"/>
+              </a:rPr>
+              <a:t>0</a:t>
+            </a:r>
+            <a:endParaRPr lang="ko-KR" altLang="en-US" sz="1400" dirty="0">
+              <a:solidFill>
+                <a:schemeClr val="tx1"/>
+              </a:solidFill>
+              <a:latin typeface="나눔스퀘어 ExtraBold" pitchFamily="50" charset="-127"/>
+              <a:ea typeface="나눔스퀘어 ExtraBold" pitchFamily="50" charset="-127"/>
+            </a:endParaRPr>
+          </a:p>
+        </p:txBody>
+      </p:sp>
+      <p:sp>
+        <p:nvSpPr>
+          <p:cNvPr id="62" name="직사각형 61"/>
+          <p:cNvSpPr/>
+          <p:nvPr/>
+        </p:nvSpPr>
+        <p:spPr>
+          <a:xfrm>
+            <a:off x="2666477" y="3519881"/>
+            <a:ext cx="773640" cy="268268"/>
+          </a:xfrm>
+          <a:prstGeom prst="rect">
+            <a:avLst/>
+          </a:prstGeom>
+          <a:noFill/>
+          <a:ln>
+            <a:noFill/>
+          </a:ln>
+        </p:spPr>
+        <p:style>
+          <a:lnRef idx="2">
+            <a:schemeClr val="accent1">
+              <a:shade val="50000"/>
+            </a:schemeClr>
+          </a:lnRef>
+          <a:fillRef idx="1">
+            <a:schemeClr val="accent1"/>
+          </a:fillRef>
+          <a:effectRef idx="0">
+            <a:schemeClr val="accent1"/>
+          </a:effectRef>
+          <a:fontRef idx="minor">
+            <a:schemeClr val="lt1"/>
+          </a:fontRef>
+        </p:style>
+        <p:txBody>
+          <a:bodyPr rtlCol="0" anchor="ctr"/>
+          <a:lstStyle/>
+          <a:p>
+            <a:pPr algn="ctr"/>
+            <a:r>
+              <a:rPr lang="en-US" altLang="ko-KR" sz="1400" dirty="0" smtClean="0">
+                <a:solidFill>
+                  <a:schemeClr val="tx1"/>
+                </a:solidFill>
+                <a:latin typeface="나눔스퀘어 ExtraBold" pitchFamily="50" charset="-127"/>
+                <a:ea typeface="나눔스퀘어 ExtraBold" pitchFamily="50" charset="-127"/>
+              </a:rPr>
+              <a:t>1</a:t>
+            </a:r>
+            <a:endParaRPr lang="ko-KR" altLang="en-US" sz="1400" dirty="0">
+              <a:solidFill>
+                <a:schemeClr val="tx1"/>
+              </a:solidFill>
+              <a:latin typeface="나눔스퀘어 ExtraBold" pitchFamily="50" charset="-127"/>
+              <a:ea typeface="나눔스퀘어 ExtraBold" pitchFamily="50" charset="-127"/>
+            </a:endParaRPr>
+          </a:p>
+        </p:txBody>
+      </p:sp>
+      <p:sp>
+        <p:nvSpPr>
+          <p:cNvPr id="63" name="직사각형 62"/>
+          <p:cNvSpPr/>
+          <p:nvPr/>
+        </p:nvSpPr>
+        <p:spPr>
+          <a:xfrm>
+            <a:off x="3440117" y="3519881"/>
+            <a:ext cx="773640" cy="268268"/>
+          </a:xfrm>
+          <a:prstGeom prst="rect">
+            <a:avLst/>
+          </a:prstGeom>
+          <a:noFill/>
+          <a:ln>
+            <a:noFill/>
+          </a:ln>
+        </p:spPr>
+        <p:style>
+          <a:lnRef idx="2">
+            <a:schemeClr val="accent1">
+              <a:shade val="50000"/>
+            </a:schemeClr>
+          </a:lnRef>
+          <a:fillRef idx="1">
+            <a:schemeClr val="accent1"/>
+          </a:fillRef>
+          <a:effectRef idx="0">
+            <a:schemeClr val="accent1"/>
+          </a:effectRef>
+          <a:fontRef idx="minor">
+            <a:schemeClr val="lt1"/>
+          </a:fontRef>
+        </p:style>
+        <p:txBody>
+          <a:bodyPr rtlCol="0" anchor="ctr"/>
+          <a:lstStyle/>
+          <a:p>
+            <a:pPr algn="ctr"/>
+            <a:r>
+              <a:rPr lang="en-US" altLang="ko-KR" sz="1400" dirty="0" smtClean="0">
+                <a:solidFill>
+                  <a:schemeClr val="tx1"/>
+                </a:solidFill>
+                <a:latin typeface="나눔스퀘어 ExtraBold" pitchFamily="50" charset="-127"/>
+                <a:ea typeface="나눔스퀘어 ExtraBold" pitchFamily="50" charset="-127"/>
+              </a:rPr>
+              <a:t>2</a:t>
+            </a:r>
+            <a:endParaRPr lang="ko-KR" altLang="en-US" sz="1400" dirty="0">
+              <a:solidFill>
+                <a:schemeClr val="tx1"/>
+              </a:solidFill>
+              <a:latin typeface="나눔스퀘어 ExtraBold" pitchFamily="50" charset="-127"/>
+              <a:ea typeface="나눔스퀘어 ExtraBold" pitchFamily="50" charset="-127"/>
+            </a:endParaRPr>
+          </a:p>
+        </p:txBody>
+      </p:sp>
+      <p:sp>
+        <p:nvSpPr>
+          <p:cNvPr id="64" name="직사각형 63"/>
+          <p:cNvSpPr/>
+          <p:nvPr/>
+        </p:nvSpPr>
+        <p:spPr>
+          <a:xfrm>
+            <a:off x="4213757" y="3519881"/>
+            <a:ext cx="773640" cy="268268"/>
+          </a:xfrm>
+          <a:prstGeom prst="rect">
+            <a:avLst/>
+          </a:prstGeom>
+          <a:noFill/>
+          <a:ln>
+            <a:noFill/>
+          </a:ln>
+        </p:spPr>
+        <p:style>
+          <a:lnRef idx="2">
+            <a:schemeClr val="accent1">
+              <a:shade val="50000"/>
+            </a:schemeClr>
+          </a:lnRef>
+          <a:fillRef idx="1">
+            <a:schemeClr val="accent1"/>
+          </a:fillRef>
+          <a:effectRef idx="0">
+            <a:schemeClr val="accent1"/>
+          </a:effectRef>
+          <a:fontRef idx="minor">
+            <a:schemeClr val="lt1"/>
+          </a:fontRef>
+        </p:style>
+        <p:txBody>
+          <a:bodyPr rtlCol="0" anchor="ctr"/>
+          <a:lstStyle/>
+          <a:p>
+            <a:pPr algn="ctr"/>
+            <a:r>
+              <a:rPr lang="en-US" altLang="ko-KR" sz="1400" dirty="0" smtClean="0">
+                <a:solidFill>
+                  <a:schemeClr val="tx1"/>
+                </a:solidFill>
+                <a:latin typeface="나눔스퀘어 ExtraBold" pitchFamily="50" charset="-127"/>
+                <a:ea typeface="나눔스퀘어 ExtraBold" pitchFamily="50" charset="-127"/>
+              </a:rPr>
+              <a:t>3</a:t>
+            </a:r>
+            <a:endParaRPr lang="ko-KR" altLang="en-US" sz="1400" dirty="0">
+              <a:solidFill>
+                <a:schemeClr val="tx1"/>
+              </a:solidFill>
+              <a:latin typeface="나눔스퀘어 ExtraBold" pitchFamily="50" charset="-127"/>
+              <a:ea typeface="나눔스퀘어 ExtraBold" pitchFamily="50" charset="-127"/>
+            </a:endParaRPr>
+          </a:p>
+        </p:txBody>
+      </p:sp>
+      <p:sp>
+        <p:nvSpPr>
+          <p:cNvPr id="65" name="직사각형 64"/>
+          <p:cNvSpPr/>
+          <p:nvPr/>
+        </p:nvSpPr>
+        <p:spPr>
+          <a:xfrm>
+            <a:off x="4987397" y="3519881"/>
+            <a:ext cx="773640" cy="268268"/>
+          </a:xfrm>
+          <a:prstGeom prst="rect">
+            <a:avLst/>
+          </a:prstGeom>
+          <a:noFill/>
+          <a:ln>
+            <a:noFill/>
+          </a:ln>
+        </p:spPr>
+        <p:style>
+          <a:lnRef idx="2">
+            <a:schemeClr val="accent1">
+              <a:shade val="50000"/>
+            </a:schemeClr>
+          </a:lnRef>
+          <a:fillRef idx="1">
+            <a:schemeClr val="accent1"/>
+          </a:fillRef>
+          <a:effectRef idx="0">
+            <a:schemeClr val="accent1"/>
+          </a:effectRef>
+          <a:fontRef idx="minor">
+            <a:schemeClr val="lt1"/>
+          </a:fontRef>
+        </p:style>
+        <p:txBody>
+          <a:bodyPr rtlCol="0" anchor="ctr"/>
+          <a:lstStyle/>
+          <a:p>
+            <a:pPr algn="ctr"/>
+            <a:r>
+              <a:rPr lang="en-US" altLang="ko-KR" sz="1400" dirty="0" smtClean="0">
+                <a:solidFill>
+                  <a:schemeClr val="tx1"/>
+                </a:solidFill>
+                <a:latin typeface="나눔스퀘어 ExtraBold" pitchFamily="50" charset="-127"/>
+                <a:ea typeface="나눔스퀘어 ExtraBold" pitchFamily="50" charset="-127"/>
+              </a:rPr>
+              <a:t>4</a:t>
+            </a:r>
+            <a:endParaRPr lang="ko-KR" altLang="en-US" sz="1400" dirty="0">
+              <a:solidFill>
+                <a:schemeClr val="tx1"/>
+              </a:solidFill>
+              <a:latin typeface="나눔스퀘어 ExtraBold" pitchFamily="50" charset="-127"/>
+              <a:ea typeface="나눔스퀘어 ExtraBold" pitchFamily="50" charset="-127"/>
+            </a:endParaRPr>
+          </a:p>
+        </p:txBody>
+      </p:sp>
+      <p:sp>
+        <p:nvSpPr>
+          <p:cNvPr id="66" name="직사각형 65"/>
+          <p:cNvSpPr/>
+          <p:nvPr/>
+        </p:nvSpPr>
+        <p:spPr>
+          <a:xfrm>
+            <a:off x="5761037" y="3519881"/>
+            <a:ext cx="773640" cy="268268"/>
+          </a:xfrm>
+          <a:prstGeom prst="rect">
+            <a:avLst/>
+          </a:prstGeom>
+          <a:noFill/>
+          <a:ln>
+            <a:noFill/>
+          </a:ln>
+        </p:spPr>
+        <p:style>
+          <a:lnRef idx="2">
+            <a:schemeClr val="accent1">
+              <a:shade val="50000"/>
+            </a:schemeClr>
+          </a:lnRef>
+          <a:fillRef idx="1">
+            <a:schemeClr val="accent1"/>
+          </a:fillRef>
+          <a:effectRef idx="0">
+            <a:schemeClr val="accent1"/>
+          </a:effectRef>
+          <a:fontRef idx="minor">
+            <a:schemeClr val="lt1"/>
+          </a:fontRef>
+        </p:style>
+        <p:txBody>
+          <a:bodyPr rtlCol="0" anchor="ctr"/>
+          <a:lstStyle/>
+          <a:p>
+            <a:pPr algn="ctr"/>
+            <a:r>
+              <a:rPr lang="en-US" altLang="ko-KR" sz="1400" dirty="0" smtClean="0">
+                <a:solidFill>
+                  <a:schemeClr val="tx1"/>
+                </a:solidFill>
+                <a:latin typeface="나눔스퀘어 ExtraBold" pitchFamily="50" charset="-127"/>
+                <a:ea typeface="나눔스퀘어 ExtraBold" pitchFamily="50" charset="-127"/>
+              </a:rPr>
+              <a:t>5</a:t>
+            </a:r>
+            <a:endParaRPr lang="ko-KR" altLang="en-US" sz="1400" dirty="0">
+              <a:solidFill>
+                <a:schemeClr val="tx1"/>
+              </a:solidFill>
+              <a:latin typeface="나눔스퀘어 ExtraBold" pitchFamily="50" charset="-127"/>
+              <a:ea typeface="나눔스퀘어 ExtraBold" pitchFamily="50" charset="-127"/>
+            </a:endParaRPr>
+          </a:p>
+        </p:txBody>
+      </p:sp>
+      <p:sp>
+        <p:nvSpPr>
+          <p:cNvPr id="67" name="직사각형 66"/>
+          <p:cNvSpPr/>
+          <p:nvPr/>
+        </p:nvSpPr>
+        <p:spPr>
+          <a:xfrm>
+            <a:off x="6534677" y="3519881"/>
+            <a:ext cx="773640" cy="268268"/>
+          </a:xfrm>
+          <a:prstGeom prst="rect">
+            <a:avLst/>
+          </a:prstGeom>
+          <a:noFill/>
+          <a:ln>
+            <a:noFill/>
+          </a:ln>
+        </p:spPr>
+        <p:style>
+          <a:lnRef idx="2">
+            <a:schemeClr val="accent1">
+              <a:shade val="50000"/>
+            </a:schemeClr>
+          </a:lnRef>
+          <a:fillRef idx="1">
+            <a:schemeClr val="accent1"/>
+          </a:fillRef>
+          <a:effectRef idx="0">
+            <a:schemeClr val="accent1"/>
+          </a:effectRef>
+          <a:fontRef idx="minor">
+            <a:schemeClr val="lt1"/>
+          </a:fontRef>
+        </p:style>
+        <p:txBody>
+          <a:bodyPr rtlCol="0" anchor="ctr"/>
+          <a:lstStyle/>
+          <a:p>
+            <a:pPr algn="ctr"/>
+            <a:r>
+              <a:rPr lang="en-US" altLang="ko-KR" sz="1400" dirty="0" smtClean="0">
+                <a:solidFill>
+                  <a:schemeClr val="tx1"/>
+                </a:solidFill>
+                <a:latin typeface="나눔스퀘어 ExtraBold" pitchFamily="50" charset="-127"/>
+                <a:ea typeface="나눔스퀘어 ExtraBold" pitchFamily="50" charset="-127"/>
+              </a:rPr>
+              <a:t>6</a:t>
+            </a:r>
+            <a:endParaRPr lang="ko-KR" altLang="en-US" sz="1400" dirty="0">
+              <a:solidFill>
+                <a:schemeClr val="tx1"/>
+              </a:solidFill>
+              <a:latin typeface="나눔스퀘어 ExtraBold" pitchFamily="50" charset="-127"/>
+              <a:ea typeface="나눔스퀘어 ExtraBold" pitchFamily="50" charset="-127"/>
+            </a:endParaRPr>
+          </a:p>
+        </p:txBody>
+      </p:sp>
+      <p:sp>
+        <p:nvSpPr>
+          <p:cNvPr id="68" name="직사각형 67"/>
+          <p:cNvSpPr/>
+          <p:nvPr/>
+        </p:nvSpPr>
+        <p:spPr>
+          <a:xfrm>
+            <a:off x="7308317" y="3519881"/>
+            <a:ext cx="773640" cy="268268"/>
+          </a:xfrm>
+          <a:prstGeom prst="rect">
+            <a:avLst/>
+          </a:prstGeom>
+          <a:noFill/>
+          <a:ln>
+            <a:noFill/>
+          </a:ln>
+        </p:spPr>
+        <p:style>
+          <a:lnRef idx="2">
+            <a:schemeClr val="accent1">
+              <a:shade val="50000"/>
+            </a:schemeClr>
+          </a:lnRef>
+          <a:fillRef idx="1">
+            <a:schemeClr val="accent1"/>
+          </a:fillRef>
+          <a:effectRef idx="0">
+            <a:schemeClr val="accent1"/>
+          </a:effectRef>
+          <a:fontRef idx="minor">
+            <a:schemeClr val="lt1"/>
+          </a:fontRef>
+        </p:style>
+        <p:txBody>
+          <a:bodyPr rtlCol="0" anchor="ctr"/>
+          <a:lstStyle/>
+          <a:p>
+            <a:pPr algn="ctr"/>
+            <a:r>
+              <a:rPr lang="en-US" altLang="ko-KR" sz="1400" dirty="0" smtClean="0">
+                <a:solidFill>
+                  <a:schemeClr val="tx1"/>
+                </a:solidFill>
+                <a:latin typeface="나눔스퀘어 ExtraBold" pitchFamily="50" charset="-127"/>
+                <a:ea typeface="나눔스퀘어 ExtraBold" pitchFamily="50" charset="-127"/>
+              </a:rPr>
+              <a:t>7</a:t>
+            </a:r>
+            <a:endParaRPr lang="ko-KR" altLang="en-US" sz="1400" dirty="0">
+              <a:solidFill>
+                <a:schemeClr val="tx1"/>
+              </a:solidFill>
+              <a:latin typeface="나눔스퀘어 ExtraBold" pitchFamily="50" charset="-127"/>
+              <a:ea typeface="나눔스퀘어 ExtraBold" pitchFamily="50" charset="-127"/>
+            </a:endParaRPr>
+          </a:p>
+        </p:txBody>
+      </p:sp>
+      <p:sp>
+        <p:nvSpPr>
+          <p:cNvPr id="69" name="직사각형 68"/>
+          <p:cNvSpPr/>
+          <p:nvPr/>
+        </p:nvSpPr>
+        <p:spPr>
+          <a:xfrm>
+            <a:off x="8081957" y="3519881"/>
+            <a:ext cx="773640" cy="268268"/>
+          </a:xfrm>
+          <a:prstGeom prst="rect">
+            <a:avLst/>
+          </a:prstGeom>
+          <a:noFill/>
+          <a:ln>
+            <a:noFill/>
+          </a:ln>
+        </p:spPr>
+        <p:style>
+          <a:lnRef idx="2">
+            <a:schemeClr val="accent1">
+              <a:shade val="50000"/>
+            </a:schemeClr>
+          </a:lnRef>
+          <a:fillRef idx="1">
+            <a:schemeClr val="accent1"/>
+          </a:fillRef>
+          <a:effectRef idx="0">
+            <a:schemeClr val="accent1"/>
+          </a:effectRef>
+          <a:fontRef idx="minor">
+            <a:schemeClr val="lt1"/>
+          </a:fontRef>
+        </p:style>
+        <p:txBody>
+          <a:bodyPr rtlCol="0" anchor="ctr"/>
+          <a:lstStyle/>
+          <a:p>
+            <a:pPr algn="ctr"/>
+            <a:r>
+              <a:rPr lang="en-US" altLang="ko-KR" sz="1400" dirty="0" smtClean="0">
+                <a:solidFill>
+                  <a:schemeClr val="tx1"/>
+                </a:solidFill>
+                <a:latin typeface="나눔스퀘어 ExtraBold" pitchFamily="50" charset="-127"/>
+                <a:ea typeface="나눔스퀘어 ExtraBold" pitchFamily="50" charset="-127"/>
+              </a:rPr>
+              <a:t>8</a:t>
+            </a:r>
+            <a:endParaRPr lang="ko-KR" altLang="en-US" sz="1400" dirty="0">
+              <a:solidFill>
+                <a:schemeClr val="tx1"/>
+              </a:solidFill>
+              <a:latin typeface="나눔스퀘어 ExtraBold" pitchFamily="50" charset="-127"/>
+              <a:ea typeface="나눔스퀘어 ExtraBold" pitchFamily="50" charset="-127"/>
+            </a:endParaRPr>
+          </a:p>
+        </p:txBody>
+      </p:sp>
+      <p:sp>
+        <p:nvSpPr>
+          <p:cNvPr id="6" name="왼쪽 대괄호 5"/>
+          <p:cNvSpPr/>
+          <p:nvPr/>
+        </p:nvSpPr>
+        <p:spPr>
+          <a:xfrm>
+            <a:off x="5671415" y="3555649"/>
+            <a:ext cx="105427" cy="811852"/>
+          </a:xfrm>
+          <a:prstGeom prst="leftBracket">
+            <a:avLst/>
+          </a:prstGeom>
+          <a:ln w="38100">
+            <a:solidFill>
+              <a:srgbClr val="FF0000"/>
+            </a:solidFill>
+          </a:ln>
+        </p:spPr>
+        <p:style>
+          <a:lnRef idx="1">
+            <a:schemeClr val="accent1"/>
+          </a:lnRef>
+          <a:fillRef idx="0">
+            <a:schemeClr val="accent1"/>
+          </a:fillRef>
+          <a:effectRef idx="0">
+            <a:schemeClr val="accent1"/>
+          </a:effectRef>
+          <a:fontRef idx="minor">
+            <a:schemeClr val="tx1"/>
+          </a:fontRef>
+        </p:style>
+        <p:txBody>
+          <a:bodyPr rtlCol="0" anchor="ctr"/>
+          <a:lstStyle/>
+          <a:p>
+            <a:pPr algn="ctr"/>
+            <a:endParaRPr lang="ko-KR" altLang="en-US"/>
+          </a:p>
+        </p:txBody>
+      </p:sp>
+      <p:sp>
+        <p:nvSpPr>
+          <p:cNvPr id="70" name="왼쪽 대괄호 69"/>
+          <p:cNvSpPr/>
+          <p:nvPr/>
+        </p:nvSpPr>
+        <p:spPr>
+          <a:xfrm flipH="1">
+            <a:off x="8890333" y="3555649"/>
+            <a:ext cx="105427" cy="811852"/>
+          </a:xfrm>
+          <a:prstGeom prst="leftBracket">
+            <a:avLst/>
+          </a:prstGeom>
+          <a:ln w="38100">
+            <a:solidFill>
+              <a:srgbClr val="0070C0"/>
+            </a:solidFill>
+          </a:ln>
+        </p:spPr>
+        <p:style>
+          <a:lnRef idx="1">
+            <a:schemeClr val="accent1"/>
+          </a:lnRef>
+          <a:fillRef idx="0">
+            <a:schemeClr val="accent1"/>
+          </a:fillRef>
+          <a:effectRef idx="0">
+            <a:schemeClr val="accent1"/>
+          </a:effectRef>
+          <a:fontRef idx="minor">
+            <a:schemeClr val="tx1"/>
+          </a:fontRef>
+        </p:style>
+        <p:txBody>
+          <a:bodyPr rtlCol="0" anchor="ctr"/>
+          <a:lstStyle/>
+          <a:p>
+            <a:pPr algn="ctr"/>
+            <a:endParaRPr lang="ko-KR" altLang="en-US"/>
+          </a:p>
+        </p:txBody>
+      </p:sp>
+      <p:sp>
+        <p:nvSpPr>
+          <p:cNvPr id="8" name="아래쪽 화살표 7"/>
+          <p:cNvSpPr/>
+          <p:nvPr/>
+        </p:nvSpPr>
+        <p:spPr>
+          <a:xfrm>
+            <a:off x="6775584" y="2969206"/>
+            <a:ext cx="291825" cy="486905"/>
+          </a:xfrm>
+          <a:prstGeom prst="downArrow">
+            <a:avLst>
+              <a:gd name="adj1" fmla="val 50000"/>
+              <a:gd name="adj2" fmla="val 65397"/>
+            </a:avLst>
+          </a:prstGeom>
+        </p:spPr>
+        <p:style>
+          <a:lnRef idx="2">
+            <a:schemeClr val="accent1">
+              <a:shade val="50000"/>
+            </a:schemeClr>
+          </a:lnRef>
+          <a:fillRef idx="1">
+            <a:schemeClr val="accent1"/>
+          </a:fillRef>
+          <a:effectRef idx="0">
+            <a:schemeClr val="accent1"/>
+          </a:effectRef>
+          <a:fontRef idx="minor">
+            <a:schemeClr val="lt1"/>
+          </a:fontRef>
+        </p:style>
+        <p:txBody>
+          <a:bodyPr rtlCol="0" anchor="ctr"/>
+          <a:lstStyle/>
+          <a:p>
+            <a:pPr algn="ctr"/>
+            <a:endParaRPr lang="ko-KR" altLang="en-US"/>
+          </a:p>
+        </p:txBody>
+      </p:sp>
+      <p:sp>
+        <p:nvSpPr>
+          <p:cNvPr id="71" name="직사각형 70"/>
+          <p:cNvSpPr/>
+          <p:nvPr/>
+        </p:nvSpPr>
+        <p:spPr>
+          <a:xfrm>
+            <a:off x="6355154" y="2658594"/>
+            <a:ext cx="1132685" cy="268268"/>
+          </a:xfrm>
+          <a:prstGeom prst="rect">
+            <a:avLst/>
+          </a:prstGeom>
+          <a:noFill/>
+          <a:ln>
+            <a:noFill/>
+          </a:ln>
+        </p:spPr>
+        <p:style>
+          <a:lnRef idx="2">
+            <a:schemeClr val="accent1">
+              <a:shade val="50000"/>
+            </a:schemeClr>
+          </a:lnRef>
+          <a:fillRef idx="1">
+            <a:schemeClr val="accent1"/>
+          </a:fillRef>
+          <a:effectRef idx="0">
+            <a:schemeClr val="accent1"/>
+          </a:effectRef>
+          <a:fontRef idx="minor">
+            <a:schemeClr val="lt1"/>
+          </a:fontRef>
+        </p:style>
+        <p:txBody>
+          <a:bodyPr rtlCol="0" anchor="ctr"/>
+          <a:lstStyle/>
+          <a:p>
+            <a:pPr algn="ctr"/>
+            <a:r>
+              <a:rPr lang="en-US" altLang="ko-KR" sz="1400" dirty="0" smtClean="0">
+                <a:solidFill>
+                  <a:schemeClr val="tx1"/>
+                </a:solidFill>
+                <a:latin typeface="나눔스퀘어 ExtraBold" pitchFamily="50" charset="-127"/>
+                <a:ea typeface="나눔스퀘어 ExtraBold" pitchFamily="50" charset="-127"/>
+              </a:rPr>
+              <a:t>(</a:t>
+            </a:r>
+            <a:r>
+              <a:rPr lang="en-US" altLang="ko-KR" sz="1400" dirty="0" smtClean="0">
+                <a:solidFill>
+                  <a:srgbClr val="FF0000"/>
+                </a:solidFill>
+                <a:latin typeface="나눔스퀘어 ExtraBold" pitchFamily="50" charset="-127"/>
+                <a:ea typeface="나눔스퀘어 ExtraBold" pitchFamily="50" charset="-127"/>
+              </a:rPr>
+              <a:t>5</a:t>
+            </a:r>
+            <a:r>
+              <a:rPr lang="en-US" altLang="ko-KR" sz="1400" dirty="0" smtClean="0">
+                <a:solidFill>
+                  <a:schemeClr val="tx1"/>
+                </a:solidFill>
+                <a:latin typeface="나눔스퀘어 ExtraBold" pitchFamily="50" charset="-127"/>
+                <a:ea typeface="나눔스퀘어 ExtraBold" pitchFamily="50" charset="-127"/>
+              </a:rPr>
+              <a:t> + </a:t>
+            </a:r>
+            <a:r>
+              <a:rPr lang="en-US" altLang="ko-KR" sz="1400" dirty="0" smtClean="0">
+                <a:solidFill>
+                  <a:srgbClr val="0070C0"/>
+                </a:solidFill>
+                <a:latin typeface="나눔스퀘어 ExtraBold" pitchFamily="50" charset="-127"/>
+                <a:ea typeface="나눔스퀘어 ExtraBold" pitchFamily="50" charset="-127"/>
+              </a:rPr>
+              <a:t>8</a:t>
+            </a:r>
+            <a:r>
+              <a:rPr lang="en-US" altLang="ko-KR" sz="1400" dirty="0" smtClean="0">
+                <a:solidFill>
+                  <a:schemeClr val="tx1"/>
+                </a:solidFill>
+                <a:latin typeface="나눔스퀘어 ExtraBold" pitchFamily="50" charset="-127"/>
+                <a:ea typeface="나눔스퀘어 ExtraBold" pitchFamily="50" charset="-127"/>
+              </a:rPr>
+              <a:t>) / 2</a:t>
+            </a:r>
+            <a:endParaRPr lang="ko-KR" altLang="en-US" sz="1400" dirty="0">
+              <a:solidFill>
+                <a:schemeClr val="tx1"/>
+              </a:solidFill>
+              <a:latin typeface="나눔스퀘어 ExtraBold" pitchFamily="50" charset="-127"/>
+              <a:ea typeface="나눔스퀘어 ExtraBold" pitchFamily="50" charset="-127"/>
+            </a:endParaRPr>
+          </a:p>
+        </p:txBody>
+      </p:sp>
+    </p:spTree>
+    <p:extLst>
+      <p:ext uri="{BB962C8B-B14F-4D97-AF65-F5344CB8AC3E}">
+        <p14:creationId xmlns:p14="http://schemas.microsoft.com/office/powerpoint/2010/main" val="3438416975"/>
+      </p:ext>
+    </p:extLst>
+  </p:cSld>
+  <p:clrMapOvr>
+    <a:masterClrMapping/>
+  </p:clrMapOvr>
+</p:sld>
+</file>
+
+<file path=ppt/slides/slide8.xml><?xml version="1.0" encoding="utf-8"?>
+<p:sld xmlns:a="http://schemas.openxmlformats.org/drawingml/2006/main" xmlns:r="http://schemas.openxmlformats.org/officeDocument/2006/relationships" xmlns:p="http://schemas.openxmlformats.org/presentationml/2006/main">
+  <p:cSld>
+    <p:spTree>
+      <p:nvGrpSpPr>
+        <p:cNvPr id="1" name=""/>
+        <p:cNvGrpSpPr/>
+        <p:nvPr/>
+      </p:nvGrpSpPr>
+      <p:grpSpPr>
+        <a:xfrm>
+          <a:off x="0" y="0"/>
+          <a:ext cx="0" cy="0"/>
+          <a:chOff x="0" y="0"/>
+          <a:chExt cx="0" cy="0"/>
+        </a:xfrm>
+      </p:grpSpPr>
+      <p:sp>
+        <p:nvSpPr>
+          <p:cNvPr id="7" name="직사각형 6"/>
+          <p:cNvSpPr/>
+          <p:nvPr/>
+        </p:nvSpPr>
+        <p:spPr>
+          <a:xfrm>
+            <a:off x="1892837" y="3818166"/>
+            <a:ext cx="773640" cy="475253"/>
+          </a:xfrm>
+          <a:prstGeom prst="rect">
+            <a:avLst/>
+          </a:prstGeom>
+          <a:solidFill>
+            <a:schemeClr val="bg1">
+              <a:lumMod val="95000"/>
+            </a:schemeClr>
+          </a:solidFill>
+          <a:ln>
+            <a:solidFill>
+              <a:schemeClr val="tx1"/>
+            </a:solidFill>
+          </a:ln>
+        </p:spPr>
+        <p:style>
+          <a:lnRef idx="2">
+            <a:schemeClr val="accent1">
+              <a:shade val="50000"/>
+            </a:schemeClr>
+          </a:lnRef>
+          <a:fillRef idx="1">
+            <a:schemeClr val="accent1"/>
+          </a:fillRef>
+          <a:effectRef idx="0">
+            <a:schemeClr val="accent1"/>
+          </a:effectRef>
+          <a:fontRef idx="minor">
+            <a:schemeClr val="lt1"/>
+          </a:fontRef>
+        </p:style>
+        <p:txBody>
+          <a:bodyPr rtlCol="0" anchor="ctr"/>
+          <a:lstStyle/>
+          <a:p>
+            <a:pPr algn="ctr"/>
+            <a:r>
+              <a:rPr lang="en-US" altLang="ko-KR" dirty="0" smtClean="0">
+                <a:solidFill>
+                  <a:schemeClr val="tx1"/>
+                </a:solidFill>
+                <a:latin typeface="나눔스퀘어 ExtraBold" pitchFamily="50" charset="-127"/>
+                <a:ea typeface="나눔스퀘어 ExtraBold" pitchFamily="50" charset="-127"/>
+              </a:rPr>
+              <a:t>8</a:t>
+            </a:r>
+            <a:endParaRPr lang="ko-KR" altLang="en-US" dirty="0">
+              <a:solidFill>
+                <a:schemeClr val="tx1"/>
+              </a:solidFill>
+              <a:latin typeface="나눔스퀘어 ExtraBold" pitchFamily="50" charset="-127"/>
+              <a:ea typeface="나눔스퀘어 ExtraBold" pitchFamily="50" charset="-127"/>
+            </a:endParaRPr>
+          </a:p>
+        </p:txBody>
+      </p:sp>
+      <p:sp>
+        <p:nvSpPr>
+          <p:cNvPr id="32" name="직사각형 31"/>
+          <p:cNvSpPr/>
+          <p:nvPr/>
+        </p:nvSpPr>
+        <p:spPr>
+          <a:xfrm>
+            <a:off x="2666477" y="3818166"/>
+            <a:ext cx="773640" cy="475253"/>
+          </a:xfrm>
+          <a:prstGeom prst="rect">
+            <a:avLst/>
+          </a:prstGeom>
+          <a:solidFill>
+            <a:schemeClr val="bg1">
+              <a:lumMod val="95000"/>
+            </a:schemeClr>
+          </a:solidFill>
+          <a:ln>
+            <a:solidFill>
+              <a:schemeClr val="tx1"/>
+            </a:solidFill>
+          </a:ln>
+        </p:spPr>
+        <p:style>
+          <a:lnRef idx="2">
+            <a:schemeClr val="accent1">
+              <a:shade val="50000"/>
+            </a:schemeClr>
+          </a:lnRef>
+          <a:fillRef idx="1">
+            <a:schemeClr val="accent1"/>
+          </a:fillRef>
+          <a:effectRef idx="0">
+            <a:schemeClr val="accent1"/>
+          </a:effectRef>
+          <a:fontRef idx="minor">
+            <a:schemeClr val="lt1"/>
+          </a:fontRef>
+        </p:style>
+        <p:txBody>
+          <a:bodyPr rtlCol="0" anchor="ctr"/>
+          <a:lstStyle/>
+          <a:p>
+            <a:pPr algn="ctr"/>
+            <a:r>
+              <a:rPr lang="en-US" altLang="ko-KR" dirty="0" smtClean="0">
+                <a:solidFill>
+                  <a:schemeClr val="tx1"/>
+                </a:solidFill>
+                <a:latin typeface="나눔스퀘어 ExtraBold" pitchFamily="50" charset="-127"/>
+                <a:ea typeface="나눔스퀘어 ExtraBold" pitchFamily="50" charset="-127"/>
+              </a:rPr>
+              <a:t>16</a:t>
+            </a:r>
+            <a:endParaRPr lang="ko-KR" altLang="en-US" dirty="0">
+              <a:solidFill>
+                <a:schemeClr val="tx1"/>
+              </a:solidFill>
+              <a:latin typeface="나눔스퀘어 ExtraBold" pitchFamily="50" charset="-127"/>
+              <a:ea typeface="나눔스퀘어 ExtraBold" pitchFamily="50" charset="-127"/>
+            </a:endParaRPr>
+          </a:p>
+        </p:txBody>
+      </p:sp>
+      <p:sp>
+        <p:nvSpPr>
+          <p:cNvPr id="34" name="직사각형 33"/>
+          <p:cNvSpPr/>
+          <p:nvPr/>
+        </p:nvSpPr>
+        <p:spPr>
+          <a:xfrm>
+            <a:off x="3440117" y="3818166"/>
+            <a:ext cx="773640" cy="475253"/>
+          </a:xfrm>
+          <a:prstGeom prst="rect">
+            <a:avLst/>
+          </a:prstGeom>
+          <a:solidFill>
+            <a:schemeClr val="bg1">
+              <a:lumMod val="95000"/>
+            </a:schemeClr>
+          </a:solidFill>
+          <a:ln>
+            <a:solidFill>
+              <a:schemeClr val="tx1"/>
+            </a:solidFill>
+          </a:ln>
+        </p:spPr>
+        <p:style>
+          <a:lnRef idx="2">
+            <a:schemeClr val="accent1">
+              <a:shade val="50000"/>
+            </a:schemeClr>
+          </a:lnRef>
+          <a:fillRef idx="1">
+            <a:schemeClr val="accent1"/>
+          </a:fillRef>
+          <a:effectRef idx="0">
+            <a:schemeClr val="accent1"/>
+          </a:effectRef>
+          <a:fontRef idx="minor">
+            <a:schemeClr val="lt1"/>
+          </a:fontRef>
+        </p:style>
+        <p:txBody>
+          <a:bodyPr rtlCol="0" anchor="ctr"/>
+          <a:lstStyle/>
+          <a:p>
+            <a:pPr algn="ctr"/>
+            <a:r>
+              <a:rPr lang="en-US" altLang="ko-KR" dirty="0" smtClean="0">
+                <a:solidFill>
+                  <a:schemeClr val="tx1"/>
+                </a:solidFill>
+                <a:latin typeface="나눔스퀘어 ExtraBold" pitchFamily="50" charset="-127"/>
+                <a:ea typeface="나눔스퀘어 ExtraBold" pitchFamily="50" charset="-127"/>
+              </a:rPr>
+              <a:t>23</a:t>
+            </a:r>
+            <a:endParaRPr lang="ko-KR" altLang="en-US" dirty="0">
+              <a:solidFill>
+                <a:schemeClr val="tx1"/>
+              </a:solidFill>
+              <a:latin typeface="나눔스퀘어 ExtraBold" pitchFamily="50" charset="-127"/>
+              <a:ea typeface="나눔스퀘어 ExtraBold" pitchFamily="50" charset="-127"/>
+            </a:endParaRPr>
+          </a:p>
+        </p:txBody>
+      </p:sp>
+      <p:sp>
+        <p:nvSpPr>
+          <p:cNvPr id="35" name="직사각형 34"/>
+          <p:cNvSpPr/>
+          <p:nvPr/>
+        </p:nvSpPr>
+        <p:spPr>
+          <a:xfrm>
+            <a:off x="4213757" y="3818166"/>
+            <a:ext cx="773640" cy="475253"/>
+          </a:xfrm>
+          <a:prstGeom prst="rect">
+            <a:avLst/>
+          </a:prstGeom>
+          <a:solidFill>
+            <a:schemeClr val="bg1">
+              <a:lumMod val="95000"/>
+            </a:schemeClr>
+          </a:solidFill>
+          <a:ln>
+            <a:solidFill>
+              <a:schemeClr val="tx1"/>
+            </a:solidFill>
+          </a:ln>
+        </p:spPr>
+        <p:style>
+          <a:lnRef idx="2">
+            <a:schemeClr val="accent1">
+              <a:shade val="50000"/>
+            </a:schemeClr>
+          </a:lnRef>
+          <a:fillRef idx="1">
+            <a:schemeClr val="accent1"/>
+          </a:fillRef>
+          <a:effectRef idx="0">
+            <a:schemeClr val="accent1"/>
+          </a:effectRef>
+          <a:fontRef idx="minor">
+            <a:schemeClr val="lt1"/>
+          </a:fontRef>
+        </p:style>
+        <p:txBody>
+          <a:bodyPr rtlCol="0" anchor="ctr"/>
+          <a:lstStyle/>
+          <a:p>
+            <a:pPr algn="ctr"/>
+            <a:r>
+              <a:rPr lang="en-US" altLang="ko-KR" dirty="0" smtClean="0">
+                <a:solidFill>
+                  <a:schemeClr val="tx1"/>
+                </a:solidFill>
+                <a:latin typeface="나눔스퀘어 ExtraBold" pitchFamily="50" charset="-127"/>
+                <a:ea typeface="나눔스퀘어 ExtraBold" pitchFamily="50" charset="-127"/>
+              </a:rPr>
+              <a:t>29</a:t>
+            </a:r>
+            <a:endParaRPr lang="ko-KR" altLang="en-US" dirty="0">
+              <a:solidFill>
+                <a:schemeClr val="tx1"/>
+              </a:solidFill>
+              <a:latin typeface="나눔스퀘어 ExtraBold" pitchFamily="50" charset="-127"/>
+              <a:ea typeface="나눔스퀘어 ExtraBold" pitchFamily="50" charset="-127"/>
+            </a:endParaRPr>
+          </a:p>
+        </p:txBody>
+      </p:sp>
+      <p:sp>
+        <p:nvSpPr>
+          <p:cNvPr id="50" name="직사각형 49"/>
+          <p:cNvSpPr/>
+          <p:nvPr/>
+        </p:nvSpPr>
+        <p:spPr>
+          <a:xfrm>
+            <a:off x="4987397" y="3818166"/>
+            <a:ext cx="773640" cy="475253"/>
+          </a:xfrm>
+          <a:prstGeom prst="rect">
+            <a:avLst/>
+          </a:prstGeom>
+          <a:solidFill>
+            <a:schemeClr val="bg1">
+              <a:lumMod val="95000"/>
+            </a:schemeClr>
+          </a:solidFill>
+          <a:ln>
+            <a:solidFill>
+              <a:schemeClr val="tx1"/>
+            </a:solidFill>
+          </a:ln>
+        </p:spPr>
+        <p:style>
+          <a:lnRef idx="2">
+            <a:schemeClr val="accent1">
+              <a:shade val="50000"/>
+            </a:schemeClr>
+          </a:lnRef>
+          <a:fillRef idx="1">
+            <a:schemeClr val="accent1"/>
+          </a:fillRef>
+          <a:effectRef idx="0">
+            <a:schemeClr val="accent1"/>
+          </a:effectRef>
+          <a:fontRef idx="minor">
+            <a:schemeClr val="lt1"/>
+          </a:fontRef>
+        </p:style>
+        <p:txBody>
+          <a:bodyPr rtlCol="0" anchor="ctr"/>
+          <a:lstStyle/>
+          <a:p>
+            <a:pPr algn="ctr"/>
+            <a:r>
+              <a:rPr lang="en-US" altLang="ko-KR" dirty="0" smtClean="0">
+                <a:solidFill>
+                  <a:schemeClr val="tx1"/>
+                </a:solidFill>
+                <a:latin typeface="나눔스퀘어 ExtraBold" pitchFamily="50" charset="-127"/>
+                <a:ea typeface="나눔스퀘어 ExtraBold" pitchFamily="50" charset="-127"/>
+              </a:rPr>
+              <a:t>33</a:t>
+            </a:r>
+            <a:endParaRPr lang="ko-KR" altLang="en-US" dirty="0">
+              <a:solidFill>
+                <a:schemeClr val="tx1"/>
+              </a:solidFill>
+              <a:latin typeface="나눔스퀘어 ExtraBold" pitchFamily="50" charset="-127"/>
+              <a:ea typeface="나눔스퀘어 ExtraBold" pitchFamily="50" charset="-127"/>
+            </a:endParaRPr>
+          </a:p>
+        </p:txBody>
+      </p:sp>
+      <p:sp>
+        <p:nvSpPr>
+          <p:cNvPr id="52" name="직사각형 51"/>
+          <p:cNvSpPr/>
+          <p:nvPr/>
+        </p:nvSpPr>
+        <p:spPr>
+          <a:xfrm>
+            <a:off x="5761037" y="3818166"/>
+            <a:ext cx="773640" cy="475253"/>
+          </a:xfrm>
+          <a:prstGeom prst="rect">
+            <a:avLst/>
+          </a:prstGeom>
+          <a:solidFill>
+            <a:schemeClr val="bg1">
+              <a:lumMod val="95000"/>
+            </a:schemeClr>
+          </a:solidFill>
+          <a:ln>
+            <a:solidFill>
+              <a:schemeClr val="tx1"/>
+            </a:solidFill>
+          </a:ln>
+        </p:spPr>
+        <p:style>
+          <a:lnRef idx="2">
+            <a:schemeClr val="accent1">
+              <a:shade val="50000"/>
+            </a:schemeClr>
+          </a:lnRef>
+          <a:fillRef idx="1">
+            <a:schemeClr val="accent1"/>
+          </a:fillRef>
+          <a:effectRef idx="0">
+            <a:schemeClr val="accent1"/>
+          </a:effectRef>
+          <a:fontRef idx="minor">
+            <a:schemeClr val="lt1"/>
+          </a:fontRef>
+        </p:style>
+        <p:txBody>
+          <a:bodyPr rtlCol="0" anchor="ctr"/>
+          <a:lstStyle/>
+          <a:p>
+            <a:pPr algn="ctr"/>
+            <a:r>
+              <a:rPr lang="en-US" altLang="ko-KR" dirty="0" smtClean="0">
+                <a:solidFill>
+                  <a:schemeClr val="tx1"/>
+                </a:solidFill>
+                <a:latin typeface="나눔스퀘어 ExtraBold" pitchFamily="50" charset="-127"/>
+                <a:ea typeface="나눔스퀘어 ExtraBold" pitchFamily="50" charset="-127"/>
+              </a:rPr>
+              <a:t>48</a:t>
+            </a:r>
+            <a:endParaRPr lang="ko-KR" altLang="en-US" dirty="0">
+              <a:solidFill>
+                <a:schemeClr val="tx1"/>
+              </a:solidFill>
+              <a:latin typeface="나눔스퀘어 ExtraBold" pitchFamily="50" charset="-127"/>
+              <a:ea typeface="나눔스퀘어 ExtraBold" pitchFamily="50" charset="-127"/>
+            </a:endParaRPr>
+          </a:p>
+        </p:txBody>
+      </p:sp>
+      <p:sp>
+        <p:nvSpPr>
+          <p:cNvPr id="58" name="직사각형 57"/>
+          <p:cNvSpPr/>
+          <p:nvPr/>
+        </p:nvSpPr>
+        <p:spPr>
+          <a:xfrm>
+            <a:off x="6534677" y="3818166"/>
+            <a:ext cx="773640" cy="475253"/>
+          </a:xfrm>
+          <a:prstGeom prst="rect">
+            <a:avLst/>
+          </a:prstGeom>
+          <a:solidFill>
+            <a:schemeClr val="bg1">
+              <a:lumMod val="95000"/>
+            </a:schemeClr>
+          </a:solidFill>
+          <a:ln>
+            <a:solidFill>
+              <a:schemeClr val="tx1"/>
+            </a:solidFill>
+          </a:ln>
+        </p:spPr>
+        <p:style>
+          <a:lnRef idx="2">
+            <a:schemeClr val="accent1">
+              <a:shade val="50000"/>
+            </a:schemeClr>
+          </a:lnRef>
+          <a:fillRef idx="1">
+            <a:schemeClr val="accent1"/>
+          </a:fillRef>
+          <a:effectRef idx="0">
+            <a:schemeClr val="accent1"/>
+          </a:effectRef>
+          <a:fontRef idx="minor">
+            <a:schemeClr val="lt1"/>
+          </a:fontRef>
+        </p:style>
+        <p:txBody>
+          <a:bodyPr rtlCol="0" anchor="ctr"/>
+          <a:lstStyle/>
+          <a:p>
+            <a:pPr algn="ctr"/>
+            <a:r>
+              <a:rPr lang="en-US" altLang="ko-KR" dirty="0" smtClean="0">
+                <a:solidFill>
+                  <a:schemeClr val="tx1"/>
+                </a:solidFill>
+                <a:latin typeface="나눔스퀘어 ExtraBold" pitchFamily="50" charset="-127"/>
+                <a:ea typeface="나눔스퀘어 ExtraBold" pitchFamily="50" charset="-127"/>
+              </a:rPr>
+              <a:t>61</a:t>
+            </a:r>
+            <a:endParaRPr lang="ko-KR" altLang="en-US" dirty="0">
+              <a:solidFill>
+                <a:schemeClr val="tx1"/>
+              </a:solidFill>
+              <a:latin typeface="나눔스퀘어 ExtraBold" pitchFamily="50" charset="-127"/>
+              <a:ea typeface="나눔스퀘어 ExtraBold" pitchFamily="50" charset="-127"/>
+            </a:endParaRPr>
+          </a:p>
+        </p:txBody>
+      </p:sp>
+      <p:sp>
+        <p:nvSpPr>
+          <p:cNvPr id="59" name="직사각형 58"/>
+          <p:cNvSpPr/>
+          <p:nvPr/>
+        </p:nvSpPr>
+        <p:spPr>
+          <a:xfrm>
+            <a:off x="7308317" y="3818166"/>
+            <a:ext cx="773640" cy="475253"/>
+          </a:xfrm>
+          <a:prstGeom prst="rect">
+            <a:avLst/>
+          </a:prstGeom>
+          <a:solidFill>
+            <a:schemeClr val="bg1">
+              <a:lumMod val="95000"/>
+            </a:schemeClr>
+          </a:solidFill>
+          <a:ln>
+            <a:solidFill>
+              <a:schemeClr val="tx1"/>
+            </a:solidFill>
+          </a:ln>
+        </p:spPr>
+        <p:style>
+          <a:lnRef idx="2">
+            <a:schemeClr val="accent1">
+              <a:shade val="50000"/>
+            </a:schemeClr>
+          </a:lnRef>
+          <a:fillRef idx="1">
+            <a:schemeClr val="accent1"/>
+          </a:fillRef>
+          <a:effectRef idx="0">
+            <a:schemeClr val="accent1"/>
+          </a:effectRef>
+          <a:fontRef idx="minor">
+            <a:schemeClr val="lt1"/>
+          </a:fontRef>
+        </p:style>
+        <p:txBody>
+          <a:bodyPr rtlCol="0" anchor="ctr"/>
+          <a:lstStyle/>
+          <a:p>
+            <a:pPr algn="ctr"/>
+            <a:r>
+              <a:rPr lang="en-US" altLang="ko-KR" dirty="0" smtClean="0">
+                <a:solidFill>
+                  <a:schemeClr val="tx1"/>
+                </a:solidFill>
+                <a:latin typeface="나눔스퀘어 ExtraBold" pitchFamily="50" charset="-127"/>
+                <a:ea typeface="나눔스퀘어 ExtraBold" pitchFamily="50" charset="-127"/>
+              </a:rPr>
+              <a:t>66</a:t>
+            </a:r>
+            <a:endParaRPr lang="ko-KR" altLang="en-US" dirty="0">
+              <a:solidFill>
+                <a:schemeClr val="tx1"/>
+              </a:solidFill>
+              <a:latin typeface="나눔스퀘어 ExtraBold" pitchFamily="50" charset="-127"/>
+              <a:ea typeface="나눔스퀘어 ExtraBold" pitchFamily="50" charset="-127"/>
+            </a:endParaRPr>
+          </a:p>
+        </p:txBody>
+      </p:sp>
+      <p:sp>
+        <p:nvSpPr>
+          <p:cNvPr id="60" name="직사각형 59"/>
+          <p:cNvSpPr/>
+          <p:nvPr/>
+        </p:nvSpPr>
+        <p:spPr>
+          <a:xfrm>
+            <a:off x="8081957" y="3818166"/>
+            <a:ext cx="773640" cy="475253"/>
+          </a:xfrm>
+          <a:prstGeom prst="rect">
+            <a:avLst/>
+          </a:prstGeom>
+          <a:solidFill>
+            <a:schemeClr val="bg1">
+              <a:lumMod val="95000"/>
+            </a:schemeClr>
+          </a:solidFill>
+          <a:ln>
+            <a:solidFill>
+              <a:schemeClr val="tx1"/>
+            </a:solidFill>
+          </a:ln>
+        </p:spPr>
+        <p:style>
+          <a:lnRef idx="2">
+            <a:schemeClr val="accent1">
+              <a:shade val="50000"/>
+            </a:schemeClr>
+          </a:lnRef>
+          <a:fillRef idx="1">
+            <a:schemeClr val="accent1"/>
+          </a:fillRef>
+          <a:effectRef idx="0">
+            <a:schemeClr val="accent1"/>
+          </a:effectRef>
+          <a:fontRef idx="minor">
+            <a:schemeClr val="lt1"/>
+          </a:fontRef>
+        </p:style>
+        <p:txBody>
+          <a:bodyPr rtlCol="0" anchor="ctr"/>
+          <a:lstStyle/>
+          <a:p>
+            <a:pPr algn="ctr"/>
+            <a:r>
+              <a:rPr lang="en-US" altLang="ko-KR" dirty="0" smtClean="0">
+                <a:solidFill>
+                  <a:schemeClr val="tx1"/>
+                </a:solidFill>
+                <a:latin typeface="나눔스퀘어 ExtraBold" pitchFamily="50" charset="-127"/>
+                <a:ea typeface="나눔스퀘어 ExtraBold" pitchFamily="50" charset="-127"/>
+              </a:rPr>
+              <a:t>98</a:t>
+            </a:r>
+            <a:endParaRPr lang="ko-KR" altLang="en-US" dirty="0">
+              <a:solidFill>
+                <a:schemeClr val="tx1"/>
+              </a:solidFill>
+              <a:latin typeface="나눔스퀘어 ExtraBold" pitchFamily="50" charset="-127"/>
+              <a:ea typeface="나눔스퀘어 ExtraBold" pitchFamily="50" charset="-127"/>
+            </a:endParaRPr>
+          </a:p>
+        </p:txBody>
+      </p:sp>
+      <p:sp>
+        <p:nvSpPr>
+          <p:cNvPr id="4" name="TextBox 3"/>
+          <p:cNvSpPr txBox="1"/>
+          <p:nvPr/>
+        </p:nvSpPr>
+        <p:spPr>
+          <a:xfrm>
+            <a:off x="1892837" y="1799927"/>
+            <a:ext cx="7180568" cy="553998"/>
+          </a:xfrm>
+          <a:prstGeom prst="rect">
+            <a:avLst/>
+          </a:prstGeom>
+          <a:noFill/>
+        </p:spPr>
+        <p:txBody>
+          <a:bodyPr wrap="square" rtlCol="0">
+            <a:spAutoFit/>
+          </a:bodyPr>
+          <a:lstStyle/>
+          <a:p>
+            <a:pPr>
+              <a:lnSpc>
+                <a:spcPct val="150000"/>
+              </a:lnSpc>
+            </a:pPr>
+            <a:r>
+              <a:rPr lang="ko-KR" altLang="en-US" sz="2000" dirty="0" err="1" smtClean="0">
+                <a:latin typeface="나눔스퀘어 ExtraBold" pitchFamily="50" charset="-127"/>
+                <a:ea typeface="나눔스퀘어 ExtraBold" pitchFamily="50" charset="-127"/>
+              </a:rPr>
+              <a:t>중간값인</a:t>
+            </a:r>
+            <a:r>
+              <a:rPr lang="ko-KR" altLang="en-US" sz="2000" dirty="0" smtClean="0">
+                <a:latin typeface="나눔스퀘어 ExtraBold" pitchFamily="50" charset="-127"/>
+                <a:ea typeface="나눔스퀘어 ExtraBold" pitchFamily="50" charset="-127"/>
+              </a:rPr>
+              <a:t> </a:t>
+            </a:r>
+            <a:r>
+              <a:rPr lang="en-US" altLang="ko-KR" sz="2000" dirty="0" smtClean="0">
+                <a:latin typeface="나눔스퀘어 ExtraBold" pitchFamily="50" charset="-127"/>
+                <a:ea typeface="나눔스퀘어 ExtraBold" pitchFamily="50" charset="-127"/>
+              </a:rPr>
+              <a:t>61 </a:t>
+            </a:r>
+            <a:r>
+              <a:rPr lang="ko-KR" altLang="en-US" sz="2000" dirty="0" smtClean="0">
+                <a:latin typeface="나눔스퀘어 ExtraBold" pitchFamily="50" charset="-127"/>
+                <a:ea typeface="나눔스퀘어 ExtraBold" pitchFamily="50" charset="-127"/>
+              </a:rPr>
+              <a:t>이 </a:t>
+            </a:r>
+            <a:r>
+              <a:rPr lang="en-US" altLang="ko-KR" sz="2000" dirty="0" smtClean="0">
+                <a:latin typeface="나눔스퀘어 ExtraBold" pitchFamily="50" charset="-127"/>
+                <a:ea typeface="나눔스퀘어 ExtraBold" pitchFamily="50" charset="-127"/>
+              </a:rPr>
+              <a:t>48 </a:t>
+            </a:r>
+            <a:r>
+              <a:rPr lang="ko-KR" altLang="en-US" sz="2000" dirty="0" smtClean="0">
+                <a:latin typeface="나눔스퀘어 ExtraBold" pitchFamily="50" charset="-127"/>
+                <a:ea typeface="나눔스퀘어 ExtraBold" pitchFamily="50" charset="-127"/>
+              </a:rPr>
+              <a:t>보다 크므로 </a:t>
+            </a:r>
+            <a:r>
+              <a:rPr lang="en-US" altLang="ko-KR" sz="2000" dirty="0" smtClean="0">
+                <a:solidFill>
+                  <a:srgbClr val="0070C0"/>
+                </a:solidFill>
+                <a:latin typeface="나눔스퀘어 ExtraBold" pitchFamily="50" charset="-127"/>
+                <a:ea typeface="나눔스퀘어 ExtraBold" pitchFamily="50" charset="-127"/>
+              </a:rPr>
+              <a:t>R</a:t>
+            </a:r>
+            <a:r>
+              <a:rPr lang="ko-KR" altLang="en-US" sz="2000" dirty="0" smtClean="0">
+                <a:latin typeface="나눔스퀘어 ExtraBold" pitchFamily="50" charset="-127"/>
+                <a:ea typeface="나눔스퀘어 ExtraBold" pitchFamily="50" charset="-127"/>
+              </a:rPr>
+              <a:t> 을 </a:t>
+            </a:r>
+            <a:r>
+              <a:rPr lang="en-US" altLang="ko-KR" sz="2000" dirty="0" smtClean="0">
+                <a:solidFill>
+                  <a:srgbClr val="0070C0"/>
+                </a:solidFill>
+                <a:latin typeface="나눔스퀘어 ExtraBold" pitchFamily="50" charset="-127"/>
+                <a:ea typeface="나눔스퀘어 ExtraBold" pitchFamily="50" charset="-127"/>
+              </a:rPr>
+              <a:t>5</a:t>
+            </a:r>
+            <a:r>
+              <a:rPr lang="ko-KR" altLang="en-US" sz="2000" dirty="0" smtClean="0">
+                <a:latin typeface="나눔스퀘어 ExtraBold" pitchFamily="50" charset="-127"/>
+                <a:ea typeface="나눔스퀘어 ExtraBold" pitchFamily="50" charset="-127"/>
+              </a:rPr>
+              <a:t>번 위치로 수정</a:t>
+            </a:r>
+            <a:endParaRPr lang="en-US" altLang="ko-KR" sz="2000" dirty="0">
+              <a:latin typeface="나눔스퀘어 ExtraBold" pitchFamily="50" charset="-127"/>
+              <a:ea typeface="나눔스퀘어 ExtraBold" pitchFamily="50" charset="-127"/>
+            </a:endParaRPr>
+          </a:p>
+        </p:txBody>
+      </p:sp>
+      <p:sp>
+        <p:nvSpPr>
+          <p:cNvPr id="61" name="직사각형 60"/>
+          <p:cNvSpPr/>
+          <p:nvPr/>
+        </p:nvSpPr>
+        <p:spPr>
+          <a:xfrm>
+            <a:off x="1892837" y="3519881"/>
+            <a:ext cx="773640" cy="268268"/>
+          </a:xfrm>
+          <a:prstGeom prst="rect">
+            <a:avLst/>
+          </a:prstGeom>
+          <a:noFill/>
+          <a:ln>
+            <a:noFill/>
+          </a:ln>
+        </p:spPr>
+        <p:style>
+          <a:lnRef idx="2">
+            <a:schemeClr val="accent1">
+              <a:shade val="50000"/>
+            </a:schemeClr>
+          </a:lnRef>
+          <a:fillRef idx="1">
+            <a:schemeClr val="accent1"/>
+          </a:fillRef>
+          <a:effectRef idx="0">
+            <a:schemeClr val="accent1"/>
+          </a:effectRef>
+          <a:fontRef idx="minor">
+            <a:schemeClr val="lt1"/>
+          </a:fontRef>
+        </p:style>
+        <p:txBody>
+          <a:bodyPr rtlCol="0" anchor="ctr"/>
+          <a:lstStyle/>
+          <a:p>
+            <a:pPr algn="ctr"/>
+            <a:r>
+              <a:rPr lang="en-US" altLang="ko-KR" sz="1400" dirty="0" smtClean="0">
+                <a:solidFill>
+                  <a:schemeClr val="tx1"/>
+                </a:solidFill>
+                <a:latin typeface="나눔스퀘어 ExtraBold" pitchFamily="50" charset="-127"/>
+                <a:ea typeface="나눔스퀘어 ExtraBold" pitchFamily="50" charset="-127"/>
+              </a:rPr>
+              <a:t>0</a:t>
+            </a:r>
+            <a:endParaRPr lang="ko-KR" altLang="en-US" sz="1400" dirty="0">
+              <a:solidFill>
+                <a:schemeClr val="tx1"/>
+              </a:solidFill>
+              <a:latin typeface="나눔스퀘어 ExtraBold" pitchFamily="50" charset="-127"/>
+              <a:ea typeface="나눔스퀘어 ExtraBold" pitchFamily="50" charset="-127"/>
+            </a:endParaRPr>
+          </a:p>
+        </p:txBody>
+      </p:sp>
+      <p:sp>
+        <p:nvSpPr>
+          <p:cNvPr id="62" name="직사각형 61"/>
+          <p:cNvSpPr/>
+          <p:nvPr/>
+        </p:nvSpPr>
+        <p:spPr>
+          <a:xfrm>
+            <a:off x="2666477" y="3519881"/>
+            <a:ext cx="773640" cy="268268"/>
+          </a:xfrm>
+          <a:prstGeom prst="rect">
+            <a:avLst/>
+          </a:prstGeom>
+          <a:noFill/>
+          <a:ln>
+            <a:noFill/>
+          </a:ln>
+        </p:spPr>
+        <p:style>
+          <a:lnRef idx="2">
+            <a:schemeClr val="accent1">
+              <a:shade val="50000"/>
+            </a:schemeClr>
+          </a:lnRef>
+          <a:fillRef idx="1">
+            <a:schemeClr val="accent1"/>
+          </a:fillRef>
+          <a:effectRef idx="0">
+            <a:schemeClr val="accent1"/>
+          </a:effectRef>
+          <a:fontRef idx="minor">
+            <a:schemeClr val="lt1"/>
+          </a:fontRef>
+        </p:style>
+        <p:txBody>
+          <a:bodyPr rtlCol="0" anchor="ctr"/>
+          <a:lstStyle/>
+          <a:p>
+            <a:pPr algn="ctr"/>
+            <a:r>
+              <a:rPr lang="en-US" altLang="ko-KR" sz="1400" dirty="0" smtClean="0">
+                <a:solidFill>
+                  <a:schemeClr val="tx1"/>
+                </a:solidFill>
+                <a:latin typeface="나눔스퀘어 ExtraBold" pitchFamily="50" charset="-127"/>
+                <a:ea typeface="나눔스퀘어 ExtraBold" pitchFamily="50" charset="-127"/>
+              </a:rPr>
+              <a:t>1</a:t>
+            </a:r>
+            <a:endParaRPr lang="ko-KR" altLang="en-US" sz="1400" dirty="0">
+              <a:solidFill>
+                <a:schemeClr val="tx1"/>
+              </a:solidFill>
+              <a:latin typeface="나눔스퀘어 ExtraBold" pitchFamily="50" charset="-127"/>
+              <a:ea typeface="나눔스퀘어 ExtraBold" pitchFamily="50" charset="-127"/>
+            </a:endParaRPr>
+          </a:p>
+        </p:txBody>
+      </p:sp>
+      <p:sp>
+        <p:nvSpPr>
+          <p:cNvPr id="63" name="직사각형 62"/>
+          <p:cNvSpPr/>
+          <p:nvPr/>
+        </p:nvSpPr>
+        <p:spPr>
+          <a:xfrm>
+            <a:off x="3440117" y="3519881"/>
+            <a:ext cx="773640" cy="268268"/>
+          </a:xfrm>
+          <a:prstGeom prst="rect">
+            <a:avLst/>
+          </a:prstGeom>
+          <a:noFill/>
+          <a:ln>
+            <a:noFill/>
+          </a:ln>
+        </p:spPr>
+        <p:style>
+          <a:lnRef idx="2">
+            <a:schemeClr val="accent1">
+              <a:shade val="50000"/>
+            </a:schemeClr>
+          </a:lnRef>
+          <a:fillRef idx="1">
+            <a:schemeClr val="accent1"/>
+          </a:fillRef>
+          <a:effectRef idx="0">
+            <a:schemeClr val="accent1"/>
+          </a:effectRef>
+          <a:fontRef idx="minor">
+            <a:schemeClr val="lt1"/>
+          </a:fontRef>
+        </p:style>
+        <p:txBody>
+          <a:bodyPr rtlCol="0" anchor="ctr"/>
+          <a:lstStyle/>
+          <a:p>
+            <a:pPr algn="ctr"/>
+            <a:r>
+              <a:rPr lang="en-US" altLang="ko-KR" sz="1400" dirty="0" smtClean="0">
+                <a:solidFill>
+                  <a:schemeClr val="tx1"/>
+                </a:solidFill>
+                <a:latin typeface="나눔스퀘어 ExtraBold" pitchFamily="50" charset="-127"/>
+                <a:ea typeface="나눔스퀘어 ExtraBold" pitchFamily="50" charset="-127"/>
+              </a:rPr>
+              <a:t>2</a:t>
+            </a:r>
+            <a:endParaRPr lang="ko-KR" altLang="en-US" sz="1400" dirty="0">
+              <a:solidFill>
+                <a:schemeClr val="tx1"/>
+              </a:solidFill>
+              <a:latin typeface="나눔스퀘어 ExtraBold" pitchFamily="50" charset="-127"/>
+              <a:ea typeface="나눔스퀘어 ExtraBold" pitchFamily="50" charset="-127"/>
+            </a:endParaRPr>
+          </a:p>
+        </p:txBody>
+      </p:sp>
+      <p:sp>
+        <p:nvSpPr>
+          <p:cNvPr id="64" name="직사각형 63"/>
+          <p:cNvSpPr/>
+          <p:nvPr/>
+        </p:nvSpPr>
+        <p:spPr>
+          <a:xfrm>
+            <a:off x="4213757" y="3519881"/>
+            <a:ext cx="773640" cy="268268"/>
+          </a:xfrm>
+          <a:prstGeom prst="rect">
+            <a:avLst/>
+          </a:prstGeom>
+          <a:noFill/>
+          <a:ln>
+            <a:noFill/>
+          </a:ln>
+        </p:spPr>
+        <p:style>
+          <a:lnRef idx="2">
+            <a:schemeClr val="accent1">
+              <a:shade val="50000"/>
+            </a:schemeClr>
+          </a:lnRef>
+          <a:fillRef idx="1">
+            <a:schemeClr val="accent1"/>
+          </a:fillRef>
+          <a:effectRef idx="0">
+            <a:schemeClr val="accent1"/>
+          </a:effectRef>
+          <a:fontRef idx="minor">
+            <a:schemeClr val="lt1"/>
+          </a:fontRef>
+        </p:style>
+        <p:txBody>
+          <a:bodyPr rtlCol="0" anchor="ctr"/>
+          <a:lstStyle/>
+          <a:p>
+            <a:pPr algn="ctr"/>
+            <a:r>
+              <a:rPr lang="en-US" altLang="ko-KR" sz="1400" dirty="0" smtClean="0">
+                <a:solidFill>
+                  <a:schemeClr val="tx1"/>
+                </a:solidFill>
+                <a:latin typeface="나눔스퀘어 ExtraBold" pitchFamily="50" charset="-127"/>
+                <a:ea typeface="나눔스퀘어 ExtraBold" pitchFamily="50" charset="-127"/>
+              </a:rPr>
+              <a:t>3</a:t>
+            </a:r>
+            <a:endParaRPr lang="ko-KR" altLang="en-US" sz="1400" dirty="0">
+              <a:solidFill>
+                <a:schemeClr val="tx1"/>
+              </a:solidFill>
+              <a:latin typeface="나눔스퀘어 ExtraBold" pitchFamily="50" charset="-127"/>
+              <a:ea typeface="나눔스퀘어 ExtraBold" pitchFamily="50" charset="-127"/>
+            </a:endParaRPr>
+          </a:p>
+        </p:txBody>
+      </p:sp>
+      <p:sp>
+        <p:nvSpPr>
+          <p:cNvPr id="65" name="직사각형 64"/>
+          <p:cNvSpPr/>
+          <p:nvPr/>
+        </p:nvSpPr>
+        <p:spPr>
+          <a:xfrm>
+            <a:off x="4987397" y="3519881"/>
+            <a:ext cx="773640" cy="268268"/>
+          </a:xfrm>
+          <a:prstGeom prst="rect">
+            <a:avLst/>
+          </a:prstGeom>
+          <a:noFill/>
+          <a:ln>
+            <a:noFill/>
+          </a:ln>
+        </p:spPr>
+        <p:style>
+          <a:lnRef idx="2">
+            <a:schemeClr val="accent1">
+              <a:shade val="50000"/>
+            </a:schemeClr>
+          </a:lnRef>
+          <a:fillRef idx="1">
+            <a:schemeClr val="accent1"/>
+          </a:fillRef>
+          <a:effectRef idx="0">
+            <a:schemeClr val="accent1"/>
+          </a:effectRef>
+          <a:fontRef idx="minor">
+            <a:schemeClr val="lt1"/>
+          </a:fontRef>
+        </p:style>
+        <p:txBody>
+          <a:bodyPr rtlCol="0" anchor="ctr"/>
+          <a:lstStyle/>
+          <a:p>
+            <a:pPr algn="ctr"/>
+            <a:r>
+              <a:rPr lang="en-US" altLang="ko-KR" sz="1400" dirty="0" smtClean="0">
+                <a:solidFill>
+                  <a:schemeClr val="tx1"/>
+                </a:solidFill>
+                <a:latin typeface="나눔스퀘어 ExtraBold" pitchFamily="50" charset="-127"/>
+                <a:ea typeface="나눔스퀘어 ExtraBold" pitchFamily="50" charset="-127"/>
+              </a:rPr>
+              <a:t>4</a:t>
+            </a:r>
+            <a:endParaRPr lang="ko-KR" altLang="en-US" sz="1400" dirty="0">
+              <a:solidFill>
+                <a:schemeClr val="tx1"/>
+              </a:solidFill>
+              <a:latin typeface="나눔스퀘어 ExtraBold" pitchFamily="50" charset="-127"/>
+              <a:ea typeface="나눔스퀘어 ExtraBold" pitchFamily="50" charset="-127"/>
+            </a:endParaRPr>
+          </a:p>
+        </p:txBody>
+      </p:sp>
+      <p:sp>
+        <p:nvSpPr>
+          <p:cNvPr id="66" name="직사각형 65"/>
+          <p:cNvSpPr/>
+          <p:nvPr/>
+        </p:nvSpPr>
+        <p:spPr>
+          <a:xfrm>
+            <a:off x="5761037" y="3519881"/>
+            <a:ext cx="773640" cy="268268"/>
+          </a:xfrm>
+          <a:prstGeom prst="rect">
+            <a:avLst/>
+          </a:prstGeom>
+          <a:noFill/>
+          <a:ln>
+            <a:noFill/>
+          </a:ln>
+        </p:spPr>
+        <p:style>
+          <a:lnRef idx="2">
+            <a:schemeClr val="accent1">
+              <a:shade val="50000"/>
+            </a:schemeClr>
+          </a:lnRef>
+          <a:fillRef idx="1">
+            <a:schemeClr val="accent1"/>
+          </a:fillRef>
+          <a:effectRef idx="0">
+            <a:schemeClr val="accent1"/>
+          </a:effectRef>
+          <a:fontRef idx="minor">
+            <a:schemeClr val="lt1"/>
+          </a:fontRef>
+        </p:style>
+        <p:txBody>
+          <a:bodyPr rtlCol="0" anchor="ctr"/>
+          <a:lstStyle/>
+          <a:p>
+            <a:pPr algn="ctr"/>
+            <a:r>
+              <a:rPr lang="en-US" altLang="ko-KR" sz="1400" dirty="0" smtClean="0">
+                <a:solidFill>
+                  <a:schemeClr val="tx1"/>
+                </a:solidFill>
+                <a:latin typeface="나눔스퀘어 ExtraBold" pitchFamily="50" charset="-127"/>
+                <a:ea typeface="나눔스퀘어 ExtraBold" pitchFamily="50" charset="-127"/>
+              </a:rPr>
+              <a:t>5</a:t>
+            </a:r>
+            <a:endParaRPr lang="ko-KR" altLang="en-US" sz="1400" dirty="0">
+              <a:solidFill>
+                <a:schemeClr val="tx1"/>
+              </a:solidFill>
+              <a:latin typeface="나눔스퀘어 ExtraBold" pitchFamily="50" charset="-127"/>
+              <a:ea typeface="나눔스퀘어 ExtraBold" pitchFamily="50" charset="-127"/>
+            </a:endParaRPr>
+          </a:p>
+        </p:txBody>
+      </p:sp>
+      <p:sp>
+        <p:nvSpPr>
+          <p:cNvPr id="67" name="직사각형 66"/>
+          <p:cNvSpPr/>
+          <p:nvPr/>
+        </p:nvSpPr>
+        <p:spPr>
+          <a:xfrm>
+            <a:off x="6534677" y="3519881"/>
+            <a:ext cx="773640" cy="268268"/>
+          </a:xfrm>
+          <a:prstGeom prst="rect">
+            <a:avLst/>
+          </a:prstGeom>
+          <a:noFill/>
+          <a:ln>
+            <a:noFill/>
+          </a:ln>
+        </p:spPr>
+        <p:style>
+          <a:lnRef idx="2">
+            <a:schemeClr val="accent1">
+              <a:shade val="50000"/>
+            </a:schemeClr>
+          </a:lnRef>
+          <a:fillRef idx="1">
+            <a:schemeClr val="accent1"/>
+          </a:fillRef>
+          <a:effectRef idx="0">
+            <a:schemeClr val="accent1"/>
+          </a:effectRef>
+          <a:fontRef idx="minor">
+            <a:schemeClr val="lt1"/>
+          </a:fontRef>
+        </p:style>
+        <p:txBody>
+          <a:bodyPr rtlCol="0" anchor="ctr"/>
+          <a:lstStyle/>
+          <a:p>
+            <a:pPr algn="ctr"/>
+            <a:r>
+              <a:rPr lang="en-US" altLang="ko-KR" sz="1400" dirty="0" smtClean="0">
+                <a:solidFill>
+                  <a:schemeClr val="tx1"/>
+                </a:solidFill>
+                <a:latin typeface="나눔스퀘어 ExtraBold" pitchFamily="50" charset="-127"/>
+                <a:ea typeface="나눔스퀘어 ExtraBold" pitchFamily="50" charset="-127"/>
+              </a:rPr>
+              <a:t>6</a:t>
+            </a:r>
+            <a:endParaRPr lang="ko-KR" altLang="en-US" sz="1400" dirty="0">
+              <a:solidFill>
+                <a:schemeClr val="tx1"/>
+              </a:solidFill>
+              <a:latin typeface="나눔스퀘어 ExtraBold" pitchFamily="50" charset="-127"/>
+              <a:ea typeface="나눔스퀘어 ExtraBold" pitchFamily="50" charset="-127"/>
+            </a:endParaRPr>
+          </a:p>
+        </p:txBody>
+      </p:sp>
+      <p:sp>
+        <p:nvSpPr>
+          <p:cNvPr id="68" name="직사각형 67"/>
+          <p:cNvSpPr/>
+          <p:nvPr/>
+        </p:nvSpPr>
+        <p:spPr>
+          <a:xfrm>
+            <a:off x="7308317" y="3519881"/>
+            <a:ext cx="773640" cy="268268"/>
+          </a:xfrm>
+          <a:prstGeom prst="rect">
+            <a:avLst/>
+          </a:prstGeom>
+          <a:noFill/>
+          <a:ln>
+            <a:noFill/>
+          </a:ln>
+        </p:spPr>
+        <p:style>
+          <a:lnRef idx="2">
+            <a:schemeClr val="accent1">
+              <a:shade val="50000"/>
+            </a:schemeClr>
+          </a:lnRef>
+          <a:fillRef idx="1">
+            <a:schemeClr val="accent1"/>
+          </a:fillRef>
+          <a:effectRef idx="0">
+            <a:schemeClr val="accent1"/>
+          </a:effectRef>
+          <a:fontRef idx="minor">
+            <a:schemeClr val="lt1"/>
+          </a:fontRef>
+        </p:style>
+        <p:txBody>
+          <a:bodyPr rtlCol="0" anchor="ctr"/>
+          <a:lstStyle/>
+          <a:p>
+            <a:pPr algn="ctr"/>
+            <a:r>
+              <a:rPr lang="en-US" altLang="ko-KR" sz="1400" dirty="0" smtClean="0">
+                <a:solidFill>
+                  <a:schemeClr val="tx1"/>
+                </a:solidFill>
+                <a:latin typeface="나눔스퀘어 ExtraBold" pitchFamily="50" charset="-127"/>
+                <a:ea typeface="나눔스퀘어 ExtraBold" pitchFamily="50" charset="-127"/>
+              </a:rPr>
+              <a:t>7</a:t>
+            </a:r>
+            <a:endParaRPr lang="ko-KR" altLang="en-US" sz="1400" dirty="0">
+              <a:solidFill>
+                <a:schemeClr val="tx1"/>
+              </a:solidFill>
+              <a:latin typeface="나눔스퀘어 ExtraBold" pitchFamily="50" charset="-127"/>
+              <a:ea typeface="나눔스퀘어 ExtraBold" pitchFamily="50" charset="-127"/>
+            </a:endParaRPr>
+          </a:p>
+        </p:txBody>
+      </p:sp>
+      <p:sp>
+        <p:nvSpPr>
+          <p:cNvPr id="69" name="직사각형 68"/>
+          <p:cNvSpPr/>
+          <p:nvPr/>
+        </p:nvSpPr>
+        <p:spPr>
+          <a:xfrm>
+            <a:off x="8081957" y="3519881"/>
+            <a:ext cx="773640" cy="268268"/>
+          </a:xfrm>
+          <a:prstGeom prst="rect">
+            <a:avLst/>
+          </a:prstGeom>
+          <a:noFill/>
+          <a:ln>
+            <a:noFill/>
+          </a:ln>
+        </p:spPr>
+        <p:style>
+          <a:lnRef idx="2">
+            <a:schemeClr val="accent1">
+              <a:shade val="50000"/>
+            </a:schemeClr>
+          </a:lnRef>
+          <a:fillRef idx="1">
+            <a:schemeClr val="accent1"/>
+          </a:fillRef>
+          <a:effectRef idx="0">
+            <a:schemeClr val="accent1"/>
+          </a:effectRef>
+          <a:fontRef idx="minor">
+            <a:schemeClr val="lt1"/>
+          </a:fontRef>
+        </p:style>
+        <p:txBody>
+          <a:bodyPr rtlCol="0" anchor="ctr"/>
+          <a:lstStyle/>
+          <a:p>
+            <a:pPr algn="ctr"/>
+            <a:r>
+              <a:rPr lang="en-US" altLang="ko-KR" sz="1400" dirty="0" smtClean="0">
+                <a:solidFill>
+                  <a:schemeClr val="tx1"/>
+                </a:solidFill>
+                <a:latin typeface="나눔스퀘어 ExtraBold" pitchFamily="50" charset="-127"/>
+                <a:ea typeface="나눔스퀘어 ExtraBold" pitchFamily="50" charset="-127"/>
+              </a:rPr>
+              <a:t>8</a:t>
+            </a:r>
+            <a:endParaRPr lang="ko-KR" altLang="en-US" sz="1400" dirty="0">
+              <a:solidFill>
+                <a:schemeClr val="tx1"/>
+              </a:solidFill>
+              <a:latin typeface="나눔스퀘어 ExtraBold" pitchFamily="50" charset="-127"/>
+              <a:ea typeface="나눔스퀘어 ExtraBold" pitchFamily="50" charset="-127"/>
+            </a:endParaRPr>
+          </a:p>
+        </p:txBody>
+      </p:sp>
+      <p:sp>
+        <p:nvSpPr>
+          <p:cNvPr id="6" name="왼쪽 대괄호 5"/>
+          <p:cNvSpPr/>
+          <p:nvPr/>
+        </p:nvSpPr>
+        <p:spPr>
+          <a:xfrm>
+            <a:off x="5671415" y="3555649"/>
+            <a:ext cx="105427" cy="811852"/>
+          </a:xfrm>
+          <a:prstGeom prst="leftBracket">
+            <a:avLst/>
+          </a:prstGeom>
+          <a:ln w="38100">
+            <a:solidFill>
+              <a:srgbClr val="FF0000"/>
+            </a:solidFill>
+          </a:ln>
+        </p:spPr>
+        <p:style>
+          <a:lnRef idx="1">
+            <a:schemeClr val="accent1"/>
+          </a:lnRef>
+          <a:fillRef idx="0">
+            <a:schemeClr val="accent1"/>
+          </a:fillRef>
+          <a:effectRef idx="0">
+            <a:schemeClr val="accent1"/>
+          </a:effectRef>
+          <a:fontRef idx="minor">
+            <a:schemeClr val="tx1"/>
+          </a:fontRef>
+        </p:style>
+        <p:txBody>
+          <a:bodyPr rtlCol="0" anchor="ctr"/>
+          <a:lstStyle/>
+          <a:p>
+            <a:pPr algn="ctr"/>
+            <a:endParaRPr lang="ko-KR" altLang="en-US"/>
+          </a:p>
+        </p:txBody>
+      </p:sp>
+      <p:sp>
+        <p:nvSpPr>
+          <p:cNvPr id="70" name="왼쪽 대괄호 69"/>
+          <p:cNvSpPr/>
+          <p:nvPr/>
+        </p:nvSpPr>
+        <p:spPr>
+          <a:xfrm flipH="1">
+            <a:off x="6534677" y="3555649"/>
+            <a:ext cx="105427" cy="811852"/>
+          </a:xfrm>
+          <a:prstGeom prst="leftBracket">
+            <a:avLst/>
+          </a:prstGeom>
+          <a:ln w="38100">
+            <a:solidFill>
+              <a:srgbClr val="0070C0"/>
+            </a:solidFill>
+          </a:ln>
+        </p:spPr>
+        <p:style>
+          <a:lnRef idx="1">
+            <a:schemeClr val="accent1"/>
+          </a:lnRef>
+          <a:fillRef idx="0">
+            <a:schemeClr val="accent1"/>
+          </a:fillRef>
+          <a:effectRef idx="0">
+            <a:schemeClr val="accent1"/>
+          </a:effectRef>
+          <a:fontRef idx="minor">
+            <a:schemeClr val="tx1"/>
+          </a:fontRef>
+        </p:style>
+        <p:txBody>
+          <a:bodyPr rtlCol="0" anchor="ctr"/>
+          <a:lstStyle/>
+          <a:p>
+            <a:pPr algn="ctr"/>
+            <a:endParaRPr lang="ko-KR" altLang="en-US"/>
+          </a:p>
+        </p:txBody>
+      </p:sp>
+      <p:sp>
+        <p:nvSpPr>
+          <p:cNvPr id="8" name="아래쪽 화살표 7"/>
+          <p:cNvSpPr/>
+          <p:nvPr/>
+        </p:nvSpPr>
+        <p:spPr>
+          <a:xfrm>
+            <a:off x="5993009" y="2969206"/>
+            <a:ext cx="291825" cy="486905"/>
+          </a:xfrm>
+          <a:prstGeom prst="downArrow">
+            <a:avLst>
+              <a:gd name="adj1" fmla="val 50000"/>
+              <a:gd name="adj2" fmla="val 65397"/>
+            </a:avLst>
+          </a:prstGeom>
+        </p:spPr>
+        <p:style>
+          <a:lnRef idx="2">
+            <a:schemeClr val="accent1">
+              <a:shade val="50000"/>
+            </a:schemeClr>
+          </a:lnRef>
+          <a:fillRef idx="1">
+            <a:schemeClr val="accent1"/>
+          </a:fillRef>
+          <a:effectRef idx="0">
+            <a:schemeClr val="accent1"/>
+          </a:effectRef>
+          <a:fontRef idx="minor">
+            <a:schemeClr val="lt1"/>
+          </a:fontRef>
+        </p:style>
+        <p:txBody>
+          <a:bodyPr rtlCol="0" anchor="ctr"/>
+          <a:lstStyle/>
+          <a:p>
+            <a:pPr algn="ctr"/>
+            <a:endParaRPr lang="ko-KR" altLang="en-US"/>
+          </a:p>
+        </p:txBody>
+      </p:sp>
+      <p:sp>
+        <p:nvSpPr>
+          <p:cNvPr id="71" name="직사각형 70"/>
+          <p:cNvSpPr/>
+          <p:nvPr/>
+        </p:nvSpPr>
+        <p:spPr>
+          <a:xfrm>
+            <a:off x="5572579" y="2658594"/>
+            <a:ext cx="1132685" cy="268268"/>
+          </a:xfrm>
+          <a:prstGeom prst="rect">
+            <a:avLst/>
+          </a:prstGeom>
+          <a:noFill/>
+          <a:ln>
+            <a:noFill/>
+          </a:ln>
+        </p:spPr>
+        <p:style>
+          <a:lnRef idx="2">
+            <a:schemeClr val="accent1">
+              <a:shade val="50000"/>
+            </a:schemeClr>
+          </a:lnRef>
+          <a:fillRef idx="1">
+            <a:schemeClr val="accent1"/>
+          </a:fillRef>
+          <a:effectRef idx="0">
+            <a:schemeClr val="accent1"/>
+          </a:effectRef>
+          <a:fontRef idx="minor">
+            <a:schemeClr val="lt1"/>
+          </a:fontRef>
+        </p:style>
+        <p:txBody>
+          <a:bodyPr rtlCol="0" anchor="ctr"/>
+          <a:lstStyle/>
+          <a:p>
+            <a:pPr algn="ctr"/>
+            <a:r>
+              <a:rPr lang="en-US" altLang="ko-KR" sz="1400" dirty="0" smtClean="0">
+                <a:solidFill>
+                  <a:schemeClr val="tx1"/>
+                </a:solidFill>
+                <a:latin typeface="나눔스퀘어 ExtraBold" pitchFamily="50" charset="-127"/>
+                <a:ea typeface="나눔스퀘어 ExtraBold" pitchFamily="50" charset="-127"/>
+              </a:rPr>
+              <a:t>(</a:t>
+            </a:r>
+            <a:r>
+              <a:rPr lang="en-US" altLang="ko-KR" sz="1400" dirty="0" smtClean="0">
+                <a:solidFill>
+                  <a:srgbClr val="FF0000"/>
+                </a:solidFill>
+                <a:latin typeface="나눔스퀘어 ExtraBold" pitchFamily="50" charset="-127"/>
+                <a:ea typeface="나눔스퀘어 ExtraBold" pitchFamily="50" charset="-127"/>
+              </a:rPr>
+              <a:t>5</a:t>
+            </a:r>
+            <a:r>
+              <a:rPr lang="en-US" altLang="ko-KR" sz="1400" dirty="0" smtClean="0">
+                <a:solidFill>
+                  <a:schemeClr val="tx1"/>
+                </a:solidFill>
+                <a:latin typeface="나눔스퀘어 ExtraBold" pitchFamily="50" charset="-127"/>
+                <a:ea typeface="나눔스퀘어 ExtraBold" pitchFamily="50" charset="-127"/>
+              </a:rPr>
+              <a:t> + </a:t>
+            </a:r>
+            <a:r>
+              <a:rPr lang="en-US" altLang="ko-KR" sz="1400" dirty="0" smtClean="0">
+                <a:solidFill>
+                  <a:srgbClr val="0070C0"/>
+                </a:solidFill>
+                <a:latin typeface="나눔스퀘어 ExtraBold" pitchFamily="50" charset="-127"/>
+                <a:ea typeface="나눔스퀘어 ExtraBold" pitchFamily="50" charset="-127"/>
+              </a:rPr>
+              <a:t>5</a:t>
+            </a:r>
+            <a:r>
+              <a:rPr lang="en-US" altLang="ko-KR" sz="1400" dirty="0" smtClean="0">
+                <a:solidFill>
+                  <a:schemeClr val="tx1"/>
+                </a:solidFill>
+                <a:latin typeface="나눔스퀘어 ExtraBold" pitchFamily="50" charset="-127"/>
+                <a:ea typeface="나눔스퀘어 ExtraBold" pitchFamily="50" charset="-127"/>
+              </a:rPr>
+              <a:t>) / 2</a:t>
+            </a:r>
+            <a:endParaRPr lang="ko-KR" altLang="en-US" sz="1400" dirty="0">
+              <a:solidFill>
+                <a:schemeClr val="tx1"/>
+              </a:solidFill>
+              <a:latin typeface="나눔스퀘어 ExtraBold" pitchFamily="50" charset="-127"/>
+              <a:ea typeface="나눔스퀘어 ExtraBold" pitchFamily="50" charset="-127"/>
+            </a:endParaRPr>
+          </a:p>
+        </p:txBody>
+      </p:sp>
+    </p:spTree>
+    <p:extLst>
+      <p:ext uri="{BB962C8B-B14F-4D97-AF65-F5344CB8AC3E}">
+        <p14:creationId xmlns:p14="http://schemas.microsoft.com/office/powerpoint/2010/main" val="3247885399"/>
       </p:ext>
     </p:extLst>
   </p:cSld>

</xml_diff>

<commit_message>
update css - header hideUnderline - latex margin
update post
- algo 3

update snippet
- hide underline
</commit_message>
<xml_diff>
--- a/assets/etc/이미지제작용.pptx
+++ b/assets/etc/이미지제작용.pptx
@@ -5,7 +5,7 @@
     <p:sldMasterId id="2147483648" r:id="rId1"/>
   </p:sldMasterIdLst>
   <p:notesMasterIdLst>
-    <p:notesMasterId r:id="rId31"/>
+    <p:notesMasterId r:id="rId32"/>
   </p:notesMasterIdLst>
   <p:sldIdLst>
     <p:sldId id="256" r:id="rId2"/>
@@ -37,6 +37,7 @@
     <p:sldId id="283" r:id="rId28"/>
     <p:sldId id="284" r:id="rId29"/>
     <p:sldId id="285" r:id="rId30"/>
+    <p:sldId id="286" r:id="rId31"/>
   </p:sldIdLst>
   <p:sldSz cx="11522075" cy="6480175"/>
   <p:notesSz cx="6858000" cy="9144000"/>
@@ -220,7 +221,7 @@
           <a:p>
             <a:fld id="{5292B011-278F-46AA-8F5C-4B7DC81D9EF2}" type="datetimeFigureOut">
               <a:rPr lang="ko-KR" altLang="en-US" smtClean="0"/>
-              <a:t>2024-04-02</a:t>
+              <a:t>2024-04-03</a:t>
             </a:fld>
             <a:endParaRPr lang="ko-KR" altLang="en-US"/>
           </a:p>
@@ -1089,7 +1090,7 @@
           <a:p>
             <a:fld id="{10B01263-E573-4C51-9265-094B7818CB45}" type="datetimeFigureOut">
               <a:rPr lang="ko-KR" altLang="en-US" smtClean="0"/>
-              <a:t>2024-04-02</a:t>
+              <a:t>2024-04-03</a:t>
             </a:fld>
             <a:endParaRPr lang="ko-KR" altLang="en-US"/>
           </a:p>
@@ -1259,7 +1260,7 @@
           <a:p>
             <a:fld id="{10B01263-E573-4C51-9265-094B7818CB45}" type="datetimeFigureOut">
               <a:rPr lang="ko-KR" altLang="en-US" smtClean="0"/>
-              <a:t>2024-04-02</a:t>
+              <a:t>2024-04-03</a:t>
             </a:fld>
             <a:endParaRPr lang="ko-KR" altLang="en-US"/>
           </a:p>
@@ -1439,7 +1440,7 @@
           <a:p>
             <a:fld id="{10B01263-E573-4C51-9265-094B7818CB45}" type="datetimeFigureOut">
               <a:rPr lang="ko-KR" altLang="en-US" smtClean="0"/>
-              <a:t>2024-04-02</a:t>
+              <a:t>2024-04-03</a:t>
             </a:fld>
             <a:endParaRPr lang="ko-KR" altLang="en-US"/>
           </a:p>
@@ -1609,7 +1610,7 @@
           <a:p>
             <a:fld id="{10B01263-E573-4C51-9265-094B7818CB45}" type="datetimeFigureOut">
               <a:rPr lang="ko-KR" altLang="en-US" smtClean="0"/>
-              <a:t>2024-04-02</a:t>
+              <a:t>2024-04-03</a:t>
             </a:fld>
             <a:endParaRPr lang="ko-KR" altLang="en-US"/>
           </a:p>
@@ -1855,7 +1856,7 @@
           <a:p>
             <a:fld id="{10B01263-E573-4C51-9265-094B7818CB45}" type="datetimeFigureOut">
               <a:rPr lang="ko-KR" altLang="en-US" smtClean="0"/>
-              <a:t>2024-04-02</a:t>
+              <a:t>2024-04-03</a:t>
             </a:fld>
             <a:endParaRPr lang="ko-KR" altLang="en-US"/>
           </a:p>
@@ -2143,7 +2144,7 @@
           <a:p>
             <a:fld id="{10B01263-E573-4C51-9265-094B7818CB45}" type="datetimeFigureOut">
               <a:rPr lang="ko-KR" altLang="en-US" smtClean="0"/>
-              <a:t>2024-04-02</a:t>
+              <a:t>2024-04-03</a:t>
             </a:fld>
             <a:endParaRPr lang="ko-KR" altLang="en-US"/>
           </a:p>
@@ -2565,7 +2566,7 @@
           <a:p>
             <a:fld id="{10B01263-E573-4C51-9265-094B7818CB45}" type="datetimeFigureOut">
               <a:rPr lang="ko-KR" altLang="en-US" smtClean="0"/>
-              <a:t>2024-04-02</a:t>
+              <a:t>2024-04-03</a:t>
             </a:fld>
             <a:endParaRPr lang="ko-KR" altLang="en-US"/>
           </a:p>
@@ -2683,7 +2684,7 @@
           <a:p>
             <a:fld id="{10B01263-E573-4C51-9265-094B7818CB45}" type="datetimeFigureOut">
               <a:rPr lang="ko-KR" altLang="en-US" smtClean="0"/>
-              <a:t>2024-04-02</a:t>
+              <a:t>2024-04-03</a:t>
             </a:fld>
             <a:endParaRPr lang="ko-KR" altLang="en-US"/>
           </a:p>
@@ -2778,7 +2779,7 @@
           <a:p>
             <a:fld id="{10B01263-E573-4C51-9265-094B7818CB45}" type="datetimeFigureOut">
               <a:rPr lang="ko-KR" altLang="en-US" smtClean="0"/>
-              <a:t>2024-04-02</a:t>
+              <a:t>2024-04-03</a:t>
             </a:fld>
             <a:endParaRPr lang="ko-KR" altLang="en-US"/>
           </a:p>
@@ -3055,7 +3056,7 @@
           <a:p>
             <a:fld id="{10B01263-E573-4C51-9265-094B7818CB45}" type="datetimeFigureOut">
               <a:rPr lang="ko-KR" altLang="en-US" smtClean="0"/>
-              <a:t>2024-04-02</a:t>
+              <a:t>2024-04-03</a:t>
             </a:fld>
             <a:endParaRPr lang="ko-KR" altLang="en-US"/>
           </a:p>
@@ -3308,7 +3309,7 @@
           <a:p>
             <a:fld id="{10B01263-E573-4C51-9265-094B7818CB45}" type="datetimeFigureOut">
               <a:rPr lang="ko-KR" altLang="en-US" smtClean="0"/>
-              <a:t>2024-04-02</a:t>
+              <a:t>2024-04-03</a:t>
             </a:fld>
             <a:endParaRPr lang="ko-KR" altLang="en-US"/>
           </a:p>
@@ -3521,7 +3522,7 @@
           <a:p>
             <a:fld id="{10B01263-E573-4C51-9265-094B7818CB45}" type="datetimeFigureOut">
               <a:rPr lang="ko-KR" altLang="en-US" smtClean="0"/>
-              <a:t>2024-04-02</a:t>
+              <a:t>2024-04-03</a:t>
             </a:fld>
             <a:endParaRPr lang="ko-KR" altLang="en-US"/>
           </a:p>
@@ -33587,6 +33588,1559 @@
 </p:sld>
 </file>
 
+<file path=ppt/slides/slide30.xml><?xml version="1.0" encoding="utf-8"?>
+<p:sld xmlns:a="http://schemas.openxmlformats.org/drawingml/2006/main" xmlns:r="http://schemas.openxmlformats.org/officeDocument/2006/relationships" xmlns:p="http://schemas.openxmlformats.org/presentationml/2006/main">
+  <p:cSld>
+    <p:spTree>
+      <p:nvGrpSpPr>
+        <p:cNvPr id="1" name=""/>
+        <p:cNvGrpSpPr/>
+        <p:nvPr/>
+      </p:nvGrpSpPr>
+      <p:grpSpPr>
+        <a:xfrm>
+          <a:off x="0" y="0"/>
+          <a:ext cx="0" cy="0"/>
+          <a:chOff x="0" y="0"/>
+          <a:chExt cx="0" cy="0"/>
+        </a:xfrm>
+      </p:grpSpPr>
+      <p:cxnSp>
+        <p:nvCxnSpPr>
+          <p:cNvPr id="53" name="직선 화살표 연결선 52"/>
+          <p:cNvCxnSpPr/>
+          <p:nvPr/>
+        </p:nvCxnSpPr>
+        <p:spPr>
+          <a:xfrm flipH="1" flipV="1">
+            <a:off x="6193085" y="2381877"/>
+            <a:ext cx="504056" cy="570178"/>
+          </a:xfrm>
+          <a:prstGeom prst="straightConnector1">
+            <a:avLst/>
+          </a:prstGeom>
+          <a:ln w="28575">
+            <a:solidFill>
+              <a:schemeClr val="accent1">
+                <a:lumMod val="75000"/>
+              </a:schemeClr>
+            </a:solidFill>
+            <a:tailEnd type="arrow"/>
+          </a:ln>
+        </p:spPr>
+        <p:style>
+          <a:lnRef idx="1">
+            <a:schemeClr val="accent1"/>
+          </a:lnRef>
+          <a:fillRef idx="0">
+            <a:schemeClr val="accent1"/>
+          </a:fillRef>
+          <a:effectRef idx="0">
+            <a:schemeClr val="accent1"/>
+          </a:effectRef>
+          <a:fontRef idx="minor">
+            <a:schemeClr val="tx1"/>
+          </a:fontRef>
+        </p:style>
+      </p:cxnSp>
+      <p:cxnSp>
+        <p:nvCxnSpPr>
+          <p:cNvPr id="21" name="직선 화살표 연결선 20"/>
+          <p:cNvCxnSpPr/>
+          <p:nvPr/>
+        </p:nvCxnSpPr>
+        <p:spPr>
+          <a:xfrm>
+            <a:off x="3672805" y="3600127"/>
+            <a:ext cx="432048" cy="554717"/>
+          </a:xfrm>
+          <a:prstGeom prst="straightConnector1">
+            <a:avLst/>
+          </a:prstGeom>
+          <a:ln w="28575">
+            <a:solidFill>
+              <a:schemeClr val="accent1">
+                <a:lumMod val="75000"/>
+              </a:schemeClr>
+            </a:solidFill>
+            <a:prstDash val="dash"/>
+            <a:tailEnd type="arrow"/>
+          </a:ln>
+        </p:spPr>
+        <p:style>
+          <a:lnRef idx="1">
+            <a:schemeClr val="accent1"/>
+          </a:lnRef>
+          <a:fillRef idx="0">
+            <a:schemeClr val="accent1"/>
+          </a:fillRef>
+          <a:effectRef idx="0">
+            <a:schemeClr val="accent1"/>
+          </a:effectRef>
+          <a:fontRef idx="minor">
+            <a:schemeClr val="tx1"/>
+          </a:fontRef>
+        </p:style>
+      </p:cxnSp>
+      <p:sp>
+        <p:nvSpPr>
+          <p:cNvPr id="2" name="모서리가 둥근 직사각형 1"/>
+          <p:cNvSpPr/>
+          <p:nvPr/>
+        </p:nvSpPr>
+        <p:spPr>
+          <a:xfrm>
+            <a:off x="2160637" y="215751"/>
+            <a:ext cx="2070105" cy="981024"/>
+          </a:xfrm>
+          <a:prstGeom prst="roundRect">
+            <a:avLst/>
+          </a:prstGeom>
+          <a:noFill/>
+          <a:ln>
+            <a:solidFill>
+              <a:schemeClr val="bg1">
+                <a:lumMod val="50000"/>
+              </a:schemeClr>
+            </a:solidFill>
+          </a:ln>
+        </p:spPr>
+        <p:style>
+          <a:lnRef idx="2">
+            <a:schemeClr val="accent1">
+              <a:shade val="50000"/>
+            </a:schemeClr>
+          </a:lnRef>
+          <a:fillRef idx="1">
+            <a:schemeClr val="accent1"/>
+          </a:fillRef>
+          <a:effectRef idx="0">
+            <a:schemeClr val="accent1"/>
+          </a:effectRef>
+          <a:fontRef idx="minor">
+            <a:schemeClr val="lt1"/>
+          </a:fontRef>
+        </p:style>
+        <p:txBody>
+          <a:bodyPr rtlCol="0" anchor="ctr"/>
+          <a:lstStyle/>
+          <a:p>
+            <a:pPr>
+              <a:lnSpc>
+                <a:spcPct val="125000"/>
+              </a:lnSpc>
+            </a:pPr>
+            <a:r>
+              <a:rPr lang="ko-KR" altLang="en-US" sz="1600" smtClean="0">
+                <a:solidFill>
+                  <a:schemeClr val="tx1"/>
+                </a:solidFill>
+              </a:rPr>
+              <a:t>ㆍ </a:t>
+            </a:r>
+            <a:r>
+              <a:rPr lang="en-US" altLang="ko-KR" sz="1600" b="1" smtClean="0">
+                <a:solidFill>
+                  <a:srgbClr val="0070C0"/>
+                </a:solidFill>
+                <a:latin typeface="Cambria" pitchFamily="18" charset="0"/>
+                <a:ea typeface="Cambria" pitchFamily="18" charset="0"/>
+              </a:rPr>
+              <a:t>dist</a:t>
+            </a:r>
+            <a:r>
+              <a:rPr lang="en-US" altLang="ko-KR" sz="1600" smtClean="0">
+                <a:solidFill>
+                  <a:schemeClr val="tx1"/>
+                </a:solidFill>
+              </a:rPr>
+              <a:t>  </a:t>
+            </a:r>
+            <a:r>
+              <a:rPr lang="ko-KR" altLang="en-US" sz="1600" smtClean="0">
+                <a:solidFill>
+                  <a:schemeClr val="tx1"/>
+                </a:solidFill>
+              </a:rPr>
+              <a:t>배열 초기화</a:t>
+            </a:r>
+            <a:endParaRPr lang="en-US" altLang="ko-KR" sz="1600" smtClean="0">
+              <a:solidFill>
+                <a:schemeClr val="tx1"/>
+              </a:solidFill>
+            </a:endParaRPr>
+          </a:p>
+          <a:p>
+            <a:pPr>
+              <a:lnSpc>
+                <a:spcPct val="125000"/>
+              </a:lnSpc>
+            </a:pPr>
+            <a:r>
+              <a:rPr lang="ko-KR" altLang="en-US" sz="1600" smtClean="0">
+                <a:solidFill>
+                  <a:schemeClr val="tx1"/>
+                </a:solidFill>
+              </a:rPr>
+              <a:t>ㆍ</a:t>
+            </a:r>
+            <a:r>
+              <a:rPr lang="en-US" altLang="ko-KR" sz="1600" b="1" smtClean="0">
+                <a:solidFill>
+                  <a:srgbClr val="0070C0"/>
+                </a:solidFill>
+                <a:latin typeface="Cambria" pitchFamily="18" charset="0"/>
+                <a:ea typeface="Cambria" pitchFamily="18" charset="0"/>
+              </a:rPr>
+              <a:t>(S, 0)</a:t>
+            </a:r>
+            <a:r>
+              <a:rPr lang="en-US" altLang="ko-KR" sz="1600" smtClean="0">
+                <a:solidFill>
+                  <a:srgbClr val="0070C0"/>
+                </a:solidFill>
+                <a:latin typeface="Cambria" pitchFamily="18" charset="0"/>
+                <a:ea typeface="Cambria" pitchFamily="18" charset="0"/>
+              </a:rPr>
+              <a:t> </a:t>
+            </a:r>
+            <a:r>
+              <a:rPr lang="ko-KR" altLang="en-US" sz="1600" smtClean="0">
+                <a:solidFill>
+                  <a:schemeClr val="tx1"/>
+                </a:solidFill>
+              </a:rPr>
+              <a:t>를 </a:t>
+            </a:r>
+            <a:r>
+              <a:rPr lang="en-US" altLang="ko-KR" sz="1600" b="1" smtClean="0">
+                <a:solidFill>
+                  <a:srgbClr val="0070C0"/>
+                </a:solidFill>
+                <a:latin typeface="Cambria" pitchFamily="18" charset="0"/>
+                <a:ea typeface="Cambria" pitchFamily="18" charset="0"/>
+              </a:rPr>
+              <a:t>D</a:t>
+            </a:r>
+            <a:r>
+              <a:rPr lang="en-US" altLang="ko-KR" sz="1600" smtClean="0">
+                <a:solidFill>
+                  <a:schemeClr val="tx1"/>
+                </a:solidFill>
+              </a:rPr>
+              <a:t> </a:t>
+            </a:r>
+            <a:r>
+              <a:rPr lang="ko-KR" altLang="en-US" sz="1600" smtClean="0">
+                <a:solidFill>
+                  <a:schemeClr val="tx1"/>
+                </a:solidFill>
+              </a:rPr>
+              <a:t>에 추가</a:t>
+            </a:r>
+            <a:endParaRPr lang="en-US" altLang="ko-KR" sz="1600" smtClean="0">
+              <a:solidFill>
+                <a:schemeClr val="tx1"/>
+              </a:solidFill>
+            </a:endParaRPr>
+          </a:p>
+        </p:txBody>
+      </p:sp>
+      <p:sp>
+        <p:nvSpPr>
+          <p:cNvPr id="13" name="모서리가 둥근 직사각형 12"/>
+          <p:cNvSpPr/>
+          <p:nvPr/>
+        </p:nvSpPr>
+        <p:spPr>
+          <a:xfrm>
+            <a:off x="2160637" y="5223236"/>
+            <a:ext cx="2070105" cy="609139"/>
+          </a:xfrm>
+          <a:prstGeom prst="roundRect">
+            <a:avLst/>
+          </a:prstGeom>
+          <a:noFill/>
+          <a:ln>
+            <a:solidFill>
+              <a:schemeClr val="bg1">
+                <a:lumMod val="50000"/>
+              </a:schemeClr>
+            </a:solidFill>
+          </a:ln>
+        </p:spPr>
+        <p:style>
+          <a:lnRef idx="2">
+            <a:schemeClr val="accent1">
+              <a:shade val="50000"/>
+            </a:schemeClr>
+          </a:lnRef>
+          <a:fillRef idx="1">
+            <a:schemeClr val="accent1"/>
+          </a:fillRef>
+          <a:effectRef idx="0">
+            <a:schemeClr val="accent1"/>
+          </a:effectRef>
+          <a:fontRef idx="minor">
+            <a:schemeClr val="lt1"/>
+          </a:fontRef>
+        </p:style>
+        <p:txBody>
+          <a:bodyPr rtlCol="0" anchor="ctr"/>
+          <a:lstStyle/>
+          <a:p>
+            <a:pPr algn="ctr">
+              <a:lnSpc>
+                <a:spcPct val="125000"/>
+              </a:lnSpc>
+            </a:pPr>
+            <a:r>
+              <a:rPr lang="ko-KR" altLang="en-US" sz="1600" smtClean="0">
+                <a:solidFill>
+                  <a:schemeClr val="tx1"/>
+                </a:solidFill>
+              </a:rPr>
+              <a:t>종료</a:t>
+            </a:r>
+            <a:endParaRPr lang="en-US" altLang="ko-KR" sz="1600" smtClean="0">
+              <a:solidFill>
+                <a:schemeClr val="tx1"/>
+              </a:solidFill>
+            </a:endParaRPr>
+          </a:p>
+        </p:txBody>
+      </p:sp>
+      <p:sp>
+        <p:nvSpPr>
+          <p:cNvPr id="3" name="다이아몬드 2"/>
+          <p:cNvSpPr/>
+          <p:nvPr/>
+        </p:nvSpPr>
+        <p:spPr>
+          <a:xfrm>
+            <a:off x="2160637" y="2664023"/>
+            <a:ext cx="2070105" cy="1152128"/>
+          </a:xfrm>
+          <a:prstGeom prst="diamond">
+            <a:avLst/>
+          </a:prstGeom>
+          <a:solidFill>
+            <a:schemeClr val="accent1">
+              <a:lumMod val="20000"/>
+              <a:lumOff val="80000"/>
+            </a:schemeClr>
+          </a:solidFill>
+        </p:spPr>
+        <p:style>
+          <a:lnRef idx="2">
+            <a:schemeClr val="accent1">
+              <a:shade val="50000"/>
+            </a:schemeClr>
+          </a:lnRef>
+          <a:fillRef idx="1">
+            <a:schemeClr val="accent1"/>
+          </a:fillRef>
+          <a:effectRef idx="0">
+            <a:schemeClr val="accent1"/>
+          </a:effectRef>
+          <a:fontRef idx="minor">
+            <a:schemeClr val="lt1"/>
+          </a:fontRef>
+        </p:style>
+        <p:txBody>
+          <a:bodyPr rtlCol="0" anchor="ctr"/>
+          <a:lstStyle/>
+          <a:p>
+            <a:pPr algn="ctr"/>
+            <a:r>
+              <a:rPr lang="en-US" altLang="ko-KR" sz="1600" b="1" smtClean="0">
+                <a:solidFill>
+                  <a:srgbClr val="FF0000"/>
+                </a:solidFill>
+                <a:latin typeface="Cambria" pitchFamily="18" charset="0"/>
+                <a:ea typeface="Cambria" pitchFamily="18" charset="0"/>
+              </a:rPr>
+              <a:t>D</a:t>
+            </a:r>
+            <a:r>
+              <a:rPr lang="en-US" altLang="ko-KR" sz="1400" smtClean="0">
+                <a:solidFill>
+                  <a:schemeClr val="tx1"/>
+                </a:solidFill>
+              </a:rPr>
+              <a:t> </a:t>
+            </a:r>
+            <a:r>
+              <a:rPr lang="ko-KR" altLang="en-US" sz="1400" smtClean="0">
+                <a:solidFill>
+                  <a:schemeClr val="tx1"/>
+                </a:solidFill>
+              </a:rPr>
+              <a:t>가 </a:t>
+            </a:r>
+            <a:endParaRPr lang="en-US" altLang="ko-KR" sz="1400" smtClean="0">
+              <a:solidFill>
+                <a:schemeClr val="tx1"/>
+              </a:solidFill>
+            </a:endParaRPr>
+          </a:p>
+          <a:p>
+            <a:pPr algn="ctr"/>
+            <a:r>
+              <a:rPr lang="ko-KR" altLang="en-US" sz="1400" smtClean="0">
+                <a:solidFill>
+                  <a:schemeClr val="tx1"/>
+                </a:solidFill>
+              </a:rPr>
+              <a:t>비어있는가</a:t>
+            </a:r>
+            <a:r>
+              <a:rPr lang="en-US" altLang="ko-KR" sz="1400" smtClean="0">
+                <a:solidFill>
+                  <a:schemeClr val="tx1"/>
+                </a:solidFill>
+              </a:rPr>
+              <a:t>?</a:t>
+            </a:r>
+            <a:endParaRPr lang="ko-KR" altLang="en-US" sz="1400">
+              <a:solidFill>
+                <a:schemeClr val="tx1"/>
+              </a:solidFill>
+            </a:endParaRPr>
+          </a:p>
+        </p:txBody>
+      </p:sp>
+      <p:cxnSp>
+        <p:nvCxnSpPr>
+          <p:cNvPr id="5" name="직선 화살표 연결선 4"/>
+          <p:cNvCxnSpPr>
+            <a:stCxn id="2" idx="2"/>
+            <a:endCxn id="3" idx="0"/>
+          </p:cNvCxnSpPr>
+          <p:nvPr/>
+        </p:nvCxnSpPr>
+        <p:spPr>
+          <a:xfrm>
+            <a:off x="3195690" y="1196775"/>
+            <a:ext cx="0" cy="1467248"/>
+          </a:xfrm>
+          <a:prstGeom prst="straightConnector1">
+            <a:avLst/>
+          </a:prstGeom>
+          <a:ln w="28575">
+            <a:solidFill>
+              <a:schemeClr val="tx1"/>
+            </a:solidFill>
+            <a:tailEnd type="arrow"/>
+          </a:ln>
+        </p:spPr>
+        <p:style>
+          <a:lnRef idx="1">
+            <a:schemeClr val="accent1"/>
+          </a:lnRef>
+          <a:fillRef idx="0">
+            <a:schemeClr val="accent1"/>
+          </a:fillRef>
+          <a:effectRef idx="0">
+            <a:schemeClr val="accent1"/>
+          </a:effectRef>
+          <a:fontRef idx="minor">
+            <a:schemeClr val="tx1"/>
+          </a:fontRef>
+        </p:style>
+      </p:cxnSp>
+      <p:cxnSp>
+        <p:nvCxnSpPr>
+          <p:cNvPr id="17" name="직선 화살표 연결선 16"/>
+          <p:cNvCxnSpPr>
+            <a:stCxn id="3" idx="2"/>
+            <a:endCxn id="13" idx="0"/>
+          </p:cNvCxnSpPr>
+          <p:nvPr/>
+        </p:nvCxnSpPr>
+        <p:spPr>
+          <a:xfrm>
+            <a:off x="3195690" y="3816151"/>
+            <a:ext cx="0" cy="1407085"/>
+          </a:xfrm>
+          <a:prstGeom prst="straightConnector1">
+            <a:avLst/>
+          </a:prstGeom>
+          <a:ln w="28575">
+            <a:solidFill>
+              <a:schemeClr val="accent1">
+                <a:lumMod val="75000"/>
+              </a:schemeClr>
+            </a:solidFill>
+            <a:tailEnd type="arrow"/>
+          </a:ln>
+        </p:spPr>
+        <p:style>
+          <a:lnRef idx="1">
+            <a:schemeClr val="accent1"/>
+          </a:lnRef>
+          <a:fillRef idx="0">
+            <a:schemeClr val="accent1"/>
+          </a:fillRef>
+          <a:effectRef idx="0">
+            <a:schemeClr val="accent1"/>
+          </a:effectRef>
+          <a:fontRef idx="minor">
+            <a:schemeClr val="tx1"/>
+          </a:fontRef>
+        </p:style>
+      </p:cxnSp>
+      <p:sp>
+        <p:nvSpPr>
+          <p:cNvPr id="8" name="TextBox 7"/>
+          <p:cNvSpPr txBox="1"/>
+          <p:nvPr/>
+        </p:nvSpPr>
+        <p:spPr>
+          <a:xfrm>
+            <a:off x="2627013" y="4290137"/>
+            <a:ext cx="572677" cy="338554"/>
+          </a:xfrm>
+          <a:prstGeom prst="rect">
+            <a:avLst/>
+          </a:prstGeom>
+          <a:noFill/>
+        </p:spPr>
+        <p:txBody>
+          <a:bodyPr wrap="square" rtlCol="0">
+            <a:spAutoFit/>
+          </a:bodyPr>
+          <a:lstStyle/>
+          <a:p>
+            <a:pPr algn="ctr"/>
+            <a:r>
+              <a:rPr lang="en-US" altLang="ko-KR" sz="1600" smtClean="0">
+                <a:solidFill>
+                  <a:schemeClr val="tx2">
+                    <a:lumMod val="50000"/>
+                  </a:schemeClr>
+                </a:solidFill>
+              </a:rPr>
+              <a:t>Yes</a:t>
+            </a:r>
+            <a:endParaRPr lang="ko-KR" altLang="en-US" sz="1600">
+              <a:solidFill>
+                <a:schemeClr val="tx2">
+                  <a:lumMod val="50000"/>
+                </a:schemeClr>
+              </a:solidFill>
+            </a:endParaRPr>
+          </a:p>
+        </p:txBody>
+      </p:sp>
+      <p:sp>
+        <p:nvSpPr>
+          <p:cNvPr id="27" name="모서리가 둥근 직사각형 26"/>
+          <p:cNvSpPr/>
+          <p:nvPr/>
+        </p:nvSpPr>
+        <p:spPr>
+          <a:xfrm>
+            <a:off x="4032845" y="4154844"/>
+            <a:ext cx="2197458" cy="609139"/>
+          </a:xfrm>
+          <a:prstGeom prst="roundRect">
+            <a:avLst/>
+          </a:prstGeom>
+          <a:noFill/>
+          <a:ln>
+            <a:solidFill>
+              <a:schemeClr val="bg1">
+                <a:lumMod val="50000"/>
+              </a:schemeClr>
+            </a:solidFill>
+          </a:ln>
+        </p:spPr>
+        <p:style>
+          <a:lnRef idx="2">
+            <a:schemeClr val="accent1">
+              <a:shade val="50000"/>
+            </a:schemeClr>
+          </a:lnRef>
+          <a:fillRef idx="1">
+            <a:schemeClr val="accent1"/>
+          </a:fillRef>
+          <a:effectRef idx="0">
+            <a:schemeClr val="accent1"/>
+          </a:effectRef>
+          <a:fontRef idx="minor">
+            <a:schemeClr val="lt1"/>
+          </a:fontRef>
+        </p:style>
+        <p:txBody>
+          <a:bodyPr rtlCol="0" anchor="ctr"/>
+          <a:lstStyle/>
+          <a:p>
+            <a:pPr algn="ctr">
+              <a:lnSpc>
+                <a:spcPct val="125000"/>
+              </a:lnSpc>
+            </a:pPr>
+            <a:r>
+              <a:rPr lang="en-US" altLang="ko-KR" sz="1600" b="1" smtClean="0">
+                <a:solidFill>
+                  <a:srgbClr val="0070C0"/>
+                </a:solidFill>
+                <a:latin typeface="Cambria" pitchFamily="18" charset="0"/>
+                <a:ea typeface="Cambria" pitchFamily="18" charset="0"/>
+              </a:rPr>
+              <a:t>min(v, d) </a:t>
+            </a:r>
+            <a:r>
+              <a:rPr lang="ko-KR" altLang="en-US" sz="1600" b="1" smtClean="0">
+                <a:solidFill>
+                  <a:srgbClr val="0070C0"/>
+                </a:solidFill>
+                <a:latin typeface="Cambria Math" pitchFamily="18" charset="0"/>
+              </a:rPr>
+              <a:t>∈</a:t>
+            </a:r>
+            <a:r>
+              <a:rPr lang="ko-KR" altLang="en-US" sz="1600" b="1" smtClean="0">
+                <a:solidFill>
+                  <a:srgbClr val="0070C0"/>
+                </a:solidFill>
+                <a:latin typeface="Cambria" pitchFamily="18" charset="0"/>
+              </a:rPr>
+              <a:t> </a:t>
+            </a:r>
+            <a:r>
+              <a:rPr lang="en-US" altLang="ko-KR" sz="1600" b="1" smtClean="0">
+                <a:solidFill>
+                  <a:srgbClr val="0070C0"/>
+                </a:solidFill>
+                <a:latin typeface="Cambria" pitchFamily="18" charset="0"/>
+                <a:ea typeface="Cambria" pitchFamily="18" charset="0"/>
+              </a:rPr>
+              <a:t>D </a:t>
+            </a:r>
+            <a:r>
+              <a:rPr lang="ko-KR" altLang="en-US" sz="1600" smtClean="0">
+                <a:solidFill>
+                  <a:schemeClr val="tx1"/>
+                </a:solidFill>
+              </a:rPr>
+              <a:t>추출</a:t>
+            </a:r>
+            <a:endParaRPr lang="en-US" altLang="ko-KR" sz="1600" smtClean="0">
+              <a:solidFill>
+                <a:schemeClr val="tx1"/>
+              </a:solidFill>
+            </a:endParaRPr>
+          </a:p>
+        </p:txBody>
+      </p:sp>
+      <p:sp>
+        <p:nvSpPr>
+          <p:cNvPr id="35" name="다이아몬드 34"/>
+          <p:cNvSpPr/>
+          <p:nvPr/>
+        </p:nvSpPr>
+        <p:spPr>
+          <a:xfrm>
+            <a:off x="6022128" y="2664023"/>
+            <a:ext cx="2070105" cy="1152128"/>
+          </a:xfrm>
+          <a:prstGeom prst="diamond">
+            <a:avLst/>
+          </a:prstGeom>
+          <a:solidFill>
+            <a:schemeClr val="accent1">
+              <a:lumMod val="20000"/>
+              <a:lumOff val="80000"/>
+            </a:schemeClr>
+          </a:solidFill>
+        </p:spPr>
+        <p:style>
+          <a:lnRef idx="2">
+            <a:schemeClr val="accent1">
+              <a:shade val="50000"/>
+            </a:schemeClr>
+          </a:lnRef>
+          <a:fillRef idx="1">
+            <a:schemeClr val="accent1"/>
+          </a:fillRef>
+          <a:effectRef idx="0">
+            <a:schemeClr val="accent1"/>
+          </a:effectRef>
+          <a:fontRef idx="minor">
+            <a:schemeClr val="lt1"/>
+          </a:fontRef>
+        </p:style>
+        <p:txBody>
+          <a:bodyPr rtlCol="0" anchor="ctr"/>
+          <a:lstStyle/>
+          <a:p>
+            <a:pPr algn="ctr"/>
+            <a:r>
+              <a:rPr lang="en-US" altLang="ko-KR" sz="1600" b="1" smtClean="0">
+                <a:solidFill>
+                  <a:srgbClr val="FF0000"/>
+                </a:solidFill>
+                <a:latin typeface="Cambria" pitchFamily="18" charset="0"/>
+                <a:ea typeface="Cambria" pitchFamily="18" charset="0"/>
+              </a:rPr>
+              <a:t>(v, d)</a:t>
+            </a:r>
+            <a:r>
+              <a:rPr lang="en-US" altLang="ko-KR" sz="1400" smtClean="0">
+                <a:solidFill>
+                  <a:schemeClr val="tx1"/>
+                </a:solidFill>
+              </a:rPr>
+              <a:t> </a:t>
+            </a:r>
+            <a:r>
+              <a:rPr lang="ko-KR" altLang="en-US" sz="1400" smtClean="0">
+                <a:solidFill>
+                  <a:schemeClr val="tx1"/>
+                </a:solidFill>
+              </a:rPr>
+              <a:t>가 </a:t>
+            </a:r>
+            <a:endParaRPr lang="en-US" altLang="ko-KR" sz="1400" smtClean="0">
+              <a:solidFill>
+                <a:schemeClr val="tx1"/>
+              </a:solidFill>
+            </a:endParaRPr>
+          </a:p>
+          <a:p>
+            <a:pPr algn="ctr"/>
+            <a:r>
+              <a:rPr lang="ko-KR" altLang="en-US" sz="1400" smtClean="0">
+                <a:solidFill>
+                  <a:schemeClr val="tx1"/>
+                </a:solidFill>
+              </a:rPr>
+              <a:t>최소인가</a:t>
+            </a:r>
+            <a:r>
+              <a:rPr lang="en-US" altLang="ko-KR" sz="1400" smtClean="0">
+                <a:solidFill>
+                  <a:schemeClr val="tx1"/>
+                </a:solidFill>
+              </a:rPr>
+              <a:t>?</a:t>
+            </a:r>
+            <a:endParaRPr lang="ko-KR" altLang="en-US" sz="1400">
+              <a:solidFill>
+                <a:schemeClr val="tx1"/>
+              </a:solidFill>
+            </a:endParaRPr>
+          </a:p>
+        </p:txBody>
+      </p:sp>
+      <p:cxnSp>
+        <p:nvCxnSpPr>
+          <p:cNvPr id="44" name="직선 화살표 연결선 43"/>
+          <p:cNvCxnSpPr/>
+          <p:nvPr/>
+        </p:nvCxnSpPr>
+        <p:spPr>
+          <a:xfrm flipV="1">
+            <a:off x="6193085" y="3600127"/>
+            <a:ext cx="432048" cy="554717"/>
+          </a:xfrm>
+          <a:prstGeom prst="straightConnector1">
+            <a:avLst/>
+          </a:prstGeom>
+          <a:ln w="28575">
+            <a:solidFill>
+              <a:schemeClr val="tx1"/>
+            </a:solidFill>
+            <a:tailEnd type="arrow"/>
+          </a:ln>
+        </p:spPr>
+        <p:style>
+          <a:lnRef idx="1">
+            <a:schemeClr val="accent1"/>
+          </a:lnRef>
+          <a:fillRef idx="0">
+            <a:schemeClr val="accent1"/>
+          </a:fillRef>
+          <a:effectRef idx="0">
+            <a:schemeClr val="accent1"/>
+          </a:effectRef>
+          <a:fontRef idx="minor">
+            <a:schemeClr val="tx1"/>
+          </a:fontRef>
+        </p:style>
+      </p:cxnSp>
+      <p:sp>
+        <p:nvSpPr>
+          <p:cNvPr id="47" name="TextBox 46"/>
+          <p:cNvSpPr txBox="1"/>
+          <p:nvPr/>
+        </p:nvSpPr>
+        <p:spPr>
+          <a:xfrm>
+            <a:off x="3804968" y="3626693"/>
+            <a:ext cx="572677" cy="338554"/>
+          </a:xfrm>
+          <a:prstGeom prst="rect">
+            <a:avLst/>
+          </a:prstGeom>
+          <a:noFill/>
+        </p:spPr>
+        <p:txBody>
+          <a:bodyPr wrap="square" rtlCol="0">
+            <a:spAutoFit/>
+          </a:bodyPr>
+          <a:lstStyle/>
+          <a:p>
+            <a:pPr algn="ctr"/>
+            <a:r>
+              <a:rPr lang="en-US" altLang="ko-KR" sz="1600" smtClean="0">
+                <a:solidFill>
+                  <a:schemeClr val="tx2">
+                    <a:lumMod val="50000"/>
+                  </a:schemeClr>
+                </a:solidFill>
+              </a:rPr>
+              <a:t>No</a:t>
+            </a:r>
+            <a:endParaRPr lang="ko-KR" altLang="en-US" sz="1600">
+              <a:solidFill>
+                <a:schemeClr val="tx2">
+                  <a:lumMod val="50000"/>
+                </a:schemeClr>
+              </a:solidFill>
+            </a:endParaRPr>
+          </a:p>
+        </p:txBody>
+      </p:sp>
+      <p:sp>
+        <p:nvSpPr>
+          <p:cNvPr id="60" name="TextBox 59"/>
+          <p:cNvSpPr txBox="1"/>
+          <p:nvPr/>
+        </p:nvSpPr>
+        <p:spPr>
+          <a:xfrm>
+            <a:off x="6321861" y="2375991"/>
+            <a:ext cx="572677" cy="338554"/>
+          </a:xfrm>
+          <a:prstGeom prst="rect">
+            <a:avLst/>
+          </a:prstGeom>
+          <a:noFill/>
+        </p:spPr>
+        <p:txBody>
+          <a:bodyPr wrap="square" rtlCol="0">
+            <a:spAutoFit/>
+          </a:bodyPr>
+          <a:lstStyle/>
+          <a:p>
+            <a:pPr algn="ctr"/>
+            <a:r>
+              <a:rPr lang="en-US" altLang="ko-KR" sz="1600" smtClean="0">
+                <a:solidFill>
+                  <a:schemeClr val="tx2">
+                    <a:lumMod val="50000"/>
+                  </a:schemeClr>
+                </a:solidFill>
+              </a:rPr>
+              <a:t>Yes</a:t>
+            </a:r>
+            <a:endParaRPr lang="ko-KR" altLang="en-US" sz="1600">
+              <a:solidFill>
+                <a:schemeClr val="tx2">
+                  <a:lumMod val="50000"/>
+                </a:schemeClr>
+              </a:solidFill>
+            </a:endParaRPr>
+          </a:p>
+        </p:txBody>
+      </p:sp>
+      <p:sp>
+        <p:nvSpPr>
+          <p:cNvPr id="61" name="모서리가 둥근 직사각형 60"/>
+          <p:cNvSpPr/>
+          <p:nvPr/>
+        </p:nvSpPr>
+        <p:spPr>
+          <a:xfrm>
+            <a:off x="4131825" y="1466238"/>
+            <a:ext cx="2070105" cy="981024"/>
+          </a:xfrm>
+          <a:prstGeom prst="roundRect">
+            <a:avLst/>
+          </a:prstGeom>
+          <a:noFill/>
+          <a:ln>
+            <a:solidFill>
+              <a:schemeClr val="bg1">
+                <a:lumMod val="50000"/>
+              </a:schemeClr>
+            </a:solidFill>
+          </a:ln>
+        </p:spPr>
+        <p:style>
+          <a:lnRef idx="2">
+            <a:schemeClr val="accent1">
+              <a:shade val="50000"/>
+            </a:schemeClr>
+          </a:lnRef>
+          <a:fillRef idx="1">
+            <a:schemeClr val="accent1"/>
+          </a:fillRef>
+          <a:effectRef idx="0">
+            <a:schemeClr val="accent1"/>
+          </a:effectRef>
+          <a:fontRef idx="minor">
+            <a:schemeClr val="lt1"/>
+          </a:fontRef>
+        </p:style>
+        <p:txBody>
+          <a:bodyPr rtlCol="0" anchor="ctr"/>
+          <a:lstStyle/>
+          <a:p>
+            <a:pPr algn="ctr">
+              <a:lnSpc>
+                <a:spcPct val="125000"/>
+              </a:lnSpc>
+            </a:pPr>
+            <a:r>
+              <a:rPr lang="en-US" altLang="ko-KR" sz="1600" b="1" smtClean="0">
+                <a:solidFill>
+                  <a:srgbClr val="0070C0"/>
+                </a:solidFill>
+                <a:latin typeface="Cambria" pitchFamily="18" charset="0"/>
+                <a:ea typeface="Cambria" pitchFamily="18" charset="0"/>
+              </a:rPr>
+              <a:t>(v, d)</a:t>
+            </a:r>
+            <a:r>
+              <a:rPr lang="en-US" altLang="ko-KR" sz="1400" smtClean="0">
+                <a:solidFill>
+                  <a:schemeClr val="tx1"/>
+                </a:solidFill>
+              </a:rPr>
+              <a:t> </a:t>
+            </a:r>
+            <a:r>
+              <a:rPr lang="ko-KR" altLang="en-US" sz="1400" smtClean="0">
+                <a:solidFill>
+                  <a:schemeClr val="tx1"/>
+                </a:solidFill>
+              </a:rPr>
+              <a:t>를 기반으로</a:t>
+            </a:r>
+            <a:r>
+              <a:rPr lang="en-US" altLang="ko-KR" sz="1400" smtClean="0">
+                <a:solidFill>
+                  <a:schemeClr val="tx1"/>
+                </a:solidFill>
+              </a:rPr>
+              <a:t>,</a:t>
+            </a:r>
+            <a:r>
+              <a:rPr lang="ko-KR" altLang="en-US" sz="1400" smtClean="0">
+                <a:solidFill>
+                  <a:schemeClr val="tx1"/>
+                </a:solidFill>
+              </a:rPr>
+              <a:t> </a:t>
+            </a:r>
+            <a:endParaRPr lang="en-US" altLang="ko-KR" sz="1400" smtClean="0">
+              <a:solidFill>
+                <a:schemeClr val="tx1"/>
+              </a:solidFill>
+            </a:endParaRPr>
+          </a:p>
+          <a:p>
+            <a:pPr algn="ctr">
+              <a:lnSpc>
+                <a:spcPct val="125000"/>
+              </a:lnSpc>
+            </a:pPr>
+            <a:r>
+              <a:rPr lang="en-US" altLang="ko-KR" sz="1600" b="1" smtClean="0">
+                <a:solidFill>
+                  <a:srgbClr val="0070C0"/>
+                </a:solidFill>
+                <a:latin typeface="Cambria" pitchFamily="18" charset="0"/>
+                <a:ea typeface="Cambria" pitchFamily="18" charset="0"/>
+              </a:rPr>
+              <a:t>(v</a:t>
+            </a:r>
+            <a:r>
+              <a:rPr lang="en-US" altLang="ko-KR" sz="1600" b="1" baseline="-12000" smtClean="0">
+                <a:solidFill>
+                  <a:srgbClr val="0070C0"/>
+                </a:solidFill>
+                <a:latin typeface="Cambria" pitchFamily="18" charset="0"/>
+                <a:ea typeface="Cambria" pitchFamily="18" charset="0"/>
+              </a:rPr>
+              <a:t>i</a:t>
+            </a:r>
+            <a:r>
+              <a:rPr lang="en-US" altLang="ko-KR" sz="1600" b="1" smtClean="0">
+                <a:solidFill>
+                  <a:srgbClr val="0070C0"/>
+                </a:solidFill>
+                <a:latin typeface="Cambria" pitchFamily="18" charset="0"/>
+                <a:ea typeface="Cambria" pitchFamily="18" charset="0"/>
+              </a:rPr>
+              <a:t>, d</a:t>
+            </a:r>
+            <a:r>
+              <a:rPr lang="en-US" altLang="ko-KR" sz="1600" b="1" baseline="-12000" smtClean="0">
+                <a:solidFill>
+                  <a:srgbClr val="0070C0"/>
+                </a:solidFill>
+                <a:latin typeface="Cambria" pitchFamily="18" charset="0"/>
+                <a:ea typeface="Cambria" pitchFamily="18" charset="0"/>
+              </a:rPr>
+              <a:t>i</a:t>
+            </a:r>
+            <a:r>
+              <a:rPr lang="en-US" altLang="ko-KR" sz="1600" b="1" smtClean="0">
+                <a:solidFill>
+                  <a:srgbClr val="0070C0"/>
+                </a:solidFill>
+                <a:latin typeface="Cambria" pitchFamily="18" charset="0"/>
+                <a:ea typeface="Cambria" pitchFamily="18" charset="0"/>
+              </a:rPr>
+              <a:t>)</a:t>
+            </a:r>
+            <a:r>
+              <a:rPr lang="en-US" altLang="ko-KR" sz="1400" smtClean="0">
+                <a:solidFill>
+                  <a:schemeClr val="tx1"/>
+                </a:solidFill>
+              </a:rPr>
+              <a:t> </a:t>
+            </a:r>
+            <a:r>
+              <a:rPr lang="ko-KR" altLang="en-US" sz="1400" smtClean="0">
+                <a:solidFill>
+                  <a:schemeClr val="tx1"/>
+                </a:solidFill>
+              </a:rPr>
+              <a:t>들을 </a:t>
+            </a:r>
+            <a:r>
+              <a:rPr lang="en-US" altLang="ko-KR" sz="1600" b="1" smtClean="0">
+                <a:solidFill>
+                  <a:srgbClr val="0070C0"/>
+                </a:solidFill>
+                <a:latin typeface="Cambria" pitchFamily="18" charset="0"/>
+                <a:ea typeface="Cambria" pitchFamily="18" charset="0"/>
+              </a:rPr>
+              <a:t>D</a:t>
+            </a:r>
+            <a:r>
+              <a:rPr lang="en-US" altLang="ko-KR" sz="1400" smtClean="0">
+                <a:solidFill>
+                  <a:schemeClr val="tx1"/>
+                </a:solidFill>
+              </a:rPr>
+              <a:t> </a:t>
+            </a:r>
+            <a:r>
+              <a:rPr lang="ko-KR" altLang="en-US" sz="1400" smtClean="0">
+                <a:solidFill>
+                  <a:schemeClr val="tx1"/>
+                </a:solidFill>
+              </a:rPr>
+              <a:t>에 추가</a:t>
+            </a:r>
+            <a:endParaRPr lang="en-US" altLang="ko-KR" sz="1400" smtClean="0">
+              <a:solidFill>
+                <a:schemeClr val="tx1"/>
+              </a:solidFill>
+            </a:endParaRPr>
+          </a:p>
+        </p:txBody>
+      </p:sp>
+      <p:cxnSp>
+        <p:nvCxnSpPr>
+          <p:cNvPr id="62" name="직선 화살표 연결선 61"/>
+          <p:cNvCxnSpPr>
+            <a:stCxn id="35" idx="1"/>
+            <a:endCxn id="3" idx="3"/>
+          </p:cNvCxnSpPr>
+          <p:nvPr/>
+        </p:nvCxnSpPr>
+        <p:spPr>
+          <a:xfrm flipH="1">
+            <a:off x="4230742" y="3240087"/>
+            <a:ext cx="1791386" cy="0"/>
+          </a:xfrm>
+          <a:prstGeom prst="straightConnector1">
+            <a:avLst/>
+          </a:prstGeom>
+          <a:ln w="28575">
+            <a:solidFill>
+              <a:schemeClr val="accent1">
+                <a:lumMod val="75000"/>
+              </a:schemeClr>
+            </a:solidFill>
+            <a:prstDash val="dash"/>
+            <a:tailEnd type="arrow"/>
+          </a:ln>
+        </p:spPr>
+        <p:style>
+          <a:lnRef idx="1">
+            <a:schemeClr val="accent1"/>
+          </a:lnRef>
+          <a:fillRef idx="0">
+            <a:schemeClr val="accent1"/>
+          </a:fillRef>
+          <a:effectRef idx="0">
+            <a:schemeClr val="accent1"/>
+          </a:effectRef>
+          <a:fontRef idx="minor">
+            <a:schemeClr val="tx1"/>
+          </a:fontRef>
+        </p:style>
+      </p:cxnSp>
+      <p:sp>
+        <p:nvSpPr>
+          <p:cNvPr id="65" name="TextBox 64"/>
+          <p:cNvSpPr txBox="1"/>
+          <p:nvPr/>
+        </p:nvSpPr>
+        <p:spPr>
+          <a:xfrm>
+            <a:off x="4845235" y="2900367"/>
+            <a:ext cx="572677" cy="338554"/>
+          </a:xfrm>
+          <a:prstGeom prst="rect">
+            <a:avLst/>
+          </a:prstGeom>
+          <a:noFill/>
+        </p:spPr>
+        <p:txBody>
+          <a:bodyPr wrap="square" rtlCol="0">
+            <a:spAutoFit/>
+          </a:bodyPr>
+          <a:lstStyle/>
+          <a:p>
+            <a:pPr algn="ctr"/>
+            <a:r>
+              <a:rPr lang="en-US" altLang="ko-KR" sz="1600" smtClean="0">
+                <a:solidFill>
+                  <a:schemeClr val="tx2">
+                    <a:lumMod val="50000"/>
+                  </a:schemeClr>
+                </a:solidFill>
+              </a:rPr>
+              <a:t>No</a:t>
+            </a:r>
+            <a:endParaRPr lang="ko-KR" altLang="en-US" sz="1600">
+              <a:solidFill>
+                <a:schemeClr val="tx2">
+                  <a:lumMod val="50000"/>
+                </a:schemeClr>
+              </a:solidFill>
+            </a:endParaRPr>
+          </a:p>
+        </p:txBody>
+      </p:sp>
+      <p:cxnSp>
+        <p:nvCxnSpPr>
+          <p:cNvPr id="66" name="직선 화살표 연결선 65"/>
+          <p:cNvCxnSpPr/>
+          <p:nvPr/>
+        </p:nvCxnSpPr>
+        <p:spPr>
+          <a:xfrm flipH="1">
+            <a:off x="3672805" y="2381877"/>
+            <a:ext cx="504056" cy="518490"/>
+          </a:xfrm>
+          <a:prstGeom prst="straightConnector1">
+            <a:avLst/>
+          </a:prstGeom>
+          <a:ln w="28575">
+            <a:solidFill>
+              <a:schemeClr val="tx1"/>
+            </a:solidFill>
+            <a:tailEnd type="arrow"/>
+          </a:ln>
+        </p:spPr>
+        <p:style>
+          <a:lnRef idx="1">
+            <a:schemeClr val="accent1"/>
+          </a:lnRef>
+          <a:fillRef idx="0">
+            <a:schemeClr val="accent1"/>
+          </a:fillRef>
+          <a:effectRef idx="0">
+            <a:schemeClr val="accent1"/>
+          </a:effectRef>
+          <a:fontRef idx="minor">
+            <a:schemeClr val="tx1"/>
+          </a:fontRef>
+        </p:style>
+      </p:cxnSp>
+      <p:sp>
+        <p:nvSpPr>
+          <p:cNvPr id="70" name="타원 69"/>
+          <p:cNvSpPr/>
+          <p:nvPr/>
+        </p:nvSpPr>
+        <p:spPr>
+          <a:xfrm>
+            <a:off x="1807026" y="250566"/>
+            <a:ext cx="288032" cy="288032"/>
+          </a:xfrm>
+          <a:prstGeom prst="ellipse">
+            <a:avLst/>
+          </a:prstGeom>
+          <a:noFill/>
+          <a:ln w="19050">
+            <a:solidFill>
+              <a:schemeClr val="tx1"/>
+            </a:solidFill>
+          </a:ln>
+        </p:spPr>
+        <p:style>
+          <a:lnRef idx="2">
+            <a:schemeClr val="accent1">
+              <a:shade val="50000"/>
+            </a:schemeClr>
+          </a:lnRef>
+          <a:fillRef idx="1">
+            <a:schemeClr val="accent1"/>
+          </a:fillRef>
+          <a:effectRef idx="0">
+            <a:schemeClr val="accent1"/>
+          </a:effectRef>
+          <a:fontRef idx="minor">
+            <a:schemeClr val="lt1"/>
+          </a:fontRef>
+        </p:style>
+        <p:txBody>
+          <a:bodyPr rtlCol="0" anchor="ctr"/>
+          <a:lstStyle/>
+          <a:p>
+            <a:pPr algn="ctr"/>
+            <a:r>
+              <a:rPr lang="en-US" altLang="ko-KR" sz="1600" smtClean="0">
+                <a:solidFill>
+                  <a:schemeClr val="tx1"/>
+                </a:solidFill>
+              </a:rPr>
+              <a:t>1</a:t>
+            </a:r>
+            <a:endParaRPr lang="ko-KR" altLang="en-US" sz="1600">
+              <a:solidFill>
+                <a:schemeClr val="tx1"/>
+              </a:solidFill>
+            </a:endParaRPr>
+          </a:p>
+        </p:txBody>
+      </p:sp>
+      <p:sp>
+        <p:nvSpPr>
+          <p:cNvPr id="71" name="타원 70"/>
+          <p:cNvSpPr/>
+          <p:nvPr/>
+        </p:nvSpPr>
+        <p:spPr>
+          <a:xfrm>
+            <a:off x="1807026" y="3096071"/>
+            <a:ext cx="288032" cy="288032"/>
+          </a:xfrm>
+          <a:prstGeom prst="ellipse">
+            <a:avLst/>
+          </a:prstGeom>
+          <a:noFill/>
+          <a:ln w="19050">
+            <a:solidFill>
+              <a:schemeClr val="tx1"/>
+            </a:solidFill>
+          </a:ln>
+        </p:spPr>
+        <p:style>
+          <a:lnRef idx="2">
+            <a:schemeClr val="accent1">
+              <a:shade val="50000"/>
+            </a:schemeClr>
+          </a:lnRef>
+          <a:fillRef idx="1">
+            <a:schemeClr val="accent1"/>
+          </a:fillRef>
+          <a:effectRef idx="0">
+            <a:schemeClr val="accent1"/>
+          </a:effectRef>
+          <a:fontRef idx="minor">
+            <a:schemeClr val="lt1"/>
+          </a:fontRef>
+        </p:style>
+        <p:txBody>
+          <a:bodyPr rtlCol="0" anchor="ctr"/>
+          <a:lstStyle/>
+          <a:p>
+            <a:pPr algn="ctr"/>
+            <a:r>
+              <a:rPr lang="en-US" altLang="ko-KR" sz="1600" smtClean="0">
+                <a:solidFill>
+                  <a:schemeClr val="tx1"/>
+                </a:solidFill>
+              </a:rPr>
+              <a:t>2</a:t>
+            </a:r>
+            <a:endParaRPr lang="ko-KR" altLang="en-US" sz="1600">
+              <a:solidFill>
+                <a:schemeClr val="tx1"/>
+              </a:solidFill>
+            </a:endParaRPr>
+          </a:p>
+        </p:txBody>
+      </p:sp>
+      <p:sp>
+        <p:nvSpPr>
+          <p:cNvPr id="72" name="타원 71"/>
+          <p:cNvSpPr/>
+          <p:nvPr/>
+        </p:nvSpPr>
+        <p:spPr>
+          <a:xfrm>
+            <a:off x="4982419" y="4819222"/>
+            <a:ext cx="288032" cy="288032"/>
+          </a:xfrm>
+          <a:prstGeom prst="ellipse">
+            <a:avLst/>
+          </a:prstGeom>
+          <a:noFill/>
+          <a:ln w="19050">
+            <a:solidFill>
+              <a:schemeClr val="tx1"/>
+            </a:solidFill>
+          </a:ln>
+        </p:spPr>
+        <p:style>
+          <a:lnRef idx="2">
+            <a:schemeClr val="accent1">
+              <a:shade val="50000"/>
+            </a:schemeClr>
+          </a:lnRef>
+          <a:fillRef idx="1">
+            <a:schemeClr val="accent1"/>
+          </a:fillRef>
+          <a:effectRef idx="0">
+            <a:schemeClr val="accent1"/>
+          </a:effectRef>
+          <a:fontRef idx="minor">
+            <a:schemeClr val="lt1"/>
+          </a:fontRef>
+        </p:style>
+        <p:txBody>
+          <a:bodyPr rtlCol="0" anchor="ctr"/>
+          <a:lstStyle/>
+          <a:p>
+            <a:pPr algn="ctr"/>
+            <a:r>
+              <a:rPr lang="en-US" altLang="ko-KR" sz="1600" smtClean="0">
+                <a:solidFill>
+                  <a:schemeClr val="tx1"/>
+                </a:solidFill>
+              </a:rPr>
+              <a:t>3</a:t>
+            </a:r>
+            <a:endParaRPr lang="ko-KR" altLang="en-US" sz="1600">
+              <a:solidFill>
+                <a:schemeClr val="tx1"/>
+              </a:solidFill>
+            </a:endParaRPr>
+          </a:p>
+        </p:txBody>
+      </p:sp>
+      <p:sp>
+        <p:nvSpPr>
+          <p:cNvPr id="73" name="타원 72"/>
+          <p:cNvSpPr/>
+          <p:nvPr/>
+        </p:nvSpPr>
+        <p:spPr>
+          <a:xfrm>
+            <a:off x="5022861" y="1141695"/>
+            <a:ext cx="288032" cy="288032"/>
+          </a:xfrm>
+          <a:prstGeom prst="ellipse">
+            <a:avLst/>
+          </a:prstGeom>
+          <a:noFill/>
+          <a:ln w="19050">
+            <a:solidFill>
+              <a:schemeClr val="tx1"/>
+            </a:solidFill>
+          </a:ln>
+        </p:spPr>
+        <p:style>
+          <a:lnRef idx="2">
+            <a:schemeClr val="accent1">
+              <a:shade val="50000"/>
+            </a:schemeClr>
+          </a:lnRef>
+          <a:fillRef idx="1">
+            <a:schemeClr val="accent1"/>
+          </a:fillRef>
+          <a:effectRef idx="0">
+            <a:schemeClr val="accent1"/>
+          </a:effectRef>
+          <a:fontRef idx="minor">
+            <a:schemeClr val="lt1"/>
+          </a:fontRef>
+        </p:style>
+        <p:txBody>
+          <a:bodyPr rtlCol="0" anchor="ctr"/>
+          <a:lstStyle/>
+          <a:p>
+            <a:pPr algn="ctr"/>
+            <a:r>
+              <a:rPr lang="en-US" altLang="ko-KR" sz="1600" smtClean="0">
+                <a:solidFill>
+                  <a:schemeClr val="tx1"/>
+                </a:solidFill>
+              </a:rPr>
+              <a:t>5</a:t>
+            </a:r>
+            <a:endParaRPr lang="ko-KR" altLang="en-US" sz="1600">
+              <a:solidFill>
+                <a:schemeClr val="tx1"/>
+              </a:solidFill>
+            </a:endParaRPr>
+          </a:p>
+        </p:txBody>
+      </p:sp>
+      <p:sp>
+        <p:nvSpPr>
+          <p:cNvPr id="74" name="타원 73"/>
+          <p:cNvSpPr/>
+          <p:nvPr/>
+        </p:nvSpPr>
+        <p:spPr>
+          <a:xfrm>
+            <a:off x="7777261" y="2770917"/>
+            <a:ext cx="288032" cy="288032"/>
+          </a:xfrm>
+          <a:prstGeom prst="ellipse">
+            <a:avLst/>
+          </a:prstGeom>
+          <a:noFill/>
+          <a:ln w="19050">
+            <a:solidFill>
+              <a:schemeClr val="tx1"/>
+            </a:solidFill>
+          </a:ln>
+        </p:spPr>
+        <p:style>
+          <a:lnRef idx="2">
+            <a:schemeClr val="accent1">
+              <a:shade val="50000"/>
+            </a:schemeClr>
+          </a:lnRef>
+          <a:fillRef idx="1">
+            <a:schemeClr val="accent1"/>
+          </a:fillRef>
+          <a:effectRef idx="0">
+            <a:schemeClr val="accent1"/>
+          </a:effectRef>
+          <a:fontRef idx="minor">
+            <a:schemeClr val="lt1"/>
+          </a:fontRef>
+        </p:style>
+        <p:txBody>
+          <a:bodyPr rtlCol="0" anchor="ctr"/>
+          <a:lstStyle/>
+          <a:p>
+            <a:pPr algn="ctr"/>
+            <a:r>
+              <a:rPr lang="en-US" altLang="ko-KR" sz="1600" smtClean="0">
+                <a:solidFill>
+                  <a:schemeClr val="tx1"/>
+                </a:solidFill>
+              </a:rPr>
+              <a:t>4</a:t>
+            </a:r>
+            <a:endParaRPr lang="ko-KR" altLang="en-US" sz="1600">
+              <a:solidFill>
+                <a:schemeClr val="tx1"/>
+              </a:solidFill>
+            </a:endParaRPr>
+          </a:p>
+        </p:txBody>
+      </p:sp>
+      <p:sp>
+        <p:nvSpPr>
+          <p:cNvPr id="75" name="타원 74"/>
+          <p:cNvSpPr/>
+          <p:nvPr/>
+        </p:nvSpPr>
+        <p:spPr>
+          <a:xfrm>
+            <a:off x="1807026" y="5239773"/>
+            <a:ext cx="288032" cy="288032"/>
+          </a:xfrm>
+          <a:prstGeom prst="ellipse">
+            <a:avLst/>
+          </a:prstGeom>
+          <a:noFill/>
+          <a:ln w="19050">
+            <a:solidFill>
+              <a:schemeClr val="tx1"/>
+            </a:solidFill>
+          </a:ln>
+        </p:spPr>
+        <p:style>
+          <a:lnRef idx="2">
+            <a:schemeClr val="accent1">
+              <a:shade val="50000"/>
+            </a:schemeClr>
+          </a:lnRef>
+          <a:fillRef idx="1">
+            <a:schemeClr val="accent1"/>
+          </a:fillRef>
+          <a:effectRef idx="0">
+            <a:schemeClr val="accent1"/>
+          </a:effectRef>
+          <a:fontRef idx="minor">
+            <a:schemeClr val="lt1"/>
+          </a:fontRef>
+        </p:style>
+        <p:txBody>
+          <a:bodyPr rtlCol="0" anchor="ctr"/>
+          <a:lstStyle/>
+          <a:p>
+            <a:pPr algn="ctr"/>
+            <a:r>
+              <a:rPr lang="en-US" altLang="ko-KR" sz="1600" smtClean="0">
+                <a:solidFill>
+                  <a:schemeClr val="tx1"/>
+                </a:solidFill>
+              </a:rPr>
+              <a:t>6</a:t>
+            </a:r>
+            <a:endParaRPr lang="ko-KR" altLang="en-US" sz="1600">
+              <a:solidFill>
+                <a:schemeClr val="tx1"/>
+              </a:solidFill>
+            </a:endParaRPr>
+          </a:p>
+        </p:txBody>
+      </p:sp>
+    </p:spTree>
+    <p:extLst>
+      <p:ext uri="{BB962C8B-B14F-4D97-AF65-F5344CB8AC3E}">
+        <p14:creationId xmlns:p14="http://schemas.microsoft.com/office/powerpoint/2010/main" val="945582495"/>
+      </p:ext>
+    </p:extLst>
+  </p:cSld>
+  <p:clrMapOvr>
+    <a:masterClrMapping/>
+  </p:clrMapOvr>
+</p:sld>
+</file>
+
 <file path=ppt/slides/slide4.xml><?xml version="1.0" encoding="utf-8"?>
 <p:sld xmlns:a="http://schemas.openxmlformats.org/drawingml/2006/main" xmlns:r="http://schemas.openxmlformats.org/officeDocument/2006/relationships" xmlns:p="http://schemas.openxmlformats.org/presentationml/2006/main">
   <p:cSld>
@@ -41776,76 +43330,16 @@
         <a:srgbClr val="800080"/>
       </a:folHlink>
     </a:clrScheme>
-    <a:fontScheme name="Office">
+    <a:fontScheme name="나눔스퀘어 ExtraBold">
       <a:majorFont>
-        <a:latin typeface="맑은 고딕"/>
-        <a:ea typeface=""/>
+        <a:latin typeface="나눔스퀘어 ExtraBold"/>
+        <a:ea typeface="나눔스퀘어 ExtraBold"/>
         <a:cs typeface=""/>
-        <a:font script="Jpan" typeface="ＭＳ Ｐゴシック"/>
-        <a:font script="Hang" typeface="맑은 고딕"/>
-        <a:font script="Hans" typeface="宋体"/>
-        <a:font script="Hant" typeface="新細明體"/>
-        <a:font script="Arab" typeface="Times New Roman"/>
-        <a:font script="Hebr" typeface="Times New Roman"/>
-        <a:font script="Thai" typeface="Angsana New"/>
-        <a:font script="Ethi" typeface="Nyala"/>
-        <a:font script="Beng" typeface="Vrinda"/>
-        <a:font script="Gujr" typeface="Shruti"/>
-        <a:font script="Khmr" typeface="MoolBoran"/>
-        <a:font script="Knda" typeface="Tunga"/>
-        <a:font script="Guru" typeface="Raavi"/>
-        <a:font script="Cans" typeface="Euphemia"/>
-        <a:font script="Cher" typeface="Plantagenet Cherokee"/>
-        <a:font script="Yiii" typeface="Microsoft Yi Baiti"/>
-        <a:font script="Tibt" typeface="Microsoft Himalaya"/>
-        <a:font script="Thaa" typeface="MV Boli"/>
-        <a:font script="Deva" typeface="Mangal"/>
-        <a:font script="Telu" typeface="Gautami"/>
-        <a:font script="Taml" typeface="Latha"/>
-        <a:font script="Syrc" typeface="Estrangelo Edessa"/>
-        <a:font script="Orya" typeface="Kalinga"/>
-        <a:font script="Mlym" typeface="Kartika"/>
-        <a:font script="Laoo" typeface="DokChampa"/>
-        <a:font script="Sinh" typeface="Iskoola Pota"/>
-        <a:font script="Mong" typeface="Mongolian Baiti"/>
-        <a:font script="Viet" typeface="Times New Roman"/>
-        <a:font script="Uigh" typeface="Microsoft Uighur"/>
-        <a:font script="Geor" typeface="Sylfaen"/>
       </a:majorFont>
       <a:minorFont>
-        <a:latin typeface="맑은 고딕"/>
-        <a:ea typeface=""/>
+        <a:latin typeface="나눔스퀘어 ExtraBold"/>
+        <a:ea typeface="나눔스퀘어 ExtraBold"/>
         <a:cs typeface=""/>
-        <a:font script="Jpan" typeface="ＭＳ Ｐゴシック"/>
-        <a:font script="Hang" typeface="맑은 고딕"/>
-        <a:font script="Hans" typeface="宋体"/>
-        <a:font script="Hant" typeface="新細明體"/>
-        <a:font script="Arab" typeface="Arial"/>
-        <a:font script="Hebr" typeface="Arial"/>
-        <a:font script="Thai" typeface="Cordia New"/>
-        <a:font script="Ethi" typeface="Nyala"/>
-        <a:font script="Beng" typeface="Vrinda"/>
-        <a:font script="Gujr" typeface="Shruti"/>
-        <a:font script="Khmr" typeface="DaunPenh"/>
-        <a:font script="Knda" typeface="Tunga"/>
-        <a:font script="Guru" typeface="Raavi"/>
-        <a:font script="Cans" typeface="Euphemia"/>
-        <a:font script="Cher" typeface="Plantagenet Cherokee"/>
-        <a:font script="Yiii" typeface="Microsoft Yi Baiti"/>
-        <a:font script="Tibt" typeface="Microsoft Himalaya"/>
-        <a:font script="Thaa" typeface="MV Boli"/>
-        <a:font script="Deva" typeface="Mangal"/>
-        <a:font script="Telu" typeface="Gautami"/>
-        <a:font script="Taml" typeface="Latha"/>
-        <a:font script="Syrc" typeface="Estrangelo Edessa"/>
-        <a:font script="Orya" typeface="Kalinga"/>
-        <a:font script="Mlym" typeface="Kartika"/>
-        <a:font script="Laoo" typeface="DokChampa"/>
-        <a:font script="Sinh" typeface="Iskoola Pota"/>
-        <a:font script="Mong" typeface="Mongolian Baiti"/>
-        <a:font script="Viet" typeface="Arial"/>
-        <a:font script="Uigh" typeface="Microsoft Uighur"/>
-        <a:font script="Geor" typeface="Sylfaen"/>
       </a:minorFont>
     </a:fontScheme>
     <a:fmtScheme name="Office">

</xml_diff>

<commit_message>
update css - dl padding left - header margin top - ol margin left
update post
- algo 3

new post
- algo 4
</commit_message>
<xml_diff>
--- a/assets/etc/이미지제작용.pptx
+++ b/assets/etc/이미지제작용.pptx
@@ -5,7 +5,7 @@
     <p:sldMasterId id="2147483648" r:id="rId1"/>
   </p:sldMasterIdLst>
   <p:notesMasterIdLst>
-    <p:notesMasterId r:id="rId32"/>
+    <p:notesMasterId r:id="rId33"/>
   </p:notesMasterIdLst>
   <p:sldIdLst>
     <p:sldId id="256" r:id="rId2"/>
@@ -38,6 +38,7 @@
     <p:sldId id="284" r:id="rId29"/>
     <p:sldId id="285" r:id="rId30"/>
     <p:sldId id="286" r:id="rId31"/>
+    <p:sldId id="287" r:id="rId32"/>
   </p:sldIdLst>
   <p:sldSz cx="11522075" cy="6480175"/>
   <p:notesSz cx="6858000" cy="9144000"/>
@@ -221,7 +222,7 @@
           <a:p>
             <a:fld id="{5292B011-278F-46AA-8F5C-4B7DC81D9EF2}" type="datetimeFigureOut">
               <a:rPr lang="ko-KR" altLang="en-US" smtClean="0"/>
-              <a:t>2024-04-03</a:t>
+              <a:t>2024-04-04</a:t>
             </a:fld>
             <a:endParaRPr lang="ko-KR" altLang="en-US"/>
           </a:p>
@@ -1090,7 +1091,7 @@
           <a:p>
             <a:fld id="{10B01263-E573-4C51-9265-094B7818CB45}" type="datetimeFigureOut">
               <a:rPr lang="ko-KR" altLang="en-US" smtClean="0"/>
-              <a:t>2024-04-03</a:t>
+              <a:t>2024-04-04</a:t>
             </a:fld>
             <a:endParaRPr lang="ko-KR" altLang="en-US"/>
           </a:p>
@@ -1260,7 +1261,7 @@
           <a:p>
             <a:fld id="{10B01263-E573-4C51-9265-094B7818CB45}" type="datetimeFigureOut">
               <a:rPr lang="ko-KR" altLang="en-US" smtClean="0"/>
-              <a:t>2024-04-03</a:t>
+              <a:t>2024-04-04</a:t>
             </a:fld>
             <a:endParaRPr lang="ko-KR" altLang="en-US"/>
           </a:p>
@@ -1440,7 +1441,7 @@
           <a:p>
             <a:fld id="{10B01263-E573-4C51-9265-094B7818CB45}" type="datetimeFigureOut">
               <a:rPr lang="ko-KR" altLang="en-US" smtClean="0"/>
-              <a:t>2024-04-03</a:t>
+              <a:t>2024-04-04</a:t>
             </a:fld>
             <a:endParaRPr lang="ko-KR" altLang="en-US"/>
           </a:p>
@@ -1610,7 +1611,7 @@
           <a:p>
             <a:fld id="{10B01263-E573-4C51-9265-094B7818CB45}" type="datetimeFigureOut">
               <a:rPr lang="ko-KR" altLang="en-US" smtClean="0"/>
-              <a:t>2024-04-03</a:t>
+              <a:t>2024-04-04</a:t>
             </a:fld>
             <a:endParaRPr lang="ko-KR" altLang="en-US"/>
           </a:p>
@@ -1856,7 +1857,7 @@
           <a:p>
             <a:fld id="{10B01263-E573-4C51-9265-094B7818CB45}" type="datetimeFigureOut">
               <a:rPr lang="ko-KR" altLang="en-US" smtClean="0"/>
-              <a:t>2024-04-03</a:t>
+              <a:t>2024-04-04</a:t>
             </a:fld>
             <a:endParaRPr lang="ko-KR" altLang="en-US"/>
           </a:p>
@@ -2144,7 +2145,7 @@
           <a:p>
             <a:fld id="{10B01263-E573-4C51-9265-094B7818CB45}" type="datetimeFigureOut">
               <a:rPr lang="ko-KR" altLang="en-US" smtClean="0"/>
-              <a:t>2024-04-03</a:t>
+              <a:t>2024-04-04</a:t>
             </a:fld>
             <a:endParaRPr lang="ko-KR" altLang="en-US"/>
           </a:p>
@@ -2566,7 +2567,7 @@
           <a:p>
             <a:fld id="{10B01263-E573-4C51-9265-094B7818CB45}" type="datetimeFigureOut">
               <a:rPr lang="ko-KR" altLang="en-US" smtClean="0"/>
-              <a:t>2024-04-03</a:t>
+              <a:t>2024-04-04</a:t>
             </a:fld>
             <a:endParaRPr lang="ko-KR" altLang="en-US"/>
           </a:p>
@@ -2684,7 +2685,7 @@
           <a:p>
             <a:fld id="{10B01263-E573-4C51-9265-094B7818CB45}" type="datetimeFigureOut">
               <a:rPr lang="ko-KR" altLang="en-US" smtClean="0"/>
-              <a:t>2024-04-03</a:t>
+              <a:t>2024-04-04</a:t>
             </a:fld>
             <a:endParaRPr lang="ko-KR" altLang="en-US"/>
           </a:p>
@@ -2779,7 +2780,7 @@
           <a:p>
             <a:fld id="{10B01263-E573-4C51-9265-094B7818CB45}" type="datetimeFigureOut">
               <a:rPr lang="ko-KR" altLang="en-US" smtClean="0"/>
-              <a:t>2024-04-03</a:t>
+              <a:t>2024-04-04</a:t>
             </a:fld>
             <a:endParaRPr lang="ko-KR" altLang="en-US"/>
           </a:p>
@@ -3056,7 +3057,7 @@
           <a:p>
             <a:fld id="{10B01263-E573-4C51-9265-094B7818CB45}" type="datetimeFigureOut">
               <a:rPr lang="ko-KR" altLang="en-US" smtClean="0"/>
-              <a:t>2024-04-03</a:t>
+              <a:t>2024-04-04</a:t>
             </a:fld>
             <a:endParaRPr lang="ko-KR" altLang="en-US"/>
           </a:p>
@@ -3309,7 +3310,7 @@
           <a:p>
             <a:fld id="{10B01263-E573-4C51-9265-094B7818CB45}" type="datetimeFigureOut">
               <a:rPr lang="ko-KR" altLang="en-US" smtClean="0"/>
-              <a:t>2024-04-03</a:t>
+              <a:t>2024-04-04</a:t>
             </a:fld>
             <a:endParaRPr lang="ko-KR" altLang="en-US"/>
           </a:p>
@@ -3522,7 +3523,7 @@
           <a:p>
             <a:fld id="{10B01263-E573-4C51-9265-094B7818CB45}" type="datetimeFigureOut">
               <a:rPr lang="ko-KR" altLang="en-US" smtClean="0"/>
-              <a:t>2024-04-03</a:t>
+              <a:t>2024-04-04</a:t>
             </a:fld>
             <a:endParaRPr lang="ko-KR" altLang="en-US"/>
           </a:p>
@@ -35141,6 +35142,1005 @@
 </p:sld>
 </file>
 
+<file path=ppt/slides/slide31.xml><?xml version="1.0" encoding="utf-8"?>
+<p:sld xmlns:a="http://schemas.openxmlformats.org/drawingml/2006/main" xmlns:r="http://schemas.openxmlformats.org/officeDocument/2006/relationships" xmlns:p="http://schemas.openxmlformats.org/presentationml/2006/main">
+  <p:cSld>
+    <p:spTree>
+      <p:nvGrpSpPr>
+        <p:cNvPr id="1" name=""/>
+        <p:cNvGrpSpPr/>
+        <p:nvPr/>
+      </p:nvGrpSpPr>
+      <p:grpSpPr>
+        <a:xfrm>
+          <a:off x="0" y="0"/>
+          <a:ext cx="0" cy="0"/>
+          <a:chOff x="0" y="0"/>
+          <a:chExt cx="0" cy="0"/>
+        </a:xfrm>
+      </p:grpSpPr>
+      <p:sp>
+        <p:nvSpPr>
+          <p:cNvPr id="2" name="모서리가 둥근 직사각형 1"/>
+          <p:cNvSpPr/>
+          <p:nvPr/>
+        </p:nvSpPr>
+        <p:spPr>
+          <a:xfrm>
+            <a:off x="4331885" y="372889"/>
+            <a:ext cx="2755311" cy="810764"/>
+          </a:xfrm>
+          <a:prstGeom prst="roundRect">
+            <a:avLst/>
+          </a:prstGeom>
+          <a:noFill/>
+          <a:ln>
+            <a:solidFill>
+              <a:schemeClr val="bg1">
+                <a:lumMod val="50000"/>
+              </a:schemeClr>
+            </a:solidFill>
+          </a:ln>
+        </p:spPr>
+        <p:style>
+          <a:lnRef idx="2">
+            <a:schemeClr val="accent1">
+              <a:shade val="50000"/>
+            </a:schemeClr>
+          </a:lnRef>
+          <a:fillRef idx="1">
+            <a:schemeClr val="accent1"/>
+          </a:fillRef>
+          <a:effectRef idx="0">
+            <a:schemeClr val="accent1"/>
+          </a:effectRef>
+          <a:fontRef idx="minor">
+            <a:schemeClr val="lt1"/>
+          </a:fontRef>
+        </p:style>
+        <p:txBody>
+          <a:bodyPr rtlCol="0" anchor="ctr"/>
+          <a:lstStyle/>
+          <a:p>
+            <a:pPr algn="ctr">
+              <a:lnSpc>
+                <a:spcPct val="125000"/>
+              </a:lnSpc>
+            </a:pPr>
+            <a:r>
+              <a:rPr lang="ko-KR" altLang="en-US" sz="1600" smtClean="0">
+                <a:solidFill>
+                  <a:schemeClr val="tx1"/>
+                </a:solidFill>
+              </a:rPr>
+              <a:t>풀고 싶은 </a:t>
+            </a:r>
+            <a:r>
+              <a:rPr lang="ko-KR" altLang="en-US" sz="1600" smtClean="0">
+                <a:solidFill>
+                  <a:srgbClr val="FF0000"/>
+                </a:solidFill>
+              </a:rPr>
+              <a:t>가짜 문제 </a:t>
+            </a:r>
+            <a:r>
+              <a:rPr lang="ko-KR" altLang="en-US" sz="1600" smtClean="0">
+                <a:solidFill>
+                  <a:schemeClr val="tx1"/>
+                </a:solidFill>
+              </a:rPr>
+              <a:t>를 정의</a:t>
+            </a:r>
+            <a:endParaRPr lang="en-US" altLang="ko-KR" sz="1600" smtClean="0">
+              <a:solidFill>
+                <a:schemeClr val="tx1"/>
+              </a:solidFill>
+            </a:endParaRPr>
+          </a:p>
+        </p:txBody>
+      </p:sp>
+      <p:cxnSp>
+        <p:nvCxnSpPr>
+          <p:cNvPr id="5" name="직선 화살표 연결선 4"/>
+          <p:cNvCxnSpPr>
+            <a:stCxn id="2" idx="2"/>
+            <a:endCxn id="26" idx="0"/>
+          </p:cNvCxnSpPr>
+          <p:nvPr/>
+        </p:nvCxnSpPr>
+        <p:spPr>
+          <a:xfrm>
+            <a:off x="5709541" y="1183653"/>
+            <a:ext cx="0" cy="400250"/>
+          </a:xfrm>
+          <a:prstGeom prst="straightConnector1">
+            <a:avLst/>
+          </a:prstGeom>
+          <a:ln w="28575">
+            <a:solidFill>
+              <a:schemeClr val="tx1"/>
+            </a:solidFill>
+            <a:tailEnd type="arrow"/>
+          </a:ln>
+        </p:spPr>
+        <p:style>
+          <a:lnRef idx="1">
+            <a:schemeClr val="accent1"/>
+          </a:lnRef>
+          <a:fillRef idx="0">
+            <a:schemeClr val="accent1"/>
+          </a:fillRef>
+          <a:effectRef idx="0">
+            <a:schemeClr val="accent1"/>
+          </a:effectRef>
+          <a:fontRef idx="minor">
+            <a:schemeClr val="tx1"/>
+          </a:fontRef>
+        </p:style>
+      </p:cxnSp>
+      <p:sp>
+        <p:nvSpPr>
+          <p:cNvPr id="70" name="타원 69"/>
+          <p:cNvSpPr/>
+          <p:nvPr/>
+        </p:nvSpPr>
+        <p:spPr>
+          <a:xfrm>
+            <a:off x="3888829" y="634255"/>
+            <a:ext cx="288032" cy="288032"/>
+          </a:xfrm>
+          <a:prstGeom prst="ellipse">
+            <a:avLst/>
+          </a:prstGeom>
+          <a:noFill/>
+          <a:ln w="19050">
+            <a:solidFill>
+              <a:schemeClr val="tx1"/>
+            </a:solidFill>
+          </a:ln>
+        </p:spPr>
+        <p:style>
+          <a:lnRef idx="2">
+            <a:schemeClr val="accent1">
+              <a:shade val="50000"/>
+            </a:schemeClr>
+          </a:lnRef>
+          <a:fillRef idx="1">
+            <a:schemeClr val="accent1"/>
+          </a:fillRef>
+          <a:effectRef idx="0">
+            <a:schemeClr val="accent1"/>
+          </a:effectRef>
+          <a:fontRef idx="minor">
+            <a:schemeClr val="lt1"/>
+          </a:fontRef>
+        </p:style>
+        <p:txBody>
+          <a:bodyPr rtlCol="0" anchor="ctr"/>
+          <a:lstStyle/>
+          <a:p>
+            <a:pPr algn="ctr"/>
+            <a:r>
+              <a:rPr lang="en-US" altLang="ko-KR" sz="1600" smtClean="0">
+                <a:solidFill>
+                  <a:schemeClr val="tx1"/>
+                </a:solidFill>
+              </a:rPr>
+              <a:t>1</a:t>
+            </a:r>
+            <a:endParaRPr lang="ko-KR" altLang="en-US" sz="1600">
+              <a:solidFill>
+                <a:schemeClr val="tx1"/>
+              </a:solidFill>
+            </a:endParaRPr>
+          </a:p>
+        </p:txBody>
+      </p:sp>
+      <p:sp>
+        <p:nvSpPr>
+          <p:cNvPr id="26" name="모서리가 둥근 직사각형 25"/>
+          <p:cNvSpPr/>
+          <p:nvPr/>
+        </p:nvSpPr>
+        <p:spPr>
+          <a:xfrm>
+            <a:off x="4331885" y="1583903"/>
+            <a:ext cx="2755311" cy="810764"/>
+          </a:xfrm>
+          <a:prstGeom prst="roundRect">
+            <a:avLst/>
+          </a:prstGeom>
+          <a:noFill/>
+          <a:ln>
+            <a:solidFill>
+              <a:schemeClr val="bg1">
+                <a:lumMod val="50000"/>
+              </a:schemeClr>
+            </a:solidFill>
+          </a:ln>
+        </p:spPr>
+        <p:style>
+          <a:lnRef idx="2">
+            <a:schemeClr val="accent1">
+              <a:shade val="50000"/>
+            </a:schemeClr>
+          </a:lnRef>
+          <a:fillRef idx="1">
+            <a:schemeClr val="accent1"/>
+          </a:fillRef>
+          <a:effectRef idx="0">
+            <a:schemeClr val="accent1"/>
+          </a:effectRef>
+          <a:fontRef idx="minor">
+            <a:schemeClr val="lt1"/>
+          </a:fontRef>
+        </p:style>
+        <p:txBody>
+          <a:bodyPr rtlCol="0" anchor="ctr"/>
+          <a:lstStyle/>
+          <a:p>
+            <a:pPr algn="ctr">
+              <a:lnSpc>
+                <a:spcPct val="125000"/>
+              </a:lnSpc>
+            </a:pPr>
+            <a:r>
+              <a:rPr lang="ko-KR" altLang="en-US" sz="1600" smtClean="0">
+                <a:solidFill>
+                  <a:srgbClr val="FF0000"/>
+                </a:solidFill>
+              </a:rPr>
+              <a:t>가짜 문제 </a:t>
+            </a:r>
+            <a:r>
+              <a:rPr lang="ko-KR" altLang="en-US" sz="1600" smtClean="0">
+                <a:solidFill>
+                  <a:schemeClr val="tx1"/>
+                </a:solidFill>
+              </a:rPr>
+              <a:t>를 풀면 </a:t>
+            </a:r>
+            <a:endParaRPr lang="en-US" altLang="ko-KR" sz="1600" smtClean="0">
+              <a:solidFill>
+                <a:schemeClr val="tx1"/>
+              </a:solidFill>
+            </a:endParaRPr>
+          </a:p>
+          <a:p>
+            <a:pPr algn="ctr">
+              <a:lnSpc>
+                <a:spcPct val="125000"/>
+              </a:lnSpc>
+            </a:pPr>
+            <a:r>
+              <a:rPr lang="ko-KR" altLang="en-US" sz="1600" smtClean="0">
+                <a:solidFill>
+                  <a:srgbClr val="0070C0"/>
+                </a:solidFill>
+              </a:rPr>
+              <a:t>진짜 문제 </a:t>
+            </a:r>
+            <a:r>
+              <a:rPr lang="ko-KR" altLang="en-US" sz="1600" smtClean="0">
+                <a:solidFill>
+                  <a:schemeClr val="tx1"/>
+                </a:solidFill>
+              </a:rPr>
+              <a:t>를 풀 수 있는가</a:t>
+            </a:r>
+            <a:r>
+              <a:rPr lang="en-US" altLang="ko-KR" sz="1600" smtClean="0">
+                <a:solidFill>
+                  <a:schemeClr val="tx1"/>
+                </a:solidFill>
+              </a:rPr>
+              <a:t>?</a:t>
+            </a:r>
+            <a:endParaRPr lang="en-US" altLang="ko-KR" sz="1600" smtClean="0">
+              <a:solidFill>
+                <a:schemeClr val="tx1"/>
+              </a:solidFill>
+            </a:endParaRPr>
+          </a:p>
+        </p:txBody>
+      </p:sp>
+      <p:sp>
+        <p:nvSpPr>
+          <p:cNvPr id="30" name="모서리가 둥근 직사각형 29"/>
+          <p:cNvSpPr/>
+          <p:nvPr/>
+        </p:nvSpPr>
+        <p:spPr>
+          <a:xfrm>
+            <a:off x="4331885" y="2808039"/>
+            <a:ext cx="2755311" cy="810764"/>
+          </a:xfrm>
+          <a:prstGeom prst="roundRect">
+            <a:avLst/>
+          </a:prstGeom>
+          <a:noFill/>
+          <a:ln>
+            <a:solidFill>
+              <a:schemeClr val="bg1">
+                <a:lumMod val="50000"/>
+              </a:schemeClr>
+            </a:solidFill>
+          </a:ln>
+        </p:spPr>
+        <p:style>
+          <a:lnRef idx="2">
+            <a:schemeClr val="accent1">
+              <a:shade val="50000"/>
+            </a:schemeClr>
+          </a:lnRef>
+          <a:fillRef idx="1">
+            <a:schemeClr val="accent1"/>
+          </a:fillRef>
+          <a:effectRef idx="0">
+            <a:schemeClr val="accent1"/>
+          </a:effectRef>
+          <a:fontRef idx="minor">
+            <a:schemeClr val="lt1"/>
+          </a:fontRef>
+        </p:style>
+        <p:txBody>
+          <a:bodyPr rtlCol="0" anchor="ctr"/>
+          <a:lstStyle/>
+          <a:p>
+            <a:pPr algn="ctr">
+              <a:lnSpc>
+                <a:spcPct val="125000"/>
+              </a:lnSpc>
+            </a:pPr>
+            <a:r>
+              <a:rPr lang="ko-KR" altLang="en-US" sz="1600" smtClean="0">
+                <a:solidFill>
+                  <a:srgbClr val="FF0000"/>
+                </a:solidFill>
+              </a:rPr>
+              <a:t>초기값</a:t>
+            </a:r>
+            <a:r>
+              <a:rPr lang="ko-KR" altLang="en-US" sz="1600" smtClean="0">
+                <a:solidFill>
+                  <a:schemeClr val="tx1"/>
+                </a:solidFill>
+              </a:rPr>
+              <a:t> 은 어떻게 되는가</a:t>
+            </a:r>
+            <a:r>
+              <a:rPr lang="en-US" altLang="ko-KR" sz="1600" smtClean="0">
+                <a:solidFill>
+                  <a:schemeClr val="tx1"/>
+                </a:solidFill>
+              </a:rPr>
+              <a:t>?</a:t>
+            </a:r>
+            <a:endParaRPr lang="en-US" altLang="ko-KR" sz="1600" smtClean="0">
+              <a:solidFill>
+                <a:schemeClr val="tx1"/>
+              </a:solidFill>
+            </a:endParaRPr>
+          </a:p>
+        </p:txBody>
+      </p:sp>
+      <p:cxnSp>
+        <p:nvCxnSpPr>
+          <p:cNvPr id="32" name="직선 화살표 연결선 31"/>
+          <p:cNvCxnSpPr/>
+          <p:nvPr/>
+        </p:nvCxnSpPr>
+        <p:spPr>
+          <a:xfrm>
+            <a:off x="5709541" y="2407789"/>
+            <a:ext cx="0" cy="400250"/>
+          </a:xfrm>
+          <a:prstGeom prst="straightConnector1">
+            <a:avLst/>
+          </a:prstGeom>
+          <a:ln w="28575">
+            <a:solidFill>
+              <a:schemeClr val="tx1"/>
+            </a:solidFill>
+            <a:tailEnd type="arrow"/>
+          </a:ln>
+        </p:spPr>
+        <p:style>
+          <a:lnRef idx="1">
+            <a:schemeClr val="accent1"/>
+          </a:lnRef>
+          <a:fillRef idx="0">
+            <a:schemeClr val="accent1"/>
+          </a:fillRef>
+          <a:effectRef idx="0">
+            <a:schemeClr val="accent1"/>
+          </a:effectRef>
+          <a:fontRef idx="minor">
+            <a:schemeClr val="tx1"/>
+          </a:fontRef>
+        </p:style>
+      </p:cxnSp>
+      <p:sp>
+        <p:nvSpPr>
+          <p:cNvPr id="34" name="모서리가 둥근 직사각형 33"/>
+          <p:cNvSpPr/>
+          <p:nvPr/>
+        </p:nvSpPr>
+        <p:spPr>
+          <a:xfrm>
+            <a:off x="4331885" y="4032175"/>
+            <a:ext cx="2755311" cy="810764"/>
+          </a:xfrm>
+          <a:prstGeom prst="roundRect">
+            <a:avLst/>
+          </a:prstGeom>
+          <a:noFill/>
+          <a:ln>
+            <a:solidFill>
+              <a:schemeClr val="bg1">
+                <a:lumMod val="50000"/>
+              </a:schemeClr>
+            </a:solidFill>
+          </a:ln>
+        </p:spPr>
+        <p:style>
+          <a:lnRef idx="2">
+            <a:schemeClr val="accent1">
+              <a:shade val="50000"/>
+            </a:schemeClr>
+          </a:lnRef>
+          <a:fillRef idx="1">
+            <a:schemeClr val="accent1"/>
+          </a:fillRef>
+          <a:effectRef idx="0">
+            <a:schemeClr val="accent1"/>
+          </a:effectRef>
+          <a:fontRef idx="minor">
+            <a:schemeClr val="lt1"/>
+          </a:fontRef>
+        </p:style>
+        <p:txBody>
+          <a:bodyPr rtlCol="0" anchor="ctr"/>
+          <a:lstStyle/>
+          <a:p>
+            <a:pPr algn="ctr">
+              <a:lnSpc>
+                <a:spcPct val="125000"/>
+              </a:lnSpc>
+            </a:pPr>
+            <a:r>
+              <a:rPr lang="ko-KR" altLang="en-US" sz="1600" smtClean="0">
+                <a:solidFill>
+                  <a:srgbClr val="FF0000"/>
+                </a:solidFill>
+              </a:rPr>
+              <a:t>점화식</a:t>
+            </a:r>
+            <a:r>
+              <a:rPr lang="ko-KR" altLang="en-US" sz="1600" smtClean="0">
+                <a:solidFill>
+                  <a:schemeClr val="tx1"/>
+                </a:solidFill>
+              </a:rPr>
+              <a:t> 을 구해내기</a:t>
+            </a:r>
+            <a:endParaRPr lang="en-US" altLang="ko-KR" sz="1600" smtClean="0">
+              <a:solidFill>
+                <a:schemeClr val="tx1"/>
+              </a:solidFill>
+            </a:endParaRPr>
+          </a:p>
+        </p:txBody>
+      </p:sp>
+      <p:cxnSp>
+        <p:nvCxnSpPr>
+          <p:cNvPr id="36" name="직선 화살표 연결선 35"/>
+          <p:cNvCxnSpPr/>
+          <p:nvPr/>
+        </p:nvCxnSpPr>
+        <p:spPr>
+          <a:xfrm>
+            <a:off x="5709541" y="3631925"/>
+            <a:ext cx="0" cy="400250"/>
+          </a:xfrm>
+          <a:prstGeom prst="straightConnector1">
+            <a:avLst/>
+          </a:prstGeom>
+          <a:ln w="28575">
+            <a:solidFill>
+              <a:schemeClr val="tx1"/>
+            </a:solidFill>
+            <a:tailEnd type="arrow"/>
+          </a:ln>
+        </p:spPr>
+        <p:style>
+          <a:lnRef idx="1">
+            <a:schemeClr val="accent1"/>
+          </a:lnRef>
+          <a:fillRef idx="0">
+            <a:schemeClr val="accent1"/>
+          </a:fillRef>
+          <a:effectRef idx="0">
+            <a:schemeClr val="accent1"/>
+          </a:effectRef>
+          <a:fontRef idx="minor">
+            <a:schemeClr val="tx1"/>
+          </a:fontRef>
+        </p:style>
+      </p:cxnSp>
+      <p:sp>
+        <p:nvSpPr>
+          <p:cNvPr id="37" name="모서리가 둥근 직사각형 36"/>
+          <p:cNvSpPr/>
+          <p:nvPr/>
+        </p:nvSpPr>
+        <p:spPr>
+          <a:xfrm>
+            <a:off x="4331885" y="5256311"/>
+            <a:ext cx="2755311" cy="810764"/>
+          </a:xfrm>
+          <a:prstGeom prst="roundRect">
+            <a:avLst/>
+          </a:prstGeom>
+          <a:noFill/>
+          <a:ln>
+            <a:solidFill>
+              <a:schemeClr val="bg1">
+                <a:lumMod val="50000"/>
+              </a:schemeClr>
+            </a:solidFill>
+          </a:ln>
+        </p:spPr>
+        <p:style>
+          <a:lnRef idx="2">
+            <a:schemeClr val="accent1">
+              <a:shade val="50000"/>
+            </a:schemeClr>
+          </a:lnRef>
+          <a:fillRef idx="1">
+            <a:schemeClr val="accent1"/>
+          </a:fillRef>
+          <a:effectRef idx="0">
+            <a:schemeClr val="accent1"/>
+          </a:effectRef>
+          <a:fontRef idx="minor">
+            <a:schemeClr val="lt1"/>
+          </a:fontRef>
+        </p:style>
+        <p:txBody>
+          <a:bodyPr rtlCol="0" anchor="ctr"/>
+          <a:lstStyle/>
+          <a:p>
+            <a:pPr algn="ctr">
+              <a:lnSpc>
+                <a:spcPct val="125000"/>
+              </a:lnSpc>
+            </a:pPr>
+            <a:r>
+              <a:rPr lang="ko-KR" altLang="en-US" sz="1600" smtClean="0">
+                <a:solidFill>
+                  <a:srgbClr val="FF0000"/>
+                </a:solidFill>
+              </a:rPr>
+              <a:t>진짜 문제</a:t>
+            </a:r>
+            <a:r>
+              <a:rPr lang="ko-KR" altLang="en-US" sz="1600" smtClean="0">
+                <a:solidFill>
+                  <a:schemeClr val="tx1"/>
+                </a:solidFill>
+              </a:rPr>
+              <a:t> 의 정답을 출력</a:t>
+            </a:r>
+            <a:endParaRPr lang="en-US" altLang="ko-KR" sz="1600" smtClean="0">
+              <a:solidFill>
+                <a:schemeClr val="tx1"/>
+              </a:solidFill>
+            </a:endParaRPr>
+          </a:p>
+        </p:txBody>
+      </p:sp>
+      <p:cxnSp>
+        <p:nvCxnSpPr>
+          <p:cNvPr id="38" name="직선 화살표 연결선 37"/>
+          <p:cNvCxnSpPr/>
+          <p:nvPr/>
+        </p:nvCxnSpPr>
+        <p:spPr>
+          <a:xfrm>
+            <a:off x="5709541" y="4856061"/>
+            <a:ext cx="0" cy="400250"/>
+          </a:xfrm>
+          <a:prstGeom prst="straightConnector1">
+            <a:avLst/>
+          </a:prstGeom>
+          <a:ln w="28575">
+            <a:solidFill>
+              <a:schemeClr val="tx1"/>
+            </a:solidFill>
+            <a:tailEnd type="arrow"/>
+          </a:ln>
+        </p:spPr>
+        <p:style>
+          <a:lnRef idx="1">
+            <a:schemeClr val="accent1"/>
+          </a:lnRef>
+          <a:fillRef idx="0">
+            <a:schemeClr val="accent1"/>
+          </a:fillRef>
+          <a:effectRef idx="0">
+            <a:schemeClr val="accent1"/>
+          </a:effectRef>
+          <a:fontRef idx="minor">
+            <a:schemeClr val="tx1"/>
+          </a:fontRef>
+        </p:style>
+      </p:cxnSp>
+      <p:sp>
+        <p:nvSpPr>
+          <p:cNvPr id="39" name="타원 38"/>
+          <p:cNvSpPr/>
+          <p:nvPr/>
+        </p:nvSpPr>
+        <p:spPr>
+          <a:xfrm>
+            <a:off x="3888829" y="1845269"/>
+            <a:ext cx="288032" cy="288032"/>
+          </a:xfrm>
+          <a:prstGeom prst="ellipse">
+            <a:avLst/>
+          </a:prstGeom>
+          <a:noFill/>
+          <a:ln w="19050">
+            <a:solidFill>
+              <a:schemeClr val="tx1"/>
+            </a:solidFill>
+          </a:ln>
+        </p:spPr>
+        <p:style>
+          <a:lnRef idx="2">
+            <a:schemeClr val="accent1">
+              <a:shade val="50000"/>
+            </a:schemeClr>
+          </a:lnRef>
+          <a:fillRef idx="1">
+            <a:schemeClr val="accent1"/>
+          </a:fillRef>
+          <a:effectRef idx="0">
+            <a:schemeClr val="accent1"/>
+          </a:effectRef>
+          <a:fontRef idx="minor">
+            <a:schemeClr val="lt1"/>
+          </a:fontRef>
+        </p:style>
+        <p:txBody>
+          <a:bodyPr rtlCol="0" anchor="ctr"/>
+          <a:lstStyle/>
+          <a:p>
+            <a:pPr algn="ctr"/>
+            <a:r>
+              <a:rPr lang="en-US" altLang="ko-KR" sz="1600" smtClean="0">
+                <a:solidFill>
+                  <a:schemeClr val="tx1"/>
+                </a:solidFill>
+              </a:rPr>
+              <a:t>2</a:t>
+            </a:r>
+            <a:endParaRPr lang="ko-KR" altLang="en-US" sz="1600">
+              <a:solidFill>
+                <a:schemeClr val="tx1"/>
+              </a:solidFill>
+            </a:endParaRPr>
+          </a:p>
+        </p:txBody>
+      </p:sp>
+      <p:sp>
+        <p:nvSpPr>
+          <p:cNvPr id="40" name="타원 39"/>
+          <p:cNvSpPr/>
+          <p:nvPr/>
+        </p:nvSpPr>
+        <p:spPr>
+          <a:xfrm>
+            <a:off x="3888829" y="3069405"/>
+            <a:ext cx="288032" cy="288032"/>
+          </a:xfrm>
+          <a:prstGeom prst="ellipse">
+            <a:avLst/>
+          </a:prstGeom>
+          <a:noFill/>
+          <a:ln w="19050">
+            <a:solidFill>
+              <a:schemeClr val="tx1"/>
+            </a:solidFill>
+          </a:ln>
+        </p:spPr>
+        <p:style>
+          <a:lnRef idx="2">
+            <a:schemeClr val="accent1">
+              <a:shade val="50000"/>
+            </a:schemeClr>
+          </a:lnRef>
+          <a:fillRef idx="1">
+            <a:schemeClr val="accent1"/>
+          </a:fillRef>
+          <a:effectRef idx="0">
+            <a:schemeClr val="accent1"/>
+          </a:effectRef>
+          <a:fontRef idx="minor">
+            <a:schemeClr val="lt1"/>
+          </a:fontRef>
+        </p:style>
+        <p:txBody>
+          <a:bodyPr rtlCol="0" anchor="ctr"/>
+          <a:lstStyle/>
+          <a:p>
+            <a:pPr algn="ctr"/>
+            <a:r>
+              <a:rPr lang="en-US" altLang="ko-KR" sz="1600" smtClean="0">
+                <a:solidFill>
+                  <a:schemeClr val="tx1"/>
+                </a:solidFill>
+              </a:rPr>
+              <a:t>3</a:t>
+            </a:r>
+            <a:endParaRPr lang="ko-KR" altLang="en-US" sz="1600">
+              <a:solidFill>
+                <a:schemeClr val="tx1"/>
+              </a:solidFill>
+            </a:endParaRPr>
+          </a:p>
+        </p:txBody>
+      </p:sp>
+      <p:sp>
+        <p:nvSpPr>
+          <p:cNvPr id="41" name="타원 40"/>
+          <p:cNvSpPr/>
+          <p:nvPr/>
+        </p:nvSpPr>
+        <p:spPr>
+          <a:xfrm>
+            <a:off x="3888829" y="4293541"/>
+            <a:ext cx="288032" cy="288032"/>
+          </a:xfrm>
+          <a:prstGeom prst="ellipse">
+            <a:avLst/>
+          </a:prstGeom>
+          <a:noFill/>
+          <a:ln w="19050">
+            <a:solidFill>
+              <a:schemeClr val="tx1"/>
+            </a:solidFill>
+          </a:ln>
+        </p:spPr>
+        <p:style>
+          <a:lnRef idx="2">
+            <a:schemeClr val="accent1">
+              <a:shade val="50000"/>
+            </a:schemeClr>
+          </a:lnRef>
+          <a:fillRef idx="1">
+            <a:schemeClr val="accent1"/>
+          </a:fillRef>
+          <a:effectRef idx="0">
+            <a:schemeClr val="accent1"/>
+          </a:effectRef>
+          <a:fontRef idx="minor">
+            <a:schemeClr val="lt1"/>
+          </a:fontRef>
+        </p:style>
+        <p:txBody>
+          <a:bodyPr rtlCol="0" anchor="ctr"/>
+          <a:lstStyle/>
+          <a:p>
+            <a:pPr algn="ctr"/>
+            <a:r>
+              <a:rPr lang="en-US" altLang="ko-KR" sz="1600" smtClean="0">
+                <a:solidFill>
+                  <a:schemeClr val="tx1"/>
+                </a:solidFill>
+              </a:rPr>
+              <a:t>4</a:t>
+            </a:r>
+            <a:endParaRPr lang="ko-KR" altLang="en-US" sz="1600">
+              <a:solidFill>
+                <a:schemeClr val="tx1"/>
+              </a:solidFill>
+            </a:endParaRPr>
+          </a:p>
+        </p:txBody>
+      </p:sp>
+      <p:sp>
+        <p:nvSpPr>
+          <p:cNvPr id="42" name="타원 41"/>
+          <p:cNvSpPr/>
+          <p:nvPr/>
+        </p:nvSpPr>
+        <p:spPr>
+          <a:xfrm>
+            <a:off x="3888829" y="5517677"/>
+            <a:ext cx="288032" cy="288032"/>
+          </a:xfrm>
+          <a:prstGeom prst="ellipse">
+            <a:avLst/>
+          </a:prstGeom>
+          <a:noFill/>
+          <a:ln w="19050">
+            <a:solidFill>
+              <a:schemeClr val="tx1"/>
+            </a:solidFill>
+          </a:ln>
+        </p:spPr>
+        <p:style>
+          <a:lnRef idx="2">
+            <a:schemeClr val="accent1">
+              <a:shade val="50000"/>
+            </a:schemeClr>
+          </a:lnRef>
+          <a:fillRef idx="1">
+            <a:schemeClr val="accent1"/>
+          </a:fillRef>
+          <a:effectRef idx="0">
+            <a:schemeClr val="accent1"/>
+          </a:effectRef>
+          <a:fontRef idx="minor">
+            <a:schemeClr val="lt1"/>
+          </a:fontRef>
+        </p:style>
+        <p:txBody>
+          <a:bodyPr rtlCol="0" anchor="ctr"/>
+          <a:lstStyle/>
+          <a:p>
+            <a:pPr algn="ctr"/>
+            <a:r>
+              <a:rPr lang="en-US" altLang="ko-KR" sz="1600" smtClean="0">
+                <a:solidFill>
+                  <a:schemeClr val="tx1"/>
+                </a:solidFill>
+              </a:rPr>
+              <a:t>5</a:t>
+            </a:r>
+            <a:endParaRPr lang="ko-KR" altLang="en-US" sz="1600">
+              <a:solidFill>
+                <a:schemeClr val="tx1"/>
+              </a:solidFill>
+            </a:endParaRPr>
+          </a:p>
+        </p:txBody>
+      </p:sp>
+      <p:cxnSp>
+        <p:nvCxnSpPr>
+          <p:cNvPr id="9" name="꺾인 연결선 8"/>
+          <p:cNvCxnSpPr/>
+          <p:nvPr/>
+        </p:nvCxnSpPr>
+        <p:spPr>
+          <a:xfrm flipV="1">
+            <a:off x="7099429" y="934856"/>
+            <a:ext cx="12700" cy="1068545"/>
+          </a:xfrm>
+          <a:prstGeom prst="bentConnector3">
+            <a:avLst>
+              <a:gd name="adj1" fmla="val 1800000"/>
+            </a:avLst>
+          </a:prstGeom>
+          <a:ln w="19050">
+            <a:solidFill>
+              <a:schemeClr val="tx1"/>
+            </a:solidFill>
+            <a:prstDash val="dash"/>
+            <a:headEnd type="none" w="med" len="med"/>
+            <a:tailEnd type="triangle" w="med" len="med"/>
+          </a:ln>
+        </p:spPr>
+        <p:style>
+          <a:lnRef idx="1">
+            <a:schemeClr val="accent1"/>
+          </a:lnRef>
+          <a:fillRef idx="0">
+            <a:schemeClr val="accent1"/>
+          </a:fillRef>
+          <a:effectRef idx="0">
+            <a:schemeClr val="accent1"/>
+          </a:effectRef>
+          <a:fontRef idx="minor">
+            <a:schemeClr val="tx1"/>
+          </a:fontRef>
+        </p:style>
+      </p:cxnSp>
+      <p:cxnSp>
+        <p:nvCxnSpPr>
+          <p:cNvPr id="46" name="꺾인 연결선 45"/>
+          <p:cNvCxnSpPr/>
+          <p:nvPr/>
+        </p:nvCxnSpPr>
+        <p:spPr>
+          <a:xfrm flipV="1">
+            <a:off x="7089008" y="785745"/>
+            <a:ext cx="22498" cy="2445472"/>
+          </a:xfrm>
+          <a:prstGeom prst="bentConnector3">
+            <a:avLst>
+              <a:gd name="adj1" fmla="val 1800000"/>
+            </a:avLst>
+          </a:prstGeom>
+          <a:ln w="19050">
+            <a:solidFill>
+              <a:schemeClr val="tx1"/>
+            </a:solidFill>
+            <a:prstDash val="dash"/>
+            <a:headEnd type="none" w="med" len="med"/>
+            <a:tailEnd type="triangle" w="med" len="med"/>
+          </a:ln>
+        </p:spPr>
+        <p:style>
+          <a:lnRef idx="1">
+            <a:schemeClr val="accent1"/>
+          </a:lnRef>
+          <a:fillRef idx="0">
+            <a:schemeClr val="accent1"/>
+          </a:fillRef>
+          <a:effectRef idx="0">
+            <a:schemeClr val="accent1"/>
+          </a:effectRef>
+          <a:fontRef idx="minor">
+            <a:schemeClr val="tx1"/>
+          </a:fontRef>
+        </p:style>
+      </p:cxnSp>
+      <p:cxnSp>
+        <p:nvCxnSpPr>
+          <p:cNvPr id="48" name="꺾인 연결선 47"/>
+          <p:cNvCxnSpPr/>
+          <p:nvPr/>
+        </p:nvCxnSpPr>
+        <p:spPr>
+          <a:xfrm flipV="1">
+            <a:off x="7084272" y="634255"/>
+            <a:ext cx="31971" cy="3822627"/>
+          </a:xfrm>
+          <a:prstGeom prst="bentConnector3">
+            <a:avLst>
+              <a:gd name="adj1" fmla="val 1800000"/>
+            </a:avLst>
+          </a:prstGeom>
+          <a:ln w="19050">
+            <a:solidFill>
+              <a:schemeClr val="tx1"/>
+            </a:solidFill>
+            <a:prstDash val="dash"/>
+            <a:headEnd type="none" w="med" len="med"/>
+            <a:tailEnd type="triangle" w="med" len="med"/>
+          </a:ln>
+        </p:spPr>
+        <p:style>
+          <a:lnRef idx="1">
+            <a:schemeClr val="accent1"/>
+          </a:lnRef>
+          <a:fillRef idx="0">
+            <a:schemeClr val="accent1"/>
+          </a:fillRef>
+          <a:effectRef idx="0">
+            <a:schemeClr val="accent1"/>
+          </a:effectRef>
+          <a:fontRef idx="minor">
+            <a:schemeClr val="tx1"/>
+          </a:fontRef>
+        </p:style>
+      </p:cxnSp>
+    </p:spTree>
+    <p:extLst>
+      <p:ext uri="{BB962C8B-B14F-4D97-AF65-F5344CB8AC3E}">
+        <p14:creationId xmlns:p14="http://schemas.microsoft.com/office/powerpoint/2010/main" val="1741443965"/>
+      </p:ext>
+    </p:extLst>
+  </p:cSld>
+  <p:clrMapOvr>
+    <a:masterClrMapping/>
+  </p:clrMapOvr>
+</p:sld>
+</file>
+
 <file path=ppt/slides/slide4.xml><?xml version="1.0" encoding="utf-8"?>
 <p:sld xmlns:a="http://schemas.openxmlformats.org/drawingml/2006/main" xmlns:r="http://schemas.openxmlformats.org/officeDocument/2006/relationships" xmlns:p="http://schemas.openxmlformats.org/presentationml/2006/main">
   <p:cSld>

</xml_diff>

<commit_message>
update post - algo 4
</commit_message>
<xml_diff>
--- a/assets/etc/이미지제작용.pptx
+++ b/assets/etc/이미지제작용.pptx
@@ -5,7 +5,7 @@
     <p:sldMasterId id="2147483648" r:id="rId1"/>
   </p:sldMasterIdLst>
   <p:notesMasterIdLst>
-    <p:notesMasterId r:id="rId33"/>
+    <p:notesMasterId r:id="rId35"/>
   </p:notesMasterIdLst>
   <p:sldIdLst>
     <p:sldId id="256" r:id="rId2"/>
@@ -39,6 +39,8 @@
     <p:sldId id="285" r:id="rId30"/>
     <p:sldId id="286" r:id="rId31"/>
     <p:sldId id="287" r:id="rId32"/>
+    <p:sldId id="288" r:id="rId33"/>
+    <p:sldId id="289" r:id="rId34"/>
   </p:sldIdLst>
   <p:sldSz cx="11522075" cy="6480175"/>
   <p:notesSz cx="6858000" cy="9144000"/>
@@ -222,7 +224,7 @@
           <a:p>
             <a:fld id="{5292B011-278F-46AA-8F5C-4B7DC81D9EF2}" type="datetimeFigureOut">
               <a:rPr lang="ko-KR" altLang="en-US" smtClean="0"/>
-              <a:t>2024-04-04</a:t>
+              <a:t>2024-04-16</a:t>
             </a:fld>
             <a:endParaRPr lang="ko-KR" altLang="en-US"/>
           </a:p>
@@ -1091,7 +1093,7 @@
           <a:p>
             <a:fld id="{10B01263-E573-4C51-9265-094B7818CB45}" type="datetimeFigureOut">
               <a:rPr lang="ko-KR" altLang="en-US" smtClean="0"/>
-              <a:t>2024-04-04</a:t>
+              <a:t>2024-04-16</a:t>
             </a:fld>
             <a:endParaRPr lang="ko-KR" altLang="en-US"/>
           </a:p>
@@ -1261,7 +1263,7 @@
           <a:p>
             <a:fld id="{10B01263-E573-4C51-9265-094B7818CB45}" type="datetimeFigureOut">
               <a:rPr lang="ko-KR" altLang="en-US" smtClean="0"/>
-              <a:t>2024-04-04</a:t>
+              <a:t>2024-04-16</a:t>
             </a:fld>
             <a:endParaRPr lang="ko-KR" altLang="en-US"/>
           </a:p>
@@ -1441,7 +1443,7 @@
           <a:p>
             <a:fld id="{10B01263-E573-4C51-9265-094B7818CB45}" type="datetimeFigureOut">
               <a:rPr lang="ko-KR" altLang="en-US" smtClean="0"/>
-              <a:t>2024-04-04</a:t>
+              <a:t>2024-04-16</a:t>
             </a:fld>
             <a:endParaRPr lang="ko-KR" altLang="en-US"/>
           </a:p>
@@ -1611,7 +1613,7 @@
           <a:p>
             <a:fld id="{10B01263-E573-4C51-9265-094B7818CB45}" type="datetimeFigureOut">
               <a:rPr lang="ko-KR" altLang="en-US" smtClean="0"/>
-              <a:t>2024-04-04</a:t>
+              <a:t>2024-04-16</a:t>
             </a:fld>
             <a:endParaRPr lang="ko-KR" altLang="en-US"/>
           </a:p>
@@ -1857,7 +1859,7 @@
           <a:p>
             <a:fld id="{10B01263-E573-4C51-9265-094B7818CB45}" type="datetimeFigureOut">
               <a:rPr lang="ko-KR" altLang="en-US" smtClean="0"/>
-              <a:t>2024-04-04</a:t>
+              <a:t>2024-04-16</a:t>
             </a:fld>
             <a:endParaRPr lang="ko-KR" altLang="en-US"/>
           </a:p>
@@ -2145,7 +2147,7 @@
           <a:p>
             <a:fld id="{10B01263-E573-4C51-9265-094B7818CB45}" type="datetimeFigureOut">
               <a:rPr lang="ko-KR" altLang="en-US" smtClean="0"/>
-              <a:t>2024-04-04</a:t>
+              <a:t>2024-04-16</a:t>
             </a:fld>
             <a:endParaRPr lang="ko-KR" altLang="en-US"/>
           </a:p>
@@ -2567,7 +2569,7 @@
           <a:p>
             <a:fld id="{10B01263-E573-4C51-9265-094B7818CB45}" type="datetimeFigureOut">
               <a:rPr lang="ko-KR" altLang="en-US" smtClean="0"/>
-              <a:t>2024-04-04</a:t>
+              <a:t>2024-04-16</a:t>
             </a:fld>
             <a:endParaRPr lang="ko-KR" altLang="en-US"/>
           </a:p>
@@ -2685,7 +2687,7 @@
           <a:p>
             <a:fld id="{10B01263-E573-4C51-9265-094B7818CB45}" type="datetimeFigureOut">
               <a:rPr lang="ko-KR" altLang="en-US" smtClean="0"/>
-              <a:t>2024-04-04</a:t>
+              <a:t>2024-04-16</a:t>
             </a:fld>
             <a:endParaRPr lang="ko-KR" altLang="en-US"/>
           </a:p>
@@ -2780,7 +2782,7 @@
           <a:p>
             <a:fld id="{10B01263-E573-4C51-9265-094B7818CB45}" type="datetimeFigureOut">
               <a:rPr lang="ko-KR" altLang="en-US" smtClean="0"/>
-              <a:t>2024-04-04</a:t>
+              <a:t>2024-04-16</a:t>
             </a:fld>
             <a:endParaRPr lang="ko-KR" altLang="en-US"/>
           </a:p>
@@ -3057,7 +3059,7 @@
           <a:p>
             <a:fld id="{10B01263-E573-4C51-9265-094B7818CB45}" type="datetimeFigureOut">
               <a:rPr lang="ko-KR" altLang="en-US" smtClean="0"/>
-              <a:t>2024-04-04</a:t>
+              <a:t>2024-04-16</a:t>
             </a:fld>
             <a:endParaRPr lang="ko-KR" altLang="en-US"/>
           </a:p>
@@ -3310,7 +3312,7 @@
           <a:p>
             <a:fld id="{10B01263-E573-4C51-9265-094B7818CB45}" type="datetimeFigureOut">
               <a:rPr lang="ko-KR" altLang="en-US" smtClean="0"/>
-              <a:t>2024-04-04</a:t>
+              <a:t>2024-04-16</a:t>
             </a:fld>
             <a:endParaRPr lang="ko-KR" altLang="en-US"/>
           </a:p>
@@ -3523,7 +3525,7 @@
           <a:p>
             <a:fld id="{10B01263-E573-4C51-9265-094B7818CB45}" type="datetimeFigureOut">
               <a:rPr lang="ko-KR" altLang="en-US" smtClean="0"/>
-              <a:t>2024-04-04</a:t>
+              <a:t>2024-04-16</a:t>
             </a:fld>
             <a:endParaRPr lang="ko-KR" altLang="en-US"/>
           </a:p>
@@ -35436,11 +35438,6 @@
               </a:rPr>
               <a:t>?</a:t>
             </a:r>
-            <a:endParaRPr lang="en-US" altLang="ko-KR" sz="1600" smtClean="0">
-              <a:solidFill>
-                <a:schemeClr val="tx1"/>
-              </a:solidFill>
-            </a:endParaRPr>
           </a:p>
         </p:txBody>
       </p:sp>
@@ -35516,11 +35513,6 @@
               </a:rPr>
               <a:t>?</a:t>
             </a:r>
-            <a:endParaRPr lang="en-US" altLang="ko-KR" sz="1600" smtClean="0">
-              <a:solidFill>
-                <a:schemeClr val="tx1"/>
-              </a:solidFill>
-            </a:endParaRPr>
           </a:p>
         </p:txBody>
       </p:sp>
@@ -36132,6 +36124,4319 @@
     <p:extLst>
       <p:ext uri="{BB962C8B-B14F-4D97-AF65-F5344CB8AC3E}">
         <p14:creationId xmlns:p14="http://schemas.microsoft.com/office/powerpoint/2010/main" val="1741443965"/>
+      </p:ext>
+    </p:extLst>
+  </p:cSld>
+  <p:clrMapOvr>
+    <a:masterClrMapping/>
+  </p:clrMapOvr>
+</p:sld>
+</file>
+
+<file path=ppt/slides/slide32.xml><?xml version="1.0" encoding="utf-8"?>
+<p:sld xmlns:a="http://schemas.openxmlformats.org/drawingml/2006/main" xmlns:r="http://schemas.openxmlformats.org/officeDocument/2006/relationships" xmlns:p="http://schemas.openxmlformats.org/presentationml/2006/main">
+  <p:cSld>
+    <p:spTree>
+      <p:nvGrpSpPr>
+        <p:cNvPr id="1" name=""/>
+        <p:cNvGrpSpPr/>
+        <p:nvPr/>
+      </p:nvGrpSpPr>
+      <p:grpSpPr>
+        <a:xfrm>
+          <a:off x="0" y="0"/>
+          <a:ext cx="0" cy="0"/>
+          <a:chOff x="0" y="0"/>
+          <a:chExt cx="0" cy="0"/>
+        </a:xfrm>
+      </p:grpSpPr>
+      <p:sp>
+        <p:nvSpPr>
+          <p:cNvPr id="3" name="직사각형 2"/>
+          <p:cNvSpPr/>
+          <p:nvPr/>
+        </p:nvSpPr>
+        <p:spPr>
+          <a:xfrm>
+            <a:off x="1726779" y="2159967"/>
+            <a:ext cx="720985" cy="648072"/>
+          </a:xfrm>
+          <a:prstGeom prst="rect">
+            <a:avLst/>
+          </a:prstGeom>
+          <a:noFill/>
+          <a:ln>
+            <a:solidFill>
+              <a:schemeClr val="tx1"/>
+            </a:solidFill>
+          </a:ln>
+        </p:spPr>
+        <p:style>
+          <a:lnRef idx="2">
+            <a:schemeClr val="accent1">
+              <a:shade val="50000"/>
+            </a:schemeClr>
+          </a:lnRef>
+          <a:fillRef idx="1">
+            <a:schemeClr val="accent1"/>
+          </a:fillRef>
+          <a:effectRef idx="0">
+            <a:schemeClr val="accent1"/>
+          </a:effectRef>
+          <a:fontRef idx="minor">
+            <a:schemeClr val="lt1"/>
+          </a:fontRef>
+        </p:style>
+        <p:txBody>
+          <a:bodyPr rtlCol="0" anchor="ctr"/>
+          <a:lstStyle/>
+          <a:p>
+            <a:pPr algn="ctr"/>
+            <a:r>
+              <a:rPr lang="en-US" altLang="ko-KR" sz="1800" b="1" smtClean="0">
+                <a:solidFill>
+                  <a:schemeClr val="tx1"/>
+                </a:solidFill>
+                <a:latin typeface="Calibri" pitchFamily="34" charset="0"/>
+                <a:ea typeface="Calibri" pitchFamily="34" charset="0"/>
+                <a:cs typeface="Calibri" pitchFamily="34" charset="0"/>
+              </a:rPr>
+              <a:t>C[1]</a:t>
+            </a:r>
+            <a:endParaRPr lang="ko-KR" altLang="en-US" sz="1800" b="1">
+              <a:solidFill>
+                <a:schemeClr val="tx1"/>
+              </a:solidFill>
+              <a:latin typeface="Calibri" pitchFamily="34" charset="0"/>
+              <a:ea typeface="나눔스퀘어 ExtraBold" pitchFamily="50" charset="-127"/>
+              <a:cs typeface="Calibri" pitchFamily="34" charset="0"/>
+            </a:endParaRPr>
+          </a:p>
+        </p:txBody>
+      </p:sp>
+      <p:sp>
+        <p:nvSpPr>
+          <p:cNvPr id="25" name="직사각형 24"/>
+          <p:cNvSpPr/>
+          <p:nvPr/>
+        </p:nvSpPr>
+        <p:spPr>
+          <a:xfrm>
+            <a:off x="2447764" y="2159967"/>
+            <a:ext cx="720985" cy="648072"/>
+          </a:xfrm>
+          <a:prstGeom prst="rect">
+            <a:avLst/>
+          </a:prstGeom>
+          <a:noFill/>
+          <a:ln>
+            <a:solidFill>
+              <a:schemeClr val="tx1"/>
+            </a:solidFill>
+          </a:ln>
+        </p:spPr>
+        <p:style>
+          <a:lnRef idx="2">
+            <a:schemeClr val="accent1">
+              <a:shade val="50000"/>
+            </a:schemeClr>
+          </a:lnRef>
+          <a:fillRef idx="1">
+            <a:schemeClr val="accent1"/>
+          </a:fillRef>
+          <a:effectRef idx="0">
+            <a:schemeClr val="accent1"/>
+          </a:effectRef>
+          <a:fontRef idx="minor">
+            <a:schemeClr val="lt1"/>
+          </a:fontRef>
+        </p:style>
+        <p:txBody>
+          <a:bodyPr rtlCol="0" anchor="ctr"/>
+          <a:lstStyle/>
+          <a:p>
+            <a:pPr algn="ctr"/>
+            <a:r>
+              <a:rPr lang="en-US" altLang="ko-KR" sz="1800" b="1" smtClean="0">
+                <a:solidFill>
+                  <a:schemeClr val="tx1"/>
+                </a:solidFill>
+                <a:latin typeface="Calibri" pitchFamily="34" charset="0"/>
+                <a:ea typeface="Calibri" pitchFamily="34" charset="0"/>
+                <a:cs typeface="Calibri" pitchFamily="34" charset="0"/>
+              </a:rPr>
+              <a:t>C[2]</a:t>
+            </a:r>
+            <a:endParaRPr lang="ko-KR" altLang="en-US" sz="1800" b="1">
+              <a:solidFill>
+                <a:schemeClr val="tx1"/>
+              </a:solidFill>
+              <a:latin typeface="Calibri" pitchFamily="34" charset="0"/>
+              <a:ea typeface="나눔스퀘어 ExtraBold" pitchFamily="50" charset="-127"/>
+              <a:cs typeface="Calibri" pitchFamily="34" charset="0"/>
+            </a:endParaRPr>
+          </a:p>
+        </p:txBody>
+      </p:sp>
+      <p:sp>
+        <p:nvSpPr>
+          <p:cNvPr id="29" name="직사각형 28"/>
+          <p:cNvSpPr/>
+          <p:nvPr/>
+        </p:nvSpPr>
+        <p:spPr>
+          <a:xfrm>
+            <a:off x="3168749" y="2159967"/>
+            <a:ext cx="720985" cy="648072"/>
+          </a:xfrm>
+          <a:prstGeom prst="rect">
+            <a:avLst/>
+          </a:prstGeom>
+          <a:noFill/>
+          <a:ln>
+            <a:solidFill>
+              <a:schemeClr val="tx1"/>
+            </a:solidFill>
+          </a:ln>
+        </p:spPr>
+        <p:style>
+          <a:lnRef idx="2">
+            <a:schemeClr val="accent1">
+              <a:shade val="50000"/>
+            </a:schemeClr>
+          </a:lnRef>
+          <a:fillRef idx="1">
+            <a:schemeClr val="accent1"/>
+          </a:fillRef>
+          <a:effectRef idx="0">
+            <a:schemeClr val="accent1"/>
+          </a:effectRef>
+          <a:fontRef idx="minor">
+            <a:schemeClr val="lt1"/>
+          </a:fontRef>
+        </p:style>
+        <p:txBody>
+          <a:bodyPr rtlCol="0" anchor="ctr"/>
+          <a:lstStyle/>
+          <a:p>
+            <a:pPr algn="ctr"/>
+            <a:r>
+              <a:rPr lang="en-US" altLang="ko-KR" sz="1800" b="1" smtClean="0">
+                <a:solidFill>
+                  <a:schemeClr val="tx1"/>
+                </a:solidFill>
+                <a:latin typeface="Calibri" pitchFamily="34" charset="0"/>
+                <a:ea typeface="Calibri" pitchFamily="34" charset="0"/>
+                <a:cs typeface="Calibri" pitchFamily="34" charset="0"/>
+              </a:rPr>
+              <a:t>C[3]</a:t>
+            </a:r>
+            <a:endParaRPr lang="ko-KR" altLang="en-US" sz="1800" b="1">
+              <a:solidFill>
+                <a:schemeClr val="tx1"/>
+              </a:solidFill>
+              <a:latin typeface="Calibri" pitchFamily="34" charset="0"/>
+              <a:ea typeface="나눔스퀘어 ExtraBold" pitchFamily="50" charset="-127"/>
+              <a:cs typeface="Calibri" pitchFamily="34" charset="0"/>
+            </a:endParaRPr>
+          </a:p>
+        </p:txBody>
+      </p:sp>
+      <p:sp>
+        <p:nvSpPr>
+          <p:cNvPr id="31" name="직사각형 30"/>
+          <p:cNvSpPr/>
+          <p:nvPr/>
+        </p:nvSpPr>
+        <p:spPr>
+          <a:xfrm>
+            <a:off x="3889734" y="2159967"/>
+            <a:ext cx="720985" cy="648072"/>
+          </a:xfrm>
+          <a:prstGeom prst="rect">
+            <a:avLst/>
+          </a:prstGeom>
+          <a:noFill/>
+          <a:ln>
+            <a:solidFill>
+              <a:schemeClr val="tx1"/>
+            </a:solidFill>
+          </a:ln>
+        </p:spPr>
+        <p:style>
+          <a:lnRef idx="2">
+            <a:schemeClr val="accent1">
+              <a:shade val="50000"/>
+            </a:schemeClr>
+          </a:lnRef>
+          <a:fillRef idx="1">
+            <a:schemeClr val="accent1"/>
+          </a:fillRef>
+          <a:effectRef idx="0">
+            <a:schemeClr val="accent1"/>
+          </a:effectRef>
+          <a:fontRef idx="minor">
+            <a:schemeClr val="lt1"/>
+          </a:fontRef>
+        </p:style>
+        <p:txBody>
+          <a:bodyPr rtlCol="0" anchor="ctr"/>
+          <a:lstStyle/>
+          <a:p>
+            <a:pPr algn="ctr"/>
+            <a:r>
+              <a:rPr lang="en-US" altLang="ko-KR" sz="1800" b="1" smtClean="0">
+                <a:solidFill>
+                  <a:schemeClr val="tx1"/>
+                </a:solidFill>
+                <a:latin typeface="Calibri" pitchFamily="34" charset="0"/>
+                <a:ea typeface="Calibri" pitchFamily="34" charset="0"/>
+                <a:cs typeface="Calibri" pitchFamily="34" charset="0"/>
+              </a:rPr>
+              <a:t>C[4]</a:t>
+            </a:r>
+            <a:endParaRPr lang="ko-KR" altLang="en-US" sz="1800" b="1">
+              <a:solidFill>
+                <a:schemeClr val="tx1"/>
+              </a:solidFill>
+              <a:latin typeface="Calibri" pitchFamily="34" charset="0"/>
+              <a:ea typeface="나눔스퀘어 ExtraBold" pitchFamily="50" charset="-127"/>
+              <a:cs typeface="Calibri" pitchFamily="34" charset="0"/>
+            </a:endParaRPr>
+          </a:p>
+        </p:txBody>
+      </p:sp>
+      <p:sp>
+        <p:nvSpPr>
+          <p:cNvPr id="40" name="TextBox 39"/>
+          <p:cNvSpPr txBox="1"/>
+          <p:nvPr/>
+        </p:nvSpPr>
+        <p:spPr>
+          <a:xfrm>
+            <a:off x="1798939" y="651008"/>
+            <a:ext cx="4682178" cy="400110"/>
+          </a:xfrm>
+          <a:prstGeom prst="rect">
+            <a:avLst/>
+          </a:prstGeom>
+          <a:noFill/>
+        </p:spPr>
+        <p:txBody>
+          <a:bodyPr wrap="square" rtlCol="0" anchor="ctr">
+            <a:spAutoFit/>
+          </a:bodyPr>
+          <a:lstStyle/>
+          <a:p>
+            <a:r>
+              <a:rPr lang="en-US" altLang="ko-KR" sz="2000" smtClean="0">
+                <a:latin typeface="나눔스퀘어 ExtraBold" pitchFamily="50" charset="-127"/>
+                <a:ea typeface="나눔스퀘어 ExtraBold" pitchFamily="50" charset="-127"/>
+              </a:rPr>
+              <a:t>i = 1, j = 4 </a:t>
+            </a:r>
+            <a:r>
+              <a:rPr lang="ko-KR" altLang="en-US" sz="2000" smtClean="0">
+                <a:latin typeface="나눔스퀘어 ExtraBold" pitchFamily="50" charset="-127"/>
+                <a:ea typeface="나눔스퀘어 ExtraBold" pitchFamily="50" charset="-127"/>
+              </a:rPr>
+              <a:t>를 계산할 수 있는 경우들</a:t>
+            </a:r>
+            <a:endParaRPr lang="ko-KR" altLang="en-US" sz="2000">
+              <a:latin typeface="나눔스퀘어 ExtraBold" pitchFamily="50" charset="-127"/>
+              <a:ea typeface="나눔스퀘어 ExtraBold" pitchFamily="50" charset="-127"/>
+            </a:endParaRPr>
+          </a:p>
+        </p:txBody>
+      </p:sp>
+      <p:sp>
+        <p:nvSpPr>
+          <p:cNvPr id="2" name="모서리가 둥근 직사각형 1"/>
+          <p:cNvSpPr/>
+          <p:nvPr/>
+        </p:nvSpPr>
+        <p:spPr>
+          <a:xfrm>
+            <a:off x="1224533" y="1079847"/>
+            <a:ext cx="8064896" cy="4968552"/>
+          </a:xfrm>
+          <a:prstGeom prst="roundRect">
+            <a:avLst/>
+          </a:prstGeom>
+          <a:noFill/>
+          <a:ln>
+            <a:solidFill>
+              <a:schemeClr val="tx1"/>
+            </a:solidFill>
+          </a:ln>
+        </p:spPr>
+        <p:style>
+          <a:lnRef idx="2">
+            <a:schemeClr val="accent1">
+              <a:shade val="50000"/>
+            </a:schemeClr>
+          </a:lnRef>
+          <a:fillRef idx="1">
+            <a:schemeClr val="accent1"/>
+          </a:fillRef>
+          <a:effectRef idx="0">
+            <a:schemeClr val="accent1"/>
+          </a:effectRef>
+          <a:fontRef idx="minor">
+            <a:schemeClr val="lt1"/>
+          </a:fontRef>
+        </p:style>
+        <p:txBody>
+          <a:bodyPr rtlCol="0" anchor="ctr"/>
+          <a:lstStyle/>
+          <a:p>
+            <a:pPr algn="ctr"/>
+            <a:endParaRPr lang="ko-KR" altLang="en-US"/>
+          </a:p>
+        </p:txBody>
+      </p:sp>
+      <p:sp>
+        <p:nvSpPr>
+          <p:cNvPr id="5" name="모서리가 둥근 직사각형 4"/>
+          <p:cNvSpPr/>
+          <p:nvPr/>
+        </p:nvSpPr>
+        <p:spPr>
+          <a:xfrm>
+            <a:off x="2375756" y="2051955"/>
+            <a:ext cx="2305161" cy="864096"/>
+          </a:xfrm>
+          <a:prstGeom prst="roundRect">
+            <a:avLst/>
+          </a:prstGeom>
+          <a:noFill/>
+          <a:ln w="38100">
+            <a:solidFill>
+              <a:srgbClr val="FF8181"/>
+            </a:solidFill>
+            <a:prstDash val="solid"/>
+          </a:ln>
+        </p:spPr>
+        <p:style>
+          <a:lnRef idx="2">
+            <a:schemeClr val="accent1">
+              <a:shade val="50000"/>
+            </a:schemeClr>
+          </a:lnRef>
+          <a:fillRef idx="1">
+            <a:schemeClr val="accent1"/>
+          </a:fillRef>
+          <a:effectRef idx="0">
+            <a:schemeClr val="accent1"/>
+          </a:effectRef>
+          <a:fontRef idx="minor">
+            <a:schemeClr val="lt1"/>
+          </a:fontRef>
+        </p:style>
+        <p:txBody>
+          <a:bodyPr rtlCol="0" anchor="ctr"/>
+          <a:lstStyle/>
+          <a:p>
+            <a:pPr algn="ctr"/>
+            <a:endParaRPr lang="ko-KR" altLang="en-US"/>
+          </a:p>
+        </p:txBody>
+      </p:sp>
+      <p:sp>
+        <p:nvSpPr>
+          <p:cNvPr id="26" name="모서리가 둥근 직사각형 25"/>
+          <p:cNvSpPr/>
+          <p:nvPr/>
+        </p:nvSpPr>
+        <p:spPr>
+          <a:xfrm>
+            <a:off x="3152144" y="2110295"/>
+            <a:ext cx="1474694" cy="747416"/>
+          </a:xfrm>
+          <a:prstGeom prst="roundRect">
+            <a:avLst/>
+          </a:prstGeom>
+          <a:noFill/>
+          <a:ln w="38100">
+            <a:solidFill>
+              <a:srgbClr val="00B050"/>
+            </a:solidFill>
+            <a:prstDash val="solid"/>
+          </a:ln>
+        </p:spPr>
+        <p:style>
+          <a:lnRef idx="2">
+            <a:schemeClr val="accent1">
+              <a:shade val="50000"/>
+            </a:schemeClr>
+          </a:lnRef>
+          <a:fillRef idx="1">
+            <a:schemeClr val="accent1"/>
+          </a:fillRef>
+          <a:effectRef idx="0">
+            <a:schemeClr val="accent1"/>
+          </a:effectRef>
+          <a:fontRef idx="minor">
+            <a:schemeClr val="lt1"/>
+          </a:fontRef>
+        </p:style>
+        <p:txBody>
+          <a:bodyPr rtlCol="0" anchor="ctr"/>
+          <a:lstStyle/>
+          <a:p>
+            <a:pPr algn="ctr"/>
+            <a:endParaRPr lang="ko-KR" altLang="en-US"/>
+          </a:p>
+        </p:txBody>
+      </p:sp>
+      <p:sp>
+        <p:nvSpPr>
+          <p:cNvPr id="47" name="직사각형 46"/>
+          <p:cNvSpPr/>
+          <p:nvPr/>
+        </p:nvSpPr>
+        <p:spPr>
+          <a:xfrm>
+            <a:off x="1726779" y="3456111"/>
+            <a:ext cx="720985" cy="648072"/>
+          </a:xfrm>
+          <a:prstGeom prst="rect">
+            <a:avLst/>
+          </a:prstGeom>
+          <a:noFill/>
+          <a:ln>
+            <a:solidFill>
+              <a:schemeClr val="tx1"/>
+            </a:solidFill>
+          </a:ln>
+        </p:spPr>
+        <p:style>
+          <a:lnRef idx="2">
+            <a:schemeClr val="accent1">
+              <a:shade val="50000"/>
+            </a:schemeClr>
+          </a:lnRef>
+          <a:fillRef idx="1">
+            <a:schemeClr val="accent1"/>
+          </a:fillRef>
+          <a:effectRef idx="0">
+            <a:schemeClr val="accent1"/>
+          </a:effectRef>
+          <a:fontRef idx="minor">
+            <a:schemeClr val="lt1"/>
+          </a:fontRef>
+        </p:style>
+        <p:txBody>
+          <a:bodyPr rtlCol="0" anchor="ctr"/>
+          <a:lstStyle/>
+          <a:p>
+            <a:pPr algn="ctr"/>
+            <a:r>
+              <a:rPr lang="en-US" altLang="ko-KR" sz="1800" b="1" smtClean="0">
+                <a:solidFill>
+                  <a:schemeClr val="tx1"/>
+                </a:solidFill>
+                <a:latin typeface="Calibri" pitchFamily="34" charset="0"/>
+                <a:ea typeface="Calibri" pitchFamily="34" charset="0"/>
+                <a:cs typeface="Calibri" pitchFamily="34" charset="0"/>
+              </a:rPr>
+              <a:t>C[1]</a:t>
+            </a:r>
+            <a:endParaRPr lang="ko-KR" altLang="en-US" sz="1800" b="1">
+              <a:solidFill>
+                <a:schemeClr val="tx1"/>
+              </a:solidFill>
+              <a:latin typeface="Calibri" pitchFamily="34" charset="0"/>
+              <a:ea typeface="나눔스퀘어 ExtraBold" pitchFamily="50" charset="-127"/>
+              <a:cs typeface="Calibri" pitchFamily="34" charset="0"/>
+            </a:endParaRPr>
+          </a:p>
+        </p:txBody>
+      </p:sp>
+      <p:sp>
+        <p:nvSpPr>
+          <p:cNvPr id="50" name="직사각형 49"/>
+          <p:cNvSpPr/>
+          <p:nvPr/>
+        </p:nvSpPr>
+        <p:spPr>
+          <a:xfrm>
+            <a:off x="2447764" y="3456111"/>
+            <a:ext cx="720985" cy="648072"/>
+          </a:xfrm>
+          <a:prstGeom prst="rect">
+            <a:avLst/>
+          </a:prstGeom>
+          <a:noFill/>
+          <a:ln>
+            <a:solidFill>
+              <a:schemeClr val="tx1"/>
+            </a:solidFill>
+          </a:ln>
+        </p:spPr>
+        <p:style>
+          <a:lnRef idx="2">
+            <a:schemeClr val="accent1">
+              <a:shade val="50000"/>
+            </a:schemeClr>
+          </a:lnRef>
+          <a:fillRef idx="1">
+            <a:schemeClr val="accent1"/>
+          </a:fillRef>
+          <a:effectRef idx="0">
+            <a:schemeClr val="accent1"/>
+          </a:effectRef>
+          <a:fontRef idx="minor">
+            <a:schemeClr val="lt1"/>
+          </a:fontRef>
+        </p:style>
+        <p:txBody>
+          <a:bodyPr rtlCol="0" anchor="ctr"/>
+          <a:lstStyle/>
+          <a:p>
+            <a:pPr algn="ctr"/>
+            <a:r>
+              <a:rPr lang="en-US" altLang="ko-KR" sz="1800" b="1" smtClean="0">
+                <a:solidFill>
+                  <a:schemeClr val="tx1"/>
+                </a:solidFill>
+                <a:latin typeface="Calibri" pitchFamily="34" charset="0"/>
+                <a:ea typeface="Calibri" pitchFamily="34" charset="0"/>
+                <a:cs typeface="Calibri" pitchFamily="34" charset="0"/>
+              </a:rPr>
+              <a:t>C[2]</a:t>
+            </a:r>
+            <a:endParaRPr lang="ko-KR" altLang="en-US" sz="1800" b="1">
+              <a:solidFill>
+                <a:schemeClr val="tx1"/>
+              </a:solidFill>
+              <a:latin typeface="Calibri" pitchFamily="34" charset="0"/>
+              <a:ea typeface="나눔스퀘어 ExtraBold" pitchFamily="50" charset="-127"/>
+              <a:cs typeface="Calibri" pitchFamily="34" charset="0"/>
+            </a:endParaRPr>
+          </a:p>
+        </p:txBody>
+      </p:sp>
+      <p:sp>
+        <p:nvSpPr>
+          <p:cNvPr id="52" name="직사각형 51"/>
+          <p:cNvSpPr/>
+          <p:nvPr/>
+        </p:nvSpPr>
+        <p:spPr>
+          <a:xfrm>
+            <a:off x="3168749" y="3456111"/>
+            <a:ext cx="720985" cy="648072"/>
+          </a:xfrm>
+          <a:prstGeom prst="rect">
+            <a:avLst/>
+          </a:prstGeom>
+          <a:noFill/>
+          <a:ln>
+            <a:solidFill>
+              <a:schemeClr val="tx1"/>
+            </a:solidFill>
+          </a:ln>
+        </p:spPr>
+        <p:style>
+          <a:lnRef idx="2">
+            <a:schemeClr val="accent1">
+              <a:shade val="50000"/>
+            </a:schemeClr>
+          </a:lnRef>
+          <a:fillRef idx="1">
+            <a:schemeClr val="accent1"/>
+          </a:fillRef>
+          <a:effectRef idx="0">
+            <a:schemeClr val="accent1"/>
+          </a:effectRef>
+          <a:fontRef idx="minor">
+            <a:schemeClr val="lt1"/>
+          </a:fontRef>
+        </p:style>
+        <p:txBody>
+          <a:bodyPr rtlCol="0" anchor="ctr"/>
+          <a:lstStyle/>
+          <a:p>
+            <a:pPr algn="ctr"/>
+            <a:r>
+              <a:rPr lang="en-US" altLang="ko-KR" sz="1800" b="1" smtClean="0">
+                <a:solidFill>
+                  <a:schemeClr val="tx1"/>
+                </a:solidFill>
+                <a:latin typeface="Calibri" pitchFamily="34" charset="0"/>
+                <a:ea typeface="Calibri" pitchFamily="34" charset="0"/>
+                <a:cs typeface="Calibri" pitchFamily="34" charset="0"/>
+              </a:rPr>
+              <a:t>C[3]</a:t>
+            </a:r>
+            <a:endParaRPr lang="ko-KR" altLang="en-US" sz="1800" b="1">
+              <a:solidFill>
+                <a:schemeClr val="tx1"/>
+              </a:solidFill>
+              <a:latin typeface="Calibri" pitchFamily="34" charset="0"/>
+              <a:ea typeface="나눔스퀘어 ExtraBold" pitchFamily="50" charset="-127"/>
+              <a:cs typeface="Calibri" pitchFamily="34" charset="0"/>
+            </a:endParaRPr>
+          </a:p>
+        </p:txBody>
+      </p:sp>
+      <p:sp>
+        <p:nvSpPr>
+          <p:cNvPr id="53" name="직사각형 52"/>
+          <p:cNvSpPr/>
+          <p:nvPr/>
+        </p:nvSpPr>
+        <p:spPr>
+          <a:xfrm>
+            <a:off x="3889734" y="3456111"/>
+            <a:ext cx="720985" cy="648072"/>
+          </a:xfrm>
+          <a:prstGeom prst="rect">
+            <a:avLst/>
+          </a:prstGeom>
+          <a:noFill/>
+          <a:ln>
+            <a:solidFill>
+              <a:schemeClr val="tx1"/>
+            </a:solidFill>
+          </a:ln>
+        </p:spPr>
+        <p:style>
+          <a:lnRef idx="2">
+            <a:schemeClr val="accent1">
+              <a:shade val="50000"/>
+            </a:schemeClr>
+          </a:lnRef>
+          <a:fillRef idx="1">
+            <a:schemeClr val="accent1"/>
+          </a:fillRef>
+          <a:effectRef idx="0">
+            <a:schemeClr val="accent1"/>
+          </a:effectRef>
+          <a:fontRef idx="minor">
+            <a:schemeClr val="lt1"/>
+          </a:fontRef>
+        </p:style>
+        <p:txBody>
+          <a:bodyPr rtlCol="0" anchor="ctr"/>
+          <a:lstStyle/>
+          <a:p>
+            <a:pPr algn="ctr"/>
+            <a:r>
+              <a:rPr lang="en-US" altLang="ko-KR" sz="1800" b="1" smtClean="0">
+                <a:solidFill>
+                  <a:schemeClr val="tx1"/>
+                </a:solidFill>
+                <a:latin typeface="Calibri" pitchFamily="34" charset="0"/>
+                <a:ea typeface="Calibri" pitchFamily="34" charset="0"/>
+                <a:cs typeface="Calibri" pitchFamily="34" charset="0"/>
+              </a:rPr>
+              <a:t>C[4]</a:t>
+            </a:r>
+            <a:endParaRPr lang="ko-KR" altLang="en-US" sz="1800" b="1">
+              <a:solidFill>
+                <a:schemeClr val="tx1"/>
+              </a:solidFill>
+              <a:latin typeface="Calibri" pitchFamily="34" charset="0"/>
+              <a:ea typeface="나눔스퀘어 ExtraBold" pitchFamily="50" charset="-127"/>
+              <a:cs typeface="Calibri" pitchFamily="34" charset="0"/>
+            </a:endParaRPr>
+          </a:p>
+        </p:txBody>
+      </p:sp>
+      <p:sp>
+        <p:nvSpPr>
+          <p:cNvPr id="54" name="모서리가 둥근 직사각형 53"/>
+          <p:cNvSpPr/>
+          <p:nvPr/>
+        </p:nvSpPr>
+        <p:spPr>
+          <a:xfrm>
+            <a:off x="2375756" y="3348099"/>
+            <a:ext cx="2305161" cy="864096"/>
+          </a:xfrm>
+          <a:prstGeom prst="roundRect">
+            <a:avLst/>
+          </a:prstGeom>
+          <a:noFill/>
+          <a:ln w="38100">
+            <a:solidFill>
+              <a:srgbClr val="FF8181"/>
+            </a:solidFill>
+            <a:prstDash val="solid"/>
+          </a:ln>
+        </p:spPr>
+        <p:style>
+          <a:lnRef idx="2">
+            <a:schemeClr val="accent1">
+              <a:shade val="50000"/>
+            </a:schemeClr>
+          </a:lnRef>
+          <a:fillRef idx="1">
+            <a:schemeClr val="accent1"/>
+          </a:fillRef>
+          <a:effectRef idx="0">
+            <a:schemeClr val="accent1"/>
+          </a:effectRef>
+          <a:fontRef idx="minor">
+            <a:schemeClr val="lt1"/>
+          </a:fontRef>
+        </p:style>
+        <p:txBody>
+          <a:bodyPr rtlCol="0" anchor="ctr"/>
+          <a:lstStyle/>
+          <a:p>
+            <a:pPr algn="ctr"/>
+            <a:endParaRPr lang="ko-KR" altLang="en-US"/>
+          </a:p>
+        </p:txBody>
+      </p:sp>
+      <p:sp>
+        <p:nvSpPr>
+          <p:cNvPr id="55" name="모서리가 둥근 직사각형 54"/>
+          <p:cNvSpPr/>
+          <p:nvPr/>
+        </p:nvSpPr>
+        <p:spPr>
+          <a:xfrm>
+            <a:off x="2436929" y="3406439"/>
+            <a:ext cx="1474694" cy="747416"/>
+          </a:xfrm>
+          <a:prstGeom prst="roundRect">
+            <a:avLst/>
+          </a:prstGeom>
+          <a:noFill/>
+          <a:ln w="38100">
+            <a:solidFill>
+              <a:srgbClr val="00B050"/>
+            </a:solidFill>
+            <a:prstDash val="solid"/>
+          </a:ln>
+        </p:spPr>
+        <p:style>
+          <a:lnRef idx="2">
+            <a:schemeClr val="accent1">
+              <a:shade val="50000"/>
+            </a:schemeClr>
+          </a:lnRef>
+          <a:fillRef idx="1">
+            <a:schemeClr val="accent1"/>
+          </a:fillRef>
+          <a:effectRef idx="0">
+            <a:schemeClr val="accent1"/>
+          </a:effectRef>
+          <a:fontRef idx="minor">
+            <a:schemeClr val="lt1"/>
+          </a:fontRef>
+        </p:style>
+        <p:txBody>
+          <a:bodyPr rtlCol="0" anchor="ctr"/>
+          <a:lstStyle/>
+          <a:p>
+            <a:pPr algn="ctr"/>
+            <a:endParaRPr lang="ko-KR" altLang="en-US"/>
+          </a:p>
+        </p:txBody>
+      </p:sp>
+      <p:sp>
+        <p:nvSpPr>
+          <p:cNvPr id="56" name="직사각형 55"/>
+          <p:cNvSpPr/>
+          <p:nvPr/>
+        </p:nvSpPr>
+        <p:spPr>
+          <a:xfrm>
+            <a:off x="5816013" y="2159967"/>
+            <a:ext cx="720985" cy="648072"/>
+          </a:xfrm>
+          <a:prstGeom prst="rect">
+            <a:avLst/>
+          </a:prstGeom>
+          <a:noFill/>
+          <a:ln>
+            <a:solidFill>
+              <a:schemeClr val="tx1"/>
+            </a:solidFill>
+          </a:ln>
+        </p:spPr>
+        <p:style>
+          <a:lnRef idx="2">
+            <a:schemeClr val="accent1">
+              <a:shade val="50000"/>
+            </a:schemeClr>
+          </a:lnRef>
+          <a:fillRef idx="1">
+            <a:schemeClr val="accent1"/>
+          </a:fillRef>
+          <a:effectRef idx="0">
+            <a:schemeClr val="accent1"/>
+          </a:effectRef>
+          <a:fontRef idx="minor">
+            <a:schemeClr val="lt1"/>
+          </a:fontRef>
+        </p:style>
+        <p:txBody>
+          <a:bodyPr rtlCol="0" anchor="ctr"/>
+          <a:lstStyle/>
+          <a:p>
+            <a:pPr algn="ctr"/>
+            <a:r>
+              <a:rPr lang="en-US" altLang="ko-KR" sz="1800" b="1" smtClean="0">
+                <a:solidFill>
+                  <a:schemeClr val="tx1"/>
+                </a:solidFill>
+                <a:latin typeface="Calibri" pitchFamily="34" charset="0"/>
+                <a:ea typeface="Calibri" pitchFamily="34" charset="0"/>
+                <a:cs typeface="Calibri" pitchFamily="34" charset="0"/>
+              </a:rPr>
+              <a:t>C[1]</a:t>
+            </a:r>
+            <a:endParaRPr lang="ko-KR" altLang="en-US" sz="1800" b="1">
+              <a:solidFill>
+                <a:schemeClr val="tx1"/>
+              </a:solidFill>
+              <a:latin typeface="Calibri" pitchFamily="34" charset="0"/>
+              <a:ea typeface="나눔스퀘어 ExtraBold" pitchFamily="50" charset="-127"/>
+              <a:cs typeface="Calibri" pitchFamily="34" charset="0"/>
+            </a:endParaRPr>
+          </a:p>
+        </p:txBody>
+      </p:sp>
+      <p:sp>
+        <p:nvSpPr>
+          <p:cNvPr id="57" name="직사각형 56"/>
+          <p:cNvSpPr/>
+          <p:nvPr/>
+        </p:nvSpPr>
+        <p:spPr>
+          <a:xfrm>
+            <a:off x="6536998" y="2159967"/>
+            <a:ext cx="720985" cy="648072"/>
+          </a:xfrm>
+          <a:prstGeom prst="rect">
+            <a:avLst/>
+          </a:prstGeom>
+          <a:noFill/>
+          <a:ln>
+            <a:solidFill>
+              <a:schemeClr val="tx1"/>
+            </a:solidFill>
+          </a:ln>
+        </p:spPr>
+        <p:style>
+          <a:lnRef idx="2">
+            <a:schemeClr val="accent1">
+              <a:shade val="50000"/>
+            </a:schemeClr>
+          </a:lnRef>
+          <a:fillRef idx="1">
+            <a:schemeClr val="accent1"/>
+          </a:fillRef>
+          <a:effectRef idx="0">
+            <a:schemeClr val="accent1"/>
+          </a:effectRef>
+          <a:fontRef idx="minor">
+            <a:schemeClr val="lt1"/>
+          </a:fontRef>
+        </p:style>
+        <p:txBody>
+          <a:bodyPr rtlCol="0" anchor="ctr"/>
+          <a:lstStyle/>
+          <a:p>
+            <a:pPr algn="ctr"/>
+            <a:r>
+              <a:rPr lang="en-US" altLang="ko-KR" sz="1800" b="1" smtClean="0">
+                <a:solidFill>
+                  <a:schemeClr val="tx1"/>
+                </a:solidFill>
+                <a:latin typeface="Calibri" pitchFamily="34" charset="0"/>
+                <a:ea typeface="Calibri" pitchFamily="34" charset="0"/>
+                <a:cs typeface="Calibri" pitchFamily="34" charset="0"/>
+              </a:rPr>
+              <a:t>C[2]</a:t>
+            </a:r>
+            <a:endParaRPr lang="ko-KR" altLang="en-US" sz="1800" b="1">
+              <a:solidFill>
+                <a:schemeClr val="tx1"/>
+              </a:solidFill>
+              <a:latin typeface="Calibri" pitchFamily="34" charset="0"/>
+              <a:ea typeface="나눔스퀘어 ExtraBold" pitchFamily="50" charset="-127"/>
+              <a:cs typeface="Calibri" pitchFamily="34" charset="0"/>
+            </a:endParaRPr>
+          </a:p>
+        </p:txBody>
+      </p:sp>
+      <p:sp>
+        <p:nvSpPr>
+          <p:cNvPr id="58" name="직사각형 57"/>
+          <p:cNvSpPr/>
+          <p:nvPr/>
+        </p:nvSpPr>
+        <p:spPr>
+          <a:xfrm>
+            <a:off x="7257983" y="2159967"/>
+            <a:ext cx="720985" cy="648072"/>
+          </a:xfrm>
+          <a:prstGeom prst="rect">
+            <a:avLst/>
+          </a:prstGeom>
+          <a:noFill/>
+          <a:ln>
+            <a:solidFill>
+              <a:schemeClr val="tx1"/>
+            </a:solidFill>
+          </a:ln>
+        </p:spPr>
+        <p:style>
+          <a:lnRef idx="2">
+            <a:schemeClr val="accent1">
+              <a:shade val="50000"/>
+            </a:schemeClr>
+          </a:lnRef>
+          <a:fillRef idx="1">
+            <a:schemeClr val="accent1"/>
+          </a:fillRef>
+          <a:effectRef idx="0">
+            <a:schemeClr val="accent1"/>
+          </a:effectRef>
+          <a:fontRef idx="minor">
+            <a:schemeClr val="lt1"/>
+          </a:fontRef>
+        </p:style>
+        <p:txBody>
+          <a:bodyPr rtlCol="0" anchor="ctr"/>
+          <a:lstStyle/>
+          <a:p>
+            <a:pPr algn="ctr"/>
+            <a:r>
+              <a:rPr lang="en-US" altLang="ko-KR" sz="1800" b="1" smtClean="0">
+                <a:solidFill>
+                  <a:schemeClr val="tx1"/>
+                </a:solidFill>
+                <a:latin typeface="Calibri" pitchFamily="34" charset="0"/>
+                <a:ea typeface="Calibri" pitchFamily="34" charset="0"/>
+                <a:cs typeface="Calibri" pitchFamily="34" charset="0"/>
+              </a:rPr>
+              <a:t>C[3]</a:t>
+            </a:r>
+            <a:endParaRPr lang="ko-KR" altLang="en-US" sz="1800" b="1">
+              <a:solidFill>
+                <a:schemeClr val="tx1"/>
+              </a:solidFill>
+              <a:latin typeface="Calibri" pitchFamily="34" charset="0"/>
+              <a:ea typeface="나눔스퀘어 ExtraBold" pitchFamily="50" charset="-127"/>
+              <a:cs typeface="Calibri" pitchFamily="34" charset="0"/>
+            </a:endParaRPr>
+          </a:p>
+        </p:txBody>
+      </p:sp>
+      <p:sp>
+        <p:nvSpPr>
+          <p:cNvPr id="59" name="직사각형 58"/>
+          <p:cNvSpPr/>
+          <p:nvPr/>
+        </p:nvSpPr>
+        <p:spPr>
+          <a:xfrm>
+            <a:off x="7978968" y="2159967"/>
+            <a:ext cx="720985" cy="648072"/>
+          </a:xfrm>
+          <a:prstGeom prst="rect">
+            <a:avLst/>
+          </a:prstGeom>
+          <a:noFill/>
+          <a:ln>
+            <a:solidFill>
+              <a:schemeClr val="tx1"/>
+            </a:solidFill>
+          </a:ln>
+        </p:spPr>
+        <p:style>
+          <a:lnRef idx="2">
+            <a:schemeClr val="accent1">
+              <a:shade val="50000"/>
+            </a:schemeClr>
+          </a:lnRef>
+          <a:fillRef idx="1">
+            <a:schemeClr val="accent1"/>
+          </a:fillRef>
+          <a:effectRef idx="0">
+            <a:schemeClr val="accent1"/>
+          </a:effectRef>
+          <a:fontRef idx="minor">
+            <a:schemeClr val="lt1"/>
+          </a:fontRef>
+        </p:style>
+        <p:txBody>
+          <a:bodyPr rtlCol="0" anchor="ctr"/>
+          <a:lstStyle/>
+          <a:p>
+            <a:pPr algn="ctr"/>
+            <a:r>
+              <a:rPr lang="en-US" altLang="ko-KR" sz="1800" b="1" smtClean="0">
+                <a:solidFill>
+                  <a:schemeClr val="tx1"/>
+                </a:solidFill>
+                <a:latin typeface="Calibri" pitchFamily="34" charset="0"/>
+                <a:ea typeface="Calibri" pitchFamily="34" charset="0"/>
+                <a:cs typeface="Calibri" pitchFamily="34" charset="0"/>
+              </a:rPr>
+              <a:t>C[4]</a:t>
+            </a:r>
+            <a:endParaRPr lang="ko-KR" altLang="en-US" sz="1800" b="1">
+              <a:solidFill>
+                <a:schemeClr val="tx1"/>
+              </a:solidFill>
+              <a:latin typeface="Calibri" pitchFamily="34" charset="0"/>
+              <a:ea typeface="나눔스퀘어 ExtraBold" pitchFamily="50" charset="-127"/>
+              <a:cs typeface="Calibri" pitchFamily="34" charset="0"/>
+            </a:endParaRPr>
+          </a:p>
+        </p:txBody>
+      </p:sp>
+      <p:sp>
+        <p:nvSpPr>
+          <p:cNvPr id="60" name="모서리가 둥근 직사각형 59"/>
+          <p:cNvSpPr/>
+          <p:nvPr/>
+        </p:nvSpPr>
+        <p:spPr>
+          <a:xfrm>
+            <a:off x="5744909" y="2051955"/>
+            <a:ext cx="2305161" cy="864096"/>
+          </a:xfrm>
+          <a:prstGeom prst="roundRect">
+            <a:avLst/>
+          </a:prstGeom>
+          <a:noFill/>
+          <a:ln w="38100">
+            <a:solidFill>
+              <a:srgbClr val="FF8181"/>
+            </a:solidFill>
+            <a:prstDash val="solid"/>
+          </a:ln>
+        </p:spPr>
+        <p:style>
+          <a:lnRef idx="2">
+            <a:schemeClr val="accent1">
+              <a:shade val="50000"/>
+            </a:schemeClr>
+          </a:lnRef>
+          <a:fillRef idx="1">
+            <a:schemeClr val="accent1"/>
+          </a:fillRef>
+          <a:effectRef idx="0">
+            <a:schemeClr val="accent1"/>
+          </a:effectRef>
+          <a:fontRef idx="minor">
+            <a:schemeClr val="lt1"/>
+          </a:fontRef>
+        </p:style>
+        <p:txBody>
+          <a:bodyPr rtlCol="0" anchor="ctr"/>
+          <a:lstStyle/>
+          <a:p>
+            <a:pPr algn="ctr"/>
+            <a:endParaRPr lang="ko-KR" altLang="en-US"/>
+          </a:p>
+        </p:txBody>
+      </p:sp>
+      <p:sp>
+        <p:nvSpPr>
+          <p:cNvPr id="61" name="모서리가 둥근 직사각형 60"/>
+          <p:cNvSpPr/>
+          <p:nvPr/>
+        </p:nvSpPr>
+        <p:spPr>
+          <a:xfrm>
+            <a:off x="6526163" y="2110295"/>
+            <a:ext cx="1474694" cy="747416"/>
+          </a:xfrm>
+          <a:prstGeom prst="roundRect">
+            <a:avLst/>
+          </a:prstGeom>
+          <a:noFill/>
+          <a:ln w="38100">
+            <a:solidFill>
+              <a:srgbClr val="00B050"/>
+            </a:solidFill>
+            <a:prstDash val="solid"/>
+          </a:ln>
+        </p:spPr>
+        <p:style>
+          <a:lnRef idx="2">
+            <a:schemeClr val="accent1">
+              <a:shade val="50000"/>
+            </a:schemeClr>
+          </a:lnRef>
+          <a:fillRef idx="1">
+            <a:schemeClr val="accent1"/>
+          </a:fillRef>
+          <a:effectRef idx="0">
+            <a:schemeClr val="accent1"/>
+          </a:effectRef>
+          <a:fontRef idx="minor">
+            <a:schemeClr val="lt1"/>
+          </a:fontRef>
+        </p:style>
+        <p:txBody>
+          <a:bodyPr rtlCol="0" anchor="ctr"/>
+          <a:lstStyle/>
+          <a:p>
+            <a:pPr algn="ctr"/>
+            <a:endParaRPr lang="ko-KR" altLang="en-US"/>
+          </a:p>
+        </p:txBody>
+      </p:sp>
+      <p:sp>
+        <p:nvSpPr>
+          <p:cNvPr id="62" name="직사각형 61"/>
+          <p:cNvSpPr/>
+          <p:nvPr/>
+        </p:nvSpPr>
+        <p:spPr>
+          <a:xfrm>
+            <a:off x="5816013" y="3450666"/>
+            <a:ext cx="720985" cy="648072"/>
+          </a:xfrm>
+          <a:prstGeom prst="rect">
+            <a:avLst/>
+          </a:prstGeom>
+          <a:noFill/>
+          <a:ln>
+            <a:solidFill>
+              <a:schemeClr val="tx1"/>
+            </a:solidFill>
+          </a:ln>
+        </p:spPr>
+        <p:style>
+          <a:lnRef idx="2">
+            <a:schemeClr val="accent1">
+              <a:shade val="50000"/>
+            </a:schemeClr>
+          </a:lnRef>
+          <a:fillRef idx="1">
+            <a:schemeClr val="accent1"/>
+          </a:fillRef>
+          <a:effectRef idx="0">
+            <a:schemeClr val="accent1"/>
+          </a:effectRef>
+          <a:fontRef idx="minor">
+            <a:schemeClr val="lt1"/>
+          </a:fontRef>
+        </p:style>
+        <p:txBody>
+          <a:bodyPr rtlCol="0" anchor="ctr"/>
+          <a:lstStyle/>
+          <a:p>
+            <a:pPr algn="ctr"/>
+            <a:r>
+              <a:rPr lang="en-US" altLang="ko-KR" sz="1800" b="1" smtClean="0">
+                <a:solidFill>
+                  <a:schemeClr val="tx1"/>
+                </a:solidFill>
+                <a:latin typeface="Calibri" pitchFamily="34" charset="0"/>
+                <a:ea typeface="Calibri" pitchFamily="34" charset="0"/>
+                <a:cs typeface="Calibri" pitchFamily="34" charset="0"/>
+              </a:rPr>
+              <a:t>C[1]</a:t>
+            </a:r>
+            <a:endParaRPr lang="ko-KR" altLang="en-US" sz="1800" b="1">
+              <a:solidFill>
+                <a:schemeClr val="tx1"/>
+              </a:solidFill>
+              <a:latin typeface="Calibri" pitchFamily="34" charset="0"/>
+              <a:ea typeface="나눔스퀘어 ExtraBold" pitchFamily="50" charset="-127"/>
+              <a:cs typeface="Calibri" pitchFamily="34" charset="0"/>
+            </a:endParaRPr>
+          </a:p>
+        </p:txBody>
+      </p:sp>
+      <p:sp>
+        <p:nvSpPr>
+          <p:cNvPr id="63" name="직사각형 62"/>
+          <p:cNvSpPr/>
+          <p:nvPr/>
+        </p:nvSpPr>
+        <p:spPr>
+          <a:xfrm>
+            <a:off x="6536998" y="3450666"/>
+            <a:ext cx="720985" cy="648072"/>
+          </a:xfrm>
+          <a:prstGeom prst="rect">
+            <a:avLst/>
+          </a:prstGeom>
+          <a:noFill/>
+          <a:ln>
+            <a:solidFill>
+              <a:schemeClr val="tx1"/>
+            </a:solidFill>
+          </a:ln>
+        </p:spPr>
+        <p:style>
+          <a:lnRef idx="2">
+            <a:schemeClr val="accent1">
+              <a:shade val="50000"/>
+            </a:schemeClr>
+          </a:lnRef>
+          <a:fillRef idx="1">
+            <a:schemeClr val="accent1"/>
+          </a:fillRef>
+          <a:effectRef idx="0">
+            <a:schemeClr val="accent1"/>
+          </a:effectRef>
+          <a:fontRef idx="minor">
+            <a:schemeClr val="lt1"/>
+          </a:fontRef>
+        </p:style>
+        <p:txBody>
+          <a:bodyPr rtlCol="0" anchor="ctr"/>
+          <a:lstStyle/>
+          <a:p>
+            <a:pPr algn="ctr"/>
+            <a:r>
+              <a:rPr lang="en-US" altLang="ko-KR" sz="1800" b="1" smtClean="0">
+                <a:solidFill>
+                  <a:schemeClr val="tx1"/>
+                </a:solidFill>
+                <a:latin typeface="Calibri" pitchFamily="34" charset="0"/>
+                <a:ea typeface="Calibri" pitchFamily="34" charset="0"/>
+                <a:cs typeface="Calibri" pitchFamily="34" charset="0"/>
+              </a:rPr>
+              <a:t>C[2]</a:t>
+            </a:r>
+            <a:endParaRPr lang="ko-KR" altLang="en-US" sz="1800" b="1">
+              <a:solidFill>
+                <a:schemeClr val="tx1"/>
+              </a:solidFill>
+              <a:latin typeface="Calibri" pitchFamily="34" charset="0"/>
+              <a:ea typeface="나눔스퀘어 ExtraBold" pitchFamily="50" charset="-127"/>
+              <a:cs typeface="Calibri" pitchFamily="34" charset="0"/>
+            </a:endParaRPr>
+          </a:p>
+        </p:txBody>
+      </p:sp>
+      <p:sp>
+        <p:nvSpPr>
+          <p:cNvPr id="64" name="직사각형 63"/>
+          <p:cNvSpPr/>
+          <p:nvPr/>
+        </p:nvSpPr>
+        <p:spPr>
+          <a:xfrm>
+            <a:off x="7257983" y="3450666"/>
+            <a:ext cx="720985" cy="648072"/>
+          </a:xfrm>
+          <a:prstGeom prst="rect">
+            <a:avLst/>
+          </a:prstGeom>
+          <a:noFill/>
+          <a:ln>
+            <a:solidFill>
+              <a:schemeClr val="tx1"/>
+            </a:solidFill>
+          </a:ln>
+        </p:spPr>
+        <p:style>
+          <a:lnRef idx="2">
+            <a:schemeClr val="accent1">
+              <a:shade val="50000"/>
+            </a:schemeClr>
+          </a:lnRef>
+          <a:fillRef idx="1">
+            <a:schemeClr val="accent1"/>
+          </a:fillRef>
+          <a:effectRef idx="0">
+            <a:schemeClr val="accent1"/>
+          </a:effectRef>
+          <a:fontRef idx="minor">
+            <a:schemeClr val="lt1"/>
+          </a:fontRef>
+        </p:style>
+        <p:txBody>
+          <a:bodyPr rtlCol="0" anchor="ctr"/>
+          <a:lstStyle/>
+          <a:p>
+            <a:pPr algn="ctr"/>
+            <a:r>
+              <a:rPr lang="en-US" altLang="ko-KR" sz="1800" b="1" smtClean="0">
+                <a:solidFill>
+                  <a:schemeClr val="tx1"/>
+                </a:solidFill>
+                <a:latin typeface="Calibri" pitchFamily="34" charset="0"/>
+                <a:ea typeface="Calibri" pitchFamily="34" charset="0"/>
+                <a:cs typeface="Calibri" pitchFamily="34" charset="0"/>
+              </a:rPr>
+              <a:t>C[3]</a:t>
+            </a:r>
+            <a:endParaRPr lang="ko-KR" altLang="en-US" sz="1800" b="1">
+              <a:solidFill>
+                <a:schemeClr val="tx1"/>
+              </a:solidFill>
+              <a:latin typeface="Calibri" pitchFamily="34" charset="0"/>
+              <a:ea typeface="나눔스퀘어 ExtraBold" pitchFamily="50" charset="-127"/>
+              <a:cs typeface="Calibri" pitchFamily="34" charset="0"/>
+            </a:endParaRPr>
+          </a:p>
+        </p:txBody>
+      </p:sp>
+      <p:sp>
+        <p:nvSpPr>
+          <p:cNvPr id="65" name="직사각형 64"/>
+          <p:cNvSpPr/>
+          <p:nvPr/>
+        </p:nvSpPr>
+        <p:spPr>
+          <a:xfrm>
+            <a:off x="7978968" y="3450666"/>
+            <a:ext cx="720985" cy="648072"/>
+          </a:xfrm>
+          <a:prstGeom prst="rect">
+            <a:avLst/>
+          </a:prstGeom>
+          <a:noFill/>
+          <a:ln>
+            <a:solidFill>
+              <a:schemeClr val="tx1"/>
+            </a:solidFill>
+          </a:ln>
+        </p:spPr>
+        <p:style>
+          <a:lnRef idx="2">
+            <a:schemeClr val="accent1">
+              <a:shade val="50000"/>
+            </a:schemeClr>
+          </a:lnRef>
+          <a:fillRef idx="1">
+            <a:schemeClr val="accent1"/>
+          </a:fillRef>
+          <a:effectRef idx="0">
+            <a:schemeClr val="accent1"/>
+          </a:effectRef>
+          <a:fontRef idx="minor">
+            <a:schemeClr val="lt1"/>
+          </a:fontRef>
+        </p:style>
+        <p:txBody>
+          <a:bodyPr rtlCol="0" anchor="ctr"/>
+          <a:lstStyle/>
+          <a:p>
+            <a:pPr algn="ctr"/>
+            <a:r>
+              <a:rPr lang="en-US" altLang="ko-KR" sz="1800" b="1" smtClean="0">
+                <a:solidFill>
+                  <a:schemeClr val="tx1"/>
+                </a:solidFill>
+                <a:latin typeface="Calibri" pitchFamily="34" charset="0"/>
+                <a:ea typeface="Calibri" pitchFamily="34" charset="0"/>
+                <a:cs typeface="Calibri" pitchFamily="34" charset="0"/>
+              </a:rPr>
+              <a:t>C[4]</a:t>
+            </a:r>
+            <a:endParaRPr lang="ko-KR" altLang="en-US" sz="1800" b="1">
+              <a:solidFill>
+                <a:schemeClr val="tx1"/>
+              </a:solidFill>
+              <a:latin typeface="Calibri" pitchFamily="34" charset="0"/>
+              <a:ea typeface="나눔스퀘어 ExtraBold" pitchFamily="50" charset="-127"/>
+              <a:cs typeface="Calibri" pitchFamily="34" charset="0"/>
+            </a:endParaRPr>
+          </a:p>
+        </p:txBody>
+      </p:sp>
+      <p:sp>
+        <p:nvSpPr>
+          <p:cNvPr id="66" name="모서리가 둥근 직사각형 65"/>
+          <p:cNvSpPr/>
+          <p:nvPr/>
+        </p:nvSpPr>
+        <p:spPr>
+          <a:xfrm>
+            <a:off x="5744909" y="3342654"/>
+            <a:ext cx="2305161" cy="864096"/>
+          </a:xfrm>
+          <a:prstGeom prst="roundRect">
+            <a:avLst/>
+          </a:prstGeom>
+          <a:noFill/>
+          <a:ln w="38100">
+            <a:solidFill>
+              <a:srgbClr val="FF8181"/>
+            </a:solidFill>
+            <a:prstDash val="solid"/>
+          </a:ln>
+        </p:spPr>
+        <p:style>
+          <a:lnRef idx="2">
+            <a:schemeClr val="accent1">
+              <a:shade val="50000"/>
+            </a:schemeClr>
+          </a:lnRef>
+          <a:fillRef idx="1">
+            <a:schemeClr val="accent1"/>
+          </a:fillRef>
+          <a:effectRef idx="0">
+            <a:schemeClr val="accent1"/>
+          </a:effectRef>
+          <a:fontRef idx="minor">
+            <a:schemeClr val="lt1"/>
+          </a:fontRef>
+        </p:style>
+        <p:txBody>
+          <a:bodyPr rtlCol="0" anchor="ctr"/>
+          <a:lstStyle/>
+          <a:p>
+            <a:pPr algn="ctr"/>
+            <a:endParaRPr lang="ko-KR" altLang="en-US"/>
+          </a:p>
+        </p:txBody>
+      </p:sp>
+      <p:sp>
+        <p:nvSpPr>
+          <p:cNvPr id="67" name="모서리가 둥근 직사각형 66"/>
+          <p:cNvSpPr/>
+          <p:nvPr/>
+        </p:nvSpPr>
+        <p:spPr>
+          <a:xfrm>
+            <a:off x="5799136" y="3400994"/>
+            <a:ext cx="1474694" cy="747416"/>
+          </a:xfrm>
+          <a:prstGeom prst="roundRect">
+            <a:avLst/>
+          </a:prstGeom>
+          <a:noFill/>
+          <a:ln w="38100">
+            <a:solidFill>
+              <a:srgbClr val="00B050"/>
+            </a:solidFill>
+            <a:prstDash val="solid"/>
+          </a:ln>
+        </p:spPr>
+        <p:style>
+          <a:lnRef idx="2">
+            <a:schemeClr val="accent1">
+              <a:shade val="50000"/>
+            </a:schemeClr>
+          </a:lnRef>
+          <a:fillRef idx="1">
+            <a:schemeClr val="accent1"/>
+          </a:fillRef>
+          <a:effectRef idx="0">
+            <a:schemeClr val="accent1"/>
+          </a:effectRef>
+          <a:fontRef idx="minor">
+            <a:schemeClr val="lt1"/>
+          </a:fontRef>
+        </p:style>
+        <p:txBody>
+          <a:bodyPr rtlCol="0" anchor="ctr"/>
+          <a:lstStyle/>
+          <a:p>
+            <a:pPr algn="ctr"/>
+            <a:endParaRPr lang="ko-KR" altLang="en-US"/>
+          </a:p>
+        </p:txBody>
+      </p:sp>
+      <p:sp>
+        <p:nvSpPr>
+          <p:cNvPr id="68" name="직사각형 67"/>
+          <p:cNvSpPr/>
+          <p:nvPr/>
+        </p:nvSpPr>
+        <p:spPr>
+          <a:xfrm>
+            <a:off x="3743909" y="4788259"/>
+            <a:ext cx="720985" cy="648072"/>
+          </a:xfrm>
+          <a:prstGeom prst="rect">
+            <a:avLst/>
+          </a:prstGeom>
+          <a:noFill/>
+          <a:ln>
+            <a:solidFill>
+              <a:schemeClr val="tx1"/>
+            </a:solidFill>
+          </a:ln>
+        </p:spPr>
+        <p:style>
+          <a:lnRef idx="2">
+            <a:schemeClr val="accent1">
+              <a:shade val="50000"/>
+            </a:schemeClr>
+          </a:lnRef>
+          <a:fillRef idx="1">
+            <a:schemeClr val="accent1"/>
+          </a:fillRef>
+          <a:effectRef idx="0">
+            <a:schemeClr val="accent1"/>
+          </a:effectRef>
+          <a:fontRef idx="minor">
+            <a:schemeClr val="lt1"/>
+          </a:fontRef>
+        </p:style>
+        <p:txBody>
+          <a:bodyPr rtlCol="0" anchor="ctr"/>
+          <a:lstStyle/>
+          <a:p>
+            <a:pPr algn="ctr"/>
+            <a:r>
+              <a:rPr lang="en-US" altLang="ko-KR" sz="1800" b="1" smtClean="0">
+                <a:solidFill>
+                  <a:schemeClr val="tx1"/>
+                </a:solidFill>
+                <a:latin typeface="Calibri" pitchFamily="34" charset="0"/>
+                <a:ea typeface="Calibri" pitchFamily="34" charset="0"/>
+                <a:cs typeface="Calibri" pitchFamily="34" charset="0"/>
+              </a:rPr>
+              <a:t>C[1]</a:t>
+            </a:r>
+            <a:endParaRPr lang="ko-KR" altLang="en-US" sz="1800" b="1">
+              <a:solidFill>
+                <a:schemeClr val="tx1"/>
+              </a:solidFill>
+              <a:latin typeface="Calibri" pitchFamily="34" charset="0"/>
+              <a:ea typeface="나눔스퀘어 ExtraBold" pitchFamily="50" charset="-127"/>
+              <a:cs typeface="Calibri" pitchFamily="34" charset="0"/>
+            </a:endParaRPr>
+          </a:p>
+        </p:txBody>
+      </p:sp>
+      <p:sp>
+        <p:nvSpPr>
+          <p:cNvPr id="69" name="직사각형 68"/>
+          <p:cNvSpPr/>
+          <p:nvPr/>
+        </p:nvSpPr>
+        <p:spPr>
+          <a:xfrm>
+            <a:off x="4464894" y="4788259"/>
+            <a:ext cx="720985" cy="648072"/>
+          </a:xfrm>
+          <a:prstGeom prst="rect">
+            <a:avLst/>
+          </a:prstGeom>
+          <a:noFill/>
+          <a:ln>
+            <a:solidFill>
+              <a:schemeClr val="tx1"/>
+            </a:solidFill>
+          </a:ln>
+        </p:spPr>
+        <p:style>
+          <a:lnRef idx="2">
+            <a:schemeClr val="accent1">
+              <a:shade val="50000"/>
+            </a:schemeClr>
+          </a:lnRef>
+          <a:fillRef idx="1">
+            <a:schemeClr val="accent1"/>
+          </a:fillRef>
+          <a:effectRef idx="0">
+            <a:schemeClr val="accent1"/>
+          </a:effectRef>
+          <a:fontRef idx="minor">
+            <a:schemeClr val="lt1"/>
+          </a:fontRef>
+        </p:style>
+        <p:txBody>
+          <a:bodyPr rtlCol="0" anchor="ctr"/>
+          <a:lstStyle/>
+          <a:p>
+            <a:pPr algn="ctr"/>
+            <a:r>
+              <a:rPr lang="en-US" altLang="ko-KR" sz="1800" b="1" smtClean="0">
+                <a:solidFill>
+                  <a:schemeClr val="tx1"/>
+                </a:solidFill>
+                <a:latin typeface="Calibri" pitchFamily="34" charset="0"/>
+                <a:ea typeface="Calibri" pitchFamily="34" charset="0"/>
+                <a:cs typeface="Calibri" pitchFamily="34" charset="0"/>
+              </a:rPr>
+              <a:t>C[2]</a:t>
+            </a:r>
+            <a:endParaRPr lang="ko-KR" altLang="en-US" sz="1800" b="1">
+              <a:solidFill>
+                <a:schemeClr val="tx1"/>
+              </a:solidFill>
+              <a:latin typeface="Calibri" pitchFamily="34" charset="0"/>
+              <a:ea typeface="나눔스퀘어 ExtraBold" pitchFamily="50" charset="-127"/>
+              <a:cs typeface="Calibri" pitchFamily="34" charset="0"/>
+            </a:endParaRPr>
+          </a:p>
+        </p:txBody>
+      </p:sp>
+      <p:sp>
+        <p:nvSpPr>
+          <p:cNvPr id="70" name="직사각형 69"/>
+          <p:cNvSpPr/>
+          <p:nvPr/>
+        </p:nvSpPr>
+        <p:spPr>
+          <a:xfrm>
+            <a:off x="5185879" y="4788259"/>
+            <a:ext cx="720985" cy="648072"/>
+          </a:xfrm>
+          <a:prstGeom prst="rect">
+            <a:avLst/>
+          </a:prstGeom>
+          <a:noFill/>
+          <a:ln>
+            <a:solidFill>
+              <a:schemeClr val="tx1"/>
+            </a:solidFill>
+          </a:ln>
+        </p:spPr>
+        <p:style>
+          <a:lnRef idx="2">
+            <a:schemeClr val="accent1">
+              <a:shade val="50000"/>
+            </a:schemeClr>
+          </a:lnRef>
+          <a:fillRef idx="1">
+            <a:schemeClr val="accent1"/>
+          </a:fillRef>
+          <a:effectRef idx="0">
+            <a:schemeClr val="accent1"/>
+          </a:effectRef>
+          <a:fontRef idx="minor">
+            <a:schemeClr val="lt1"/>
+          </a:fontRef>
+        </p:style>
+        <p:txBody>
+          <a:bodyPr rtlCol="0" anchor="ctr"/>
+          <a:lstStyle/>
+          <a:p>
+            <a:pPr algn="ctr"/>
+            <a:r>
+              <a:rPr lang="en-US" altLang="ko-KR" sz="1800" b="1" smtClean="0">
+                <a:solidFill>
+                  <a:schemeClr val="tx1"/>
+                </a:solidFill>
+                <a:latin typeface="Calibri" pitchFamily="34" charset="0"/>
+                <a:ea typeface="Calibri" pitchFamily="34" charset="0"/>
+                <a:cs typeface="Calibri" pitchFamily="34" charset="0"/>
+              </a:rPr>
+              <a:t>C[3]</a:t>
+            </a:r>
+            <a:endParaRPr lang="ko-KR" altLang="en-US" sz="1800" b="1">
+              <a:solidFill>
+                <a:schemeClr val="tx1"/>
+              </a:solidFill>
+              <a:latin typeface="Calibri" pitchFamily="34" charset="0"/>
+              <a:ea typeface="나눔스퀘어 ExtraBold" pitchFamily="50" charset="-127"/>
+              <a:cs typeface="Calibri" pitchFamily="34" charset="0"/>
+            </a:endParaRPr>
+          </a:p>
+        </p:txBody>
+      </p:sp>
+      <p:sp>
+        <p:nvSpPr>
+          <p:cNvPr id="71" name="직사각형 70"/>
+          <p:cNvSpPr/>
+          <p:nvPr/>
+        </p:nvSpPr>
+        <p:spPr>
+          <a:xfrm>
+            <a:off x="5906864" y="4788259"/>
+            <a:ext cx="720985" cy="648072"/>
+          </a:xfrm>
+          <a:prstGeom prst="rect">
+            <a:avLst/>
+          </a:prstGeom>
+          <a:noFill/>
+          <a:ln>
+            <a:solidFill>
+              <a:schemeClr val="tx1"/>
+            </a:solidFill>
+          </a:ln>
+        </p:spPr>
+        <p:style>
+          <a:lnRef idx="2">
+            <a:schemeClr val="accent1">
+              <a:shade val="50000"/>
+            </a:schemeClr>
+          </a:lnRef>
+          <a:fillRef idx="1">
+            <a:schemeClr val="accent1"/>
+          </a:fillRef>
+          <a:effectRef idx="0">
+            <a:schemeClr val="accent1"/>
+          </a:effectRef>
+          <a:fontRef idx="minor">
+            <a:schemeClr val="lt1"/>
+          </a:fontRef>
+        </p:style>
+        <p:txBody>
+          <a:bodyPr rtlCol="0" anchor="ctr"/>
+          <a:lstStyle/>
+          <a:p>
+            <a:pPr algn="ctr"/>
+            <a:r>
+              <a:rPr lang="en-US" altLang="ko-KR" sz="1800" b="1" smtClean="0">
+                <a:solidFill>
+                  <a:schemeClr val="tx1"/>
+                </a:solidFill>
+                <a:latin typeface="Calibri" pitchFamily="34" charset="0"/>
+                <a:ea typeface="Calibri" pitchFamily="34" charset="0"/>
+                <a:cs typeface="Calibri" pitchFamily="34" charset="0"/>
+              </a:rPr>
+              <a:t>C[4]</a:t>
+            </a:r>
+            <a:endParaRPr lang="ko-KR" altLang="en-US" sz="1800" b="1">
+              <a:solidFill>
+                <a:schemeClr val="tx1"/>
+              </a:solidFill>
+              <a:latin typeface="Calibri" pitchFamily="34" charset="0"/>
+              <a:ea typeface="나눔스퀘어 ExtraBold" pitchFamily="50" charset="-127"/>
+              <a:cs typeface="Calibri" pitchFamily="34" charset="0"/>
+            </a:endParaRPr>
+          </a:p>
+        </p:txBody>
+      </p:sp>
+      <p:sp>
+        <p:nvSpPr>
+          <p:cNvPr id="73" name="모서리가 둥근 직사각형 72"/>
+          <p:cNvSpPr/>
+          <p:nvPr/>
+        </p:nvSpPr>
+        <p:spPr>
+          <a:xfrm>
+            <a:off x="3703853" y="4738587"/>
+            <a:ext cx="1460093" cy="747416"/>
+          </a:xfrm>
+          <a:prstGeom prst="roundRect">
+            <a:avLst/>
+          </a:prstGeom>
+          <a:noFill/>
+          <a:ln w="38100">
+            <a:solidFill>
+              <a:srgbClr val="00B050"/>
+            </a:solidFill>
+            <a:prstDash val="solid"/>
+          </a:ln>
+        </p:spPr>
+        <p:style>
+          <a:lnRef idx="2">
+            <a:schemeClr val="accent1">
+              <a:shade val="50000"/>
+            </a:schemeClr>
+          </a:lnRef>
+          <a:fillRef idx="1">
+            <a:schemeClr val="accent1"/>
+          </a:fillRef>
+          <a:effectRef idx="0">
+            <a:schemeClr val="accent1"/>
+          </a:effectRef>
+          <a:fontRef idx="minor">
+            <a:schemeClr val="lt1"/>
+          </a:fontRef>
+        </p:style>
+        <p:txBody>
+          <a:bodyPr rtlCol="0" anchor="ctr"/>
+          <a:lstStyle/>
+          <a:p>
+            <a:pPr algn="ctr"/>
+            <a:endParaRPr lang="ko-KR" altLang="en-US"/>
+          </a:p>
+        </p:txBody>
+      </p:sp>
+      <p:sp>
+        <p:nvSpPr>
+          <p:cNvPr id="74" name="모서리가 둥근 직사각형 73"/>
+          <p:cNvSpPr/>
+          <p:nvPr/>
+        </p:nvSpPr>
+        <p:spPr>
+          <a:xfrm>
+            <a:off x="5214107" y="4738587"/>
+            <a:ext cx="1460093" cy="747416"/>
+          </a:xfrm>
+          <a:prstGeom prst="roundRect">
+            <a:avLst/>
+          </a:prstGeom>
+          <a:noFill/>
+          <a:ln w="38100">
+            <a:solidFill>
+              <a:srgbClr val="FF8181"/>
+            </a:solidFill>
+            <a:prstDash val="solid"/>
+          </a:ln>
+        </p:spPr>
+        <p:style>
+          <a:lnRef idx="2">
+            <a:schemeClr val="accent1">
+              <a:shade val="50000"/>
+            </a:schemeClr>
+          </a:lnRef>
+          <a:fillRef idx="1">
+            <a:schemeClr val="accent1"/>
+          </a:fillRef>
+          <a:effectRef idx="0">
+            <a:schemeClr val="accent1"/>
+          </a:effectRef>
+          <a:fontRef idx="minor">
+            <a:schemeClr val="lt1"/>
+          </a:fontRef>
+        </p:style>
+        <p:txBody>
+          <a:bodyPr rtlCol="0" anchor="ctr"/>
+          <a:lstStyle/>
+          <a:p>
+            <a:pPr algn="ctr"/>
+            <a:endParaRPr lang="ko-KR" altLang="en-US"/>
+          </a:p>
+        </p:txBody>
+      </p:sp>
+      <p:sp>
+        <p:nvSpPr>
+          <p:cNvPr id="75" name="모서리가 둥근 직사각형 74"/>
+          <p:cNvSpPr/>
+          <p:nvPr/>
+        </p:nvSpPr>
+        <p:spPr>
+          <a:xfrm>
+            <a:off x="1577901" y="1976600"/>
+            <a:ext cx="3192749" cy="1014807"/>
+          </a:xfrm>
+          <a:prstGeom prst="roundRect">
+            <a:avLst/>
+          </a:prstGeom>
+          <a:noFill/>
+          <a:ln w="38100">
+            <a:solidFill>
+              <a:schemeClr val="tx2">
+                <a:lumMod val="40000"/>
+                <a:lumOff val="60000"/>
+              </a:schemeClr>
+            </a:solidFill>
+            <a:prstDash val="solid"/>
+          </a:ln>
+        </p:spPr>
+        <p:style>
+          <a:lnRef idx="2">
+            <a:schemeClr val="accent1">
+              <a:shade val="50000"/>
+            </a:schemeClr>
+          </a:lnRef>
+          <a:fillRef idx="1">
+            <a:schemeClr val="accent1"/>
+          </a:fillRef>
+          <a:effectRef idx="0">
+            <a:schemeClr val="accent1"/>
+          </a:effectRef>
+          <a:fontRef idx="minor">
+            <a:schemeClr val="lt1"/>
+          </a:fontRef>
+        </p:style>
+        <p:txBody>
+          <a:bodyPr rtlCol="0" anchor="ctr"/>
+          <a:lstStyle/>
+          <a:p>
+            <a:pPr algn="ctr"/>
+            <a:endParaRPr lang="ko-KR" altLang="en-US"/>
+          </a:p>
+        </p:txBody>
+      </p:sp>
+      <p:sp>
+        <p:nvSpPr>
+          <p:cNvPr id="76" name="모서리가 둥근 직사각형 75"/>
+          <p:cNvSpPr/>
+          <p:nvPr/>
+        </p:nvSpPr>
+        <p:spPr>
+          <a:xfrm>
+            <a:off x="1577901" y="3272743"/>
+            <a:ext cx="3192749" cy="1014807"/>
+          </a:xfrm>
+          <a:prstGeom prst="roundRect">
+            <a:avLst/>
+          </a:prstGeom>
+          <a:noFill/>
+          <a:ln w="38100">
+            <a:solidFill>
+              <a:schemeClr val="tx2">
+                <a:lumMod val="40000"/>
+                <a:lumOff val="60000"/>
+              </a:schemeClr>
+            </a:solidFill>
+            <a:prstDash val="solid"/>
+          </a:ln>
+        </p:spPr>
+        <p:style>
+          <a:lnRef idx="2">
+            <a:schemeClr val="accent1">
+              <a:shade val="50000"/>
+            </a:schemeClr>
+          </a:lnRef>
+          <a:fillRef idx="1">
+            <a:schemeClr val="accent1"/>
+          </a:fillRef>
+          <a:effectRef idx="0">
+            <a:schemeClr val="accent1"/>
+          </a:effectRef>
+          <a:fontRef idx="minor">
+            <a:schemeClr val="lt1"/>
+          </a:fontRef>
+        </p:style>
+        <p:txBody>
+          <a:bodyPr rtlCol="0" anchor="ctr"/>
+          <a:lstStyle/>
+          <a:p>
+            <a:pPr algn="ctr"/>
+            <a:endParaRPr lang="ko-KR" altLang="en-US"/>
+          </a:p>
+        </p:txBody>
+      </p:sp>
+      <p:sp>
+        <p:nvSpPr>
+          <p:cNvPr id="77" name="모서리가 둥근 직사각형 76"/>
+          <p:cNvSpPr/>
+          <p:nvPr/>
+        </p:nvSpPr>
+        <p:spPr>
+          <a:xfrm>
+            <a:off x="5617021" y="3272743"/>
+            <a:ext cx="3192749" cy="1014807"/>
+          </a:xfrm>
+          <a:prstGeom prst="roundRect">
+            <a:avLst/>
+          </a:prstGeom>
+          <a:noFill/>
+          <a:ln w="38100">
+            <a:solidFill>
+              <a:schemeClr val="tx2">
+                <a:lumMod val="40000"/>
+                <a:lumOff val="60000"/>
+              </a:schemeClr>
+            </a:solidFill>
+            <a:prstDash val="solid"/>
+          </a:ln>
+        </p:spPr>
+        <p:style>
+          <a:lnRef idx="2">
+            <a:schemeClr val="accent1">
+              <a:shade val="50000"/>
+            </a:schemeClr>
+          </a:lnRef>
+          <a:fillRef idx="1">
+            <a:schemeClr val="accent1"/>
+          </a:fillRef>
+          <a:effectRef idx="0">
+            <a:schemeClr val="accent1"/>
+          </a:effectRef>
+          <a:fontRef idx="minor">
+            <a:schemeClr val="lt1"/>
+          </a:fontRef>
+        </p:style>
+        <p:txBody>
+          <a:bodyPr rtlCol="0" anchor="ctr"/>
+          <a:lstStyle/>
+          <a:p>
+            <a:pPr algn="ctr"/>
+            <a:endParaRPr lang="ko-KR" altLang="en-US"/>
+          </a:p>
+        </p:txBody>
+      </p:sp>
+      <p:sp>
+        <p:nvSpPr>
+          <p:cNvPr id="78" name="모서리가 둥근 직사각형 77"/>
+          <p:cNvSpPr/>
+          <p:nvPr/>
+        </p:nvSpPr>
+        <p:spPr>
+          <a:xfrm>
+            <a:off x="5617021" y="1976599"/>
+            <a:ext cx="3192749" cy="1014807"/>
+          </a:xfrm>
+          <a:prstGeom prst="roundRect">
+            <a:avLst/>
+          </a:prstGeom>
+          <a:noFill/>
+          <a:ln w="38100">
+            <a:solidFill>
+              <a:schemeClr val="tx2">
+                <a:lumMod val="40000"/>
+                <a:lumOff val="60000"/>
+              </a:schemeClr>
+            </a:solidFill>
+            <a:prstDash val="solid"/>
+          </a:ln>
+        </p:spPr>
+        <p:style>
+          <a:lnRef idx="2">
+            <a:schemeClr val="accent1">
+              <a:shade val="50000"/>
+            </a:schemeClr>
+          </a:lnRef>
+          <a:fillRef idx="1">
+            <a:schemeClr val="accent1"/>
+          </a:fillRef>
+          <a:effectRef idx="0">
+            <a:schemeClr val="accent1"/>
+          </a:effectRef>
+          <a:fontRef idx="minor">
+            <a:schemeClr val="lt1"/>
+          </a:fontRef>
+        </p:style>
+        <p:txBody>
+          <a:bodyPr rtlCol="0" anchor="ctr"/>
+          <a:lstStyle/>
+          <a:p>
+            <a:pPr algn="ctr"/>
+            <a:endParaRPr lang="ko-KR" altLang="en-US"/>
+          </a:p>
+        </p:txBody>
+      </p:sp>
+      <p:sp>
+        <p:nvSpPr>
+          <p:cNvPr id="79" name="모서리가 둥근 직사각형 78"/>
+          <p:cNvSpPr/>
+          <p:nvPr/>
+        </p:nvSpPr>
+        <p:spPr>
+          <a:xfrm>
+            <a:off x="3589504" y="4604891"/>
+            <a:ext cx="3192749" cy="1014807"/>
+          </a:xfrm>
+          <a:prstGeom prst="roundRect">
+            <a:avLst/>
+          </a:prstGeom>
+          <a:noFill/>
+          <a:ln w="38100">
+            <a:solidFill>
+              <a:schemeClr val="tx2">
+                <a:lumMod val="40000"/>
+                <a:lumOff val="60000"/>
+              </a:schemeClr>
+            </a:solidFill>
+            <a:prstDash val="solid"/>
+          </a:ln>
+        </p:spPr>
+        <p:style>
+          <a:lnRef idx="2">
+            <a:schemeClr val="accent1">
+              <a:shade val="50000"/>
+            </a:schemeClr>
+          </a:lnRef>
+          <a:fillRef idx="1">
+            <a:schemeClr val="accent1"/>
+          </a:fillRef>
+          <a:effectRef idx="0">
+            <a:schemeClr val="accent1"/>
+          </a:effectRef>
+          <a:fontRef idx="minor">
+            <a:schemeClr val="lt1"/>
+          </a:fontRef>
+        </p:style>
+        <p:txBody>
+          <a:bodyPr rtlCol="0" anchor="ctr"/>
+          <a:lstStyle/>
+          <a:p>
+            <a:pPr algn="ctr"/>
+            <a:endParaRPr lang="ko-KR" altLang="en-US"/>
+          </a:p>
+        </p:txBody>
+      </p:sp>
+    </p:spTree>
+    <p:extLst>
+      <p:ext uri="{BB962C8B-B14F-4D97-AF65-F5344CB8AC3E}">
+        <p14:creationId xmlns:p14="http://schemas.microsoft.com/office/powerpoint/2010/main" val="2194133565"/>
+      </p:ext>
+    </p:extLst>
+  </p:cSld>
+  <p:clrMapOvr>
+    <a:masterClrMapping/>
+  </p:clrMapOvr>
+</p:sld>
+</file>
+
+<file path=ppt/slides/slide33.xml><?xml version="1.0" encoding="utf-8"?>
+<p:sld xmlns:a="http://schemas.openxmlformats.org/drawingml/2006/main" xmlns:r="http://schemas.openxmlformats.org/officeDocument/2006/relationships" xmlns:p="http://schemas.openxmlformats.org/presentationml/2006/main">
+  <p:cSld>
+    <p:spTree>
+      <p:nvGrpSpPr>
+        <p:cNvPr id="1" name=""/>
+        <p:cNvGrpSpPr/>
+        <p:nvPr/>
+      </p:nvGrpSpPr>
+      <p:grpSpPr>
+        <a:xfrm>
+          <a:off x="0" y="0"/>
+          <a:ext cx="0" cy="0"/>
+          <a:chOff x="0" y="0"/>
+          <a:chExt cx="0" cy="0"/>
+        </a:xfrm>
+      </p:grpSpPr>
+      <p:sp>
+        <p:nvSpPr>
+          <p:cNvPr id="3" name="직사각형 2"/>
+          <p:cNvSpPr/>
+          <p:nvPr/>
+        </p:nvSpPr>
+        <p:spPr>
+          <a:xfrm>
+            <a:off x="1726779" y="2339987"/>
+            <a:ext cx="720985" cy="648072"/>
+          </a:xfrm>
+          <a:prstGeom prst="rect">
+            <a:avLst/>
+          </a:prstGeom>
+          <a:noFill/>
+          <a:ln>
+            <a:solidFill>
+              <a:schemeClr val="tx1"/>
+            </a:solidFill>
+          </a:ln>
+        </p:spPr>
+        <p:style>
+          <a:lnRef idx="2">
+            <a:schemeClr val="accent1">
+              <a:shade val="50000"/>
+            </a:schemeClr>
+          </a:lnRef>
+          <a:fillRef idx="1">
+            <a:schemeClr val="accent1"/>
+          </a:fillRef>
+          <a:effectRef idx="0">
+            <a:schemeClr val="accent1"/>
+          </a:effectRef>
+          <a:fontRef idx="minor">
+            <a:schemeClr val="lt1"/>
+          </a:fontRef>
+        </p:style>
+        <p:txBody>
+          <a:bodyPr rtlCol="0" anchor="ctr"/>
+          <a:lstStyle/>
+          <a:p>
+            <a:pPr algn="ctr"/>
+            <a:r>
+              <a:rPr lang="en-US" altLang="ko-KR" sz="1800" b="1" smtClean="0">
+                <a:solidFill>
+                  <a:schemeClr val="tx1"/>
+                </a:solidFill>
+                <a:latin typeface="Calibri" pitchFamily="34" charset="0"/>
+                <a:ea typeface="Calibri" pitchFamily="34" charset="0"/>
+                <a:cs typeface="Calibri" pitchFamily="34" charset="0"/>
+              </a:rPr>
+              <a:t>C[1]</a:t>
+            </a:r>
+            <a:endParaRPr lang="ko-KR" altLang="en-US" sz="1800" b="1">
+              <a:solidFill>
+                <a:schemeClr val="tx1"/>
+              </a:solidFill>
+              <a:latin typeface="Calibri" pitchFamily="34" charset="0"/>
+              <a:ea typeface="나눔스퀘어 ExtraBold" pitchFamily="50" charset="-127"/>
+              <a:cs typeface="Calibri" pitchFamily="34" charset="0"/>
+            </a:endParaRPr>
+          </a:p>
+        </p:txBody>
+      </p:sp>
+      <p:sp>
+        <p:nvSpPr>
+          <p:cNvPr id="25" name="직사각형 24"/>
+          <p:cNvSpPr/>
+          <p:nvPr/>
+        </p:nvSpPr>
+        <p:spPr>
+          <a:xfrm>
+            <a:off x="2447764" y="2339987"/>
+            <a:ext cx="720985" cy="648072"/>
+          </a:xfrm>
+          <a:prstGeom prst="rect">
+            <a:avLst/>
+          </a:prstGeom>
+          <a:noFill/>
+          <a:ln>
+            <a:solidFill>
+              <a:schemeClr val="tx1"/>
+            </a:solidFill>
+          </a:ln>
+        </p:spPr>
+        <p:style>
+          <a:lnRef idx="2">
+            <a:schemeClr val="accent1">
+              <a:shade val="50000"/>
+            </a:schemeClr>
+          </a:lnRef>
+          <a:fillRef idx="1">
+            <a:schemeClr val="accent1"/>
+          </a:fillRef>
+          <a:effectRef idx="0">
+            <a:schemeClr val="accent1"/>
+          </a:effectRef>
+          <a:fontRef idx="minor">
+            <a:schemeClr val="lt1"/>
+          </a:fontRef>
+        </p:style>
+        <p:txBody>
+          <a:bodyPr rtlCol="0" anchor="ctr"/>
+          <a:lstStyle/>
+          <a:p>
+            <a:pPr algn="ctr"/>
+            <a:r>
+              <a:rPr lang="en-US" altLang="ko-KR" sz="1800" b="1" smtClean="0">
+                <a:solidFill>
+                  <a:schemeClr val="tx1"/>
+                </a:solidFill>
+                <a:latin typeface="Calibri" pitchFamily="34" charset="0"/>
+                <a:ea typeface="Calibri" pitchFamily="34" charset="0"/>
+                <a:cs typeface="Calibri" pitchFamily="34" charset="0"/>
+              </a:rPr>
+              <a:t>C[2]</a:t>
+            </a:r>
+            <a:endParaRPr lang="ko-KR" altLang="en-US" sz="1800" b="1">
+              <a:solidFill>
+                <a:schemeClr val="tx1"/>
+              </a:solidFill>
+              <a:latin typeface="Calibri" pitchFamily="34" charset="0"/>
+              <a:ea typeface="나눔스퀘어 ExtraBold" pitchFamily="50" charset="-127"/>
+              <a:cs typeface="Calibri" pitchFamily="34" charset="0"/>
+            </a:endParaRPr>
+          </a:p>
+        </p:txBody>
+      </p:sp>
+      <p:sp>
+        <p:nvSpPr>
+          <p:cNvPr id="29" name="직사각형 28"/>
+          <p:cNvSpPr/>
+          <p:nvPr/>
+        </p:nvSpPr>
+        <p:spPr>
+          <a:xfrm>
+            <a:off x="3168749" y="2339987"/>
+            <a:ext cx="720985" cy="648072"/>
+          </a:xfrm>
+          <a:prstGeom prst="rect">
+            <a:avLst/>
+          </a:prstGeom>
+          <a:noFill/>
+          <a:ln>
+            <a:solidFill>
+              <a:schemeClr val="tx1"/>
+            </a:solidFill>
+          </a:ln>
+        </p:spPr>
+        <p:style>
+          <a:lnRef idx="2">
+            <a:schemeClr val="accent1">
+              <a:shade val="50000"/>
+            </a:schemeClr>
+          </a:lnRef>
+          <a:fillRef idx="1">
+            <a:schemeClr val="accent1"/>
+          </a:fillRef>
+          <a:effectRef idx="0">
+            <a:schemeClr val="accent1"/>
+          </a:effectRef>
+          <a:fontRef idx="minor">
+            <a:schemeClr val="lt1"/>
+          </a:fontRef>
+        </p:style>
+        <p:txBody>
+          <a:bodyPr rtlCol="0" anchor="ctr"/>
+          <a:lstStyle/>
+          <a:p>
+            <a:pPr algn="ctr"/>
+            <a:r>
+              <a:rPr lang="en-US" altLang="ko-KR" sz="1800" b="1" smtClean="0">
+                <a:solidFill>
+                  <a:schemeClr val="tx1"/>
+                </a:solidFill>
+                <a:latin typeface="Calibri" pitchFamily="34" charset="0"/>
+                <a:ea typeface="Calibri" pitchFamily="34" charset="0"/>
+                <a:cs typeface="Calibri" pitchFamily="34" charset="0"/>
+              </a:rPr>
+              <a:t>C[3]</a:t>
+            </a:r>
+            <a:endParaRPr lang="ko-KR" altLang="en-US" sz="1800" b="1">
+              <a:solidFill>
+                <a:schemeClr val="tx1"/>
+              </a:solidFill>
+              <a:latin typeface="Calibri" pitchFamily="34" charset="0"/>
+              <a:ea typeface="나눔스퀘어 ExtraBold" pitchFamily="50" charset="-127"/>
+              <a:cs typeface="Calibri" pitchFamily="34" charset="0"/>
+            </a:endParaRPr>
+          </a:p>
+        </p:txBody>
+      </p:sp>
+      <p:sp>
+        <p:nvSpPr>
+          <p:cNvPr id="31" name="직사각형 30"/>
+          <p:cNvSpPr/>
+          <p:nvPr/>
+        </p:nvSpPr>
+        <p:spPr>
+          <a:xfrm>
+            <a:off x="3889734" y="2339987"/>
+            <a:ext cx="720985" cy="648072"/>
+          </a:xfrm>
+          <a:prstGeom prst="rect">
+            <a:avLst/>
+          </a:prstGeom>
+          <a:noFill/>
+          <a:ln>
+            <a:solidFill>
+              <a:schemeClr val="tx1"/>
+            </a:solidFill>
+          </a:ln>
+        </p:spPr>
+        <p:style>
+          <a:lnRef idx="2">
+            <a:schemeClr val="accent1">
+              <a:shade val="50000"/>
+            </a:schemeClr>
+          </a:lnRef>
+          <a:fillRef idx="1">
+            <a:schemeClr val="accent1"/>
+          </a:fillRef>
+          <a:effectRef idx="0">
+            <a:schemeClr val="accent1"/>
+          </a:effectRef>
+          <a:fontRef idx="minor">
+            <a:schemeClr val="lt1"/>
+          </a:fontRef>
+        </p:style>
+        <p:txBody>
+          <a:bodyPr rtlCol="0" anchor="ctr"/>
+          <a:lstStyle/>
+          <a:p>
+            <a:pPr algn="ctr"/>
+            <a:r>
+              <a:rPr lang="en-US" altLang="ko-KR" sz="1800" b="1" smtClean="0">
+                <a:solidFill>
+                  <a:schemeClr val="tx1"/>
+                </a:solidFill>
+                <a:latin typeface="Calibri" pitchFamily="34" charset="0"/>
+                <a:ea typeface="Calibri" pitchFamily="34" charset="0"/>
+                <a:cs typeface="Calibri" pitchFamily="34" charset="0"/>
+              </a:rPr>
+              <a:t>C[4]</a:t>
+            </a:r>
+            <a:endParaRPr lang="ko-KR" altLang="en-US" sz="1800" b="1">
+              <a:solidFill>
+                <a:schemeClr val="tx1"/>
+              </a:solidFill>
+              <a:latin typeface="Calibri" pitchFamily="34" charset="0"/>
+              <a:ea typeface="나눔스퀘어 ExtraBold" pitchFamily="50" charset="-127"/>
+              <a:cs typeface="Calibri" pitchFamily="34" charset="0"/>
+            </a:endParaRPr>
+          </a:p>
+        </p:txBody>
+      </p:sp>
+      <p:sp>
+        <p:nvSpPr>
+          <p:cNvPr id="40" name="TextBox 39"/>
+          <p:cNvSpPr txBox="1"/>
+          <p:nvPr/>
+        </p:nvSpPr>
+        <p:spPr>
+          <a:xfrm>
+            <a:off x="1798939" y="391705"/>
+            <a:ext cx="4682178" cy="400110"/>
+          </a:xfrm>
+          <a:prstGeom prst="rect">
+            <a:avLst/>
+          </a:prstGeom>
+          <a:noFill/>
+        </p:spPr>
+        <p:txBody>
+          <a:bodyPr wrap="square" rtlCol="0" anchor="ctr">
+            <a:spAutoFit/>
+          </a:bodyPr>
+          <a:lstStyle/>
+          <a:p>
+            <a:r>
+              <a:rPr lang="en-US" altLang="ko-KR" sz="2000" smtClean="0">
+                <a:latin typeface="나눔스퀘어 ExtraBold" pitchFamily="50" charset="-127"/>
+                <a:ea typeface="나눔스퀘어 ExtraBold" pitchFamily="50" charset="-127"/>
+              </a:rPr>
+              <a:t>i = 1, j = 4 </a:t>
+            </a:r>
+            <a:r>
+              <a:rPr lang="ko-KR" altLang="en-US" sz="2000" smtClean="0">
+                <a:latin typeface="나눔스퀘어 ExtraBold" pitchFamily="50" charset="-127"/>
+                <a:ea typeface="나눔스퀘어 ExtraBold" pitchFamily="50" charset="-127"/>
+              </a:rPr>
+              <a:t>를 계산할 수 있는 경우들</a:t>
+            </a:r>
+            <a:endParaRPr lang="ko-KR" altLang="en-US" sz="2000">
+              <a:latin typeface="나눔스퀘어 ExtraBold" pitchFamily="50" charset="-127"/>
+              <a:ea typeface="나눔스퀘어 ExtraBold" pitchFamily="50" charset="-127"/>
+            </a:endParaRPr>
+          </a:p>
+        </p:txBody>
+      </p:sp>
+      <p:sp>
+        <p:nvSpPr>
+          <p:cNvPr id="2" name="모서리가 둥근 직사각형 1"/>
+          <p:cNvSpPr/>
+          <p:nvPr/>
+        </p:nvSpPr>
+        <p:spPr>
+          <a:xfrm>
+            <a:off x="1224533" y="935831"/>
+            <a:ext cx="8064896" cy="5256584"/>
+          </a:xfrm>
+          <a:prstGeom prst="roundRect">
+            <a:avLst/>
+          </a:prstGeom>
+          <a:noFill/>
+          <a:ln>
+            <a:solidFill>
+              <a:srgbClr val="0070C0"/>
+            </a:solidFill>
+          </a:ln>
+        </p:spPr>
+        <p:style>
+          <a:lnRef idx="2">
+            <a:schemeClr val="accent1">
+              <a:shade val="50000"/>
+            </a:schemeClr>
+          </a:lnRef>
+          <a:fillRef idx="1">
+            <a:schemeClr val="accent1"/>
+          </a:fillRef>
+          <a:effectRef idx="0">
+            <a:schemeClr val="accent1"/>
+          </a:effectRef>
+          <a:fontRef idx="minor">
+            <a:schemeClr val="lt1"/>
+          </a:fontRef>
+        </p:style>
+        <p:txBody>
+          <a:bodyPr rtlCol="0" anchor="ctr"/>
+          <a:lstStyle/>
+          <a:p>
+            <a:pPr algn="ctr"/>
+            <a:endParaRPr lang="ko-KR" altLang="en-US"/>
+          </a:p>
+        </p:txBody>
+      </p:sp>
+      <p:sp>
+        <p:nvSpPr>
+          <p:cNvPr id="5" name="모서리가 둥근 직사각형 4"/>
+          <p:cNvSpPr/>
+          <p:nvPr/>
+        </p:nvSpPr>
+        <p:spPr>
+          <a:xfrm>
+            <a:off x="2375756" y="2231975"/>
+            <a:ext cx="2305161" cy="864096"/>
+          </a:xfrm>
+          <a:prstGeom prst="roundRect">
+            <a:avLst/>
+          </a:prstGeom>
+          <a:noFill/>
+          <a:ln w="38100">
+            <a:solidFill>
+              <a:srgbClr val="FF8181"/>
+            </a:solidFill>
+            <a:prstDash val="solid"/>
+          </a:ln>
+        </p:spPr>
+        <p:style>
+          <a:lnRef idx="2">
+            <a:schemeClr val="accent1">
+              <a:shade val="50000"/>
+            </a:schemeClr>
+          </a:lnRef>
+          <a:fillRef idx="1">
+            <a:schemeClr val="accent1"/>
+          </a:fillRef>
+          <a:effectRef idx="0">
+            <a:schemeClr val="accent1"/>
+          </a:effectRef>
+          <a:fontRef idx="minor">
+            <a:schemeClr val="lt1"/>
+          </a:fontRef>
+        </p:style>
+        <p:txBody>
+          <a:bodyPr rtlCol="0" anchor="ctr"/>
+          <a:lstStyle/>
+          <a:p>
+            <a:pPr algn="ctr"/>
+            <a:endParaRPr lang="ko-KR" altLang="en-US"/>
+          </a:p>
+        </p:txBody>
+      </p:sp>
+      <p:sp>
+        <p:nvSpPr>
+          <p:cNvPr id="26" name="모서리가 둥근 직사각형 25"/>
+          <p:cNvSpPr/>
+          <p:nvPr/>
+        </p:nvSpPr>
+        <p:spPr>
+          <a:xfrm>
+            <a:off x="3152144" y="2290315"/>
+            <a:ext cx="1474694" cy="747416"/>
+          </a:xfrm>
+          <a:prstGeom prst="roundRect">
+            <a:avLst/>
+          </a:prstGeom>
+          <a:noFill/>
+          <a:ln w="38100">
+            <a:solidFill>
+              <a:srgbClr val="00B050"/>
+            </a:solidFill>
+            <a:prstDash val="solid"/>
+          </a:ln>
+        </p:spPr>
+        <p:style>
+          <a:lnRef idx="2">
+            <a:schemeClr val="accent1">
+              <a:shade val="50000"/>
+            </a:schemeClr>
+          </a:lnRef>
+          <a:fillRef idx="1">
+            <a:schemeClr val="accent1"/>
+          </a:fillRef>
+          <a:effectRef idx="0">
+            <a:schemeClr val="accent1"/>
+          </a:effectRef>
+          <a:fontRef idx="minor">
+            <a:schemeClr val="lt1"/>
+          </a:fontRef>
+        </p:style>
+        <p:txBody>
+          <a:bodyPr rtlCol="0" anchor="ctr"/>
+          <a:lstStyle/>
+          <a:p>
+            <a:pPr algn="ctr"/>
+            <a:endParaRPr lang="ko-KR" altLang="en-US"/>
+          </a:p>
+        </p:txBody>
+      </p:sp>
+      <p:sp>
+        <p:nvSpPr>
+          <p:cNvPr id="47" name="직사각형 46"/>
+          <p:cNvSpPr/>
+          <p:nvPr/>
+        </p:nvSpPr>
+        <p:spPr>
+          <a:xfrm>
+            <a:off x="1726779" y="3492115"/>
+            <a:ext cx="720985" cy="648072"/>
+          </a:xfrm>
+          <a:prstGeom prst="rect">
+            <a:avLst/>
+          </a:prstGeom>
+          <a:noFill/>
+          <a:ln>
+            <a:solidFill>
+              <a:schemeClr val="tx1"/>
+            </a:solidFill>
+          </a:ln>
+        </p:spPr>
+        <p:style>
+          <a:lnRef idx="2">
+            <a:schemeClr val="accent1">
+              <a:shade val="50000"/>
+            </a:schemeClr>
+          </a:lnRef>
+          <a:fillRef idx="1">
+            <a:schemeClr val="accent1"/>
+          </a:fillRef>
+          <a:effectRef idx="0">
+            <a:schemeClr val="accent1"/>
+          </a:effectRef>
+          <a:fontRef idx="minor">
+            <a:schemeClr val="lt1"/>
+          </a:fontRef>
+        </p:style>
+        <p:txBody>
+          <a:bodyPr rtlCol="0" anchor="ctr"/>
+          <a:lstStyle/>
+          <a:p>
+            <a:pPr algn="ctr"/>
+            <a:r>
+              <a:rPr lang="en-US" altLang="ko-KR" sz="1800" b="1" smtClean="0">
+                <a:solidFill>
+                  <a:schemeClr val="tx1"/>
+                </a:solidFill>
+                <a:latin typeface="Calibri" pitchFamily="34" charset="0"/>
+                <a:ea typeface="Calibri" pitchFamily="34" charset="0"/>
+                <a:cs typeface="Calibri" pitchFamily="34" charset="0"/>
+              </a:rPr>
+              <a:t>C[1]</a:t>
+            </a:r>
+            <a:endParaRPr lang="ko-KR" altLang="en-US" sz="1800" b="1">
+              <a:solidFill>
+                <a:schemeClr val="tx1"/>
+              </a:solidFill>
+              <a:latin typeface="Calibri" pitchFamily="34" charset="0"/>
+              <a:ea typeface="나눔스퀘어 ExtraBold" pitchFamily="50" charset="-127"/>
+              <a:cs typeface="Calibri" pitchFamily="34" charset="0"/>
+            </a:endParaRPr>
+          </a:p>
+        </p:txBody>
+      </p:sp>
+      <p:sp>
+        <p:nvSpPr>
+          <p:cNvPr id="50" name="직사각형 49"/>
+          <p:cNvSpPr/>
+          <p:nvPr/>
+        </p:nvSpPr>
+        <p:spPr>
+          <a:xfrm>
+            <a:off x="2447764" y="3492115"/>
+            <a:ext cx="720985" cy="648072"/>
+          </a:xfrm>
+          <a:prstGeom prst="rect">
+            <a:avLst/>
+          </a:prstGeom>
+          <a:noFill/>
+          <a:ln>
+            <a:solidFill>
+              <a:schemeClr val="tx1"/>
+            </a:solidFill>
+          </a:ln>
+        </p:spPr>
+        <p:style>
+          <a:lnRef idx="2">
+            <a:schemeClr val="accent1">
+              <a:shade val="50000"/>
+            </a:schemeClr>
+          </a:lnRef>
+          <a:fillRef idx="1">
+            <a:schemeClr val="accent1"/>
+          </a:fillRef>
+          <a:effectRef idx="0">
+            <a:schemeClr val="accent1"/>
+          </a:effectRef>
+          <a:fontRef idx="minor">
+            <a:schemeClr val="lt1"/>
+          </a:fontRef>
+        </p:style>
+        <p:txBody>
+          <a:bodyPr rtlCol="0" anchor="ctr"/>
+          <a:lstStyle/>
+          <a:p>
+            <a:pPr algn="ctr"/>
+            <a:r>
+              <a:rPr lang="en-US" altLang="ko-KR" sz="1800" b="1" smtClean="0">
+                <a:solidFill>
+                  <a:schemeClr val="tx1"/>
+                </a:solidFill>
+                <a:latin typeface="Calibri" pitchFamily="34" charset="0"/>
+                <a:ea typeface="Calibri" pitchFamily="34" charset="0"/>
+                <a:cs typeface="Calibri" pitchFamily="34" charset="0"/>
+              </a:rPr>
+              <a:t>C[2]</a:t>
+            </a:r>
+            <a:endParaRPr lang="ko-KR" altLang="en-US" sz="1800" b="1">
+              <a:solidFill>
+                <a:schemeClr val="tx1"/>
+              </a:solidFill>
+              <a:latin typeface="Calibri" pitchFamily="34" charset="0"/>
+              <a:ea typeface="나눔스퀘어 ExtraBold" pitchFamily="50" charset="-127"/>
+              <a:cs typeface="Calibri" pitchFamily="34" charset="0"/>
+            </a:endParaRPr>
+          </a:p>
+        </p:txBody>
+      </p:sp>
+      <p:sp>
+        <p:nvSpPr>
+          <p:cNvPr id="52" name="직사각형 51"/>
+          <p:cNvSpPr/>
+          <p:nvPr/>
+        </p:nvSpPr>
+        <p:spPr>
+          <a:xfrm>
+            <a:off x="3168749" y="3492115"/>
+            <a:ext cx="720985" cy="648072"/>
+          </a:xfrm>
+          <a:prstGeom prst="rect">
+            <a:avLst/>
+          </a:prstGeom>
+          <a:noFill/>
+          <a:ln>
+            <a:solidFill>
+              <a:schemeClr val="tx1"/>
+            </a:solidFill>
+          </a:ln>
+        </p:spPr>
+        <p:style>
+          <a:lnRef idx="2">
+            <a:schemeClr val="accent1">
+              <a:shade val="50000"/>
+            </a:schemeClr>
+          </a:lnRef>
+          <a:fillRef idx="1">
+            <a:schemeClr val="accent1"/>
+          </a:fillRef>
+          <a:effectRef idx="0">
+            <a:schemeClr val="accent1"/>
+          </a:effectRef>
+          <a:fontRef idx="minor">
+            <a:schemeClr val="lt1"/>
+          </a:fontRef>
+        </p:style>
+        <p:txBody>
+          <a:bodyPr rtlCol="0" anchor="ctr"/>
+          <a:lstStyle/>
+          <a:p>
+            <a:pPr algn="ctr"/>
+            <a:r>
+              <a:rPr lang="en-US" altLang="ko-KR" sz="1800" b="1" smtClean="0">
+                <a:solidFill>
+                  <a:schemeClr val="tx1"/>
+                </a:solidFill>
+                <a:latin typeface="Calibri" pitchFamily="34" charset="0"/>
+                <a:ea typeface="Calibri" pitchFamily="34" charset="0"/>
+                <a:cs typeface="Calibri" pitchFamily="34" charset="0"/>
+              </a:rPr>
+              <a:t>C[3]</a:t>
+            </a:r>
+            <a:endParaRPr lang="ko-KR" altLang="en-US" sz="1800" b="1">
+              <a:solidFill>
+                <a:schemeClr val="tx1"/>
+              </a:solidFill>
+              <a:latin typeface="Calibri" pitchFamily="34" charset="0"/>
+              <a:ea typeface="나눔스퀘어 ExtraBold" pitchFamily="50" charset="-127"/>
+              <a:cs typeface="Calibri" pitchFamily="34" charset="0"/>
+            </a:endParaRPr>
+          </a:p>
+        </p:txBody>
+      </p:sp>
+      <p:sp>
+        <p:nvSpPr>
+          <p:cNvPr id="53" name="직사각형 52"/>
+          <p:cNvSpPr/>
+          <p:nvPr/>
+        </p:nvSpPr>
+        <p:spPr>
+          <a:xfrm>
+            <a:off x="3889734" y="3492115"/>
+            <a:ext cx="720985" cy="648072"/>
+          </a:xfrm>
+          <a:prstGeom prst="rect">
+            <a:avLst/>
+          </a:prstGeom>
+          <a:noFill/>
+          <a:ln>
+            <a:solidFill>
+              <a:schemeClr val="tx1"/>
+            </a:solidFill>
+          </a:ln>
+        </p:spPr>
+        <p:style>
+          <a:lnRef idx="2">
+            <a:schemeClr val="accent1">
+              <a:shade val="50000"/>
+            </a:schemeClr>
+          </a:lnRef>
+          <a:fillRef idx="1">
+            <a:schemeClr val="accent1"/>
+          </a:fillRef>
+          <a:effectRef idx="0">
+            <a:schemeClr val="accent1"/>
+          </a:effectRef>
+          <a:fontRef idx="minor">
+            <a:schemeClr val="lt1"/>
+          </a:fontRef>
+        </p:style>
+        <p:txBody>
+          <a:bodyPr rtlCol="0" anchor="ctr"/>
+          <a:lstStyle/>
+          <a:p>
+            <a:pPr algn="ctr"/>
+            <a:r>
+              <a:rPr lang="en-US" altLang="ko-KR" sz="1800" b="1" smtClean="0">
+                <a:solidFill>
+                  <a:schemeClr val="tx1"/>
+                </a:solidFill>
+                <a:latin typeface="Calibri" pitchFamily="34" charset="0"/>
+                <a:ea typeface="Calibri" pitchFamily="34" charset="0"/>
+                <a:cs typeface="Calibri" pitchFamily="34" charset="0"/>
+              </a:rPr>
+              <a:t>C[4]</a:t>
+            </a:r>
+            <a:endParaRPr lang="ko-KR" altLang="en-US" sz="1800" b="1">
+              <a:solidFill>
+                <a:schemeClr val="tx1"/>
+              </a:solidFill>
+              <a:latin typeface="Calibri" pitchFamily="34" charset="0"/>
+              <a:ea typeface="나눔스퀘어 ExtraBold" pitchFamily="50" charset="-127"/>
+              <a:cs typeface="Calibri" pitchFamily="34" charset="0"/>
+            </a:endParaRPr>
+          </a:p>
+        </p:txBody>
+      </p:sp>
+      <p:sp>
+        <p:nvSpPr>
+          <p:cNvPr id="54" name="모서리가 둥근 직사각형 53"/>
+          <p:cNvSpPr/>
+          <p:nvPr/>
+        </p:nvSpPr>
+        <p:spPr>
+          <a:xfrm>
+            <a:off x="2375756" y="3384103"/>
+            <a:ext cx="2305161" cy="864096"/>
+          </a:xfrm>
+          <a:prstGeom prst="roundRect">
+            <a:avLst/>
+          </a:prstGeom>
+          <a:noFill/>
+          <a:ln w="38100">
+            <a:solidFill>
+              <a:srgbClr val="FF8181"/>
+            </a:solidFill>
+            <a:prstDash val="solid"/>
+          </a:ln>
+        </p:spPr>
+        <p:style>
+          <a:lnRef idx="2">
+            <a:schemeClr val="accent1">
+              <a:shade val="50000"/>
+            </a:schemeClr>
+          </a:lnRef>
+          <a:fillRef idx="1">
+            <a:schemeClr val="accent1"/>
+          </a:fillRef>
+          <a:effectRef idx="0">
+            <a:schemeClr val="accent1"/>
+          </a:effectRef>
+          <a:fontRef idx="minor">
+            <a:schemeClr val="lt1"/>
+          </a:fontRef>
+        </p:style>
+        <p:txBody>
+          <a:bodyPr rtlCol="0" anchor="ctr"/>
+          <a:lstStyle/>
+          <a:p>
+            <a:pPr algn="ctr"/>
+            <a:endParaRPr lang="ko-KR" altLang="en-US"/>
+          </a:p>
+        </p:txBody>
+      </p:sp>
+      <p:sp>
+        <p:nvSpPr>
+          <p:cNvPr id="55" name="모서리가 둥근 직사각형 54"/>
+          <p:cNvSpPr/>
+          <p:nvPr/>
+        </p:nvSpPr>
+        <p:spPr>
+          <a:xfrm>
+            <a:off x="2436929" y="3442443"/>
+            <a:ext cx="1474694" cy="747416"/>
+          </a:xfrm>
+          <a:prstGeom prst="roundRect">
+            <a:avLst/>
+          </a:prstGeom>
+          <a:noFill/>
+          <a:ln w="38100">
+            <a:solidFill>
+              <a:srgbClr val="00B050"/>
+            </a:solidFill>
+            <a:prstDash val="solid"/>
+          </a:ln>
+        </p:spPr>
+        <p:style>
+          <a:lnRef idx="2">
+            <a:schemeClr val="accent1">
+              <a:shade val="50000"/>
+            </a:schemeClr>
+          </a:lnRef>
+          <a:fillRef idx="1">
+            <a:schemeClr val="accent1"/>
+          </a:fillRef>
+          <a:effectRef idx="0">
+            <a:schemeClr val="accent1"/>
+          </a:effectRef>
+          <a:fontRef idx="minor">
+            <a:schemeClr val="lt1"/>
+          </a:fontRef>
+        </p:style>
+        <p:txBody>
+          <a:bodyPr rtlCol="0" anchor="ctr"/>
+          <a:lstStyle/>
+          <a:p>
+            <a:pPr algn="ctr"/>
+            <a:endParaRPr lang="ko-KR" altLang="en-US"/>
+          </a:p>
+        </p:txBody>
+      </p:sp>
+      <p:sp>
+        <p:nvSpPr>
+          <p:cNvPr id="56" name="직사각형 55"/>
+          <p:cNvSpPr/>
+          <p:nvPr/>
+        </p:nvSpPr>
+        <p:spPr>
+          <a:xfrm>
+            <a:off x="5816013" y="2339987"/>
+            <a:ext cx="720985" cy="648072"/>
+          </a:xfrm>
+          <a:prstGeom prst="rect">
+            <a:avLst/>
+          </a:prstGeom>
+          <a:noFill/>
+          <a:ln>
+            <a:solidFill>
+              <a:schemeClr val="tx1"/>
+            </a:solidFill>
+          </a:ln>
+        </p:spPr>
+        <p:style>
+          <a:lnRef idx="2">
+            <a:schemeClr val="accent1">
+              <a:shade val="50000"/>
+            </a:schemeClr>
+          </a:lnRef>
+          <a:fillRef idx="1">
+            <a:schemeClr val="accent1"/>
+          </a:fillRef>
+          <a:effectRef idx="0">
+            <a:schemeClr val="accent1"/>
+          </a:effectRef>
+          <a:fontRef idx="minor">
+            <a:schemeClr val="lt1"/>
+          </a:fontRef>
+        </p:style>
+        <p:txBody>
+          <a:bodyPr rtlCol="0" anchor="ctr"/>
+          <a:lstStyle/>
+          <a:p>
+            <a:pPr algn="ctr"/>
+            <a:r>
+              <a:rPr lang="en-US" altLang="ko-KR" sz="1800" b="1" smtClean="0">
+                <a:solidFill>
+                  <a:schemeClr val="tx1"/>
+                </a:solidFill>
+                <a:latin typeface="Calibri" pitchFamily="34" charset="0"/>
+                <a:ea typeface="Calibri" pitchFamily="34" charset="0"/>
+                <a:cs typeface="Calibri" pitchFamily="34" charset="0"/>
+              </a:rPr>
+              <a:t>C[1]</a:t>
+            </a:r>
+            <a:endParaRPr lang="ko-KR" altLang="en-US" sz="1800" b="1">
+              <a:solidFill>
+                <a:schemeClr val="tx1"/>
+              </a:solidFill>
+              <a:latin typeface="Calibri" pitchFamily="34" charset="0"/>
+              <a:ea typeface="나눔스퀘어 ExtraBold" pitchFamily="50" charset="-127"/>
+              <a:cs typeface="Calibri" pitchFamily="34" charset="0"/>
+            </a:endParaRPr>
+          </a:p>
+        </p:txBody>
+      </p:sp>
+      <p:sp>
+        <p:nvSpPr>
+          <p:cNvPr id="57" name="직사각형 56"/>
+          <p:cNvSpPr/>
+          <p:nvPr/>
+        </p:nvSpPr>
+        <p:spPr>
+          <a:xfrm>
+            <a:off x="6536998" y="2339987"/>
+            <a:ext cx="720985" cy="648072"/>
+          </a:xfrm>
+          <a:prstGeom prst="rect">
+            <a:avLst/>
+          </a:prstGeom>
+          <a:noFill/>
+          <a:ln>
+            <a:solidFill>
+              <a:schemeClr val="tx1"/>
+            </a:solidFill>
+          </a:ln>
+        </p:spPr>
+        <p:style>
+          <a:lnRef idx="2">
+            <a:schemeClr val="accent1">
+              <a:shade val="50000"/>
+            </a:schemeClr>
+          </a:lnRef>
+          <a:fillRef idx="1">
+            <a:schemeClr val="accent1"/>
+          </a:fillRef>
+          <a:effectRef idx="0">
+            <a:schemeClr val="accent1"/>
+          </a:effectRef>
+          <a:fontRef idx="minor">
+            <a:schemeClr val="lt1"/>
+          </a:fontRef>
+        </p:style>
+        <p:txBody>
+          <a:bodyPr rtlCol="0" anchor="ctr"/>
+          <a:lstStyle/>
+          <a:p>
+            <a:pPr algn="ctr"/>
+            <a:r>
+              <a:rPr lang="en-US" altLang="ko-KR" sz="1800" b="1" smtClean="0">
+                <a:solidFill>
+                  <a:schemeClr val="tx1"/>
+                </a:solidFill>
+                <a:latin typeface="Calibri" pitchFamily="34" charset="0"/>
+                <a:ea typeface="Calibri" pitchFamily="34" charset="0"/>
+                <a:cs typeface="Calibri" pitchFamily="34" charset="0"/>
+              </a:rPr>
+              <a:t>C[2]</a:t>
+            </a:r>
+            <a:endParaRPr lang="ko-KR" altLang="en-US" sz="1800" b="1">
+              <a:solidFill>
+                <a:schemeClr val="tx1"/>
+              </a:solidFill>
+              <a:latin typeface="Calibri" pitchFamily="34" charset="0"/>
+              <a:ea typeface="나눔스퀘어 ExtraBold" pitchFamily="50" charset="-127"/>
+              <a:cs typeface="Calibri" pitchFamily="34" charset="0"/>
+            </a:endParaRPr>
+          </a:p>
+        </p:txBody>
+      </p:sp>
+      <p:sp>
+        <p:nvSpPr>
+          <p:cNvPr id="58" name="직사각형 57"/>
+          <p:cNvSpPr/>
+          <p:nvPr/>
+        </p:nvSpPr>
+        <p:spPr>
+          <a:xfrm>
+            <a:off x="7257983" y="2339987"/>
+            <a:ext cx="720985" cy="648072"/>
+          </a:xfrm>
+          <a:prstGeom prst="rect">
+            <a:avLst/>
+          </a:prstGeom>
+          <a:noFill/>
+          <a:ln>
+            <a:solidFill>
+              <a:schemeClr val="tx1"/>
+            </a:solidFill>
+          </a:ln>
+        </p:spPr>
+        <p:style>
+          <a:lnRef idx="2">
+            <a:schemeClr val="accent1">
+              <a:shade val="50000"/>
+            </a:schemeClr>
+          </a:lnRef>
+          <a:fillRef idx="1">
+            <a:schemeClr val="accent1"/>
+          </a:fillRef>
+          <a:effectRef idx="0">
+            <a:schemeClr val="accent1"/>
+          </a:effectRef>
+          <a:fontRef idx="minor">
+            <a:schemeClr val="lt1"/>
+          </a:fontRef>
+        </p:style>
+        <p:txBody>
+          <a:bodyPr rtlCol="0" anchor="ctr"/>
+          <a:lstStyle/>
+          <a:p>
+            <a:pPr algn="ctr"/>
+            <a:r>
+              <a:rPr lang="en-US" altLang="ko-KR" sz="1800" b="1" smtClean="0">
+                <a:solidFill>
+                  <a:schemeClr val="tx1"/>
+                </a:solidFill>
+                <a:latin typeface="Calibri" pitchFamily="34" charset="0"/>
+                <a:ea typeface="Calibri" pitchFamily="34" charset="0"/>
+                <a:cs typeface="Calibri" pitchFamily="34" charset="0"/>
+              </a:rPr>
+              <a:t>C[3]</a:t>
+            </a:r>
+            <a:endParaRPr lang="ko-KR" altLang="en-US" sz="1800" b="1">
+              <a:solidFill>
+                <a:schemeClr val="tx1"/>
+              </a:solidFill>
+              <a:latin typeface="Calibri" pitchFamily="34" charset="0"/>
+              <a:ea typeface="나눔스퀘어 ExtraBold" pitchFamily="50" charset="-127"/>
+              <a:cs typeface="Calibri" pitchFamily="34" charset="0"/>
+            </a:endParaRPr>
+          </a:p>
+        </p:txBody>
+      </p:sp>
+      <p:sp>
+        <p:nvSpPr>
+          <p:cNvPr id="59" name="직사각형 58"/>
+          <p:cNvSpPr/>
+          <p:nvPr/>
+        </p:nvSpPr>
+        <p:spPr>
+          <a:xfrm>
+            <a:off x="7978968" y="2339987"/>
+            <a:ext cx="720985" cy="648072"/>
+          </a:xfrm>
+          <a:prstGeom prst="rect">
+            <a:avLst/>
+          </a:prstGeom>
+          <a:noFill/>
+          <a:ln>
+            <a:solidFill>
+              <a:schemeClr val="tx1"/>
+            </a:solidFill>
+          </a:ln>
+        </p:spPr>
+        <p:style>
+          <a:lnRef idx="2">
+            <a:schemeClr val="accent1">
+              <a:shade val="50000"/>
+            </a:schemeClr>
+          </a:lnRef>
+          <a:fillRef idx="1">
+            <a:schemeClr val="accent1"/>
+          </a:fillRef>
+          <a:effectRef idx="0">
+            <a:schemeClr val="accent1"/>
+          </a:effectRef>
+          <a:fontRef idx="minor">
+            <a:schemeClr val="lt1"/>
+          </a:fontRef>
+        </p:style>
+        <p:txBody>
+          <a:bodyPr rtlCol="0" anchor="ctr"/>
+          <a:lstStyle/>
+          <a:p>
+            <a:pPr algn="ctr"/>
+            <a:r>
+              <a:rPr lang="en-US" altLang="ko-KR" sz="1800" b="1" smtClean="0">
+                <a:solidFill>
+                  <a:schemeClr val="tx1"/>
+                </a:solidFill>
+                <a:latin typeface="Calibri" pitchFamily="34" charset="0"/>
+                <a:ea typeface="Calibri" pitchFamily="34" charset="0"/>
+                <a:cs typeface="Calibri" pitchFamily="34" charset="0"/>
+              </a:rPr>
+              <a:t>C[4]</a:t>
+            </a:r>
+            <a:endParaRPr lang="ko-KR" altLang="en-US" sz="1800" b="1">
+              <a:solidFill>
+                <a:schemeClr val="tx1"/>
+              </a:solidFill>
+              <a:latin typeface="Calibri" pitchFamily="34" charset="0"/>
+              <a:ea typeface="나눔스퀘어 ExtraBold" pitchFamily="50" charset="-127"/>
+              <a:cs typeface="Calibri" pitchFamily="34" charset="0"/>
+            </a:endParaRPr>
+          </a:p>
+        </p:txBody>
+      </p:sp>
+      <p:sp>
+        <p:nvSpPr>
+          <p:cNvPr id="60" name="모서리가 둥근 직사각형 59"/>
+          <p:cNvSpPr/>
+          <p:nvPr/>
+        </p:nvSpPr>
+        <p:spPr>
+          <a:xfrm>
+            <a:off x="5744909" y="2231975"/>
+            <a:ext cx="2305161" cy="864096"/>
+          </a:xfrm>
+          <a:prstGeom prst="roundRect">
+            <a:avLst/>
+          </a:prstGeom>
+          <a:noFill/>
+          <a:ln w="38100">
+            <a:solidFill>
+              <a:srgbClr val="FF8181"/>
+            </a:solidFill>
+            <a:prstDash val="solid"/>
+          </a:ln>
+        </p:spPr>
+        <p:style>
+          <a:lnRef idx="2">
+            <a:schemeClr val="accent1">
+              <a:shade val="50000"/>
+            </a:schemeClr>
+          </a:lnRef>
+          <a:fillRef idx="1">
+            <a:schemeClr val="accent1"/>
+          </a:fillRef>
+          <a:effectRef idx="0">
+            <a:schemeClr val="accent1"/>
+          </a:effectRef>
+          <a:fontRef idx="minor">
+            <a:schemeClr val="lt1"/>
+          </a:fontRef>
+        </p:style>
+        <p:txBody>
+          <a:bodyPr rtlCol="0" anchor="ctr"/>
+          <a:lstStyle/>
+          <a:p>
+            <a:pPr algn="ctr"/>
+            <a:endParaRPr lang="ko-KR" altLang="en-US"/>
+          </a:p>
+        </p:txBody>
+      </p:sp>
+      <p:sp>
+        <p:nvSpPr>
+          <p:cNvPr id="61" name="모서리가 둥근 직사각형 60"/>
+          <p:cNvSpPr/>
+          <p:nvPr/>
+        </p:nvSpPr>
+        <p:spPr>
+          <a:xfrm>
+            <a:off x="6526163" y="2290315"/>
+            <a:ext cx="1474694" cy="747416"/>
+          </a:xfrm>
+          <a:prstGeom prst="roundRect">
+            <a:avLst/>
+          </a:prstGeom>
+          <a:noFill/>
+          <a:ln w="38100">
+            <a:solidFill>
+              <a:srgbClr val="00B050"/>
+            </a:solidFill>
+            <a:prstDash val="solid"/>
+          </a:ln>
+        </p:spPr>
+        <p:style>
+          <a:lnRef idx="2">
+            <a:schemeClr val="accent1">
+              <a:shade val="50000"/>
+            </a:schemeClr>
+          </a:lnRef>
+          <a:fillRef idx="1">
+            <a:schemeClr val="accent1"/>
+          </a:fillRef>
+          <a:effectRef idx="0">
+            <a:schemeClr val="accent1"/>
+          </a:effectRef>
+          <a:fontRef idx="minor">
+            <a:schemeClr val="lt1"/>
+          </a:fontRef>
+        </p:style>
+        <p:txBody>
+          <a:bodyPr rtlCol="0" anchor="ctr"/>
+          <a:lstStyle/>
+          <a:p>
+            <a:pPr algn="ctr"/>
+            <a:endParaRPr lang="ko-KR" altLang="en-US"/>
+          </a:p>
+        </p:txBody>
+      </p:sp>
+      <p:sp>
+        <p:nvSpPr>
+          <p:cNvPr id="62" name="직사각형 61"/>
+          <p:cNvSpPr/>
+          <p:nvPr/>
+        </p:nvSpPr>
+        <p:spPr>
+          <a:xfrm>
+            <a:off x="5816013" y="3492115"/>
+            <a:ext cx="720985" cy="648072"/>
+          </a:xfrm>
+          <a:prstGeom prst="rect">
+            <a:avLst/>
+          </a:prstGeom>
+          <a:noFill/>
+          <a:ln>
+            <a:solidFill>
+              <a:schemeClr val="tx1"/>
+            </a:solidFill>
+          </a:ln>
+        </p:spPr>
+        <p:style>
+          <a:lnRef idx="2">
+            <a:schemeClr val="accent1">
+              <a:shade val="50000"/>
+            </a:schemeClr>
+          </a:lnRef>
+          <a:fillRef idx="1">
+            <a:schemeClr val="accent1"/>
+          </a:fillRef>
+          <a:effectRef idx="0">
+            <a:schemeClr val="accent1"/>
+          </a:effectRef>
+          <a:fontRef idx="minor">
+            <a:schemeClr val="lt1"/>
+          </a:fontRef>
+        </p:style>
+        <p:txBody>
+          <a:bodyPr rtlCol="0" anchor="ctr"/>
+          <a:lstStyle/>
+          <a:p>
+            <a:pPr algn="ctr"/>
+            <a:r>
+              <a:rPr lang="en-US" altLang="ko-KR" sz="1800" b="1" smtClean="0">
+                <a:solidFill>
+                  <a:schemeClr val="tx1"/>
+                </a:solidFill>
+                <a:latin typeface="Calibri" pitchFamily="34" charset="0"/>
+                <a:ea typeface="Calibri" pitchFamily="34" charset="0"/>
+                <a:cs typeface="Calibri" pitchFamily="34" charset="0"/>
+              </a:rPr>
+              <a:t>C[1]</a:t>
+            </a:r>
+            <a:endParaRPr lang="ko-KR" altLang="en-US" sz="1800" b="1">
+              <a:solidFill>
+                <a:schemeClr val="tx1"/>
+              </a:solidFill>
+              <a:latin typeface="Calibri" pitchFamily="34" charset="0"/>
+              <a:ea typeface="나눔스퀘어 ExtraBold" pitchFamily="50" charset="-127"/>
+              <a:cs typeface="Calibri" pitchFamily="34" charset="0"/>
+            </a:endParaRPr>
+          </a:p>
+        </p:txBody>
+      </p:sp>
+      <p:sp>
+        <p:nvSpPr>
+          <p:cNvPr id="63" name="직사각형 62"/>
+          <p:cNvSpPr/>
+          <p:nvPr/>
+        </p:nvSpPr>
+        <p:spPr>
+          <a:xfrm>
+            <a:off x="6536998" y="3492115"/>
+            <a:ext cx="720985" cy="648072"/>
+          </a:xfrm>
+          <a:prstGeom prst="rect">
+            <a:avLst/>
+          </a:prstGeom>
+          <a:noFill/>
+          <a:ln>
+            <a:solidFill>
+              <a:schemeClr val="tx1"/>
+            </a:solidFill>
+          </a:ln>
+        </p:spPr>
+        <p:style>
+          <a:lnRef idx="2">
+            <a:schemeClr val="accent1">
+              <a:shade val="50000"/>
+            </a:schemeClr>
+          </a:lnRef>
+          <a:fillRef idx="1">
+            <a:schemeClr val="accent1"/>
+          </a:fillRef>
+          <a:effectRef idx="0">
+            <a:schemeClr val="accent1"/>
+          </a:effectRef>
+          <a:fontRef idx="minor">
+            <a:schemeClr val="lt1"/>
+          </a:fontRef>
+        </p:style>
+        <p:txBody>
+          <a:bodyPr rtlCol="0" anchor="ctr"/>
+          <a:lstStyle/>
+          <a:p>
+            <a:pPr algn="ctr"/>
+            <a:r>
+              <a:rPr lang="en-US" altLang="ko-KR" sz="1800" b="1" smtClean="0">
+                <a:solidFill>
+                  <a:schemeClr val="tx1"/>
+                </a:solidFill>
+                <a:latin typeface="Calibri" pitchFamily="34" charset="0"/>
+                <a:ea typeface="Calibri" pitchFamily="34" charset="0"/>
+                <a:cs typeface="Calibri" pitchFamily="34" charset="0"/>
+              </a:rPr>
+              <a:t>C[2]</a:t>
+            </a:r>
+            <a:endParaRPr lang="ko-KR" altLang="en-US" sz="1800" b="1">
+              <a:solidFill>
+                <a:schemeClr val="tx1"/>
+              </a:solidFill>
+              <a:latin typeface="Calibri" pitchFamily="34" charset="0"/>
+              <a:ea typeface="나눔스퀘어 ExtraBold" pitchFamily="50" charset="-127"/>
+              <a:cs typeface="Calibri" pitchFamily="34" charset="0"/>
+            </a:endParaRPr>
+          </a:p>
+        </p:txBody>
+      </p:sp>
+      <p:sp>
+        <p:nvSpPr>
+          <p:cNvPr id="64" name="직사각형 63"/>
+          <p:cNvSpPr/>
+          <p:nvPr/>
+        </p:nvSpPr>
+        <p:spPr>
+          <a:xfrm>
+            <a:off x="7257983" y="3492115"/>
+            <a:ext cx="720985" cy="648072"/>
+          </a:xfrm>
+          <a:prstGeom prst="rect">
+            <a:avLst/>
+          </a:prstGeom>
+          <a:noFill/>
+          <a:ln>
+            <a:solidFill>
+              <a:schemeClr val="tx1"/>
+            </a:solidFill>
+          </a:ln>
+        </p:spPr>
+        <p:style>
+          <a:lnRef idx="2">
+            <a:schemeClr val="accent1">
+              <a:shade val="50000"/>
+            </a:schemeClr>
+          </a:lnRef>
+          <a:fillRef idx="1">
+            <a:schemeClr val="accent1"/>
+          </a:fillRef>
+          <a:effectRef idx="0">
+            <a:schemeClr val="accent1"/>
+          </a:effectRef>
+          <a:fontRef idx="minor">
+            <a:schemeClr val="lt1"/>
+          </a:fontRef>
+        </p:style>
+        <p:txBody>
+          <a:bodyPr rtlCol="0" anchor="ctr"/>
+          <a:lstStyle/>
+          <a:p>
+            <a:pPr algn="ctr"/>
+            <a:r>
+              <a:rPr lang="en-US" altLang="ko-KR" sz="1800" b="1" smtClean="0">
+                <a:solidFill>
+                  <a:schemeClr val="tx1"/>
+                </a:solidFill>
+                <a:latin typeface="Calibri" pitchFamily="34" charset="0"/>
+                <a:ea typeface="Calibri" pitchFamily="34" charset="0"/>
+                <a:cs typeface="Calibri" pitchFamily="34" charset="0"/>
+              </a:rPr>
+              <a:t>C[3]</a:t>
+            </a:r>
+            <a:endParaRPr lang="ko-KR" altLang="en-US" sz="1800" b="1">
+              <a:solidFill>
+                <a:schemeClr val="tx1"/>
+              </a:solidFill>
+              <a:latin typeface="Calibri" pitchFamily="34" charset="0"/>
+              <a:ea typeface="나눔스퀘어 ExtraBold" pitchFamily="50" charset="-127"/>
+              <a:cs typeface="Calibri" pitchFamily="34" charset="0"/>
+            </a:endParaRPr>
+          </a:p>
+        </p:txBody>
+      </p:sp>
+      <p:sp>
+        <p:nvSpPr>
+          <p:cNvPr id="65" name="직사각형 64"/>
+          <p:cNvSpPr/>
+          <p:nvPr/>
+        </p:nvSpPr>
+        <p:spPr>
+          <a:xfrm>
+            <a:off x="7978968" y="3492115"/>
+            <a:ext cx="720985" cy="648072"/>
+          </a:xfrm>
+          <a:prstGeom prst="rect">
+            <a:avLst/>
+          </a:prstGeom>
+          <a:noFill/>
+          <a:ln>
+            <a:solidFill>
+              <a:schemeClr val="tx1"/>
+            </a:solidFill>
+          </a:ln>
+        </p:spPr>
+        <p:style>
+          <a:lnRef idx="2">
+            <a:schemeClr val="accent1">
+              <a:shade val="50000"/>
+            </a:schemeClr>
+          </a:lnRef>
+          <a:fillRef idx="1">
+            <a:schemeClr val="accent1"/>
+          </a:fillRef>
+          <a:effectRef idx="0">
+            <a:schemeClr val="accent1"/>
+          </a:effectRef>
+          <a:fontRef idx="minor">
+            <a:schemeClr val="lt1"/>
+          </a:fontRef>
+        </p:style>
+        <p:txBody>
+          <a:bodyPr rtlCol="0" anchor="ctr"/>
+          <a:lstStyle/>
+          <a:p>
+            <a:pPr algn="ctr"/>
+            <a:r>
+              <a:rPr lang="en-US" altLang="ko-KR" sz="1800" b="1" smtClean="0">
+                <a:solidFill>
+                  <a:schemeClr val="tx1"/>
+                </a:solidFill>
+                <a:latin typeface="Calibri" pitchFamily="34" charset="0"/>
+                <a:ea typeface="Calibri" pitchFamily="34" charset="0"/>
+                <a:cs typeface="Calibri" pitchFamily="34" charset="0"/>
+              </a:rPr>
+              <a:t>C[4]</a:t>
+            </a:r>
+            <a:endParaRPr lang="ko-KR" altLang="en-US" sz="1800" b="1">
+              <a:solidFill>
+                <a:schemeClr val="tx1"/>
+              </a:solidFill>
+              <a:latin typeface="Calibri" pitchFamily="34" charset="0"/>
+              <a:ea typeface="나눔스퀘어 ExtraBold" pitchFamily="50" charset="-127"/>
+              <a:cs typeface="Calibri" pitchFamily="34" charset="0"/>
+            </a:endParaRPr>
+          </a:p>
+        </p:txBody>
+      </p:sp>
+      <p:sp>
+        <p:nvSpPr>
+          <p:cNvPr id="66" name="모서리가 둥근 직사각형 65"/>
+          <p:cNvSpPr/>
+          <p:nvPr/>
+        </p:nvSpPr>
+        <p:spPr>
+          <a:xfrm>
+            <a:off x="5744909" y="3384103"/>
+            <a:ext cx="2305161" cy="864096"/>
+          </a:xfrm>
+          <a:prstGeom prst="roundRect">
+            <a:avLst/>
+          </a:prstGeom>
+          <a:noFill/>
+          <a:ln w="38100">
+            <a:solidFill>
+              <a:srgbClr val="FF8181"/>
+            </a:solidFill>
+            <a:prstDash val="solid"/>
+          </a:ln>
+        </p:spPr>
+        <p:style>
+          <a:lnRef idx="2">
+            <a:schemeClr val="accent1">
+              <a:shade val="50000"/>
+            </a:schemeClr>
+          </a:lnRef>
+          <a:fillRef idx="1">
+            <a:schemeClr val="accent1"/>
+          </a:fillRef>
+          <a:effectRef idx="0">
+            <a:schemeClr val="accent1"/>
+          </a:effectRef>
+          <a:fontRef idx="minor">
+            <a:schemeClr val="lt1"/>
+          </a:fontRef>
+        </p:style>
+        <p:txBody>
+          <a:bodyPr rtlCol="0" anchor="ctr"/>
+          <a:lstStyle/>
+          <a:p>
+            <a:pPr algn="ctr"/>
+            <a:endParaRPr lang="ko-KR" altLang="en-US"/>
+          </a:p>
+        </p:txBody>
+      </p:sp>
+      <p:sp>
+        <p:nvSpPr>
+          <p:cNvPr id="67" name="모서리가 둥근 직사각형 66"/>
+          <p:cNvSpPr/>
+          <p:nvPr/>
+        </p:nvSpPr>
+        <p:spPr>
+          <a:xfrm>
+            <a:off x="5799136" y="3442443"/>
+            <a:ext cx="1474694" cy="747416"/>
+          </a:xfrm>
+          <a:prstGeom prst="roundRect">
+            <a:avLst/>
+          </a:prstGeom>
+          <a:noFill/>
+          <a:ln w="38100">
+            <a:solidFill>
+              <a:srgbClr val="00B050"/>
+            </a:solidFill>
+            <a:prstDash val="solid"/>
+          </a:ln>
+        </p:spPr>
+        <p:style>
+          <a:lnRef idx="2">
+            <a:schemeClr val="accent1">
+              <a:shade val="50000"/>
+            </a:schemeClr>
+          </a:lnRef>
+          <a:fillRef idx="1">
+            <a:schemeClr val="accent1"/>
+          </a:fillRef>
+          <a:effectRef idx="0">
+            <a:schemeClr val="accent1"/>
+          </a:effectRef>
+          <a:fontRef idx="minor">
+            <a:schemeClr val="lt1"/>
+          </a:fontRef>
+        </p:style>
+        <p:txBody>
+          <a:bodyPr rtlCol="0" anchor="ctr"/>
+          <a:lstStyle/>
+          <a:p>
+            <a:pPr algn="ctr"/>
+            <a:endParaRPr lang="ko-KR" altLang="en-US"/>
+          </a:p>
+        </p:txBody>
+      </p:sp>
+      <p:sp>
+        <p:nvSpPr>
+          <p:cNvPr id="68" name="직사각형 67"/>
+          <p:cNvSpPr/>
+          <p:nvPr/>
+        </p:nvSpPr>
+        <p:spPr>
+          <a:xfrm>
+            <a:off x="3815011" y="5184303"/>
+            <a:ext cx="720985" cy="648072"/>
+          </a:xfrm>
+          <a:prstGeom prst="rect">
+            <a:avLst/>
+          </a:prstGeom>
+          <a:noFill/>
+          <a:ln>
+            <a:solidFill>
+              <a:schemeClr val="tx1"/>
+            </a:solidFill>
+          </a:ln>
+        </p:spPr>
+        <p:style>
+          <a:lnRef idx="2">
+            <a:schemeClr val="accent1">
+              <a:shade val="50000"/>
+            </a:schemeClr>
+          </a:lnRef>
+          <a:fillRef idx="1">
+            <a:schemeClr val="accent1"/>
+          </a:fillRef>
+          <a:effectRef idx="0">
+            <a:schemeClr val="accent1"/>
+          </a:effectRef>
+          <a:fontRef idx="minor">
+            <a:schemeClr val="lt1"/>
+          </a:fontRef>
+        </p:style>
+        <p:txBody>
+          <a:bodyPr rtlCol="0" anchor="ctr"/>
+          <a:lstStyle/>
+          <a:p>
+            <a:pPr algn="ctr"/>
+            <a:r>
+              <a:rPr lang="en-US" altLang="ko-KR" sz="1800" b="1" smtClean="0">
+                <a:solidFill>
+                  <a:schemeClr val="tx1"/>
+                </a:solidFill>
+                <a:latin typeface="Calibri" pitchFamily="34" charset="0"/>
+                <a:ea typeface="Calibri" pitchFamily="34" charset="0"/>
+                <a:cs typeface="Calibri" pitchFamily="34" charset="0"/>
+              </a:rPr>
+              <a:t>C[1]</a:t>
+            </a:r>
+            <a:endParaRPr lang="ko-KR" altLang="en-US" sz="1800" b="1">
+              <a:solidFill>
+                <a:schemeClr val="tx1"/>
+              </a:solidFill>
+              <a:latin typeface="Calibri" pitchFamily="34" charset="0"/>
+              <a:ea typeface="나눔스퀘어 ExtraBold" pitchFamily="50" charset="-127"/>
+              <a:cs typeface="Calibri" pitchFamily="34" charset="0"/>
+            </a:endParaRPr>
+          </a:p>
+        </p:txBody>
+      </p:sp>
+      <p:sp>
+        <p:nvSpPr>
+          <p:cNvPr id="69" name="직사각형 68"/>
+          <p:cNvSpPr/>
+          <p:nvPr/>
+        </p:nvSpPr>
+        <p:spPr>
+          <a:xfrm>
+            <a:off x="4535996" y="5184303"/>
+            <a:ext cx="720985" cy="648072"/>
+          </a:xfrm>
+          <a:prstGeom prst="rect">
+            <a:avLst/>
+          </a:prstGeom>
+          <a:noFill/>
+          <a:ln>
+            <a:solidFill>
+              <a:schemeClr val="tx1"/>
+            </a:solidFill>
+          </a:ln>
+        </p:spPr>
+        <p:style>
+          <a:lnRef idx="2">
+            <a:schemeClr val="accent1">
+              <a:shade val="50000"/>
+            </a:schemeClr>
+          </a:lnRef>
+          <a:fillRef idx="1">
+            <a:schemeClr val="accent1"/>
+          </a:fillRef>
+          <a:effectRef idx="0">
+            <a:schemeClr val="accent1"/>
+          </a:effectRef>
+          <a:fontRef idx="minor">
+            <a:schemeClr val="lt1"/>
+          </a:fontRef>
+        </p:style>
+        <p:txBody>
+          <a:bodyPr rtlCol="0" anchor="ctr"/>
+          <a:lstStyle/>
+          <a:p>
+            <a:pPr algn="ctr"/>
+            <a:r>
+              <a:rPr lang="en-US" altLang="ko-KR" sz="1800" b="1" smtClean="0">
+                <a:solidFill>
+                  <a:schemeClr val="tx1"/>
+                </a:solidFill>
+                <a:latin typeface="Calibri" pitchFamily="34" charset="0"/>
+                <a:ea typeface="Calibri" pitchFamily="34" charset="0"/>
+                <a:cs typeface="Calibri" pitchFamily="34" charset="0"/>
+              </a:rPr>
+              <a:t>C[2]</a:t>
+            </a:r>
+            <a:endParaRPr lang="ko-KR" altLang="en-US" sz="1800" b="1">
+              <a:solidFill>
+                <a:schemeClr val="tx1"/>
+              </a:solidFill>
+              <a:latin typeface="Calibri" pitchFamily="34" charset="0"/>
+              <a:ea typeface="나눔스퀘어 ExtraBold" pitchFamily="50" charset="-127"/>
+              <a:cs typeface="Calibri" pitchFamily="34" charset="0"/>
+            </a:endParaRPr>
+          </a:p>
+        </p:txBody>
+      </p:sp>
+      <p:sp>
+        <p:nvSpPr>
+          <p:cNvPr id="70" name="직사각형 69"/>
+          <p:cNvSpPr/>
+          <p:nvPr/>
+        </p:nvSpPr>
+        <p:spPr>
+          <a:xfrm>
+            <a:off x="5256981" y="5184303"/>
+            <a:ext cx="720985" cy="648072"/>
+          </a:xfrm>
+          <a:prstGeom prst="rect">
+            <a:avLst/>
+          </a:prstGeom>
+          <a:noFill/>
+          <a:ln>
+            <a:solidFill>
+              <a:schemeClr val="tx1"/>
+            </a:solidFill>
+          </a:ln>
+        </p:spPr>
+        <p:style>
+          <a:lnRef idx="2">
+            <a:schemeClr val="accent1">
+              <a:shade val="50000"/>
+            </a:schemeClr>
+          </a:lnRef>
+          <a:fillRef idx="1">
+            <a:schemeClr val="accent1"/>
+          </a:fillRef>
+          <a:effectRef idx="0">
+            <a:schemeClr val="accent1"/>
+          </a:effectRef>
+          <a:fontRef idx="minor">
+            <a:schemeClr val="lt1"/>
+          </a:fontRef>
+        </p:style>
+        <p:txBody>
+          <a:bodyPr rtlCol="0" anchor="ctr"/>
+          <a:lstStyle/>
+          <a:p>
+            <a:pPr algn="ctr"/>
+            <a:r>
+              <a:rPr lang="en-US" altLang="ko-KR" sz="1800" b="1" smtClean="0">
+                <a:solidFill>
+                  <a:schemeClr val="tx1"/>
+                </a:solidFill>
+                <a:latin typeface="Calibri" pitchFamily="34" charset="0"/>
+                <a:ea typeface="Calibri" pitchFamily="34" charset="0"/>
+                <a:cs typeface="Calibri" pitchFamily="34" charset="0"/>
+              </a:rPr>
+              <a:t>C[3]</a:t>
+            </a:r>
+            <a:endParaRPr lang="ko-KR" altLang="en-US" sz="1800" b="1">
+              <a:solidFill>
+                <a:schemeClr val="tx1"/>
+              </a:solidFill>
+              <a:latin typeface="Calibri" pitchFamily="34" charset="0"/>
+              <a:ea typeface="나눔스퀘어 ExtraBold" pitchFamily="50" charset="-127"/>
+              <a:cs typeface="Calibri" pitchFamily="34" charset="0"/>
+            </a:endParaRPr>
+          </a:p>
+        </p:txBody>
+      </p:sp>
+      <p:sp>
+        <p:nvSpPr>
+          <p:cNvPr id="71" name="직사각형 70"/>
+          <p:cNvSpPr/>
+          <p:nvPr/>
+        </p:nvSpPr>
+        <p:spPr>
+          <a:xfrm>
+            <a:off x="5977966" y="5184303"/>
+            <a:ext cx="720985" cy="648072"/>
+          </a:xfrm>
+          <a:prstGeom prst="rect">
+            <a:avLst/>
+          </a:prstGeom>
+          <a:noFill/>
+          <a:ln>
+            <a:solidFill>
+              <a:schemeClr val="tx1"/>
+            </a:solidFill>
+          </a:ln>
+        </p:spPr>
+        <p:style>
+          <a:lnRef idx="2">
+            <a:schemeClr val="accent1">
+              <a:shade val="50000"/>
+            </a:schemeClr>
+          </a:lnRef>
+          <a:fillRef idx="1">
+            <a:schemeClr val="accent1"/>
+          </a:fillRef>
+          <a:effectRef idx="0">
+            <a:schemeClr val="accent1"/>
+          </a:effectRef>
+          <a:fontRef idx="minor">
+            <a:schemeClr val="lt1"/>
+          </a:fontRef>
+        </p:style>
+        <p:txBody>
+          <a:bodyPr rtlCol="0" anchor="ctr"/>
+          <a:lstStyle/>
+          <a:p>
+            <a:pPr algn="ctr"/>
+            <a:r>
+              <a:rPr lang="en-US" altLang="ko-KR" sz="1800" b="1" smtClean="0">
+                <a:solidFill>
+                  <a:schemeClr val="tx1"/>
+                </a:solidFill>
+                <a:latin typeface="Calibri" pitchFamily="34" charset="0"/>
+                <a:ea typeface="Calibri" pitchFamily="34" charset="0"/>
+                <a:cs typeface="Calibri" pitchFamily="34" charset="0"/>
+              </a:rPr>
+              <a:t>C[4]</a:t>
+            </a:r>
+            <a:endParaRPr lang="ko-KR" altLang="en-US" sz="1800" b="1">
+              <a:solidFill>
+                <a:schemeClr val="tx1"/>
+              </a:solidFill>
+              <a:latin typeface="Calibri" pitchFamily="34" charset="0"/>
+              <a:ea typeface="나눔스퀘어 ExtraBold" pitchFamily="50" charset="-127"/>
+              <a:cs typeface="Calibri" pitchFamily="34" charset="0"/>
+            </a:endParaRPr>
+          </a:p>
+        </p:txBody>
+      </p:sp>
+      <p:sp>
+        <p:nvSpPr>
+          <p:cNvPr id="73" name="모서리가 둥근 직사각형 72"/>
+          <p:cNvSpPr/>
+          <p:nvPr/>
+        </p:nvSpPr>
+        <p:spPr>
+          <a:xfrm>
+            <a:off x="3774955" y="5134631"/>
+            <a:ext cx="1460093" cy="747416"/>
+          </a:xfrm>
+          <a:prstGeom prst="roundRect">
+            <a:avLst/>
+          </a:prstGeom>
+          <a:noFill/>
+          <a:ln w="38100">
+            <a:solidFill>
+              <a:srgbClr val="00B050"/>
+            </a:solidFill>
+            <a:prstDash val="solid"/>
+          </a:ln>
+        </p:spPr>
+        <p:style>
+          <a:lnRef idx="2">
+            <a:schemeClr val="accent1">
+              <a:shade val="50000"/>
+            </a:schemeClr>
+          </a:lnRef>
+          <a:fillRef idx="1">
+            <a:schemeClr val="accent1"/>
+          </a:fillRef>
+          <a:effectRef idx="0">
+            <a:schemeClr val="accent1"/>
+          </a:effectRef>
+          <a:fontRef idx="minor">
+            <a:schemeClr val="lt1"/>
+          </a:fontRef>
+        </p:style>
+        <p:txBody>
+          <a:bodyPr rtlCol="0" anchor="ctr"/>
+          <a:lstStyle/>
+          <a:p>
+            <a:pPr algn="ctr"/>
+            <a:endParaRPr lang="ko-KR" altLang="en-US"/>
+          </a:p>
+        </p:txBody>
+      </p:sp>
+      <p:sp>
+        <p:nvSpPr>
+          <p:cNvPr id="74" name="모서리가 둥근 직사각형 73"/>
+          <p:cNvSpPr/>
+          <p:nvPr/>
+        </p:nvSpPr>
+        <p:spPr>
+          <a:xfrm>
+            <a:off x="5285209" y="5134631"/>
+            <a:ext cx="1460093" cy="747416"/>
+          </a:xfrm>
+          <a:prstGeom prst="roundRect">
+            <a:avLst/>
+          </a:prstGeom>
+          <a:noFill/>
+          <a:ln w="38100">
+            <a:solidFill>
+              <a:srgbClr val="FF8181"/>
+            </a:solidFill>
+            <a:prstDash val="solid"/>
+          </a:ln>
+        </p:spPr>
+        <p:style>
+          <a:lnRef idx="2">
+            <a:schemeClr val="accent1">
+              <a:shade val="50000"/>
+            </a:schemeClr>
+          </a:lnRef>
+          <a:fillRef idx="1">
+            <a:schemeClr val="accent1"/>
+          </a:fillRef>
+          <a:effectRef idx="0">
+            <a:schemeClr val="accent1"/>
+          </a:effectRef>
+          <a:fontRef idx="minor">
+            <a:schemeClr val="lt1"/>
+          </a:fontRef>
+        </p:style>
+        <p:txBody>
+          <a:bodyPr rtlCol="0" anchor="ctr"/>
+          <a:lstStyle/>
+          <a:p>
+            <a:pPr algn="ctr"/>
+            <a:endParaRPr lang="ko-KR" altLang="en-US"/>
+          </a:p>
+        </p:txBody>
+      </p:sp>
+      <p:sp>
+        <p:nvSpPr>
+          <p:cNvPr id="42" name="TextBox 41"/>
+          <p:cNvSpPr txBox="1"/>
+          <p:nvPr/>
+        </p:nvSpPr>
+        <p:spPr>
+          <a:xfrm>
+            <a:off x="2951896" y="1029325"/>
+            <a:ext cx="4610170" cy="338554"/>
+          </a:xfrm>
+          <a:prstGeom prst="rect">
+            <a:avLst/>
+          </a:prstGeom>
+          <a:noFill/>
+        </p:spPr>
+        <p:txBody>
+          <a:bodyPr wrap="square" rtlCol="0" anchor="ctr">
+            <a:spAutoFit/>
+          </a:bodyPr>
+          <a:lstStyle/>
+          <a:p>
+            <a:pPr algn="ctr"/>
+            <a:r>
+              <a:rPr lang="ko-KR" altLang="en-US" sz="1600" smtClean="0">
+                <a:latin typeface="나눔스퀘어 ExtraBold" pitchFamily="50" charset="-127"/>
+                <a:ea typeface="나눔스퀘어 ExtraBold" pitchFamily="50" charset="-127"/>
+              </a:rPr>
+              <a:t>최종적으로 </a:t>
+            </a:r>
+            <a:r>
+              <a:rPr lang="ko-KR" altLang="en-US" sz="1600" smtClean="0">
+                <a:latin typeface="나눔스퀘어 ExtraBold" pitchFamily="50" charset="-127"/>
+                <a:ea typeface="나눔스퀘어 ExtraBold" pitchFamily="50" charset="-127"/>
+              </a:rPr>
+              <a:t>사용되는 계산식을 고려해보자</a:t>
+            </a:r>
+            <a:r>
+              <a:rPr lang="en-US" altLang="ko-KR" sz="1600" smtClean="0">
+                <a:latin typeface="나눔스퀘어 ExtraBold" pitchFamily="50" charset="-127"/>
+                <a:ea typeface="나눔스퀘어 ExtraBold" pitchFamily="50" charset="-127"/>
+              </a:rPr>
+              <a:t>.</a:t>
+            </a:r>
+            <a:r>
+              <a:rPr lang="en-US" altLang="ko-KR" sz="1600" smtClean="0">
+                <a:latin typeface="나눔스퀘어 ExtraBold" pitchFamily="50" charset="-127"/>
+                <a:ea typeface="나눔스퀘어 ExtraBold" pitchFamily="50" charset="-127"/>
+              </a:rPr>
+              <a:t> </a:t>
+            </a:r>
+            <a:endParaRPr lang="ko-KR" altLang="en-US" sz="1600">
+              <a:latin typeface="나눔스퀘어 ExtraBold" pitchFamily="50" charset="-127"/>
+              <a:ea typeface="나눔스퀘어 ExtraBold" pitchFamily="50" charset="-127"/>
+            </a:endParaRPr>
+          </a:p>
+        </p:txBody>
+      </p:sp>
+      <p:sp>
+        <p:nvSpPr>
+          <p:cNvPr id="43" name="TextBox 42"/>
+          <p:cNvSpPr txBox="1"/>
+          <p:nvPr/>
+        </p:nvSpPr>
+        <p:spPr>
+          <a:xfrm>
+            <a:off x="2181426" y="1689360"/>
+            <a:ext cx="1985701" cy="338554"/>
+          </a:xfrm>
+          <a:prstGeom prst="rect">
+            <a:avLst/>
+          </a:prstGeom>
+          <a:noFill/>
+        </p:spPr>
+        <p:txBody>
+          <a:bodyPr wrap="square" rtlCol="0" anchor="ctr">
+            <a:spAutoFit/>
+          </a:bodyPr>
+          <a:lstStyle/>
+          <a:p>
+            <a:pPr algn="ctr"/>
+            <a:r>
+              <a:rPr lang="en-US" altLang="ko-KR" sz="1600" b="1" smtClean="0">
+                <a:latin typeface="Calibri" pitchFamily="34" charset="0"/>
+                <a:ea typeface="Calibri" pitchFamily="34" charset="0"/>
+                <a:cs typeface="Calibri" pitchFamily="34" charset="0"/>
+              </a:rPr>
+              <a:t>D[1][1] + D[2][4]</a:t>
+            </a:r>
+            <a:endParaRPr lang="ko-KR" altLang="en-US" sz="1600" b="1">
+              <a:latin typeface="Calibri" pitchFamily="34" charset="0"/>
+              <a:ea typeface="나눔스퀘어 ExtraBold" pitchFamily="50" charset="-127"/>
+              <a:cs typeface="Calibri" pitchFamily="34" charset="0"/>
+            </a:endParaRPr>
+          </a:p>
+        </p:txBody>
+      </p:sp>
+      <p:sp>
+        <p:nvSpPr>
+          <p:cNvPr id="45" name="모서리가 둥근 직사각형 44"/>
+          <p:cNvSpPr/>
+          <p:nvPr/>
+        </p:nvSpPr>
+        <p:spPr>
+          <a:xfrm>
+            <a:off x="1577901" y="2087959"/>
+            <a:ext cx="3192749" cy="2261475"/>
+          </a:xfrm>
+          <a:prstGeom prst="roundRect">
+            <a:avLst/>
+          </a:prstGeom>
+          <a:noFill/>
+          <a:ln w="19050">
+            <a:solidFill>
+              <a:schemeClr val="tx1">
+                <a:lumMod val="65000"/>
+                <a:lumOff val="35000"/>
+              </a:schemeClr>
+            </a:solidFill>
+            <a:prstDash val="sysDash"/>
+          </a:ln>
+        </p:spPr>
+        <p:style>
+          <a:lnRef idx="2">
+            <a:schemeClr val="accent1">
+              <a:shade val="50000"/>
+            </a:schemeClr>
+          </a:lnRef>
+          <a:fillRef idx="1">
+            <a:schemeClr val="accent1"/>
+          </a:fillRef>
+          <a:effectRef idx="0">
+            <a:schemeClr val="accent1"/>
+          </a:effectRef>
+          <a:fontRef idx="minor">
+            <a:schemeClr val="lt1"/>
+          </a:fontRef>
+        </p:style>
+        <p:txBody>
+          <a:bodyPr rtlCol="0" anchor="ctr"/>
+          <a:lstStyle/>
+          <a:p>
+            <a:pPr algn="ctr"/>
+            <a:endParaRPr lang="ko-KR" altLang="en-US"/>
+          </a:p>
+        </p:txBody>
+      </p:sp>
+      <p:sp>
+        <p:nvSpPr>
+          <p:cNvPr id="46" name="TextBox 45"/>
+          <p:cNvSpPr txBox="1"/>
+          <p:nvPr/>
+        </p:nvSpPr>
+        <p:spPr>
+          <a:xfrm>
+            <a:off x="6270659" y="1689360"/>
+            <a:ext cx="1985701" cy="338554"/>
+          </a:xfrm>
+          <a:prstGeom prst="rect">
+            <a:avLst/>
+          </a:prstGeom>
+          <a:noFill/>
+        </p:spPr>
+        <p:txBody>
+          <a:bodyPr wrap="square" rtlCol="0" anchor="ctr">
+            <a:spAutoFit/>
+          </a:bodyPr>
+          <a:lstStyle/>
+          <a:p>
+            <a:pPr algn="ctr"/>
+            <a:r>
+              <a:rPr lang="en-US" altLang="ko-KR" sz="1600" b="1" smtClean="0">
+                <a:latin typeface="Calibri" pitchFamily="34" charset="0"/>
+                <a:ea typeface="Calibri" pitchFamily="34" charset="0"/>
+                <a:cs typeface="Calibri" pitchFamily="34" charset="0"/>
+              </a:rPr>
+              <a:t>D[1][3] + D[4][4]</a:t>
+            </a:r>
+            <a:endParaRPr lang="ko-KR" altLang="en-US" sz="1600" b="1">
+              <a:latin typeface="Calibri" pitchFamily="34" charset="0"/>
+              <a:ea typeface="나눔스퀘어 ExtraBold" pitchFamily="50" charset="-127"/>
+              <a:cs typeface="Calibri" pitchFamily="34" charset="0"/>
+            </a:endParaRPr>
+          </a:p>
+        </p:txBody>
+      </p:sp>
+      <p:sp>
+        <p:nvSpPr>
+          <p:cNvPr id="48" name="모서리가 둥근 직사각형 47"/>
+          <p:cNvSpPr/>
+          <p:nvPr/>
+        </p:nvSpPr>
+        <p:spPr>
+          <a:xfrm>
+            <a:off x="5661608" y="2087959"/>
+            <a:ext cx="3192749" cy="2261475"/>
+          </a:xfrm>
+          <a:prstGeom prst="roundRect">
+            <a:avLst/>
+          </a:prstGeom>
+          <a:noFill/>
+          <a:ln w="19050">
+            <a:solidFill>
+              <a:schemeClr val="tx1">
+                <a:lumMod val="65000"/>
+                <a:lumOff val="35000"/>
+              </a:schemeClr>
+            </a:solidFill>
+            <a:prstDash val="sysDash"/>
+          </a:ln>
+        </p:spPr>
+        <p:style>
+          <a:lnRef idx="2">
+            <a:schemeClr val="accent1">
+              <a:shade val="50000"/>
+            </a:schemeClr>
+          </a:lnRef>
+          <a:fillRef idx="1">
+            <a:schemeClr val="accent1"/>
+          </a:fillRef>
+          <a:effectRef idx="0">
+            <a:schemeClr val="accent1"/>
+          </a:effectRef>
+          <a:fontRef idx="minor">
+            <a:schemeClr val="lt1"/>
+          </a:fontRef>
+        </p:style>
+        <p:txBody>
+          <a:bodyPr rtlCol="0" anchor="ctr"/>
+          <a:lstStyle/>
+          <a:p>
+            <a:pPr algn="ctr"/>
+            <a:endParaRPr lang="ko-KR" altLang="en-US"/>
+          </a:p>
+        </p:txBody>
+      </p:sp>
+      <p:sp>
+        <p:nvSpPr>
+          <p:cNvPr id="49" name="TextBox 48"/>
+          <p:cNvSpPr txBox="1"/>
+          <p:nvPr/>
+        </p:nvSpPr>
+        <p:spPr>
+          <a:xfrm>
+            <a:off x="4264130" y="4680247"/>
+            <a:ext cx="1985701" cy="338554"/>
+          </a:xfrm>
+          <a:prstGeom prst="rect">
+            <a:avLst/>
+          </a:prstGeom>
+          <a:noFill/>
+        </p:spPr>
+        <p:txBody>
+          <a:bodyPr wrap="square" rtlCol="0" anchor="ctr">
+            <a:spAutoFit/>
+          </a:bodyPr>
+          <a:lstStyle/>
+          <a:p>
+            <a:pPr algn="ctr"/>
+            <a:r>
+              <a:rPr lang="en-US" altLang="ko-KR" sz="1600" b="1" smtClean="0">
+                <a:latin typeface="Calibri" pitchFamily="34" charset="0"/>
+                <a:ea typeface="Calibri" pitchFamily="34" charset="0"/>
+                <a:cs typeface="Calibri" pitchFamily="34" charset="0"/>
+              </a:rPr>
+              <a:t>D[1][2] + D[3][4]</a:t>
+            </a:r>
+            <a:endParaRPr lang="ko-KR" altLang="en-US" sz="1600" b="1">
+              <a:latin typeface="Calibri" pitchFamily="34" charset="0"/>
+              <a:ea typeface="나눔스퀘어 ExtraBold" pitchFamily="50" charset="-127"/>
+              <a:cs typeface="Calibri" pitchFamily="34" charset="0"/>
+            </a:endParaRPr>
+          </a:p>
+        </p:txBody>
+      </p:sp>
+      <p:sp>
+        <p:nvSpPr>
+          <p:cNvPr id="51" name="모서리가 둥근 직사각형 50"/>
+          <p:cNvSpPr/>
+          <p:nvPr/>
+        </p:nvSpPr>
+        <p:spPr>
+          <a:xfrm>
+            <a:off x="3660605" y="5025047"/>
+            <a:ext cx="3192749" cy="959086"/>
+          </a:xfrm>
+          <a:prstGeom prst="roundRect">
+            <a:avLst/>
+          </a:prstGeom>
+          <a:noFill/>
+          <a:ln w="19050">
+            <a:solidFill>
+              <a:schemeClr val="tx1">
+                <a:lumMod val="65000"/>
+                <a:lumOff val="35000"/>
+              </a:schemeClr>
+            </a:solidFill>
+            <a:prstDash val="sysDash"/>
+          </a:ln>
+        </p:spPr>
+        <p:style>
+          <a:lnRef idx="2">
+            <a:schemeClr val="accent1">
+              <a:shade val="50000"/>
+            </a:schemeClr>
+          </a:lnRef>
+          <a:fillRef idx="1">
+            <a:schemeClr val="accent1"/>
+          </a:fillRef>
+          <a:effectRef idx="0">
+            <a:schemeClr val="accent1"/>
+          </a:effectRef>
+          <a:fontRef idx="minor">
+            <a:schemeClr val="lt1"/>
+          </a:fontRef>
+        </p:style>
+        <p:txBody>
+          <a:bodyPr rtlCol="0" anchor="ctr"/>
+          <a:lstStyle/>
+          <a:p>
+            <a:pPr algn="ctr"/>
+            <a:endParaRPr lang="ko-KR" altLang="en-US"/>
+          </a:p>
+        </p:txBody>
+      </p:sp>
+    </p:spTree>
+    <p:extLst>
+      <p:ext uri="{BB962C8B-B14F-4D97-AF65-F5344CB8AC3E}">
+        <p14:creationId xmlns:p14="http://schemas.microsoft.com/office/powerpoint/2010/main" val="3704870597"/>
       </p:ext>
     </p:extLst>
   </p:cSld>

</xml_diff>